<commit_message>
feat: add dict base section
</commit_message>
<xml_diff>
--- a/python 101/python_101.pptx
+++ b/python 101/python_101.pptx
@@ -43,11 +43,13 @@
     <p:sldId id="293" r:id="rId37"/>
     <p:sldId id="294" r:id="rId38"/>
     <p:sldId id="297" r:id="rId39"/>
-    <p:sldId id="292" r:id="rId40"/>
-    <p:sldId id="295" r:id="rId41"/>
-    <p:sldId id="296" r:id="rId42"/>
-    <p:sldId id="299" r:id="rId43"/>
-    <p:sldId id="298" r:id="rId44"/>
+    <p:sldId id="301" r:id="rId40"/>
+    <p:sldId id="300" r:id="rId41"/>
+    <p:sldId id="292" r:id="rId42"/>
+    <p:sldId id="295" r:id="rId43"/>
+    <p:sldId id="296" r:id="rId44"/>
+    <p:sldId id="299" r:id="rId45"/>
+    <p:sldId id="298" r:id="rId46"/>
   </p:sldIdLst>
   <p:sldSz cx="12192000" cy="6858000"/>
   <p:notesSz cx="6858000" cy="9144000"/>
@@ -2751,7 +2753,7 @@
             <a:fld id="{79F9FB66-DBE4-4599-9B3C-E1452FD2AC05}" type="datetimeFigureOut">
               <a:rPr lang="en-US" smtClean="0"/>
               <a:pPr/>
-              <a:t>9/9/2021</a:t>
+              <a:t>9/12/2021</a:t>
             </a:fld>
             <a:endParaRPr lang="en-US" dirty="0"/>
           </a:p>
@@ -2921,7 +2923,7 @@
             <a:fld id="{79F9FB66-DBE4-4599-9B3C-E1452FD2AC05}" type="datetimeFigureOut">
               <a:rPr lang="en-US" smtClean="0"/>
               <a:pPr/>
-              <a:t>9/9/2021</a:t>
+              <a:t>9/12/2021</a:t>
             </a:fld>
             <a:endParaRPr lang="en-US" dirty="0"/>
           </a:p>
@@ -3101,7 +3103,7 @@
             <a:fld id="{79F9FB66-DBE4-4599-9B3C-E1452FD2AC05}" type="datetimeFigureOut">
               <a:rPr lang="en-US" smtClean="0"/>
               <a:pPr/>
-              <a:t>9/9/2021</a:t>
+              <a:t>9/12/2021</a:t>
             </a:fld>
             <a:endParaRPr lang="en-US" dirty="0"/>
           </a:p>
@@ -3271,7 +3273,7 @@
             <a:fld id="{79F9FB66-DBE4-4599-9B3C-E1452FD2AC05}" type="datetimeFigureOut">
               <a:rPr lang="en-US" smtClean="0"/>
               <a:pPr/>
-              <a:t>9/9/2021</a:t>
+              <a:t>9/12/2021</a:t>
             </a:fld>
             <a:endParaRPr lang="en-US" dirty="0"/>
           </a:p>
@@ -3518,7 +3520,7 @@
             <a:fld id="{79F9FB66-DBE4-4599-9B3C-E1452FD2AC05}" type="datetimeFigureOut">
               <a:rPr lang="en-US" smtClean="0"/>
               <a:pPr/>
-              <a:t>9/9/2021</a:t>
+              <a:t>9/12/2021</a:t>
             </a:fld>
             <a:endParaRPr lang="en-US" dirty="0"/>
           </a:p>
@@ -3749,7 +3751,7 @@
             <a:fld id="{79F9FB66-DBE4-4599-9B3C-E1452FD2AC05}" type="datetimeFigureOut">
               <a:rPr lang="en-US" smtClean="0"/>
               <a:pPr/>
-              <a:t>9/9/2021</a:t>
+              <a:t>9/12/2021</a:t>
             </a:fld>
             <a:endParaRPr lang="en-US" dirty="0"/>
           </a:p>
@@ -4115,7 +4117,7 @@
             <a:fld id="{79F9FB66-DBE4-4599-9B3C-E1452FD2AC05}" type="datetimeFigureOut">
               <a:rPr lang="en-US" smtClean="0"/>
               <a:pPr/>
-              <a:t>9/9/2021</a:t>
+              <a:t>9/12/2021</a:t>
             </a:fld>
             <a:endParaRPr lang="en-US" dirty="0"/>
           </a:p>
@@ -4234,7 +4236,7 @@
             <a:fld id="{79F9FB66-DBE4-4599-9B3C-E1452FD2AC05}" type="datetimeFigureOut">
               <a:rPr lang="en-US" smtClean="0"/>
               <a:pPr/>
-              <a:t>9/9/2021</a:t>
+              <a:t>9/12/2021</a:t>
             </a:fld>
             <a:endParaRPr lang="en-US" dirty="0"/>
           </a:p>
@@ -4331,7 +4333,7 @@
             <a:fld id="{79F9FB66-DBE4-4599-9B3C-E1452FD2AC05}" type="datetimeFigureOut">
               <a:rPr lang="en-US" smtClean="0"/>
               <a:pPr/>
-              <a:t>9/9/2021</a:t>
+              <a:t>9/12/2021</a:t>
             </a:fld>
             <a:endParaRPr lang="en-US" dirty="0"/>
           </a:p>
@@ -4608,7 +4610,7 @@
             <a:fld id="{79F9FB66-DBE4-4599-9B3C-E1452FD2AC05}" type="datetimeFigureOut">
               <a:rPr lang="en-US" smtClean="0"/>
               <a:pPr/>
-              <a:t>9/9/2021</a:t>
+              <a:t>9/12/2021</a:t>
             </a:fld>
             <a:endParaRPr lang="en-US" dirty="0"/>
           </a:p>
@@ -4862,7 +4864,7 @@
             <a:fld id="{79F9FB66-DBE4-4599-9B3C-E1452FD2AC05}" type="datetimeFigureOut">
               <a:rPr lang="en-US" smtClean="0"/>
               <a:pPr/>
-              <a:t>9/9/2021</a:t>
+              <a:t>9/12/2021</a:t>
             </a:fld>
             <a:endParaRPr lang="en-US" dirty="0"/>
           </a:p>
@@ -5105,7 +5107,7 @@
             <a:fld id="{79F9FB66-DBE4-4599-9B3C-E1452FD2AC05}" type="datetimeFigureOut">
               <a:rPr lang="en-US" smtClean="0"/>
               <a:pPr/>
-              <a:t>9/9/2021</a:t>
+              <a:t>9/12/2021</a:t>
             </a:fld>
             <a:endParaRPr lang="en-US" dirty="0"/>
           </a:p>
@@ -11212,7 +11214,7 @@
             <a:pPr algn="ctr"/>
             <a:r>
               <a:rPr lang="en-US" b="1" dirty="0"/>
-              <a:t>List Comprehension</a:t>
+              <a:t>List Comprehension (Generator)</a:t>
             </a:r>
             <a:endParaRPr lang="ru-RU" b="1" dirty="0"/>
           </a:p>
@@ -11236,13 +11238,13 @@
         </p:spPr>
         <p:txBody>
           <a:bodyPr>
-            <a:normAutofit/>
+            <a:normAutofit lnSpcReduction="10000"/>
           </a:bodyPr>
           <a:lstStyle/>
           <a:p>
             <a:r>
               <a:rPr lang="en-US" dirty="0"/>
-              <a:t>List comprehension offers a shorter syntax when you want to create a new list based on the values of an existing list.    Common syntax –  			          </a:t>
+              <a:t>List comprehension offers a shorter syntax when you want to create a new list based on the values of an existing list.    Common syntax (or generator)  –  			          </a:t>
             </a:r>
             <a:r>
               <a:rPr lang="en-US" sz="1700" dirty="0" err="1">
@@ -12652,6 +12654,58 @@
       </p:grpSpPr>
       <p:sp>
         <p:nvSpPr>
+          <p:cNvPr id="5" name="Прямоугольник 4">
+            <a:extLst>
+              <a:ext uri="{FF2B5EF4-FFF2-40B4-BE49-F238E27FC236}">
+                <a16:creationId xmlns:a16="http://schemas.microsoft.com/office/drawing/2014/main" id="{247A1D87-67BB-4E72-A9D2-90151956BEDF}"/>
+              </a:ext>
+            </a:extLst>
+          </p:cNvPr>
+          <p:cNvSpPr/>
+          <p:nvPr/>
+        </p:nvSpPr>
+        <p:spPr>
+          <a:xfrm>
+            <a:off x="4876800" y="993913"/>
+            <a:ext cx="2451652" cy="318052"/>
+          </a:xfrm>
+          <a:prstGeom prst="rect">
+            <a:avLst/>
+          </a:prstGeom>
+          <a:solidFill>
+            <a:srgbClr val="65F8FF"/>
+          </a:solidFill>
+          <a:ln>
+            <a:noFill/>
+          </a:ln>
+        </p:spPr>
+        <p:style>
+          <a:lnRef idx="2">
+            <a:schemeClr val="accent1">
+              <a:shade val="50000"/>
+            </a:schemeClr>
+          </a:lnRef>
+          <a:fillRef idx="1">
+            <a:schemeClr val="accent1"/>
+          </a:fillRef>
+          <a:effectRef idx="0">
+            <a:schemeClr val="accent1"/>
+          </a:effectRef>
+          <a:fontRef idx="minor">
+            <a:schemeClr val="lt1"/>
+          </a:fontRef>
+        </p:style>
+        <p:txBody>
+          <a:bodyPr rtlCol="0" anchor="ctr"/>
+          <a:lstStyle/>
+          <a:p>
+            <a:pPr algn="ctr"/>
+            <a:endParaRPr lang="ru-RU"/>
+          </a:p>
+        </p:txBody>
+      </p:sp>
+      <p:sp>
+        <p:nvSpPr>
           <p:cNvPr id="2" name="Заголовок 1"/>
           <p:cNvSpPr>
             <a:spLocks noGrp="1"/>
@@ -12665,7 +12719,12 @@
           <a:bodyPr/>
           <a:lstStyle/>
           <a:p>
-            <a:endParaRPr lang="ru-RU"/>
+            <a:pPr algn="ctr"/>
+            <a:r>
+              <a:rPr lang="en-US" b="1" dirty="0"/>
+              <a:t>Dictionary</a:t>
+            </a:r>
+            <a:endParaRPr lang="ru-RU" dirty="0"/>
           </a:p>
         </p:txBody>
       </p:sp>
@@ -12684,10 +12743,133 @@
           <a:bodyPr/>
           <a:lstStyle/>
           <a:p>
-            <a:endParaRPr lang="ru-RU"/>
+            <a:r>
+              <a:rPr lang="en-US" dirty="0" err="1">
+                <a:solidFill>
+                  <a:srgbClr val="FF0000"/>
+                </a:solidFill>
+              </a:rPr>
+              <a:t>dict</a:t>
+            </a:r>
+            <a:r>
+              <a:rPr lang="en-US" dirty="0"/>
+              <a:t> is a data structure in python where we may store our data in </a:t>
+            </a:r>
+            <a:r>
+              <a:rPr lang="en-US" dirty="0">
+                <a:solidFill>
+                  <a:srgbClr val="FF0000"/>
+                </a:solidFill>
+              </a:rPr>
+              <a:t>key: value </a:t>
+            </a:r>
+            <a:r>
+              <a:rPr lang="en-US" dirty="0"/>
+              <a:t>pair.</a:t>
+            </a:r>
+          </a:p>
+          <a:p>
+            <a:r>
+              <a:rPr lang="en-US" dirty="0" err="1">
+                <a:solidFill>
+                  <a:srgbClr val="FF0000"/>
+                </a:solidFill>
+              </a:rPr>
+              <a:t>dict</a:t>
+            </a:r>
+            <a:r>
+              <a:rPr lang="en-US" dirty="0"/>
+              <a:t> is a collection which is ordered*, changeable and does not allow duplicates.</a:t>
+            </a:r>
+          </a:p>
+          <a:p>
+            <a:pPr lvl="1"/>
+            <a:r>
+              <a:rPr lang="en-US" dirty="0">
+                <a:highlight>
+                  <a:srgbClr val="FFFF00"/>
+                </a:highlight>
+              </a:rPr>
+              <a:t>As of Python version 3.7, dictionaries are </a:t>
+            </a:r>
+            <a:r>
+              <a:rPr lang="en-US" i="1" dirty="0">
+                <a:highlight>
+                  <a:srgbClr val="FFFF00"/>
+                </a:highlight>
+              </a:rPr>
+              <a:t>ordered</a:t>
+            </a:r>
+            <a:r>
+              <a:rPr lang="en-US" dirty="0">
+                <a:highlight>
+                  <a:srgbClr val="FFFF00"/>
+                </a:highlight>
+              </a:rPr>
+              <a:t>. In Python 3.6 and earlier, dictionaries are </a:t>
+            </a:r>
+            <a:r>
+              <a:rPr lang="en-US" i="1" dirty="0">
+                <a:highlight>
+                  <a:srgbClr val="FFFF00"/>
+                </a:highlight>
+              </a:rPr>
+              <a:t>unordered.</a:t>
+            </a:r>
+            <a:endParaRPr lang="en-US" dirty="0"/>
+          </a:p>
+          <a:p>
+            <a:r>
+              <a:rPr lang="en-US" dirty="0" err="1"/>
+              <a:t>Dict</a:t>
+            </a:r>
+            <a:r>
+              <a:rPr lang="en-US" dirty="0"/>
+              <a:t> keys always a strings</a:t>
+            </a:r>
+          </a:p>
+          <a:p>
+            <a:r>
+              <a:rPr lang="en-US" dirty="0" err="1"/>
+              <a:t>Dict</a:t>
+            </a:r>
+            <a:r>
+              <a:rPr lang="en-US" dirty="0"/>
+              <a:t> value may be different types</a:t>
+            </a:r>
           </a:p>
         </p:txBody>
       </p:sp>
+      <p:pic>
+        <p:nvPicPr>
+          <p:cNvPr id="6" name="Рисунок 5">
+            <a:extLst>
+              <a:ext uri="{FF2B5EF4-FFF2-40B4-BE49-F238E27FC236}">
+                <a16:creationId xmlns:a16="http://schemas.microsoft.com/office/drawing/2014/main" id="{42AEB133-B6ED-481A-9047-E19F59AA4214}"/>
+              </a:ext>
+            </a:extLst>
+          </p:cNvPr>
+          <p:cNvPicPr>
+            <a:picLocks noChangeAspect="1"/>
+          </p:cNvPicPr>
+          <p:nvPr/>
+        </p:nvPicPr>
+        <p:blipFill>
+          <a:blip r:embed="rId2"/>
+          <a:stretch>
+            <a:fillRect/>
+          </a:stretch>
+        </p:blipFill>
+        <p:spPr>
+          <a:xfrm>
+            <a:off x="6891130" y="4126171"/>
+            <a:ext cx="3551583" cy="2366704"/>
+          </a:xfrm>
+          <a:prstGeom prst="rect">
+            <a:avLst/>
+          </a:prstGeom>
+        </p:spPr>
+      </p:pic>
     </p:spTree>
   </p:cSld>
   <p:clrMapOvr>
@@ -12697,6 +12879,684 @@
 </file>
 
 <file path=ppt/slides/slide39.xml><?xml version="1.0" encoding="utf-8"?>
+<p:sld xmlns:a="http://schemas.openxmlformats.org/drawingml/2006/main" xmlns:r="http://schemas.openxmlformats.org/officeDocument/2006/relationships" xmlns:p="http://schemas.openxmlformats.org/presentationml/2006/main">
+  <p:cSld>
+    <p:spTree>
+      <p:nvGrpSpPr>
+        <p:cNvPr id="1" name=""/>
+        <p:cNvGrpSpPr/>
+        <p:nvPr/>
+      </p:nvGrpSpPr>
+      <p:grpSpPr>
+        <a:xfrm>
+          <a:off x="0" y="0"/>
+          <a:ext cx="0" cy="0"/>
+          <a:chOff x="0" y="0"/>
+          <a:chExt cx="0" cy="0"/>
+        </a:xfrm>
+      </p:grpSpPr>
+      <p:sp>
+        <p:nvSpPr>
+          <p:cNvPr id="2" name="Заголовок 1">
+            <a:extLst>
+              <a:ext uri="{FF2B5EF4-FFF2-40B4-BE49-F238E27FC236}">
+                <a16:creationId xmlns:a16="http://schemas.microsoft.com/office/drawing/2014/main" id="{DD5F6D06-4788-4EA8-82B0-0155C312B5BE}"/>
+              </a:ext>
+            </a:extLst>
+          </p:cNvPr>
+          <p:cNvSpPr>
+            <a:spLocks noGrp="1"/>
+          </p:cNvSpPr>
+          <p:nvPr>
+            <p:ph type="title"/>
+          </p:nvPr>
+        </p:nvSpPr>
+        <p:spPr/>
+        <p:txBody>
+          <a:bodyPr/>
+          <a:lstStyle/>
+          <a:p>
+            <a:pPr algn="ctr"/>
+            <a:r>
+              <a:rPr lang="en-US" dirty="0"/>
+              <a:t>Create a </a:t>
+            </a:r>
+            <a:r>
+              <a:rPr lang="en-US" dirty="0" err="1"/>
+              <a:t>dict</a:t>
+            </a:r>
+            <a:endParaRPr lang="ru-RU" dirty="0"/>
+          </a:p>
+        </p:txBody>
+      </p:sp>
+      <p:sp>
+        <p:nvSpPr>
+          <p:cNvPr id="3" name="Объект 2">
+            <a:extLst>
+              <a:ext uri="{FF2B5EF4-FFF2-40B4-BE49-F238E27FC236}">
+                <a16:creationId xmlns:a16="http://schemas.microsoft.com/office/drawing/2014/main" id="{C127DC5E-D7C1-4597-81DD-5F308250F84D}"/>
+              </a:ext>
+            </a:extLst>
+          </p:cNvPr>
+          <p:cNvSpPr>
+            <a:spLocks noGrp="1"/>
+          </p:cNvSpPr>
+          <p:nvPr>
+            <p:ph idx="1"/>
+          </p:nvPr>
+        </p:nvSpPr>
+        <p:spPr>
+          <a:xfrm>
+            <a:off x="838200" y="1825625"/>
+            <a:ext cx="4621696" cy="4893227"/>
+          </a:xfrm>
+        </p:spPr>
+        <p:txBody>
+          <a:bodyPr>
+            <a:normAutofit fontScale="92500" lnSpcReduction="20000"/>
+          </a:bodyPr>
+          <a:lstStyle/>
+          <a:p>
+            <a:r>
+              <a:rPr lang="en-US" dirty="0"/>
+              <a:t>To create a </a:t>
+            </a:r>
+            <a:r>
+              <a:rPr lang="en-US" dirty="0" err="1">
+                <a:solidFill>
+                  <a:srgbClr val="FF0000"/>
+                </a:solidFill>
+              </a:rPr>
+              <a:t>dict</a:t>
+            </a:r>
+            <a:r>
+              <a:rPr lang="en-US" dirty="0"/>
+              <a:t> you may use a common syntax</a:t>
+            </a:r>
+          </a:p>
+          <a:p>
+            <a:endParaRPr lang="en-US" dirty="0"/>
+          </a:p>
+          <a:p>
+            <a:r>
+              <a:rPr lang="en-US" dirty="0"/>
+              <a:t>Create with </a:t>
+            </a:r>
+            <a:r>
+              <a:rPr lang="en-US" dirty="0" err="1">
+                <a:solidFill>
+                  <a:srgbClr val="FF0000"/>
+                </a:solidFill>
+              </a:rPr>
+              <a:t>dict</a:t>
+            </a:r>
+            <a:r>
+              <a:rPr lang="en-US" dirty="0">
+                <a:solidFill>
+                  <a:srgbClr val="FF0000"/>
+                </a:solidFill>
+              </a:rPr>
+              <a:t>() </a:t>
+            </a:r>
+            <a:r>
+              <a:rPr lang="en-US" dirty="0"/>
+              <a:t>. There we use a list of tuples that contains key, value</a:t>
+            </a:r>
+          </a:p>
+          <a:p>
+            <a:endParaRPr lang="en-US" dirty="0"/>
+          </a:p>
+          <a:p>
+            <a:r>
+              <a:rPr lang="en-US" dirty="0"/>
+              <a:t> uses </a:t>
+            </a:r>
+            <a:r>
+              <a:rPr lang="en-US" dirty="0" err="1">
+                <a:solidFill>
+                  <a:srgbClr val="FF0000"/>
+                </a:solidFill>
+              </a:rPr>
+              <a:t>dict.fromkeys</a:t>
+            </a:r>
+            <a:r>
+              <a:rPr lang="en-US" dirty="0">
+                <a:solidFill>
+                  <a:srgbClr val="FF0000"/>
+                </a:solidFill>
+              </a:rPr>
+              <a:t>() </a:t>
+            </a:r>
+            <a:r>
+              <a:rPr lang="en-US" dirty="0"/>
+              <a:t>. In the first case, our </a:t>
+            </a:r>
+            <a:r>
+              <a:rPr lang="en-US" dirty="0" err="1"/>
+              <a:t>dict</a:t>
+            </a:r>
+            <a:r>
+              <a:rPr lang="en-US" dirty="0"/>
+              <a:t> doesn’t have values.</a:t>
+            </a:r>
+          </a:p>
+          <a:p>
+            <a:endParaRPr lang="en-US" dirty="0"/>
+          </a:p>
+          <a:p>
+            <a:r>
+              <a:rPr lang="en-US" dirty="0"/>
+              <a:t>Or use a generator. </a:t>
+            </a:r>
+            <a:r>
+              <a:rPr lang="en-US" dirty="0">
+                <a:highlight>
+                  <a:srgbClr val="FFFF00"/>
+                </a:highlight>
+              </a:rPr>
+              <a:t>Note!</a:t>
+            </a:r>
+            <a:r>
+              <a:rPr lang="en-US" dirty="0"/>
+              <a:t> We used a curly brackets  </a:t>
+            </a:r>
+            <a:endParaRPr lang="ru-RU" dirty="0"/>
+          </a:p>
+        </p:txBody>
+      </p:sp>
+      <p:pic>
+        <p:nvPicPr>
+          <p:cNvPr id="4" name="Рисунок 3">
+            <a:extLst>
+              <a:ext uri="{FF2B5EF4-FFF2-40B4-BE49-F238E27FC236}">
+                <a16:creationId xmlns:a16="http://schemas.microsoft.com/office/drawing/2014/main" id="{DB63E1ED-F45C-4611-B6BB-992530B08068}"/>
+              </a:ext>
+            </a:extLst>
+          </p:cNvPr>
+          <p:cNvPicPr>
+            <a:picLocks noChangeAspect="1"/>
+          </p:cNvPicPr>
+          <p:nvPr/>
+        </p:nvPicPr>
+        <p:blipFill>
+          <a:blip r:embed="rId2"/>
+          <a:stretch>
+            <a:fillRect/>
+          </a:stretch>
+        </p:blipFill>
+        <p:spPr>
+          <a:xfrm>
+            <a:off x="6188766" y="1825626"/>
+            <a:ext cx="3061251" cy="510208"/>
+          </a:xfrm>
+          <a:prstGeom prst="rect">
+            <a:avLst/>
+          </a:prstGeom>
+        </p:spPr>
+      </p:pic>
+      <p:pic>
+        <p:nvPicPr>
+          <p:cNvPr id="5" name="Рисунок 4">
+            <a:extLst>
+              <a:ext uri="{FF2B5EF4-FFF2-40B4-BE49-F238E27FC236}">
+                <a16:creationId xmlns:a16="http://schemas.microsoft.com/office/drawing/2014/main" id="{50B009FF-3B46-4A58-9E88-3822EA1C5A65}"/>
+              </a:ext>
+            </a:extLst>
+          </p:cNvPr>
+          <p:cNvPicPr>
+            <a:picLocks noChangeAspect="1"/>
+          </p:cNvPicPr>
+          <p:nvPr/>
+        </p:nvPicPr>
+        <p:blipFill>
+          <a:blip r:embed="rId3"/>
+          <a:stretch>
+            <a:fillRect/>
+          </a:stretch>
+        </p:blipFill>
+        <p:spPr>
+          <a:xfrm>
+            <a:off x="6188766" y="2822299"/>
+            <a:ext cx="5646302" cy="510208"/>
+          </a:xfrm>
+          <a:prstGeom prst="rect">
+            <a:avLst/>
+          </a:prstGeom>
+        </p:spPr>
+      </p:pic>
+      <p:pic>
+        <p:nvPicPr>
+          <p:cNvPr id="6" name="Рисунок 5">
+            <a:extLst>
+              <a:ext uri="{FF2B5EF4-FFF2-40B4-BE49-F238E27FC236}">
+                <a16:creationId xmlns:a16="http://schemas.microsoft.com/office/drawing/2014/main" id="{BCCE4D55-B9F1-45BF-99DC-6ACE524FDA5D}"/>
+              </a:ext>
+            </a:extLst>
+          </p:cNvPr>
+          <p:cNvPicPr>
+            <a:picLocks noChangeAspect="1"/>
+          </p:cNvPicPr>
+          <p:nvPr/>
+        </p:nvPicPr>
+        <p:blipFill>
+          <a:blip r:embed="rId4"/>
+          <a:stretch>
+            <a:fillRect/>
+          </a:stretch>
+        </p:blipFill>
+        <p:spPr>
+          <a:xfrm>
+            <a:off x="6188766" y="3891860"/>
+            <a:ext cx="5629074" cy="978315"/>
+          </a:xfrm>
+          <a:prstGeom prst="rect">
+            <a:avLst/>
+          </a:prstGeom>
+        </p:spPr>
+      </p:pic>
+      <p:pic>
+        <p:nvPicPr>
+          <p:cNvPr id="7" name="Рисунок 6">
+            <a:extLst>
+              <a:ext uri="{FF2B5EF4-FFF2-40B4-BE49-F238E27FC236}">
+                <a16:creationId xmlns:a16="http://schemas.microsoft.com/office/drawing/2014/main" id="{68D42A08-03AA-4768-9F11-8CC934EBDE73}"/>
+              </a:ext>
+            </a:extLst>
+          </p:cNvPr>
+          <p:cNvPicPr>
+            <a:picLocks noChangeAspect="1"/>
+          </p:cNvPicPr>
+          <p:nvPr/>
+        </p:nvPicPr>
+        <p:blipFill>
+          <a:blip r:embed="rId5"/>
+          <a:stretch>
+            <a:fillRect/>
+          </a:stretch>
+        </p:blipFill>
+        <p:spPr>
+          <a:xfrm>
+            <a:off x="6188766" y="5382731"/>
+            <a:ext cx="5629074" cy="440329"/>
+          </a:xfrm>
+          <a:prstGeom prst="rect">
+            <a:avLst/>
+          </a:prstGeom>
+        </p:spPr>
+      </p:pic>
+    </p:spTree>
+    <p:extLst>
+      <p:ext uri="{BB962C8B-B14F-4D97-AF65-F5344CB8AC3E}">
+        <p14:creationId xmlns:p14="http://schemas.microsoft.com/office/powerpoint/2010/main" val="1698809376"/>
+      </p:ext>
+    </p:extLst>
+  </p:cSld>
+  <p:clrMapOvr>
+    <a:masterClrMapping/>
+  </p:clrMapOvr>
+</p:sld>
+</file>
+
+<file path=ppt/slides/slide4.xml><?xml version="1.0" encoding="utf-8"?>
+<p:sld xmlns:a="http://schemas.openxmlformats.org/drawingml/2006/main" xmlns:r="http://schemas.openxmlformats.org/officeDocument/2006/relationships" xmlns:p="http://schemas.openxmlformats.org/presentationml/2006/main">
+  <p:cSld>
+    <p:spTree>
+      <p:nvGrpSpPr>
+        <p:cNvPr id="1" name=""/>
+        <p:cNvGrpSpPr/>
+        <p:nvPr/>
+      </p:nvGrpSpPr>
+      <p:grpSpPr>
+        <a:xfrm>
+          <a:off x="0" y="0"/>
+          <a:ext cx="0" cy="0"/>
+          <a:chOff x="0" y="0"/>
+          <a:chExt cx="0" cy="0"/>
+        </a:xfrm>
+      </p:grpSpPr>
+      <p:sp>
+        <p:nvSpPr>
+          <p:cNvPr id="2" name="Заголовок 1"/>
+          <p:cNvSpPr>
+            <a:spLocks noGrp="1"/>
+          </p:cNvSpPr>
+          <p:nvPr>
+            <p:ph type="title"/>
+          </p:nvPr>
+        </p:nvSpPr>
+        <p:spPr/>
+        <p:txBody>
+          <a:bodyPr/>
+          <a:lstStyle/>
+          <a:p>
+            <a:endParaRPr lang="ru-RU" dirty="0"/>
+          </a:p>
+        </p:txBody>
+      </p:sp>
+      <p:sp>
+        <p:nvSpPr>
+          <p:cNvPr id="3" name="Содержимое 2"/>
+          <p:cNvSpPr>
+            <a:spLocks noGrp="1"/>
+          </p:cNvSpPr>
+          <p:nvPr>
+            <p:ph idx="1"/>
+          </p:nvPr>
+        </p:nvSpPr>
+        <p:spPr/>
+        <p:txBody>
+          <a:bodyPr/>
+          <a:lstStyle/>
+          <a:p>
+            <a:endParaRPr lang="ru-RU" dirty="0"/>
+          </a:p>
+        </p:txBody>
+      </p:sp>
+      <p:pic>
+        <p:nvPicPr>
+          <p:cNvPr id="2050" name="Picture 2"/>
+          <p:cNvPicPr>
+            <a:picLocks noChangeAspect="1" noChangeArrowheads="1"/>
+          </p:cNvPicPr>
+          <p:nvPr/>
+        </p:nvPicPr>
+        <p:blipFill>
+          <a:blip r:embed="rId2"/>
+          <a:srcRect/>
+          <a:stretch>
+            <a:fillRect/>
+          </a:stretch>
+        </p:blipFill>
+        <p:spPr bwMode="auto">
+          <a:xfrm>
+            <a:off x="256032" y="640080"/>
+            <a:ext cx="6850319" cy="5200650"/>
+          </a:xfrm>
+          <a:prstGeom prst="rect">
+            <a:avLst/>
+          </a:prstGeom>
+          <a:noFill/>
+          <a:ln w="9525">
+            <a:noFill/>
+            <a:miter lim="800000"/>
+            <a:headEnd/>
+            <a:tailEnd/>
+          </a:ln>
+          <a:effectLst/>
+        </p:spPr>
+      </p:pic>
+      <p:pic>
+        <p:nvPicPr>
+          <p:cNvPr id="2051" name="Picture 3"/>
+          <p:cNvPicPr>
+            <a:picLocks noChangeAspect="1" noChangeArrowheads="1"/>
+          </p:cNvPicPr>
+          <p:nvPr/>
+        </p:nvPicPr>
+        <p:blipFill>
+          <a:blip r:embed="rId3"/>
+          <a:srcRect/>
+          <a:stretch>
+            <a:fillRect/>
+          </a:stretch>
+        </p:blipFill>
+        <p:spPr bwMode="auto">
+          <a:xfrm>
+            <a:off x="7486269" y="621792"/>
+            <a:ext cx="3963326" cy="5212272"/>
+          </a:xfrm>
+          <a:prstGeom prst="rect">
+            <a:avLst/>
+          </a:prstGeom>
+          <a:noFill/>
+          <a:ln w="9525">
+            <a:noFill/>
+            <a:miter lim="800000"/>
+            <a:headEnd/>
+            <a:tailEnd/>
+          </a:ln>
+          <a:effectLst/>
+        </p:spPr>
+      </p:pic>
+    </p:spTree>
+  </p:cSld>
+  <p:clrMapOvr>
+    <a:masterClrMapping/>
+  </p:clrMapOvr>
+</p:sld>
+</file>
+
+<file path=ppt/slides/slide40.xml><?xml version="1.0" encoding="utf-8"?>
+<p:sld xmlns:a="http://schemas.openxmlformats.org/drawingml/2006/main" xmlns:r="http://schemas.openxmlformats.org/officeDocument/2006/relationships" xmlns:p="http://schemas.openxmlformats.org/presentationml/2006/main">
+  <p:cSld>
+    <p:spTree>
+      <p:nvGrpSpPr>
+        <p:cNvPr id="1" name=""/>
+        <p:cNvGrpSpPr/>
+        <p:nvPr/>
+      </p:nvGrpSpPr>
+      <p:grpSpPr>
+        <a:xfrm>
+          <a:off x="0" y="0"/>
+          <a:ext cx="0" cy="0"/>
+          <a:chOff x="0" y="0"/>
+          <a:chExt cx="0" cy="0"/>
+        </a:xfrm>
+      </p:grpSpPr>
+      <p:sp>
+        <p:nvSpPr>
+          <p:cNvPr id="2" name="Заголовок 1">
+            <a:extLst>
+              <a:ext uri="{FF2B5EF4-FFF2-40B4-BE49-F238E27FC236}">
+                <a16:creationId xmlns:a16="http://schemas.microsoft.com/office/drawing/2014/main" id="{47965378-A975-4970-AFD5-300EC5A33050}"/>
+              </a:ext>
+            </a:extLst>
+          </p:cNvPr>
+          <p:cNvSpPr>
+            <a:spLocks noGrp="1"/>
+          </p:cNvSpPr>
+          <p:nvPr>
+            <p:ph type="title"/>
+          </p:nvPr>
+        </p:nvSpPr>
+        <p:spPr>
+          <a:xfrm>
+            <a:off x="838200" y="365126"/>
+            <a:ext cx="10515600" cy="933588"/>
+          </a:xfrm>
+        </p:spPr>
+        <p:txBody>
+          <a:bodyPr/>
+          <a:lstStyle/>
+          <a:p>
+            <a:pPr algn="ctr"/>
+            <a:r>
+              <a:rPr lang="en-US" dirty="0"/>
+              <a:t>Access data </a:t>
+            </a:r>
+            <a:endParaRPr lang="ru-RU" dirty="0"/>
+          </a:p>
+        </p:txBody>
+      </p:sp>
+      <p:sp>
+        <p:nvSpPr>
+          <p:cNvPr id="3" name="Объект 2">
+            <a:extLst>
+              <a:ext uri="{FF2B5EF4-FFF2-40B4-BE49-F238E27FC236}">
+                <a16:creationId xmlns:a16="http://schemas.microsoft.com/office/drawing/2014/main" id="{118513B2-1CD4-48F8-AC80-448D554C9C84}"/>
+              </a:ext>
+            </a:extLst>
+          </p:cNvPr>
+          <p:cNvSpPr>
+            <a:spLocks noGrp="1"/>
+          </p:cNvSpPr>
+          <p:nvPr>
+            <p:ph idx="1"/>
+          </p:nvPr>
+        </p:nvSpPr>
+        <p:spPr>
+          <a:xfrm>
+            <a:off x="838200" y="1205948"/>
+            <a:ext cx="5165035" cy="5446643"/>
+          </a:xfrm>
+        </p:spPr>
+        <p:txBody>
+          <a:bodyPr>
+            <a:normAutofit fontScale="92500" lnSpcReduction="20000"/>
+          </a:bodyPr>
+          <a:lstStyle/>
+          <a:p>
+            <a:r>
+              <a:rPr lang="en-US" dirty="0"/>
+              <a:t>For access we may use direct method</a:t>
+            </a:r>
+          </a:p>
+          <a:p>
+            <a:r>
+              <a:rPr lang="en-US" dirty="0"/>
+              <a:t>Also we may do it with </a:t>
+            </a:r>
+            <a:r>
+              <a:rPr lang="en-US" dirty="0">
+                <a:solidFill>
+                  <a:srgbClr val="FF0000"/>
+                </a:solidFill>
+              </a:rPr>
+              <a:t>.get(</a:t>
+            </a:r>
+            <a:r>
+              <a:rPr lang="en-US" dirty="0"/>
+              <a:t>str</a:t>
+            </a:r>
+            <a:r>
+              <a:rPr lang="en-US" dirty="0">
+                <a:solidFill>
+                  <a:srgbClr val="FF0000"/>
+                </a:solidFill>
+              </a:rPr>
+              <a:t>) </a:t>
+            </a:r>
+            <a:r>
+              <a:rPr lang="en-US" dirty="0"/>
+              <a:t>function</a:t>
+            </a:r>
+          </a:p>
+          <a:p>
+            <a:r>
+              <a:rPr lang="en-US" dirty="0"/>
+              <a:t>We may separate keys and values with eponymous functions. These functions return to us a list with keys or values</a:t>
+            </a:r>
+          </a:p>
+          <a:p>
+            <a:r>
+              <a:rPr lang="en-US" dirty="0"/>
+              <a:t>If we want to get keys and values together we may use </a:t>
+            </a:r>
+            <a:r>
+              <a:rPr lang="en-US" dirty="0">
+                <a:solidFill>
+                  <a:srgbClr val="FF0000"/>
+                </a:solidFill>
+              </a:rPr>
+              <a:t>.items() </a:t>
+            </a:r>
+            <a:r>
+              <a:rPr lang="en-US" dirty="0"/>
+              <a:t>. It returns a </a:t>
+            </a:r>
+            <a:r>
+              <a:rPr lang="en-US" dirty="0" err="1">
+                <a:solidFill>
+                  <a:srgbClr val="FF0000"/>
+                </a:solidFill>
+              </a:rPr>
+              <a:t>dict_items</a:t>
+            </a:r>
+            <a:r>
+              <a:rPr lang="en-US" dirty="0">
+                <a:solidFill>
+                  <a:srgbClr val="FF0000"/>
+                </a:solidFill>
+              </a:rPr>
+              <a:t> </a:t>
+            </a:r>
+            <a:r>
+              <a:rPr lang="en-US" dirty="0"/>
+              <a:t>structure with a list of tuples that contains key, value. To get it as a list you must transform it to the list before.</a:t>
+            </a:r>
+          </a:p>
+          <a:p>
+            <a:r>
+              <a:rPr lang="en-US" dirty="0"/>
+              <a:t>To check a property in a </a:t>
+            </a:r>
+            <a:r>
+              <a:rPr lang="en-US" dirty="0" err="1"/>
+              <a:t>dict</a:t>
+            </a:r>
+            <a:r>
+              <a:rPr lang="en-US" dirty="0"/>
+              <a:t> use  -</a:t>
+            </a:r>
+            <a:r>
+              <a:rPr lang="en-US" dirty="0">
+                <a:solidFill>
+                  <a:srgbClr val="FF0000"/>
+                </a:solidFill>
+              </a:rPr>
+              <a:t> in </a:t>
+            </a:r>
+            <a:r>
+              <a:rPr lang="en-US" dirty="0"/>
+              <a:t>keyword</a:t>
+            </a:r>
+          </a:p>
+        </p:txBody>
+      </p:sp>
+      <p:pic>
+        <p:nvPicPr>
+          <p:cNvPr id="4" name="Рисунок 3">
+            <a:extLst>
+              <a:ext uri="{FF2B5EF4-FFF2-40B4-BE49-F238E27FC236}">
+                <a16:creationId xmlns:a16="http://schemas.microsoft.com/office/drawing/2014/main" id="{BF8226BE-D99A-4826-AC66-46AAB9D5E05D}"/>
+              </a:ext>
+            </a:extLst>
+          </p:cNvPr>
+          <p:cNvPicPr>
+            <a:picLocks noChangeAspect="1"/>
+          </p:cNvPicPr>
+          <p:nvPr/>
+        </p:nvPicPr>
+        <p:blipFill>
+          <a:blip r:embed="rId2"/>
+          <a:stretch>
+            <a:fillRect/>
+          </a:stretch>
+        </p:blipFill>
+        <p:spPr>
+          <a:xfrm>
+            <a:off x="6175515" y="1574524"/>
+            <a:ext cx="5890972" cy="3620328"/>
+          </a:xfrm>
+          <a:prstGeom prst="rect">
+            <a:avLst/>
+          </a:prstGeom>
+        </p:spPr>
+      </p:pic>
+    </p:spTree>
+    <p:extLst>
+      <p:ext uri="{BB962C8B-B14F-4D97-AF65-F5344CB8AC3E}">
+        <p14:creationId xmlns:p14="http://schemas.microsoft.com/office/powerpoint/2010/main" val="2199442591"/>
+      </p:ext>
+    </p:extLst>
+  </p:cSld>
+  <p:clrMapOvr>
+    <a:masterClrMapping/>
+  </p:clrMapOvr>
+</p:sld>
+</file>
+
+<file path=ppt/slides/slide41.xml><?xml version="1.0" encoding="utf-8"?>
 <p:sld xmlns:a="http://schemas.openxmlformats.org/drawingml/2006/main" xmlns:r="http://schemas.openxmlformats.org/officeDocument/2006/relationships" xmlns:p="http://schemas.openxmlformats.org/presentationml/2006/main">
   <p:cSld>
     <p:spTree>
@@ -12936,7 +13796,7 @@
 </p:sld>
 </file>
 
-<file path=ppt/slides/slide4.xml><?xml version="1.0" encoding="utf-8"?>
+<file path=ppt/slides/slide42.xml><?xml version="1.0" encoding="utf-8"?>
 <p:sld xmlns:a="http://schemas.openxmlformats.org/drawingml/2006/main" xmlns:r="http://schemas.openxmlformats.org/officeDocument/2006/relationships" xmlns:p="http://schemas.openxmlformats.org/presentationml/2006/main">
   <p:cSld>
     <p:spTree>
@@ -12968,135 +13828,6 @@
           <a:bodyPr/>
           <a:lstStyle/>
           <a:p>
-            <a:endParaRPr lang="ru-RU" dirty="0"/>
-          </a:p>
-        </p:txBody>
-      </p:sp>
-      <p:sp>
-        <p:nvSpPr>
-          <p:cNvPr id="3" name="Содержимое 2"/>
-          <p:cNvSpPr>
-            <a:spLocks noGrp="1"/>
-          </p:cNvSpPr>
-          <p:nvPr>
-            <p:ph idx="1"/>
-          </p:nvPr>
-        </p:nvSpPr>
-        <p:spPr/>
-        <p:txBody>
-          <a:bodyPr/>
-          <a:lstStyle/>
-          <a:p>
-            <a:endParaRPr lang="ru-RU" dirty="0"/>
-          </a:p>
-        </p:txBody>
-      </p:sp>
-      <p:pic>
-        <p:nvPicPr>
-          <p:cNvPr id="2050" name="Picture 2"/>
-          <p:cNvPicPr>
-            <a:picLocks noChangeAspect="1" noChangeArrowheads="1"/>
-          </p:cNvPicPr>
-          <p:nvPr/>
-        </p:nvPicPr>
-        <p:blipFill>
-          <a:blip r:embed="rId2"/>
-          <a:srcRect/>
-          <a:stretch>
-            <a:fillRect/>
-          </a:stretch>
-        </p:blipFill>
-        <p:spPr bwMode="auto">
-          <a:xfrm>
-            <a:off x="256032" y="640080"/>
-            <a:ext cx="6850319" cy="5200650"/>
-          </a:xfrm>
-          <a:prstGeom prst="rect">
-            <a:avLst/>
-          </a:prstGeom>
-          <a:noFill/>
-          <a:ln w="9525">
-            <a:noFill/>
-            <a:miter lim="800000"/>
-            <a:headEnd/>
-            <a:tailEnd/>
-          </a:ln>
-          <a:effectLst/>
-        </p:spPr>
-      </p:pic>
-      <p:pic>
-        <p:nvPicPr>
-          <p:cNvPr id="2051" name="Picture 3"/>
-          <p:cNvPicPr>
-            <a:picLocks noChangeAspect="1" noChangeArrowheads="1"/>
-          </p:cNvPicPr>
-          <p:nvPr/>
-        </p:nvPicPr>
-        <p:blipFill>
-          <a:blip r:embed="rId3"/>
-          <a:srcRect/>
-          <a:stretch>
-            <a:fillRect/>
-          </a:stretch>
-        </p:blipFill>
-        <p:spPr bwMode="auto">
-          <a:xfrm>
-            <a:off x="7486269" y="621792"/>
-            <a:ext cx="3963326" cy="5212272"/>
-          </a:xfrm>
-          <a:prstGeom prst="rect">
-            <a:avLst/>
-          </a:prstGeom>
-          <a:noFill/>
-          <a:ln w="9525">
-            <a:noFill/>
-            <a:miter lim="800000"/>
-            <a:headEnd/>
-            <a:tailEnd/>
-          </a:ln>
-          <a:effectLst/>
-        </p:spPr>
-      </p:pic>
-    </p:spTree>
-  </p:cSld>
-  <p:clrMapOvr>
-    <a:masterClrMapping/>
-  </p:clrMapOvr>
-</p:sld>
-</file>
-
-<file path=ppt/slides/slide40.xml><?xml version="1.0" encoding="utf-8"?>
-<p:sld xmlns:a="http://schemas.openxmlformats.org/drawingml/2006/main" xmlns:r="http://schemas.openxmlformats.org/officeDocument/2006/relationships" xmlns:p="http://schemas.openxmlformats.org/presentationml/2006/main">
-  <p:cSld>
-    <p:spTree>
-      <p:nvGrpSpPr>
-        <p:cNvPr id="1" name=""/>
-        <p:cNvGrpSpPr/>
-        <p:nvPr/>
-      </p:nvGrpSpPr>
-      <p:grpSpPr>
-        <a:xfrm>
-          <a:off x="0" y="0"/>
-          <a:ext cx="0" cy="0"/>
-          <a:chOff x="0" y="0"/>
-          <a:chExt cx="0" cy="0"/>
-        </a:xfrm>
-      </p:grpSpPr>
-      <p:sp>
-        <p:nvSpPr>
-          <p:cNvPr id="2" name="Заголовок 1"/>
-          <p:cNvSpPr>
-            <a:spLocks noGrp="1"/>
-          </p:cNvSpPr>
-          <p:nvPr>
-            <p:ph type="title"/>
-          </p:nvPr>
-        </p:nvSpPr>
-        <p:spPr/>
-        <p:txBody>
-          <a:bodyPr/>
-          <a:lstStyle/>
-          <a:p>
             <a:pPr algn="ctr"/>
             <a:r>
               <a:rPr lang="en-US" b="1" dirty="0"/>
@@ -13124,13 +13855,21 @@
         </p:spPr>
         <p:txBody>
           <a:bodyPr>
-            <a:normAutofit fontScale="92500" lnSpcReduction="20000"/>
+            <a:normAutofit fontScale="85000" lnSpcReduction="20000"/>
           </a:bodyPr>
           <a:lstStyle/>
           <a:p>
             <a:r>
               <a:rPr lang="en-US" dirty="0"/>
-              <a:t>You can use as many arguments as you want, but prefer use a Dictionary for parameters, when them more that 3. And think about decomposition( it much prefers than </a:t>
+              <a:t>You can use as many arguments as you want, but prefer use a Dictionary for parameters, when them more that </a:t>
+            </a:r>
+            <a:r>
+              <a:rPr lang="ru-RU" dirty="0"/>
+              <a:t>3</a:t>
+            </a:r>
+            <a:r>
+              <a:rPr lang="en-US" dirty="0"/>
+              <a:t>. And think about decomposition( it much prefers than </a:t>
             </a:r>
             <a:r>
               <a:rPr lang="en-US" dirty="0" err="1">
@@ -13151,7 +13890,31 @@
           <a:p>
             <a:r>
               <a:rPr lang="en-US" dirty="0"/>
-              <a:t>!UNEXPECTED TASK! Decompose this function </a:t>
+              <a:t>!UNEXPECTED TASK! Decompose this function to </a:t>
+            </a:r>
+            <a:r>
+              <a:rPr lang="en-US" dirty="0" err="1"/>
+              <a:t>printObject</a:t>
+            </a:r>
+            <a:r>
+              <a:rPr lang="en-US" dirty="0"/>
+              <a:t>, </a:t>
+            </a:r>
+            <a:r>
+              <a:rPr lang="en-US" dirty="0" err="1"/>
+              <a:t>calculateSum</a:t>
+            </a:r>
+            <a:r>
+              <a:rPr lang="en-US" dirty="0"/>
+              <a:t> and </a:t>
+            </a:r>
+            <a:r>
+              <a:rPr lang="en-US" dirty="0" err="1"/>
+              <a:t>getTitle</a:t>
+            </a:r>
+            <a:r>
+              <a:rPr lang="en-US" dirty="0"/>
+              <a:t>.</a:t>
             </a:r>
             <a:endParaRPr lang="ru-RU" dirty="0"/>
           </a:p>
@@ -13198,7 +13961,7 @@
 </p:sld>
 </file>
 
-<file path=ppt/slides/slide41.xml><?xml version="1.0" encoding="utf-8"?>
+<file path=ppt/slides/slide43.xml><?xml version="1.0" encoding="utf-8"?>
 <p:sld xmlns:a="http://schemas.openxmlformats.org/drawingml/2006/main" xmlns:r="http://schemas.openxmlformats.org/officeDocument/2006/relationships" xmlns:p="http://schemas.openxmlformats.org/presentationml/2006/main">
   <p:cSld>
     <p:spTree>
@@ -13428,7 +14191,7 @@
 </p:sld>
 </file>
 
-<file path=ppt/slides/slide42.xml><?xml version="1.0" encoding="utf-8"?>
+<file path=ppt/slides/slide44.xml><?xml version="1.0" encoding="utf-8"?>
 <p:sld xmlns:a="http://schemas.openxmlformats.org/drawingml/2006/main" xmlns:r="http://schemas.openxmlformats.org/officeDocument/2006/relationships" xmlns:p="http://schemas.openxmlformats.org/presentationml/2006/main">
   <p:cSld>
     <p:spTree>
@@ -13537,7 +14300,7 @@
 </p:sld>
 </file>
 
-<file path=ppt/slides/slide43.xml><?xml version="1.0" encoding="utf-8"?>
+<file path=ppt/slides/slide45.xml><?xml version="1.0" encoding="utf-8"?>
 <p:sld xmlns:a="http://schemas.openxmlformats.org/drawingml/2006/main" xmlns:r="http://schemas.openxmlformats.org/officeDocument/2006/relationships" xmlns:p="http://schemas.openxmlformats.org/presentationml/2006/main">
   <p:cSld>
     <p:spTree>

</xml_diff>

<commit_message>
feat: complete dict part
</commit_message>
<xml_diff>
--- a/python 101/python_101.pptx
+++ b/python 101/python_101.pptx
@@ -45,11 +45,14 @@
     <p:sldId id="297" r:id="rId39"/>
     <p:sldId id="301" r:id="rId40"/>
     <p:sldId id="300" r:id="rId41"/>
-    <p:sldId id="292" r:id="rId42"/>
-    <p:sldId id="295" r:id="rId43"/>
-    <p:sldId id="296" r:id="rId44"/>
-    <p:sldId id="299" r:id="rId45"/>
-    <p:sldId id="298" r:id="rId46"/>
+    <p:sldId id="302" r:id="rId42"/>
+    <p:sldId id="303" r:id="rId43"/>
+    <p:sldId id="305" r:id="rId44"/>
+    <p:sldId id="292" r:id="rId45"/>
+    <p:sldId id="295" r:id="rId46"/>
+    <p:sldId id="296" r:id="rId47"/>
+    <p:sldId id="299" r:id="rId48"/>
+    <p:sldId id="298" r:id="rId49"/>
   </p:sldIdLst>
   <p:sldSz cx="12192000" cy="6858000"/>
   <p:notesSz cx="6858000" cy="9144000"/>
@@ -2753,7 +2756,7 @@
             <a:fld id="{79F9FB66-DBE4-4599-9B3C-E1452FD2AC05}" type="datetimeFigureOut">
               <a:rPr lang="en-US" smtClean="0"/>
               <a:pPr/>
-              <a:t>9/12/2021</a:t>
+              <a:t>9/15/2021</a:t>
             </a:fld>
             <a:endParaRPr lang="en-US" dirty="0"/>
           </a:p>
@@ -2923,7 +2926,7 @@
             <a:fld id="{79F9FB66-DBE4-4599-9B3C-E1452FD2AC05}" type="datetimeFigureOut">
               <a:rPr lang="en-US" smtClean="0"/>
               <a:pPr/>
-              <a:t>9/12/2021</a:t>
+              <a:t>9/15/2021</a:t>
             </a:fld>
             <a:endParaRPr lang="en-US" dirty="0"/>
           </a:p>
@@ -3103,7 +3106,7 @@
             <a:fld id="{79F9FB66-DBE4-4599-9B3C-E1452FD2AC05}" type="datetimeFigureOut">
               <a:rPr lang="en-US" smtClean="0"/>
               <a:pPr/>
-              <a:t>9/12/2021</a:t>
+              <a:t>9/15/2021</a:t>
             </a:fld>
             <a:endParaRPr lang="en-US" dirty="0"/>
           </a:p>
@@ -3273,7 +3276,7 @@
             <a:fld id="{79F9FB66-DBE4-4599-9B3C-E1452FD2AC05}" type="datetimeFigureOut">
               <a:rPr lang="en-US" smtClean="0"/>
               <a:pPr/>
-              <a:t>9/12/2021</a:t>
+              <a:t>9/15/2021</a:t>
             </a:fld>
             <a:endParaRPr lang="en-US" dirty="0"/>
           </a:p>
@@ -3520,7 +3523,7 @@
             <a:fld id="{79F9FB66-DBE4-4599-9B3C-E1452FD2AC05}" type="datetimeFigureOut">
               <a:rPr lang="en-US" smtClean="0"/>
               <a:pPr/>
-              <a:t>9/12/2021</a:t>
+              <a:t>9/15/2021</a:t>
             </a:fld>
             <a:endParaRPr lang="en-US" dirty="0"/>
           </a:p>
@@ -3751,7 +3754,7 @@
             <a:fld id="{79F9FB66-DBE4-4599-9B3C-E1452FD2AC05}" type="datetimeFigureOut">
               <a:rPr lang="en-US" smtClean="0"/>
               <a:pPr/>
-              <a:t>9/12/2021</a:t>
+              <a:t>9/15/2021</a:t>
             </a:fld>
             <a:endParaRPr lang="en-US" dirty="0"/>
           </a:p>
@@ -4117,7 +4120,7 @@
             <a:fld id="{79F9FB66-DBE4-4599-9B3C-E1452FD2AC05}" type="datetimeFigureOut">
               <a:rPr lang="en-US" smtClean="0"/>
               <a:pPr/>
-              <a:t>9/12/2021</a:t>
+              <a:t>9/15/2021</a:t>
             </a:fld>
             <a:endParaRPr lang="en-US" dirty="0"/>
           </a:p>
@@ -4236,7 +4239,7 @@
             <a:fld id="{79F9FB66-DBE4-4599-9B3C-E1452FD2AC05}" type="datetimeFigureOut">
               <a:rPr lang="en-US" smtClean="0"/>
               <a:pPr/>
-              <a:t>9/12/2021</a:t>
+              <a:t>9/15/2021</a:t>
             </a:fld>
             <a:endParaRPr lang="en-US" dirty="0"/>
           </a:p>
@@ -4333,7 +4336,7 @@
             <a:fld id="{79F9FB66-DBE4-4599-9B3C-E1452FD2AC05}" type="datetimeFigureOut">
               <a:rPr lang="en-US" smtClean="0"/>
               <a:pPr/>
-              <a:t>9/12/2021</a:t>
+              <a:t>9/15/2021</a:t>
             </a:fld>
             <a:endParaRPr lang="en-US" dirty="0"/>
           </a:p>
@@ -4610,7 +4613,7 @@
             <a:fld id="{79F9FB66-DBE4-4599-9B3C-E1452FD2AC05}" type="datetimeFigureOut">
               <a:rPr lang="en-US" smtClean="0"/>
               <a:pPr/>
-              <a:t>9/12/2021</a:t>
+              <a:t>9/15/2021</a:t>
             </a:fld>
             <a:endParaRPr lang="en-US" dirty="0"/>
           </a:p>
@@ -4864,7 +4867,7 @@
             <a:fld id="{79F9FB66-DBE4-4599-9B3C-E1452FD2AC05}" type="datetimeFigureOut">
               <a:rPr lang="en-US" smtClean="0"/>
               <a:pPr/>
-              <a:t>9/12/2021</a:t>
+              <a:t>9/15/2021</a:t>
             </a:fld>
             <a:endParaRPr lang="en-US" dirty="0"/>
           </a:p>
@@ -5107,7 +5110,7 @@
             <a:fld id="{79F9FB66-DBE4-4599-9B3C-E1452FD2AC05}" type="datetimeFigureOut">
               <a:rPr lang="en-US" smtClean="0"/>
               <a:pPr/>
-              <a:t>9/12/2021</a:t>
+              <a:t>9/15/2021</a:t>
             </a:fld>
             <a:endParaRPr lang="en-US" dirty="0"/>
           </a:p>
@@ -13575,53 +13578,13 @@
       </p:grpSpPr>
       <p:sp>
         <p:nvSpPr>
-          <p:cNvPr id="5" name="Прямоугольник 4"/>
-          <p:cNvSpPr/>
-          <p:nvPr/>
-        </p:nvSpPr>
-        <p:spPr>
-          <a:xfrm>
-            <a:off x="4919472" y="950976"/>
-            <a:ext cx="2340864" cy="347472"/>
-          </a:xfrm>
-          <a:prstGeom prst="rect">
-            <a:avLst/>
-          </a:prstGeom>
-          <a:solidFill>
-            <a:srgbClr val="65F8FF"/>
-          </a:solidFill>
-          <a:ln>
-            <a:noFill/>
-          </a:ln>
-        </p:spPr>
-        <p:style>
-          <a:lnRef idx="2">
-            <a:schemeClr val="accent1">
-              <a:shade val="50000"/>
-            </a:schemeClr>
-          </a:lnRef>
-          <a:fillRef idx="1">
-            <a:schemeClr val="accent1"/>
-          </a:fillRef>
-          <a:effectRef idx="0">
-            <a:schemeClr val="accent1"/>
-          </a:effectRef>
-          <a:fontRef idx="minor">
-            <a:schemeClr val="lt1"/>
-          </a:fontRef>
-        </p:style>
-        <p:txBody>
-          <a:bodyPr rtlCol="0" anchor="ctr"/>
-          <a:lstStyle/>
-          <a:p>
-            <a:pPr algn="ctr"/>
-            <a:endParaRPr lang="ru-RU"/>
-          </a:p>
-        </p:txBody>
-      </p:sp>
-      <p:sp>
-        <p:nvSpPr>
-          <p:cNvPr id="2" name="Заголовок 1"/>
+          <p:cNvPr id="2" name="Заголовок 1">
+            <a:extLst>
+              <a:ext uri="{FF2B5EF4-FFF2-40B4-BE49-F238E27FC236}">
+                <a16:creationId xmlns:a16="http://schemas.microsoft.com/office/drawing/2014/main" id="{FF1D059C-D342-42C8-9EB5-7DD07BBAC59C}"/>
+              </a:ext>
+            </a:extLst>
+          </p:cNvPr>
           <p:cNvSpPr>
             <a:spLocks noGrp="1"/>
           </p:cNvSpPr>
@@ -13636,16 +13599,22 @@
           <a:p>
             <a:pPr algn="ctr"/>
             <a:r>
-              <a:rPr lang="en-US" b="1" dirty="0"/>
-              <a:t>Functions</a:t>
-            </a:r>
-            <a:endParaRPr lang="ru-RU" b="1" dirty="0"/>
+              <a:rPr lang="en-US" dirty="0"/>
+              <a:t>Add | Delete</a:t>
+            </a:r>
+            <a:endParaRPr lang="ru-RU" dirty="0"/>
           </a:p>
         </p:txBody>
       </p:sp>
       <p:sp>
         <p:nvSpPr>
-          <p:cNvPr id="3" name="Содержимое 2"/>
+          <p:cNvPr id="3" name="Объект 2">
+            <a:extLst>
+              <a:ext uri="{FF2B5EF4-FFF2-40B4-BE49-F238E27FC236}">
+                <a16:creationId xmlns:a16="http://schemas.microsoft.com/office/drawing/2014/main" id="{C3A26852-8DC0-465D-B270-B302271D02C9}"/>
+              </a:ext>
+            </a:extLst>
+          </p:cNvPr>
           <p:cNvSpPr>
             <a:spLocks noGrp="1"/>
           </p:cNvSpPr>
@@ -13656,34 +13625,176 @@
         <p:spPr>
           <a:xfrm>
             <a:off x="838200" y="1825625"/>
-            <a:ext cx="6294120" cy="4351338"/>
+            <a:ext cx="5257800" cy="4919732"/>
           </a:xfrm>
         </p:spPr>
         <p:txBody>
-          <a:bodyPr/>
+          <a:bodyPr>
+            <a:normAutofit fontScale="92500" lnSpcReduction="10000"/>
+          </a:bodyPr>
           <a:lstStyle/>
           <a:p>
             <a:r>
               <a:rPr lang="en-US" dirty="0"/>
-              <a:t>It reusable  predefined block of code, that invokes by function call </a:t>
-            </a:r>
-          </a:p>
-          <a:p>
-            <a:endParaRPr lang="en-US" dirty="0"/>
-          </a:p>
-          <a:p>
-            <a:r>
-              <a:rPr lang="en-US" dirty="0"/>
-              <a:t>Function may have a arguments </a:t>
-            </a:r>
-          </a:p>
-          <a:p>
-            <a:endParaRPr lang="en-US" dirty="0"/>
-          </a:p>
-          <a:p>
-            <a:r>
-              <a:rPr lang="en-US" dirty="0"/>
-              <a:t>… And may returns a value.</a:t>
+              <a:t>For add an item to </a:t>
+            </a:r>
+            <a:r>
+              <a:rPr lang="en-US" dirty="0" err="1"/>
+              <a:t>dict</a:t>
+            </a:r>
+            <a:r>
+              <a:rPr lang="en-US" dirty="0"/>
+              <a:t> use common syntax or </a:t>
+            </a:r>
+            <a:r>
+              <a:rPr lang="en-US" dirty="0">
+                <a:solidFill>
+                  <a:srgbClr val="FF0000"/>
+                </a:solidFill>
+              </a:rPr>
+              <a:t>.update(</a:t>
+            </a:r>
+            <a:r>
+              <a:rPr lang="en-US" dirty="0" err="1"/>
+              <a:t>dict</a:t>
+            </a:r>
+            <a:r>
+              <a:rPr lang="en-US" dirty="0">
+                <a:solidFill>
+                  <a:srgbClr val="FF0000"/>
+                </a:solidFill>
+              </a:rPr>
+              <a:t>)</a:t>
+            </a:r>
+            <a:r>
+              <a:rPr lang="en-US" dirty="0"/>
+              <a:t>. You also may use it to change an item</a:t>
+            </a:r>
+          </a:p>
+          <a:p>
+            <a:r>
+              <a:rPr lang="en-US" dirty="0"/>
+              <a:t>To delete an item we have multiple cases also:</a:t>
+            </a:r>
+          </a:p>
+          <a:p>
+            <a:pPr lvl="1"/>
+            <a:r>
+              <a:rPr lang="en-US" dirty="0"/>
+              <a:t>.</a:t>
+            </a:r>
+            <a:r>
+              <a:rPr lang="en-US" dirty="0">
+                <a:solidFill>
+                  <a:srgbClr val="FF0000"/>
+                </a:solidFill>
+              </a:rPr>
+              <a:t>pop(</a:t>
+            </a:r>
+            <a:r>
+              <a:rPr lang="en-US" dirty="0"/>
+              <a:t>str</a:t>
+            </a:r>
+            <a:r>
+              <a:rPr lang="en-US" dirty="0">
+                <a:solidFill>
+                  <a:srgbClr val="FF0000"/>
+                </a:solidFill>
+              </a:rPr>
+              <a:t>) </a:t>
+            </a:r>
+          </a:p>
+          <a:p>
+            <a:pPr lvl="1"/>
+            <a:r>
+              <a:rPr lang="en-US" dirty="0"/>
+              <a:t>.</a:t>
+            </a:r>
+            <a:r>
+              <a:rPr lang="en-US" dirty="0" err="1">
+                <a:solidFill>
+                  <a:srgbClr val="FF0000"/>
+                </a:solidFill>
+              </a:rPr>
+              <a:t>popitem</a:t>
+            </a:r>
+            <a:r>
+              <a:rPr lang="en-US" dirty="0">
+                <a:solidFill>
+                  <a:srgbClr val="FF0000"/>
+                </a:solidFill>
+              </a:rPr>
+              <a:t>() </a:t>
+            </a:r>
+            <a:r>
+              <a:rPr lang="en-US" dirty="0"/>
+              <a:t>. The method removes the last inserted item (</a:t>
+            </a:r>
+            <a:r>
+              <a:rPr lang="en-US" dirty="0">
+                <a:highlight>
+                  <a:srgbClr val="FFFF00"/>
+                </a:highlight>
+              </a:rPr>
+              <a:t>in versions before 3.7, a random item is removed instead</a:t>
+            </a:r>
+            <a:r>
+              <a:rPr lang="en-US" dirty="0"/>
+              <a:t>)</a:t>
+            </a:r>
+          </a:p>
+          <a:p>
+            <a:pPr lvl="1"/>
+            <a:r>
+              <a:rPr lang="en-US" dirty="0">
+                <a:solidFill>
+                  <a:srgbClr val="FF0000"/>
+                </a:solidFill>
+              </a:rPr>
+              <a:t>del</a:t>
+            </a:r>
+            <a:r>
+              <a:rPr lang="en-US" dirty="0"/>
+              <a:t> keyword. But be careful because if you don’t specify an item it deletes a </a:t>
+            </a:r>
+            <a:r>
+              <a:rPr lang="en-US" dirty="0" err="1"/>
+              <a:t>dict</a:t>
+            </a:r>
+            <a:r>
+              <a:rPr lang="en-US" dirty="0"/>
+              <a:t> itself.</a:t>
+            </a:r>
+          </a:p>
+          <a:p>
+            <a:pPr lvl="1"/>
+            <a:r>
+              <a:rPr lang="en-US" dirty="0"/>
+              <a:t>.</a:t>
+            </a:r>
+            <a:r>
+              <a:rPr lang="en-US" dirty="0">
+                <a:solidFill>
+                  <a:srgbClr val="FF0000"/>
+                </a:solidFill>
+              </a:rPr>
+              <a:t>clear() </a:t>
+            </a:r>
+            <a:r>
+              <a:rPr lang="en-US" dirty="0"/>
+              <a:t>. It deletes all property from </a:t>
+            </a:r>
+            <a:r>
+              <a:rPr lang="en-US" dirty="0" err="1"/>
+              <a:t>dict</a:t>
+            </a:r>
+            <a:r>
+              <a:rPr lang="en-US" dirty="0"/>
+              <a:t>, but not it </a:t>
+            </a:r>
+            <a:r>
+              <a:rPr lang="en-US" dirty="0" err="1"/>
+              <a:t>dict</a:t>
             </a:r>
             <a:endParaRPr lang="ru-RU" dirty="0"/>
           </a:p>
@@ -13691,104 +13802,70 @@
       </p:sp>
       <p:pic>
         <p:nvPicPr>
-          <p:cNvPr id="1026" name="Picture 2"/>
+          <p:cNvPr id="4" name="Рисунок 3">
+            <a:extLst>
+              <a:ext uri="{FF2B5EF4-FFF2-40B4-BE49-F238E27FC236}">
+                <a16:creationId xmlns:a16="http://schemas.microsoft.com/office/drawing/2014/main" id="{0F401C32-71BA-4804-A9B1-EBBC91838543}"/>
+              </a:ext>
+            </a:extLst>
+          </p:cNvPr>
           <p:cNvPicPr>
-            <a:picLocks noChangeAspect="1" noChangeArrowheads="1"/>
+            <a:picLocks noChangeAspect="1"/>
           </p:cNvPicPr>
           <p:nvPr/>
         </p:nvPicPr>
         <p:blipFill>
           <a:blip r:embed="rId2"/>
-          <a:srcRect/>
           <a:stretch>
             <a:fillRect/>
           </a:stretch>
         </p:blipFill>
-        <p:spPr bwMode="auto">
+        <p:spPr>
           <a:xfrm>
-            <a:off x="7379589" y="1466468"/>
-            <a:ext cx="3789924" cy="1331595"/>
+            <a:off x="6290434" y="1610926"/>
+            <a:ext cx="5530505" cy="3636148"/>
           </a:xfrm>
           <a:prstGeom prst="rect">
             <a:avLst/>
           </a:prstGeom>
-          <a:noFill/>
-          <a:ln w="9525">
-            <a:noFill/>
-            <a:miter lim="800000"/>
-            <a:headEnd/>
-            <a:tailEnd/>
-          </a:ln>
-          <a:effectLst/>
         </p:spPr>
       </p:pic>
       <p:pic>
         <p:nvPicPr>
-          <p:cNvPr id="1027" name="Picture 3"/>
+          <p:cNvPr id="5" name="Рисунок 4">
+            <a:extLst>
+              <a:ext uri="{FF2B5EF4-FFF2-40B4-BE49-F238E27FC236}">
+                <a16:creationId xmlns:a16="http://schemas.microsoft.com/office/drawing/2014/main" id="{C5AF8726-ACB7-4D22-BC82-51C151AEEC61}"/>
+              </a:ext>
+            </a:extLst>
+          </p:cNvPr>
           <p:cNvPicPr>
-            <a:picLocks noChangeAspect="1" noChangeArrowheads="1"/>
+            <a:picLocks noChangeAspect="1"/>
           </p:cNvPicPr>
           <p:nvPr/>
         </p:nvPicPr>
         <p:blipFill>
           <a:blip r:embed="rId3"/>
-          <a:srcRect/>
           <a:stretch>
             <a:fillRect/>
           </a:stretch>
         </p:blipFill>
-        <p:spPr bwMode="auto">
+        <p:spPr>
           <a:xfrm>
-            <a:off x="7380732" y="3016949"/>
-            <a:ext cx="3032698" cy="1353883"/>
+            <a:off x="6290433" y="5537131"/>
+            <a:ext cx="5537083" cy="664886"/>
           </a:xfrm>
           <a:prstGeom prst="rect">
             <a:avLst/>
           </a:prstGeom>
-          <a:noFill/>
-          <a:ln w="9525">
-            <a:noFill/>
-            <a:miter lim="800000"/>
-            <a:headEnd/>
-            <a:tailEnd/>
-          </a:ln>
-          <a:effectLst/>
-        </p:spPr>
-      </p:pic>
-      <p:pic>
-        <p:nvPicPr>
-          <p:cNvPr id="1028" name="Picture 4"/>
-          <p:cNvPicPr>
-            <a:picLocks noChangeAspect="1" noChangeArrowheads="1"/>
-          </p:cNvPicPr>
-          <p:nvPr/>
-        </p:nvPicPr>
-        <p:blipFill>
-          <a:blip r:embed="rId4"/>
-          <a:srcRect/>
-          <a:stretch>
-            <a:fillRect/>
-          </a:stretch>
-        </p:blipFill>
-        <p:spPr bwMode="auto">
-          <a:xfrm>
-            <a:off x="7400353" y="4600194"/>
-            <a:ext cx="4143383" cy="1636014"/>
-          </a:xfrm>
-          <a:prstGeom prst="rect">
-            <a:avLst/>
-          </a:prstGeom>
-          <a:noFill/>
-          <a:ln w="9525">
-            <a:noFill/>
-            <a:miter lim="800000"/>
-            <a:headEnd/>
-            <a:tailEnd/>
-          </a:ln>
-          <a:effectLst/>
         </p:spPr>
       </p:pic>
     </p:spTree>
+    <p:extLst>
+      <p:ext uri="{BB962C8B-B14F-4D97-AF65-F5344CB8AC3E}">
+        <p14:creationId xmlns:p14="http://schemas.microsoft.com/office/powerpoint/2010/main" val="3766604173"/>
+      </p:ext>
+    </p:extLst>
   </p:cSld>
   <p:clrMapOvr>
     <a:masterClrMapping/>
@@ -13815,7 +13892,13 @@
       </p:grpSpPr>
       <p:sp>
         <p:nvSpPr>
-          <p:cNvPr id="2" name="Заголовок 1"/>
+          <p:cNvPr id="2" name="Заголовок 1">
+            <a:extLst>
+              <a:ext uri="{FF2B5EF4-FFF2-40B4-BE49-F238E27FC236}">
+                <a16:creationId xmlns:a16="http://schemas.microsoft.com/office/drawing/2014/main" id="{2A3BD687-9A00-49B9-8D6B-F758FD9E2B9E}"/>
+              </a:ext>
+            </a:extLst>
+          </p:cNvPr>
           <p:cNvSpPr>
             <a:spLocks noGrp="1"/>
           </p:cNvSpPr>
@@ -13830,16 +13913,22 @@
           <a:p>
             <a:pPr algn="ctr"/>
             <a:r>
-              <a:rPr lang="en-US" b="1" dirty="0"/>
-              <a:t>Functions - Arguments</a:t>
-            </a:r>
-            <a:endParaRPr lang="ru-RU" b="1" dirty="0"/>
+              <a:rPr lang="en-US" dirty="0"/>
+              <a:t>Loop And Copy</a:t>
+            </a:r>
+            <a:endParaRPr lang="ru-RU" dirty="0"/>
           </a:p>
         </p:txBody>
       </p:sp>
       <p:sp>
         <p:nvSpPr>
-          <p:cNvPr id="3" name="Содержимое 2"/>
+          <p:cNvPr id="3" name="Объект 2">
+            <a:extLst>
+              <a:ext uri="{FF2B5EF4-FFF2-40B4-BE49-F238E27FC236}">
+                <a16:creationId xmlns:a16="http://schemas.microsoft.com/office/drawing/2014/main" id="{FAFCD1F6-18D9-487C-A5CE-7FE612FAF4D9}"/>
+              </a:ext>
+            </a:extLst>
+          </p:cNvPr>
           <p:cNvSpPr>
             <a:spLocks noGrp="1"/>
           </p:cNvSpPr>
@@ -13849,39 +13938,45 @@
         </p:nvSpPr>
         <p:spPr>
           <a:xfrm>
-            <a:off x="838200" y="1714501"/>
-            <a:ext cx="7943850" cy="2057400"/>
+            <a:off x="838200" y="1825624"/>
+            <a:ext cx="5138530" cy="5032375"/>
           </a:xfrm>
         </p:spPr>
         <p:txBody>
           <a:bodyPr>
-            <a:normAutofit fontScale="85000" lnSpcReduction="20000"/>
+            <a:normAutofit fontScale="77500" lnSpcReduction="20000"/>
           </a:bodyPr>
           <a:lstStyle/>
           <a:p>
             <a:r>
               <a:rPr lang="en-US" dirty="0"/>
-              <a:t>You can use as many arguments as you want, but prefer use a Dictionary for parameters, when them more that </a:t>
-            </a:r>
-            <a:r>
-              <a:rPr lang="ru-RU" dirty="0"/>
-              <a:t>3</a:t>
-            </a:r>
-            <a:r>
-              <a:rPr lang="en-US" dirty="0"/>
-              <a:t>. And think about decomposition( it much prefers than </a:t>
-            </a:r>
-            <a:r>
-              <a:rPr lang="en-US" dirty="0" err="1">
-                <a:solidFill>
-                  <a:srgbClr val="FF0000"/>
-                </a:solidFill>
-              </a:rPr>
+              <a:t>To loop through </a:t>
+            </a:r>
+            <a:r>
+              <a:rPr lang="en-US" dirty="0" err="1"/>
               <a:t>dict</a:t>
             </a:r>
             <a:r>
               <a:rPr lang="en-US" dirty="0"/>
-              <a:t>)</a:t>
+              <a:t> use cycle for. It returns all keys in dict.</a:t>
+            </a:r>
+          </a:p>
+          <a:p>
+            <a:r>
+              <a:rPr lang="en-US" dirty="0"/>
+              <a:t>To take all  values – get it by direct</a:t>
+            </a:r>
+          </a:p>
+          <a:p>
+            <a:r>
+              <a:rPr lang="en-US" dirty="0"/>
+              <a:t>Also, you can iterate through keys() or values()</a:t>
+            </a:r>
+          </a:p>
+          <a:p>
+            <a:r>
+              <a:rPr lang="en-US" dirty="0"/>
+              <a:t>To take both key and value - use to the items()</a:t>
             </a:r>
           </a:p>
           <a:p>
@@ -13890,31 +13985,51 @@
           <a:p>
             <a:r>
               <a:rPr lang="en-US" dirty="0"/>
-              <a:t>!UNEXPECTED TASK! Decompose this function to </a:t>
+              <a:t>Note! As in lists we may not just define one </a:t>
             </a:r>
             <a:r>
               <a:rPr lang="en-US" dirty="0" err="1"/>
-              <a:t>printObject</a:t>
-            </a:r>
-            <a:r>
-              <a:rPr lang="en-US" dirty="0"/>
-              <a:t>, </a:t>
+              <a:t>dict</a:t>
+            </a:r>
+            <a:r>
+              <a:rPr lang="en-US" dirty="0"/>
+              <a:t> to another like this </a:t>
             </a:r>
             <a:r>
               <a:rPr lang="en-US" dirty="0" err="1"/>
-              <a:t>calculateSum</a:t>
-            </a:r>
-            <a:r>
-              <a:rPr lang="en-US" dirty="0"/>
-              <a:t> and </a:t>
+              <a:t>usercopy</a:t>
+            </a:r>
+            <a:r>
+              <a:rPr lang="en-US" dirty="0"/>
+              <a:t> = user . It will just be a reference to user, not a real copy of the object</a:t>
+            </a:r>
+          </a:p>
+          <a:p>
+            <a:r>
+              <a:rPr lang="en-US" dirty="0"/>
+              <a:t>A common way to copy </a:t>
             </a:r>
             <a:r>
               <a:rPr lang="en-US" dirty="0" err="1"/>
-              <a:t>getTitle</a:t>
-            </a:r>
-            <a:r>
-              <a:rPr lang="en-US" dirty="0"/>
-              <a:t>.</a:t>
+              <a:t>dict</a:t>
+            </a:r>
+            <a:r>
+              <a:rPr lang="en-US" dirty="0"/>
+              <a:t> use .copy() as we did with lists</a:t>
+            </a:r>
+          </a:p>
+          <a:p>
+            <a:r>
+              <a:rPr lang="en-US" dirty="0"/>
+              <a:t>Or create a new </a:t>
+            </a:r>
+            <a:r>
+              <a:rPr lang="en-US" dirty="0" err="1"/>
+              <a:t>dict</a:t>
+            </a:r>
+            <a:r>
+              <a:rPr lang="en-US" dirty="0"/>
+              <a:t> on the old.</a:t>
             </a:r>
             <a:endParaRPr lang="ru-RU" dirty="0"/>
           </a:p>
@@ -13922,38 +14037,416 @@
       </p:sp>
       <p:pic>
         <p:nvPicPr>
-          <p:cNvPr id="1027" name="Picture 3"/>
+          <p:cNvPr id="4" name="Рисунок 3">
+            <a:extLst>
+              <a:ext uri="{FF2B5EF4-FFF2-40B4-BE49-F238E27FC236}">
+                <a16:creationId xmlns:a16="http://schemas.microsoft.com/office/drawing/2014/main" id="{D953D29E-82F3-4133-BF25-613E34782245}"/>
+              </a:ext>
+            </a:extLst>
+          </p:cNvPr>
           <p:cNvPicPr>
-            <a:picLocks noChangeAspect="1" noChangeArrowheads="1"/>
+            <a:picLocks noChangeAspect="1"/>
           </p:cNvPicPr>
           <p:nvPr/>
         </p:nvPicPr>
         <p:blipFill>
           <a:blip r:embed="rId2"/>
-          <a:srcRect/>
           <a:stretch>
             <a:fillRect/>
           </a:stretch>
         </p:blipFill>
-        <p:spPr bwMode="auto">
+        <p:spPr>
           <a:xfrm>
-            <a:off x="2233613" y="3714751"/>
-            <a:ext cx="6788905" cy="3143250"/>
+            <a:off x="5820051" y="1425645"/>
+            <a:ext cx="1245705" cy="1258957"/>
           </a:xfrm>
           <a:prstGeom prst="rect">
             <a:avLst/>
           </a:prstGeom>
-          <a:noFill/>
-          <a:ln w="9525">
-            <a:noFill/>
-            <a:miter lim="800000"/>
-            <a:headEnd/>
-            <a:tailEnd/>
-          </a:ln>
-          <a:effectLst/>
         </p:spPr>
       </p:pic>
+      <p:pic>
+        <p:nvPicPr>
+          <p:cNvPr id="5" name="Рисунок 4">
+            <a:extLst>
+              <a:ext uri="{FF2B5EF4-FFF2-40B4-BE49-F238E27FC236}">
+                <a16:creationId xmlns:a16="http://schemas.microsoft.com/office/drawing/2014/main" id="{415100CE-BA9F-4F48-816F-4B594D438717}"/>
+              </a:ext>
+            </a:extLst>
+          </p:cNvPr>
+          <p:cNvPicPr>
+            <a:picLocks noChangeAspect="1"/>
+          </p:cNvPicPr>
+          <p:nvPr/>
+        </p:nvPicPr>
+        <p:blipFill>
+          <a:blip r:embed="rId3"/>
+          <a:stretch>
+            <a:fillRect/>
+          </a:stretch>
+        </p:blipFill>
+        <p:spPr>
+          <a:xfrm>
+            <a:off x="9926117" y="2061423"/>
+            <a:ext cx="1427683" cy="1258957"/>
+          </a:xfrm>
+          <a:prstGeom prst="rect">
+            <a:avLst/>
+          </a:prstGeom>
+        </p:spPr>
+      </p:pic>
+      <p:pic>
+        <p:nvPicPr>
+          <p:cNvPr id="6" name="Рисунок 5">
+            <a:extLst>
+              <a:ext uri="{FF2B5EF4-FFF2-40B4-BE49-F238E27FC236}">
+                <a16:creationId xmlns:a16="http://schemas.microsoft.com/office/drawing/2014/main" id="{9ED7714B-BF04-4831-A40E-2CD08A923F56}"/>
+              </a:ext>
+            </a:extLst>
+          </p:cNvPr>
+          <p:cNvPicPr>
+            <a:picLocks noChangeAspect="1"/>
+          </p:cNvPicPr>
+          <p:nvPr/>
+        </p:nvPicPr>
+        <p:blipFill>
+          <a:blip r:embed="rId4"/>
+          <a:stretch>
+            <a:fillRect/>
+          </a:stretch>
+        </p:blipFill>
+        <p:spPr>
+          <a:xfrm>
+            <a:off x="7345418" y="1422922"/>
+            <a:ext cx="2252029" cy="1261679"/>
+          </a:xfrm>
+          <a:prstGeom prst="rect">
+            <a:avLst/>
+          </a:prstGeom>
+        </p:spPr>
+      </p:pic>
+      <p:pic>
+        <p:nvPicPr>
+          <p:cNvPr id="7" name="Рисунок 6">
+            <a:extLst>
+              <a:ext uri="{FF2B5EF4-FFF2-40B4-BE49-F238E27FC236}">
+                <a16:creationId xmlns:a16="http://schemas.microsoft.com/office/drawing/2014/main" id="{EE38EB77-2FED-402A-BDDE-15EB2B1F9C5F}"/>
+              </a:ext>
+            </a:extLst>
+          </p:cNvPr>
+          <p:cNvPicPr>
+            <a:picLocks noChangeAspect="1"/>
+          </p:cNvPicPr>
+          <p:nvPr/>
+        </p:nvPicPr>
+        <p:blipFill>
+          <a:blip r:embed="rId5"/>
+          <a:stretch>
+            <a:fillRect/>
+          </a:stretch>
+        </p:blipFill>
+        <p:spPr>
+          <a:xfrm>
+            <a:off x="6116559" y="2862216"/>
+            <a:ext cx="2178055" cy="1261679"/>
+          </a:xfrm>
+          <a:prstGeom prst="rect">
+            <a:avLst/>
+          </a:prstGeom>
+        </p:spPr>
+      </p:pic>
+      <p:cxnSp>
+        <p:nvCxnSpPr>
+          <p:cNvPr id="9" name="Прямая со стрелкой 8">
+            <a:extLst>
+              <a:ext uri="{FF2B5EF4-FFF2-40B4-BE49-F238E27FC236}">
+                <a16:creationId xmlns:a16="http://schemas.microsoft.com/office/drawing/2014/main" id="{F38DECA3-EFB2-4F92-9571-27CAE2DEEE13}"/>
+              </a:ext>
+            </a:extLst>
+          </p:cNvPr>
+          <p:cNvCxnSpPr>
+            <a:cxnSpLocks/>
+          </p:cNvCxnSpPr>
+          <p:nvPr/>
+        </p:nvCxnSpPr>
+        <p:spPr>
+          <a:xfrm>
+            <a:off x="7065756" y="1590261"/>
+            <a:ext cx="279662" cy="0"/>
+          </a:xfrm>
+          <a:prstGeom prst="straightConnector1">
+            <a:avLst/>
+          </a:prstGeom>
+          <a:ln w="9525" cap="flat" cmpd="sng" algn="ctr">
+            <a:solidFill>
+              <a:schemeClr val="accent2"/>
+            </a:solidFill>
+            <a:prstDash val="solid"/>
+            <a:round/>
+            <a:headEnd type="arrow" w="med" len="med"/>
+            <a:tailEnd type="arrow" w="med" len="med"/>
+          </a:ln>
+        </p:spPr>
+        <p:style>
+          <a:lnRef idx="0">
+            <a:scrgbClr r="0" g="0" b="0"/>
+          </a:lnRef>
+          <a:fillRef idx="0">
+            <a:scrgbClr r="0" g="0" b="0"/>
+          </a:fillRef>
+          <a:effectRef idx="0">
+            <a:scrgbClr r="0" g="0" b="0"/>
+          </a:effectRef>
+          <a:fontRef idx="minor">
+            <a:schemeClr val="tx1"/>
+          </a:fontRef>
+        </p:style>
+      </p:cxnSp>
+      <p:cxnSp>
+        <p:nvCxnSpPr>
+          <p:cNvPr id="13" name="Прямая со стрелкой 12">
+            <a:extLst>
+              <a:ext uri="{FF2B5EF4-FFF2-40B4-BE49-F238E27FC236}">
+                <a16:creationId xmlns:a16="http://schemas.microsoft.com/office/drawing/2014/main" id="{A4419111-426D-41EA-8208-857DD0798BF0}"/>
+              </a:ext>
+            </a:extLst>
+          </p:cNvPr>
+          <p:cNvCxnSpPr>
+            <a:cxnSpLocks/>
+          </p:cNvCxnSpPr>
+          <p:nvPr/>
+        </p:nvCxnSpPr>
+        <p:spPr>
+          <a:xfrm flipH="1">
+            <a:off x="9597447" y="2186609"/>
+            <a:ext cx="279662" cy="0"/>
+          </a:xfrm>
+          <a:prstGeom prst="straightConnector1">
+            <a:avLst/>
+          </a:prstGeom>
+          <a:ln>
+            <a:headEnd type="arrow" w="med" len="med"/>
+            <a:tailEnd type="arrow" w="med" len="med"/>
+          </a:ln>
+        </p:spPr>
+        <p:style>
+          <a:lnRef idx="3">
+            <a:schemeClr val="accent2"/>
+          </a:lnRef>
+          <a:fillRef idx="0">
+            <a:schemeClr val="accent2"/>
+          </a:fillRef>
+          <a:effectRef idx="2">
+            <a:schemeClr val="accent2"/>
+          </a:effectRef>
+          <a:fontRef idx="minor">
+            <a:schemeClr val="tx1"/>
+          </a:fontRef>
+        </p:style>
+      </p:cxnSp>
+      <p:pic>
+        <p:nvPicPr>
+          <p:cNvPr id="15" name="Рисунок 14">
+            <a:extLst>
+              <a:ext uri="{FF2B5EF4-FFF2-40B4-BE49-F238E27FC236}">
+                <a16:creationId xmlns:a16="http://schemas.microsoft.com/office/drawing/2014/main" id="{3012350C-8B5A-4A12-952C-DA82FE134B01}"/>
+              </a:ext>
+            </a:extLst>
+          </p:cNvPr>
+          <p:cNvPicPr>
+            <a:picLocks noChangeAspect="1"/>
+          </p:cNvPicPr>
+          <p:nvPr/>
+        </p:nvPicPr>
+        <p:blipFill>
+          <a:blip r:embed="rId6"/>
+          <a:stretch>
+            <a:fillRect/>
+          </a:stretch>
+        </p:blipFill>
+        <p:spPr>
+          <a:xfrm>
+            <a:off x="5976730" y="5295423"/>
+            <a:ext cx="3164666" cy="548786"/>
+          </a:xfrm>
+          <a:prstGeom prst="rect">
+            <a:avLst/>
+          </a:prstGeom>
+        </p:spPr>
+      </p:pic>
+      <p:cxnSp>
+        <p:nvCxnSpPr>
+          <p:cNvPr id="17" name="Прямая со стрелкой 16">
+            <a:extLst>
+              <a:ext uri="{FF2B5EF4-FFF2-40B4-BE49-F238E27FC236}">
+                <a16:creationId xmlns:a16="http://schemas.microsoft.com/office/drawing/2014/main" id="{E7A20430-4724-461B-98F2-7E63E335D75B}"/>
+              </a:ext>
+            </a:extLst>
+          </p:cNvPr>
+          <p:cNvCxnSpPr>
+            <a:cxnSpLocks/>
+            <a:endCxn id="4" idx="1"/>
+          </p:cNvCxnSpPr>
+          <p:nvPr/>
+        </p:nvCxnSpPr>
+        <p:spPr>
+          <a:xfrm>
+            <a:off x="5287617" y="2053761"/>
+            <a:ext cx="532434" cy="1363"/>
+          </a:xfrm>
+          <a:prstGeom prst="straightConnector1">
+            <a:avLst/>
+          </a:prstGeom>
+          <a:ln>
+            <a:tailEnd type="triangle"/>
+          </a:ln>
+        </p:spPr>
+        <p:style>
+          <a:lnRef idx="1">
+            <a:schemeClr val="accent1"/>
+          </a:lnRef>
+          <a:fillRef idx="0">
+            <a:schemeClr val="accent1"/>
+          </a:fillRef>
+          <a:effectRef idx="0">
+            <a:schemeClr val="accent1"/>
+          </a:effectRef>
+          <a:fontRef idx="minor">
+            <a:schemeClr val="tx1"/>
+          </a:fontRef>
+        </p:style>
+      </p:cxnSp>
+      <p:cxnSp>
+        <p:nvCxnSpPr>
+          <p:cNvPr id="21" name="Соединитель: уступ 20">
+            <a:extLst>
+              <a:ext uri="{FF2B5EF4-FFF2-40B4-BE49-F238E27FC236}">
+                <a16:creationId xmlns:a16="http://schemas.microsoft.com/office/drawing/2014/main" id="{EC644E08-FAEB-4133-8FBF-ADA3CE718543}"/>
+              </a:ext>
+            </a:extLst>
+          </p:cNvPr>
+          <p:cNvCxnSpPr>
+            <a:cxnSpLocks/>
+          </p:cNvCxnSpPr>
+          <p:nvPr/>
+        </p:nvCxnSpPr>
+        <p:spPr>
+          <a:xfrm>
+            <a:off x="5287617" y="2639964"/>
+            <a:ext cx="4638500" cy="104301"/>
+          </a:xfrm>
+          <a:prstGeom prst="bentConnector3">
+            <a:avLst>
+              <a:gd name="adj1" fmla="val 9145"/>
+            </a:avLst>
+          </a:prstGeom>
+          <a:ln>
+            <a:tailEnd type="triangle"/>
+          </a:ln>
+        </p:spPr>
+        <p:style>
+          <a:lnRef idx="1">
+            <a:schemeClr val="accent1"/>
+          </a:lnRef>
+          <a:fillRef idx="0">
+            <a:schemeClr val="accent1"/>
+          </a:fillRef>
+          <a:effectRef idx="0">
+            <a:schemeClr val="accent1"/>
+          </a:effectRef>
+          <a:fontRef idx="minor">
+            <a:schemeClr val="tx1"/>
+          </a:fontRef>
+        </p:style>
+      </p:cxnSp>
+      <p:cxnSp>
+        <p:nvCxnSpPr>
+          <p:cNvPr id="39" name="Соединитель: уступ 38">
+            <a:extLst>
+              <a:ext uri="{FF2B5EF4-FFF2-40B4-BE49-F238E27FC236}">
+                <a16:creationId xmlns:a16="http://schemas.microsoft.com/office/drawing/2014/main" id="{1AD89F08-2610-43BD-9523-D2FA439B62EF}"/>
+              </a:ext>
+            </a:extLst>
+          </p:cNvPr>
+          <p:cNvCxnSpPr>
+            <a:cxnSpLocks/>
+          </p:cNvCxnSpPr>
+          <p:nvPr/>
+        </p:nvCxnSpPr>
+        <p:spPr>
+          <a:xfrm flipV="1">
+            <a:off x="5553834" y="2819538"/>
+            <a:ext cx="422896" cy="184862"/>
+          </a:xfrm>
+          <a:prstGeom prst="bentConnector3">
+            <a:avLst/>
+          </a:prstGeom>
+        </p:spPr>
+        <p:style>
+          <a:lnRef idx="1">
+            <a:schemeClr val="accent1"/>
+          </a:lnRef>
+          <a:fillRef idx="0">
+            <a:schemeClr val="accent1"/>
+          </a:fillRef>
+          <a:effectRef idx="0">
+            <a:schemeClr val="accent1"/>
+          </a:effectRef>
+          <a:fontRef idx="minor">
+            <a:schemeClr val="tx1"/>
+          </a:fontRef>
+        </p:style>
+      </p:cxnSp>
+      <p:cxnSp>
+        <p:nvCxnSpPr>
+          <p:cNvPr id="43" name="Соединитель: уступ 42">
+            <a:extLst>
+              <a:ext uri="{FF2B5EF4-FFF2-40B4-BE49-F238E27FC236}">
+                <a16:creationId xmlns:a16="http://schemas.microsoft.com/office/drawing/2014/main" id="{01687355-3F3D-48D7-A393-4860B2E421A2}"/>
+              </a:ext>
+            </a:extLst>
+          </p:cNvPr>
+          <p:cNvCxnSpPr>
+            <a:cxnSpLocks/>
+            <a:endCxn id="6" idx="1"/>
+          </p:cNvCxnSpPr>
+          <p:nvPr/>
+        </p:nvCxnSpPr>
+        <p:spPr>
+          <a:xfrm flipV="1">
+            <a:off x="5976730" y="2053762"/>
+            <a:ext cx="1368688" cy="765775"/>
+          </a:xfrm>
+          <a:prstGeom prst="bentConnector3">
+            <a:avLst>
+              <a:gd name="adj1" fmla="val 87761"/>
+            </a:avLst>
+          </a:prstGeom>
+          <a:ln>
+            <a:tailEnd type="triangle"/>
+          </a:ln>
+        </p:spPr>
+        <p:style>
+          <a:lnRef idx="1">
+            <a:schemeClr val="accent1"/>
+          </a:lnRef>
+          <a:fillRef idx="0">
+            <a:schemeClr val="accent1"/>
+          </a:fillRef>
+          <a:effectRef idx="0">
+            <a:schemeClr val="accent1"/>
+          </a:effectRef>
+          <a:fontRef idx="minor">
+            <a:schemeClr val="tx1"/>
+          </a:fontRef>
+        </p:style>
+      </p:cxnSp>
     </p:spTree>
+    <p:extLst>
+      <p:ext uri="{BB962C8B-B14F-4D97-AF65-F5344CB8AC3E}">
+        <p14:creationId xmlns:p14="http://schemas.microsoft.com/office/powerpoint/2010/main" val="4246786161"/>
+      </p:ext>
+    </p:extLst>
   </p:cSld>
   <p:clrMapOvr>
     <a:masterClrMapping/>
@@ -13990,6 +14483,880 @@
         </p:nvSpPr>
         <p:spPr>
           <a:xfrm>
+            <a:off x="914400" y="1499616"/>
+            <a:ext cx="10439400" cy="5358384"/>
+          </a:xfrm>
+        </p:spPr>
+        <p:txBody>
+          <a:bodyPr>
+            <a:normAutofit fontScale="92500" lnSpcReduction="20000"/>
+          </a:bodyPr>
+          <a:lstStyle/>
+          <a:p>
+            <a:pPr marL="571500" indent="-571500">
+              <a:buFont typeface="+mj-lt"/>
+              <a:buAutoNum type="romanUcPeriod"/>
+            </a:pPr>
+            <a:r>
+              <a:rPr lang="en-US" dirty="0"/>
+              <a:t>Create a family.</a:t>
+            </a:r>
+          </a:p>
+          <a:p>
+            <a:pPr lvl="1"/>
+            <a:r>
+              <a:rPr lang="en-US" sz="1700" dirty="0"/>
+              <a:t>The family must contains all family members.</a:t>
+            </a:r>
+          </a:p>
+          <a:p>
+            <a:pPr lvl="1"/>
+            <a:r>
+              <a:rPr lang="en-US" sz="1700" dirty="0"/>
+              <a:t>Family member – is </a:t>
+            </a:r>
+            <a:r>
+              <a:rPr lang="en-US" sz="1700" dirty="0" err="1"/>
+              <a:t>dict</a:t>
+            </a:r>
+            <a:r>
+              <a:rPr lang="en-US" sz="1700" dirty="0"/>
+              <a:t> that contains next properties:</a:t>
+            </a:r>
+          </a:p>
+          <a:p>
+            <a:pPr lvl="2"/>
+            <a:r>
+              <a:rPr lang="en-US" sz="1700" dirty="0"/>
+              <a:t>Name</a:t>
+            </a:r>
+            <a:r>
+              <a:rPr lang="en-US" sz="1700" dirty="0">
+                <a:solidFill>
+                  <a:schemeClr val="bg1">
+                    <a:lumMod val="75000"/>
+                  </a:schemeClr>
+                </a:solidFill>
+              </a:rPr>
+              <a:t>: string</a:t>
+            </a:r>
+          </a:p>
+          <a:p>
+            <a:pPr lvl="2"/>
+            <a:r>
+              <a:rPr lang="en-US" sz="1700" dirty="0"/>
+              <a:t>Age</a:t>
+            </a:r>
+            <a:r>
+              <a:rPr lang="en-US" sz="1700" dirty="0">
+                <a:solidFill>
+                  <a:schemeClr val="bg1">
+                    <a:lumMod val="75000"/>
+                  </a:schemeClr>
+                </a:solidFill>
+              </a:rPr>
+              <a:t>: int</a:t>
+            </a:r>
+          </a:p>
+          <a:p>
+            <a:pPr lvl="2"/>
+            <a:r>
+              <a:rPr lang="en-US" sz="1700" dirty="0"/>
+              <a:t>to-do list</a:t>
+            </a:r>
+            <a:r>
+              <a:rPr lang="en-US" sz="1700" dirty="0">
+                <a:solidFill>
+                  <a:schemeClr val="bg1">
+                    <a:lumMod val="75000"/>
+                  </a:schemeClr>
+                </a:solidFill>
+              </a:rPr>
+              <a:t>: string[]</a:t>
+            </a:r>
+            <a:endParaRPr lang="ru-RU" sz="1700" dirty="0">
+              <a:solidFill>
+                <a:schemeClr val="bg1">
+                  <a:lumMod val="75000"/>
+                </a:schemeClr>
+              </a:solidFill>
+            </a:endParaRPr>
+          </a:p>
+          <a:p>
+            <a:pPr lvl="1"/>
+            <a:r>
+              <a:rPr lang="en-US" sz="1700" dirty="0"/>
+              <a:t>For animals in family use different structure:</a:t>
+            </a:r>
+          </a:p>
+          <a:p>
+            <a:pPr lvl="2"/>
+            <a:r>
+              <a:rPr lang="en-US" sz="1700" dirty="0"/>
+              <a:t>Name</a:t>
+            </a:r>
+            <a:r>
+              <a:rPr lang="en-US" sz="1700" dirty="0">
+                <a:solidFill>
+                  <a:schemeClr val="bg1">
+                    <a:lumMod val="75000"/>
+                  </a:schemeClr>
+                </a:solidFill>
+              </a:rPr>
+              <a:t>: string</a:t>
+            </a:r>
+          </a:p>
+          <a:p>
+            <a:pPr lvl="2"/>
+            <a:r>
+              <a:rPr lang="en-US" sz="1700" dirty="0"/>
+              <a:t>Age</a:t>
+            </a:r>
+            <a:r>
+              <a:rPr lang="en-US" sz="1700" dirty="0">
+                <a:solidFill>
+                  <a:schemeClr val="bg1">
+                    <a:lumMod val="75000"/>
+                  </a:schemeClr>
+                </a:solidFill>
+              </a:rPr>
+              <a:t>: int</a:t>
+            </a:r>
+          </a:p>
+          <a:p>
+            <a:pPr lvl="2"/>
+            <a:r>
+              <a:rPr lang="en-US" sz="1700" dirty="0"/>
+              <a:t>Owners</a:t>
+            </a:r>
+            <a:r>
+              <a:rPr lang="en-US" sz="1700" dirty="0">
+                <a:solidFill>
+                  <a:schemeClr val="bg1">
+                    <a:lumMod val="75000"/>
+                  </a:schemeClr>
+                </a:solidFill>
+              </a:rPr>
+              <a:t>: </a:t>
+            </a:r>
+            <a:r>
+              <a:rPr lang="en-US" sz="1700" dirty="0" err="1">
+                <a:solidFill>
+                  <a:schemeClr val="bg1">
+                    <a:lumMod val="75000"/>
+                  </a:schemeClr>
+                </a:solidFill>
+              </a:rPr>
+              <a:t>dict</a:t>
+            </a:r>
+            <a:r>
+              <a:rPr lang="en-US" sz="1700" dirty="0">
+                <a:solidFill>
+                  <a:schemeClr val="bg1">
+                    <a:lumMod val="75000"/>
+                  </a:schemeClr>
+                </a:solidFill>
+              </a:rPr>
+              <a:t>[]</a:t>
+            </a:r>
+          </a:p>
+          <a:p>
+            <a:pPr lvl="2"/>
+            <a:r>
+              <a:rPr lang="en-US" sz="1700" dirty="0"/>
+              <a:t>Is Hungry </a:t>
+            </a:r>
+            <a:r>
+              <a:rPr lang="en-US" sz="1700" dirty="0">
+                <a:solidFill>
+                  <a:schemeClr val="bg1">
+                    <a:lumMod val="75000"/>
+                  </a:schemeClr>
+                </a:solidFill>
+              </a:rPr>
+              <a:t>: </a:t>
+            </a:r>
+            <a:r>
+              <a:rPr lang="en-US" sz="1700" dirty="0" err="1">
+                <a:solidFill>
+                  <a:schemeClr val="bg1">
+                    <a:lumMod val="75000"/>
+                  </a:schemeClr>
+                </a:solidFill>
+              </a:rPr>
+              <a:t>boolean</a:t>
+            </a:r>
+            <a:endParaRPr lang="en-US" sz="1700" dirty="0">
+              <a:solidFill>
+                <a:schemeClr val="bg1">
+                  <a:lumMod val="75000"/>
+                </a:schemeClr>
+              </a:solidFill>
+            </a:endParaRPr>
+          </a:p>
+          <a:p>
+            <a:pPr lvl="1"/>
+            <a:r>
+              <a:rPr lang="en-US" sz="1700" dirty="0"/>
+              <a:t>There are 4 members of family: Mom Alice 35 </a:t>
+            </a:r>
+            <a:r>
+              <a:rPr lang="en-US" sz="1700" dirty="0" err="1"/>
+              <a:t>y.o</a:t>
+            </a:r>
+            <a:r>
+              <a:rPr lang="en-US" sz="1700" dirty="0"/>
+              <a:t>. , Dad Garry 33 </a:t>
+            </a:r>
+            <a:r>
+              <a:rPr lang="en-US" sz="1700" dirty="0" err="1"/>
+              <a:t>y.o</a:t>
+            </a:r>
+            <a:r>
+              <a:rPr lang="en-US" sz="1700" dirty="0"/>
+              <a:t>.,  Daughter Lora 6 </a:t>
+            </a:r>
+            <a:r>
+              <a:rPr lang="en-US" sz="1700" dirty="0" err="1"/>
+              <a:t>y.o</a:t>
+            </a:r>
+            <a:r>
+              <a:rPr lang="en-US" sz="1700" dirty="0"/>
+              <a:t>, Dog </a:t>
+            </a:r>
+            <a:r>
+              <a:rPr lang="en-US" sz="1700" dirty="0" err="1"/>
+              <a:t>Maylo</a:t>
+            </a:r>
+            <a:r>
+              <a:rPr lang="en-US" sz="1700" dirty="0"/>
+              <a:t> 2 </a:t>
+            </a:r>
+            <a:r>
+              <a:rPr lang="en-US" sz="1700" dirty="0" err="1"/>
+              <a:t>y.o</a:t>
+            </a:r>
+            <a:r>
+              <a:rPr lang="en-US" sz="1700" dirty="0"/>
+              <a:t>.</a:t>
+            </a:r>
+          </a:p>
+          <a:p>
+            <a:pPr lvl="1"/>
+            <a:r>
+              <a:rPr lang="en-US" sz="1700" dirty="0"/>
+              <a:t>Mom is going to finish the song, cook dinner, clean the house. Dad is going to work, iron the laundry, change the light bulbs, kiss mom. Daughter is going to play with the dog, eat. The dog was owned to all.</a:t>
+            </a:r>
+          </a:p>
+          <a:p>
+            <a:pPr marL="571500" indent="-571500">
+              <a:buFont typeface="+mj-lt"/>
+              <a:buAutoNum type="romanUcPeriod"/>
+            </a:pPr>
+            <a:r>
+              <a:rPr lang="en-US" dirty="0"/>
+              <a:t>Create a Dictionary.</a:t>
+            </a:r>
+          </a:p>
+          <a:p>
+            <a:pPr lvl="1"/>
+            <a:r>
+              <a:rPr lang="en-US" sz="1800" dirty="0"/>
+              <a:t>Create a dictionary with key: English word, value: Translation.</a:t>
+            </a:r>
+          </a:p>
+          <a:p>
+            <a:pPr lvl="1"/>
+            <a:r>
+              <a:rPr lang="en-US" sz="1800" dirty="0"/>
+              <a:t>User may put English or translation in input and gets different form. command – translate English -&gt; Translation </a:t>
+            </a:r>
+          </a:p>
+          <a:p>
+            <a:pPr lvl="1"/>
+            <a:r>
+              <a:rPr lang="en-US" sz="1800" dirty="0"/>
+              <a:t>User may add new words in your dictionary  by command – add English Translation . If a user had a mistake on a number of arguments prints error </a:t>
+            </a:r>
+          </a:p>
+          <a:p>
+            <a:pPr lvl="1"/>
+            <a:r>
+              <a:rPr lang="en-US" sz="1800" dirty="0"/>
+              <a:t>Add 5 any words to the initial dictionary</a:t>
+            </a:r>
+          </a:p>
+          <a:p>
+            <a:pPr lvl="1"/>
+            <a:r>
+              <a:rPr lang="en-US" sz="1800" dirty="0"/>
+              <a:t>If no word show an error to the user</a:t>
+            </a:r>
+          </a:p>
+        </p:txBody>
+      </p:sp>
+      <p:grpSp>
+        <p:nvGrpSpPr>
+          <p:cNvPr id="2" name="Группа 3"/>
+          <p:cNvGrpSpPr/>
+          <p:nvPr/>
+        </p:nvGrpSpPr>
+        <p:grpSpPr>
+          <a:xfrm>
+            <a:off x="838200" y="365125"/>
+            <a:ext cx="10515600" cy="1325563"/>
+            <a:chOff x="838200" y="365125"/>
+            <a:chExt cx="10515600" cy="1325563"/>
+          </a:xfrm>
+        </p:grpSpPr>
+        <p:sp>
+          <p:nvSpPr>
+            <p:cNvPr id="5" name="Заголовок 1"/>
+            <p:cNvSpPr txBox="1">
+              <a:spLocks/>
+            </p:cNvSpPr>
+            <p:nvPr/>
+          </p:nvSpPr>
+          <p:spPr>
+            <a:xfrm>
+              <a:off x="838200" y="365125"/>
+              <a:ext cx="10515600" cy="1325563"/>
+            </a:xfrm>
+            <a:prstGeom prst="rect">
+              <a:avLst/>
+            </a:prstGeom>
+          </p:spPr>
+          <p:txBody>
+            <a:bodyPr vert="horz" lIns="91440" tIns="45720" rIns="91440" bIns="45720" rtlCol="0" anchor="ctr">
+              <a:normAutofit/>
+            </a:bodyPr>
+            <a:lstStyle/>
+            <a:p>
+              <a:pPr marL="0" marR="0" lvl="0" indent="0" algn="ctr" defTabSz="914400" rtl="0" eaLnBrk="1" fontAlgn="auto" latinLnBrk="0" hangingPunct="1">
+                <a:lnSpc>
+                  <a:spcPct val="90000"/>
+                </a:lnSpc>
+                <a:spcBef>
+                  <a:spcPct val="0"/>
+                </a:spcBef>
+                <a:spcAft>
+                  <a:spcPts val="0"/>
+                </a:spcAft>
+                <a:buClrTx/>
+                <a:buSzTx/>
+                <a:buFontTx/>
+                <a:buNone/>
+                <a:tabLst/>
+                <a:defRPr/>
+              </a:pPr>
+              <a:r>
+                <a:rPr kumimoji="0" lang="en-US" sz="4400" b="1" i="0" u="none" strike="noStrike" kern="1200" cap="none" spc="0" normalizeH="0" baseline="0" noProof="0" dirty="0">
+                  <a:ln>
+                    <a:noFill/>
+                  </a:ln>
+                  <a:solidFill>
+                    <a:schemeClr val="tx1"/>
+                  </a:solidFill>
+                  <a:effectLst/>
+                  <a:uLnTx/>
+                  <a:uFillTx/>
+                  <a:latin typeface="+mj-lt"/>
+                  <a:ea typeface="+mj-ea"/>
+                  <a:cs typeface="+mj-cs"/>
+                </a:rPr>
+                <a:t>Tasks</a:t>
+              </a:r>
+              <a:endParaRPr kumimoji="0" lang="ru-RU" sz="4400" b="1" i="0" u="none" strike="noStrike" kern="1200" cap="none" spc="0" normalizeH="0" baseline="0" noProof="0" dirty="0">
+                <a:ln>
+                  <a:noFill/>
+                </a:ln>
+                <a:solidFill>
+                  <a:schemeClr val="tx1"/>
+                </a:solidFill>
+                <a:effectLst/>
+                <a:uLnTx/>
+                <a:uFillTx/>
+                <a:latin typeface="+mj-lt"/>
+                <a:ea typeface="+mj-ea"/>
+                <a:cs typeface="+mj-cs"/>
+              </a:endParaRPr>
+            </a:p>
+          </p:txBody>
+        </p:sp>
+        <p:pic>
+          <p:nvPicPr>
+            <p:cNvPr id="6" name="Picture 2" descr="Pin on Бесплатные иконки"/>
+            <p:cNvPicPr>
+              <a:picLocks noChangeAspect="1" noChangeArrowheads="1"/>
+            </p:cNvPicPr>
+            <p:nvPr/>
+          </p:nvPicPr>
+          <p:blipFill>
+            <a:blip r:embed="rId2" cstate="print"/>
+            <a:srcRect/>
+            <a:stretch>
+              <a:fillRect/>
+            </a:stretch>
+          </p:blipFill>
+          <p:spPr bwMode="auto">
+            <a:xfrm>
+              <a:off x="4672711" y="603504"/>
+              <a:ext cx="795401" cy="795401"/>
+            </a:xfrm>
+            <a:prstGeom prst="rect">
+              <a:avLst/>
+            </a:prstGeom>
+            <a:noFill/>
+          </p:spPr>
+        </p:pic>
+      </p:grpSp>
+    </p:spTree>
+    <p:extLst>
+      <p:ext uri="{BB962C8B-B14F-4D97-AF65-F5344CB8AC3E}">
+        <p14:creationId xmlns:p14="http://schemas.microsoft.com/office/powerpoint/2010/main" val="1762471610"/>
+      </p:ext>
+    </p:extLst>
+  </p:cSld>
+  <p:clrMapOvr>
+    <a:masterClrMapping/>
+  </p:clrMapOvr>
+</p:sld>
+</file>
+
+<file path=ppt/slides/slide44.xml><?xml version="1.0" encoding="utf-8"?>
+<p:sld xmlns:a="http://schemas.openxmlformats.org/drawingml/2006/main" xmlns:r="http://schemas.openxmlformats.org/officeDocument/2006/relationships" xmlns:p="http://schemas.openxmlformats.org/presentationml/2006/main">
+  <p:cSld>
+    <p:spTree>
+      <p:nvGrpSpPr>
+        <p:cNvPr id="1" name=""/>
+        <p:cNvGrpSpPr/>
+        <p:nvPr/>
+      </p:nvGrpSpPr>
+      <p:grpSpPr>
+        <a:xfrm>
+          <a:off x="0" y="0"/>
+          <a:ext cx="0" cy="0"/>
+          <a:chOff x="0" y="0"/>
+          <a:chExt cx="0" cy="0"/>
+        </a:xfrm>
+      </p:grpSpPr>
+      <p:sp>
+        <p:nvSpPr>
+          <p:cNvPr id="5" name="Прямоугольник 4"/>
+          <p:cNvSpPr/>
+          <p:nvPr/>
+        </p:nvSpPr>
+        <p:spPr>
+          <a:xfrm>
+            <a:off x="4919472" y="950976"/>
+            <a:ext cx="2340864" cy="347472"/>
+          </a:xfrm>
+          <a:prstGeom prst="rect">
+            <a:avLst/>
+          </a:prstGeom>
+          <a:solidFill>
+            <a:srgbClr val="65F8FF"/>
+          </a:solidFill>
+          <a:ln>
+            <a:noFill/>
+          </a:ln>
+        </p:spPr>
+        <p:style>
+          <a:lnRef idx="2">
+            <a:schemeClr val="accent1">
+              <a:shade val="50000"/>
+            </a:schemeClr>
+          </a:lnRef>
+          <a:fillRef idx="1">
+            <a:schemeClr val="accent1"/>
+          </a:fillRef>
+          <a:effectRef idx="0">
+            <a:schemeClr val="accent1"/>
+          </a:effectRef>
+          <a:fontRef idx="minor">
+            <a:schemeClr val="lt1"/>
+          </a:fontRef>
+        </p:style>
+        <p:txBody>
+          <a:bodyPr rtlCol="0" anchor="ctr"/>
+          <a:lstStyle/>
+          <a:p>
+            <a:pPr algn="ctr"/>
+            <a:endParaRPr lang="ru-RU"/>
+          </a:p>
+        </p:txBody>
+      </p:sp>
+      <p:sp>
+        <p:nvSpPr>
+          <p:cNvPr id="2" name="Заголовок 1"/>
+          <p:cNvSpPr>
+            <a:spLocks noGrp="1"/>
+          </p:cNvSpPr>
+          <p:nvPr>
+            <p:ph type="title"/>
+          </p:nvPr>
+        </p:nvSpPr>
+        <p:spPr/>
+        <p:txBody>
+          <a:bodyPr/>
+          <a:lstStyle/>
+          <a:p>
+            <a:pPr algn="ctr"/>
+            <a:r>
+              <a:rPr lang="en-US" b="1" dirty="0"/>
+              <a:t>Functions</a:t>
+            </a:r>
+            <a:endParaRPr lang="ru-RU" b="1" dirty="0"/>
+          </a:p>
+        </p:txBody>
+      </p:sp>
+      <p:sp>
+        <p:nvSpPr>
+          <p:cNvPr id="3" name="Содержимое 2"/>
+          <p:cNvSpPr>
+            <a:spLocks noGrp="1"/>
+          </p:cNvSpPr>
+          <p:nvPr>
+            <p:ph idx="1"/>
+          </p:nvPr>
+        </p:nvSpPr>
+        <p:spPr>
+          <a:xfrm>
+            <a:off x="838200" y="1825625"/>
+            <a:ext cx="6294120" cy="4351338"/>
+          </a:xfrm>
+        </p:spPr>
+        <p:txBody>
+          <a:bodyPr/>
+          <a:lstStyle/>
+          <a:p>
+            <a:r>
+              <a:rPr lang="en-US" dirty="0"/>
+              <a:t>It reusable  predefined block of code, that invokes by function call </a:t>
+            </a:r>
+          </a:p>
+          <a:p>
+            <a:endParaRPr lang="en-US" dirty="0"/>
+          </a:p>
+          <a:p>
+            <a:r>
+              <a:rPr lang="en-US" dirty="0"/>
+              <a:t>Function may have a arguments </a:t>
+            </a:r>
+          </a:p>
+          <a:p>
+            <a:endParaRPr lang="en-US" dirty="0"/>
+          </a:p>
+          <a:p>
+            <a:r>
+              <a:rPr lang="en-US" dirty="0"/>
+              <a:t>… And may returns a value.</a:t>
+            </a:r>
+            <a:endParaRPr lang="ru-RU" dirty="0"/>
+          </a:p>
+        </p:txBody>
+      </p:sp>
+      <p:pic>
+        <p:nvPicPr>
+          <p:cNvPr id="1026" name="Picture 2"/>
+          <p:cNvPicPr>
+            <a:picLocks noChangeAspect="1" noChangeArrowheads="1"/>
+          </p:cNvPicPr>
+          <p:nvPr/>
+        </p:nvPicPr>
+        <p:blipFill>
+          <a:blip r:embed="rId2"/>
+          <a:srcRect/>
+          <a:stretch>
+            <a:fillRect/>
+          </a:stretch>
+        </p:blipFill>
+        <p:spPr bwMode="auto">
+          <a:xfrm>
+            <a:off x="7379589" y="1466468"/>
+            <a:ext cx="3789924" cy="1331595"/>
+          </a:xfrm>
+          <a:prstGeom prst="rect">
+            <a:avLst/>
+          </a:prstGeom>
+          <a:noFill/>
+          <a:ln w="9525">
+            <a:noFill/>
+            <a:miter lim="800000"/>
+            <a:headEnd/>
+            <a:tailEnd/>
+          </a:ln>
+          <a:effectLst/>
+        </p:spPr>
+      </p:pic>
+      <p:pic>
+        <p:nvPicPr>
+          <p:cNvPr id="1027" name="Picture 3"/>
+          <p:cNvPicPr>
+            <a:picLocks noChangeAspect="1" noChangeArrowheads="1"/>
+          </p:cNvPicPr>
+          <p:nvPr/>
+        </p:nvPicPr>
+        <p:blipFill>
+          <a:blip r:embed="rId3"/>
+          <a:srcRect/>
+          <a:stretch>
+            <a:fillRect/>
+          </a:stretch>
+        </p:blipFill>
+        <p:spPr bwMode="auto">
+          <a:xfrm>
+            <a:off x="7380732" y="3016949"/>
+            <a:ext cx="3032698" cy="1353883"/>
+          </a:xfrm>
+          <a:prstGeom prst="rect">
+            <a:avLst/>
+          </a:prstGeom>
+          <a:noFill/>
+          <a:ln w="9525">
+            <a:noFill/>
+            <a:miter lim="800000"/>
+            <a:headEnd/>
+            <a:tailEnd/>
+          </a:ln>
+          <a:effectLst/>
+        </p:spPr>
+      </p:pic>
+      <p:pic>
+        <p:nvPicPr>
+          <p:cNvPr id="1028" name="Picture 4"/>
+          <p:cNvPicPr>
+            <a:picLocks noChangeAspect="1" noChangeArrowheads="1"/>
+          </p:cNvPicPr>
+          <p:nvPr/>
+        </p:nvPicPr>
+        <p:blipFill>
+          <a:blip r:embed="rId4"/>
+          <a:srcRect/>
+          <a:stretch>
+            <a:fillRect/>
+          </a:stretch>
+        </p:blipFill>
+        <p:spPr bwMode="auto">
+          <a:xfrm>
+            <a:off x="7400353" y="4600194"/>
+            <a:ext cx="4143383" cy="1636014"/>
+          </a:xfrm>
+          <a:prstGeom prst="rect">
+            <a:avLst/>
+          </a:prstGeom>
+          <a:noFill/>
+          <a:ln w="9525">
+            <a:noFill/>
+            <a:miter lim="800000"/>
+            <a:headEnd/>
+            <a:tailEnd/>
+          </a:ln>
+          <a:effectLst/>
+        </p:spPr>
+      </p:pic>
+    </p:spTree>
+  </p:cSld>
+  <p:clrMapOvr>
+    <a:masterClrMapping/>
+  </p:clrMapOvr>
+</p:sld>
+</file>
+
+<file path=ppt/slides/slide45.xml><?xml version="1.0" encoding="utf-8"?>
+<p:sld xmlns:a="http://schemas.openxmlformats.org/drawingml/2006/main" xmlns:r="http://schemas.openxmlformats.org/officeDocument/2006/relationships" xmlns:p="http://schemas.openxmlformats.org/presentationml/2006/main">
+  <p:cSld>
+    <p:spTree>
+      <p:nvGrpSpPr>
+        <p:cNvPr id="1" name=""/>
+        <p:cNvGrpSpPr/>
+        <p:nvPr/>
+      </p:nvGrpSpPr>
+      <p:grpSpPr>
+        <a:xfrm>
+          <a:off x="0" y="0"/>
+          <a:ext cx="0" cy="0"/>
+          <a:chOff x="0" y="0"/>
+          <a:chExt cx="0" cy="0"/>
+        </a:xfrm>
+      </p:grpSpPr>
+      <p:sp>
+        <p:nvSpPr>
+          <p:cNvPr id="2" name="Заголовок 1"/>
+          <p:cNvSpPr>
+            <a:spLocks noGrp="1"/>
+          </p:cNvSpPr>
+          <p:nvPr>
+            <p:ph type="title"/>
+          </p:nvPr>
+        </p:nvSpPr>
+        <p:spPr/>
+        <p:txBody>
+          <a:bodyPr/>
+          <a:lstStyle/>
+          <a:p>
+            <a:pPr algn="ctr"/>
+            <a:r>
+              <a:rPr lang="en-US" b="1" dirty="0"/>
+              <a:t>Functions - Arguments</a:t>
+            </a:r>
+            <a:endParaRPr lang="ru-RU" b="1" dirty="0"/>
+          </a:p>
+        </p:txBody>
+      </p:sp>
+      <p:sp>
+        <p:nvSpPr>
+          <p:cNvPr id="3" name="Содержимое 2"/>
+          <p:cNvSpPr>
+            <a:spLocks noGrp="1"/>
+          </p:cNvSpPr>
+          <p:nvPr>
+            <p:ph idx="1"/>
+          </p:nvPr>
+        </p:nvSpPr>
+        <p:spPr>
+          <a:xfrm>
+            <a:off x="838200" y="1714501"/>
+            <a:ext cx="7943850" cy="2057400"/>
+          </a:xfrm>
+        </p:spPr>
+        <p:txBody>
+          <a:bodyPr>
+            <a:normAutofit fontScale="85000" lnSpcReduction="20000"/>
+          </a:bodyPr>
+          <a:lstStyle/>
+          <a:p>
+            <a:r>
+              <a:rPr lang="en-US" dirty="0"/>
+              <a:t>You can use as many arguments as you want, but prefer use a Dictionary for parameters, when them more that </a:t>
+            </a:r>
+            <a:r>
+              <a:rPr lang="ru-RU" dirty="0"/>
+              <a:t>3</a:t>
+            </a:r>
+            <a:r>
+              <a:rPr lang="en-US" dirty="0"/>
+              <a:t>. And think about decomposition( it much prefers than </a:t>
+            </a:r>
+            <a:r>
+              <a:rPr lang="en-US" dirty="0" err="1">
+                <a:solidFill>
+                  <a:srgbClr val="FF0000"/>
+                </a:solidFill>
+              </a:rPr>
+              <a:t>dict</a:t>
+            </a:r>
+            <a:r>
+              <a:rPr lang="en-US" dirty="0"/>
+              <a:t>)</a:t>
+            </a:r>
+          </a:p>
+          <a:p>
+            <a:endParaRPr lang="en-US" dirty="0"/>
+          </a:p>
+          <a:p>
+            <a:r>
+              <a:rPr lang="en-US" dirty="0"/>
+              <a:t>!UNEXPECTED TASK! Decompose this function to </a:t>
+            </a:r>
+            <a:r>
+              <a:rPr lang="en-US" dirty="0" err="1"/>
+              <a:t>printObject</a:t>
+            </a:r>
+            <a:r>
+              <a:rPr lang="en-US" dirty="0"/>
+              <a:t>, </a:t>
+            </a:r>
+            <a:r>
+              <a:rPr lang="en-US" dirty="0" err="1"/>
+              <a:t>calculateSum</a:t>
+            </a:r>
+            <a:r>
+              <a:rPr lang="en-US" dirty="0"/>
+              <a:t> and </a:t>
+            </a:r>
+            <a:r>
+              <a:rPr lang="en-US" dirty="0" err="1"/>
+              <a:t>getTitle</a:t>
+            </a:r>
+            <a:r>
+              <a:rPr lang="en-US" dirty="0"/>
+              <a:t>.</a:t>
+            </a:r>
+            <a:endParaRPr lang="ru-RU" dirty="0"/>
+          </a:p>
+        </p:txBody>
+      </p:sp>
+      <p:pic>
+        <p:nvPicPr>
+          <p:cNvPr id="1027" name="Picture 3"/>
+          <p:cNvPicPr>
+            <a:picLocks noChangeAspect="1" noChangeArrowheads="1"/>
+          </p:cNvPicPr>
+          <p:nvPr/>
+        </p:nvPicPr>
+        <p:blipFill>
+          <a:blip r:embed="rId2"/>
+          <a:srcRect/>
+          <a:stretch>
+            <a:fillRect/>
+          </a:stretch>
+        </p:blipFill>
+        <p:spPr bwMode="auto">
+          <a:xfrm>
+            <a:off x="2233613" y="3714751"/>
+            <a:ext cx="6788905" cy="3143250"/>
+          </a:xfrm>
+          <a:prstGeom prst="rect">
+            <a:avLst/>
+          </a:prstGeom>
+          <a:noFill/>
+          <a:ln w="9525">
+            <a:noFill/>
+            <a:miter lim="800000"/>
+            <a:headEnd/>
+            <a:tailEnd/>
+          </a:ln>
+          <a:effectLst/>
+        </p:spPr>
+      </p:pic>
+    </p:spTree>
+  </p:cSld>
+  <p:clrMapOvr>
+    <a:masterClrMapping/>
+  </p:clrMapOvr>
+</p:sld>
+</file>
+
+<file path=ppt/slides/slide46.xml><?xml version="1.0" encoding="utf-8"?>
+<p:sld xmlns:a="http://schemas.openxmlformats.org/drawingml/2006/main" xmlns:r="http://schemas.openxmlformats.org/officeDocument/2006/relationships" xmlns:p="http://schemas.openxmlformats.org/presentationml/2006/main">
+  <p:cSld>
+    <p:spTree>
+      <p:nvGrpSpPr>
+        <p:cNvPr id="1" name=""/>
+        <p:cNvGrpSpPr/>
+        <p:nvPr/>
+      </p:nvGrpSpPr>
+      <p:grpSpPr>
+        <a:xfrm>
+          <a:off x="0" y="0"/>
+          <a:ext cx="0" cy="0"/>
+          <a:chOff x="0" y="0"/>
+          <a:chExt cx="0" cy="0"/>
+        </a:xfrm>
+      </p:grpSpPr>
+      <p:sp>
+        <p:nvSpPr>
+          <p:cNvPr id="3" name="Содержимое 2"/>
+          <p:cNvSpPr>
+            <a:spLocks noGrp="1"/>
+          </p:cNvSpPr>
+          <p:nvPr>
+            <p:ph idx="1"/>
+          </p:nvPr>
+        </p:nvSpPr>
+        <p:spPr>
+          <a:xfrm>
             <a:off x="783336" y="310896"/>
             <a:ext cx="5068824" cy="6547104"/>
           </a:xfrm>
@@ -14191,7 +15558,7 @@
 </p:sld>
 </file>
 
-<file path=ppt/slides/slide44.xml><?xml version="1.0" encoding="utf-8"?>
+<file path=ppt/slides/slide47.xml><?xml version="1.0" encoding="utf-8"?>
 <p:sld xmlns:a="http://schemas.openxmlformats.org/drawingml/2006/main" xmlns:r="http://schemas.openxmlformats.org/officeDocument/2006/relationships" xmlns:p="http://schemas.openxmlformats.org/presentationml/2006/main">
   <p:cSld>
     <p:spTree>
@@ -14300,7 +15667,7 @@
 </p:sld>
 </file>
 
-<file path=ppt/slides/slide45.xml><?xml version="1.0" encoding="utf-8"?>
+<file path=ppt/slides/slide48.xml><?xml version="1.0" encoding="utf-8"?>
 <p:sld xmlns:a="http://schemas.openxmlformats.org/drawingml/2006/main" xmlns:r="http://schemas.openxmlformats.org/officeDocument/2006/relationships" xmlns:p="http://schemas.openxmlformats.org/presentationml/2006/main">
   <p:cSld>
     <p:spTree>

</xml_diff>

<commit_message>
feat: add functions block
</commit_message>
<xml_diff>
--- a/python 101/python_101.pptx
+++ b/python 101/python_101.pptx
@@ -52,7 +52,11 @@
     <p:sldId id="295" r:id="rId46"/>
     <p:sldId id="296" r:id="rId47"/>
     <p:sldId id="299" r:id="rId48"/>
-    <p:sldId id="298" r:id="rId49"/>
+    <p:sldId id="306" r:id="rId49"/>
+    <p:sldId id="307" r:id="rId50"/>
+    <p:sldId id="308" r:id="rId51"/>
+    <p:sldId id="298" r:id="rId52"/>
+    <p:sldId id="309" r:id="rId53"/>
   </p:sldIdLst>
   <p:sldSz cx="12192000" cy="6858000"/>
   <p:notesSz cx="6858000" cy="9144000"/>
@@ -2756,7 +2760,7 @@
             <a:fld id="{79F9FB66-DBE4-4599-9B3C-E1452FD2AC05}" type="datetimeFigureOut">
               <a:rPr lang="en-US" smtClean="0"/>
               <a:pPr/>
-              <a:t>9/15/2021</a:t>
+              <a:t>9/19/2021</a:t>
             </a:fld>
             <a:endParaRPr lang="en-US" dirty="0"/>
           </a:p>
@@ -2926,7 +2930,7 @@
             <a:fld id="{79F9FB66-DBE4-4599-9B3C-E1452FD2AC05}" type="datetimeFigureOut">
               <a:rPr lang="en-US" smtClean="0"/>
               <a:pPr/>
-              <a:t>9/15/2021</a:t>
+              <a:t>9/19/2021</a:t>
             </a:fld>
             <a:endParaRPr lang="en-US" dirty="0"/>
           </a:p>
@@ -3106,7 +3110,7 @@
             <a:fld id="{79F9FB66-DBE4-4599-9B3C-E1452FD2AC05}" type="datetimeFigureOut">
               <a:rPr lang="en-US" smtClean="0"/>
               <a:pPr/>
-              <a:t>9/15/2021</a:t>
+              <a:t>9/19/2021</a:t>
             </a:fld>
             <a:endParaRPr lang="en-US" dirty="0"/>
           </a:p>
@@ -3276,7 +3280,7 @@
             <a:fld id="{79F9FB66-DBE4-4599-9B3C-E1452FD2AC05}" type="datetimeFigureOut">
               <a:rPr lang="en-US" smtClean="0"/>
               <a:pPr/>
-              <a:t>9/15/2021</a:t>
+              <a:t>9/19/2021</a:t>
             </a:fld>
             <a:endParaRPr lang="en-US" dirty="0"/>
           </a:p>
@@ -3523,7 +3527,7 @@
             <a:fld id="{79F9FB66-DBE4-4599-9B3C-E1452FD2AC05}" type="datetimeFigureOut">
               <a:rPr lang="en-US" smtClean="0"/>
               <a:pPr/>
-              <a:t>9/15/2021</a:t>
+              <a:t>9/19/2021</a:t>
             </a:fld>
             <a:endParaRPr lang="en-US" dirty="0"/>
           </a:p>
@@ -3754,7 +3758,7 @@
             <a:fld id="{79F9FB66-DBE4-4599-9B3C-E1452FD2AC05}" type="datetimeFigureOut">
               <a:rPr lang="en-US" smtClean="0"/>
               <a:pPr/>
-              <a:t>9/15/2021</a:t>
+              <a:t>9/19/2021</a:t>
             </a:fld>
             <a:endParaRPr lang="en-US" dirty="0"/>
           </a:p>
@@ -4120,7 +4124,7 @@
             <a:fld id="{79F9FB66-DBE4-4599-9B3C-E1452FD2AC05}" type="datetimeFigureOut">
               <a:rPr lang="en-US" smtClean="0"/>
               <a:pPr/>
-              <a:t>9/15/2021</a:t>
+              <a:t>9/19/2021</a:t>
             </a:fld>
             <a:endParaRPr lang="en-US" dirty="0"/>
           </a:p>
@@ -4239,7 +4243,7 @@
             <a:fld id="{79F9FB66-DBE4-4599-9B3C-E1452FD2AC05}" type="datetimeFigureOut">
               <a:rPr lang="en-US" smtClean="0"/>
               <a:pPr/>
-              <a:t>9/15/2021</a:t>
+              <a:t>9/19/2021</a:t>
             </a:fld>
             <a:endParaRPr lang="en-US" dirty="0"/>
           </a:p>
@@ -4336,7 +4340,7 @@
             <a:fld id="{79F9FB66-DBE4-4599-9B3C-E1452FD2AC05}" type="datetimeFigureOut">
               <a:rPr lang="en-US" smtClean="0"/>
               <a:pPr/>
-              <a:t>9/15/2021</a:t>
+              <a:t>9/19/2021</a:t>
             </a:fld>
             <a:endParaRPr lang="en-US" dirty="0"/>
           </a:p>
@@ -4613,7 +4617,7 @@
             <a:fld id="{79F9FB66-DBE4-4599-9B3C-E1452FD2AC05}" type="datetimeFigureOut">
               <a:rPr lang="en-US" smtClean="0"/>
               <a:pPr/>
-              <a:t>9/15/2021</a:t>
+              <a:t>9/19/2021</a:t>
             </a:fld>
             <a:endParaRPr lang="en-US" dirty="0"/>
           </a:p>
@@ -4867,7 +4871,7 @@
             <a:fld id="{79F9FB66-DBE4-4599-9B3C-E1452FD2AC05}" type="datetimeFigureOut">
               <a:rPr lang="en-US" smtClean="0"/>
               <a:pPr/>
-              <a:t>9/15/2021</a:t>
+              <a:t>9/19/2021</a:t>
             </a:fld>
             <a:endParaRPr lang="en-US" dirty="0"/>
           </a:p>
@@ -5110,7 +5114,7 @@
             <a:fld id="{79F9FB66-DBE4-4599-9B3C-E1452FD2AC05}" type="datetimeFigureOut">
               <a:rPr lang="en-US" smtClean="0"/>
               <a:pPr/>
-              <a:t>9/15/2021</a:t>
+              <a:t>9/19/2021</a:t>
             </a:fld>
             <a:endParaRPr lang="en-US" dirty="0"/>
           </a:p>
@@ -5587,8 +5591,15 @@
           <a:p>
             <a:r>
               <a:rPr lang="en-US" dirty="0"/>
-              <a:t>Created by Alexander Dostovalov</a:t>
-            </a:r>
+              <a:t>Created by </a:t>
+            </a:r>
+            <a:r>
+              <a:rPr lang="en-US" dirty="0" err="1">
+                <a:hlinkClick r:id="rId2"/>
+              </a:rPr>
+              <a:t>wonderluc</a:t>
+            </a:r>
+            <a:endParaRPr lang="en-US" dirty="0"/>
           </a:p>
         </p:txBody>
       </p:sp>
@@ -10246,7 +10257,7 @@
                   <a:srgbClr val="FF0000"/>
                 </a:solidFill>
               </a:rPr>
-              <a:t>Int float complex</a:t>
+              <a:t>int float complex</a:t>
             </a:r>
             <a:endParaRPr kumimoji="0" lang="en-US" sz="2800" b="0" i="0" u="none" strike="noStrike" kern="1200" cap="none" spc="0" normalizeH="0" baseline="0" noProof="0" dirty="0">
               <a:ln>
@@ -10285,7 +10296,7 @@
                   <a:srgbClr val="FF0000"/>
                 </a:solidFill>
               </a:rPr>
-              <a:t>List tuple range</a:t>
+              <a:t>list tuple range</a:t>
             </a:r>
             <a:endParaRPr kumimoji="0" lang="en-US" sz="2800" b="0" i="0" u="none" strike="noStrike" kern="1200" cap="none" spc="0" normalizeH="0" baseline="0" noProof="0" dirty="0">
               <a:ln>
@@ -10363,7 +10374,7 @@
                   <a:srgbClr val="FF0000"/>
                 </a:solidFill>
               </a:rPr>
-              <a:t>Set frozenset</a:t>
+              <a:t>set frozenset</a:t>
             </a:r>
             <a:endParaRPr kumimoji="0" lang="en-US" sz="2800" b="0" i="0" u="none" strike="noStrike" kern="1200" cap="none" spc="0" normalizeH="0" baseline="0" noProof="0" dirty="0">
               <a:ln>
@@ -10441,7 +10452,7 @@
                   <a:srgbClr val="FF0000"/>
                 </a:solidFill>
               </a:rPr>
-              <a:t>Bytes bytearray memoryview</a:t>
+              <a:t>bytes bytearray memoryview</a:t>
             </a:r>
             <a:endParaRPr kumimoji="0" lang="en-US" sz="2800" b="0" i="0" u="none" strike="noStrike" kern="1200" cap="none" spc="0" normalizeH="0" baseline="0" noProof="0" dirty="0">
               <a:ln>
@@ -14489,7 +14500,7 @@
         </p:spPr>
         <p:txBody>
           <a:bodyPr>
-            <a:normAutofit fontScale="92500" lnSpcReduction="20000"/>
+            <a:normAutofit fontScale="85000" lnSpcReduction="20000"/>
           </a:bodyPr>
           <a:lstStyle/>
           <a:p>
@@ -14791,6 +14802,13 @@
             <a:r>
               <a:rPr lang="en-US" sz="1800" dirty="0"/>
               <a:t>If no word show an error to the user</a:t>
+            </a:r>
+          </a:p>
+          <a:p>
+            <a:pPr lvl="1"/>
+            <a:r>
+              <a:rPr lang="en-US" sz="1800" dirty="0"/>
+              <a:t>All commands and words will in lower case</a:t>
             </a:r>
           </a:p>
         </p:txBody>
@@ -15012,6 +15030,58 @@
       </p:sp>
       <p:sp>
         <p:nvSpPr>
+          <p:cNvPr id="4" name="Прямоугольник 3">
+            <a:extLst>
+              <a:ext uri="{FF2B5EF4-FFF2-40B4-BE49-F238E27FC236}">
+                <a16:creationId xmlns:a16="http://schemas.microsoft.com/office/drawing/2014/main" id="{02F6B57E-DB9D-49AE-8DFD-785F4F311EDF}"/>
+              </a:ext>
+            </a:extLst>
+          </p:cNvPr>
+          <p:cNvSpPr/>
+          <p:nvPr/>
+        </p:nvSpPr>
+        <p:spPr>
+          <a:xfrm>
+            <a:off x="1298713" y="5009322"/>
+            <a:ext cx="3492935" cy="808382"/>
+          </a:xfrm>
+          <a:prstGeom prst="rect">
+            <a:avLst/>
+          </a:prstGeom>
+          <a:noFill/>
+          <a:ln>
+            <a:solidFill>
+              <a:srgbClr val="FFC000"/>
+            </a:solidFill>
+          </a:ln>
+        </p:spPr>
+        <p:style>
+          <a:lnRef idx="2">
+            <a:schemeClr val="accent1">
+              <a:shade val="50000"/>
+            </a:schemeClr>
+          </a:lnRef>
+          <a:fillRef idx="1">
+            <a:schemeClr val="accent1"/>
+          </a:fillRef>
+          <a:effectRef idx="0">
+            <a:schemeClr val="accent1"/>
+          </a:effectRef>
+          <a:fontRef idx="minor">
+            <a:schemeClr val="lt1"/>
+          </a:fontRef>
+        </p:style>
+        <p:txBody>
+          <a:bodyPr rtlCol="0" anchor="ctr"/>
+          <a:lstStyle/>
+          <a:p>
+            <a:pPr algn="ctr"/>
+            <a:endParaRPr lang="ru-RU"/>
+          </a:p>
+        </p:txBody>
+      </p:sp>
+      <p:sp>
+        <p:nvSpPr>
           <p:cNvPr id="3" name="Содержимое 2"/>
           <p:cNvSpPr>
             <a:spLocks noGrp="1"/>
@@ -15027,12 +15097,14 @@
           </a:xfrm>
         </p:spPr>
         <p:txBody>
-          <a:bodyPr/>
+          <a:bodyPr>
+            <a:normAutofit fontScale="77500" lnSpcReduction="20000"/>
+          </a:bodyPr>
           <a:lstStyle/>
           <a:p>
             <a:r>
               <a:rPr lang="en-US" dirty="0"/>
-              <a:t>It reusable  predefined block of code, that invokes by function call </a:t>
+              <a:t>It reusable  predefined block of code, that invokes by function call</a:t>
             </a:r>
           </a:p>
           <a:p>
@@ -15050,8 +15122,118 @@
           <a:p>
             <a:r>
               <a:rPr lang="en-US" dirty="0"/>
-              <a:t>… And may returns a value.</a:t>
-            </a:r>
+              <a:t>… And may returns a value. A value, in this case, it any other type from python. So you may use it for calculation and pass it to another function</a:t>
+            </a:r>
+          </a:p>
+          <a:p>
+            <a:endParaRPr lang="en-US" dirty="0"/>
+          </a:p>
+          <a:p>
+            <a:r>
+              <a:rPr lang="en-US" dirty="0"/>
+              <a:t>Schema – </a:t>
+            </a:r>
+          </a:p>
+          <a:p>
+            <a:pPr marL="457200" lvl="1" indent="0">
+              <a:buNone/>
+            </a:pPr>
+            <a:r>
+              <a:rPr lang="en-US" dirty="0">
+                <a:solidFill>
+                  <a:srgbClr val="FF0000"/>
+                </a:solidFill>
+              </a:rPr>
+              <a:t>def</a:t>
+            </a:r>
+            <a:r>
+              <a:rPr lang="en-US" dirty="0"/>
+              <a:t> NAME </a:t>
+            </a:r>
+            <a:r>
+              <a:rPr lang="en-US" dirty="0">
+                <a:solidFill>
+                  <a:srgbClr val="FF0000"/>
+                </a:solidFill>
+              </a:rPr>
+              <a:t>(</a:t>
+            </a:r>
+            <a:r>
+              <a:rPr lang="en-US" dirty="0" err="1">
+                <a:solidFill>
+                  <a:srgbClr val="FF0000"/>
+                </a:solidFill>
+              </a:rPr>
+              <a:t>args</a:t>
+            </a:r>
+            <a:r>
+              <a:rPr lang="en-US" dirty="0">
+                <a:solidFill>
+                  <a:srgbClr val="FF0000"/>
+                </a:solidFill>
+              </a:rPr>
+              <a:t>, *</a:t>
+            </a:r>
+            <a:r>
+              <a:rPr lang="en-US" dirty="0" err="1">
+                <a:solidFill>
+                  <a:srgbClr val="FF0000"/>
+                </a:solidFill>
+              </a:rPr>
+              <a:t>args</a:t>
+            </a:r>
+            <a:r>
+              <a:rPr lang="en-US" dirty="0">
+                <a:solidFill>
+                  <a:srgbClr val="FF0000"/>
+                </a:solidFill>
+              </a:rPr>
+              <a:t>, **</a:t>
+            </a:r>
+            <a:r>
+              <a:rPr lang="en-US" dirty="0" err="1">
+                <a:solidFill>
+                  <a:srgbClr val="FF0000"/>
+                </a:solidFill>
+              </a:rPr>
+              <a:t>kwargs</a:t>
+            </a:r>
+            <a:r>
+              <a:rPr lang="en-US" dirty="0">
+                <a:solidFill>
+                  <a:srgbClr val="FF0000"/>
+                </a:solidFill>
+              </a:rPr>
+              <a:t>):</a:t>
+            </a:r>
+          </a:p>
+          <a:p>
+            <a:pPr marL="457200" lvl="1" indent="0">
+              <a:buNone/>
+            </a:pPr>
+            <a:r>
+              <a:rPr lang="en-US" dirty="0"/>
+              <a:t>	Some code</a:t>
+            </a:r>
+          </a:p>
+          <a:p>
+            <a:pPr marL="457200" lvl="1" indent="0">
+              <a:buNone/>
+            </a:pPr>
+            <a:r>
+              <a:rPr lang="en-US" dirty="0"/>
+              <a:t>	</a:t>
+            </a:r>
+            <a:r>
+              <a:rPr lang="en-US" dirty="0">
+                <a:solidFill>
+                  <a:srgbClr val="FF0000"/>
+                </a:solidFill>
+              </a:rPr>
+              <a:t>return </a:t>
+            </a:r>
+          </a:p>
+          <a:p>
             <a:endParaRPr lang="ru-RU" dirty="0"/>
           </a:p>
         </p:txBody>
@@ -15222,7 +15404,7 @@
         </p:spPr>
         <p:txBody>
           <a:bodyPr>
-            <a:normAutofit fontScale="85000" lnSpcReduction="20000"/>
+            <a:normAutofit/>
           </a:bodyPr>
           <a:lstStyle/>
           <a:p>
@@ -15255,69 +15437,38 @@
             <a:endParaRPr lang="en-US" dirty="0"/>
           </a:p>
           <a:p>
-            <a:r>
-              <a:rPr lang="en-US" dirty="0"/>
-              <a:t>!UNEXPECTED TASK! Decompose this function to </a:t>
-            </a:r>
-            <a:r>
-              <a:rPr lang="en-US" dirty="0" err="1"/>
-              <a:t>printObject</a:t>
-            </a:r>
-            <a:r>
-              <a:rPr lang="en-US" dirty="0"/>
-              <a:t>, </a:t>
-            </a:r>
-            <a:r>
-              <a:rPr lang="en-US" dirty="0" err="1"/>
-              <a:t>calculateSum</a:t>
-            </a:r>
-            <a:r>
-              <a:rPr lang="en-US" dirty="0"/>
-              <a:t> and </a:t>
-            </a:r>
-            <a:r>
-              <a:rPr lang="en-US" dirty="0" err="1"/>
-              <a:t>getTitle</a:t>
-            </a:r>
-            <a:r>
-              <a:rPr lang="en-US" dirty="0"/>
-              <a:t>.</a:t>
-            </a:r>
             <a:endParaRPr lang="ru-RU" dirty="0"/>
           </a:p>
         </p:txBody>
       </p:sp>
       <p:pic>
         <p:nvPicPr>
-          <p:cNvPr id="1027" name="Picture 3"/>
+          <p:cNvPr id="5" name="Рисунок 4">
+            <a:extLst>
+              <a:ext uri="{FF2B5EF4-FFF2-40B4-BE49-F238E27FC236}">
+                <a16:creationId xmlns:a16="http://schemas.microsoft.com/office/drawing/2014/main" id="{7A97CE74-A006-426A-9724-2F3B2054B99B}"/>
+              </a:ext>
+            </a:extLst>
+          </p:cNvPr>
           <p:cNvPicPr>
-            <a:picLocks noChangeAspect="1" noChangeArrowheads="1"/>
+            <a:picLocks noChangeAspect="1"/>
           </p:cNvPicPr>
           <p:nvPr/>
         </p:nvPicPr>
         <p:blipFill>
           <a:blip r:embed="rId2"/>
-          <a:srcRect/>
           <a:stretch>
             <a:fillRect/>
           </a:stretch>
         </p:blipFill>
-        <p:spPr bwMode="auto">
-          <a:xfrm>
-            <a:off x="2233613" y="3714751"/>
-            <a:ext cx="6788905" cy="3143250"/>
+        <p:spPr>
+          <a:xfrm>
+            <a:off x="3199157" y="3429000"/>
+            <a:ext cx="5793685" cy="3286802"/>
           </a:xfrm>
           <a:prstGeom prst="rect">
             <a:avLst/>
           </a:prstGeom>
-          <a:noFill/>
-          <a:ln w="9525">
-            <a:noFill/>
-            <a:miter lim="800000"/>
-            <a:headEnd/>
-            <a:tailEnd/>
-          </a:ln>
-          <a:effectLst/>
         </p:spPr>
       </p:pic>
     </p:spTree>
@@ -15362,20 +15513,42 @@
           </a:xfrm>
         </p:spPr>
         <p:txBody>
-          <a:bodyPr/>
+          <a:bodyPr>
+            <a:normAutofit fontScale="85000" lnSpcReduction="20000"/>
+          </a:bodyPr>
           <a:lstStyle/>
           <a:p>
             <a:r>
               <a:rPr lang="en-US" dirty="0"/>
-              <a:t>As in example before you can use </a:t>
-            </a:r>
-            <a:r>
-              <a:rPr lang="en-US" dirty="0" err="1"/>
+              <a:t>As in example before you can use a Key Arguments or </a:t>
+            </a:r>
+            <a:r>
+              <a:rPr lang="en-US" dirty="0">
+                <a:solidFill>
+                  <a:srgbClr val="FF0000"/>
+                </a:solidFill>
+              </a:rPr>
+              <a:t>**</a:t>
+            </a:r>
+            <a:r>
+              <a:rPr lang="en-US" dirty="0" err="1">
+                <a:solidFill>
+                  <a:srgbClr val="FF0000"/>
+                </a:solidFill>
+              </a:rPr>
               <a:t>kwargs</a:t>
             </a:r>
             <a:r>
-              <a:rPr lang="en-US" dirty="0"/>
-              <a:t> – special python syntax for function </a:t>
+              <a:rPr lang="en-US" dirty="0">
+                <a:solidFill>
+                  <a:srgbClr val="FF0000"/>
+                </a:solidFill>
+              </a:rPr>
+              <a:t> </a:t>
+            </a:r>
+            <a:r>
+              <a:rPr lang="en-US" dirty="0"/>
+              <a:t>– special python syntax for function </a:t>
             </a:r>
           </a:p>
           <a:p>
@@ -15396,21 +15569,69 @@
             <a:endParaRPr lang="ru-RU" dirty="0"/>
           </a:p>
           <a:p>
+            <a:pPr marL="0" indent="0">
+              <a:buNone/>
+            </a:pPr>
+            <a:endParaRPr lang="en-US" dirty="0"/>
+          </a:p>
+          <a:p>
             <a:endParaRPr lang="ru-RU" dirty="0"/>
           </a:p>
           <a:p>
-            <a:endParaRPr lang="ru-RU" dirty="0"/>
-          </a:p>
-          <a:p>
-            <a:r>
-              <a:rPr lang="en-US" dirty="0"/>
-              <a:t>If number of arguments unknown – use a Arbitrary Arguments.</a:t>
-            </a:r>
-          </a:p>
-          <a:p>
-            <a:r>
-              <a:rPr lang="en-US" dirty="0"/>
-              <a:t>If you plan use default value python provide you a possibility with default value	</a:t>
+            <a:r>
+              <a:rPr lang="en-US" dirty="0"/>
+              <a:t>If number of arguments unknown – use a Arbitrary Arguments. ( usually this </a:t>
+            </a:r>
+            <a:r>
+              <a:rPr lang="en-US" dirty="0">
+                <a:solidFill>
+                  <a:srgbClr val="FF0000"/>
+                </a:solidFill>
+              </a:rPr>
+              <a:t>*</a:t>
+            </a:r>
+            <a:r>
+              <a:rPr lang="en-US" dirty="0" err="1">
+                <a:solidFill>
+                  <a:srgbClr val="FF0000"/>
+                </a:solidFill>
+              </a:rPr>
+              <a:t>ags</a:t>
+            </a:r>
+            <a:r>
+              <a:rPr lang="en-US" dirty="0"/>
+              <a:t>, but you may define it as you want )</a:t>
+            </a:r>
+          </a:p>
+          <a:p>
+            <a:pPr marL="0" indent="0">
+              <a:buNone/>
+            </a:pPr>
+            <a:endParaRPr lang="en-US" dirty="0"/>
+          </a:p>
+          <a:p>
+            <a:r>
+              <a:rPr lang="en-US" dirty="0"/>
+              <a:t>If you plan use default value python provide you a possibility with default value</a:t>
+            </a:r>
+          </a:p>
+          <a:p>
+            <a:endParaRPr lang="en-US" dirty="0"/>
+          </a:p>
+          <a:p>
+            <a:r>
+              <a:rPr lang="en-US" dirty="0"/>
+              <a:t>More about function arguments you may find in </a:t>
+            </a:r>
+            <a:r>
+              <a:rPr lang="en-US" dirty="0">
+                <a:hlinkClick r:id="rId2"/>
+              </a:rPr>
+              <a:t>docs</a:t>
+            </a:r>
+            <a:r>
+              <a:rPr lang="en-US" dirty="0"/>
+              <a:t> 	</a:t>
             </a:r>
           </a:p>
           <a:p>
@@ -15427,7 +15648,7 @@
           <p:nvPr/>
         </p:nvPicPr>
         <p:blipFill>
-          <a:blip r:embed="rId2"/>
+          <a:blip r:embed="rId3"/>
           <a:srcRect/>
           <a:stretch>
             <a:fillRect/>
@@ -15435,8 +15656,8 @@
         </p:blipFill>
         <p:spPr bwMode="auto">
           <a:xfrm>
-            <a:off x="5274564" y="2335340"/>
-            <a:ext cx="6155436" cy="1614718"/>
+            <a:off x="5852008" y="1733387"/>
+            <a:ext cx="5240062" cy="1374594"/>
           </a:xfrm>
           <a:prstGeom prst="rect">
             <a:avLst/>
@@ -15460,7 +15681,7 @@
           <p:nvPr/>
         </p:nvPicPr>
         <p:blipFill>
-          <a:blip r:embed="rId3"/>
+          <a:blip r:embed="rId4"/>
           <a:srcRect/>
           <a:stretch>
             <a:fillRect/>
@@ -15468,8 +15689,8 @@
         </p:blipFill>
         <p:spPr bwMode="auto">
           <a:xfrm>
-            <a:off x="5682044" y="0"/>
-            <a:ext cx="3939364" cy="2084832"/>
+            <a:off x="5852160" y="12338"/>
+            <a:ext cx="3102113" cy="1641733"/>
           </a:xfrm>
           <a:prstGeom prst="rect">
             <a:avLst/>
@@ -15493,7 +15714,7 @@
           <p:nvPr/>
         </p:nvPicPr>
         <p:blipFill>
-          <a:blip r:embed="rId4"/>
+          <a:blip r:embed="rId5"/>
           <a:srcRect/>
           <a:stretch>
             <a:fillRect/>
@@ -15501,7 +15722,7 @@
         </p:blipFill>
         <p:spPr bwMode="auto">
           <a:xfrm>
-            <a:off x="5297234" y="4064318"/>
+            <a:off x="5852160" y="3194427"/>
             <a:ext cx="3768868" cy="1111186"/>
           </a:xfrm>
           <a:prstGeom prst="rect">
@@ -15526,7 +15747,7 @@
           <p:nvPr/>
         </p:nvPicPr>
         <p:blipFill>
-          <a:blip r:embed="rId5"/>
+          <a:blip r:embed="rId6"/>
           <a:srcRect/>
           <a:stretch>
             <a:fillRect/>
@@ -15534,8 +15755,8 @@
         </p:blipFill>
         <p:spPr bwMode="auto">
           <a:xfrm>
-            <a:off x="5993321" y="5318189"/>
-            <a:ext cx="3769020" cy="1247203"/>
+            <a:off x="5852008" y="4468989"/>
+            <a:ext cx="3543783" cy="1172670"/>
           </a:xfrm>
           <a:prstGeom prst="rect">
             <a:avLst/>
@@ -15609,9 +15830,16 @@
             <p:ph idx="1"/>
           </p:nvPr>
         </p:nvSpPr>
-        <p:spPr/>
+        <p:spPr>
+          <a:xfrm>
+            <a:off x="838200" y="1825625"/>
+            <a:ext cx="7192617" cy="4151105"/>
+          </a:xfrm>
+        </p:spPr>
         <p:txBody>
-          <a:bodyPr/>
+          <a:bodyPr>
+            <a:normAutofit fontScale="92500" lnSpcReduction="10000"/>
+          </a:bodyPr>
           <a:lstStyle/>
           <a:p>
             <a:r>
@@ -15651,14 +15879,99 @@
               </a:rPr>
               <a:t>: exp</a:t>
             </a:r>
-            <a:endParaRPr lang="ru-RU" dirty="0">
+          </a:p>
+          <a:p>
+            <a:pPr lvl="1"/>
+            <a:endParaRPr lang="en-US" dirty="0">
               <a:solidFill>
                 <a:srgbClr val="FF0000"/>
               </a:solidFill>
             </a:endParaRPr>
           </a:p>
+          <a:p>
+            <a:r>
+              <a:rPr lang="en-US" dirty="0"/>
+              <a:t>The power of lambda is better shown when you use them as an anonymous function inside another function.</a:t>
+            </a:r>
+          </a:p>
+          <a:p>
+            <a:r>
+              <a:rPr lang="en-US" dirty="0"/>
+              <a:t>Say you have a function definition that takes one argument, and that argument will be power by an unknown number</a:t>
+            </a:r>
+          </a:p>
+          <a:p>
+            <a:pPr marL="457200" lvl="1" indent="0">
+              <a:buNone/>
+            </a:pPr>
+            <a:endParaRPr lang="en-US" dirty="0">
+              <a:solidFill>
+                <a:srgbClr val="FF0000"/>
+              </a:solidFill>
+            </a:endParaRPr>
+          </a:p>
         </p:txBody>
       </p:sp>
+      <p:pic>
+        <p:nvPicPr>
+          <p:cNvPr id="4" name="Рисунок 3">
+            <a:extLst>
+              <a:ext uri="{FF2B5EF4-FFF2-40B4-BE49-F238E27FC236}">
+                <a16:creationId xmlns:a16="http://schemas.microsoft.com/office/drawing/2014/main" id="{8B7CC15A-B63A-459D-B609-94D5E16290B3}"/>
+              </a:ext>
+            </a:extLst>
+          </p:cNvPr>
+          <p:cNvPicPr>
+            <a:picLocks noChangeAspect="1"/>
+          </p:cNvPicPr>
+          <p:nvPr/>
+        </p:nvPicPr>
+        <p:blipFill>
+          <a:blip r:embed="rId2"/>
+          <a:stretch>
+            <a:fillRect/>
+          </a:stretch>
+        </p:blipFill>
+        <p:spPr>
+          <a:xfrm>
+            <a:off x="8030817" y="2289934"/>
+            <a:ext cx="3017094" cy="623095"/>
+          </a:xfrm>
+          <a:prstGeom prst="rect">
+            <a:avLst/>
+          </a:prstGeom>
+        </p:spPr>
+      </p:pic>
+      <p:pic>
+        <p:nvPicPr>
+          <p:cNvPr id="5" name="Рисунок 4">
+            <a:extLst>
+              <a:ext uri="{FF2B5EF4-FFF2-40B4-BE49-F238E27FC236}">
+                <a16:creationId xmlns:a16="http://schemas.microsoft.com/office/drawing/2014/main" id="{25F41AF8-D724-42FB-BAA8-EE9994908FC2}"/>
+              </a:ext>
+            </a:extLst>
+          </p:cNvPr>
+          <p:cNvPicPr>
+            <a:picLocks noChangeAspect="1"/>
+          </p:cNvPicPr>
+          <p:nvPr/>
+        </p:nvPicPr>
+        <p:blipFill>
+          <a:blip r:embed="rId3"/>
+          <a:stretch>
+            <a:fillRect/>
+          </a:stretch>
+        </p:blipFill>
+        <p:spPr>
+          <a:xfrm>
+            <a:off x="8030816" y="3703981"/>
+            <a:ext cx="3017093" cy="1942037"/>
+          </a:xfrm>
+          <a:prstGeom prst="rect">
+            <a:avLst/>
+          </a:prstGeom>
+        </p:spPr>
+      </p:pic>
     </p:spTree>
   </p:cSld>
   <p:clrMapOvr>
@@ -15686,6 +15999,1332 @@
       </p:grpSpPr>
       <p:sp>
         <p:nvSpPr>
+          <p:cNvPr id="2" name="Заголовок 1">
+            <a:extLst>
+              <a:ext uri="{FF2B5EF4-FFF2-40B4-BE49-F238E27FC236}">
+                <a16:creationId xmlns:a16="http://schemas.microsoft.com/office/drawing/2014/main" id="{53286900-E4F0-4187-B0B0-AFE1A82E4F9A}"/>
+              </a:ext>
+            </a:extLst>
+          </p:cNvPr>
+          <p:cNvSpPr>
+            <a:spLocks noGrp="1"/>
+          </p:cNvSpPr>
+          <p:nvPr>
+            <p:ph type="title"/>
+          </p:nvPr>
+        </p:nvSpPr>
+        <p:spPr/>
+        <p:txBody>
+          <a:bodyPr/>
+          <a:lstStyle/>
+          <a:p>
+            <a:pPr algn="ctr"/>
+            <a:r>
+              <a:rPr lang="en-US" dirty="0"/>
+              <a:t>Scope</a:t>
+            </a:r>
+            <a:r>
+              <a:rPr lang="ru-RU" dirty="0"/>
+              <a:t>(</a:t>
+            </a:r>
+            <a:r>
+              <a:rPr lang="en-US" dirty="0"/>
+              <a:t>Closure)</a:t>
+            </a:r>
+            <a:endParaRPr lang="ru-RU" dirty="0"/>
+          </a:p>
+        </p:txBody>
+      </p:sp>
+      <p:sp>
+        <p:nvSpPr>
+          <p:cNvPr id="3" name="Объект 2">
+            <a:extLst>
+              <a:ext uri="{FF2B5EF4-FFF2-40B4-BE49-F238E27FC236}">
+                <a16:creationId xmlns:a16="http://schemas.microsoft.com/office/drawing/2014/main" id="{D884FED1-32C1-4512-A35D-BD1E21C0EA23}"/>
+              </a:ext>
+            </a:extLst>
+          </p:cNvPr>
+          <p:cNvSpPr>
+            <a:spLocks noGrp="1"/>
+          </p:cNvSpPr>
+          <p:nvPr>
+            <p:ph idx="1"/>
+          </p:nvPr>
+        </p:nvSpPr>
+        <p:spPr>
+          <a:xfrm>
+            <a:off x="838200" y="1825625"/>
+            <a:ext cx="5430078" cy="4879976"/>
+          </a:xfrm>
+        </p:spPr>
+        <p:txBody>
+          <a:bodyPr>
+            <a:normAutofit fontScale="70000" lnSpcReduction="20000"/>
+          </a:bodyPr>
+          <a:lstStyle/>
+          <a:p>
+            <a:r>
+              <a:rPr lang="en-US" dirty="0"/>
+              <a:t>It’s a place where we may use variables and functions. Scope limited by region where the variable is created</a:t>
+            </a:r>
+          </a:p>
+          <a:p>
+            <a:r>
+              <a:rPr lang="en-US" dirty="0"/>
+              <a:t>A variable created inside a function belongs to the </a:t>
+            </a:r>
+            <a:r>
+              <a:rPr lang="en-US" i="1" dirty="0">
+                <a:solidFill>
+                  <a:srgbClr val="FF0000"/>
+                </a:solidFill>
+              </a:rPr>
+              <a:t>local scope</a:t>
+            </a:r>
+            <a:r>
+              <a:rPr lang="en-US" dirty="0"/>
+              <a:t> of that function, and can only be used inside that function</a:t>
+            </a:r>
+          </a:p>
+          <a:p>
+            <a:r>
+              <a:rPr lang="en-US" dirty="0"/>
+              <a:t>A variable created in the main body of the Python code is a global variable and belongs to the </a:t>
+            </a:r>
+            <a:r>
+              <a:rPr lang="en-US" dirty="0">
+                <a:solidFill>
+                  <a:srgbClr val="FF0000"/>
+                </a:solidFill>
+              </a:rPr>
+              <a:t>global scope</a:t>
+            </a:r>
+            <a:r>
+              <a:rPr lang="en-US" dirty="0"/>
+              <a:t>. Global variables are available from within any scope, global and local</a:t>
+            </a:r>
+          </a:p>
+          <a:p>
+            <a:r>
+              <a:rPr lang="en-US" dirty="0"/>
+              <a:t>If you operate with the same variable name inside and outside of a function, Python will treat them as two separate variables.</a:t>
+            </a:r>
+          </a:p>
+          <a:p>
+            <a:r>
+              <a:rPr lang="en-US" dirty="0"/>
+              <a:t>If you need to create a global variable, but are stuck in the local scope, you can use the </a:t>
+            </a:r>
+            <a:r>
+              <a:rPr lang="en-US" dirty="0">
+                <a:solidFill>
+                  <a:srgbClr val="FF0000"/>
+                </a:solidFill>
+              </a:rPr>
+              <a:t>global</a:t>
+            </a:r>
+            <a:r>
+              <a:rPr lang="en-US" dirty="0"/>
+              <a:t> keyword.</a:t>
+            </a:r>
+          </a:p>
+          <a:p>
+            <a:r>
+              <a:rPr lang="en-US" dirty="0"/>
+              <a:t>Also, use the </a:t>
+            </a:r>
+            <a:r>
+              <a:rPr lang="en-US" dirty="0">
+                <a:solidFill>
+                  <a:srgbClr val="FF0000"/>
+                </a:solidFill>
+              </a:rPr>
+              <a:t>global</a:t>
+            </a:r>
+            <a:r>
+              <a:rPr lang="en-US" dirty="0"/>
+              <a:t> keyword if you want to make a change to a global variable inside a function</a:t>
+            </a:r>
+          </a:p>
+          <a:p>
+            <a:endParaRPr lang="en-US" dirty="0"/>
+          </a:p>
+          <a:p>
+            <a:endParaRPr lang="en-US" dirty="0"/>
+          </a:p>
+          <a:p>
+            <a:endParaRPr lang="en-US" dirty="0"/>
+          </a:p>
+          <a:p>
+            <a:endParaRPr lang="ru-RU" dirty="0"/>
+          </a:p>
+        </p:txBody>
+      </p:sp>
+      <p:pic>
+        <p:nvPicPr>
+          <p:cNvPr id="18" name="Рисунок 17">
+            <a:extLst>
+              <a:ext uri="{FF2B5EF4-FFF2-40B4-BE49-F238E27FC236}">
+                <a16:creationId xmlns:a16="http://schemas.microsoft.com/office/drawing/2014/main" id="{4A345E72-8944-44C2-9F66-C98442B07249}"/>
+              </a:ext>
+            </a:extLst>
+          </p:cNvPr>
+          <p:cNvPicPr>
+            <a:picLocks noChangeAspect="1"/>
+          </p:cNvPicPr>
+          <p:nvPr/>
+        </p:nvPicPr>
+        <p:blipFill>
+          <a:blip r:embed="rId2"/>
+          <a:stretch>
+            <a:fillRect/>
+          </a:stretch>
+        </p:blipFill>
+        <p:spPr>
+          <a:xfrm>
+            <a:off x="6444697" y="1825625"/>
+            <a:ext cx="3573945" cy="1171975"/>
+          </a:xfrm>
+          <a:prstGeom prst="rect">
+            <a:avLst/>
+          </a:prstGeom>
+        </p:spPr>
+      </p:pic>
+      <p:pic>
+        <p:nvPicPr>
+          <p:cNvPr id="19" name="Рисунок 18">
+            <a:extLst>
+              <a:ext uri="{FF2B5EF4-FFF2-40B4-BE49-F238E27FC236}">
+                <a16:creationId xmlns:a16="http://schemas.microsoft.com/office/drawing/2014/main" id="{13CD212E-C994-40A3-AEB5-AF0D3A3BCE5D}"/>
+              </a:ext>
+            </a:extLst>
+          </p:cNvPr>
+          <p:cNvPicPr>
+            <a:picLocks noChangeAspect="1"/>
+          </p:cNvPicPr>
+          <p:nvPr/>
+        </p:nvPicPr>
+        <p:blipFill>
+          <a:blip r:embed="rId3"/>
+          <a:stretch>
+            <a:fillRect/>
+          </a:stretch>
+        </p:blipFill>
+        <p:spPr>
+          <a:xfrm>
+            <a:off x="6444697" y="3132537"/>
+            <a:ext cx="1506608" cy="1209531"/>
+          </a:xfrm>
+          <a:prstGeom prst="rect">
+            <a:avLst/>
+          </a:prstGeom>
+        </p:spPr>
+      </p:pic>
+      <p:pic>
+        <p:nvPicPr>
+          <p:cNvPr id="20" name="Рисунок 19">
+            <a:extLst>
+              <a:ext uri="{FF2B5EF4-FFF2-40B4-BE49-F238E27FC236}">
+                <a16:creationId xmlns:a16="http://schemas.microsoft.com/office/drawing/2014/main" id="{3B44B7EA-0E3E-41A2-AD7E-D28BC05B450C}"/>
+              </a:ext>
+            </a:extLst>
+          </p:cNvPr>
+          <p:cNvPicPr>
+            <a:picLocks noChangeAspect="1"/>
+          </p:cNvPicPr>
+          <p:nvPr/>
+        </p:nvPicPr>
+        <p:blipFill>
+          <a:blip r:embed="rId4"/>
+          <a:stretch>
+            <a:fillRect/>
+          </a:stretch>
+        </p:blipFill>
+        <p:spPr>
+          <a:xfrm>
+            <a:off x="6444697" y="4460440"/>
+            <a:ext cx="1639129" cy="2040548"/>
+          </a:xfrm>
+          <a:prstGeom prst="rect">
+            <a:avLst/>
+          </a:prstGeom>
+        </p:spPr>
+      </p:pic>
+      <p:sp>
+        <p:nvSpPr>
+          <p:cNvPr id="21" name="TextBox 20">
+            <a:extLst>
+              <a:ext uri="{FF2B5EF4-FFF2-40B4-BE49-F238E27FC236}">
+                <a16:creationId xmlns:a16="http://schemas.microsoft.com/office/drawing/2014/main" id="{D2203179-5BA6-44DB-8ED2-D64953630A40}"/>
+              </a:ext>
+            </a:extLst>
+          </p:cNvPr>
+          <p:cNvSpPr txBox="1"/>
+          <p:nvPr/>
+        </p:nvSpPr>
+        <p:spPr>
+          <a:xfrm>
+            <a:off x="10429461" y="1690688"/>
+            <a:ext cx="1457739" cy="646331"/>
+          </a:xfrm>
+          <a:prstGeom prst="rect">
+            <a:avLst/>
+          </a:prstGeom>
+          <a:noFill/>
+        </p:spPr>
+        <p:txBody>
+          <a:bodyPr wrap="square" rtlCol="0">
+            <a:spAutoFit/>
+          </a:bodyPr>
+          <a:lstStyle/>
+          <a:p>
+            <a:r>
+              <a:rPr lang="en-US" dirty="0"/>
+              <a:t>Local Scope</a:t>
+            </a:r>
+          </a:p>
+          <a:p>
+            <a:endParaRPr lang="ru-RU" dirty="0"/>
+          </a:p>
+        </p:txBody>
+      </p:sp>
+      <p:sp>
+        <p:nvSpPr>
+          <p:cNvPr id="22" name="TextBox 21">
+            <a:extLst>
+              <a:ext uri="{FF2B5EF4-FFF2-40B4-BE49-F238E27FC236}">
+                <a16:creationId xmlns:a16="http://schemas.microsoft.com/office/drawing/2014/main" id="{88443131-E0EC-4741-8764-4C41760FBFC6}"/>
+              </a:ext>
+            </a:extLst>
+          </p:cNvPr>
+          <p:cNvSpPr txBox="1"/>
+          <p:nvPr/>
+        </p:nvSpPr>
+        <p:spPr>
+          <a:xfrm>
+            <a:off x="8772938" y="3179040"/>
+            <a:ext cx="1457739" cy="369332"/>
+          </a:xfrm>
+          <a:prstGeom prst="rect">
+            <a:avLst/>
+          </a:prstGeom>
+          <a:noFill/>
+        </p:spPr>
+        <p:txBody>
+          <a:bodyPr wrap="square" rtlCol="0">
+            <a:spAutoFit/>
+          </a:bodyPr>
+          <a:lstStyle/>
+          <a:p>
+            <a:r>
+              <a:rPr lang="en-US" dirty="0"/>
+              <a:t>Global Scope</a:t>
+            </a:r>
+            <a:endParaRPr lang="ru-RU" dirty="0"/>
+          </a:p>
+        </p:txBody>
+      </p:sp>
+      <p:cxnSp>
+        <p:nvCxnSpPr>
+          <p:cNvPr id="24" name="Прямая со стрелкой 23">
+            <a:extLst>
+              <a:ext uri="{FF2B5EF4-FFF2-40B4-BE49-F238E27FC236}">
+                <a16:creationId xmlns:a16="http://schemas.microsoft.com/office/drawing/2014/main" id="{91F8A2BA-7876-4A08-B78A-1F72DB11F1C4}"/>
+              </a:ext>
+            </a:extLst>
+          </p:cNvPr>
+          <p:cNvCxnSpPr>
+            <a:cxnSpLocks/>
+          </p:cNvCxnSpPr>
+          <p:nvPr/>
+        </p:nvCxnSpPr>
+        <p:spPr>
+          <a:xfrm flipH="1">
+            <a:off x="7580243" y="1825625"/>
+            <a:ext cx="2849218" cy="307975"/>
+          </a:xfrm>
+          <a:prstGeom prst="straightConnector1">
+            <a:avLst/>
+          </a:prstGeom>
+          <a:ln>
+            <a:tailEnd type="triangle"/>
+          </a:ln>
+        </p:spPr>
+        <p:style>
+          <a:lnRef idx="3">
+            <a:schemeClr val="accent2"/>
+          </a:lnRef>
+          <a:fillRef idx="0">
+            <a:schemeClr val="accent2"/>
+          </a:fillRef>
+          <a:effectRef idx="2">
+            <a:schemeClr val="accent2"/>
+          </a:effectRef>
+          <a:fontRef idx="minor">
+            <a:schemeClr val="tx1"/>
+          </a:fontRef>
+        </p:style>
+      </p:cxnSp>
+      <p:cxnSp>
+        <p:nvCxnSpPr>
+          <p:cNvPr id="26" name="Прямая со стрелкой 25">
+            <a:extLst>
+              <a:ext uri="{FF2B5EF4-FFF2-40B4-BE49-F238E27FC236}">
+                <a16:creationId xmlns:a16="http://schemas.microsoft.com/office/drawing/2014/main" id="{18BA1C47-E4D4-4AC7-B918-F4A391D50979}"/>
+              </a:ext>
+            </a:extLst>
+          </p:cNvPr>
+          <p:cNvCxnSpPr>
+            <a:cxnSpLocks/>
+          </p:cNvCxnSpPr>
+          <p:nvPr/>
+        </p:nvCxnSpPr>
+        <p:spPr>
+          <a:xfrm flipH="1" flipV="1">
+            <a:off x="7792278" y="3179040"/>
+            <a:ext cx="980660" cy="197918"/>
+          </a:xfrm>
+          <a:prstGeom prst="straightConnector1">
+            <a:avLst/>
+          </a:prstGeom>
+          <a:ln>
+            <a:tailEnd type="triangle"/>
+          </a:ln>
+        </p:spPr>
+        <p:style>
+          <a:lnRef idx="3">
+            <a:schemeClr val="accent2"/>
+          </a:lnRef>
+          <a:fillRef idx="0">
+            <a:schemeClr val="accent2"/>
+          </a:fillRef>
+          <a:effectRef idx="2">
+            <a:schemeClr val="accent2"/>
+          </a:effectRef>
+          <a:fontRef idx="minor">
+            <a:schemeClr val="tx1"/>
+          </a:fontRef>
+        </p:style>
+      </p:cxnSp>
+      <p:sp>
+        <p:nvSpPr>
+          <p:cNvPr id="28" name="Прямоугольник 27">
+            <a:extLst>
+              <a:ext uri="{FF2B5EF4-FFF2-40B4-BE49-F238E27FC236}">
+                <a16:creationId xmlns:a16="http://schemas.microsoft.com/office/drawing/2014/main" id="{9CB798CE-5DD6-4A84-B460-8B00C07F8BDC}"/>
+              </a:ext>
+            </a:extLst>
+          </p:cNvPr>
+          <p:cNvSpPr/>
+          <p:nvPr/>
+        </p:nvSpPr>
+        <p:spPr>
+          <a:xfrm>
+            <a:off x="6573078" y="1987826"/>
+            <a:ext cx="1007166" cy="543340"/>
+          </a:xfrm>
+          <a:prstGeom prst="rect">
+            <a:avLst/>
+          </a:prstGeom>
+          <a:noFill/>
+          <a:ln w="9525" cap="flat" cmpd="sng" algn="ctr">
+            <a:solidFill>
+              <a:schemeClr val="accent2"/>
+            </a:solidFill>
+            <a:prstDash val="solid"/>
+            <a:round/>
+            <a:headEnd type="none" w="med" len="med"/>
+            <a:tailEnd type="none" w="med" len="med"/>
+          </a:ln>
+        </p:spPr>
+        <p:style>
+          <a:lnRef idx="0">
+            <a:scrgbClr r="0" g="0" b="0"/>
+          </a:lnRef>
+          <a:fillRef idx="0">
+            <a:scrgbClr r="0" g="0" b="0"/>
+          </a:fillRef>
+          <a:effectRef idx="0">
+            <a:scrgbClr r="0" g="0" b="0"/>
+          </a:effectRef>
+          <a:fontRef idx="minor">
+            <a:schemeClr val="accent2"/>
+          </a:fontRef>
+        </p:style>
+        <p:txBody>
+          <a:bodyPr rtlCol="0" anchor="ctr"/>
+          <a:lstStyle/>
+          <a:p>
+            <a:pPr algn="ctr"/>
+            <a:endParaRPr lang="ru-RU"/>
+          </a:p>
+        </p:txBody>
+      </p:sp>
+      <p:sp>
+        <p:nvSpPr>
+          <p:cNvPr id="29" name="Прямоугольник 28">
+            <a:extLst>
+              <a:ext uri="{FF2B5EF4-FFF2-40B4-BE49-F238E27FC236}">
+                <a16:creationId xmlns:a16="http://schemas.microsoft.com/office/drawing/2014/main" id="{36921629-2E51-4AAA-95C1-D8674ED5E15B}"/>
+              </a:ext>
+            </a:extLst>
+          </p:cNvPr>
+          <p:cNvSpPr/>
+          <p:nvPr/>
+        </p:nvSpPr>
+        <p:spPr>
+          <a:xfrm>
+            <a:off x="6444697" y="3132537"/>
+            <a:ext cx="1347581" cy="1171975"/>
+          </a:xfrm>
+          <a:prstGeom prst="rect">
+            <a:avLst/>
+          </a:prstGeom>
+          <a:noFill/>
+          <a:ln w="9525" cap="flat" cmpd="sng" algn="ctr">
+            <a:solidFill>
+              <a:schemeClr val="accent2"/>
+            </a:solidFill>
+            <a:prstDash val="solid"/>
+            <a:round/>
+            <a:headEnd type="none" w="med" len="med"/>
+            <a:tailEnd type="none" w="med" len="med"/>
+          </a:ln>
+        </p:spPr>
+        <p:style>
+          <a:lnRef idx="0">
+            <a:scrgbClr r="0" g="0" b="0"/>
+          </a:lnRef>
+          <a:fillRef idx="0">
+            <a:scrgbClr r="0" g="0" b="0"/>
+          </a:fillRef>
+          <a:effectRef idx="0">
+            <a:scrgbClr r="0" g="0" b="0"/>
+          </a:effectRef>
+          <a:fontRef idx="minor">
+            <a:schemeClr val="accent2"/>
+          </a:fontRef>
+        </p:style>
+        <p:txBody>
+          <a:bodyPr rtlCol="0" anchor="ctr"/>
+          <a:lstStyle/>
+          <a:p>
+            <a:pPr algn="ctr"/>
+            <a:endParaRPr lang="ru-RU"/>
+          </a:p>
+        </p:txBody>
+      </p:sp>
+    </p:spTree>
+    <p:extLst>
+      <p:ext uri="{BB962C8B-B14F-4D97-AF65-F5344CB8AC3E}">
+        <p14:creationId xmlns:p14="http://schemas.microsoft.com/office/powerpoint/2010/main" val="1408040424"/>
+      </p:ext>
+    </p:extLst>
+  </p:cSld>
+  <p:clrMapOvr>
+    <a:masterClrMapping/>
+  </p:clrMapOvr>
+</p:sld>
+</file>
+
+<file path=ppt/slides/slide49.xml><?xml version="1.0" encoding="utf-8"?>
+<p:sld xmlns:a="http://schemas.openxmlformats.org/drawingml/2006/main" xmlns:r="http://schemas.openxmlformats.org/officeDocument/2006/relationships" xmlns:p="http://schemas.openxmlformats.org/presentationml/2006/main">
+  <p:cSld>
+    <p:spTree>
+      <p:nvGrpSpPr>
+        <p:cNvPr id="1" name=""/>
+        <p:cNvGrpSpPr/>
+        <p:nvPr/>
+      </p:nvGrpSpPr>
+      <p:grpSpPr>
+        <a:xfrm>
+          <a:off x="0" y="0"/>
+          <a:ext cx="0" cy="0"/>
+          <a:chOff x="0" y="0"/>
+          <a:chExt cx="0" cy="0"/>
+        </a:xfrm>
+      </p:grpSpPr>
+      <p:sp>
+        <p:nvSpPr>
+          <p:cNvPr id="2" name="Заголовок 1">
+            <a:extLst>
+              <a:ext uri="{FF2B5EF4-FFF2-40B4-BE49-F238E27FC236}">
+                <a16:creationId xmlns:a16="http://schemas.microsoft.com/office/drawing/2014/main" id="{C3883674-A64A-4013-9248-153D6E8B3A97}"/>
+              </a:ext>
+            </a:extLst>
+          </p:cNvPr>
+          <p:cNvSpPr>
+            <a:spLocks noGrp="1"/>
+          </p:cNvSpPr>
+          <p:nvPr>
+            <p:ph type="title"/>
+          </p:nvPr>
+        </p:nvSpPr>
+        <p:spPr/>
+        <p:txBody>
+          <a:bodyPr/>
+          <a:lstStyle/>
+          <a:p>
+            <a:pPr algn="ctr"/>
+            <a:r>
+              <a:rPr lang="en-US" dirty="0"/>
+              <a:t>Decorators</a:t>
+            </a:r>
+            <a:endParaRPr lang="ru-RU" dirty="0"/>
+          </a:p>
+        </p:txBody>
+      </p:sp>
+      <p:sp>
+        <p:nvSpPr>
+          <p:cNvPr id="3" name="Объект 2">
+            <a:extLst>
+              <a:ext uri="{FF2B5EF4-FFF2-40B4-BE49-F238E27FC236}">
+                <a16:creationId xmlns:a16="http://schemas.microsoft.com/office/drawing/2014/main" id="{03EB723B-0CBC-4631-B586-ECB2FACA9F37}"/>
+              </a:ext>
+            </a:extLst>
+          </p:cNvPr>
+          <p:cNvSpPr>
+            <a:spLocks noGrp="1"/>
+          </p:cNvSpPr>
+          <p:nvPr>
+            <p:ph idx="1"/>
+          </p:nvPr>
+        </p:nvSpPr>
+        <p:spPr>
+          <a:xfrm>
+            <a:off x="838200" y="1825624"/>
+            <a:ext cx="6331226" cy="5032375"/>
+          </a:xfrm>
+        </p:spPr>
+        <p:txBody>
+          <a:bodyPr>
+            <a:normAutofit fontScale="70000" lnSpcReduction="20000"/>
+          </a:bodyPr>
+          <a:lstStyle/>
+          <a:p>
+            <a:r>
+              <a:rPr lang="en-US" dirty="0"/>
+              <a:t>Decorators are design patterns, that alter the functionality of functions without functions changes themselves. Think about it like a wrapper for a present.</a:t>
+            </a:r>
+          </a:p>
+          <a:p>
+            <a:r>
+              <a:rPr lang="en-US" dirty="0"/>
+              <a:t>The decorator takes a function as an argument and returns a new function with </a:t>
+            </a:r>
+            <a:r>
+              <a:rPr lang="en-US" dirty="0" err="1"/>
+              <a:t>modificated</a:t>
+            </a:r>
+            <a:r>
+              <a:rPr lang="en-US" dirty="0"/>
+              <a:t> functionality.</a:t>
+            </a:r>
+          </a:p>
+          <a:p>
+            <a:r>
+              <a:rPr lang="en-US" dirty="0"/>
+              <a:t> Simplest schema of a decorator:</a:t>
+            </a:r>
+          </a:p>
+          <a:p>
+            <a:pPr lvl="1"/>
+            <a:r>
+              <a:rPr lang="en-US" dirty="0">
+                <a:solidFill>
+                  <a:srgbClr val="FF0000"/>
+                </a:solidFill>
+              </a:rPr>
+              <a:t>def</a:t>
+            </a:r>
+            <a:r>
+              <a:rPr lang="en-US" dirty="0"/>
+              <a:t> decorator</a:t>
+            </a:r>
+            <a:r>
+              <a:rPr lang="en-US" dirty="0">
+                <a:solidFill>
+                  <a:srgbClr val="FF0000"/>
+                </a:solidFill>
+              </a:rPr>
+              <a:t>(</a:t>
+            </a:r>
+            <a:r>
+              <a:rPr lang="en-US" dirty="0" err="1">
+                <a:solidFill>
+                  <a:srgbClr val="FF0000"/>
+                </a:solidFill>
+              </a:rPr>
+              <a:t>func</a:t>
+            </a:r>
+            <a:r>
+              <a:rPr lang="en-US" dirty="0">
+                <a:solidFill>
+                  <a:srgbClr val="FF0000"/>
+                </a:solidFill>
+              </a:rPr>
+              <a:t>):</a:t>
+            </a:r>
+          </a:p>
+          <a:p>
+            <a:pPr marL="457200" lvl="1" indent="0">
+              <a:buNone/>
+            </a:pPr>
+            <a:r>
+              <a:rPr lang="en-US" dirty="0"/>
+              <a:t>	</a:t>
+            </a:r>
+            <a:r>
+              <a:rPr lang="en-US" dirty="0">
+                <a:solidFill>
+                  <a:srgbClr val="FF0000"/>
+                </a:solidFill>
+              </a:rPr>
+              <a:t>def</a:t>
+            </a:r>
+            <a:r>
+              <a:rPr lang="en-US" dirty="0"/>
+              <a:t> </a:t>
+            </a:r>
+            <a:r>
+              <a:rPr lang="en-US" dirty="0" err="1"/>
+              <a:t>newF</a:t>
+            </a:r>
+            <a:r>
+              <a:rPr lang="en-US" dirty="0"/>
+              <a:t>():</a:t>
+            </a:r>
+          </a:p>
+          <a:p>
+            <a:pPr marL="457200" lvl="1" indent="0">
+              <a:buNone/>
+            </a:pPr>
+            <a:r>
+              <a:rPr lang="en-US" dirty="0"/>
+              <a:t>		do something</a:t>
+            </a:r>
+          </a:p>
+          <a:p>
+            <a:pPr marL="457200" lvl="1" indent="0">
+              <a:buNone/>
+            </a:pPr>
+            <a:r>
+              <a:rPr lang="en-US" dirty="0"/>
+              <a:t>		</a:t>
+            </a:r>
+            <a:r>
+              <a:rPr lang="en-US" dirty="0" err="1">
+                <a:solidFill>
+                  <a:srgbClr val="FF0000"/>
+                </a:solidFill>
+              </a:rPr>
+              <a:t>func</a:t>
+            </a:r>
+            <a:r>
+              <a:rPr lang="en-US" dirty="0">
+                <a:solidFill>
+                  <a:srgbClr val="FF0000"/>
+                </a:solidFill>
+              </a:rPr>
+              <a:t>()</a:t>
+            </a:r>
+          </a:p>
+          <a:p>
+            <a:pPr marL="457200" lvl="1" indent="0">
+              <a:buNone/>
+            </a:pPr>
+            <a:r>
+              <a:rPr lang="en-US" dirty="0"/>
+              <a:t>	</a:t>
+            </a:r>
+            <a:r>
+              <a:rPr lang="en-US" dirty="0">
+                <a:solidFill>
+                  <a:srgbClr val="FF0000"/>
+                </a:solidFill>
+              </a:rPr>
+              <a:t>return</a:t>
+            </a:r>
+            <a:r>
+              <a:rPr lang="en-US" dirty="0"/>
+              <a:t> </a:t>
+            </a:r>
+            <a:r>
+              <a:rPr lang="en-US" dirty="0" err="1"/>
+              <a:t>newF</a:t>
+            </a:r>
+            <a:endParaRPr lang="en-US" dirty="0"/>
+          </a:p>
+          <a:p>
+            <a:r>
+              <a:rPr lang="en-US" dirty="0"/>
+              <a:t>Also you need remember about returned value of original function. </a:t>
+            </a:r>
+          </a:p>
+          <a:p>
+            <a:r>
+              <a:rPr lang="en-US" dirty="0"/>
+              <a:t>To using a decorator we have few ways:</a:t>
+            </a:r>
+          </a:p>
+          <a:p>
+            <a:pPr lvl="1"/>
+            <a:r>
+              <a:rPr lang="en-US" dirty="0"/>
+              <a:t>Create an instance of the decorated function</a:t>
+            </a:r>
+          </a:p>
+          <a:p>
+            <a:pPr lvl="1"/>
+            <a:r>
+              <a:rPr lang="en-US" dirty="0"/>
+              <a:t>Add decorator to defining a function with keyword </a:t>
+            </a:r>
+            <a:r>
+              <a:rPr lang="en-US" dirty="0">
+                <a:solidFill>
+                  <a:srgbClr val="FF0000"/>
+                </a:solidFill>
+              </a:rPr>
+              <a:t>@</a:t>
+            </a:r>
+            <a:r>
+              <a:rPr lang="en-US" dirty="0"/>
+              <a:t> ( Note! Every time you call a function call will be with decorator)</a:t>
+            </a:r>
+          </a:p>
+        </p:txBody>
+      </p:sp>
+      <p:sp>
+        <p:nvSpPr>
+          <p:cNvPr id="5" name="Прямоугольник 4">
+            <a:extLst>
+              <a:ext uri="{FF2B5EF4-FFF2-40B4-BE49-F238E27FC236}">
+                <a16:creationId xmlns:a16="http://schemas.microsoft.com/office/drawing/2014/main" id="{D6AF2D64-2D2F-4382-AEEC-A870EDC31456}"/>
+              </a:ext>
+            </a:extLst>
+          </p:cNvPr>
+          <p:cNvSpPr/>
+          <p:nvPr/>
+        </p:nvSpPr>
+        <p:spPr>
+          <a:xfrm>
+            <a:off x="1524001" y="3415747"/>
+            <a:ext cx="2716696" cy="1351723"/>
+          </a:xfrm>
+          <a:prstGeom prst="rect">
+            <a:avLst/>
+          </a:prstGeom>
+          <a:noFill/>
+          <a:ln>
+            <a:solidFill>
+              <a:srgbClr val="FFC000"/>
+            </a:solidFill>
+          </a:ln>
+        </p:spPr>
+        <p:style>
+          <a:lnRef idx="2">
+            <a:schemeClr val="accent1">
+              <a:shade val="50000"/>
+            </a:schemeClr>
+          </a:lnRef>
+          <a:fillRef idx="1">
+            <a:schemeClr val="accent1"/>
+          </a:fillRef>
+          <a:effectRef idx="0">
+            <a:schemeClr val="accent1"/>
+          </a:effectRef>
+          <a:fontRef idx="minor">
+            <a:schemeClr val="lt1"/>
+          </a:fontRef>
+        </p:style>
+        <p:txBody>
+          <a:bodyPr rtlCol="0" anchor="ctr"/>
+          <a:lstStyle/>
+          <a:p>
+            <a:pPr algn="ctr"/>
+            <a:endParaRPr lang="ru-RU"/>
+          </a:p>
+        </p:txBody>
+      </p:sp>
+      <p:pic>
+        <p:nvPicPr>
+          <p:cNvPr id="6" name="Рисунок 5">
+            <a:extLst>
+              <a:ext uri="{FF2B5EF4-FFF2-40B4-BE49-F238E27FC236}">
+                <a16:creationId xmlns:a16="http://schemas.microsoft.com/office/drawing/2014/main" id="{1D300C2C-D6B4-43DE-8E1C-A0EC60510B3C}"/>
+              </a:ext>
+            </a:extLst>
+          </p:cNvPr>
+          <p:cNvPicPr>
+            <a:picLocks noChangeAspect="1"/>
+          </p:cNvPicPr>
+          <p:nvPr/>
+        </p:nvPicPr>
+        <p:blipFill>
+          <a:blip r:embed="rId2"/>
+          <a:stretch>
+            <a:fillRect/>
+          </a:stretch>
+        </p:blipFill>
+        <p:spPr>
+          <a:xfrm>
+            <a:off x="7169426" y="2164569"/>
+            <a:ext cx="3153811" cy="1264431"/>
+          </a:xfrm>
+          <a:prstGeom prst="rect">
+            <a:avLst/>
+          </a:prstGeom>
+        </p:spPr>
+      </p:pic>
+      <p:pic>
+        <p:nvPicPr>
+          <p:cNvPr id="7" name="Рисунок 6">
+            <a:extLst>
+              <a:ext uri="{FF2B5EF4-FFF2-40B4-BE49-F238E27FC236}">
+                <a16:creationId xmlns:a16="http://schemas.microsoft.com/office/drawing/2014/main" id="{2F22876C-A3A2-41F3-98C8-96F60013D586}"/>
+              </a:ext>
+            </a:extLst>
+          </p:cNvPr>
+          <p:cNvPicPr>
+            <a:picLocks noChangeAspect="1"/>
+          </p:cNvPicPr>
+          <p:nvPr/>
+        </p:nvPicPr>
+        <p:blipFill>
+          <a:blip r:embed="rId3"/>
+          <a:stretch>
+            <a:fillRect/>
+          </a:stretch>
+        </p:blipFill>
+        <p:spPr>
+          <a:xfrm>
+            <a:off x="7169426" y="3544057"/>
+            <a:ext cx="4184374" cy="2152733"/>
+          </a:xfrm>
+          <a:prstGeom prst="rect">
+            <a:avLst/>
+          </a:prstGeom>
+        </p:spPr>
+      </p:pic>
+    </p:spTree>
+    <p:extLst>
+      <p:ext uri="{BB962C8B-B14F-4D97-AF65-F5344CB8AC3E}">
+        <p14:creationId xmlns:p14="http://schemas.microsoft.com/office/powerpoint/2010/main" val="3898460943"/>
+      </p:ext>
+    </p:extLst>
+  </p:cSld>
+  <p:clrMapOvr>
+    <a:masterClrMapping/>
+  </p:clrMapOvr>
+</p:sld>
+</file>
+
+<file path=ppt/slides/slide5.xml><?xml version="1.0" encoding="utf-8"?>
+<p:sld xmlns:a="http://schemas.openxmlformats.org/drawingml/2006/main" xmlns:r="http://schemas.openxmlformats.org/officeDocument/2006/relationships" xmlns:p="http://schemas.openxmlformats.org/presentationml/2006/main">
+  <p:cSld>
+    <p:spTree>
+      <p:nvGrpSpPr>
+        <p:cNvPr id="1" name=""/>
+        <p:cNvGrpSpPr/>
+        <p:nvPr/>
+      </p:nvGrpSpPr>
+      <p:grpSpPr>
+        <a:xfrm>
+          <a:off x="0" y="0"/>
+          <a:ext cx="0" cy="0"/>
+          <a:chOff x="0" y="0"/>
+          <a:chExt cx="0" cy="0"/>
+        </a:xfrm>
+      </p:grpSpPr>
+      <p:sp>
+        <p:nvSpPr>
+          <p:cNvPr id="2" name="Заголовок 1"/>
+          <p:cNvSpPr>
+            <a:spLocks noGrp="1"/>
+          </p:cNvSpPr>
+          <p:nvPr>
+            <p:ph type="title"/>
+          </p:nvPr>
+        </p:nvSpPr>
+        <p:spPr/>
+        <p:txBody>
+          <a:bodyPr/>
+          <a:lstStyle/>
+          <a:p>
+            <a:pPr algn="ctr"/>
+            <a:r>
+              <a:rPr lang="en-US" b="1" dirty="0"/>
+              <a:t>Transform Data Type</a:t>
+            </a:r>
+            <a:endParaRPr lang="ru-RU" b="1" dirty="0"/>
+          </a:p>
+        </p:txBody>
+      </p:sp>
+      <p:pic>
+        <p:nvPicPr>
+          <p:cNvPr id="3074" name="Picture 2"/>
+          <p:cNvPicPr>
+            <a:picLocks noGrp="1" noChangeAspect="1" noChangeArrowheads="1"/>
+          </p:cNvPicPr>
+          <p:nvPr>
+            <p:ph idx="1"/>
+          </p:nvPr>
+        </p:nvPicPr>
+        <p:blipFill>
+          <a:blip r:embed="rId2"/>
+          <a:srcRect/>
+          <a:stretch>
+            <a:fillRect/>
+          </a:stretch>
+        </p:blipFill>
+        <p:spPr bwMode="auto">
+          <a:xfrm>
+            <a:off x="2615184" y="1437139"/>
+            <a:ext cx="6967728" cy="4932418"/>
+          </a:xfrm>
+          <a:prstGeom prst="rect">
+            <a:avLst/>
+          </a:prstGeom>
+          <a:noFill/>
+          <a:ln w="9525">
+            <a:noFill/>
+            <a:miter lim="800000"/>
+            <a:headEnd/>
+            <a:tailEnd/>
+          </a:ln>
+          <a:effectLst/>
+        </p:spPr>
+      </p:pic>
+    </p:spTree>
+  </p:cSld>
+  <p:clrMapOvr>
+    <a:masterClrMapping/>
+  </p:clrMapOvr>
+</p:sld>
+</file>
+
+<file path=ppt/slides/slide50.xml><?xml version="1.0" encoding="utf-8"?>
+<p:sld xmlns:a="http://schemas.openxmlformats.org/drawingml/2006/main" xmlns:r="http://schemas.openxmlformats.org/officeDocument/2006/relationships" xmlns:p="http://schemas.openxmlformats.org/presentationml/2006/main">
+  <p:cSld>
+    <p:spTree>
+      <p:nvGrpSpPr>
+        <p:cNvPr id="1" name=""/>
+        <p:cNvGrpSpPr/>
+        <p:nvPr/>
+      </p:nvGrpSpPr>
+      <p:grpSpPr>
+        <a:xfrm>
+          <a:off x="0" y="0"/>
+          <a:ext cx="0" cy="0"/>
+          <a:chOff x="0" y="0"/>
+          <a:chExt cx="0" cy="0"/>
+        </a:xfrm>
+      </p:grpSpPr>
+      <p:sp>
+        <p:nvSpPr>
+          <p:cNvPr id="2" name="Заголовок 1">
+            <a:extLst>
+              <a:ext uri="{FF2B5EF4-FFF2-40B4-BE49-F238E27FC236}">
+                <a16:creationId xmlns:a16="http://schemas.microsoft.com/office/drawing/2014/main" id="{0747DEB6-B27E-427E-8304-A7868DA4EB3A}"/>
+              </a:ext>
+            </a:extLst>
+          </p:cNvPr>
+          <p:cNvSpPr>
+            <a:spLocks noGrp="1"/>
+          </p:cNvSpPr>
+          <p:nvPr>
+            <p:ph type="title"/>
+          </p:nvPr>
+        </p:nvSpPr>
+        <p:spPr/>
+        <p:txBody>
+          <a:bodyPr/>
+          <a:lstStyle/>
+          <a:p>
+            <a:pPr algn="ctr"/>
+            <a:r>
+              <a:rPr lang="en-US" dirty="0"/>
+              <a:t>Passing arguments to decorator</a:t>
+            </a:r>
+            <a:endParaRPr lang="ru-RU" dirty="0"/>
+          </a:p>
+        </p:txBody>
+      </p:sp>
+      <p:sp>
+        <p:nvSpPr>
+          <p:cNvPr id="3" name="Объект 2">
+            <a:extLst>
+              <a:ext uri="{FF2B5EF4-FFF2-40B4-BE49-F238E27FC236}">
+                <a16:creationId xmlns:a16="http://schemas.microsoft.com/office/drawing/2014/main" id="{6CF2C342-D409-4E18-9C93-6F0C27558374}"/>
+              </a:ext>
+            </a:extLst>
+          </p:cNvPr>
+          <p:cNvSpPr>
+            <a:spLocks noGrp="1"/>
+          </p:cNvSpPr>
+          <p:nvPr>
+            <p:ph idx="1"/>
+          </p:nvPr>
+        </p:nvSpPr>
+        <p:spPr>
+          <a:xfrm>
+            <a:off x="838200" y="1825625"/>
+            <a:ext cx="8252791" cy="1467540"/>
+          </a:xfrm>
+        </p:spPr>
+        <p:txBody>
+          <a:bodyPr>
+            <a:normAutofit fontScale="85000" lnSpcReduction="20000"/>
+          </a:bodyPr>
+          <a:lstStyle/>
+          <a:p>
+            <a:r>
+              <a:rPr lang="en-US" dirty="0"/>
+              <a:t>You may pass any number of arguments to the decorator. There are two ways:</a:t>
+            </a:r>
+          </a:p>
+          <a:p>
+            <a:pPr lvl="1"/>
+            <a:r>
+              <a:rPr lang="en-US" dirty="0"/>
+              <a:t>Pass all </a:t>
+            </a:r>
+            <a:r>
+              <a:rPr lang="en-US" dirty="0" err="1"/>
+              <a:t>specificated</a:t>
+            </a:r>
+            <a:r>
+              <a:rPr lang="en-US" dirty="0"/>
+              <a:t> arguments  of the function to the returned function (But it decreases the universality of the decorator)</a:t>
+            </a:r>
+          </a:p>
+          <a:p>
+            <a:pPr lvl="1"/>
+            <a:r>
+              <a:rPr lang="en-US" dirty="0"/>
+              <a:t>Do it universal and pass arbitrary arguments and keys arguments</a:t>
+            </a:r>
+          </a:p>
+          <a:p>
+            <a:pPr marL="457200" lvl="1" indent="0">
+              <a:buNone/>
+            </a:pPr>
+            <a:endParaRPr lang="ru-RU" dirty="0"/>
+          </a:p>
+        </p:txBody>
+      </p:sp>
+      <p:pic>
+        <p:nvPicPr>
+          <p:cNvPr id="4" name="Рисунок 3">
+            <a:extLst>
+              <a:ext uri="{FF2B5EF4-FFF2-40B4-BE49-F238E27FC236}">
+                <a16:creationId xmlns:a16="http://schemas.microsoft.com/office/drawing/2014/main" id="{704473CB-461C-49C5-BB62-CAE1BCAE77CC}"/>
+              </a:ext>
+            </a:extLst>
+          </p:cNvPr>
+          <p:cNvPicPr>
+            <a:picLocks noChangeAspect="1"/>
+          </p:cNvPicPr>
+          <p:nvPr/>
+        </p:nvPicPr>
+        <p:blipFill>
+          <a:blip r:embed="rId2"/>
+          <a:stretch>
+            <a:fillRect/>
+          </a:stretch>
+        </p:blipFill>
+        <p:spPr>
+          <a:xfrm>
+            <a:off x="4498283" y="3300101"/>
+            <a:ext cx="2220775" cy="776590"/>
+          </a:xfrm>
+          <a:prstGeom prst="rect">
+            <a:avLst/>
+          </a:prstGeom>
+        </p:spPr>
+      </p:pic>
+      <p:pic>
+        <p:nvPicPr>
+          <p:cNvPr id="5" name="Рисунок 4">
+            <a:extLst>
+              <a:ext uri="{FF2B5EF4-FFF2-40B4-BE49-F238E27FC236}">
+                <a16:creationId xmlns:a16="http://schemas.microsoft.com/office/drawing/2014/main" id="{994AD303-6DD0-4B20-8FD2-39C22A9756FD}"/>
+              </a:ext>
+            </a:extLst>
+          </p:cNvPr>
+          <p:cNvPicPr>
+            <a:picLocks noChangeAspect="1"/>
+          </p:cNvPicPr>
+          <p:nvPr/>
+        </p:nvPicPr>
+        <p:blipFill>
+          <a:blip r:embed="rId3"/>
+          <a:stretch>
+            <a:fillRect/>
+          </a:stretch>
+        </p:blipFill>
+        <p:spPr>
+          <a:xfrm>
+            <a:off x="1077460" y="3943774"/>
+            <a:ext cx="2887732" cy="2847250"/>
+          </a:xfrm>
+          <a:prstGeom prst="rect">
+            <a:avLst/>
+          </a:prstGeom>
+        </p:spPr>
+      </p:pic>
+      <p:pic>
+        <p:nvPicPr>
+          <p:cNvPr id="6" name="Рисунок 5">
+            <a:extLst>
+              <a:ext uri="{FF2B5EF4-FFF2-40B4-BE49-F238E27FC236}">
+                <a16:creationId xmlns:a16="http://schemas.microsoft.com/office/drawing/2014/main" id="{1B264B89-514A-4C3E-910F-2CA734C04FEE}"/>
+              </a:ext>
+            </a:extLst>
+          </p:cNvPr>
+          <p:cNvPicPr>
+            <a:picLocks noChangeAspect="1"/>
+          </p:cNvPicPr>
+          <p:nvPr/>
+        </p:nvPicPr>
+        <p:blipFill>
+          <a:blip r:embed="rId4"/>
+          <a:stretch>
+            <a:fillRect/>
+          </a:stretch>
+        </p:blipFill>
+        <p:spPr>
+          <a:xfrm>
+            <a:off x="7413757" y="3973795"/>
+            <a:ext cx="3354468" cy="2817229"/>
+          </a:xfrm>
+          <a:prstGeom prst="rect">
+            <a:avLst/>
+          </a:prstGeom>
+        </p:spPr>
+      </p:pic>
+      <p:sp>
+        <p:nvSpPr>
+          <p:cNvPr id="8" name="Прямоугольник 7">
+            <a:extLst>
+              <a:ext uri="{FF2B5EF4-FFF2-40B4-BE49-F238E27FC236}">
+                <a16:creationId xmlns:a16="http://schemas.microsoft.com/office/drawing/2014/main" id="{1160204A-02C3-4F3A-B455-FB813FB9B99F}"/>
+              </a:ext>
+            </a:extLst>
+          </p:cNvPr>
+          <p:cNvSpPr/>
+          <p:nvPr/>
+        </p:nvSpPr>
+        <p:spPr>
+          <a:xfrm>
+            <a:off x="4498283" y="4440514"/>
+            <a:ext cx="2220775" cy="1251783"/>
+          </a:xfrm>
+          <a:prstGeom prst="rect">
+            <a:avLst/>
+          </a:prstGeom>
+          <a:noFill/>
+          <a:ln>
+            <a:solidFill>
+              <a:srgbClr val="FFC000"/>
+            </a:solidFill>
+          </a:ln>
+        </p:spPr>
+        <p:style>
+          <a:lnRef idx="2">
+            <a:schemeClr val="accent1">
+              <a:shade val="50000"/>
+            </a:schemeClr>
+          </a:lnRef>
+          <a:fillRef idx="1">
+            <a:schemeClr val="accent1"/>
+          </a:fillRef>
+          <a:effectRef idx="0">
+            <a:schemeClr val="accent1"/>
+          </a:effectRef>
+          <a:fontRef idx="minor">
+            <a:schemeClr val="lt1"/>
+          </a:fontRef>
+        </p:style>
+        <p:txBody>
+          <a:bodyPr rtlCol="0" anchor="ctr"/>
+          <a:lstStyle/>
+          <a:p>
+            <a:pPr algn="ctr"/>
+            <a:endParaRPr lang="ru-RU"/>
+          </a:p>
+        </p:txBody>
+      </p:sp>
+      <p:sp>
+        <p:nvSpPr>
+          <p:cNvPr id="7" name="TextBox 6">
+            <a:extLst>
+              <a:ext uri="{FF2B5EF4-FFF2-40B4-BE49-F238E27FC236}">
+                <a16:creationId xmlns:a16="http://schemas.microsoft.com/office/drawing/2014/main" id="{A490D809-2779-43E5-8092-CA391479E8A5}"/>
+              </a:ext>
+            </a:extLst>
+          </p:cNvPr>
+          <p:cNvSpPr txBox="1"/>
+          <p:nvPr/>
+        </p:nvSpPr>
+        <p:spPr>
+          <a:xfrm>
+            <a:off x="4498283" y="4491968"/>
+            <a:ext cx="2220775" cy="1200329"/>
+          </a:xfrm>
+          <a:prstGeom prst="rect">
+            <a:avLst/>
+          </a:prstGeom>
+          <a:noFill/>
+        </p:spPr>
+        <p:txBody>
+          <a:bodyPr wrap="square" rtlCol="0">
+            <a:spAutoFit/>
+          </a:bodyPr>
+          <a:lstStyle/>
+          <a:p>
+            <a:pPr algn="ctr"/>
+            <a:r>
+              <a:rPr lang="en-US" dirty="0"/>
+              <a:t>Note! We handle the return of the original function, so it may work as before</a:t>
+            </a:r>
+            <a:endParaRPr lang="ru-RU" dirty="0"/>
+          </a:p>
+        </p:txBody>
+      </p:sp>
+    </p:spTree>
+    <p:extLst>
+      <p:ext uri="{BB962C8B-B14F-4D97-AF65-F5344CB8AC3E}">
+        <p14:creationId xmlns:p14="http://schemas.microsoft.com/office/powerpoint/2010/main" val="2730259520"/>
+      </p:ext>
+    </p:extLst>
+  </p:cSld>
+  <p:clrMapOvr>
+    <a:masterClrMapping/>
+  </p:clrMapOvr>
+</p:sld>
+</file>
+
+<file path=ppt/slides/slide51.xml><?xml version="1.0" encoding="utf-8"?>
+<p:sld xmlns:a="http://schemas.openxmlformats.org/drawingml/2006/main" xmlns:r="http://schemas.openxmlformats.org/officeDocument/2006/relationships" xmlns:p="http://schemas.openxmlformats.org/presentationml/2006/main">
+  <p:cSld>
+    <p:spTree>
+      <p:nvGrpSpPr>
+        <p:cNvPr id="1" name=""/>
+        <p:cNvGrpSpPr/>
+        <p:nvPr/>
+      </p:nvGrpSpPr>
+      <p:grpSpPr>
+        <a:xfrm>
+          <a:off x="0" y="0"/>
+          <a:ext cx="0" cy="0"/>
+          <a:chOff x="0" y="0"/>
+          <a:chExt cx="0" cy="0"/>
+        </a:xfrm>
+      </p:grpSpPr>
+      <p:sp>
+        <p:nvSpPr>
           <p:cNvPr id="3" name="Содержимое 2"/>
           <p:cNvSpPr>
             <a:spLocks noGrp="1"/>
@@ -15702,10 +17341,14 @@
         </p:spPr>
         <p:txBody>
           <a:bodyPr>
-            <a:normAutofit/>
+            <a:normAutofit lnSpcReduction="10000"/>
           </a:bodyPr>
           <a:lstStyle/>
           <a:p>
+            <a:pPr marL="514350" indent="-514350">
+              <a:buFont typeface="+mj-lt"/>
+              <a:buAutoNum type="arabicPeriod"/>
+            </a:pPr>
             <a:r>
               <a:rPr lang="en-US" dirty="0"/>
               <a:t>Write a function that returns a Average of arguments</a:t>
@@ -15719,6 +17362,66 @@
             </a:r>
           </a:p>
           <a:p>
+            <a:pPr marL="514350" indent="-514350">
+              <a:buFont typeface="+mj-lt"/>
+              <a:buAutoNum type="arabicPeriod"/>
+            </a:pPr>
+            <a:r>
+              <a:rPr lang="en-US" dirty="0"/>
+              <a:t>Write a decorator that prints:</a:t>
+            </a:r>
+          </a:p>
+          <a:p>
+            <a:pPr lvl="1"/>
+            <a:r>
+              <a:rPr lang="en-US" dirty="0"/>
+              <a:t>Arguments of function – </a:t>
+            </a:r>
+            <a:r>
+              <a:rPr lang="en-US" dirty="0" err="1"/>
+              <a:t>args</a:t>
+            </a:r>
+            <a:r>
+              <a:rPr lang="en-US" dirty="0"/>
+              <a:t> and </a:t>
+            </a:r>
+            <a:r>
+              <a:rPr lang="en-US" dirty="0" err="1"/>
+              <a:t>kwargs</a:t>
+            </a:r>
+            <a:endParaRPr lang="en-US" dirty="0"/>
+          </a:p>
+          <a:p>
+            <a:pPr lvl="1"/>
+            <a:r>
+              <a:rPr lang="en-US" dirty="0"/>
+              <a:t>Return from function</a:t>
+            </a:r>
+          </a:p>
+          <a:p>
+            <a:pPr lvl="1"/>
+            <a:r>
+              <a:rPr lang="en-US" dirty="0"/>
+              <a:t>Use it with </a:t>
+            </a:r>
+            <a:r>
+              <a:rPr lang="en-US" dirty="0">
+                <a:solidFill>
+                  <a:srgbClr val="FF0000"/>
+                </a:solidFill>
+              </a:rPr>
+              <a:t>@</a:t>
+            </a:r>
+            <a:r>
+              <a:rPr lang="en-US" dirty="0"/>
+              <a:t> </a:t>
+            </a:r>
+          </a:p>
+          <a:p>
+            <a:pPr marL="514350" indent="-514350">
+              <a:buFont typeface="+mj-lt"/>
+              <a:buAutoNum type="arabicPeriod"/>
+            </a:pPr>
             <a:r>
               <a:rPr lang="en-US" dirty="0"/>
               <a:t>Write a Fibonacci number function</a:t>
@@ -15785,12 +17488,6 @@
             <a:r>
               <a:rPr lang="en-US" dirty="0"/>
               <a:t>Example – 2 -&gt; 1 ; 4 -&gt; 2;  7 -&gt; 8</a:t>
-            </a:r>
-          </a:p>
-          <a:p>
-            <a:r>
-              <a:rPr lang="en-US" dirty="0"/>
-              <a:t>You skeleton lord. </a:t>
             </a:r>
           </a:p>
           <a:p>
@@ -15921,7 +17618,7 @@
 </p:sld>
 </file>
 
-<file path=ppt/slides/slide5.xml><?xml version="1.0" encoding="utf-8"?>
+<file path=ppt/slides/slide52.xml><?xml version="1.0" encoding="utf-8"?>
 <p:sld xmlns:a="http://schemas.openxmlformats.org/drawingml/2006/main" xmlns:r="http://schemas.openxmlformats.org/officeDocument/2006/relationships" xmlns:p="http://schemas.openxmlformats.org/presentationml/2006/main">
   <p:cSld>
     <p:spTree>
@@ -15940,64 +17637,306 @@
       </p:grpSpPr>
       <p:sp>
         <p:nvSpPr>
-          <p:cNvPr id="2" name="Заголовок 1"/>
+          <p:cNvPr id="3" name="Содержимое 2"/>
           <p:cNvSpPr>
             <a:spLocks noGrp="1"/>
           </p:cNvSpPr>
           <p:nvPr>
-            <p:ph type="title"/>
+            <p:ph idx="1"/>
           </p:nvPr>
         </p:nvSpPr>
-        <p:spPr/>
+        <p:spPr>
+          <a:xfrm>
+            <a:off x="914400" y="1499616"/>
+            <a:ext cx="10439400" cy="5358384"/>
+          </a:xfrm>
+        </p:spPr>
         <p:txBody>
-          <a:bodyPr/>
+          <a:bodyPr>
+            <a:normAutofit fontScale="70000" lnSpcReduction="20000"/>
+          </a:bodyPr>
           <a:lstStyle/>
           <a:p>
-            <a:pPr algn="ctr"/>
-            <a:r>
-              <a:rPr lang="en-US" b="1" dirty="0"/>
-              <a:t>Transform Data Type</a:t>
-            </a:r>
-            <a:endParaRPr lang="ru-RU" b="1" dirty="0"/>
+            <a:r>
+              <a:rPr lang="en-US" dirty="0"/>
+              <a:t>You are skeleton lord. And you need an army. Create a program with a function that creates a skeleton with given </a:t>
+            </a:r>
+            <a:r>
+              <a:rPr lang="en-US" dirty="0" err="1"/>
+              <a:t>args</a:t>
+            </a:r>
+            <a:r>
+              <a:rPr lang="en-US" dirty="0"/>
+              <a:t>. Also you need a system to manage them: add, delete, find and send to defeat hero.</a:t>
+            </a:r>
+          </a:p>
+          <a:p>
+            <a:pPr lvl="1"/>
+            <a:r>
+              <a:rPr lang="en-US" dirty="0"/>
+              <a:t>You have an army: list</a:t>
+            </a:r>
+          </a:p>
+          <a:p>
+            <a:pPr lvl="1"/>
+            <a:r>
+              <a:rPr lang="en-US" dirty="0"/>
+              <a:t>Every skeleton has:</a:t>
+            </a:r>
+          </a:p>
+          <a:p>
+            <a:pPr lvl="2"/>
+            <a:r>
+              <a:rPr lang="en-US" dirty="0"/>
+              <a:t>name: string</a:t>
+            </a:r>
+          </a:p>
+          <a:p>
+            <a:pPr lvl="2"/>
+            <a:r>
+              <a:rPr lang="en-US" dirty="0"/>
+              <a:t>id: int – unique  number </a:t>
+            </a:r>
+          </a:p>
+          <a:p>
+            <a:pPr lvl="2"/>
+            <a:r>
+              <a:rPr lang="en-US" dirty="0"/>
+              <a:t>health: int</a:t>
+            </a:r>
+          </a:p>
+          <a:p>
+            <a:pPr lvl="2"/>
+            <a:r>
+              <a:rPr lang="en-US" dirty="0"/>
+              <a:t>damage: int</a:t>
+            </a:r>
+          </a:p>
+          <a:p>
+            <a:pPr lvl="1"/>
+            <a:r>
+              <a:rPr lang="en-US" dirty="0"/>
+              <a:t>You may provide all characteristics </a:t>
+            </a:r>
+            <a:r>
+              <a:rPr lang="en-US" dirty="0" err="1"/>
+              <a:t>ecxept</a:t>
+            </a:r>
+            <a:r>
+              <a:rPr lang="en-US" dirty="0"/>
+              <a:t> id, but required always the only name. Other defaults it is health – 20 , damage – 10. Manage id as you want</a:t>
+            </a:r>
+          </a:p>
+          <a:p>
+            <a:pPr lvl="1"/>
+            <a:r>
+              <a:rPr lang="en-US" dirty="0"/>
+              <a:t>The hero will be provided</a:t>
+            </a:r>
+          </a:p>
+          <a:p>
+            <a:pPr lvl="1"/>
+            <a:r>
+              <a:rPr lang="en-US" dirty="0"/>
+              <a:t>All actions must be printed</a:t>
+            </a:r>
+          </a:p>
+          <a:p>
+            <a:pPr lvl="1"/>
+            <a:r>
+              <a:rPr lang="en-US" dirty="0"/>
+              <a:t>All actions are taken from the input. Name command as you want</a:t>
+            </a:r>
+          </a:p>
+          <a:p>
+            <a:pPr lvl="1"/>
+            <a:r>
+              <a:rPr lang="en-US" dirty="0"/>
+              <a:t>Before the program starts, show a user all commands </a:t>
+            </a:r>
+          </a:p>
+          <a:p>
+            <a:pPr lvl="1"/>
+            <a:r>
+              <a:rPr lang="en-US" dirty="0"/>
+              <a:t>Add – adds skeleton to the army </a:t>
+            </a:r>
+          </a:p>
+          <a:p>
+            <a:pPr lvl="1"/>
+            <a:r>
+              <a:rPr lang="en-US" dirty="0"/>
+              <a:t>Find – return skeleton by id from your army, but not delete them. Must return 0 if skeleton not found</a:t>
+            </a:r>
+          </a:p>
+          <a:p>
+            <a:pPr lvl="1"/>
+            <a:r>
+              <a:rPr lang="en-US" dirty="0"/>
+              <a:t>Delete – deletes skeleton by id from your army. Must return 1 if success or 0 if failed</a:t>
+            </a:r>
+          </a:p>
+          <a:p>
+            <a:pPr lvl="1"/>
+            <a:r>
+              <a:rPr lang="en-US" dirty="0"/>
+              <a:t>Send to defeat – takes skeleton, then skeleton and hero are fighting. </a:t>
+            </a:r>
+          </a:p>
+          <a:p>
+            <a:pPr lvl="2"/>
+            <a:r>
+              <a:rPr lang="en-US" dirty="0"/>
+              <a:t>They fights while one of them doesn’t die.  Every cycle the hero hit the skeleton when the skeleton hit the hero. </a:t>
+            </a:r>
+          </a:p>
+          <a:p>
+            <a:pPr lvl="2"/>
+            <a:r>
+              <a:rPr lang="en-US" dirty="0"/>
+              <a:t>If skeleton health &lt;= 0 print ‘SKELETON_NAME defeated’ and delete him from the army. </a:t>
+            </a:r>
+          </a:p>
+          <a:p>
+            <a:pPr lvl="2"/>
+            <a:r>
+              <a:rPr lang="en-US" dirty="0"/>
+              <a:t>If hero health &lt;= 0 , program prints ‘Hero defeated’ and program out. </a:t>
+            </a:r>
+          </a:p>
+          <a:p>
+            <a:pPr lvl="2"/>
+            <a:r>
+              <a:rPr lang="en-US" dirty="0"/>
+              <a:t>Statuses of hero and skeleton must printed</a:t>
+            </a:r>
+          </a:p>
+          <a:p>
+            <a:endParaRPr lang="en-US" dirty="0"/>
           </a:p>
         </p:txBody>
       </p:sp>
-      <p:pic>
-        <p:nvPicPr>
-          <p:cNvPr id="3074" name="Picture 2"/>
-          <p:cNvPicPr>
-            <a:picLocks noGrp="1" noChangeAspect="1" noChangeArrowheads="1"/>
-          </p:cNvPicPr>
-          <p:nvPr>
-            <p:ph idx="1"/>
-          </p:nvPr>
-        </p:nvPicPr>
-        <p:blipFill>
-          <a:blip r:embed="rId2"/>
-          <a:srcRect/>
-          <a:stretch>
-            <a:fillRect/>
-          </a:stretch>
-        </p:blipFill>
-        <p:spPr bwMode="auto">
-          <a:xfrm>
-            <a:off x="2615184" y="1437139"/>
-            <a:ext cx="6967728" cy="4932418"/>
-          </a:xfrm>
-          <a:prstGeom prst="rect">
-            <a:avLst/>
-          </a:prstGeom>
-          <a:noFill/>
-          <a:ln w="9525">
+      <p:grpSp>
+        <p:nvGrpSpPr>
+          <p:cNvPr id="2" name="Группа 3"/>
+          <p:cNvGrpSpPr/>
+          <p:nvPr/>
+        </p:nvGrpSpPr>
+        <p:grpSpPr>
+          <a:xfrm>
+            <a:off x="838200" y="365125"/>
+            <a:ext cx="10515600" cy="1325563"/>
+            <a:chOff x="838200" y="365125"/>
+            <a:chExt cx="10515600" cy="1325563"/>
+          </a:xfrm>
+        </p:grpSpPr>
+        <p:sp>
+          <p:nvSpPr>
+            <p:cNvPr id="5" name="Заголовок 1"/>
+            <p:cNvSpPr txBox="1">
+              <a:spLocks/>
+            </p:cNvSpPr>
+            <p:nvPr/>
+          </p:nvSpPr>
+          <p:spPr>
+            <a:xfrm>
+              <a:off x="838200" y="365125"/>
+              <a:ext cx="10515600" cy="1325563"/>
+            </a:xfrm>
+            <a:prstGeom prst="rect">
+              <a:avLst/>
+            </a:prstGeom>
+          </p:spPr>
+          <p:txBody>
+            <a:bodyPr vert="horz" lIns="91440" tIns="45720" rIns="91440" bIns="45720" rtlCol="0" anchor="ctr">
+              <a:normAutofit/>
+            </a:bodyPr>
+            <a:lstStyle/>
+            <a:p>
+              <a:pPr marL="0" marR="0" lvl="0" indent="0" algn="ctr" defTabSz="914400" rtl="0" eaLnBrk="1" fontAlgn="auto" latinLnBrk="0" hangingPunct="1">
+                <a:lnSpc>
+                  <a:spcPct val="90000"/>
+                </a:lnSpc>
+                <a:spcBef>
+                  <a:spcPct val="0"/>
+                </a:spcBef>
+                <a:spcAft>
+                  <a:spcPts val="0"/>
+                </a:spcAft>
+                <a:buClrTx/>
+                <a:buSzTx/>
+                <a:buFontTx/>
+                <a:buNone/>
+                <a:tabLst/>
+                <a:defRPr/>
+              </a:pPr>
+              <a:r>
+                <a:rPr kumimoji="0" lang="en-US" sz="4400" b="1" i="0" u="none" strike="noStrike" kern="1200" cap="none" spc="0" normalizeH="0" baseline="0" noProof="0" dirty="0">
+                  <a:ln>
+                    <a:noFill/>
+                  </a:ln>
+                  <a:solidFill>
+                    <a:schemeClr val="tx1"/>
+                  </a:solidFill>
+                  <a:effectLst/>
+                  <a:uLnTx/>
+                  <a:uFillTx/>
+                  <a:latin typeface="+mj-lt"/>
+                  <a:ea typeface="+mj-ea"/>
+                  <a:cs typeface="+mj-cs"/>
+                </a:rPr>
+                <a:t>Tasks</a:t>
+              </a:r>
+              <a:endParaRPr kumimoji="0" lang="ru-RU" sz="4400" b="1" i="0" u="none" strike="noStrike" kern="1200" cap="none" spc="0" normalizeH="0" baseline="0" noProof="0" dirty="0">
+                <a:ln>
+                  <a:noFill/>
+                </a:ln>
+                <a:solidFill>
+                  <a:schemeClr val="tx1"/>
+                </a:solidFill>
+                <a:effectLst/>
+                <a:uLnTx/>
+                <a:uFillTx/>
+                <a:latin typeface="+mj-lt"/>
+                <a:ea typeface="+mj-ea"/>
+                <a:cs typeface="+mj-cs"/>
+              </a:endParaRPr>
+            </a:p>
+          </p:txBody>
+        </p:sp>
+        <p:pic>
+          <p:nvPicPr>
+            <p:cNvPr id="6" name="Picture 2" descr="Pin on Бесплатные иконки"/>
+            <p:cNvPicPr>
+              <a:picLocks noChangeAspect="1" noChangeArrowheads="1"/>
+            </p:cNvPicPr>
+            <p:nvPr/>
+          </p:nvPicPr>
+          <p:blipFill>
+            <a:blip r:embed="rId2" cstate="print"/>
+            <a:srcRect/>
+            <a:stretch>
+              <a:fillRect/>
+            </a:stretch>
+          </p:blipFill>
+          <p:spPr bwMode="auto">
+            <a:xfrm>
+              <a:off x="4672711" y="603504"/>
+              <a:ext cx="795401" cy="795401"/>
+            </a:xfrm>
+            <a:prstGeom prst="rect">
+              <a:avLst/>
+            </a:prstGeom>
             <a:noFill/>
-            <a:miter lim="800000"/>
-            <a:headEnd/>
-            <a:tailEnd/>
-          </a:ln>
-          <a:effectLst/>
-        </p:spPr>
-      </p:pic>
+          </p:spPr>
+        </p:pic>
+      </p:grpSp>
     </p:spTree>
+    <p:extLst>
+      <p:ext uri="{BB962C8B-B14F-4D97-AF65-F5344CB8AC3E}">
+        <p14:creationId xmlns:p14="http://schemas.microsoft.com/office/powerpoint/2010/main" val="3382887928"/>
+      </p:ext>
+    </p:extLst>
   </p:cSld>
   <p:clrMapOvr>
     <a:masterClrMapping/>

</xml_diff>

<commit_message>
feat: add tuples and recursion blocks
</commit_message>
<xml_diff>
--- a/python 101/python_101.pptx
+++ b/python 101/python_101.pptx
@@ -41,22 +41,25 @@
     <p:sldId id="291" r:id="rId35"/>
     <p:sldId id="285" r:id="rId36"/>
     <p:sldId id="293" r:id="rId37"/>
-    <p:sldId id="294" r:id="rId38"/>
-    <p:sldId id="297" r:id="rId39"/>
-    <p:sldId id="301" r:id="rId40"/>
-    <p:sldId id="300" r:id="rId41"/>
-    <p:sldId id="302" r:id="rId42"/>
-    <p:sldId id="303" r:id="rId43"/>
-    <p:sldId id="305" r:id="rId44"/>
-    <p:sldId id="292" r:id="rId45"/>
-    <p:sldId id="295" r:id="rId46"/>
-    <p:sldId id="296" r:id="rId47"/>
-    <p:sldId id="299" r:id="rId48"/>
-    <p:sldId id="306" r:id="rId49"/>
-    <p:sldId id="307" r:id="rId50"/>
-    <p:sldId id="308" r:id="rId51"/>
-    <p:sldId id="298" r:id="rId52"/>
-    <p:sldId id="309" r:id="rId53"/>
+    <p:sldId id="310" r:id="rId38"/>
+    <p:sldId id="294" r:id="rId39"/>
+    <p:sldId id="297" r:id="rId40"/>
+    <p:sldId id="301" r:id="rId41"/>
+    <p:sldId id="300" r:id="rId42"/>
+    <p:sldId id="302" r:id="rId43"/>
+    <p:sldId id="303" r:id="rId44"/>
+    <p:sldId id="305" r:id="rId45"/>
+    <p:sldId id="292" r:id="rId46"/>
+    <p:sldId id="295" r:id="rId47"/>
+    <p:sldId id="296" r:id="rId48"/>
+    <p:sldId id="299" r:id="rId49"/>
+    <p:sldId id="306" r:id="rId50"/>
+    <p:sldId id="307" r:id="rId51"/>
+    <p:sldId id="308" r:id="rId52"/>
+    <p:sldId id="312" r:id="rId53"/>
+    <p:sldId id="298" r:id="rId54"/>
+    <p:sldId id="309" r:id="rId55"/>
+    <p:sldId id="311" r:id="rId56"/>
   </p:sldIdLst>
   <p:sldSz cx="12192000" cy="6858000"/>
   <p:notesSz cx="6858000" cy="9144000"/>
@@ -12610,6 +12613,265 @@
       </p:grpSpPr>
       <p:sp>
         <p:nvSpPr>
+          <p:cNvPr id="4" name="Прямоугольник 3">
+            <a:extLst>
+              <a:ext uri="{FF2B5EF4-FFF2-40B4-BE49-F238E27FC236}">
+                <a16:creationId xmlns:a16="http://schemas.microsoft.com/office/drawing/2014/main" id="{B98737B7-18F5-4608-82CE-E128EDDB32AA}"/>
+              </a:ext>
+            </a:extLst>
+          </p:cNvPr>
+          <p:cNvSpPr/>
+          <p:nvPr/>
+        </p:nvSpPr>
+        <p:spPr>
+          <a:xfrm>
+            <a:off x="5446643" y="967409"/>
+            <a:ext cx="1364974" cy="357808"/>
+          </a:xfrm>
+          <a:prstGeom prst="rect">
+            <a:avLst/>
+          </a:prstGeom>
+          <a:solidFill>
+            <a:srgbClr val="65F8FF"/>
+          </a:solidFill>
+          <a:ln>
+            <a:solidFill>
+              <a:srgbClr val="65F8FF"/>
+            </a:solidFill>
+          </a:ln>
+        </p:spPr>
+        <p:style>
+          <a:lnRef idx="2">
+            <a:schemeClr val="accent1">
+              <a:shade val="50000"/>
+            </a:schemeClr>
+          </a:lnRef>
+          <a:fillRef idx="1">
+            <a:schemeClr val="accent1"/>
+          </a:fillRef>
+          <a:effectRef idx="0">
+            <a:schemeClr val="accent1"/>
+          </a:effectRef>
+          <a:fontRef idx="minor">
+            <a:schemeClr val="lt1"/>
+          </a:fontRef>
+        </p:style>
+        <p:txBody>
+          <a:bodyPr rtlCol="0" anchor="ctr"/>
+          <a:lstStyle/>
+          <a:p>
+            <a:pPr algn="ctr"/>
+            <a:endParaRPr lang="ru-RU"/>
+          </a:p>
+        </p:txBody>
+      </p:sp>
+      <p:sp>
+        <p:nvSpPr>
+          <p:cNvPr id="2" name="Заголовок 1">
+            <a:extLst>
+              <a:ext uri="{FF2B5EF4-FFF2-40B4-BE49-F238E27FC236}">
+                <a16:creationId xmlns:a16="http://schemas.microsoft.com/office/drawing/2014/main" id="{D9409785-DA55-4C19-B0DE-2CFAB2B0670F}"/>
+              </a:ext>
+            </a:extLst>
+          </p:cNvPr>
+          <p:cNvSpPr>
+            <a:spLocks noGrp="1"/>
+          </p:cNvSpPr>
+          <p:nvPr>
+            <p:ph type="title"/>
+          </p:nvPr>
+        </p:nvSpPr>
+        <p:spPr/>
+        <p:txBody>
+          <a:bodyPr/>
+          <a:lstStyle/>
+          <a:p>
+            <a:pPr algn="ctr"/>
+            <a:r>
+              <a:rPr lang="en-US" dirty="0"/>
+              <a:t>Tuple</a:t>
+            </a:r>
+            <a:endParaRPr lang="ru-RU" dirty="0"/>
+          </a:p>
+        </p:txBody>
+      </p:sp>
+      <p:sp>
+        <p:nvSpPr>
+          <p:cNvPr id="3" name="Объект 2">
+            <a:extLst>
+              <a:ext uri="{FF2B5EF4-FFF2-40B4-BE49-F238E27FC236}">
+                <a16:creationId xmlns:a16="http://schemas.microsoft.com/office/drawing/2014/main" id="{20ECA7D5-2964-48AA-9FA7-C2D6AFF5E08A}"/>
+              </a:ext>
+            </a:extLst>
+          </p:cNvPr>
+          <p:cNvSpPr>
+            <a:spLocks noGrp="1"/>
+          </p:cNvSpPr>
+          <p:nvPr>
+            <p:ph idx="1"/>
+          </p:nvPr>
+        </p:nvSpPr>
+        <p:spPr>
+          <a:xfrm>
+            <a:off x="838200" y="1825624"/>
+            <a:ext cx="5973417" cy="4389645"/>
+          </a:xfrm>
+        </p:spPr>
+        <p:txBody>
+          <a:bodyPr>
+            <a:normAutofit fontScale="77500" lnSpcReduction="20000"/>
+          </a:bodyPr>
+          <a:lstStyle/>
+          <a:p>
+            <a:r>
+              <a:rPr lang="en-US" dirty="0"/>
+              <a:t>A tuple is a collection which is ordered and </a:t>
+            </a:r>
+            <a:r>
+              <a:rPr lang="en-US" b="1" dirty="0"/>
+              <a:t>unchangeable</a:t>
+            </a:r>
+            <a:r>
+              <a:rPr lang="en-US" dirty="0"/>
+              <a:t>, duplicates is allow.</a:t>
+            </a:r>
+          </a:p>
+          <a:p>
+            <a:r>
+              <a:rPr lang="en-US" dirty="0"/>
+              <a:t>A tuple similar to a list, but unchangeable. In this way to change a tuple, we may convert it into the list, change and then create a new tuple. </a:t>
+            </a:r>
+            <a:endParaRPr lang="ru-RU" dirty="0"/>
+          </a:p>
+          <a:p>
+            <a:r>
+              <a:rPr lang="en-US" dirty="0"/>
+              <a:t>Loop and access to items similar to list.</a:t>
+            </a:r>
+          </a:p>
+          <a:p>
+            <a:r>
+              <a:rPr lang="en-US" dirty="0"/>
+              <a:t>The Tuple has a unique ability – </a:t>
+            </a:r>
+            <a:r>
+              <a:rPr lang="en-US" dirty="0">
+                <a:solidFill>
+                  <a:srgbClr val="FF0000"/>
+                </a:solidFill>
+              </a:rPr>
+              <a:t>unpack</a:t>
+            </a:r>
+            <a:r>
+              <a:rPr lang="en-US" dirty="0"/>
+              <a:t>. That allows us unpack a tuple into different variables</a:t>
+            </a:r>
+          </a:p>
+          <a:p>
+            <a:r>
+              <a:rPr lang="en-US" dirty="0"/>
+              <a:t>If we don’t know how many arguments – use </a:t>
+            </a:r>
+            <a:r>
+              <a:rPr lang="en-US" dirty="0">
+                <a:solidFill>
+                  <a:srgbClr val="FF0000"/>
+                </a:solidFill>
+              </a:rPr>
+              <a:t>*</a:t>
+            </a:r>
+            <a:r>
+              <a:rPr lang="en-US" dirty="0" err="1">
+                <a:solidFill>
+                  <a:srgbClr val="FF0000"/>
+                </a:solidFill>
+              </a:rPr>
+              <a:t>args</a:t>
+            </a:r>
+            <a:r>
+              <a:rPr lang="en-US" dirty="0">
+                <a:solidFill>
+                  <a:srgbClr val="FF0000"/>
+                </a:solidFill>
+              </a:rPr>
+              <a:t> </a:t>
+            </a:r>
+            <a:r>
+              <a:rPr lang="en-US" dirty="0"/>
+              <a:t>to catch them in the list</a:t>
+            </a:r>
+          </a:p>
+          <a:p>
+            <a:r>
+              <a:rPr lang="en-US" dirty="0"/>
+              <a:t>Also, a tuple has differences to list in join – you may concatenate them, its returns a new tuple. Also, we may double tuple items just multiple them, as example before it returns a new tuple </a:t>
+            </a:r>
+            <a:endParaRPr lang="ru-RU" dirty="0"/>
+          </a:p>
+        </p:txBody>
+      </p:sp>
+      <p:pic>
+        <p:nvPicPr>
+          <p:cNvPr id="5" name="Рисунок 4">
+            <a:extLst>
+              <a:ext uri="{FF2B5EF4-FFF2-40B4-BE49-F238E27FC236}">
+                <a16:creationId xmlns:a16="http://schemas.microsoft.com/office/drawing/2014/main" id="{6389C0F3-5C47-4C16-A693-A03FDAEF3C1E}"/>
+              </a:ext>
+            </a:extLst>
+          </p:cNvPr>
+          <p:cNvPicPr>
+            <a:picLocks noChangeAspect="1"/>
+          </p:cNvPicPr>
+          <p:nvPr/>
+        </p:nvPicPr>
+        <p:blipFill>
+          <a:blip r:embed="rId2"/>
+          <a:stretch>
+            <a:fillRect/>
+          </a:stretch>
+        </p:blipFill>
+        <p:spPr>
+          <a:xfrm>
+            <a:off x="6811617" y="1950692"/>
+            <a:ext cx="5206838" cy="3543921"/>
+          </a:xfrm>
+          <a:prstGeom prst="rect">
+            <a:avLst/>
+          </a:prstGeom>
+        </p:spPr>
+      </p:pic>
+    </p:spTree>
+    <p:extLst>
+      <p:ext uri="{BB962C8B-B14F-4D97-AF65-F5344CB8AC3E}">
+        <p14:creationId xmlns:p14="http://schemas.microsoft.com/office/powerpoint/2010/main" val="2978970547"/>
+      </p:ext>
+    </p:extLst>
+  </p:cSld>
+  <p:clrMapOvr>
+    <a:masterClrMapping/>
+  </p:clrMapOvr>
+</p:sld>
+</file>
+
+<file path=ppt/slides/slide38.xml><?xml version="1.0" encoding="utf-8"?>
+<p:sld xmlns:a="http://schemas.openxmlformats.org/drawingml/2006/main" xmlns:r="http://schemas.openxmlformats.org/officeDocument/2006/relationships" xmlns:p="http://schemas.openxmlformats.org/presentationml/2006/main">
+  <p:cSld>
+    <p:spTree>
+      <p:nvGrpSpPr>
+        <p:cNvPr id="1" name=""/>
+        <p:cNvGrpSpPr/>
+        <p:nvPr/>
+      </p:nvGrpSpPr>
+      <p:grpSpPr>
+        <a:xfrm>
+          <a:off x="0" y="0"/>
+          <a:ext cx="0" cy="0"/>
+          <a:chOff x="0" y="0"/>
+          <a:chExt cx="0" cy="0"/>
+        </a:xfrm>
+      </p:grpSpPr>
+      <p:sp>
+        <p:nvSpPr>
           <p:cNvPr id="2" name="Заголовок 1"/>
           <p:cNvSpPr>
             <a:spLocks noGrp="1"/>
@@ -12649,7 +12911,7 @@
 </p:sld>
 </file>
 
-<file path=ppt/slides/slide38.xml><?xml version="1.0" encoding="utf-8"?>
+<file path=ppt/slides/slide39.xml><?xml version="1.0" encoding="utf-8"?>
 <p:sld xmlns:a="http://schemas.openxmlformats.org/drawingml/2006/main" xmlns:r="http://schemas.openxmlformats.org/officeDocument/2006/relationships" xmlns:p="http://schemas.openxmlformats.org/presentationml/2006/main">
   <p:cSld>
     <p:spTree>
@@ -12885,325 +13147,6 @@
         </p:spPr>
       </p:pic>
     </p:spTree>
-  </p:cSld>
-  <p:clrMapOvr>
-    <a:masterClrMapping/>
-  </p:clrMapOvr>
-</p:sld>
-</file>
-
-<file path=ppt/slides/slide39.xml><?xml version="1.0" encoding="utf-8"?>
-<p:sld xmlns:a="http://schemas.openxmlformats.org/drawingml/2006/main" xmlns:r="http://schemas.openxmlformats.org/officeDocument/2006/relationships" xmlns:p="http://schemas.openxmlformats.org/presentationml/2006/main">
-  <p:cSld>
-    <p:spTree>
-      <p:nvGrpSpPr>
-        <p:cNvPr id="1" name=""/>
-        <p:cNvGrpSpPr/>
-        <p:nvPr/>
-      </p:nvGrpSpPr>
-      <p:grpSpPr>
-        <a:xfrm>
-          <a:off x="0" y="0"/>
-          <a:ext cx="0" cy="0"/>
-          <a:chOff x="0" y="0"/>
-          <a:chExt cx="0" cy="0"/>
-        </a:xfrm>
-      </p:grpSpPr>
-      <p:sp>
-        <p:nvSpPr>
-          <p:cNvPr id="2" name="Заголовок 1">
-            <a:extLst>
-              <a:ext uri="{FF2B5EF4-FFF2-40B4-BE49-F238E27FC236}">
-                <a16:creationId xmlns:a16="http://schemas.microsoft.com/office/drawing/2014/main" id="{DD5F6D06-4788-4EA8-82B0-0155C312B5BE}"/>
-              </a:ext>
-            </a:extLst>
-          </p:cNvPr>
-          <p:cNvSpPr>
-            <a:spLocks noGrp="1"/>
-          </p:cNvSpPr>
-          <p:nvPr>
-            <p:ph type="title"/>
-          </p:nvPr>
-        </p:nvSpPr>
-        <p:spPr/>
-        <p:txBody>
-          <a:bodyPr/>
-          <a:lstStyle/>
-          <a:p>
-            <a:pPr algn="ctr"/>
-            <a:r>
-              <a:rPr lang="en-US" dirty="0"/>
-              <a:t>Create a </a:t>
-            </a:r>
-            <a:r>
-              <a:rPr lang="en-US" dirty="0" err="1"/>
-              <a:t>dict</a:t>
-            </a:r>
-            <a:endParaRPr lang="ru-RU" dirty="0"/>
-          </a:p>
-        </p:txBody>
-      </p:sp>
-      <p:sp>
-        <p:nvSpPr>
-          <p:cNvPr id="3" name="Объект 2">
-            <a:extLst>
-              <a:ext uri="{FF2B5EF4-FFF2-40B4-BE49-F238E27FC236}">
-                <a16:creationId xmlns:a16="http://schemas.microsoft.com/office/drawing/2014/main" id="{C127DC5E-D7C1-4597-81DD-5F308250F84D}"/>
-              </a:ext>
-            </a:extLst>
-          </p:cNvPr>
-          <p:cNvSpPr>
-            <a:spLocks noGrp="1"/>
-          </p:cNvSpPr>
-          <p:nvPr>
-            <p:ph idx="1"/>
-          </p:nvPr>
-        </p:nvSpPr>
-        <p:spPr>
-          <a:xfrm>
-            <a:off x="838200" y="1825625"/>
-            <a:ext cx="4621696" cy="4893227"/>
-          </a:xfrm>
-        </p:spPr>
-        <p:txBody>
-          <a:bodyPr>
-            <a:normAutofit fontScale="92500" lnSpcReduction="20000"/>
-          </a:bodyPr>
-          <a:lstStyle/>
-          <a:p>
-            <a:r>
-              <a:rPr lang="en-US" dirty="0"/>
-              <a:t>To create a </a:t>
-            </a:r>
-            <a:r>
-              <a:rPr lang="en-US" dirty="0" err="1">
-                <a:solidFill>
-                  <a:srgbClr val="FF0000"/>
-                </a:solidFill>
-              </a:rPr>
-              <a:t>dict</a:t>
-            </a:r>
-            <a:r>
-              <a:rPr lang="en-US" dirty="0"/>
-              <a:t> you may use a common syntax</a:t>
-            </a:r>
-          </a:p>
-          <a:p>
-            <a:endParaRPr lang="en-US" dirty="0"/>
-          </a:p>
-          <a:p>
-            <a:r>
-              <a:rPr lang="en-US" dirty="0"/>
-              <a:t>Create with </a:t>
-            </a:r>
-            <a:r>
-              <a:rPr lang="en-US" dirty="0" err="1">
-                <a:solidFill>
-                  <a:srgbClr val="FF0000"/>
-                </a:solidFill>
-              </a:rPr>
-              <a:t>dict</a:t>
-            </a:r>
-            <a:r>
-              <a:rPr lang="en-US" dirty="0">
-                <a:solidFill>
-                  <a:srgbClr val="FF0000"/>
-                </a:solidFill>
-              </a:rPr>
-              <a:t>() </a:t>
-            </a:r>
-            <a:r>
-              <a:rPr lang="en-US" dirty="0"/>
-              <a:t>. There we use a list of tuples that contains key, value</a:t>
-            </a:r>
-          </a:p>
-          <a:p>
-            <a:endParaRPr lang="en-US" dirty="0"/>
-          </a:p>
-          <a:p>
-            <a:r>
-              <a:rPr lang="en-US" dirty="0"/>
-              <a:t> uses </a:t>
-            </a:r>
-            <a:r>
-              <a:rPr lang="en-US" dirty="0" err="1">
-                <a:solidFill>
-                  <a:srgbClr val="FF0000"/>
-                </a:solidFill>
-              </a:rPr>
-              <a:t>dict.fromkeys</a:t>
-            </a:r>
-            <a:r>
-              <a:rPr lang="en-US" dirty="0">
-                <a:solidFill>
-                  <a:srgbClr val="FF0000"/>
-                </a:solidFill>
-              </a:rPr>
-              <a:t>() </a:t>
-            </a:r>
-            <a:r>
-              <a:rPr lang="en-US" dirty="0"/>
-              <a:t>. In the first case, our </a:t>
-            </a:r>
-            <a:r>
-              <a:rPr lang="en-US" dirty="0" err="1"/>
-              <a:t>dict</a:t>
-            </a:r>
-            <a:r>
-              <a:rPr lang="en-US" dirty="0"/>
-              <a:t> doesn’t have values.</a:t>
-            </a:r>
-          </a:p>
-          <a:p>
-            <a:endParaRPr lang="en-US" dirty="0"/>
-          </a:p>
-          <a:p>
-            <a:r>
-              <a:rPr lang="en-US" dirty="0"/>
-              <a:t>Or use a generator. </a:t>
-            </a:r>
-            <a:r>
-              <a:rPr lang="en-US" dirty="0">
-                <a:highlight>
-                  <a:srgbClr val="FFFF00"/>
-                </a:highlight>
-              </a:rPr>
-              <a:t>Note!</a:t>
-            </a:r>
-            <a:r>
-              <a:rPr lang="en-US" dirty="0"/>
-              <a:t> We used a curly brackets  </a:t>
-            </a:r>
-            <a:endParaRPr lang="ru-RU" dirty="0"/>
-          </a:p>
-        </p:txBody>
-      </p:sp>
-      <p:pic>
-        <p:nvPicPr>
-          <p:cNvPr id="4" name="Рисунок 3">
-            <a:extLst>
-              <a:ext uri="{FF2B5EF4-FFF2-40B4-BE49-F238E27FC236}">
-                <a16:creationId xmlns:a16="http://schemas.microsoft.com/office/drawing/2014/main" id="{DB63E1ED-F45C-4611-B6BB-992530B08068}"/>
-              </a:ext>
-            </a:extLst>
-          </p:cNvPr>
-          <p:cNvPicPr>
-            <a:picLocks noChangeAspect="1"/>
-          </p:cNvPicPr>
-          <p:nvPr/>
-        </p:nvPicPr>
-        <p:blipFill>
-          <a:blip r:embed="rId2"/>
-          <a:stretch>
-            <a:fillRect/>
-          </a:stretch>
-        </p:blipFill>
-        <p:spPr>
-          <a:xfrm>
-            <a:off x="6188766" y="1825626"/>
-            <a:ext cx="3061251" cy="510208"/>
-          </a:xfrm>
-          <a:prstGeom prst="rect">
-            <a:avLst/>
-          </a:prstGeom>
-        </p:spPr>
-      </p:pic>
-      <p:pic>
-        <p:nvPicPr>
-          <p:cNvPr id="5" name="Рисунок 4">
-            <a:extLst>
-              <a:ext uri="{FF2B5EF4-FFF2-40B4-BE49-F238E27FC236}">
-                <a16:creationId xmlns:a16="http://schemas.microsoft.com/office/drawing/2014/main" id="{50B009FF-3B46-4A58-9E88-3822EA1C5A65}"/>
-              </a:ext>
-            </a:extLst>
-          </p:cNvPr>
-          <p:cNvPicPr>
-            <a:picLocks noChangeAspect="1"/>
-          </p:cNvPicPr>
-          <p:nvPr/>
-        </p:nvPicPr>
-        <p:blipFill>
-          <a:blip r:embed="rId3"/>
-          <a:stretch>
-            <a:fillRect/>
-          </a:stretch>
-        </p:blipFill>
-        <p:spPr>
-          <a:xfrm>
-            <a:off x="6188766" y="2822299"/>
-            <a:ext cx="5646302" cy="510208"/>
-          </a:xfrm>
-          <a:prstGeom prst="rect">
-            <a:avLst/>
-          </a:prstGeom>
-        </p:spPr>
-      </p:pic>
-      <p:pic>
-        <p:nvPicPr>
-          <p:cNvPr id="6" name="Рисунок 5">
-            <a:extLst>
-              <a:ext uri="{FF2B5EF4-FFF2-40B4-BE49-F238E27FC236}">
-                <a16:creationId xmlns:a16="http://schemas.microsoft.com/office/drawing/2014/main" id="{BCCE4D55-B9F1-45BF-99DC-6ACE524FDA5D}"/>
-              </a:ext>
-            </a:extLst>
-          </p:cNvPr>
-          <p:cNvPicPr>
-            <a:picLocks noChangeAspect="1"/>
-          </p:cNvPicPr>
-          <p:nvPr/>
-        </p:nvPicPr>
-        <p:blipFill>
-          <a:blip r:embed="rId4"/>
-          <a:stretch>
-            <a:fillRect/>
-          </a:stretch>
-        </p:blipFill>
-        <p:spPr>
-          <a:xfrm>
-            <a:off x="6188766" y="3891860"/>
-            <a:ext cx="5629074" cy="978315"/>
-          </a:xfrm>
-          <a:prstGeom prst="rect">
-            <a:avLst/>
-          </a:prstGeom>
-        </p:spPr>
-      </p:pic>
-      <p:pic>
-        <p:nvPicPr>
-          <p:cNvPr id="7" name="Рисунок 6">
-            <a:extLst>
-              <a:ext uri="{FF2B5EF4-FFF2-40B4-BE49-F238E27FC236}">
-                <a16:creationId xmlns:a16="http://schemas.microsoft.com/office/drawing/2014/main" id="{68D42A08-03AA-4768-9F11-8CC934EBDE73}"/>
-              </a:ext>
-            </a:extLst>
-          </p:cNvPr>
-          <p:cNvPicPr>
-            <a:picLocks noChangeAspect="1"/>
-          </p:cNvPicPr>
-          <p:nvPr/>
-        </p:nvPicPr>
-        <p:blipFill>
-          <a:blip r:embed="rId5"/>
-          <a:stretch>
-            <a:fillRect/>
-          </a:stretch>
-        </p:blipFill>
-        <p:spPr>
-          <a:xfrm>
-            <a:off x="6188766" y="5382731"/>
-            <a:ext cx="5629074" cy="440329"/>
-          </a:xfrm>
-          <a:prstGeom prst="rect">
-            <a:avLst/>
-          </a:prstGeom>
-        </p:spPr>
-      </p:pic>
-    </p:spTree>
-    <p:extLst>
-      <p:ext uri="{BB962C8B-B14F-4D97-AF65-F5344CB8AC3E}">
-        <p14:creationId xmlns:p14="http://schemas.microsoft.com/office/powerpoint/2010/main" val="1698809376"/>
-      </p:ext>
-    </p:extLst>
   </p:cSld>
   <p:clrMapOvr>
     <a:masterClrMapping/>
@@ -13362,6 +13305,325 @@
           <p:cNvPr id="2" name="Заголовок 1">
             <a:extLst>
               <a:ext uri="{FF2B5EF4-FFF2-40B4-BE49-F238E27FC236}">
+                <a16:creationId xmlns:a16="http://schemas.microsoft.com/office/drawing/2014/main" id="{DD5F6D06-4788-4EA8-82B0-0155C312B5BE}"/>
+              </a:ext>
+            </a:extLst>
+          </p:cNvPr>
+          <p:cNvSpPr>
+            <a:spLocks noGrp="1"/>
+          </p:cNvSpPr>
+          <p:nvPr>
+            <p:ph type="title"/>
+          </p:nvPr>
+        </p:nvSpPr>
+        <p:spPr/>
+        <p:txBody>
+          <a:bodyPr/>
+          <a:lstStyle/>
+          <a:p>
+            <a:pPr algn="ctr"/>
+            <a:r>
+              <a:rPr lang="en-US" dirty="0"/>
+              <a:t>Create a </a:t>
+            </a:r>
+            <a:r>
+              <a:rPr lang="en-US" dirty="0" err="1"/>
+              <a:t>dict</a:t>
+            </a:r>
+            <a:endParaRPr lang="ru-RU" dirty="0"/>
+          </a:p>
+        </p:txBody>
+      </p:sp>
+      <p:sp>
+        <p:nvSpPr>
+          <p:cNvPr id="3" name="Объект 2">
+            <a:extLst>
+              <a:ext uri="{FF2B5EF4-FFF2-40B4-BE49-F238E27FC236}">
+                <a16:creationId xmlns:a16="http://schemas.microsoft.com/office/drawing/2014/main" id="{C127DC5E-D7C1-4597-81DD-5F308250F84D}"/>
+              </a:ext>
+            </a:extLst>
+          </p:cNvPr>
+          <p:cNvSpPr>
+            <a:spLocks noGrp="1"/>
+          </p:cNvSpPr>
+          <p:nvPr>
+            <p:ph idx="1"/>
+          </p:nvPr>
+        </p:nvSpPr>
+        <p:spPr>
+          <a:xfrm>
+            <a:off x="838200" y="1825625"/>
+            <a:ext cx="4621696" cy="4893227"/>
+          </a:xfrm>
+        </p:spPr>
+        <p:txBody>
+          <a:bodyPr>
+            <a:normAutofit fontScale="92500" lnSpcReduction="20000"/>
+          </a:bodyPr>
+          <a:lstStyle/>
+          <a:p>
+            <a:r>
+              <a:rPr lang="en-US" dirty="0"/>
+              <a:t>To create a </a:t>
+            </a:r>
+            <a:r>
+              <a:rPr lang="en-US" dirty="0" err="1">
+                <a:solidFill>
+                  <a:srgbClr val="FF0000"/>
+                </a:solidFill>
+              </a:rPr>
+              <a:t>dict</a:t>
+            </a:r>
+            <a:r>
+              <a:rPr lang="en-US" dirty="0"/>
+              <a:t> you may use a common syntax</a:t>
+            </a:r>
+          </a:p>
+          <a:p>
+            <a:endParaRPr lang="en-US" dirty="0"/>
+          </a:p>
+          <a:p>
+            <a:r>
+              <a:rPr lang="en-US" dirty="0"/>
+              <a:t>Create with </a:t>
+            </a:r>
+            <a:r>
+              <a:rPr lang="en-US" dirty="0" err="1">
+                <a:solidFill>
+                  <a:srgbClr val="FF0000"/>
+                </a:solidFill>
+              </a:rPr>
+              <a:t>dict</a:t>
+            </a:r>
+            <a:r>
+              <a:rPr lang="en-US" dirty="0">
+                <a:solidFill>
+                  <a:srgbClr val="FF0000"/>
+                </a:solidFill>
+              </a:rPr>
+              <a:t>() </a:t>
+            </a:r>
+            <a:r>
+              <a:rPr lang="en-US" dirty="0"/>
+              <a:t>. There we use a list of tuples that contains key, value</a:t>
+            </a:r>
+          </a:p>
+          <a:p>
+            <a:endParaRPr lang="en-US" dirty="0"/>
+          </a:p>
+          <a:p>
+            <a:r>
+              <a:rPr lang="en-US" dirty="0"/>
+              <a:t> uses </a:t>
+            </a:r>
+            <a:r>
+              <a:rPr lang="en-US" dirty="0" err="1">
+                <a:solidFill>
+                  <a:srgbClr val="FF0000"/>
+                </a:solidFill>
+              </a:rPr>
+              <a:t>dict.fromkeys</a:t>
+            </a:r>
+            <a:r>
+              <a:rPr lang="en-US" dirty="0">
+                <a:solidFill>
+                  <a:srgbClr val="FF0000"/>
+                </a:solidFill>
+              </a:rPr>
+              <a:t>() </a:t>
+            </a:r>
+            <a:r>
+              <a:rPr lang="en-US" dirty="0"/>
+              <a:t>. In the first case, our </a:t>
+            </a:r>
+            <a:r>
+              <a:rPr lang="en-US" dirty="0" err="1"/>
+              <a:t>dict</a:t>
+            </a:r>
+            <a:r>
+              <a:rPr lang="en-US" dirty="0"/>
+              <a:t> doesn’t have values.</a:t>
+            </a:r>
+          </a:p>
+          <a:p>
+            <a:endParaRPr lang="en-US" dirty="0"/>
+          </a:p>
+          <a:p>
+            <a:r>
+              <a:rPr lang="en-US" dirty="0"/>
+              <a:t>Or use a generator. </a:t>
+            </a:r>
+            <a:r>
+              <a:rPr lang="en-US" dirty="0">
+                <a:highlight>
+                  <a:srgbClr val="FFFF00"/>
+                </a:highlight>
+              </a:rPr>
+              <a:t>Note!</a:t>
+            </a:r>
+            <a:r>
+              <a:rPr lang="en-US" dirty="0"/>
+              <a:t> We used a curly brackets  </a:t>
+            </a:r>
+            <a:endParaRPr lang="ru-RU" dirty="0"/>
+          </a:p>
+        </p:txBody>
+      </p:sp>
+      <p:pic>
+        <p:nvPicPr>
+          <p:cNvPr id="4" name="Рисунок 3">
+            <a:extLst>
+              <a:ext uri="{FF2B5EF4-FFF2-40B4-BE49-F238E27FC236}">
+                <a16:creationId xmlns:a16="http://schemas.microsoft.com/office/drawing/2014/main" id="{DB63E1ED-F45C-4611-B6BB-992530B08068}"/>
+              </a:ext>
+            </a:extLst>
+          </p:cNvPr>
+          <p:cNvPicPr>
+            <a:picLocks noChangeAspect="1"/>
+          </p:cNvPicPr>
+          <p:nvPr/>
+        </p:nvPicPr>
+        <p:blipFill>
+          <a:blip r:embed="rId2"/>
+          <a:stretch>
+            <a:fillRect/>
+          </a:stretch>
+        </p:blipFill>
+        <p:spPr>
+          <a:xfrm>
+            <a:off x="6188766" y="1825626"/>
+            <a:ext cx="3061251" cy="510208"/>
+          </a:xfrm>
+          <a:prstGeom prst="rect">
+            <a:avLst/>
+          </a:prstGeom>
+        </p:spPr>
+      </p:pic>
+      <p:pic>
+        <p:nvPicPr>
+          <p:cNvPr id="5" name="Рисунок 4">
+            <a:extLst>
+              <a:ext uri="{FF2B5EF4-FFF2-40B4-BE49-F238E27FC236}">
+                <a16:creationId xmlns:a16="http://schemas.microsoft.com/office/drawing/2014/main" id="{50B009FF-3B46-4A58-9E88-3822EA1C5A65}"/>
+              </a:ext>
+            </a:extLst>
+          </p:cNvPr>
+          <p:cNvPicPr>
+            <a:picLocks noChangeAspect="1"/>
+          </p:cNvPicPr>
+          <p:nvPr/>
+        </p:nvPicPr>
+        <p:blipFill>
+          <a:blip r:embed="rId3"/>
+          <a:stretch>
+            <a:fillRect/>
+          </a:stretch>
+        </p:blipFill>
+        <p:spPr>
+          <a:xfrm>
+            <a:off x="6188766" y="2822299"/>
+            <a:ext cx="5646302" cy="510208"/>
+          </a:xfrm>
+          <a:prstGeom prst="rect">
+            <a:avLst/>
+          </a:prstGeom>
+        </p:spPr>
+      </p:pic>
+      <p:pic>
+        <p:nvPicPr>
+          <p:cNvPr id="6" name="Рисунок 5">
+            <a:extLst>
+              <a:ext uri="{FF2B5EF4-FFF2-40B4-BE49-F238E27FC236}">
+                <a16:creationId xmlns:a16="http://schemas.microsoft.com/office/drawing/2014/main" id="{BCCE4D55-B9F1-45BF-99DC-6ACE524FDA5D}"/>
+              </a:ext>
+            </a:extLst>
+          </p:cNvPr>
+          <p:cNvPicPr>
+            <a:picLocks noChangeAspect="1"/>
+          </p:cNvPicPr>
+          <p:nvPr/>
+        </p:nvPicPr>
+        <p:blipFill>
+          <a:blip r:embed="rId4"/>
+          <a:stretch>
+            <a:fillRect/>
+          </a:stretch>
+        </p:blipFill>
+        <p:spPr>
+          <a:xfrm>
+            <a:off x="6188766" y="3891860"/>
+            <a:ext cx="5629074" cy="978315"/>
+          </a:xfrm>
+          <a:prstGeom prst="rect">
+            <a:avLst/>
+          </a:prstGeom>
+        </p:spPr>
+      </p:pic>
+      <p:pic>
+        <p:nvPicPr>
+          <p:cNvPr id="7" name="Рисунок 6">
+            <a:extLst>
+              <a:ext uri="{FF2B5EF4-FFF2-40B4-BE49-F238E27FC236}">
+                <a16:creationId xmlns:a16="http://schemas.microsoft.com/office/drawing/2014/main" id="{68D42A08-03AA-4768-9F11-8CC934EBDE73}"/>
+              </a:ext>
+            </a:extLst>
+          </p:cNvPr>
+          <p:cNvPicPr>
+            <a:picLocks noChangeAspect="1"/>
+          </p:cNvPicPr>
+          <p:nvPr/>
+        </p:nvPicPr>
+        <p:blipFill>
+          <a:blip r:embed="rId5"/>
+          <a:stretch>
+            <a:fillRect/>
+          </a:stretch>
+        </p:blipFill>
+        <p:spPr>
+          <a:xfrm>
+            <a:off x="6188766" y="5382731"/>
+            <a:ext cx="5629074" cy="440329"/>
+          </a:xfrm>
+          <a:prstGeom prst="rect">
+            <a:avLst/>
+          </a:prstGeom>
+        </p:spPr>
+      </p:pic>
+    </p:spTree>
+    <p:extLst>
+      <p:ext uri="{BB962C8B-B14F-4D97-AF65-F5344CB8AC3E}">
+        <p14:creationId xmlns:p14="http://schemas.microsoft.com/office/powerpoint/2010/main" val="1698809376"/>
+      </p:ext>
+    </p:extLst>
+  </p:cSld>
+  <p:clrMapOvr>
+    <a:masterClrMapping/>
+  </p:clrMapOvr>
+</p:sld>
+</file>
+
+<file path=ppt/slides/slide41.xml><?xml version="1.0" encoding="utf-8"?>
+<p:sld xmlns:a="http://schemas.openxmlformats.org/drawingml/2006/main" xmlns:r="http://schemas.openxmlformats.org/officeDocument/2006/relationships" xmlns:p="http://schemas.openxmlformats.org/presentationml/2006/main">
+  <p:cSld>
+    <p:spTree>
+      <p:nvGrpSpPr>
+        <p:cNvPr id="1" name=""/>
+        <p:cNvGrpSpPr/>
+        <p:nvPr/>
+      </p:nvGrpSpPr>
+      <p:grpSpPr>
+        <a:xfrm>
+          <a:off x="0" y="0"/>
+          <a:ext cx="0" cy="0"/>
+          <a:chOff x="0" y="0"/>
+          <a:chExt cx="0" cy="0"/>
+        </a:xfrm>
+      </p:grpSpPr>
+      <p:sp>
+        <p:nvSpPr>
+          <p:cNvPr id="2" name="Заголовок 1">
+            <a:extLst>
+              <a:ext uri="{FF2B5EF4-FFF2-40B4-BE49-F238E27FC236}">
                 <a16:creationId xmlns:a16="http://schemas.microsoft.com/office/drawing/2014/main" id="{47965378-A975-4970-AFD5-300EC5A33050}"/>
               </a:ext>
             </a:extLst>
@@ -13570,7 +13832,7 @@
 </p:sld>
 </file>
 
-<file path=ppt/slides/slide41.xml><?xml version="1.0" encoding="utf-8"?>
+<file path=ppt/slides/slide42.xml><?xml version="1.0" encoding="utf-8"?>
 <p:sld xmlns:a="http://schemas.openxmlformats.org/drawingml/2006/main" xmlns:r="http://schemas.openxmlformats.org/officeDocument/2006/relationships" xmlns:p="http://schemas.openxmlformats.org/presentationml/2006/main">
   <p:cSld>
     <p:spTree>
@@ -13884,7 +14146,7 @@
 </p:sld>
 </file>
 
-<file path=ppt/slides/slide42.xml><?xml version="1.0" encoding="utf-8"?>
+<file path=ppt/slides/slide43.xml><?xml version="1.0" encoding="utf-8"?>
 <p:sld xmlns:a="http://schemas.openxmlformats.org/drawingml/2006/main" xmlns:r="http://schemas.openxmlformats.org/officeDocument/2006/relationships" xmlns:p="http://schemas.openxmlformats.org/presentationml/2006/main">
   <p:cSld>
     <p:spTree>
@@ -14465,7 +14727,7 @@
 </p:sld>
 </file>
 
-<file path=ppt/slides/slide43.xml><?xml version="1.0" encoding="utf-8"?>
+<file path=ppt/slides/slide44.xml><?xml version="1.0" encoding="utf-8"?>
 <p:sld xmlns:a="http://schemas.openxmlformats.org/drawingml/2006/main" xmlns:r="http://schemas.openxmlformats.org/officeDocument/2006/relationships" xmlns:p="http://schemas.openxmlformats.org/presentationml/2006/main">
   <p:cSld>
     <p:spTree>
@@ -14941,7 +15203,7 @@
 </p:sld>
 </file>
 
-<file path=ppt/slides/slide44.xml><?xml version="1.0" encoding="utf-8"?>
+<file path=ppt/slides/slide45.xml><?xml version="1.0" encoding="utf-8"?>
 <p:sld xmlns:a="http://schemas.openxmlformats.org/drawingml/2006/main" xmlns:r="http://schemas.openxmlformats.org/officeDocument/2006/relationships" xmlns:p="http://schemas.openxmlformats.org/presentationml/2006/main">
   <p:cSld>
     <p:spTree>
@@ -15345,7 +15607,7 @@
 </p:sld>
 </file>
 
-<file path=ppt/slides/slide45.xml><?xml version="1.0" encoding="utf-8"?>
+<file path=ppt/slides/slide46.xml><?xml version="1.0" encoding="utf-8"?>
 <p:sld xmlns:a="http://schemas.openxmlformats.org/drawingml/2006/main" xmlns:r="http://schemas.openxmlformats.org/officeDocument/2006/relationships" xmlns:p="http://schemas.openxmlformats.org/presentationml/2006/main">
   <p:cSld>
     <p:spTree>
@@ -15479,7 +15741,7 @@
 </p:sld>
 </file>
 
-<file path=ppt/slides/slide46.xml><?xml version="1.0" encoding="utf-8"?>
+<file path=ppt/slides/slide47.xml><?xml version="1.0" encoding="utf-8"?>
 <p:sld xmlns:a="http://schemas.openxmlformats.org/drawingml/2006/main" xmlns:r="http://schemas.openxmlformats.org/officeDocument/2006/relationships" xmlns:p="http://schemas.openxmlformats.org/presentationml/2006/main">
   <p:cSld>
     <p:spTree>
@@ -15779,7 +16041,7 @@
 </p:sld>
 </file>
 
-<file path=ppt/slides/slide47.xml><?xml version="1.0" encoding="utf-8"?>
+<file path=ppt/slides/slide48.xml><?xml version="1.0" encoding="utf-8"?>
 <p:sld xmlns:a="http://schemas.openxmlformats.org/drawingml/2006/main" xmlns:r="http://schemas.openxmlformats.org/officeDocument/2006/relationships" xmlns:p="http://schemas.openxmlformats.org/presentationml/2006/main">
   <p:cSld>
     <p:spTree>
@@ -15980,7 +16242,7 @@
 </p:sld>
 </file>
 
-<file path=ppt/slides/slide48.xml><?xml version="1.0" encoding="utf-8"?>
+<file path=ppt/slides/slide49.xml><?xml version="1.0" encoding="utf-8"?>
 <p:sld xmlns:a="http://schemas.openxmlformats.org/drawingml/2006/main" xmlns:r="http://schemas.openxmlformats.org/officeDocument/2006/relationships" xmlns:p="http://schemas.openxmlformats.org/presentationml/2006/main">
   <p:cSld>
     <p:spTree>
@@ -16518,399 +16780,6 @@
     <p:extLst>
       <p:ext uri="{BB962C8B-B14F-4D97-AF65-F5344CB8AC3E}">
         <p14:creationId xmlns:p14="http://schemas.microsoft.com/office/powerpoint/2010/main" val="1408040424"/>
-      </p:ext>
-    </p:extLst>
-  </p:cSld>
-  <p:clrMapOvr>
-    <a:masterClrMapping/>
-  </p:clrMapOvr>
-</p:sld>
-</file>
-
-<file path=ppt/slides/slide49.xml><?xml version="1.0" encoding="utf-8"?>
-<p:sld xmlns:a="http://schemas.openxmlformats.org/drawingml/2006/main" xmlns:r="http://schemas.openxmlformats.org/officeDocument/2006/relationships" xmlns:p="http://schemas.openxmlformats.org/presentationml/2006/main">
-  <p:cSld>
-    <p:spTree>
-      <p:nvGrpSpPr>
-        <p:cNvPr id="1" name=""/>
-        <p:cNvGrpSpPr/>
-        <p:nvPr/>
-      </p:nvGrpSpPr>
-      <p:grpSpPr>
-        <a:xfrm>
-          <a:off x="0" y="0"/>
-          <a:ext cx="0" cy="0"/>
-          <a:chOff x="0" y="0"/>
-          <a:chExt cx="0" cy="0"/>
-        </a:xfrm>
-      </p:grpSpPr>
-      <p:sp>
-        <p:nvSpPr>
-          <p:cNvPr id="2" name="Заголовок 1">
-            <a:extLst>
-              <a:ext uri="{FF2B5EF4-FFF2-40B4-BE49-F238E27FC236}">
-                <a16:creationId xmlns:a16="http://schemas.microsoft.com/office/drawing/2014/main" id="{C3883674-A64A-4013-9248-153D6E8B3A97}"/>
-              </a:ext>
-            </a:extLst>
-          </p:cNvPr>
-          <p:cNvSpPr>
-            <a:spLocks noGrp="1"/>
-          </p:cNvSpPr>
-          <p:nvPr>
-            <p:ph type="title"/>
-          </p:nvPr>
-        </p:nvSpPr>
-        <p:spPr/>
-        <p:txBody>
-          <a:bodyPr/>
-          <a:lstStyle/>
-          <a:p>
-            <a:pPr algn="ctr"/>
-            <a:r>
-              <a:rPr lang="en-US" dirty="0"/>
-              <a:t>Decorators</a:t>
-            </a:r>
-            <a:endParaRPr lang="ru-RU" dirty="0"/>
-          </a:p>
-        </p:txBody>
-      </p:sp>
-      <p:sp>
-        <p:nvSpPr>
-          <p:cNvPr id="3" name="Объект 2">
-            <a:extLst>
-              <a:ext uri="{FF2B5EF4-FFF2-40B4-BE49-F238E27FC236}">
-                <a16:creationId xmlns:a16="http://schemas.microsoft.com/office/drawing/2014/main" id="{03EB723B-0CBC-4631-B586-ECB2FACA9F37}"/>
-              </a:ext>
-            </a:extLst>
-          </p:cNvPr>
-          <p:cNvSpPr>
-            <a:spLocks noGrp="1"/>
-          </p:cNvSpPr>
-          <p:nvPr>
-            <p:ph idx="1"/>
-          </p:nvPr>
-        </p:nvSpPr>
-        <p:spPr>
-          <a:xfrm>
-            <a:off x="838200" y="1825624"/>
-            <a:ext cx="6331226" cy="5032375"/>
-          </a:xfrm>
-        </p:spPr>
-        <p:txBody>
-          <a:bodyPr>
-            <a:normAutofit fontScale="70000" lnSpcReduction="20000"/>
-          </a:bodyPr>
-          <a:lstStyle/>
-          <a:p>
-            <a:r>
-              <a:rPr lang="en-US" dirty="0"/>
-              <a:t>Decorators are design patterns, that alter the functionality of functions without functions changes themselves. Think about it like a wrapper for a present.</a:t>
-            </a:r>
-          </a:p>
-          <a:p>
-            <a:r>
-              <a:rPr lang="en-US" dirty="0"/>
-              <a:t>The decorator takes a function as an argument and returns a new function with </a:t>
-            </a:r>
-            <a:r>
-              <a:rPr lang="en-US" dirty="0" err="1"/>
-              <a:t>modificated</a:t>
-            </a:r>
-            <a:r>
-              <a:rPr lang="en-US" dirty="0"/>
-              <a:t> functionality.</a:t>
-            </a:r>
-          </a:p>
-          <a:p>
-            <a:r>
-              <a:rPr lang="en-US" dirty="0"/>
-              <a:t> Simplest schema of a decorator:</a:t>
-            </a:r>
-          </a:p>
-          <a:p>
-            <a:pPr lvl="1"/>
-            <a:r>
-              <a:rPr lang="en-US" dirty="0">
-                <a:solidFill>
-                  <a:srgbClr val="FF0000"/>
-                </a:solidFill>
-              </a:rPr>
-              <a:t>def</a:t>
-            </a:r>
-            <a:r>
-              <a:rPr lang="en-US" dirty="0"/>
-              <a:t> decorator</a:t>
-            </a:r>
-            <a:r>
-              <a:rPr lang="en-US" dirty="0">
-                <a:solidFill>
-                  <a:srgbClr val="FF0000"/>
-                </a:solidFill>
-              </a:rPr>
-              <a:t>(</a:t>
-            </a:r>
-            <a:r>
-              <a:rPr lang="en-US" dirty="0" err="1">
-                <a:solidFill>
-                  <a:srgbClr val="FF0000"/>
-                </a:solidFill>
-              </a:rPr>
-              <a:t>func</a:t>
-            </a:r>
-            <a:r>
-              <a:rPr lang="en-US" dirty="0">
-                <a:solidFill>
-                  <a:srgbClr val="FF0000"/>
-                </a:solidFill>
-              </a:rPr>
-              <a:t>):</a:t>
-            </a:r>
-          </a:p>
-          <a:p>
-            <a:pPr marL="457200" lvl="1" indent="0">
-              <a:buNone/>
-            </a:pPr>
-            <a:r>
-              <a:rPr lang="en-US" dirty="0"/>
-              <a:t>	</a:t>
-            </a:r>
-            <a:r>
-              <a:rPr lang="en-US" dirty="0">
-                <a:solidFill>
-                  <a:srgbClr val="FF0000"/>
-                </a:solidFill>
-              </a:rPr>
-              <a:t>def</a:t>
-            </a:r>
-            <a:r>
-              <a:rPr lang="en-US" dirty="0"/>
-              <a:t> </a:t>
-            </a:r>
-            <a:r>
-              <a:rPr lang="en-US" dirty="0" err="1"/>
-              <a:t>newF</a:t>
-            </a:r>
-            <a:r>
-              <a:rPr lang="en-US" dirty="0"/>
-              <a:t>():</a:t>
-            </a:r>
-          </a:p>
-          <a:p>
-            <a:pPr marL="457200" lvl="1" indent="0">
-              <a:buNone/>
-            </a:pPr>
-            <a:r>
-              <a:rPr lang="en-US" dirty="0"/>
-              <a:t>		do something</a:t>
-            </a:r>
-          </a:p>
-          <a:p>
-            <a:pPr marL="457200" lvl="1" indent="0">
-              <a:buNone/>
-            </a:pPr>
-            <a:r>
-              <a:rPr lang="en-US" dirty="0"/>
-              <a:t>		</a:t>
-            </a:r>
-            <a:r>
-              <a:rPr lang="en-US" dirty="0" err="1">
-                <a:solidFill>
-                  <a:srgbClr val="FF0000"/>
-                </a:solidFill>
-              </a:rPr>
-              <a:t>func</a:t>
-            </a:r>
-            <a:r>
-              <a:rPr lang="en-US" dirty="0">
-                <a:solidFill>
-                  <a:srgbClr val="FF0000"/>
-                </a:solidFill>
-              </a:rPr>
-              <a:t>()</a:t>
-            </a:r>
-          </a:p>
-          <a:p>
-            <a:pPr marL="457200" lvl="1" indent="0">
-              <a:buNone/>
-            </a:pPr>
-            <a:r>
-              <a:rPr lang="en-US" dirty="0"/>
-              <a:t>	</a:t>
-            </a:r>
-            <a:r>
-              <a:rPr lang="en-US" dirty="0">
-                <a:solidFill>
-                  <a:srgbClr val="FF0000"/>
-                </a:solidFill>
-              </a:rPr>
-              <a:t>return</a:t>
-            </a:r>
-            <a:r>
-              <a:rPr lang="en-US" dirty="0"/>
-              <a:t> </a:t>
-            </a:r>
-            <a:r>
-              <a:rPr lang="en-US" dirty="0" err="1"/>
-              <a:t>newF</a:t>
-            </a:r>
-            <a:endParaRPr lang="en-US" dirty="0"/>
-          </a:p>
-          <a:p>
-            <a:r>
-              <a:rPr lang="en-US" dirty="0"/>
-              <a:t>Also you need remember about returned value of original function. </a:t>
-            </a:r>
-          </a:p>
-          <a:p>
-            <a:r>
-              <a:rPr lang="en-US" dirty="0"/>
-              <a:t>To using a decorator we have few ways:</a:t>
-            </a:r>
-          </a:p>
-          <a:p>
-            <a:pPr lvl="1"/>
-            <a:r>
-              <a:rPr lang="en-US" dirty="0"/>
-              <a:t>Create an instance of the decorated function</a:t>
-            </a:r>
-          </a:p>
-          <a:p>
-            <a:pPr lvl="1"/>
-            <a:r>
-              <a:rPr lang="en-US" dirty="0"/>
-              <a:t>Add decorator to defining a function with keyword </a:t>
-            </a:r>
-            <a:r>
-              <a:rPr lang="en-US" dirty="0">
-                <a:solidFill>
-                  <a:srgbClr val="FF0000"/>
-                </a:solidFill>
-              </a:rPr>
-              <a:t>@</a:t>
-            </a:r>
-            <a:r>
-              <a:rPr lang="en-US" dirty="0"/>
-              <a:t> ( Note! Every time you call a function call will be with decorator)</a:t>
-            </a:r>
-          </a:p>
-        </p:txBody>
-      </p:sp>
-      <p:sp>
-        <p:nvSpPr>
-          <p:cNvPr id="5" name="Прямоугольник 4">
-            <a:extLst>
-              <a:ext uri="{FF2B5EF4-FFF2-40B4-BE49-F238E27FC236}">
-                <a16:creationId xmlns:a16="http://schemas.microsoft.com/office/drawing/2014/main" id="{D6AF2D64-2D2F-4382-AEEC-A870EDC31456}"/>
-              </a:ext>
-            </a:extLst>
-          </p:cNvPr>
-          <p:cNvSpPr/>
-          <p:nvPr/>
-        </p:nvSpPr>
-        <p:spPr>
-          <a:xfrm>
-            <a:off x="1524001" y="3415747"/>
-            <a:ext cx="2716696" cy="1351723"/>
-          </a:xfrm>
-          <a:prstGeom prst="rect">
-            <a:avLst/>
-          </a:prstGeom>
-          <a:noFill/>
-          <a:ln>
-            <a:solidFill>
-              <a:srgbClr val="FFC000"/>
-            </a:solidFill>
-          </a:ln>
-        </p:spPr>
-        <p:style>
-          <a:lnRef idx="2">
-            <a:schemeClr val="accent1">
-              <a:shade val="50000"/>
-            </a:schemeClr>
-          </a:lnRef>
-          <a:fillRef idx="1">
-            <a:schemeClr val="accent1"/>
-          </a:fillRef>
-          <a:effectRef idx="0">
-            <a:schemeClr val="accent1"/>
-          </a:effectRef>
-          <a:fontRef idx="minor">
-            <a:schemeClr val="lt1"/>
-          </a:fontRef>
-        </p:style>
-        <p:txBody>
-          <a:bodyPr rtlCol="0" anchor="ctr"/>
-          <a:lstStyle/>
-          <a:p>
-            <a:pPr algn="ctr"/>
-            <a:endParaRPr lang="ru-RU"/>
-          </a:p>
-        </p:txBody>
-      </p:sp>
-      <p:pic>
-        <p:nvPicPr>
-          <p:cNvPr id="6" name="Рисунок 5">
-            <a:extLst>
-              <a:ext uri="{FF2B5EF4-FFF2-40B4-BE49-F238E27FC236}">
-                <a16:creationId xmlns:a16="http://schemas.microsoft.com/office/drawing/2014/main" id="{1D300C2C-D6B4-43DE-8E1C-A0EC60510B3C}"/>
-              </a:ext>
-            </a:extLst>
-          </p:cNvPr>
-          <p:cNvPicPr>
-            <a:picLocks noChangeAspect="1"/>
-          </p:cNvPicPr>
-          <p:nvPr/>
-        </p:nvPicPr>
-        <p:blipFill>
-          <a:blip r:embed="rId2"/>
-          <a:stretch>
-            <a:fillRect/>
-          </a:stretch>
-        </p:blipFill>
-        <p:spPr>
-          <a:xfrm>
-            <a:off x="7169426" y="2164569"/>
-            <a:ext cx="3153811" cy="1264431"/>
-          </a:xfrm>
-          <a:prstGeom prst="rect">
-            <a:avLst/>
-          </a:prstGeom>
-        </p:spPr>
-      </p:pic>
-      <p:pic>
-        <p:nvPicPr>
-          <p:cNvPr id="7" name="Рисунок 6">
-            <a:extLst>
-              <a:ext uri="{FF2B5EF4-FFF2-40B4-BE49-F238E27FC236}">
-                <a16:creationId xmlns:a16="http://schemas.microsoft.com/office/drawing/2014/main" id="{2F22876C-A3A2-41F3-98C8-96F60013D586}"/>
-              </a:ext>
-            </a:extLst>
-          </p:cNvPr>
-          <p:cNvPicPr>
-            <a:picLocks noChangeAspect="1"/>
-          </p:cNvPicPr>
-          <p:nvPr/>
-        </p:nvPicPr>
-        <p:blipFill>
-          <a:blip r:embed="rId3"/>
-          <a:stretch>
-            <a:fillRect/>
-          </a:stretch>
-        </p:blipFill>
-        <p:spPr>
-          <a:xfrm>
-            <a:off x="7169426" y="3544057"/>
-            <a:ext cx="4184374" cy="2152733"/>
-          </a:xfrm>
-          <a:prstGeom prst="rect">
-            <a:avLst/>
-          </a:prstGeom>
-        </p:spPr>
-      </p:pic>
-    </p:spTree>
-    <p:extLst>
-      <p:ext uri="{BB962C8B-B14F-4D97-AF65-F5344CB8AC3E}">
-        <p14:creationId xmlns:p14="http://schemas.microsoft.com/office/powerpoint/2010/main" val="3898460943"/>
       </p:ext>
     </p:extLst>
   </p:cSld>
@@ -17026,6 +16895,405 @@
           <p:cNvPr id="2" name="Заголовок 1">
             <a:extLst>
               <a:ext uri="{FF2B5EF4-FFF2-40B4-BE49-F238E27FC236}">
+                <a16:creationId xmlns:a16="http://schemas.microsoft.com/office/drawing/2014/main" id="{C3883674-A64A-4013-9248-153D6E8B3A97}"/>
+              </a:ext>
+            </a:extLst>
+          </p:cNvPr>
+          <p:cNvSpPr>
+            <a:spLocks noGrp="1"/>
+          </p:cNvSpPr>
+          <p:nvPr>
+            <p:ph type="title"/>
+          </p:nvPr>
+        </p:nvSpPr>
+        <p:spPr/>
+        <p:txBody>
+          <a:bodyPr/>
+          <a:lstStyle/>
+          <a:p>
+            <a:pPr algn="ctr"/>
+            <a:r>
+              <a:rPr lang="en-US" dirty="0"/>
+              <a:t>Decorators</a:t>
+            </a:r>
+            <a:endParaRPr lang="ru-RU" dirty="0"/>
+          </a:p>
+        </p:txBody>
+      </p:sp>
+      <p:sp>
+        <p:nvSpPr>
+          <p:cNvPr id="3" name="Объект 2">
+            <a:extLst>
+              <a:ext uri="{FF2B5EF4-FFF2-40B4-BE49-F238E27FC236}">
+                <a16:creationId xmlns:a16="http://schemas.microsoft.com/office/drawing/2014/main" id="{03EB723B-0CBC-4631-B586-ECB2FACA9F37}"/>
+              </a:ext>
+            </a:extLst>
+          </p:cNvPr>
+          <p:cNvSpPr>
+            <a:spLocks noGrp="1"/>
+          </p:cNvSpPr>
+          <p:nvPr>
+            <p:ph idx="1"/>
+          </p:nvPr>
+        </p:nvSpPr>
+        <p:spPr>
+          <a:xfrm>
+            <a:off x="838200" y="1825624"/>
+            <a:ext cx="6331226" cy="5032375"/>
+          </a:xfrm>
+        </p:spPr>
+        <p:txBody>
+          <a:bodyPr>
+            <a:normAutofit fontScale="70000" lnSpcReduction="20000"/>
+          </a:bodyPr>
+          <a:lstStyle/>
+          <a:p>
+            <a:r>
+              <a:rPr lang="en-US" dirty="0"/>
+              <a:t>Decorators are design patterns, that alter the functionality of functions without functions changes themselves. Think about it like a wrapper for a present.</a:t>
+            </a:r>
+          </a:p>
+          <a:p>
+            <a:r>
+              <a:rPr lang="en-US" dirty="0"/>
+              <a:t>The decorator takes a function as an argument and returns a new function with </a:t>
+            </a:r>
+            <a:r>
+              <a:rPr lang="en-US" dirty="0" err="1"/>
+              <a:t>modificated</a:t>
+            </a:r>
+            <a:r>
+              <a:rPr lang="en-US" dirty="0"/>
+              <a:t> functionality.</a:t>
+            </a:r>
+          </a:p>
+          <a:p>
+            <a:r>
+              <a:rPr lang="en-US" dirty="0"/>
+              <a:t> Simplest schema of a decorator:</a:t>
+            </a:r>
+          </a:p>
+          <a:p>
+            <a:pPr lvl="1"/>
+            <a:r>
+              <a:rPr lang="en-US" dirty="0">
+                <a:solidFill>
+                  <a:srgbClr val="FF0000"/>
+                </a:solidFill>
+              </a:rPr>
+              <a:t>def</a:t>
+            </a:r>
+            <a:r>
+              <a:rPr lang="en-US" dirty="0"/>
+              <a:t> decorator</a:t>
+            </a:r>
+            <a:r>
+              <a:rPr lang="en-US" dirty="0">
+                <a:solidFill>
+                  <a:srgbClr val="FF0000"/>
+                </a:solidFill>
+              </a:rPr>
+              <a:t>(</a:t>
+            </a:r>
+            <a:r>
+              <a:rPr lang="en-US" dirty="0" err="1">
+                <a:solidFill>
+                  <a:srgbClr val="FF0000"/>
+                </a:solidFill>
+              </a:rPr>
+              <a:t>func</a:t>
+            </a:r>
+            <a:r>
+              <a:rPr lang="en-US" dirty="0">
+                <a:solidFill>
+                  <a:srgbClr val="FF0000"/>
+                </a:solidFill>
+              </a:rPr>
+              <a:t>):</a:t>
+            </a:r>
+          </a:p>
+          <a:p>
+            <a:pPr marL="457200" lvl="1" indent="0">
+              <a:buNone/>
+            </a:pPr>
+            <a:r>
+              <a:rPr lang="en-US" dirty="0"/>
+              <a:t>	</a:t>
+            </a:r>
+            <a:r>
+              <a:rPr lang="en-US" dirty="0">
+                <a:solidFill>
+                  <a:srgbClr val="FF0000"/>
+                </a:solidFill>
+              </a:rPr>
+              <a:t>def</a:t>
+            </a:r>
+            <a:r>
+              <a:rPr lang="en-US" dirty="0"/>
+              <a:t> </a:t>
+            </a:r>
+            <a:r>
+              <a:rPr lang="en-US" dirty="0" err="1"/>
+              <a:t>newF</a:t>
+            </a:r>
+            <a:r>
+              <a:rPr lang="en-US" dirty="0"/>
+              <a:t>():</a:t>
+            </a:r>
+          </a:p>
+          <a:p>
+            <a:pPr marL="457200" lvl="1" indent="0">
+              <a:buNone/>
+            </a:pPr>
+            <a:r>
+              <a:rPr lang="en-US" dirty="0"/>
+              <a:t>		do something</a:t>
+            </a:r>
+          </a:p>
+          <a:p>
+            <a:pPr marL="457200" lvl="1" indent="0">
+              <a:buNone/>
+            </a:pPr>
+            <a:r>
+              <a:rPr lang="en-US" dirty="0"/>
+              <a:t>		</a:t>
+            </a:r>
+            <a:r>
+              <a:rPr lang="en-US" dirty="0" err="1">
+                <a:solidFill>
+                  <a:srgbClr val="FF0000"/>
+                </a:solidFill>
+              </a:rPr>
+              <a:t>func</a:t>
+            </a:r>
+            <a:r>
+              <a:rPr lang="en-US" dirty="0">
+                <a:solidFill>
+                  <a:srgbClr val="FF0000"/>
+                </a:solidFill>
+              </a:rPr>
+              <a:t>()</a:t>
+            </a:r>
+          </a:p>
+          <a:p>
+            <a:pPr marL="457200" lvl="1" indent="0">
+              <a:buNone/>
+            </a:pPr>
+            <a:r>
+              <a:rPr lang="en-US" dirty="0"/>
+              <a:t>	</a:t>
+            </a:r>
+            <a:r>
+              <a:rPr lang="en-US" dirty="0">
+                <a:solidFill>
+                  <a:srgbClr val="FF0000"/>
+                </a:solidFill>
+              </a:rPr>
+              <a:t>return</a:t>
+            </a:r>
+            <a:r>
+              <a:rPr lang="en-US" dirty="0"/>
+              <a:t> </a:t>
+            </a:r>
+            <a:r>
+              <a:rPr lang="en-US" dirty="0" err="1"/>
+              <a:t>newF</a:t>
+            </a:r>
+            <a:endParaRPr lang="en-US" dirty="0"/>
+          </a:p>
+          <a:p>
+            <a:pPr marL="457200" lvl="1" indent="0">
+              <a:buNone/>
+            </a:pPr>
+            <a:endParaRPr lang="en-US" dirty="0"/>
+          </a:p>
+          <a:p>
+            <a:r>
+              <a:rPr lang="en-US" dirty="0"/>
+              <a:t>Also you need remember about returned value of original function. </a:t>
+            </a:r>
+          </a:p>
+          <a:p>
+            <a:r>
+              <a:rPr lang="en-US" dirty="0"/>
+              <a:t>To using a decorator we have few ways:</a:t>
+            </a:r>
+          </a:p>
+          <a:p>
+            <a:pPr lvl="1"/>
+            <a:r>
+              <a:rPr lang="en-US" dirty="0"/>
+              <a:t>Create an instance of the decorated function</a:t>
+            </a:r>
+          </a:p>
+          <a:p>
+            <a:pPr lvl="1"/>
+            <a:r>
+              <a:rPr lang="en-US" dirty="0"/>
+              <a:t>Add decorator to defining a function with keyword </a:t>
+            </a:r>
+            <a:r>
+              <a:rPr lang="en-US" dirty="0">
+                <a:solidFill>
+                  <a:srgbClr val="FF0000"/>
+                </a:solidFill>
+              </a:rPr>
+              <a:t>@</a:t>
+            </a:r>
+            <a:r>
+              <a:rPr lang="en-US" dirty="0"/>
+              <a:t> ( Note! Every time you call a function call will be with decorator)</a:t>
+            </a:r>
+          </a:p>
+        </p:txBody>
+      </p:sp>
+      <p:sp>
+        <p:nvSpPr>
+          <p:cNvPr id="5" name="Прямоугольник 4">
+            <a:extLst>
+              <a:ext uri="{FF2B5EF4-FFF2-40B4-BE49-F238E27FC236}">
+                <a16:creationId xmlns:a16="http://schemas.microsoft.com/office/drawing/2014/main" id="{D6AF2D64-2D2F-4382-AEEC-A870EDC31456}"/>
+              </a:ext>
+            </a:extLst>
+          </p:cNvPr>
+          <p:cNvSpPr/>
+          <p:nvPr/>
+        </p:nvSpPr>
+        <p:spPr>
+          <a:xfrm>
+            <a:off x="1524001" y="3415747"/>
+            <a:ext cx="2716696" cy="1351723"/>
+          </a:xfrm>
+          <a:prstGeom prst="rect">
+            <a:avLst/>
+          </a:prstGeom>
+          <a:noFill/>
+          <a:ln>
+            <a:solidFill>
+              <a:srgbClr val="FFC000"/>
+            </a:solidFill>
+          </a:ln>
+        </p:spPr>
+        <p:style>
+          <a:lnRef idx="2">
+            <a:schemeClr val="accent1">
+              <a:shade val="50000"/>
+            </a:schemeClr>
+          </a:lnRef>
+          <a:fillRef idx="1">
+            <a:schemeClr val="accent1"/>
+          </a:fillRef>
+          <a:effectRef idx="0">
+            <a:schemeClr val="accent1"/>
+          </a:effectRef>
+          <a:fontRef idx="minor">
+            <a:schemeClr val="lt1"/>
+          </a:fontRef>
+        </p:style>
+        <p:txBody>
+          <a:bodyPr rtlCol="0" anchor="ctr"/>
+          <a:lstStyle/>
+          <a:p>
+            <a:pPr algn="ctr"/>
+            <a:endParaRPr lang="ru-RU"/>
+          </a:p>
+        </p:txBody>
+      </p:sp>
+      <p:pic>
+        <p:nvPicPr>
+          <p:cNvPr id="6" name="Рисунок 5">
+            <a:extLst>
+              <a:ext uri="{FF2B5EF4-FFF2-40B4-BE49-F238E27FC236}">
+                <a16:creationId xmlns:a16="http://schemas.microsoft.com/office/drawing/2014/main" id="{1D300C2C-D6B4-43DE-8E1C-A0EC60510B3C}"/>
+              </a:ext>
+            </a:extLst>
+          </p:cNvPr>
+          <p:cNvPicPr>
+            <a:picLocks noChangeAspect="1"/>
+          </p:cNvPicPr>
+          <p:nvPr/>
+        </p:nvPicPr>
+        <p:blipFill>
+          <a:blip r:embed="rId2"/>
+          <a:stretch>
+            <a:fillRect/>
+          </a:stretch>
+        </p:blipFill>
+        <p:spPr>
+          <a:xfrm>
+            <a:off x="7169426" y="2164569"/>
+            <a:ext cx="3153811" cy="1264431"/>
+          </a:xfrm>
+          <a:prstGeom prst="rect">
+            <a:avLst/>
+          </a:prstGeom>
+        </p:spPr>
+      </p:pic>
+      <p:pic>
+        <p:nvPicPr>
+          <p:cNvPr id="7" name="Рисунок 6">
+            <a:extLst>
+              <a:ext uri="{FF2B5EF4-FFF2-40B4-BE49-F238E27FC236}">
+                <a16:creationId xmlns:a16="http://schemas.microsoft.com/office/drawing/2014/main" id="{2F22876C-A3A2-41F3-98C8-96F60013D586}"/>
+              </a:ext>
+            </a:extLst>
+          </p:cNvPr>
+          <p:cNvPicPr>
+            <a:picLocks noChangeAspect="1"/>
+          </p:cNvPicPr>
+          <p:nvPr/>
+        </p:nvPicPr>
+        <p:blipFill>
+          <a:blip r:embed="rId3"/>
+          <a:stretch>
+            <a:fillRect/>
+          </a:stretch>
+        </p:blipFill>
+        <p:spPr>
+          <a:xfrm>
+            <a:off x="7169426" y="3544057"/>
+            <a:ext cx="4184374" cy="2152733"/>
+          </a:xfrm>
+          <a:prstGeom prst="rect">
+            <a:avLst/>
+          </a:prstGeom>
+        </p:spPr>
+      </p:pic>
+    </p:spTree>
+    <p:extLst>
+      <p:ext uri="{BB962C8B-B14F-4D97-AF65-F5344CB8AC3E}">
+        <p14:creationId xmlns:p14="http://schemas.microsoft.com/office/powerpoint/2010/main" val="3898460943"/>
+      </p:ext>
+    </p:extLst>
+  </p:cSld>
+  <p:clrMapOvr>
+    <a:masterClrMapping/>
+  </p:clrMapOvr>
+</p:sld>
+</file>
+
+<file path=ppt/slides/slide51.xml><?xml version="1.0" encoding="utf-8"?>
+<p:sld xmlns:a="http://schemas.openxmlformats.org/drawingml/2006/main" xmlns:r="http://schemas.openxmlformats.org/officeDocument/2006/relationships" xmlns:p="http://schemas.openxmlformats.org/presentationml/2006/main">
+  <p:cSld>
+    <p:spTree>
+      <p:nvGrpSpPr>
+        <p:cNvPr id="1" name=""/>
+        <p:cNvGrpSpPr/>
+        <p:nvPr/>
+      </p:nvGrpSpPr>
+      <p:grpSpPr>
+        <a:xfrm>
+          <a:off x="0" y="0"/>
+          <a:ext cx="0" cy="0"/>
+          <a:chOff x="0" y="0"/>
+          <a:chExt cx="0" cy="0"/>
+        </a:xfrm>
+      </p:grpSpPr>
+      <p:sp>
+        <p:nvSpPr>
+          <p:cNvPr id="2" name="Заголовок 1">
+            <a:extLst>
+              <a:ext uri="{FF2B5EF4-FFF2-40B4-BE49-F238E27FC236}">
                 <a16:creationId xmlns:a16="http://schemas.microsoft.com/office/drawing/2014/main" id="{0747DEB6-B27E-427E-8304-A7868DA4EB3A}"/>
               </a:ext>
             </a:extLst>
@@ -17306,7 +17574,405 @@
 </p:sld>
 </file>
 
-<file path=ppt/slides/slide51.xml><?xml version="1.0" encoding="utf-8"?>
+<file path=ppt/slides/slide52.xml><?xml version="1.0" encoding="utf-8"?>
+<p:sld xmlns:a="http://schemas.openxmlformats.org/drawingml/2006/main" xmlns:r="http://schemas.openxmlformats.org/officeDocument/2006/relationships" xmlns:p="http://schemas.openxmlformats.org/presentationml/2006/main">
+  <p:cSld>
+    <p:spTree>
+      <p:nvGrpSpPr>
+        <p:cNvPr id="1" name=""/>
+        <p:cNvGrpSpPr/>
+        <p:nvPr/>
+      </p:nvGrpSpPr>
+      <p:grpSpPr>
+        <a:xfrm>
+          <a:off x="0" y="0"/>
+          <a:ext cx="0" cy="0"/>
+          <a:chOff x="0" y="0"/>
+          <a:chExt cx="0" cy="0"/>
+        </a:xfrm>
+      </p:grpSpPr>
+      <p:sp>
+        <p:nvSpPr>
+          <p:cNvPr id="2" name="Заголовок 1">
+            <a:extLst>
+              <a:ext uri="{FF2B5EF4-FFF2-40B4-BE49-F238E27FC236}">
+                <a16:creationId xmlns:a16="http://schemas.microsoft.com/office/drawing/2014/main" id="{33C16949-0582-4B53-AA2A-D98ECFAF8F48}"/>
+              </a:ext>
+            </a:extLst>
+          </p:cNvPr>
+          <p:cNvSpPr>
+            <a:spLocks noGrp="1"/>
+          </p:cNvSpPr>
+          <p:nvPr>
+            <p:ph type="title"/>
+          </p:nvPr>
+        </p:nvSpPr>
+        <p:spPr/>
+        <p:txBody>
+          <a:bodyPr/>
+          <a:lstStyle/>
+          <a:p>
+            <a:pPr algn="ctr"/>
+            <a:r>
+              <a:rPr lang="en-US" dirty="0"/>
+              <a:t>Recursion</a:t>
+            </a:r>
+            <a:endParaRPr lang="ru-RU" dirty="0"/>
+          </a:p>
+        </p:txBody>
+      </p:sp>
+      <p:sp>
+        <p:nvSpPr>
+          <p:cNvPr id="3" name="Объект 2">
+            <a:extLst>
+              <a:ext uri="{FF2B5EF4-FFF2-40B4-BE49-F238E27FC236}">
+                <a16:creationId xmlns:a16="http://schemas.microsoft.com/office/drawing/2014/main" id="{F45569B0-788A-4CD7-89F1-47EDA203A14C}"/>
+              </a:ext>
+            </a:extLst>
+          </p:cNvPr>
+          <p:cNvSpPr>
+            <a:spLocks noGrp="1"/>
+          </p:cNvSpPr>
+          <p:nvPr>
+            <p:ph idx="1"/>
+          </p:nvPr>
+        </p:nvSpPr>
+        <p:spPr>
+          <a:xfrm>
+            <a:off x="838200" y="1825624"/>
+            <a:ext cx="5257800" cy="4760705"/>
+          </a:xfrm>
+        </p:spPr>
+        <p:txBody>
+          <a:bodyPr>
+            <a:normAutofit fontScale="92500"/>
+          </a:bodyPr>
+          <a:lstStyle/>
+          <a:p>
+            <a:r>
+              <a:rPr lang="en-US" dirty="0"/>
+              <a:t>It’s not the specific topic of python, but a powerful technique of programming. The main idea of it’s a returns function itself as many times as it needed</a:t>
+            </a:r>
+          </a:p>
+          <a:p>
+            <a:r>
+              <a:rPr lang="en-US" dirty="0"/>
+              <a:t>First, define the base case. It must return value if the passed argument match the condition</a:t>
+            </a:r>
+            <a:endParaRPr lang="ru-RU" dirty="0"/>
+          </a:p>
+          <a:p>
+            <a:r>
+              <a:rPr lang="en-US" dirty="0"/>
+              <a:t>Then return a function with modified arguments </a:t>
+            </a:r>
+          </a:p>
+          <a:p>
+            <a:r>
+              <a:rPr lang="en-US" dirty="0"/>
+              <a:t>Be careful with these conditions because it may start an infinite loop</a:t>
+            </a:r>
+            <a:endParaRPr lang="ru-RU" dirty="0"/>
+          </a:p>
+        </p:txBody>
+      </p:sp>
+      <p:pic>
+        <p:nvPicPr>
+          <p:cNvPr id="4" name="Рисунок 3">
+            <a:extLst>
+              <a:ext uri="{FF2B5EF4-FFF2-40B4-BE49-F238E27FC236}">
+                <a16:creationId xmlns:a16="http://schemas.microsoft.com/office/drawing/2014/main" id="{487AC2F7-F196-46A5-AF86-C54ADA73BF31}"/>
+              </a:ext>
+            </a:extLst>
+          </p:cNvPr>
+          <p:cNvPicPr>
+            <a:picLocks noChangeAspect="1"/>
+          </p:cNvPicPr>
+          <p:nvPr/>
+        </p:nvPicPr>
+        <p:blipFill>
+          <a:blip r:embed="rId2"/>
+          <a:stretch>
+            <a:fillRect/>
+          </a:stretch>
+        </p:blipFill>
+        <p:spPr>
+          <a:xfrm>
+            <a:off x="6489283" y="2968694"/>
+            <a:ext cx="5191472" cy="1775585"/>
+          </a:xfrm>
+          <a:prstGeom prst="rect">
+            <a:avLst/>
+          </a:prstGeom>
+        </p:spPr>
+      </p:pic>
+      <p:sp>
+        <p:nvSpPr>
+          <p:cNvPr id="5" name="Прямоугольник 4">
+            <a:extLst>
+              <a:ext uri="{FF2B5EF4-FFF2-40B4-BE49-F238E27FC236}">
+                <a16:creationId xmlns:a16="http://schemas.microsoft.com/office/drawing/2014/main" id="{0333BA4E-549C-4DA1-96AF-916DA8960981}"/>
+              </a:ext>
+            </a:extLst>
+          </p:cNvPr>
+          <p:cNvSpPr/>
+          <p:nvPr/>
+        </p:nvSpPr>
+        <p:spPr>
+          <a:xfrm>
+            <a:off x="6891130" y="3313043"/>
+            <a:ext cx="1577009" cy="490331"/>
+          </a:xfrm>
+          <a:prstGeom prst="rect">
+            <a:avLst/>
+          </a:prstGeom>
+          <a:noFill/>
+        </p:spPr>
+        <p:style>
+          <a:lnRef idx="2">
+            <a:schemeClr val="accent2"/>
+          </a:lnRef>
+          <a:fillRef idx="1">
+            <a:schemeClr val="lt1"/>
+          </a:fillRef>
+          <a:effectRef idx="0">
+            <a:schemeClr val="accent2"/>
+          </a:effectRef>
+          <a:fontRef idx="minor">
+            <a:schemeClr val="dk1"/>
+          </a:fontRef>
+        </p:style>
+        <p:txBody>
+          <a:bodyPr rtlCol="0" anchor="ctr"/>
+          <a:lstStyle/>
+          <a:p>
+            <a:pPr algn="ctr"/>
+            <a:endParaRPr lang="ru-RU"/>
+          </a:p>
+        </p:txBody>
+      </p:sp>
+      <p:cxnSp>
+        <p:nvCxnSpPr>
+          <p:cNvPr id="7" name="Прямая со стрелкой 6">
+            <a:extLst>
+              <a:ext uri="{FF2B5EF4-FFF2-40B4-BE49-F238E27FC236}">
+                <a16:creationId xmlns:a16="http://schemas.microsoft.com/office/drawing/2014/main" id="{E305B89C-3FF2-4626-8D19-C96264B3F0BB}"/>
+              </a:ext>
+            </a:extLst>
+          </p:cNvPr>
+          <p:cNvCxnSpPr>
+            <a:cxnSpLocks/>
+          </p:cNvCxnSpPr>
+          <p:nvPr/>
+        </p:nvCxnSpPr>
+        <p:spPr>
+          <a:xfrm>
+            <a:off x="6891130" y="2570922"/>
+            <a:ext cx="0" cy="742121"/>
+          </a:xfrm>
+          <a:prstGeom prst="straightConnector1">
+            <a:avLst/>
+          </a:prstGeom>
+          <a:ln>
+            <a:tailEnd type="triangle"/>
+          </a:ln>
+        </p:spPr>
+        <p:style>
+          <a:lnRef idx="3">
+            <a:schemeClr val="accent2"/>
+          </a:lnRef>
+          <a:fillRef idx="0">
+            <a:schemeClr val="accent2"/>
+          </a:fillRef>
+          <a:effectRef idx="2">
+            <a:schemeClr val="accent2"/>
+          </a:effectRef>
+          <a:fontRef idx="minor">
+            <a:schemeClr val="tx1"/>
+          </a:fontRef>
+        </p:style>
+      </p:cxnSp>
+      <p:sp>
+        <p:nvSpPr>
+          <p:cNvPr id="12" name="Прямоугольник 11">
+            <a:extLst>
+              <a:ext uri="{FF2B5EF4-FFF2-40B4-BE49-F238E27FC236}">
+                <a16:creationId xmlns:a16="http://schemas.microsoft.com/office/drawing/2014/main" id="{5319DDE8-988B-4CBF-83B7-29DCCFAFA610}"/>
+              </a:ext>
+            </a:extLst>
+          </p:cNvPr>
+          <p:cNvSpPr/>
+          <p:nvPr/>
+        </p:nvSpPr>
+        <p:spPr>
+          <a:xfrm>
+            <a:off x="6891130" y="3803374"/>
+            <a:ext cx="4611757" cy="344349"/>
+          </a:xfrm>
+          <a:prstGeom prst="rect">
+            <a:avLst/>
+          </a:prstGeom>
+          <a:noFill/>
+          <a:ln w="9525" cap="flat" cmpd="sng" algn="ctr">
+            <a:solidFill>
+              <a:schemeClr val="accent2"/>
+            </a:solidFill>
+            <a:prstDash val="solid"/>
+            <a:round/>
+            <a:headEnd type="none" w="med" len="med"/>
+            <a:tailEnd type="none" w="med" len="med"/>
+          </a:ln>
+        </p:spPr>
+        <p:style>
+          <a:lnRef idx="0">
+            <a:scrgbClr r="0" g="0" b="0"/>
+          </a:lnRef>
+          <a:fillRef idx="0">
+            <a:scrgbClr r="0" g="0" b="0"/>
+          </a:fillRef>
+          <a:effectRef idx="0">
+            <a:scrgbClr r="0" g="0" b="0"/>
+          </a:effectRef>
+          <a:fontRef idx="minor">
+            <a:schemeClr val="accent2"/>
+          </a:fontRef>
+        </p:style>
+        <p:txBody>
+          <a:bodyPr rtlCol="0" anchor="ctr"/>
+          <a:lstStyle/>
+          <a:p>
+            <a:pPr algn="ctr"/>
+            <a:endParaRPr lang="ru-RU"/>
+          </a:p>
+        </p:txBody>
+      </p:sp>
+      <p:cxnSp>
+        <p:nvCxnSpPr>
+          <p:cNvPr id="14" name="Прямая со стрелкой 13">
+            <a:extLst>
+              <a:ext uri="{FF2B5EF4-FFF2-40B4-BE49-F238E27FC236}">
+                <a16:creationId xmlns:a16="http://schemas.microsoft.com/office/drawing/2014/main" id="{F86D8063-5680-4A1E-A863-D6D2D4BE083F}"/>
+              </a:ext>
+            </a:extLst>
+          </p:cNvPr>
+          <p:cNvCxnSpPr/>
+          <p:nvPr/>
+        </p:nvCxnSpPr>
+        <p:spPr>
+          <a:xfrm>
+            <a:off x="11118574" y="2570922"/>
+            <a:ext cx="0" cy="1232452"/>
+          </a:xfrm>
+          <a:prstGeom prst="straightConnector1">
+            <a:avLst/>
+          </a:prstGeom>
+          <a:ln>
+            <a:tailEnd type="triangle"/>
+          </a:ln>
+        </p:spPr>
+        <p:style>
+          <a:lnRef idx="3">
+            <a:schemeClr val="accent2"/>
+          </a:lnRef>
+          <a:fillRef idx="0">
+            <a:schemeClr val="accent2"/>
+          </a:fillRef>
+          <a:effectRef idx="2">
+            <a:schemeClr val="accent2"/>
+          </a:effectRef>
+          <a:fontRef idx="minor">
+            <a:schemeClr val="tx1"/>
+          </a:fontRef>
+        </p:style>
+      </p:cxnSp>
+      <p:sp>
+        <p:nvSpPr>
+          <p:cNvPr id="15" name="TextBox 14">
+            <a:extLst>
+              <a:ext uri="{FF2B5EF4-FFF2-40B4-BE49-F238E27FC236}">
+                <a16:creationId xmlns:a16="http://schemas.microsoft.com/office/drawing/2014/main" id="{C601CEC0-C7AC-47D2-A733-217CBD36E36A}"/>
+              </a:ext>
+            </a:extLst>
+          </p:cNvPr>
+          <p:cNvSpPr txBox="1"/>
+          <p:nvPr/>
+        </p:nvSpPr>
+        <p:spPr>
+          <a:xfrm>
+            <a:off x="6274904" y="2201590"/>
+            <a:ext cx="1232451" cy="369332"/>
+          </a:xfrm>
+          <a:prstGeom prst="rect">
+            <a:avLst/>
+          </a:prstGeom>
+          <a:noFill/>
+        </p:spPr>
+        <p:txBody>
+          <a:bodyPr wrap="square" rtlCol="0">
+            <a:spAutoFit/>
+          </a:bodyPr>
+          <a:lstStyle/>
+          <a:p>
+            <a:r>
+              <a:rPr lang="en-US" dirty="0"/>
+              <a:t>Base Case</a:t>
+            </a:r>
+            <a:endParaRPr lang="ru-RU" dirty="0"/>
+          </a:p>
+        </p:txBody>
+      </p:sp>
+      <p:sp>
+        <p:nvSpPr>
+          <p:cNvPr id="16" name="TextBox 15">
+            <a:extLst>
+              <a:ext uri="{FF2B5EF4-FFF2-40B4-BE49-F238E27FC236}">
+                <a16:creationId xmlns:a16="http://schemas.microsoft.com/office/drawing/2014/main" id="{871356E7-935D-48B2-A011-0CEA1A801B23}"/>
+              </a:ext>
+            </a:extLst>
+          </p:cNvPr>
+          <p:cNvSpPr txBox="1"/>
+          <p:nvPr/>
+        </p:nvSpPr>
+        <p:spPr>
+          <a:xfrm>
+            <a:off x="9793362" y="1924591"/>
+            <a:ext cx="2398638" cy="923330"/>
+          </a:xfrm>
+          <a:prstGeom prst="rect">
+            <a:avLst/>
+          </a:prstGeom>
+          <a:noFill/>
+        </p:spPr>
+        <p:txBody>
+          <a:bodyPr wrap="square" rtlCol="0">
+            <a:spAutoFit/>
+          </a:bodyPr>
+          <a:lstStyle/>
+          <a:p>
+            <a:r>
+              <a:rPr lang="en-US" dirty="0"/>
+              <a:t>Return function with modified arguments</a:t>
+            </a:r>
+          </a:p>
+          <a:p>
+            <a:endParaRPr lang="ru-RU" dirty="0"/>
+          </a:p>
+        </p:txBody>
+      </p:sp>
+    </p:spTree>
+    <p:extLst>
+      <p:ext uri="{BB962C8B-B14F-4D97-AF65-F5344CB8AC3E}">
+        <p14:creationId xmlns:p14="http://schemas.microsoft.com/office/powerpoint/2010/main" val="1122437414"/>
+      </p:ext>
+    </p:extLst>
+  </p:cSld>
+  <p:clrMapOvr>
+    <a:masterClrMapping/>
+  </p:clrMapOvr>
+</p:sld>
+</file>
+
+<file path=ppt/slides/slide53.xml><?xml version="1.0" encoding="utf-8"?>
 <p:sld xmlns:a="http://schemas.openxmlformats.org/drawingml/2006/main" xmlns:r="http://schemas.openxmlformats.org/officeDocument/2006/relationships" xmlns:p="http://schemas.openxmlformats.org/presentationml/2006/main">
   <p:cSld>
     <p:spTree>
@@ -17564,7 +18230,7 @@
                   <a:ea typeface="+mj-ea"/>
                   <a:cs typeface="+mj-cs"/>
                 </a:rPr>
-                <a:t>Tasks</a:t>
+                <a:t>Tasks </a:t>
               </a:r>
               <a:endParaRPr kumimoji="0" lang="ru-RU" sz="4400" b="1" i="0" u="none" strike="noStrike" kern="1200" cap="none" spc="0" normalizeH="0" baseline="0" noProof="0" dirty="0">
                 <a:ln>
@@ -17618,7 +18284,7 @@
 </p:sld>
 </file>
 
-<file path=ppt/slides/slide52.xml><?xml version="1.0" encoding="utf-8"?>
+<file path=ppt/slides/slide54.xml><?xml version="1.0" encoding="utf-8"?>
 <p:sld xmlns:a="http://schemas.openxmlformats.org/drawingml/2006/main" xmlns:r="http://schemas.openxmlformats.org/officeDocument/2006/relationships" xmlns:p="http://schemas.openxmlformats.org/presentationml/2006/main">
   <p:cSld>
     <p:spTree>
@@ -17653,7 +18319,7 @@
         </p:spPr>
         <p:txBody>
           <a:bodyPr>
-            <a:normAutofit fontScale="70000" lnSpcReduction="20000"/>
+            <a:normAutofit fontScale="62500" lnSpcReduction="20000"/>
           </a:bodyPr>
           <a:lstStyle/>
           <a:p>
@@ -17667,7 +18333,14 @@
             </a:r>
             <a:r>
               <a:rPr lang="en-US" dirty="0"/>
-              <a:t>. Also you need a system to manage them: add, delete, find and send to defeat hero.</a:t>
+              <a:t>. Also you need a system to manage them: add, delete, find and send to defeat hero. </a:t>
+            </a:r>
+          </a:p>
+          <a:p>
+            <a:pPr lvl="1"/>
+            <a:r>
+              <a:rPr lang="en-US" dirty="0"/>
+              <a:t>Start in skeletons_start.py</a:t>
             </a:r>
           </a:p>
           <a:p>
@@ -17935,6 +18608,69 @@
     <p:extLst>
       <p:ext uri="{BB962C8B-B14F-4D97-AF65-F5344CB8AC3E}">
         <p14:creationId xmlns:p14="http://schemas.microsoft.com/office/powerpoint/2010/main" val="3382887928"/>
+      </p:ext>
+    </p:extLst>
+  </p:cSld>
+  <p:clrMapOvr>
+    <a:masterClrMapping/>
+  </p:clrMapOvr>
+</p:sld>
+</file>
+
+<file path=ppt/slides/slide55.xml><?xml version="1.0" encoding="utf-8"?>
+<p:sld xmlns:a="http://schemas.openxmlformats.org/drawingml/2006/main" xmlns:r="http://schemas.openxmlformats.org/officeDocument/2006/relationships" xmlns:p="http://schemas.openxmlformats.org/presentationml/2006/main">
+  <p:cSld>
+    <p:spTree>
+      <p:nvGrpSpPr>
+        <p:cNvPr id="1" name=""/>
+        <p:cNvGrpSpPr/>
+        <p:nvPr/>
+      </p:nvGrpSpPr>
+      <p:grpSpPr>
+        <a:xfrm>
+          <a:off x="0" y="0"/>
+          <a:ext cx="0" cy="0"/>
+          <a:chOff x="0" y="0"/>
+          <a:chExt cx="0" cy="0"/>
+        </a:xfrm>
+      </p:grpSpPr>
+      <p:sp>
+        <p:nvSpPr>
+          <p:cNvPr id="2" name="Заголовок 1"/>
+          <p:cNvSpPr>
+            <a:spLocks noGrp="1"/>
+          </p:cNvSpPr>
+          <p:nvPr>
+            <p:ph type="title"/>
+          </p:nvPr>
+        </p:nvSpPr>
+        <p:spPr>
+          <a:xfrm>
+            <a:off x="856488" y="2431669"/>
+            <a:ext cx="10515600" cy="1325563"/>
+          </a:xfrm>
+        </p:spPr>
+        <p:txBody>
+          <a:bodyPr>
+            <a:normAutofit/>
+          </a:bodyPr>
+          <a:lstStyle/>
+          <a:p>
+            <a:pPr algn="ctr"/>
+            <a:r>
+              <a:rPr lang="en-US" sz="8800" dirty="0">
+                <a:latin typeface="Forte" pitchFamily="66" charset="0"/>
+              </a:rPr>
+              <a:t>Coffee Break </a:t>
+            </a:r>
+            <a:endParaRPr lang="ru-RU" sz="8800" dirty="0"/>
+          </a:p>
+        </p:txBody>
+      </p:sp>
+    </p:spTree>
+    <p:extLst>
+      <p:ext uri="{BB962C8B-B14F-4D97-AF65-F5344CB8AC3E}">
+        <p14:creationId xmlns:p14="http://schemas.microsoft.com/office/powerpoint/2010/main" val="1822150012"/>
       </p:ext>
     </p:extLst>
   </p:cSld>

</xml_diff>

<commit_message>
feat: add set block
</commit_message>
<xml_diff>
--- a/python 101/python_101.pptx
+++ b/python 101/python_101.pptx
@@ -49,17 +49,22 @@
     <p:sldId id="302" r:id="rId43"/>
     <p:sldId id="303" r:id="rId44"/>
     <p:sldId id="305" r:id="rId45"/>
-    <p:sldId id="292" r:id="rId46"/>
-    <p:sldId id="295" r:id="rId47"/>
-    <p:sldId id="296" r:id="rId48"/>
-    <p:sldId id="299" r:id="rId49"/>
-    <p:sldId id="306" r:id="rId50"/>
-    <p:sldId id="307" r:id="rId51"/>
-    <p:sldId id="308" r:id="rId52"/>
-    <p:sldId id="312" r:id="rId53"/>
-    <p:sldId id="298" r:id="rId54"/>
-    <p:sldId id="309" r:id="rId55"/>
-    <p:sldId id="311" r:id="rId56"/>
+    <p:sldId id="313" r:id="rId46"/>
+    <p:sldId id="314" r:id="rId47"/>
+    <p:sldId id="315" r:id="rId48"/>
+    <p:sldId id="316" r:id="rId49"/>
+    <p:sldId id="317" r:id="rId50"/>
+    <p:sldId id="292" r:id="rId51"/>
+    <p:sldId id="295" r:id="rId52"/>
+    <p:sldId id="296" r:id="rId53"/>
+    <p:sldId id="299" r:id="rId54"/>
+    <p:sldId id="306" r:id="rId55"/>
+    <p:sldId id="307" r:id="rId56"/>
+    <p:sldId id="308" r:id="rId57"/>
+    <p:sldId id="312" r:id="rId58"/>
+    <p:sldId id="298" r:id="rId59"/>
+    <p:sldId id="309" r:id="rId60"/>
+    <p:sldId id="311" r:id="rId61"/>
   </p:sldIdLst>
   <p:sldSz cx="12192000" cy="6858000"/>
   <p:notesSz cx="6858000" cy="9144000"/>
@@ -2763,7 +2768,7 @@
             <a:fld id="{79F9FB66-DBE4-4599-9B3C-E1452FD2AC05}" type="datetimeFigureOut">
               <a:rPr lang="en-US" smtClean="0"/>
               <a:pPr/>
-              <a:t>9/19/2021</a:t>
+              <a:t>9/20/2021</a:t>
             </a:fld>
             <a:endParaRPr lang="en-US" dirty="0"/>
           </a:p>
@@ -2933,7 +2938,7 @@
             <a:fld id="{79F9FB66-DBE4-4599-9B3C-E1452FD2AC05}" type="datetimeFigureOut">
               <a:rPr lang="en-US" smtClean="0"/>
               <a:pPr/>
-              <a:t>9/19/2021</a:t>
+              <a:t>9/20/2021</a:t>
             </a:fld>
             <a:endParaRPr lang="en-US" dirty="0"/>
           </a:p>
@@ -3113,7 +3118,7 @@
             <a:fld id="{79F9FB66-DBE4-4599-9B3C-E1452FD2AC05}" type="datetimeFigureOut">
               <a:rPr lang="en-US" smtClean="0"/>
               <a:pPr/>
-              <a:t>9/19/2021</a:t>
+              <a:t>9/20/2021</a:t>
             </a:fld>
             <a:endParaRPr lang="en-US" dirty="0"/>
           </a:p>
@@ -3283,7 +3288,7 @@
             <a:fld id="{79F9FB66-DBE4-4599-9B3C-E1452FD2AC05}" type="datetimeFigureOut">
               <a:rPr lang="en-US" smtClean="0"/>
               <a:pPr/>
-              <a:t>9/19/2021</a:t>
+              <a:t>9/20/2021</a:t>
             </a:fld>
             <a:endParaRPr lang="en-US" dirty="0"/>
           </a:p>
@@ -3530,7 +3535,7 @@
             <a:fld id="{79F9FB66-DBE4-4599-9B3C-E1452FD2AC05}" type="datetimeFigureOut">
               <a:rPr lang="en-US" smtClean="0"/>
               <a:pPr/>
-              <a:t>9/19/2021</a:t>
+              <a:t>9/20/2021</a:t>
             </a:fld>
             <a:endParaRPr lang="en-US" dirty="0"/>
           </a:p>
@@ -3761,7 +3766,7 @@
             <a:fld id="{79F9FB66-DBE4-4599-9B3C-E1452FD2AC05}" type="datetimeFigureOut">
               <a:rPr lang="en-US" smtClean="0"/>
               <a:pPr/>
-              <a:t>9/19/2021</a:t>
+              <a:t>9/20/2021</a:t>
             </a:fld>
             <a:endParaRPr lang="en-US" dirty="0"/>
           </a:p>
@@ -4127,7 +4132,7 @@
             <a:fld id="{79F9FB66-DBE4-4599-9B3C-E1452FD2AC05}" type="datetimeFigureOut">
               <a:rPr lang="en-US" smtClean="0"/>
               <a:pPr/>
-              <a:t>9/19/2021</a:t>
+              <a:t>9/20/2021</a:t>
             </a:fld>
             <a:endParaRPr lang="en-US" dirty="0"/>
           </a:p>
@@ -4246,7 +4251,7 @@
             <a:fld id="{79F9FB66-DBE4-4599-9B3C-E1452FD2AC05}" type="datetimeFigureOut">
               <a:rPr lang="en-US" smtClean="0"/>
               <a:pPr/>
-              <a:t>9/19/2021</a:t>
+              <a:t>9/20/2021</a:t>
             </a:fld>
             <a:endParaRPr lang="en-US" dirty="0"/>
           </a:p>
@@ -4343,7 +4348,7 @@
             <a:fld id="{79F9FB66-DBE4-4599-9B3C-E1452FD2AC05}" type="datetimeFigureOut">
               <a:rPr lang="en-US" smtClean="0"/>
               <a:pPr/>
-              <a:t>9/19/2021</a:t>
+              <a:t>9/20/2021</a:t>
             </a:fld>
             <a:endParaRPr lang="en-US" dirty="0"/>
           </a:p>
@@ -4620,7 +4625,7 @@
             <a:fld id="{79F9FB66-DBE4-4599-9B3C-E1452FD2AC05}" type="datetimeFigureOut">
               <a:rPr lang="en-US" smtClean="0"/>
               <a:pPr/>
-              <a:t>9/19/2021</a:t>
+              <a:t>9/20/2021</a:t>
             </a:fld>
             <a:endParaRPr lang="en-US" dirty="0"/>
           </a:p>
@@ -4874,7 +4879,7 @@
             <a:fld id="{79F9FB66-DBE4-4599-9B3C-E1452FD2AC05}" type="datetimeFigureOut">
               <a:rPr lang="en-US" smtClean="0"/>
               <a:pPr/>
-              <a:t>9/19/2021</a:t>
+              <a:t>9/20/2021</a:t>
             </a:fld>
             <a:endParaRPr lang="en-US" dirty="0"/>
           </a:p>
@@ -5117,7 +5122,7 @@
             <a:fld id="{79F9FB66-DBE4-4599-9B3C-E1452FD2AC05}" type="datetimeFigureOut">
               <a:rPr lang="en-US" smtClean="0"/>
               <a:pPr/>
-              <a:t>9/19/2021</a:t>
+              <a:t>9/20/2021</a:t>
             </a:fld>
             <a:endParaRPr lang="en-US" dirty="0"/>
           </a:p>
@@ -15222,14 +15227,20 @@
       </p:grpSpPr>
       <p:sp>
         <p:nvSpPr>
-          <p:cNvPr id="5" name="Прямоугольник 4"/>
+          <p:cNvPr id="4" name="Прямоугольник 3">
+            <a:extLst>
+              <a:ext uri="{FF2B5EF4-FFF2-40B4-BE49-F238E27FC236}">
+                <a16:creationId xmlns:a16="http://schemas.microsoft.com/office/drawing/2014/main" id="{50F27227-B010-4814-9359-C14D716F6011}"/>
+              </a:ext>
+            </a:extLst>
+          </p:cNvPr>
           <p:cNvSpPr/>
           <p:nvPr/>
         </p:nvSpPr>
         <p:spPr>
           <a:xfrm>
-            <a:off x="4919472" y="950976"/>
-            <a:ext cx="2340864" cy="347472"/>
+            <a:off x="5486400" y="954157"/>
+            <a:ext cx="1192696" cy="318052"/>
           </a:xfrm>
           <a:prstGeom prst="rect">
             <a:avLst/>
@@ -15268,7 +15279,13 @@
       </p:sp>
       <p:sp>
         <p:nvSpPr>
-          <p:cNvPr id="2" name="Заголовок 1"/>
+          <p:cNvPr id="2" name="Заголовок 1">
+            <a:extLst>
+              <a:ext uri="{FF2B5EF4-FFF2-40B4-BE49-F238E27FC236}">
+                <a16:creationId xmlns:a16="http://schemas.microsoft.com/office/drawing/2014/main" id="{2E1751DC-06D0-43D3-B1E5-DFD39E2AF50B}"/>
+              </a:ext>
+            </a:extLst>
+          </p:cNvPr>
           <p:cNvSpPr>
             <a:spLocks noGrp="1"/>
           </p:cNvSpPr>
@@ -15283,68 +15300,22 @@
           <a:p>
             <a:pPr algn="ctr"/>
             <a:r>
-              <a:rPr lang="en-US" b="1" dirty="0"/>
-              <a:t>Functions</a:t>
-            </a:r>
-            <a:endParaRPr lang="ru-RU" b="1" dirty="0"/>
+              <a:rPr lang="en-US" dirty="0"/>
+              <a:t>Sets</a:t>
+            </a:r>
+            <a:endParaRPr lang="ru-RU" dirty="0"/>
           </a:p>
         </p:txBody>
       </p:sp>
       <p:sp>
         <p:nvSpPr>
-          <p:cNvPr id="4" name="Прямоугольник 3">
+          <p:cNvPr id="3" name="Объект 2">
             <a:extLst>
               <a:ext uri="{FF2B5EF4-FFF2-40B4-BE49-F238E27FC236}">
-                <a16:creationId xmlns:a16="http://schemas.microsoft.com/office/drawing/2014/main" id="{02F6B57E-DB9D-49AE-8DFD-785F4F311EDF}"/>
+                <a16:creationId xmlns:a16="http://schemas.microsoft.com/office/drawing/2014/main" id="{F1FE1291-FA9D-45FF-9A4B-FA7BCA73E929}"/>
               </a:ext>
             </a:extLst>
           </p:cNvPr>
-          <p:cNvSpPr/>
-          <p:nvPr/>
-        </p:nvSpPr>
-        <p:spPr>
-          <a:xfrm>
-            <a:off x="1298713" y="5009322"/>
-            <a:ext cx="3492935" cy="808382"/>
-          </a:xfrm>
-          <a:prstGeom prst="rect">
-            <a:avLst/>
-          </a:prstGeom>
-          <a:noFill/>
-          <a:ln>
-            <a:solidFill>
-              <a:srgbClr val="FFC000"/>
-            </a:solidFill>
-          </a:ln>
-        </p:spPr>
-        <p:style>
-          <a:lnRef idx="2">
-            <a:schemeClr val="accent1">
-              <a:shade val="50000"/>
-            </a:schemeClr>
-          </a:lnRef>
-          <a:fillRef idx="1">
-            <a:schemeClr val="accent1"/>
-          </a:fillRef>
-          <a:effectRef idx="0">
-            <a:schemeClr val="accent1"/>
-          </a:effectRef>
-          <a:fontRef idx="minor">
-            <a:schemeClr val="lt1"/>
-          </a:fontRef>
-        </p:style>
-        <p:txBody>
-          <a:bodyPr rtlCol="0" anchor="ctr"/>
-          <a:lstStyle/>
-          <a:p>
-            <a:pPr algn="ctr"/>
-            <a:endParaRPr lang="ru-RU"/>
-          </a:p>
-        </p:txBody>
-      </p:sp>
-      <p:sp>
-        <p:nvSpPr>
-          <p:cNvPr id="3" name="Содержимое 2"/>
           <p:cNvSpPr>
             <a:spLocks noGrp="1"/>
           </p:cNvSpPr>
@@ -15354,63 +15325,57 @@
         </p:nvSpPr>
         <p:spPr>
           <a:xfrm>
-            <a:off x="838200" y="1825625"/>
-            <a:ext cx="6294120" cy="4351338"/>
+            <a:off x="838201" y="1825625"/>
+            <a:ext cx="5840896" cy="4078218"/>
           </a:xfrm>
         </p:spPr>
         <p:txBody>
           <a:bodyPr>
-            <a:normAutofit fontScale="77500" lnSpcReduction="20000"/>
+            <a:normAutofit fontScale="92500" lnSpcReduction="10000"/>
           </a:bodyPr>
           <a:lstStyle/>
           <a:p>
             <a:r>
               <a:rPr lang="en-US" dirty="0"/>
-              <a:t>It reusable  predefined block of code, that invokes by function call</a:t>
-            </a:r>
-          </a:p>
-          <a:p>
-            <a:endParaRPr lang="en-US" dirty="0"/>
-          </a:p>
-          <a:p>
-            <a:r>
-              <a:rPr lang="en-US" dirty="0"/>
-              <a:t>Function may have a arguments </a:t>
-            </a:r>
-          </a:p>
-          <a:p>
-            <a:endParaRPr lang="en-US" dirty="0"/>
-          </a:p>
-          <a:p>
-            <a:r>
-              <a:rPr lang="en-US" dirty="0"/>
-              <a:t>… And may returns a value. A value, in this case, it any other type from python. So you may use it for calculation and pass it to another function</a:t>
-            </a:r>
-          </a:p>
-          <a:p>
-            <a:endParaRPr lang="en-US" dirty="0"/>
-          </a:p>
-          <a:p>
-            <a:r>
-              <a:rPr lang="en-US" dirty="0"/>
-              <a:t>Schema – </a:t>
-            </a:r>
-          </a:p>
-          <a:p>
-            <a:pPr marL="457200" lvl="1" indent="0">
-              <a:buNone/>
-            </a:pPr>
+              <a:t>The </a:t>
+            </a:r>
             <a:r>
               <a:rPr lang="en-US" dirty="0">
                 <a:solidFill>
                   <a:srgbClr val="FF0000"/>
                 </a:solidFill>
               </a:rPr>
-              <a:t>def</a:t>
-            </a:r>
-            <a:r>
-              <a:rPr lang="en-US" dirty="0"/>
-              <a:t> NAME </a:t>
+              <a:t>set</a:t>
+            </a:r>
+            <a:r>
+              <a:rPr lang="en-US" dirty="0"/>
+              <a:t> is a collection which is  </a:t>
+            </a:r>
+            <a:r>
+              <a:rPr lang="en-US" i="1" dirty="0"/>
+              <a:t>unordered, unindexed, </a:t>
+            </a:r>
+            <a:r>
+              <a:rPr lang="en-US" dirty="0"/>
+              <a:t>do not allow duplicate values, and have unchangeable items. </a:t>
+            </a:r>
+          </a:p>
+          <a:p>
+            <a:r>
+              <a:rPr lang="en-US" dirty="0"/>
+              <a:t>Once a set is created, you cannot change its items, but you can add new items.</a:t>
+            </a:r>
+          </a:p>
+          <a:p>
+            <a:r>
+              <a:rPr lang="en-US" dirty="0"/>
+              <a:t>To access item form set – you can loop through the set items using a for loop, </a:t>
+            </a:r>
+          </a:p>
+          <a:p>
+            <a:r>
+              <a:rPr lang="en-US" dirty="0"/>
+              <a:t>or ask if a specified value is present in a set, by using the </a:t>
             </a:r>
             <a:r>
               <a:rPr lang="en-US" dirty="0">
@@ -15418,188 +15383,52 @@
                   <a:srgbClr val="FF0000"/>
                 </a:solidFill>
               </a:rPr>
-              <a:t>(</a:t>
-            </a:r>
-            <a:r>
-              <a:rPr lang="en-US" dirty="0" err="1">
-                <a:solidFill>
-                  <a:srgbClr val="FF0000"/>
-                </a:solidFill>
-              </a:rPr>
-              <a:t>args</a:t>
-            </a:r>
-            <a:r>
-              <a:rPr lang="en-US" dirty="0">
-                <a:solidFill>
-                  <a:srgbClr val="FF0000"/>
-                </a:solidFill>
-              </a:rPr>
-              <a:t>, *</a:t>
-            </a:r>
-            <a:r>
-              <a:rPr lang="en-US" dirty="0" err="1">
-                <a:solidFill>
-                  <a:srgbClr val="FF0000"/>
-                </a:solidFill>
-              </a:rPr>
-              <a:t>args</a:t>
-            </a:r>
-            <a:r>
-              <a:rPr lang="en-US" dirty="0">
-                <a:solidFill>
-                  <a:srgbClr val="FF0000"/>
-                </a:solidFill>
-              </a:rPr>
-              <a:t>, **</a:t>
-            </a:r>
-            <a:r>
-              <a:rPr lang="en-US" dirty="0" err="1">
-                <a:solidFill>
-                  <a:srgbClr val="FF0000"/>
-                </a:solidFill>
-              </a:rPr>
-              <a:t>kwargs</a:t>
-            </a:r>
-            <a:r>
-              <a:rPr lang="en-US" dirty="0">
-                <a:solidFill>
-                  <a:srgbClr val="FF0000"/>
-                </a:solidFill>
-              </a:rPr>
-              <a:t>):</a:t>
-            </a:r>
-          </a:p>
-          <a:p>
-            <a:pPr marL="457200" lvl="1" indent="0">
-              <a:buNone/>
-            </a:pPr>
-            <a:r>
-              <a:rPr lang="en-US" dirty="0"/>
-              <a:t>	Some code</a:t>
-            </a:r>
-          </a:p>
-          <a:p>
-            <a:pPr marL="457200" lvl="1" indent="0">
-              <a:buNone/>
-            </a:pPr>
-            <a:r>
-              <a:rPr lang="en-US" dirty="0"/>
-              <a:t>	</a:t>
-            </a:r>
-            <a:r>
-              <a:rPr lang="en-US" dirty="0">
-                <a:solidFill>
-                  <a:srgbClr val="FF0000"/>
-                </a:solidFill>
-              </a:rPr>
-              <a:t>return </a:t>
-            </a:r>
-          </a:p>
-          <a:p>
+              <a:t>in </a:t>
+            </a:r>
+            <a:r>
+              <a:rPr lang="en-US" dirty="0"/>
+              <a:t>keyword </a:t>
+            </a:r>
             <a:endParaRPr lang="ru-RU" dirty="0"/>
           </a:p>
         </p:txBody>
       </p:sp>
       <p:pic>
         <p:nvPicPr>
-          <p:cNvPr id="1026" name="Picture 2"/>
+          <p:cNvPr id="7" name="Рисунок 6">
+            <a:extLst>
+              <a:ext uri="{FF2B5EF4-FFF2-40B4-BE49-F238E27FC236}">
+                <a16:creationId xmlns:a16="http://schemas.microsoft.com/office/drawing/2014/main" id="{F9C10528-E328-4A8D-8D84-2CEE1727654B}"/>
+              </a:ext>
+            </a:extLst>
+          </p:cNvPr>
           <p:cNvPicPr>
-            <a:picLocks noChangeAspect="1" noChangeArrowheads="1"/>
+            <a:picLocks noChangeAspect="1"/>
           </p:cNvPicPr>
           <p:nvPr/>
         </p:nvPicPr>
         <p:blipFill>
           <a:blip r:embed="rId2"/>
-          <a:srcRect/>
           <a:stretch>
             <a:fillRect/>
           </a:stretch>
         </p:blipFill>
-        <p:spPr bwMode="auto">
-          <a:xfrm>
-            <a:off x="7379589" y="1466468"/>
-            <a:ext cx="3789924" cy="1331595"/>
+        <p:spPr>
+          <a:xfrm>
+            <a:off x="6679096" y="2726772"/>
+            <a:ext cx="4267200" cy="1612415"/>
           </a:xfrm>
           <a:prstGeom prst="rect">
             <a:avLst/>
           </a:prstGeom>
-          <a:noFill/>
-          <a:ln w="9525">
-            <a:noFill/>
-            <a:miter lim="800000"/>
-            <a:headEnd/>
-            <a:tailEnd/>
-          </a:ln>
-          <a:effectLst/>
-        </p:spPr>
-      </p:pic>
-      <p:pic>
-        <p:nvPicPr>
-          <p:cNvPr id="1027" name="Picture 3"/>
-          <p:cNvPicPr>
-            <a:picLocks noChangeAspect="1" noChangeArrowheads="1"/>
-          </p:cNvPicPr>
-          <p:nvPr/>
-        </p:nvPicPr>
-        <p:blipFill>
-          <a:blip r:embed="rId3"/>
-          <a:srcRect/>
-          <a:stretch>
-            <a:fillRect/>
-          </a:stretch>
-        </p:blipFill>
-        <p:spPr bwMode="auto">
-          <a:xfrm>
-            <a:off x="7380732" y="3016949"/>
-            <a:ext cx="3032698" cy="1353883"/>
-          </a:xfrm>
-          <a:prstGeom prst="rect">
-            <a:avLst/>
-          </a:prstGeom>
-          <a:noFill/>
-          <a:ln w="9525">
-            <a:noFill/>
-            <a:miter lim="800000"/>
-            <a:headEnd/>
-            <a:tailEnd/>
-          </a:ln>
-          <a:effectLst/>
-        </p:spPr>
-      </p:pic>
-      <p:pic>
-        <p:nvPicPr>
-          <p:cNvPr id="1028" name="Picture 4"/>
-          <p:cNvPicPr>
-            <a:picLocks noChangeAspect="1" noChangeArrowheads="1"/>
-          </p:cNvPicPr>
-          <p:nvPr/>
-        </p:nvPicPr>
-        <p:blipFill>
-          <a:blip r:embed="rId4"/>
-          <a:srcRect/>
-          <a:stretch>
-            <a:fillRect/>
-          </a:stretch>
-        </p:blipFill>
-        <p:spPr bwMode="auto">
-          <a:xfrm>
-            <a:off x="7400353" y="4600194"/>
-            <a:ext cx="4143383" cy="1636014"/>
-          </a:xfrm>
-          <a:prstGeom prst="rect">
-            <a:avLst/>
-          </a:prstGeom>
-          <a:noFill/>
-          <a:ln w="9525">
-            <a:noFill/>
-            <a:miter lim="800000"/>
-            <a:headEnd/>
-            <a:tailEnd/>
-          </a:ln>
-          <a:effectLst/>
         </p:spPr>
       </p:pic>
     </p:spTree>
+    <p:extLst>
+      <p:ext uri="{BB962C8B-B14F-4D97-AF65-F5344CB8AC3E}">
+        <p14:creationId xmlns:p14="http://schemas.microsoft.com/office/powerpoint/2010/main" val="1457543013"/>
+      </p:ext>
+    </p:extLst>
   </p:cSld>
   <p:clrMapOvr>
     <a:masterClrMapping/>
@@ -15626,7 +15455,13 @@
       </p:grpSpPr>
       <p:sp>
         <p:nvSpPr>
-          <p:cNvPr id="2" name="Заголовок 1"/>
+          <p:cNvPr id="2" name="Заголовок 1">
+            <a:extLst>
+              <a:ext uri="{FF2B5EF4-FFF2-40B4-BE49-F238E27FC236}">
+                <a16:creationId xmlns:a16="http://schemas.microsoft.com/office/drawing/2014/main" id="{D20677D5-5C04-4D47-8B3A-B576EEE1FE4E}"/>
+              </a:ext>
+            </a:extLst>
+          </p:cNvPr>
           <p:cNvSpPr>
             <a:spLocks noGrp="1"/>
           </p:cNvSpPr>
@@ -15641,16 +15476,22 @@
           <a:p>
             <a:pPr algn="ctr"/>
             <a:r>
-              <a:rPr lang="en-US" b="1" dirty="0"/>
-              <a:t>Functions - Arguments</a:t>
-            </a:r>
-            <a:endParaRPr lang="ru-RU" b="1" dirty="0"/>
+              <a:rPr lang="en-US" dirty="0"/>
+              <a:t>Add/Remove Set Items</a:t>
+            </a:r>
+            <a:endParaRPr lang="ru-RU" dirty="0"/>
           </a:p>
         </p:txBody>
       </p:sp>
       <p:sp>
         <p:nvSpPr>
-          <p:cNvPr id="3" name="Содержимое 2"/>
+          <p:cNvPr id="3" name="Объект 2">
+            <a:extLst>
+              <a:ext uri="{FF2B5EF4-FFF2-40B4-BE49-F238E27FC236}">
+                <a16:creationId xmlns:a16="http://schemas.microsoft.com/office/drawing/2014/main" id="{6D293161-8432-4A37-922A-6F26E2BFFCA4}"/>
+              </a:ext>
+            </a:extLst>
+          </p:cNvPr>
           <p:cNvSpPr>
             <a:spLocks noGrp="1"/>
           </p:cNvSpPr>
@@ -15660,55 +15501,172 @@
         </p:nvSpPr>
         <p:spPr>
           <a:xfrm>
-            <a:off x="838200" y="1714501"/>
-            <a:ext cx="7943850" cy="2057400"/>
+            <a:off x="838200" y="1825625"/>
+            <a:ext cx="6264965" cy="4667250"/>
           </a:xfrm>
         </p:spPr>
         <p:txBody>
           <a:bodyPr>
-            <a:normAutofit/>
+            <a:normAutofit fontScale="85000" lnSpcReduction="10000"/>
           </a:bodyPr>
           <a:lstStyle/>
           <a:p>
             <a:r>
               <a:rPr lang="en-US" dirty="0"/>
-              <a:t>You can use as many arguments as you want, but prefer use a Dictionary for parameters, when them more that </a:t>
-            </a:r>
-            <a:r>
-              <a:rPr lang="ru-RU" dirty="0"/>
-              <a:t>3</a:t>
-            </a:r>
-            <a:r>
-              <a:rPr lang="en-US" dirty="0"/>
-              <a:t>. And think about decomposition( it much prefers than </a:t>
-            </a:r>
-            <a:r>
-              <a:rPr lang="en-US" dirty="0" err="1">
+              <a:t>To add one item to the set – use </a:t>
+            </a:r>
+            <a:r>
+              <a:rPr lang="en-US" dirty="0">
                 <a:solidFill>
                   <a:srgbClr val="FF0000"/>
                 </a:solidFill>
               </a:rPr>
+              <a:t>add()</a:t>
+            </a:r>
+            <a:r>
+              <a:rPr lang="en-US" dirty="0"/>
+              <a:t> method. Remember set exclude any duplicate</a:t>
+            </a:r>
+          </a:p>
+          <a:p>
+            <a:r>
+              <a:rPr lang="en-US" dirty="0"/>
+              <a:t>To add items from another set – use </a:t>
+            </a:r>
+            <a:r>
+              <a:rPr lang="en-US" dirty="0">
+                <a:solidFill>
+                  <a:srgbClr val="FF0000"/>
+                </a:solidFill>
+              </a:rPr>
+              <a:t>update()</a:t>
+            </a:r>
+            <a:r>
+              <a:rPr lang="en-US" dirty="0"/>
+              <a:t> method. Actually, update receives any </a:t>
+            </a:r>
+            <a:r>
+              <a:rPr lang="en-US" dirty="0" err="1"/>
+              <a:t>iterable</a:t>
+            </a:r>
+            <a:r>
+              <a:rPr lang="en-US" dirty="0"/>
+              <a:t> object, so you may put to it array, tuple or </a:t>
+            </a:r>
+            <a:r>
+              <a:rPr lang="en-US" dirty="0" err="1"/>
               <a:t>dict</a:t>
             </a:r>
-            <a:r>
-              <a:rPr lang="en-US" dirty="0"/>
-              <a:t>)</a:t>
-            </a:r>
-          </a:p>
-          <a:p>
             <a:endParaRPr lang="en-US" dirty="0"/>
           </a:p>
           <a:p>
+            <a:endParaRPr lang="en-US" dirty="0"/>
+          </a:p>
+          <a:p>
+            <a:r>
+              <a:rPr lang="en-US" dirty="0"/>
+              <a:t>To remove item – use </a:t>
+            </a:r>
+            <a:r>
+              <a:rPr lang="en-US" dirty="0">
+                <a:solidFill>
+                  <a:srgbClr val="FF0000"/>
+                </a:solidFill>
+              </a:rPr>
+              <a:t>remove() </a:t>
+            </a:r>
+            <a:r>
+              <a:rPr lang="en-US" dirty="0"/>
+              <a:t>or </a:t>
+            </a:r>
+            <a:r>
+              <a:rPr lang="en-US" dirty="0">
+                <a:solidFill>
+                  <a:srgbClr val="FF0000"/>
+                </a:solidFill>
+              </a:rPr>
+              <a:t>discard() </a:t>
+            </a:r>
+            <a:r>
+              <a:rPr lang="en-US" dirty="0"/>
+              <a:t>methods. But remember that </a:t>
+            </a:r>
+            <a:r>
+              <a:rPr lang="en-US" dirty="0">
+                <a:solidFill>
+                  <a:srgbClr val="FF0000"/>
+                </a:solidFill>
+              </a:rPr>
+              <a:t>remove() </a:t>
+            </a:r>
+            <a:r>
+              <a:rPr lang="en-US" dirty="0"/>
+              <a:t>raise error if item doesn’t exists.</a:t>
+            </a:r>
+          </a:p>
+          <a:p>
+            <a:r>
+              <a:rPr lang="en-US" dirty="0"/>
+              <a:t>Also you may use </a:t>
+            </a:r>
+            <a:r>
+              <a:rPr lang="en-US" dirty="0">
+                <a:solidFill>
+                  <a:srgbClr val="FF0000"/>
+                </a:solidFill>
+              </a:rPr>
+              <a:t>pop() </a:t>
+            </a:r>
+            <a:r>
+              <a:rPr lang="en-US" dirty="0"/>
+              <a:t>, but because a set doesn’t ordered it removes a random item</a:t>
+            </a:r>
+          </a:p>
+          <a:p>
+            <a:r>
+              <a:rPr lang="en-US" dirty="0"/>
+              <a:t>To remove all items – use </a:t>
+            </a:r>
+            <a:r>
+              <a:rPr lang="en-US" dirty="0">
+                <a:solidFill>
+                  <a:srgbClr val="FF0000"/>
+                </a:solidFill>
+              </a:rPr>
+              <a:t>clear() </a:t>
+            </a:r>
+            <a:r>
+              <a:rPr lang="en-US" dirty="0"/>
+              <a:t>method</a:t>
+            </a:r>
+          </a:p>
+          <a:p>
+            <a:r>
+              <a:rPr lang="en-US" dirty="0"/>
+              <a:t>To delete the set at all – use </a:t>
+            </a:r>
+            <a:r>
+              <a:rPr lang="en-US" dirty="0">
+                <a:solidFill>
+                  <a:srgbClr val="FF0000"/>
+                </a:solidFill>
+              </a:rPr>
+              <a:t>del</a:t>
+            </a:r>
+            <a:r>
+              <a:rPr lang="en-US" dirty="0"/>
+              <a:t> keyword</a:t>
+            </a:r>
             <a:endParaRPr lang="ru-RU" dirty="0"/>
           </a:p>
         </p:txBody>
       </p:sp>
       <p:pic>
         <p:nvPicPr>
-          <p:cNvPr id="5" name="Рисунок 4">
+          <p:cNvPr id="4" name="Рисунок 3">
             <a:extLst>
               <a:ext uri="{FF2B5EF4-FFF2-40B4-BE49-F238E27FC236}">
-                <a16:creationId xmlns:a16="http://schemas.microsoft.com/office/drawing/2014/main" id="{7A97CE74-A006-426A-9724-2F3B2054B99B}"/>
+                <a16:creationId xmlns:a16="http://schemas.microsoft.com/office/drawing/2014/main" id="{74BD3EE1-E487-4394-A6B5-955D64E46E39}"/>
               </a:ext>
             </a:extLst>
           </p:cNvPr>
@@ -15725,15 +15683,80 @@
         </p:blipFill>
         <p:spPr>
           <a:xfrm>
-            <a:off x="3199157" y="3429000"/>
-            <a:ext cx="5793685" cy="3286802"/>
+            <a:off x="7103165" y="2013322"/>
+            <a:ext cx="3339548" cy="1415678"/>
           </a:xfrm>
           <a:prstGeom prst="rect">
             <a:avLst/>
           </a:prstGeom>
         </p:spPr>
       </p:pic>
+      <p:pic>
+        <p:nvPicPr>
+          <p:cNvPr id="5" name="Рисунок 4">
+            <a:extLst>
+              <a:ext uri="{FF2B5EF4-FFF2-40B4-BE49-F238E27FC236}">
+                <a16:creationId xmlns:a16="http://schemas.microsoft.com/office/drawing/2014/main" id="{1B8856FA-42F3-4B85-9328-BE1C163CADC5}"/>
+              </a:ext>
+            </a:extLst>
+          </p:cNvPr>
+          <p:cNvPicPr>
+            <a:picLocks noChangeAspect="1"/>
+          </p:cNvPicPr>
+          <p:nvPr/>
+        </p:nvPicPr>
+        <p:blipFill>
+          <a:blip r:embed="rId3"/>
+          <a:stretch>
+            <a:fillRect/>
+          </a:stretch>
+        </p:blipFill>
+        <p:spPr>
+          <a:xfrm>
+            <a:off x="7103165" y="1683419"/>
+            <a:ext cx="2425148" cy="248733"/>
+          </a:xfrm>
+          <a:prstGeom prst="rect">
+            <a:avLst/>
+          </a:prstGeom>
+        </p:spPr>
+      </p:pic>
+      <p:pic>
+        <p:nvPicPr>
+          <p:cNvPr id="6" name="Рисунок 5">
+            <a:extLst>
+              <a:ext uri="{FF2B5EF4-FFF2-40B4-BE49-F238E27FC236}">
+                <a16:creationId xmlns:a16="http://schemas.microsoft.com/office/drawing/2014/main" id="{C2B5597F-22C6-4C6F-A2D1-74792A52D56C}"/>
+              </a:ext>
+            </a:extLst>
+          </p:cNvPr>
+          <p:cNvPicPr>
+            <a:picLocks noChangeAspect="1"/>
+          </p:cNvPicPr>
+          <p:nvPr/>
+        </p:nvPicPr>
+        <p:blipFill>
+          <a:blip r:embed="rId4"/>
+          <a:stretch>
+            <a:fillRect/>
+          </a:stretch>
+        </p:blipFill>
+        <p:spPr>
+          <a:xfrm>
+            <a:off x="7103165" y="3563936"/>
+            <a:ext cx="3551583" cy="2874525"/>
+          </a:xfrm>
+          <a:prstGeom prst="rect">
+            <a:avLst/>
+          </a:prstGeom>
+        </p:spPr>
+      </p:pic>
     </p:spTree>
+    <p:extLst>
+      <p:ext uri="{BB962C8B-B14F-4D97-AF65-F5344CB8AC3E}">
+        <p14:creationId xmlns:p14="http://schemas.microsoft.com/office/powerpoint/2010/main" val="3159875968"/>
+      </p:ext>
+    </p:extLst>
   </p:cSld>
   <p:clrMapOvr>
     <a:masterClrMapping/>
@@ -15742,6 +15765,349 @@
 </file>
 
 <file path=ppt/slides/slide47.xml><?xml version="1.0" encoding="utf-8"?>
+<p:sld xmlns:a="http://schemas.openxmlformats.org/drawingml/2006/main" xmlns:r="http://schemas.openxmlformats.org/officeDocument/2006/relationships" xmlns:p="http://schemas.openxmlformats.org/presentationml/2006/main">
+  <p:cSld>
+    <p:spTree>
+      <p:nvGrpSpPr>
+        <p:cNvPr id="1" name=""/>
+        <p:cNvGrpSpPr/>
+        <p:nvPr/>
+      </p:nvGrpSpPr>
+      <p:grpSpPr>
+        <a:xfrm>
+          <a:off x="0" y="0"/>
+          <a:ext cx="0" cy="0"/>
+          <a:chOff x="0" y="0"/>
+          <a:chExt cx="0" cy="0"/>
+        </a:xfrm>
+      </p:grpSpPr>
+      <p:sp>
+        <p:nvSpPr>
+          <p:cNvPr id="2" name="Заголовок 1">
+            <a:extLst>
+              <a:ext uri="{FF2B5EF4-FFF2-40B4-BE49-F238E27FC236}">
+                <a16:creationId xmlns:a16="http://schemas.microsoft.com/office/drawing/2014/main" id="{45A2A282-36B1-49C4-AF9F-45FE0C599553}"/>
+              </a:ext>
+            </a:extLst>
+          </p:cNvPr>
+          <p:cNvSpPr>
+            <a:spLocks noGrp="1"/>
+          </p:cNvSpPr>
+          <p:nvPr>
+            <p:ph type="title"/>
+          </p:nvPr>
+        </p:nvSpPr>
+        <p:spPr/>
+        <p:txBody>
+          <a:bodyPr/>
+          <a:lstStyle/>
+          <a:p>
+            <a:pPr algn="ctr"/>
+            <a:r>
+              <a:rPr lang="en-US" dirty="0"/>
+              <a:t>Actions of Set</a:t>
+            </a:r>
+            <a:endParaRPr lang="ru-RU" dirty="0"/>
+          </a:p>
+        </p:txBody>
+      </p:sp>
+      <p:sp>
+        <p:nvSpPr>
+          <p:cNvPr id="3" name="Объект 2">
+            <a:extLst>
+              <a:ext uri="{FF2B5EF4-FFF2-40B4-BE49-F238E27FC236}">
+                <a16:creationId xmlns:a16="http://schemas.microsoft.com/office/drawing/2014/main" id="{CFC6F3F5-877A-4338-8C3A-584286A907AF}"/>
+              </a:ext>
+            </a:extLst>
+          </p:cNvPr>
+          <p:cNvSpPr>
+            <a:spLocks noGrp="1"/>
+          </p:cNvSpPr>
+          <p:nvPr>
+            <p:ph idx="1"/>
+          </p:nvPr>
+        </p:nvSpPr>
+        <p:spPr>
+          <a:xfrm>
+            <a:off x="838200" y="1825624"/>
+            <a:ext cx="5469835" cy="4760705"/>
+          </a:xfrm>
+        </p:spPr>
+        <p:txBody>
+          <a:bodyPr>
+            <a:normAutofit fontScale="92500" lnSpcReduction="10000"/>
+          </a:bodyPr>
+          <a:lstStyle/>
+          <a:p>
+            <a:r>
+              <a:rPr lang="en-US" dirty="0"/>
+              <a:t>Just like in mathematics, sets in python have specific methods for joining comparing, and differences. In common all methods change the set on which it was called</a:t>
+            </a:r>
+          </a:p>
+          <a:p>
+            <a:r>
+              <a:rPr lang="en-US" dirty="0"/>
+              <a:t>For join – use </a:t>
+            </a:r>
+            <a:r>
+              <a:rPr lang="en-US" dirty="0">
+                <a:solidFill>
+                  <a:srgbClr val="FF0000"/>
+                </a:solidFill>
+              </a:rPr>
+              <a:t>union()</a:t>
+            </a:r>
+            <a:r>
+              <a:rPr lang="en-US" dirty="0"/>
+              <a:t> method. It’s also as an </a:t>
+            </a:r>
+            <a:r>
+              <a:rPr lang="en-US" dirty="0">
+                <a:solidFill>
+                  <a:srgbClr val="FF0000"/>
+                </a:solidFill>
+              </a:rPr>
+              <a:t>update()</a:t>
+            </a:r>
+            <a:r>
+              <a:rPr lang="en-US" dirty="0"/>
+              <a:t> combines the sets.</a:t>
+            </a:r>
+          </a:p>
+          <a:p>
+            <a:r>
+              <a:rPr lang="en-US" dirty="0"/>
+              <a:t>For Difference – use </a:t>
+            </a:r>
+            <a:r>
+              <a:rPr lang="en-US" dirty="0">
+                <a:solidFill>
+                  <a:srgbClr val="FF0000"/>
+                </a:solidFill>
+              </a:rPr>
+              <a:t>difference()</a:t>
+            </a:r>
+          </a:p>
+          <a:p>
+            <a:r>
+              <a:rPr lang="en-US" dirty="0"/>
+              <a:t>For intersection – use </a:t>
+            </a:r>
+            <a:r>
+              <a:rPr lang="en-US" dirty="0">
+                <a:solidFill>
+                  <a:srgbClr val="FF0000"/>
+                </a:solidFill>
+              </a:rPr>
+              <a:t>intersection()</a:t>
+            </a:r>
+          </a:p>
+          <a:p>
+            <a:r>
+              <a:rPr lang="en-US" dirty="0"/>
+              <a:t>For checks – use </a:t>
+            </a:r>
+            <a:r>
+              <a:rPr lang="en-US" dirty="0" err="1">
+                <a:solidFill>
+                  <a:srgbClr val="FF0000"/>
+                </a:solidFill>
+              </a:rPr>
+              <a:t>issubset</a:t>
+            </a:r>
+            <a:r>
+              <a:rPr lang="en-US" dirty="0">
+                <a:solidFill>
+                  <a:srgbClr val="FF0000"/>
+                </a:solidFill>
+              </a:rPr>
+              <a:t>()</a:t>
+            </a:r>
+            <a:r>
+              <a:rPr lang="en-US" dirty="0"/>
+              <a:t> and </a:t>
+            </a:r>
+            <a:r>
+              <a:rPr lang="en-US" dirty="0" err="1">
+                <a:solidFill>
+                  <a:srgbClr val="FF0000"/>
+                </a:solidFill>
+              </a:rPr>
+              <a:t>issuperset</a:t>
+            </a:r>
+            <a:r>
+              <a:rPr lang="en-US" dirty="0">
+                <a:solidFill>
+                  <a:srgbClr val="FF0000"/>
+                </a:solidFill>
+              </a:rPr>
+              <a:t>()</a:t>
+            </a:r>
+          </a:p>
+          <a:p>
+            <a:endParaRPr lang="ru-RU" dirty="0"/>
+          </a:p>
+        </p:txBody>
+      </p:sp>
+      <p:pic>
+        <p:nvPicPr>
+          <p:cNvPr id="4" name="Рисунок 3">
+            <a:extLst>
+              <a:ext uri="{FF2B5EF4-FFF2-40B4-BE49-F238E27FC236}">
+                <a16:creationId xmlns:a16="http://schemas.microsoft.com/office/drawing/2014/main" id="{A8063200-2511-43A9-ABD0-C008CC2B297D}"/>
+              </a:ext>
+            </a:extLst>
+          </p:cNvPr>
+          <p:cNvPicPr>
+            <a:picLocks noChangeAspect="1"/>
+          </p:cNvPicPr>
+          <p:nvPr/>
+        </p:nvPicPr>
+        <p:blipFill>
+          <a:blip r:embed="rId2"/>
+          <a:stretch>
+            <a:fillRect/>
+          </a:stretch>
+        </p:blipFill>
+        <p:spPr>
+          <a:xfrm>
+            <a:off x="6540155" y="2287036"/>
+            <a:ext cx="5227484" cy="3119851"/>
+          </a:xfrm>
+          <a:prstGeom prst="rect">
+            <a:avLst/>
+          </a:prstGeom>
+        </p:spPr>
+      </p:pic>
+    </p:spTree>
+    <p:extLst>
+      <p:ext uri="{BB962C8B-B14F-4D97-AF65-F5344CB8AC3E}">
+        <p14:creationId xmlns:p14="http://schemas.microsoft.com/office/powerpoint/2010/main" val="1854816996"/>
+      </p:ext>
+    </p:extLst>
+  </p:cSld>
+  <p:clrMapOvr>
+    <a:masterClrMapping/>
+  </p:clrMapOvr>
+</p:sld>
+</file>
+
+<file path=ppt/slides/slide48.xml><?xml version="1.0" encoding="utf-8"?>
+<p:sld xmlns:a="http://schemas.openxmlformats.org/drawingml/2006/main" xmlns:r="http://schemas.openxmlformats.org/officeDocument/2006/relationships" xmlns:p="http://schemas.openxmlformats.org/presentationml/2006/main">
+  <p:cSld>
+    <p:spTree>
+      <p:nvGrpSpPr>
+        <p:cNvPr id="1" name=""/>
+        <p:cNvGrpSpPr/>
+        <p:nvPr/>
+      </p:nvGrpSpPr>
+      <p:grpSpPr>
+        <a:xfrm>
+          <a:off x="0" y="0"/>
+          <a:ext cx="0" cy="0"/>
+          <a:chOff x="0" y="0"/>
+          <a:chExt cx="0" cy="0"/>
+        </a:xfrm>
+      </p:grpSpPr>
+      <p:sp>
+        <p:nvSpPr>
+          <p:cNvPr id="2" name="Заголовок 1">
+            <a:extLst>
+              <a:ext uri="{FF2B5EF4-FFF2-40B4-BE49-F238E27FC236}">
+                <a16:creationId xmlns:a16="http://schemas.microsoft.com/office/drawing/2014/main" id="{E5EB5D8F-C6D1-43FD-9030-57273CC0EC90}"/>
+              </a:ext>
+            </a:extLst>
+          </p:cNvPr>
+          <p:cNvSpPr>
+            <a:spLocks noGrp="1"/>
+          </p:cNvSpPr>
+          <p:nvPr>
+            <p:ph type="title"/>
+          </p:nvPr>
+        </p:nvSpPr>
+        <p:spPr/>
+        <p:txBody>
+          <a:bodyPr/>
+          <a:lstStyle/>
+          <a:p>
+            <a:pPr algn="ctr"/>
+            <a:r>
+              <a:rPr lang="en-US" dirty="0"/>
+              <a:t>Methods of Set</a:t>
+            </a:r>
+            <a:endParaRPr lang="ru-RU" dirty="0"/>
+          </a:p>
+        </p:txBody>
+      </p:sp>
+      <p:sp>
+        <p:nvSpPr>
+          <p:cNvPr id="3" name="Объект 2">
+            <a:extLst>
+              <a:ext uri="{FF2B5EF4-FFF2-40B4-BE49-F238E27FC236}">
+                <a16:creationId xmlns:a16="http://schemas.microsoft.com/office/drawing/2014/main" id="{F844A7B8-9278-407C-929A-D88EDEB9AB0F}"/>
+              </a:ext>
+            </a:extLst>
+          </p:cNvPr>
+          <p:cNvSpPr>
+            <a:spLocks noGrp="1"/>
+          </p:cNvSpPr>
+          <p:nvPr>
+            <p:ph idx="1"/>
+          </p:nvPr>
+        </p:nvSpPr>
+        <p:spPr/>
+        <p:txBody>
+          <a:bodyPr/>
+          <a:lstStyle/>
+          <a:p>
+            <a:endParaRPr lang="ru-RU"/>
+          </a:p>
+        </p:txBody>
+      </p:sp>
+      <p:pic>
+        <p:nvPicPr>
+          <p:cNvPr id="4" name="Рисунок 3">
+            <a:extLst>
+              <a:ext uri="{FF2B5EF4-FFF2-40B4-BE49-F238E27FC236}">
+                <a16:creationId xmlns:a16="http://schemas.microsoft.com/office/drawing/2014/main" id="{09DC1D4A-BC70-4DD8-A436-07FC8B6D34B9}"/>
+              </a:ext>
+            </a:extLst>
+          </p:cNvPr>
+          <p:cNvPicPr>
+            <a:picLocks noChangeAspect="1"/>
+          </p:cNvPicPr>
+          <p:nvPr/>
+        </p:nvPicPr>
+        <p:blipFill>
+          <a:blip r:embed="rId2"/>
+          <a:stretch>
+            <a:fillRect/>
+          </a:stretch>
+        </p:blipFill>
+        <p:spPr>
+          <a:xfrm>
+            <a:off x="2490787" y="1343025"/>
+            <a:ext cx="7210425" cy="5514975"/>
+          </a:xfrm>
+          <a:prstGeom prst="rect">
+            <a:avLst/>
+          </a:prstGeom>
+        </p:spPr>
+      </p:pic>
+    </p:spTree>
+    <p:extLst>
+      <p:ext uri="{BB962C8B-B14F-4D97-AF65-F5344CB8AC3E}">
+        <p14:creationId xmlns:p14="http://schemas.microsoft.com/office/powerpoint/2010/main" val="302922128"/>
+      </p:ext>
+    </p:extLst>
+  </p:cSld>
+  <p:clrMapOvr>
+    <a:masterClrMapping/>
+  </p:clrMapOvr>
+</p:sld>
+</file>
+
+<file path=ppt/slides/slide49.xml><?xml version="1.0" encoding="utf-8"?>
 <p:sld xmlns:a="http://schemas.openxmlformats.org/drawingml/2006/main" xmlns:r="http://schemas.openxmlformats.org/officeDocument/2006/relationships" xmlns:p="http://schemas.openxmlformats.org/presentationml/2006/main">
   <p:cSld>
     <p:spTree>
@@ -15770,1016 +16136,244 @@
         </p:nvSpPr>
         <p:spPr>
           <a:xfrm>
-            <a:off x="783336" y="310896"/>
-            <a:ext cx="5068824" cy="6547104"/>
+            <a:off x="914400" y="1499616"/>
+            <a:ext cx="10439400" cy="5358384"/>
           </a:xfrm>
         </p:spPr>
         <p:txBody>
           <a:bodyPr>
-            <a:normAutofit fontScale="85000" lnSpcReduction="20000"/>
+            <a:normAutofit/>
           </a:bodyPr>
           <a:lstStyle/>
           <a:p>
-            <a:r>
-              <a:rPr lang="en-US" dirty="0"/>
-              <a:t>As in example before you can use a Key Arguments or </a:t>
-            </a:r>
-            <a:r>
-              <a:rPr lang="en-US" dirty="0">
-                <a:solidFill>
-                  <a:srgbClr val="FF0000"/>
-                </a:solidFill>
-              </a:rPr>
-              <a:t>**</a:t>
-            </a:r>
-            <a:r>
-              <a:rPr lang="en-US" dirty="0" err="1">
-                <a:solidFill>
-                  <a:srgbClr val="FF0000"/>
-                </a:solidFill>
-              </a:rPr>
-              <a:t>kwargs</a:t>
-            </a:r>
-            <a:r>
-              <a:rPr lang="en-US" dirty="0">
-                <a:solidFill>
-                  <a:srgbClr val="FF0000"/>
-                </a:solidFill>
-              </a:rPr>
-              <a:t> </a:t>
-            </a:r>
-            <a:r>
-              <a:rPr lang="en-US" dirty="0"/>
-              <a:t>– special python syntax for function </a:t>
-            </a:r>
-          </a:p>
-          <a:p>
-            <a:endParaRPr lang="en-US" dirty="0"/>
-          </a:p>
-          <a:p>
-            <a:endParaRPr lang="en-US" dirty="0"/>
-          </a:p>
-          <a:p>
-            <a:r>
-              <a:rPr lang="en-US" dirty="0"/>
-              <a:t>OR also use named </a:t>
-            </a:r>
-            <a:r>
-              <a:rPr lang="en-US" dirty="0" err="1"/>
-              <a:t>args</a:t>
-            </a:r>
-            <a:endParaRPr lang="ru-RU" dirty="0"/>
-          </a:p>
-          <a:p>
-            <a:pPr marL="0" indent="0">
-              <a:buNone/>
+            <a:pPr marL="571500" indent="-571500">
+              <a:buFont typeface="+mj-lt"/>
+              <a:buAutoNum type="romanUcPeriod"/>
             </a:pPr>
-            <a:endParaRPr lang="en-US" dirty="0"/>
-          </a:p>
-          <a:p>
-            <a:endParaRPr lang="ru-RU" dirty="0"/>
-          </a:p>
-          <a:p>
-            <a:r>
-              <a:rPr lang="en-US" dirty="0"/>
-              <a:t>If number of arguments unknown – use a Arbitrary Arguments. ( usually this </a:t>
-            </a:r>
-            <a:r>
-              <a:rPr lang="en-US" dirty="0">
-                <a:solidFill>
-                  <a:srgbClr val="FF0000"/>
-                </a:solidFill>
-              </a:rPr>
-              <a:t>*</a:t>
-            </a:r>
-            <a:r>
-              <a:rPr lang="en-US" dirty="0" err="1">
-                <a:solidFill>
-                  <a:srgbClr val="FF0000"/>
-                </a:solidFill>
-              </a:rPr>
-              <a:t>ags</a:t>
-            </a:r>
-            <a:r>
-              <a:rPr lang="en-US" dirty="0"/>
-              <a:t>, but you may define it as you want )</a:t>
-            </a:r>
-          </a:p>
-          <a:p>
-            <a:pPr marL="0" indent="0">
-              <a:buNone/>
+            <a:r>
+              <a:rPr lang="en-US" dirty="0"/>
+              <a:t>Remove all duplicate from names: list</a:t>
+            </a:r>
+          </a:p>
+          <a:p>
+            <a:pPr lvl="1"/>
+            <a:r>
+              <a:rPr lang="en-US" sz="2000" dirty="0"/>
+              <a:t>names = ['Lucy', 'Frank', 'Ann', 'Garry', 'Frank', 'Alex', 'Penny', 'Garry', 'Tom', 'Frank']</a:t>
+            </a:r>
+          </a:p>
+          <a:p>
+            <a:pPr lvl="1"/>
+            <a:r>
+              <a:rPr lang="en-US" sz="2000" dirty="0"/>
+              <a:t>Use Set for it</a:t>
+            </a:r>
+          </a:p>
+          <a:p>
+            <a:pPr lvl="1"/>
+            <a:r>
+              <a:rPr lang="en-US" sz="2000" dirty="0"/>
+              <a:t>Do it also without set </a:t>
+            </a:r>
+          </a:p>
+          <a:p>
+            <a:pPr lvl="1"/>
+            <a:endParaRPr lang="en-US" sz="2000" dirty="0"/>
+          </a:p>
+          <a:p>
+            <a:pPr marL="571500" indent="-571500">
+              <a:buFont typeface="+mj-lt"/>
+              <a:buAutoNum type="romanUcPeriod"/>
             </a:pPr>
-            <a:endParaRPr lang="en-US" dirty="0"/>
-          </a:p>
-          <a:p>
-            <a:r>
-              <a:rPr lang="en-US" dirty="0"/>
-              <a:t>If you plan use default value python provide you a possibility with default value</a:t>
-            </a:r>
-          </a:p>
-          <a:p>
-            <a:endParaRPr lang="en-US" dirty="0"/>
-          </a:p>
-          <a:p>
-            <a:r>
-              <a:rPr lang="en-US" dirty="0"/>
-              <a:t>More about function arguments you may find in </a:t>
-            </a:r>
-            <a:r>
-              <a:rPr lang="en-US" dirty="0">
-                <a:hlinkClick r:id="rId2"/>
-              </a:rPr>
-              <a:t>docs</a:t>
-            </a:r>
-            <a:r>
-              <a:rPr lang="en-US" dirty="0"/>
-              <a:t> 	</a:t>
-            </a:r>
-          </a:p>
-          <a:p>
-            <a:endParaRPr lang="ru-RU" dirty="0"/>
+            <a:r>
+              <a:rPr lang="en-US" dirty="0"/>
+              <a:t>We have a lists of users who subscribed to magazine and emails. </a:t>
+            </a:r>
+          </a:p>
+          <a:p>
+            <a:pPr lvl="1"/>
+            <a:r>
+              <a:rPr lang="en-US" sz="2000" dirty="0"/>
+              <a:t>Emails = ['josh', '</a:t>
+            </a:r>
+            <a:r>
+              <a:rPr lang="en-US" sz="2000" dirty="0" err="1"/>
+              <a:t>alex</a:t>
+            </a:r>
+            <a:r>
+              <a:rPr lang="en-US" sz="2000" dirty="0"/>
+              <a:t>', 'lord', 'marry', 'penny', 'dog']</a:t>
+            </a:r>
+            <a:r>
+              <a:rPr lang="en-US" dirty="0"/>
+              <a:t> </a:t>
+            </a:r>
+          </a:p>
+          <a:p>
+            <a:pPr lvl="1"/>
+            <a:r>
+              <a:rPr lang="en-US" sz="2000" dirty="0"/>
+              <a:t>Magazine = ['</a:t>
+            </a:r>
+            <a:r>
+              <a:rPr lang="en-US" sz="2000" dirty="0" err="1"/>
+              <a:t>alex</a:t>
+            </a:r>
+            <a:r>
+              <a:rPr lang="en-US" sz="2000" dirty="0"/>
+              <a:t>', 'frank', 'harry', '</a:t>
+            </a:r>
+            <a:r>
+              <a:rPr lang="en-US" sz="2000" dirty="0" err="1"/>
+              <a:t>yourCrash</a:t>
+            </a:r>
+            <a:r>
+              <a:rPr lang="en-US" sz="2000" dirty="0"/>
+              <a:t>', 'lord']</a:t>
+            </a:r>
+          </a:p>
+          <a:p>
+            <a:pPr lvl="1"/>
+            <a:r>
+              <a:rPr lang="en-US" sz="2000" dirty="0"/>
+              <a:t>Find users that subscribed to magazine only</a:t>
+            </a:r>
+          </a:p>
+          <a:p>
+            <a:pPr lvl="1"/>
+            <a:r>
+              <a:rPr lang="en-US" sz="2000" dirty="0"/>
+              <a:t>Find users that subscribed to emails only</a:t>
+            </a:r>
+          </a:p>
+          <a:p>
+            <a:pPr lvl="1"/>
+            <a:r>
+              <a:rPr lang="en-US" sz="2000" dirty="0"/>
+              <a:t>Find users that subscribed to both magazine and emails</a:t>
+            </a:r>
           </a:p>
         </p:txBody>
       </p:sp>
-      <p:pic>
-        <p:nvPicPr>
-          <p:cNvPr id="2051" name="Picture 3"/>
-          <p:cNvPicPr>
-            <a:picLocks noChangeAspect="1" noChangeArrowheads="1"/>
-          </p:cNvPicPr>
+      <p:grpSp>
+        <p:nvGrpSpPr>
+          <p:cNvPr id="2" name="Группа 3"/>
+          <p:cNvGrpSpPr/>
           <p:nvPr/>
-        </p:nvPicPr>
-        <p:blipFill>
-          <a:blip r:embed="rId3"/>
-          <a:srcRect/>
-          <a:stretch>
-            <a:fillRect/>
-          </a:stretch>
-        </p:blipFill>
-        <p:spPr bwMode="auto">
-          <a:xfrm>
-            <a:off x="5852008" y="1733387"/>
-            <a:ext cx="5240062" cy="1374594"/>
-          </a:xfrm>
-          <a:prstGeom prst="rect">
-            <a:avLst/>
-          </a:prstGeom>
-          <a:noFill/>
-          <a:ln w="9525">
+        </p:nvGrpSpPr>
+        <p:grpSpPr>
+          <a:xfrm>
+            <a:off x="762000" y="338621"/>
+            <a:ext cx="10515600" cy="1325563"/>
+            <a:chOff x="838200" y="365125"/>
+            <a:chExt cx="10515600" cy="1325563"/>
+          </a:xfrm>
+        </p:grpSpPr>
+        <p:sp>
+          <p:nvSpPr>
+            <p:cNvPr id="5" name="Заголовок 1"/>
+            <p:cNvSpPr txBox="1">
+              <a:spLocks/>
+            </p:cNvSpPr>
+            <p:nvPr/>
+          </p:nvSpPr>
+          <p:spPr>
+            <a:xfrm>
+              <a:off x="838200" y="365125"/>
+              <a:ext cx="10515600" cy="1325563"/>
+            </a:xfrm>
+            <a:prstGeom prst="rect">
+              <a:avLst/>
+            </a:prstGeom>
+          </p:spPr>
+          <p:txBody>
+            <a:bodyPr vert="horz" lIns="91440" tIns="45720" rIns="91440" bIns="45720" rtlCol="0" anchor="ctr">
+              <a:normAutofit/>
+            </a:bodyPr>
+            <a:lstStyle/>
+            <a:p>
+              <a:pPr marL="0" marR="0" lvl="0" indent="0" algn="ctr" defTabSz="914400" rtl="0" eaLnBrk="1" fontAlgn="auto" latinLnBrk="0" hangingPunct="1">
+                <a:lnSpc>
+                  <a:spcPct val="90000"/>
+                </a:lnSpc>
+                <a:spcBef>
+                  <a:spcPct val="0"/>
+                </a:spcBef>
+                <a:spcAft>
+                  <a:spcPts val="0"/>
+                </a:spcAft>
+                <a:buClrTx/>
+                <a:buSzTx/>
+                <a:buFontTx/>
+                <a:buNone/>
+                <a:tabLst/>
+                <a:defRPr/>
+              </a:pPr>
+              <a:r>
+                <a:rPr kumimoji="0" lang="en-US" sz="4400" b="1" i="0" u="none" strike="noStrike" kern="1200" cap="none" spc="0" normalizeH="0" baseline="0" noProof="0" dirty="0">
+                  <a:ln>
+                    <a:noFill/>
+                  </a:ln>
+                  <a:solidFill>
+                    <a:schemeClr val="tx1"/>
+                  </a:solidFill>
+                  <a:effectLst/>
+                  <a:uLnTx/>
+                  <a:uFillTx/>
+                  <a:latin typeface="+mj-lt"/>
+                  <a:ea typeface="+mj-ea"/>
+                  <a:cs typeface="+mj-cs"/>
+                </a:rPr>
+                <a:t>Tasks</a:t>
+              </a:r>
+              <a:endParaRPr kumimoji="0" lang="ru-RU" sz="4400" b="1" i="0" u="none" strike="noStrike" kern="1200" cap="none" spc="0" normalizeH="0" baseline="0" noProof="0" dirty="0">
+                <a:ln>
+                  <a:noFill/>
+                </a:ln>
+                <a:solidFill>
+                  <a:schemeClr val="tx1"/>
+                </a:solidFill>
+                <a:effectLst/>
+                <a:uLnTx/>
+                <a:uFillTx/>
+                <a:latin typeface="+mj-lt"/>
+                <a:ea typeface="+mj-ea"/>
+                <a:cs typeface="+mj-cs"/>
+              </a:endParaRPr>
+            </a:p>
+          </p:txBody>
+        </p:sp>
+        <p:pic>
+          <p:nvPicPr>
+            <p:cNvPr id="6" name="Picture 2" descr="Pin on Бесплатные иконки"/>
+            <p:cNvPicPr>
+              <a:picLocks noChangeAspect="1" noChangeArrowheads="1"/>
+            </p:cNvPicPr>
+            <p:nvPr/>
+          </p:nvPicPr>
+          <p:blipFill>
+            <a:blip r:embed="rId2" cstate="print"/>
+            <a:srcRect/>
+            <a:stretch>
+              <a:fillRect/>
+            </a:stretch>
+          </p:blipFill>
+          <p:spPr bwMode="auto">
+            <a:xfrm>
+              <a:off x="4672711" y="603504"/>
+              <a:ext cx="795401" cy="795401"/>
+            </a:xfrm>
+            <a:prstGeom prst="rect">
+              <a:avLst/>
+            </a:prstGeom>
             <a:noFill/>
-            <a:miter lim="800000"/>
-            <a:headEnd/>
-            <a:tailEnd/>
-          </a:ln>
-          <a:effectLst/>
-        </p:spPr>
-      </p:pic>
-      <p:pic>
-        <p:nvPicPr>
-          <p:cNvPr id="2052" name="Picture 4"/>
-          <p:cNvPicPr>
-            <a:picLocks noChangeAspect="1" noChangeArrowheads="1"/>
-          </p:cNvPicPr>
-          <p:nvPr/>
-        </p:nvPicPr>
-        <p:blipFill>
-          <a:blip r:embed="rId4"/>
-          <a:srcRect/>
-          <a:stretch>
-            <a:fillRect/>
-          </a:stretch>
-        </p:blipFill>
-        <p:spPr bwMode="auto">
-          <a:xfrm>
-            <a:off x="5852160" y="12338"/>
-            <a:ext cx="3102113" cy="1641733"/>
-          </a:xfrm>
-          <a:prstGeom prst="rect">
-            <a:avLst/>
-          </a:prstGeom>
-          <a:noFill/>
-          <a:ln w="9525">
-            <a:noFill/>
-            <a:miter lim="800000"/>
-            <a:headEnd/>
-            <a:tailEnd/>
-          </a:ln>
-          <a:effectLst/>
-        </p:spPr>
-      </p:pic>
-      <p:pic>
-        <p:nvPicPr>
-          <p:cNvPr id="2053" name="Picture 5"/>
-          <p:cNvPicPr>
-            <a:picLocks noChangeAspect="1" noChangeArrowheads="1"/>
-          </p:cNvPicPr>
-          <p:nvPr/>
-        </p:nvPicPr>
-        <p:blipFill>
-          <a:blip r:embed="rId5"/>
-          <a:srcRect/>
-          <a:stretch>
-            <a:fillRect/>
-          </a:stretch>
-        </p:blipFill>
-        <p:spPr bwMode="auto">
-          <a:xfrm>
-            <a:off x="5852160" y="3194427"/>
-            <a:ext cx="3768868" cy="1111186"/>
-          </a:xfrm>
-          <a:prstGeom prst="rect">
-            <a:avLst/>
-          </a:prstGeom>
-          <a:noFill/>
-          <a:ln w="9525">
-            <a:noFill/>
-            <a:miter lim="800000"/>
-            <a:headEnd/>
-            <a:tailEnd/>
-          </a:ln>
-          <a:effectLst/>
-        </p:spPr>
-      </p:pic>
-      <p:pic>
-        <p:nvPicPr>
-          <p:cNvPr id="2054" name="Picture 6"/>
-          <p:cNvPicPr>
-            <a:picLocks noChangeAspect="1" noChangeArrowheads="1"/>
-          </p:cNvPicPr>
-          <p:nvPr/>
-        </p:nvPicPr>
-        <p:blipFill>
-          <a:blip r:embed="rId6"/>
-          <a:srcRect/>
-          <a:stretch>
-            <a:fillRect/>
-          </a:stretch>
-        </p:blipFill>
-        <p:spPr bwMode="auto">
-          <a:xfrm>
-            <a:off x="5852008" y="4468989"/>
-            <a:ext cx="3543783" cy="1172670"/>
-          </a:xfrm>
-          <a:prstGeom prst="rect">
-            <a:avLst/>
-          </a:prstGeom>
-          <a:noFill/>
-          <a:ln w="9525">
-            <a:noFill/>
-            <a:miter lim="800000"/>
-            <a:headEnd/>
-            <a:tailEnd/>
-          </a:ln>
-          <a:effectLst/>
-        </p:spPr>
-      </p:pic>
-    </p:spTree>
-  </p:cSld>
-  <p:clrMapOvr>
-    <a:masterClrMapping/>
-  </p:clrMapOvr>
-</p:sld>
-</file>
-
-<file path=ppt/slides/slide48.xml><?xml version="1.0" encoding="utf-8"?>
-<p:sld xmlns:a="http://schemas.openxmlformats.org/drawingml/2006/main" xmlns:r="http://schemas.openxmlformats.org/officeDocument/2006/relationships" xmlns:p="http://schemas.openxmlformats.org/presentationml/2006/main">
-  <p:cSld>
-    <p:spTree>
-      <p:nvGrpSpPr>
-        <p:cNvPr id="1" name=""/>
-        <p:cNvGrpSpPr/>
-        <p:nvPr/>
-      </p:nvGrpSpPr>
-      <p:grpSpPr>
-        <a:xfrm>
-          <a:off x="0" y="0"/>
-          <a:ext cx="0" cy="0"/>
-          <a:chOff x="0" y="0"/>
-          <a:chExt cx="0" cy="0"/>
-        </a:xfrm>
-      </p:grpSpPr>
-      <p:sp>
-        <p:nvSpPr>
-          <p:cNvPr id="2" name="Заголовок 1"/>
-          <p:cNvSpPr>
-            <a:spLocks noGrp="1"/>
-          </p:cNvSpPr>
-          <p:nvPr>
-            <p:ph type="title"/>
-          </p:nvPr>
-        </p:nvSpPr>
-        <p:spPr/>
-        <p:txBody>
-          <a:bodyPr/>
-          <a:lstStyle/>
-          <a:p>
-            <a:pPr algn="ctr"/>
-            <a:r>
-              <a:rPr lang="en-US" b="1" dirty="0"/>
-              <a:t>Lambda</a:t>
-            </a:r>
-            <a:endParaRPr lang="ru-RU" b="1" dirty="0"/>
-          </a:p>
-        </p:txBody>
-      </p:sp>
-      <p:sp>
-        <p:nvSpPr>
-          <p:cNvPr id="3" name="Содержимое 2"/>
-          <p:cNvSpPr>
-            <a:spLocks noGrp="1"/>
-          </p:cNvSpPr>
-          <p:nvPr>
-            <p:ph idx="1"/>
-          </p:nvPr>
-        </p:nvSpPr>
-        <p:spPr>
-          <a:xfrm>
-            <a:off x="838200" y="1825625"/>
-            <a:ext cx="7192617" cy="4151105"/>
-          </a:xfrm>
-        </p:spPr>
-        <p:txBody>
-          <a:bodyPr>
-            <a:normAutofit fontScale="92500" lnSpcReduction="10000"/>
-          </a:bodyPr>
-          <a:lstStyle/>
-          <a:p>
-            <a:r>
-              <a:rPr lang="en-US" dirty="0"/>
-              <a:t>A lambda function is a small anonymous function.</a:t>
-            </a:r>
-          </a:p>
-          <a:p>
-            <a:r>
-              <a:rPr lang="en-US" dirty="0"/>
-              <a:t>A lambda function can take any number of arguments, but can only have one expression.</a:t>
-            </a:r>
-          </a:p>
-          <a:p>
-            <a:pPr lvl="1"/>
-            <a:r>
-              <a:rPr lang="en-US" dirty="0">
-                <a:solidFill>
-                  <a:srgbClr val="FF0000"/>
-                </a:solidFill>
-              </a:rPr>
-              <a:t>lambda </a:t>
-            </a:r>
-            <a:r>
-              <a:rPr lang="en-US" dirty="0" err="1">
-                <a:solidFill>
-                  <a:srgbClr val="FF0000"/>
-                </a:solidFill>
-              </a:rPr>
-              <a:t>args</a:t>
-            </a:r>
-            <a:r>
-              <a:rPr lang="en-US" dirty="0">
-                <a:solidFill>
-                  <a:srgbClr val="FF0000"/>
-                </a:solidFill>
-              </a:rPr>
-              <a:t>: exp</a:t>
-            </a:r>
-          </a:p>
-          <a:p>
-            <a:pPr lvl="1"/>
-            <a:endParaRPr lang="en-US" dirty="0">
-              <a:solidFill>
-                <a:srgbClr val="FF0000"/>
-              </a:solidFill>
-            </a:endParaRPr>
-          </a:p>
-          <a:p>
-            <a:r>
-              <a:rPr lang="en-US" dirty="0"/>
-              <a:t>The power of lambda is better shown when you use them as an anonymous function inside another function.</a:t>
-            </a:r>
-          </a:p>
-          <a:p>
-            <a:r>
-              <a:rPr lang="en-US" dirty="0"/>
-              <a:t>Say you have a function definition that takes one argument, and that argument will be power by an unknown number</a:t>
-            </a:r>
-          </a:p>
-          <a:p>
-            <a:pPr marL="457200" lvl="1" indent="0">
-              <a:buNone/>
-            </a:pPr>
-            <a:endParaRPr lang="en-US" dirty="0">
-              <a:solidFill>
-                <a:srgbClr val="FF0000"/>
-              </a:solidFill>
-            </a:endParaRPr>
-          </a:p>
-        </p:txBody>
-      </p:sp>
-      <p:pic>
-        <p:nvPicPr>
-          <p:cNvPr id="4" name="Рисунок 3">
-            <a:extLst>
-              <a:ext uri="{FF2B5EF4-FFF2-40B4-BE49-F238E27FC236}">
-                <a16:creationId xmlns:a16="http://schemas.microsoft.com/office/drawing/2014/main" id="{8B7CC15A-B63A-459D-B609-94D5E16290B3}"/>
-              </a:ext>
-            </a:extLst>
-          </p:cNvPr>
-          <p:cNvPicPr>
-            <a:picLocks noChangeAspect="1"/>
-          </p:cNvPicPr>
-          <p:nvPr/>
-        </p:nvPicPr>
-        <p:blipFill>
-          <a:blip r:embed="rId2"/>
-          <a:stretch>
-            <a:fillRect/>
-          </a:stretch>
-        </p:blipFill>
-        <p:spPr>
-          <a:xfrm>
-            <a:off x="8030817" y="2289934"/>
-            <a:ext cx="3017094" cy="623095"/>
-          </a:xfrm>
-          <a:prstGeom prst="rect">
-            <a:avLst/>
-          </a:prstGeom>
-        </p:spPr>
-      </p:pic>
-      <p:pic>
-        <p:nvPicPr>
-          <p:cNvPr id="5" name="Рисунок 4">
-            <a:extLst>
-              <a:ext uri="{FF2B5EF4-FFF2-40B4-BE49-F238E27FC236}">
-                <a16:creationId xmlns:a16="http://schemas.microsoft.com/office/drawing/2014/main" id="{25F41AF8-D724-42FB-BAA8-EE9994908FC2}"/>
-              </a:ext>
-            </a:extLst>
-          </p:cNvPr>
-          <p:cNvPicPr>
-            <a:picLocks noChangeAspect="1"/>
-          </p:cNvPicPr>
-          <p:nvPr/>
-        </p:nvPicPr>
-        <p:blipFill>
-          <a:blip r:embed="rId3"/>
-          <a:stretch>
-            <a:fillRect/>
-          </a:stretch>
-        </p:blipFill>
-        <p:spPr>
-          <a:xfrm>
-            <a:off x="8030816" y="3703981"/>
-            <a:ext cx="3017093" cy="1942037"/>
-          </a:xfrm>
-          <a:prstGeom prst="rect">
-            <a:avLst/>
-          </a:prstGeom>
-        </p:spPr>
-      </p:pic>
-    </p:spTree>
-  </p:cSld>
-  <p:clrMapOvr>
-    <a:masterClrMapping/>
-  </p:clrMapOvr>
-</p:sld>
-</file>
-
-<file path=ppt/slides/slide49.xml><?xml version="1.0" encoding="utf-8"?>
-<p:sld xmlns:a="http://schemas.openxmlformats.org/drawingml/2006/main" xmlns:r="http://schemas.openxmlformats.org/officeDocument/2006/relationships" xmlns:p="http://schemas.openxmlformats.org/presentationml/2006/main">
-  <p:cSld>
-    <p:spTree>
-      <p:nvGrpSpPr>
-        <p:cNvPr id="1" name=""/>
-        <p:cNvGrpSpPr/>
-        <p:nvPr/>
-      </p:nvGrpSpPr>
-      <p:grpSpPr>
-        <a:xfrm>
-          <a:off x="0" y="0"/>
-          <a:ext cx="0" cy="0"/>
-          <a:chOff x="0" y="0"/>
-          <a:chExt cx="0" cy="0"/>
-        </a:xfrm>
-      </p:grpSpPr>
-      <p:sp>
-        <p:nvSpPr>
-          <p:cNvPr id="2" name="Заголовок 1">
-            <a:extLst>
-              <a:ext uri="{FF2B5EF4-FFF2-40B4-BE49-F238E27FC236}">
-                <a16:creationId xmlns:a16="http://schemas.microsoft.com/office/drawing/2014/main" id="{53286900-E4F0-4187-B0B0-AFE1A82E4F9A}"/>
-              </a:ext>
-            </a:extLst>
-          </p:cNvPr>
-          <p:cNvSpPr>
-            <a:spLocks noGrp="1"/>
-          </p:cNvSpPr>
-          <p:nvPr>
-            <p:ph type="title"/>
-          </p:nvPr>
-        </p:nvSpPr>
-        <p:spPr/>
-        <p:txBody>
-          <a:bodyPr/>
-          <a:lstStyle/>
-          <a:p>
-            <a:pPr algn="ctr"/>
-            <a:r>
-              <a:rPr lang="en-US" dirty="0"/>
-              <a:t>Scope</a:t>
-            </a:r>
-            <a:r>
-              <a:rPr lang="ru-RU" dirty="0"/>
-              <a:t>(</a:t>
-            </a:r>
-            <a:r>
-              <a:rPr lang="en-US" dirty="0"/>
-              <a:t>Closure)</a:t>
-            </a:r>
-            <a:endParaRPr lang="ru-RU" dirty="0"/>
-          </a:p>
-        </p:txBody>
-      </p:sp>
-      <p:sp>
-        <p:nvSpPr>
-          <p:cNvPr id="3" name="Объект 2">
-            <a:extLst>
-              <a:ext uri="{FF2B5EF4-FFF2-40B4-BE49-F238E27FC236}">
-                <a16:creationId xmlns:a16="http://schemas.microsoft.com/office/drawing/2014/main" id="{D884FED1-32C1-4512-A35D-BD1E21C0EA23}"/>
-              </a:ext>
-            </a:extLst>
-          </p:cNvPr>
-          <p:cNvSpPr>
-            <a:spLocks noGrp="1"/>
-          </p:cNvSpPr>
-          <p:nvPr>
-            <p:ph idx="1"/>
-          </p:nvPr>
-        </p:nvSpPr>
-        <p:spPr>
-          <a:xfrm>
-            <a:off x="838200" y="1825625"/>
-            <a:ext cx="5430078" cy="4879976"/>
-          </a:xfrm>
-        </p:spPr>
-        <p:txBody>
-          <a:bodyPr>
-            <a:normAutofit fontScale="70000" lnSpcReduction="20000"/>
-          </a:bodyPr>
-          <a:lstStyle/>
-          <a:p>
-            <a:r>
-              <a:rPr lang="en-US" dirty="0"/>
-              <a:t>It’s a place where we may use variables and functions. Scope limited by region where the variable is created</a:t>
-            </a:r>
-          </a:p>
-          <a:p>
-            <a:r>
-              <a:rPr lang="en-US" dirty="0"/>
-              <a:t>A variable created inside a function belongs to the </a:t>
-            </a:r>
-            <a:r>
-              <a:rPr lang="en-US" i="1" dirty="0">
-                <a:solidFill>
-                  <a:srgbClr val="FF0000"/>
-                </a:solidFill>
-              </a:rPr>
-              <a:t>local scope</a:t>
-            </a:r>
-            <a:r>
-              <a:rPr lang="en-US" dirty="0"/>
-              <a:t> of that function, and can only be used inside that function</a:t>
-            </a:r>
-          </a:p>
-          <a:p>
-            <a:r>
-              <a:rPr lang="en-US" dirty="0"/>
-              <a:t>A variable created in the main body of the Python code is a global variable and belongs to the </a:t>
-            </a:r>
-            <a:r>
-              <a:rPr lang="en-US" dirty="0">
-                <a:solidFill>
-                  <a:srgbClr val="FF0000"/>
-                </a:solidFill>
-              </a:rPr>
-              <a:t>global scope</a:t>
-            </a:r>
-            <a:r>
-              <a:rPr lang="en-US" dirty="0"/>
-              <a:t>. Global variables are available from within any scope, global and local</a:t>
-            </a:r>
-          </a:p>
-          <a:p>
-            <a:r>
-              <a:rPr lang="en-US" dirty="0"/>
-              <a:t>If you operate with the same variable name inside and outside of a function, Python will treat them as two separate variables.</a:t>
-            </a:r>
-          </a:p>
-          <a:p>
-            <a:r>
-              <a:rPr lang="en-US" dirty="0"/>
-              <a:t>If you need to create a global variable, but are stuck in the local scope, you can use the </a:t>
-            </a:r>
-            <a:r>
-              <a:rPr lang="en-US" dirty="0">
-                <a:solidFill>
-                  <a:srgbClr val="FF0000"/>
-                </a:solidFill>
-              </a:rPr>
-              <a:t>global</a:t>
-            </a:r>
-            <a:r>
-              <a:rPr lang="en-US" dirty="0"/>
-              <a:t> keyword.</a:t>
-            </a:r>
-          </a:p>
-          <a:p>
-            <a:r>
-              <a:rPr lang="en-US" dirty="0"/>
-              <a:t>Also, use the </a:t>
-            </a:r>
-            <a:r>
-              <a:rPr lang="en-US" dirty="0">
-                <a:solidFill>
-                  <a:srgbClr val="FF0000"/>
-                </a:solidFill>
-              </a:rPr>
-              <a:t>global</a:t>
-            </a:r>
-            <a:r>
-              <a:rPr lang="en-US" dirty="0"/>
-              <a:t> keyword if you want to make a change to a global variable inside a function</a:t>
-            </a:r>
-          </a:p>
-          <a:p>
-            <a:endParaRPr lang="en-US" dirty="0"/>
-          </a:p>
-          <a:p>
-            <a:endParaRPr lang="en-US" dirty="0"/>
-          </a:p>
-          <a:p>
-            <a:endParaRPr lang="en-US" dirty="0"/>
-          </a:p>
-          <a:p>
-            <a:endParaRPr lang="ru-RU" dirty="0"/>
-          </a:p>
-        </p:txBody>
-      </p:sp>
-      <p:pic>
-        <p:nvPicPr>
-          <p:cNvPr id="18" name="Рисунок 17">
-            <a:extLst>
-              <a:ext uri="{FF2B5EF4-FFF2-40B4-BE49-F238E27FC236}">
-                <a16:creationId xmlns:a16="http://schemas.microsoft.com/office/drawing/2014/main" id="{4A345E72-8944-44C2-9F66-C98442B07249}"/>
-              </a:ext>
-            </a:extLst>
-          </p:cNvPr>
-          <p:cNvPicPr>
-            <a:picLocks noChangeAspect="1"/>
-          </p:cNvPicPr>
-          <p:nvPr/>
-        </p:nvPicPr>
-        <p:blipFill>
-          <a:blip r:embed="rId2"/>
-          <a:stretch>
-            <a:fillRect/>
-          </a:stretch>
-        </p:blipFill>
-        <p:spPr>
-          <a:xfrm>
-            <a:off x="6444697" y="1825625"/>
-            <a:ext cx="3573945" cy="1171975"/>
-          </a:xfrm>
-          <a:prstGeom prst="rect">
-            <a:avLst/>
-          </a:prstGeom>
-        </p:spPr>
-      </p:pic>
-      <p:pic>
-        <p:nvPicPr>
-          <p:cNvPr id="19" name="Рисунок 18">
-            <a:extLst>
-              <a:ext uri="{FF2B5EF4-FFF2-40B4-BE49-F238E27FC236}">
-                <a16:creationId xmlns:a16="http://schemas.microsoft.com/office/drawing/2014/main" id="{13CD212E-C994-40A3-AEB5-AF0D3A3BCE5D}"/>
-              </a:ext>
-            </a:extLst>
-          </p:cNvPr>
-          <p:cNvPicPr>
-            <a:picLocks noChangeAspect="1"/>
-          </p:cNvPicPr>
-          <p:nvPr/>
-        </p:nvPicPr>
-        <p:blipFill>
-          <a:blip r:embed="rId3"/>
-          <a:stretch>
-            <a:fillRect/>
-          </a:stretch>
-        </p:blipFill>
-        <p:spPr>
-          <a:xfrm>
-            <a:off x="6444697" y="3132537"/>
-            <a:ext cx="1506608" cy="1209531"/>
-          </a:xfrm>
-          <a:prstGeom prst="rect">
-            <a:avLst/>
-          </a:prstGeom>
-        </p:spPr>
-      </p:pic>
-      <p:pic>
-        <p:nvPicPr>
-          <p:cNvPr id="20" name="Рисунок 19">
-            <a:extLst>
-              <a:ext uri="{FF2B5EF4-FFF2-40B4-BE49-F238E27FC236}">
-                <a16:creationId xmlns:a16="http://schemas.microsoft.com/office/drawing/2014/main" id="{3B44B7EA-0E3E-41A2-AD7E-D28BC05B450C}"/>
-              </a:ext>
-            </a:extLst>
-          </p:cNvPr>
-          <p:cNvPicPr>
-            <a:picLocks noChangeAspect="1"/>
-          </p:cNvPicPr>
-          <p:nvPr/>
-        </p:nvPicPr>
-        <p:blipFill>
-          <a:blip r:embed="rId4"/>
-          <a:stretch>
-            <a:fillRect/>
-          </a:stretch>
-        </p:blipFill>
-        <p:spPr>
-          <a:xfrm>
-            <a:off x="6444697" y="4460440"/>
-            <a:ext cx="1639129" cy="2040548"/>
-          </a:xfrm>
-          <a:prstGeom prst="rect">
-            <a:avLst/>
-          </a:prstGeom>
-        </p:spPr>
-      </p:pic>
-      <p:sp>
-        <p:nvSpPr>
-          <p:cNvPr id="21" name="TextBox 20">
-            <a:extLst>
-              <a:ext uri="{FF2B5EF4-FFF2-40B4-BE49-F238E27FC236}">
-                <a16:creationId xmlns:a16="http://schemas.microsoft.com/office/drawing/2014/main" id="{D2203179-5BA6-44DB-8ED2-D64953630A40}"/>
-              </a:ext>
-            </a:extLst>
-          </p:cNvPr>
-          <p:cNvSpPr txBox="1"/>
-          <p:nvPr/>
-        </p:nvSpPr>
-        <p:spPr>
-          <a:xfrm>
-            <a:off x="10429461" y="1690688"/>
-            <a:ext cx="1457739" cy="646331"/>
-          </a:xfrm>
-          <a:prstGeom prst="rect">
-            <a:avLst/>
-          </a:prstGeom>
-          <a:noFill/>
-        </p:spPr>
-        <p:txBody>
-          <a:bodyPr wrap="square" rtlCol="0">
-            <a:spAutoFit/>
-          </a:bodyPr>
-          <a:lstStyle/>
-          <a:p>
-            <a:r>
-              <a:rPr lang="en-US" dirty="0"/>
-              <a:t>Local Scope</a:t>
-            </a:r>
-          </a:p>
-          <a:p>
-            <a:endParaRPr lang="ru-RU" dirty="0"/>
-          </a:p>
-        </p:txBody>
-      </p:sp>
-      <p:sp>
-        <p:nvSpPr>
-          <p:cNvPr id="22" name="TextBox 21">
-            <a:extLst>
-              <a:ext uri="{FF2B5EF4-FFF2-40B4-BE49-F238E27FC236}">
-                <a16:creationId xmlns:a16="http://schemas.microsoft.com/office/drawing/2014/main" id="{88443131-E0EC-4741-8764-4C41760FBFC6}"/>
-              </a:ext>
-            </a:extLst>
-          </p:cNvPr>
-          <p:cNvSpPr txBox="1"/>
-          <p:nvPr/>
-        </p:nvSpPr>
-        <p:spPr>
-          <a:xfrm>
-            <a:off x="8772938" y="3179040"/>
-            <a:ext cx="1457739" cy="369332"/>
-          </a:xfrm>
-          <a:prstGeom prst="rect">
-            <a:avLst/>
-          </a:prstGeom>
-          <a:noFill/>
-        </p:spPr>
-        <p:txBody>
-          <a:bodyPr wrap="square" rtlCol="0">
-            <a:spAutoFit/>
-          </a:bodyPr>
-          <a:lstStyle/>
-          <a:p>
-            <a:r>
-              <a:rPr lang="en-US" dirty="0"/>
-              <a:t>Global Scope</a:t>
-            </a:r>
-            <a:endParaRPr lang="ru-RU" dirty="0"/>
-          </a:p>
-        </p:txBody>
-      </p:sp>
-      <p:cxnSp>
-        <p:nvCxnSpPr>
-          <p:cNvPr id="24" name="Прямая со стрелкой 23">
-            <a:extLst>
-              <a:ext uri="{FF2B5EF4-FFF2-40B4-BE49-F238E27FC236}">
-                <a16:creationId xmlns:a16="http://schemas.microsoft.com/office/drawing/2014/main" id="{91F8A2BA-7876-4A08-B78A-1F72DB11F1C4}"/>
-              </a:ext>
-            </a:extLst>
-          </p:cNvPr>
-          <p:cNvCxnSpPr>
-            <a:cxnSpLocks/>
-          </p:cNvCxnSpPr>
-          <p:nvPr/>
-        </p:nvCxnSpPr>
-        <p:spPr>
-          <a:xfrm flipH="1">
-            <a:off x="7580243" y="1825625"/>
-            <a:ext cx="2849218" cy="307975"/>
-          </a:xfrm>
-          <a:prstGeom prst="straightConnector1">
-            <a:avLst/>
-          </a:prstGeom>
-          <a:ln>
-            <a:tailEnd type="triangle"/>
-          </a:ln>
-        </p:spPr>
-        <p:style>
-          <a:lnRef idx="3">
-            <a:schemeClr val="accent2"/>
-          </a:lnRef>
-          <a:fillRef idx="0">
-            <a:schemeClr val="accent2"/>
-          </a:fillRef>
-          <a:effectRef idx="2">
-            <a:schemeClr val="accent2"/>
-          </a:effectRef>
-          <a:fontRef idx="minor">
-            <a:schemeClr val="tx1"/>
-          </a:fontRef>
-        </p:style>
-      </p:cxnSp>
-      <p:cxnSp>
-        <p:nvCxnSpPr>
-          <p:cNvPr id="26" name="Прямая со стрелкой 25">
-            <a:extLst>
-              <a:ext uri="{FF2B5EF4-FFF2-40B4-BE49-F238E27FC236}">
-                <a16:creationId xmlns:a16="http://schemas.microsoft.com/office/drawing/2014/main" id="{18BA1C47-E4D4-4AC7-B918-F4A391D50979}"/>
-              </a:ext>
-            </a:extLst>
-          </p:cNvPr>
-          <p:cNvCxnSpPr>
-            <a:cxnSpLocks/>
-          </p:cNvCxnSpPr>
-          <p:nvPr/>
-        </p:nvCxnSpPr>
-        <p:spPr>
-          <a:xfrm flipH="1" flipV="1">
-            <a:off x="7792278" y="3179040"/>
-            <a:ext cx="980660" cy="197918"/>
-          </a:xfrm>
-          <a:prstGeom prst="straightConnector1">
-            <a:avLst/>
-          </a:prstGeom>
-          <a:ln>
-            <a:tailEnd type="triangle"/>
-          </a:ln>
-        </p:spPr>
-        <p:style>
-          <a:lnRef idx="3">
-            <a:schemeClr val="accent2"/>
-          </a:lnRef>
-          <a:fillRef idx="0">
-            <a:schemeClr val="accent2"/>
-          </a:fillRef>
-          <a:effectRef idx="2">
-            <a:schemeClr val="accent2"/>
-          </a:effectRef>
-          <a:fontRef idx="minor">
-            <a:schemeClr val="tx1"/>
-          </a:fontRef>
-        </p:style>
-      </p:cxnSp>
-      <p:sp>
-        <p:nvSpPr>
-          <p:cNvPr id="28" name="Прямоугольник 27">
-            <a:extLst>
-              <a:ext uri="{FF2B5EF4-FFF2-40B4-BE49-F238E27FC236}">
-                <a16:creationId xmlns:a16="http://schemas.microsoft.com/office/drawing/2014/main" id="{9CB798CE-5DD6-4A84-B460-8B00C07F8BDC}"/>
-              </a:ext>
-            </a:extLst>
-          </p:cNvPr>
-          <p:cNvSpPr/>
-          <p:nvPr/>
-        </p:nvSpPr>
-        <p:spPr>
-          <a:xfrm>
-            <a:off x="6573078" y="1987826"/>
-            <a:ext cx="1007166" cy="543340"/>
-          </a:xfrm>
-          <a:prstGeom prst="rect">
-            <a:avLst/>
-          </a:prstGeom>
-          <a:noFill/>
-          <a:ln w="9525" cap="flat" cmpd="sng" algn="ctr">
-            <a:solidFill>
-              <a:schemeClr val="accent2"/>
-            </a:solidFill>
-            <a:prstDash val="solid"/>
-            <a:round/>
-            <a:headEnd type="none" w="med" len="med"/>
-            <a:tailEnd type="none" w="med" len="med"/>
-          </a:ln>
-        </p:spPr>
-        <p:style>
-          <a:lnRef idx="0">
-            <a:scrgbClr r="0" g="0" b="0"/>
-          </a:lnRef>
-          <a:fillRef idx="0">
-            <a:scrgbClr r="0" g="0" b="0"/>
-          </a:fillRef>
-          <a:effectRef idx="0">
-            <a:scrgbClr r="0" g="0" b="0"/>
-          </a:effectRef>
-          <a:fontRef idx="minor">
-            <a:schemeClr val="accent2"/>
-          </a:fontRef>
-        </p:style>
-        <p:txBody>
-          <a:bodyPr rtlCol="0" anchor="ctr"/>
-          <a:lstStyle/>
-          <a:p>
-            <a:pPr algn="ctr"/>
-            <a:endParaRPr lang="ru-RU"/>
-          </a:p>
-        </p:txBody>
-      </p:sp>
-      <p:sp>
-        <p:nvSpPr>
-          <p:cNvPr id="29" name="Прямоугольник 28">
-            <a:extLst>
-              <a:ext uri="{FF2B5EF4-FFF2-40B4-BE49-F238E27FC236}">
-                <a16:creationId xmlns:a16="http://schemas.microsoft.com/office/drawing/2014/main" id="{36921629-2E51-4AAA-95C1-D8674ED5E15B}"/>
-              </a:ext>
-            </a:extLst>
-          </p:cNvPr>
-          <p:cNvSpPr/>
-          <p:nvPr/>
-        </p:nvSpPr>
-        <p:spPr>
-          <a:xfrm>
-            <a:off x="6444697" y="3132537"/>
-            <a:ext cx="1347581" cy="1171975"/>
-          </a:xfrm>
-          <a:prstGeom prst="rect">
-            <a:avLst/>
-          </a:prstGeom>
-          <a:noFill/>
-          <a:ln w="9525" cap="flat" cmpd="sng" algn="ctr">
-            <a:solidFill>
-              <a:schemeClr val="accent2"/>
-            </a:solidFill>
-            <a:prstDash val="solid"/>
-            <a:round/>
-            <a:headEnd type="none" w="med" len="med"/>
-            <a:tailEnd type="none" w="med" len="med"/>
-          </a:ln>
-        </p:spPr>
-        <p:style>
-          <a:lnRef idx="0">
-            <a:scrgbClr r="0" g="0" b="0"/>
-          </a:lnRef>
-          <a:fillRef idx="0">
-            <a:scrgbClr r="0" g="0" b="0"/>
-          </a:fillRef>
-          <a:effectRef idx="0">
-            <a:scrgbClr r="0" g="0" b="0"/>
-          </a:effectRef>
-          <a:fontRef idx="minor">
-            <a:schemeClr val="accent2"/>
-          </a:fontRef>
-        </p:style>
-        <p:txBody>
-          <a:bodyPr rtlCol="0" anchor="ctr"/>
-          <a:lstStyle/>
-          <a:p>
-            <a:pPr algn="ctr"/>
-            <a:endParaRPr lang="ru-RU"/>
-          </a:p>
-        </p:txBody>
-      </p:sp>
+          </p:spPr>
+        </p:pic>
+      </p:grpSp>
     </p:spTree>
     <p:extLst>
       <p:ext uri="{BB962C8B-B14F-4D97-AF65-F5344CB8AC3E}">
-        <p14:creationId xmlns:p14="http://schemas.microsoft.com/office/powerpoint/2010/main" val="1408040424"/>
+        <p14:creationId xmlns:p14="http://schemas.microsoft.com/office/powerpoint/2010/main" val="599958745"/>
       </p:ext>
     </p:extLst>
   </p:cSld>
@@ -16892,6 +16486,1592 @@
       </p:grpSpPr>
       <p:sp>
         <p:nvSpPr>
+          <p:cNvPr id="5" name="Прямоугольник 4"/>
+          <p:cNvSpPr/>
+          <p:nvPr/>
+        </p:nvSpPr>
+        <p:spPr>
+          <a:xfrm>
+            <a:off x="4919472" y="950976"/>
+            <a:ext cx="2340864" cy="347472"/>
+          </a:xfrm>
+          <a:prstGeom prst="rect">
+            <a:avLst/>
+          </a:prstGeom>
+          <a:solidFill>
+            <a:srgbClr val="65F8FF"/>
+          </a:solidFill>
+          <a:ln>
+            <a:noFill/>
+          </a:ln>
+        </p:spPr>
+        <p:style>
+          <a:lnRef idx="2">
+            <a:schemeClr val="accent1">
+              <a:shade val="50000"/>
+            </a:schemeClr>
+          </a:lnRef>
+          <a:fillRef idx="1">
+            <a:schemeClr val="accent1"/>
+          </a:fillRef>
+          <a:effectRef idx="0">
+            <a:schemeClr val="accent1"/>
+          </a:effectRef>
+          <a:fontRef idx="minor">
+            <a:schemeClr val="lt1"/>
+          </a:fontRef>
+        </p:style>
+        <p:txBody>
+          <a:bodyPr rtlCol="0" anchor="ctr"/>
+          <a:lstStyle/>
+          <a:p>
+            <a:pPr algn="ctr"/>
+            <a:endParaRPr lang="ru-RU" dirty="0"/>
+          </a:p>
+        </p:txBody>
+      </p:sp>
+      <p:sp>
+        <p:nvSpPr>
+          <p:cNvPr id="2" name="Заголовок 1"/>
+          <p:cNvSpPr>
+            <a:spLocks noGrp="1"/>
+          </p:cNvSpPr>
+          <p:nvPr>
+            <p:ph type="title"/>
+          </p:nvPr>
+        </p:nvSpPr>
+        <p:spPr/>
+        <p:txBody>
+          <a:bodyPr/>
+          <a:lstStyle/>
+          <a:p>
+            <a:pPr algn="ctr"/>
+            <a:r>
+              <a:rPr lang="en-US" b="1" dirty="0"/>
+              <a:t>Functions</a:t>
+            </a:r>
+            <a:endParaRPr lang="ru-RU" b="1" dirty="0"/>
+          </a:p>
+        </p:txBody>
+      </p:sp>
+      <p:sp>
+        <p:nvSpPr>
+          <p:cNvPr id="4" name="Прямоугольник 3">
+            <a:extLst>
+              <a:ext uri="{FF2B5EF4-FFF2-40B4-BE49-F238E27FC236}">
+                <a16:creationId xmlns:a16="http://schemas.microsoft.com/office/drawing/2014/main" id="{02F6B57E-DB9D-49AE-8DFD-785F4F311EDF}"/>
+              </a:ext>
+            </a:extLst>
+          </p:cNvPr>
+          <p:cNvSpPr/>
+          <p:nvPr/>
+        </p:nvSpPr>
+        <p:spPr>
+          <a:xfrm>
+            <a:off x="1298713" y="5009322"/>
+            <a:ext cx="3492935" cy="808382"/>
+          </a:xfrm>
+          <a:prstGeom prst="rect">
+            <a:avLst/>
+          </a:prstGeom>
+          <a:noFill/>
+          <a:ln>
+            <a:solidFill>
+              <a:srgbClr val="FFC000"/>
+            </a:solidFill>
+          </a:ln>
+        </p:spPr>
+        <p:style>
+          <a:lnRef idx="2">
+            <a:schemeClr val="accent1">
+              <a:shade val="50000"/>
+            </a:schemeClr>
+          </a:lnRef>
+          <a:fillRef idx="1">
+            <a:schemeClr val="accent1"/>
+          </a:fillRef>
+          <a:effectRef idx="0">
+            <a:schemeClr val="accent1"/>
+          </a:effectRef>
+          <a:fontRef idx="minor">
+            <a:schemeClr val="lt1"/>
+          </a:fontRef>
+        </p:style>
+        <p:txBody>
+          <a:bodyPr rtlCol="0" anchor="ctr"/>
+          <a:lstStyle/>
+          <a:p>
+            <a:pPr algn="ctr"/>
+            <a:endParaRPr lang="ru-RU" dirty="0"/>
+          </a:p>
+        </p:txBody>
+      </p:sp>
+      <p:sp>
+        <p:nvSpPr>
+          <p:cNvPr id="3" name="Содержимое 2"/>
+          <p:cNvSpPr>
+            <a:spLocks noGrp="1"/>
+          </p:cNvSpPr>
+          <p:nvPr>
+            <p:ph idx="1"/>
+          </p:nvPr>
+        </p:nvSpPr>
+        <p:spPr>
+          <a:xfrm>
+            <a:off x="838200" y="1825625"/>
+            <a:ext cx="6294120" cy="4351338"/>
+          </a:xfrm>
+        </p:spPr>
+        <p:txBody>
+          <a:bodyPr>
+            <a:normAutofit fontScale="77500" lnSpcReduction="20000"/>
+          </a:bodyPr>
+          <a:lstStyle/>
+          <a:p>
+            <a:r>
+              <a:rPr lang="en-US" dirty="0"/>
+              <a:t>It reusable  predefined block of code, that invokes by function call</a:t>
+            </a:r>
+          </a:p>
+          <a:p>
+            <a:endParaRPr lang="en-US" dirty="0"/>
+          </a:p>
+          <a:p>
+            <a:r>
+              <a:rPr lang="en-US" dirty="0"/>
+              <a:t>Function may have a arguments </a:t>
+            </a:r>
+          </a:p>
+          <a:p>
+            <a:endParaRPr lang="en-US" dirty="0"/>
+          </a:p>
+          <a:p>
+            <a:r>
+              <a:rPr lang="en-US" dirty="0"/>
+              <a:t>… And may returns a value. A value, in this case, it any other type from python. So you may use it for calculation and pass it to another function</a:t>
+            </a:r>
+          </a:p>
+          <a:p>
+            <a:endParaRPr lang="en-US" dirty="0"/>
+          </a:p>
+          <a:p>
+            <a:r>
+              <a:rPr lang="en-US" dirty="0"/>
+              <a:t>Schema – </a:t>
+            </a:r>
+          </a:p>
+          <a:p>
+            <a:pPr marL="457200" lvl="1" indent="0">
+              <a:buNone/>
+            </a:pPr>
+            <a:r>
+              <a:rPr lang="en-US" dirty="0">
+                <a:solidFill>
+                  <a:srgbClr val="FF0000"/>
+                </a:solidFill>
+              </a:rPr>
+              <a:t>def</a:t>
+            </a:r>
+            <a:r>
+              <a:rPr lang="en-US" dirty="0"/>
+              <a:t> NAME </a:t>
+            </a:r>
+            <a:r>
+              <a:rPr lang="en-US" dirty="0">
+                <a:solidFill>
+                  <a:srgbClr val="FF0000"/>
+                </a:solidFill>
+              </a:rPr>
+              <a:t>(</a:t>
+            </a:r>
+            <a:r>
+              <a:rPr lang="en-US" dirty="0" err="1">
+                <a:solidFill>
+                  <a:srgbClr val="FF0000"/>
+                </a:solidFill>
+              </a:rPr>
+              <a:t>args</a:t>
+            </a:r>
+            <a:r>
+              <a:rPr lang="en-US" dirty="0">
+                <a:solidFill>
+                  <a:srgbClr val="FF0000"/>
+                </a:solidFill>
+              </a:rPr>
+              <a:t>, *</a:t>
+            </a:r>
+            <a:r>
+              <a:rPr lang="en-US" dirty="0" err="1">
+                <a:solidFill>
+                  <a:srgbClr val="FF0000"/>
+                </a:solidFill>
+              </a:rPr>
+              <a:t>args</a:t>
+            </a:r>
+            <a:r>
+              <a:rPr lang="en-US" dirty="0">
+                <a:solidFill>
+                  <a:srgbClr val="FF0000"/>
+                </a:solidFill>
+              </a:rPr>
+              <a:t>, **</a:t>
+            </a:r>
+            <a:r>
+              <a:rPr lang="en-US" dirty="0" err="1">
+                <a:solidFill>
+                  <a:srgbClr val="FF0000"/>
+                </a:solidFill>
+              </a:rPr>
+              <a:t>kwargs</a:t>
+            </a:r>
+            <a:r>
+              <a:rPr lang="en-US" dirty="0">
+                <a:solidFill>
+                  <a:srgbClr val="FF0000"/>
+                </a:solidFill>
+              </a:rPr>
+              <a:t>):</a:t>
+            </a:r>
+          </a:p>
+          <a:p>
+            <a:pPr marL="457200" lvl="1" indent="0">
+              <a:buNone/>
+            </a:pPr>
+            <a:r>
+              <a:rPr lang="en-US" dirty="0"/>
+              <a:t>	Some code</a:t>
+            </a:r>
+          </a:p>
+          <a:p>
+            <a:pPr marL="457200" lvl="1" indent="0">
+              <a:buNone/>
+            </a:pPr>
+            <a:r>
+              <a:rPr lang="en-US" dirty="0"/>
+              <a:t>	</a:t>
+            </a:r>
+            <a:r>
+              <a:rPr lang="en-US" dirty="0">
+                <a:solidFill>
+                  <a:srgbClr val="FF0000"/>
+                </a:solidFill>
+              </a:rPr>
+              <a:t>return </a:t>
+            </a:r>
+          </a:p>
+          <a:p>
+            <a:endParaRPr lang="ru-RU" dirty="0"/>
+          </a:p>
+        </p:txBody>
+      </p:sp>
+      <p:pic>
+        <p:nvPicPr>
+          <p:cNvPr id="1026" name="Picture 2"/>
+          <p:cNvPicPr>
+            <a:picLocks noChangeAspect="1" noChangeArrowheads="1"/>
+          </p:cNvPicPr>
+          <p:nvPr/>
+        </p:nvPicPr>
+        <p:blipFill>
+          <a:blip r:embed="rId2"/>
+          <a:srcRect/>
+          <a:stretch>
+            <a:fillRect/>
+          </a:stretch>
+        </p:blipFill>
+        <p:spPr bwMode="auto">
+          <a:xfrm>
+            <a:off x="7379589" y="1466468"/>
+            <a:ext cx="3789924" cy="1331595"/>
+          </a:xfrm>
+          <a:prstGeom prst="rect">
+            <a:avLst/>
+          </a:prstGeom>
+          <a:noFill/>
+          <a:ln w="9525">
+            <a:noFill/>
+            <a:miter lim="800000"/>
+            <a:headEnd/>
+            <a:tailEnd/>
+          </a:ln>
+          <a:effectLst/>
+        </p:spPr>
+      </p:pic>
+      <p:pic>
+        <p:nvPicPr>
+          <p:cNvPr id="1027" name="Picture 3"/>
+          <p:cNvPicPr>
+            <a:picLocks noChangeAspect="1" noChangeArrowheads="1"/>
+          </p:cNvPicPr>
+          <p:nvPr/>
+        </p:nvPicPr>
+        <p:blipFill>
+          <a:blip r:embed="rId3"/>
+          <a:srcRect/>
+          <a:stretch>
+            <a:fillRect/>
+          </a:stretch>
+        </p:blipFill>
+        <p:spPr bwMode="auto">
+          <a:xfrm>
+            <a:off x="7380732" y="3016949"/>
+            <a:ext cx="3032698" cy="1353883"/>
+          </a:xfrm>
+          <a:prstGeom prst="rect">
+            <a:avLst/>
+          </a:prstGeom>
+          <a:noFill/>
+          <a:ln w="9525">
+            <a:noFill/>
+            <a:miter lim="800000"/>
+            <a:headEnd/>
+            <a:tailEnd/>
+          </a:ln>
+          <a:effectLst/>
+        </p:spPr>
+      </p:pic>
+      <p:pic>
+        <p:nvPicPr>
+          <p:cNvPr id="1028" name="Picture 4"/>
+          <p:cNvPicPr>
+            <a:picLocks noChangeAspect="1" noChangeArrowheads="1"/>
+          </p:cNvPicPr>
+          <p:nvPr/>
+        </p:nvPicPr>
+        <p:blipFill>
+          <a:blip r:embed="rId4"/>
+          <a:srcRect/>
+          <a:stretch>
+            <a:fillRect/>
+          </a:stretch>
+        </p:blipFill>
+        <p:spPr bwMode="auto">
+          <a:xfrm>
+            <a:off x="7400353" y="4600194"/>
+            <a:ext cx="4143383" cy="1636014"/>
+          </a:xfrm>
+          <a:prstGeom prst="rect">
+            <a:avLst/>
+          </a:prstGeom>
+          <a:noFill/>
+          <a:ln w="9525">
+            <a:noFill/>
+            <a:miter lim="800000"/>
+            <a:headEnd/>
+            <a:tailEnd/>
+          </a:ln>
+          <a:effectLst/>
+        </p:spPr>
+      </p:pic>
+    </p:spTree>
+  </p:cSld>
+  <p:clrMapOvr>
+    <a:masterClrMapping/>
+  </p:clrMapOvr>
+</p:sld>
+</file>
+
+<file path=ppt/slides/slide51.xml><?xml version="1.0" encoding="utf-8"?>
+<p:sld xmlns:a="http://schemas.openxmlformats.org/drawingml/2006/main" xmlns:r="http://schemas.openxmlformats.org/officeDocument/2006/relationships" xmlns:p="http://schemas.openxmlformats.org/presentationml/2006/main">
+  <p:cSld>
+    <p:spTree>
+      <p:nvGrpSpPr>
+        <p:cNvPr id="1" name=""/>
+        <p:cNvGrpSpPr/>
+        <p:nvPr/>
+      </p:nvGrpSpPr>
+      <p:grpSpPr>
+        <a:xfrm>
+          <a:off x="0" y="0"/>
+          <a:ext cx="0" cy="0"/>
+          <a:chOff x="0" y="0"/>
+          <a:chExt cx="0" cy="0"/>
+        </a:xfrm>
+      </p:grpSpPr>
+      <p:sp>
+        <p:nvSpPr>
+          <p:cNvPr id="2" name="Заголовок 1"/>
+          <p:cNvSpPr>
+            <a:spLocks noGrp="1"/>
+          </p:cNvSpPr>
+          <p:nvPr>
+            <p:ph type="title"/>
+          </p:nvPr>
+        </p:nvSpPr>
+        <p:spPr/>
+        <p:txBody>
+          <a:bodyPr/>
+          <a:lstStyle/>
+          <a:p>
+            <a:pPr algn="ctr"/>
+            <a:r>
+              <a:rPr lang="en-US" b="1" dirty="0"/>
+              <a:t>Functions - Arguments</a:t>
+            </a:r>
+            <a:endParaRPr lang="ru-RU" b="1" dirty="0"/>
+          </a:p>
+        </p:txBody>
+      </p:sp>
+      <p:sp>
+        <p:nvSpPr>
+          <p:cNvPr id="3" name="Содержимое 2"/>
+          <p:cNvSpPr>
+            <a:spLocks noGrp="1"/>
+          </p:cNvSpPr>
+          <p:nvPr>
+            <p:ph idx="1"/>
+          </p:nvPr>
+        </p:nvSpPr>
+        <p:spPr>
+          <a:xfrm>
+            <a:off x="838200" y="1714501"/>
+            <a:ext cx="7943850" cy="2057400"/>
+          </a:xfrm>
+        </p:spPr>
+        <p:txBody>
+          <a:bodyPr>
+            <a:normAutofit/>
+          </a:bodyPr>
+          <a:lstStyle/>
+          <a:p>
+            <a:r>
+              <a:rPr lang="en-US" dirty="0"/>
+              <a:t>You can use as many arguments as you want, but prefer use a Dictionary for parameters, when them more that </a:t>
+            </a:r>
+            <a:r>
+              <a:rPr lang="ru-RU" dirty="0"/>
+              <a:t>3</a:t>
+            </a:r>
+            <a:r>
+              <a:rPr lang="en-US" dirty="0"/>
+              <a:t>. And think about decomposition( it much prefers than </a:t>
+            </a:r>
+            <a:r>
+              <a:rPr lang="en-US" dirty="0" err="1">
+                <a:solidFill>
+                  <a:srgbClr val="FF0000"/>
+                </a:solidFill>
+              </a:rPr>
+              <a:t>dict</a:t>
+            </a:r>
+            <a:r>
+              <a:rPr lang="en-US" dirty="0"/>
+              <a:t>)</a:t>
+            </a:r>
+          </a:p>
+          <a:p>
+            <a:endParaRPr lang="en-US" dirty="0"/>
+          </a:p>
+          <a:p>
+            <a:endParaRPr lang="ru-RU" dirty="0"/>
+          </a:p>
+        </p:txBody>
+      </p:sp>
+      <p:pic>
+        <p:nvPicPr>
+          <p:cNvPr id="5" name="Рисунок 4">
+            <a:extLst>
+              <a:ext uri="{FF2B5EF4-FFF2-40B4-BE49-F238E27FC236}">
+                <a16:creationId xmlns:a16="http://schemas.microsoft.com/office/drawing/2014/main" id="{7A97CE74-A006-426A-9724-2F3B2054B99B}"/>
+              </a:ext>
+            </a:extLst>
+          </p:cNvPr>
+          <p:cNvPicPr>
+            <a:picLocks noChangeAspect="1"/>
+          </p:cNvPicPr>
+          <p:nvPr/>
+        </p:nvPicPr>
+        <p:blipFill>
+          <a:blip r:embed="rId2"/>
+          <a:stretch>
+            <a:fillRect/>
+          </a:stretch>
+        </p:blipFill>
+        <p:spPr>
+          <a:xfrm>
+            <a:off x="3199157" y="3429000"/>
+            <a:ext cx="5793685" cy="3286802"/>
+          </a:xfrm>
+          <a:prstGeom prst="rect">
+            <a:avLst/>
+          </a:prstGeom>
+        </p:spPr>
+      </p:pic>
+    </p:spTree>
+  </p:cSld>
+  <p:clrMapOvr>
+    <a:masterClrMapping/>
+  </p:clrMapOvr>
+</p:sld>
+</file>
+
+<file path=ppt/slides/slide52.xml><?xml version="1.0" encoding="utf-8"?>
+<p:sld xmlns:a="http://schemas.openxmlformats.org/drawingml/2006/main" xmlns:r="http://schemas.openxmlformats.org/officeDocument/2006/relationships" xmlns:p="http://schemas.openxmlformats.org/presentationml/2006/main">
+  <p:cSld>
+    <p:spTree>
+      <p:nvGrpSpPr>
+        <p:cNvPr id="1" name=""/>
+        <p:cNvGrpSpPr/>
+        <p:nvPr/>
+      </p:nvGrpSpPr>
+      <p:grpSpPr>
+        <a:xfrm>
+          <a:off x="0" y="0"/>
+          <a:ext cx="0" cy="0"/>
+          <a:chOff x="0" y="0"/>
+          <a:chExt cx="0" cy="0"/>
+        </a:xfrm>
+      </p:grpSpPr>
+      <p:sp>
+        <p:nvSpPr>
+          <p:cNvPr id="3" name="Содержимое 2"/>
+          <p:cNvSpPr>
+            <a:spLocks noGrp="1"/>
+          </p:cNvSpPr>
+          <p:nvPr>
+            <p:ph idx="1"/>
+          </p:nvPr>
+        </p:nvSpPr>
+        <p:spPr>
+          <a:xfrm>
+            <a:off x="783336" y="310896"/>
+            <a:ext cx="5068824" cy="6547104"/>
+          </a:xfrm>
+        </p:spPr>
+        <p:txBody>
+          <a:bodyPr>
+            <a:normAutofit fontScale="85000" lnSpcReduction="20000"/>
+          </a:bodyPr>
+          <a:lstStyle/>
+          <a:p>
+            <a:r>
+              <a:rPr lang="en-US" dirty="0"/>
+              <a:t>As in example before you can use a Key Arguments or </a:t>
+            </a:r>
+            <a:r>
+              <a:rPr lang="en-US" dirty="0">
+                <a:solidFill>
+                  <a:srgbClr val="FF0000"/>
+                </a:solidFill>
+              </a:rPr>
+              <a:t>**</a:t>
+            </a:r>
+            <a:r>
+              <a:rPr lang="en-US" dirty="0" err="1">
+                <a:solidFill>
+                  <a:srgbClr val="FF0000"/>
+                </a:solidFill>
+              </a:rPr>
+              <a:t>kwargs</a:t>
+            </a:r>
+            <a:r>
+              <a:rPr lang="en-US" dirty="0">
+                <a:solidFill>
+                  <a:srgbClr val="FF0000"/>
+                </a:solidFill>
+              </a:rPr>
+              <a:t> </a:t>
+            </a:r>
+            <a:r>
+              <a:rPr lang="en-US" dirty="0"/>
+              <a:t>– special python syntax for function </a:t>
+            </a:r>
+          </a:p>
+          <a:p>
+            <a:endParaRPr lang="en-US" dirty="0"/>
+          </a:p>
+          <a:p>
+            <a:endParaRPr lang="en-US" dirty="0"/>
+          </a:p>
+          <a:p>
+            <a:r>
+              <a:rPr lang="en-US" dirty="0"/>
+              <a:t>OR also use named </a:t>
+            </a:r>
+            <a:r>
+              <a:rPr lang="en-US" dirty="0" err="1"/>
+              <a:t>args</a:t>
+            </a:r>
+            <a:endParaRPr lang="ru-RU" dirty="0"/>
+          </a:p>
+          <a:p>
+            <a:pPr marL="0" indent="0">
+              <a:buNone/>
+            </a:pPr>
+            <a:endParaRPr lang="en-US" dirty="0"/>
+          </a:p>
+          <a:p>
+            <a:endParaRPr lang="ru-RU" dirty="0"/>
+          </a:p>
+          <a:p>
+            <a:r>
+              <a:rPr lang="en-US" dirty="0"/>
+              <a:t>If number of arguments unknown – use a Arbitrary Arguments. ( usually this </a:t>
+            </a:r>
+            <a:r>
+              <a:rPr lang="en-US" dirty="0">
+                <a:solidFill>
+                  <a:srgbClr val="FF0000"/>
+                </a:solidFill>
+              </a:rPr>
+              <a:t>*</a:t>
+            </a:r>
+            <a:r>
+              <a:rPr lang="en-US" dirty="0" err="1">
+                <a:solidFill>
+                  <a:srgbClr val="FF0000"/>
+                </a:solidFill>
+              </a:rPr>
+              <a:t>ags</a:t>
+            </a:r>
+            <a:r>
+              <a:rPr lang="en-US" dirty="0"/>
+              <a:t>, but you may define it as you want )</a:t>
+            </a:r>
+          </a:p>
+          <a:p>
+            <a:pPr marL="0" indent="0">
+              <a:buNone/>
+            </a:pPr>
+            <a:endParaRPr lang="en-US" dirty="0"/>
+          </a:p>
+          <a:p>
+            <a:r>
+              <a:rPr lang="en-US" dirty="0"/>
+              <a:t>If you plan use default value python provide you a possibility with default value</a:t>
+            </a:r>
+          </a:p>
+          <a:p>
+            <a:endParaRPr lang="en-US" dirty="0"/>
+          </a:p>
+          <a:p>
+            <a:r>
+              <a:rPr lang="en-US" dirty="0"/>
+              <a:t>More about function arguments you may find in </a:t>
+            </a:r>
+            <a:r>
+              <a:rPr lang="en-US" dirty="0">
+                <a:hlinkClick r:id="rId2"/>
+              </a:rPr>
+              <a:t>docs</a:t>
+            </a:r>
+            <a:r>
+              <a:rPr lang="en-US" dirty="0"/>
+              <a:t> 	</a:t>
+            </a:r>
+          </a:p>
+          <a:p>
+            <a:endParaRPr lang="ru-RU" dirty="0"/>
+          </a:p>
+        </p:txBody>
+      </p:sp>
+      <p:pic>
+        <p:nvPicPr>
+          <p:cNvPr id="2051" name="Picture 3"/>
+          <p:cNvPicPr>
+            <a:picLocks noChangeAspect="1" noChangeArrowheads="1"/>
+          </p:cNvPicPr>
+          <p:nvPr/>
+        </p:nvPicPr>
+        <p:blipFill>
+          <a:blip r:embed="rId3"/>
+          <a:srcRect/>
+          <a:stretch>
+            <a:fillRect/>
+          </a:stretch>
+        </p:blipFill>
+        <p:spPr bwMode="auto">
+          <a:xfrm>
+            <a:off x="5852008" y="1733387"/>
+            <a:ext cx="5240062" cy="1374594"/>
+          </a:xfrm>
+          <a:prstGeom prst="rect">
+            <a:avLst/>
+          </a:prstGeom>
+          <a:noFill/>
+          <a:ln w="9525">
+            <a:noFill/>
+            <a:miter lim="800000"/>
+            <a:headEnd/>
+            <a:tailEnd/>
+          </a:ln>
+          <a:effectLst/>
+        </p:spPr>
+      </p:pic>
+      <p:pic>
+        <p:nvPicPr>
+          <p:cNvPr id="2052" name="Picture 4"/>
+          <p:cNvPicPr>
+            <a:picLocks noChangeAspect="1" noChangeArrowheads="1"/>
+          </p:cNvPicPr>
+          <p:nvPr/>
+        </p:nvPicPr>
+        <p:blipFill>
+          <a:blip r:embed="rId4"/>
+          <a:srcRect/>
+          <a:stretch>
+            <a:fillRect/>
+          </a:stretch>
+        </p:blipFill>
+        <p:spPr bwMode="auto">
+          <a:xfrm>
+            <a:off x="5852160" y="12338"/>
+            <a:ext cx="3102113" cy="1641733"/>
+          </a:xfrm>
+          <a:prstGeom prst="rect">
+            <a:avLst/>
+          </a:prstGeom>
+          <a:noFill/>
+          <a:ln w="9525">
+            <a:noFill/>
+            <a:miter lim="800000"/>
+            <a:headEnd/>
+            <a:tailEnd/>
+          </a:ln>
+          <a:effectLst/>
+        </p:spPr>
+      </p:pic>
+      <p:pic>
+        <p:nvPicPr>
+          <p:cNvPr id="2053" name="Picture 5"/>
+          <p:cNvPicPr>
+            <a:picLocks noChangeAspect="1" noChangeArrowheads="1"/>
+          </p:cNvPicPr>
+          <p:nvPr/>
+        </p:nvPicPr>
+        <p:blipFill>
+          <a:blip r:embed="rId5"/>
+          <a:srcRect/>
+          <a:stretch>
+            <a:fillRect/>
+          </a:stretch>
+        </p:blipFill>
+        <p:spPr bwMode="auto">
+          <a:xfrm>
+            <a:off x="5852160" y="3194427"/>
+            <a:ext cx="3768868" cy="1111186"/>
+          </a:xfrm>
+          <a:prstGeom prst="rect">
+            <a:avLst/>
+          </a:prstGeom>
+          <a:noFill/>
+          <a:ln w="9525">
+            <a:noFill/>
+            <a:miter lim="800000"/>
+            <a:headEnd/>
+            <a:tailEnd/>
+          </a:ln>
+          <a:effectLst/>
+        </p:spPr>
+      </p:pic>
+      <p:pic>
+        <p:nvPicPr>
+          <p:cNvPr id="2054" name="Picture 6"/>
+          <p:cNvPicPr>
+            <a:picLocks noChangeAspect="1" noChangeArrowheads="1"/>
+          </p:cNvPicPr>
+          <p:nvPr/>
+        </p:nvPicPr>
+        <p:blipFill>
+          <a:blip r:embed="rId6"/>
+          <a:srcRect/>
+          <a:stretch>
+            <a:fillRect/>
+          </a:stretch>
+        </p:blipFill>
+        <p:spPr bwMode="auto">
+          <a:xfrm>
+            <a:off x="5852008" y="4468989"/>
+            <a:ext cx="3543783" cy="1172670"/>
+          </a:xfrm>
+          <a:prstGeom prst="rect">
+            <a:avLst/>
+          </a:prstGeom>
+          <a:noFill/>
+          <a:ln w="9525">
+            <a:noFill/>
+            <a:miter lim="800000"/>
+            <a:headEnd/>
+            <a:tailEnd/>
+          </a:ln>
+          <a:effectLst/>
+        </p:spPr>
+      </p:pic>
+    </p:spTree>
+  </p:cSld>
+  <p:clrMapOvr>
+    <a:masterClrMapping/>
+  </p:clrMapOvr>
+</p:sld>
+</file>
+
+<file path=ppt/slides/slide53.xml><?xml version="1.0" encoding="utf-8"?>
+<p:sld xmlns:a="http://schemas.openxmlformats.org/drawingml/2006/main" xmlns:r="http://schemas.openxmlformats.org/officeDocument/2006/relationships" xmlns:p="http://schemas.openxmlformats.org/presentationml/2006/main">
+  <p:cSld>
+    <p:spTree>
+      <p:nvGrpSpPr>
+        <p:cNvPr id="1" name=""/>
+        <p:cNvGrpSpPr/>
+        <p:nvPr/>
+      </p:nvGrpSpPr>
+      <p:grpSpPr>
+        <a:xfrm>
+          <a:off x="0" y="0"/>
+          <a:ext cx="0" cy="0"/>
+          <a:chOff x="0" y="0"/>
+          <a:chExt cx="0" cy="0"/>
+        </a:xfrm>
+      </p:grpSpPr>
+      <p:sp>
+        <p:nvSpPr>
+          <p:cNvPr id="2" name="Заголовок 1"/>
+          <p:cNvSpPr>
+            <a:spLocks noGrp="1"/>
+          </p:cNvSpPr>
+          <p:nvPr>
+            <p:ph type="title"/>
+          </p:nvPr>
+        </p:nvSpPr>
+        <p:spPr/>
+        <p:txBody>
+          <a:bodyPr/>
+          <a:lstStyle/>
+          <a:p>
+            <a:pPr algn="ctr"/>
+            <a:r>
+              <a:rPr lang="en-US" b="1" dirty="0"/>
+              <a:t>Lambda</a:t>
+            </a:r>
+            <a:endParaRPr lang="ru-RU" b="1" dirty="0"/>
+          </a:p>
+        </p:txBody>
+      </p:sp>
+      <p:sp>
+        <p:nvSpPr>
+          <p:cNvPr id="3" name="Содержимое 2"/>
+          <p:cNvSpPr>
+            <a:spLocks noGrp="1"/>
+          </p:cNvSpPr>
+          <p:nvPr>
+            <p:ph idx="1"/>
+          </p:nvPr>
+        </p:nvSpPr>
+        <p:spPr>
+          <a:xfrm>
+            <a:off x="838200" y="1825625"/>
+            <a:ext cx="7192617" cy="4151105"/>
+          </a:xfrm>
+        </p:spPr>
+        <p:txBody>
+          <a:bodyPr>
+            <a:normAutofit fontScale="92500" lnSpcReduction="10000"/>
+          </a:bodyPr>
+          <a:lstStyle/>
+          <a:p>
+            <a:r>
+              <a:rPr lang="en-US" dirty="0"/>
+              <a:t>A lambda function is a small anonymous function.</a:t>
+            </a:r>
+          </a:p>
+          <a:p>
+            <a:r>
+              <a:rPr lang="en-US" dirty="0"/>
+              <a:t>A lambda function can take any number of arguments, but can only have one expression.</a:t>
+            </a:r>
+          </a:p>
+          <a:p>
+            <a:pPr lvl="1"/>
+            <a:r>
+              <a:rPr lang="en-US" dirty="0">
+                <a:solidFill>
+                  <a:srgbClr val="FF0000"/>
+                </a:solidFill>
+              </a:rPr>
+              <a:t>lambda </a:t>
+            </a:r>
+            <a:r>
+              <a:rPr lang="en-US" dirty="0" err="1">
+                <a:solidFill>
+                  <a:srgbClr val="FF0000"/>
+                </a:solidFill>
+              </a:rPr>
+              <a:t>args</a:t>
+            </a:r>
+            <a:r>
+              <a:rPr lang="en-US" dirty="0">
+                <a:solidFill>
+                  <a:srgbClr val="FF0000"/>
+                </a:solidFill>
+              </a:rPr>
+              <a:t>: exp</a:t>
+            </a:r>
+          </a:p>
+          <a:p>
+            <a:pPr lvl="1"/>
+            <a:endParaRPr lang="en-US" dirty="0">
+              <a:solidFill>
+                <a:srgbClr val="FF0000"/>
+              </a:solidFill>
+            </a:endParaRPr>
+          </a:p>
+          <a:p>
+            <a:r>
+              <a:rPr lang="en-US" dirty="0"/>
+              <a:t>The power of lambda is better shown when you use them as an anonymous function inside another function.</a:t>
+            </a:r>
+          </a:p>
+          <a:p>
+            <a:r>
+              <a:rPr lang="en-US" dirty="0"/>
+              <a:t>Say you have a function definition that takes one argument, and that argument will be power by an unknown number</a:t>
+            </a:r>
+          </a:p>
+          <a:p>
+            <a:pPr marL="457200" lvl="1" indent="0">
+              <a:buNone/>
+            </a:pPr>
+            <a:endParaRPr lang="en-US" dirty="0">
+              <a:solidFill>
+                <a:srgbClr val="FF0000"/>
+              </a:solidFill>
+            </a:endParaRPr>
+          </a:p>
+        </p:txBody>
+      </p:sp>
+      <p:pic>
+        <p:nvPicPr>
+          <p:cNvPr id="4" name="Рисунок 3">
+            <a:extLst>
+              <a:ext uri="{FF2B5EF4-FFF2-40B4-BE49-F238E27FC236}">
+                <a16:creationId xmlns:a16="http://schemas.microsoft.com/office/drawing/2014/main" id="{8B7CC15A-B63A-459D-B609-94D5E16290B3}"/>
+              </a:ext>
+            </a:extLst>
+          </p:cNvPr>
+          <p:cNvPicPr>
+            <a:picLocks noChangeAspect="1"/>
+          </p:cNvPicPr>
+          <p:nvPr/>
+        </p:nvPicPr>
+        <p:blipFill>
+          <a:blip r:embed="rId2"/>
+          <a:stretch>
+            <a:fillRect/>
+          </a:stretch>
+        </p:blipFill>
+        <p:spPr>
+          <a:xfrm>
+            <a:off x="8030817" y="2289934"/>
+            <a:ext cx="3017094" cy="623095"/>
+          </a:xfrm>
+          <a:prstGeom prst="rect">
+            <a:avLst/>
+          </a:prstGeom>
+        </p:spPr>
+      </p:pic>
+      <p:pic>
+        <p:nvPicPr>
+          <p:cNvPr id="5" name="Рисунок 4">
+            <a:extLst>
+              <a:ext uri="{FF2B5EF4-FFF2-40B4-BE49-F238E27FC236}">
+                <a16:creationId xmlns:a16="http://schemas.microsoft.com/office/drawing/2014/main" id="{25F41AF8-D724-42FB-BAA8-EE9994908FC2}"/>
+              </a:ext>
+            </a:extLst>
+          </p:cNvPr>
+          <p:cNvPicPr>
+            <a:picLocks noChangeAspect="1"/>
+          </p:cNvPicPr>
+          <p:nvPr/>
+        </p:nvPicPr>
+        <p:blipFill>
+          <a:blip r:embed="rId3"/>
+          <a:stretch>
+            <a:fillRect/>
+          </a:stretch>
+        </p:blipFill>
+        <p:spPr>
+          <a:xfrm>
+            <a:off x="8030816" y="3703981"/>
+            <a:ext cx="3017093" cy="1942037"/>
+          </a:xfrm>
+          <a:prstGeom prst="rect">
+            <a:avLst/>
+          </a:prstGeom>
+        </p:spPr>
+      </p:pic>
+    </p:spTree>
+  </p:cSld>
+  <p:clrMapOvr>
+    <a:masterClrMapping/>
+  </p:clrMapOvr>
+</p:sld>
+</file>
+
+<file path=ppt/slides/slide54.xml><?xml version="1.0" encoding="utf-8"?>
+<p:sld xmlns:a="http://schemas.openxmlformats.org/drawingml/2006/main" xmlns:r="http://schemas.openxmlformats.org/officeDocument/2006/relationships" xmlns:p="http://schemas.openxmlformats.org/presentationml/2006/main">
+  <p:cSld>
+    <p:spTree>
+      <p:nvGrpSpPr>
+        <p:cNvPr id="1" name=""/>
+        <p:cNvGrpSpPr/>
+        <p:nvPr/>
+      </p:nvGrpSpPr>
+      <p:grpSpPr>
+        <a:xfrm>
+          <a:off x="0" y="0"/>
+          <a:ext cx="0" cy="0"/>
+          <a:chOff x="0" y="0"/>
+          <a:chExt cx="0" cy="0"/>
+        </a:xfrm>
+      </p:grpSpPr>
+      <p:sp>
+        <p:nvSpPr>
+          <p:cNvPr id="2" name="Заголовок 1">
+            <a:extLst>
+              <a:ext uri="{FF2B5EF4-FFF2-40B4-BE49-F238E27FC236}">
+                <a16:creationId xmlns:a16="http://schemas.microsoft.com/office/drawing/2014/main" id="{53286900-E4F0-4187-B0B0-AFE1A82E4F9A}"/>
+              </a:ext>
+            </a:extLst>
+          </p:cNvPr>
+          <p:cNvSpPr>
+            <a:spLocks noGrp="1"/>
+          </p:cNvSpPr>
+          <p:nvPr>
+            <p:ph type="title"/>
+          </p:nvPr>
+        </p:nvSpPr>
+        <p:spPr/>
+        <p:txBody>
+          <a:bodyPr/>
+          <a:lstStyle/>
+          <a:p>
+            <a:pPr algn="ctr"/>
+            <a:r>
+              <a:rPr lang="en-US" dirty="0"/>
+              <a:t>Scope</a:t>
+            </a:r>
+            <a:r>
+              <a:rPr lang="ru-RU" dirty="0"/>
+              <a:t>(</a:t>
+            </a:r>
+            <a:r>
+              <a:rPr lang="en-US" dirty="0"/>
+              <a:t>Closure)</a:t>
+            </a:r>
+            <a:endParaRPr lang="ru-RU" dirty="0"/>
+          </a:p>
+        </p:txBody>
+      </p:sp>
+      <p:sp>
+        <p:nvSpPr>
+          <p:cNvPr id="3" name="Объект 2">
+            <a:extLst>
+              <a:ext uri="{FF2B5EF4-FFF2-40B4-BE49-F238E27FC236}">
+                <a16:creationId xmlns:a16="http://schemas.microsoft.com/office/drawing/2014/main" id="{D884FED1-32C1-4512-A35D-BD1E21C0EA23}"/>
+              </a:ext>
+            </a:extLst>
+          </p:cNvPr>
+          <p:cNvSpPr>
+            <a:spLocks noGrp="1"/>
+          </p:cNvSpPr>
+          <p:nvPr>
+            <p:ph idx="1"/>
+          </p:nvPr>
+        </p:nvSpPr>
+        <p:spPr>
+          <a:xfrm>
+            <a:off x="838200" y="1825625"/>
+            <a:ext cx="5430078" cy="4879976"/>
+          </a:xfrm>
+        </p:spPr>
+        <p:txBody>
+          <a:bodyPr>
+            <a:normAutofit fontScale="70000" lnSpcReduction="20000"/>
+          </a:bodyPr>
+          <a:lstStyle/>
+          <a:p>
+            <a:r>
+              <a:rPr lang="en-US" dirty="0"/>
+              <a:t>It’s a place where we may use variables and functions. Scope limited by region where the variable is created</a:t>
+            </a:r>
+          </a:p>
+          <a:p>
+            <a:r>
+              <a:rPr lang="en-US" dirty="0"/>
+              <a:t>A variable created inside a function belongs to the </a:t>
+            </a:r>
+            <a:r>
+              <a:rPr lang="en-US" i="1" dirty="0">
+                <a:solidFill>
+                  <a:srgbClr val="FF0000"/>
+                </a:solidFill>
+              </a:rPr>
+              <a:t>local scope</a:t>
+            </a:r>
+            <a:r>
+              <a:rPr lang="en-US" dirty="0"/>
+              <a:t> of that function, and can only be used inside that function</a:t>
+            </a:r>
+          </a:p>
+          <a:p>
+            <a:r>
+              <a:rPr lang="en-US" dirty="0"/>
+              <a:t>A variable created in the main body of the Python code is a global variable and belongs to the </a:t>
+            </a:r>
+            <a:r>
+              <a:rPr lang="en-US" dirty="0">
+                <a:solidFill>
+                  <a:srgbClr val="FF0000"/>
+                </a:solidFill>
+              </a:rPr>
+              <a:t>global scope</a:t>
+            </a:r>
+            <a:r>
+              <a:rPr lang="en-US" dirty="0"/>
+              <a:t>. Global variables are available from within any scope, global and local</a:t>
+            </a:r>
+          </a:p>
+          <a:p>
+            <a:r>
+              <a:rPr lang="en-US" dirty="0"/>
+              <a:t>If you operate with the same variable name inside and outside of a function, Python will treat them as two separate variables.</a:t>
+            </a:r>
+          </a:p>
+          <a:p>
+            <a:r>
+              <a:rPr lang="en-US" dirty="0"/>
+              <a:t>If you need to create a global variable, but are stuck in the local scope, you can use the </a:t>
+            </a:r>
+            <a:r>
+              <a:rPr lang="en-US" dirty="0">
+                <a:solidFill>
+                  <a:srgbClr val="FF0000"/>
+                </a:solidFill>
+              </a:rPr>
+              <a:t>global</a:t>
+            </a:r>
+            <a:r>
+              <a:rPr lang="en-US" dirty="0"/>
+              <a:t> keyword.</a:t>
+            </a:r>
+          </a:p>
+          <a:p>
+            <a:r>
+              <a:rPr lang="en-US" dirty="0"/>
+              <a:t>Also, use the </a:t>
+            </a:r>
+            <a:r>
+              <a:rPr lang="en-US" dirty="0">
+                <a:solidFill>
+                  <a:srgbClr val="FF0000"/>
+                </a:solidFill>
+              </a:rPr>
+              <a:t>global</a:t>
+            </a:r>
+            <a:r>
+              <a:rPr lang="en-US" dirty="0"/>
+              <a:t> keyword if you want to make a change to a global variable inside a function</a:t>
+            </a:r>
+          </a:p>
+          <a:p>
+            <a:endParaRPr lang="en-US" dirty="0"/>
+          </a:p>
+          <a:p>
+            <a:endParaRPr lang="en-US" dirty="0"/>
+          </a:p>
+          <a:p>
+            <a:endParaRPr lang="en-US" dirty="0"/>
+          </a:p>
+          <a:p>
+            <a:endParaRPr lang="ru-RU" dirty="0"/>
+          </a:p>
+        </p:txBody>
+      </p:sp>
+      <p:pic>
+        <p:nvPicPr>
+          <p:cNvPr id="18" name="Рисунок 17">
+            <a:extLst>
+              <a:ext uri="{FF2B5EF4-FFF2-40B4-BE49-F238E27FC236}">
+                <a16:creationId xmlns:a16="http://schemas.microsoft.com/office/drawing/2014/main" id="{4A345E72-8944-44C2-9F66-C98442B07249}"/>
+              </a:ext>
+            </a:extLst>
+          </p:cNvPr>
+          <p:cNvPicPr>
+            <a:picLocks noChangeAspect="1"/>
+          </p:cNvPicPr>
+          <p:nvPr/>
+        </p:nvPicPr>
+        <p:blipFill>
+          <a:blip r:embed="rId2"/>
+          <a:stretch>
+            <a:fillRect/>
+          </a:stretch>
+        </p:blipFill>
+        <p:spPr>
+          <a:xfrm>
+            <a:off x="6444697" y="1825625"/>
+            <a:ext cx="3573945" cy="1171975"/>
+          </a:xfrm>
+          <a:prstGeom prst="rect">
+            <a:avLst/>
+          </a:prstGeom>
+        </p:spPr>
+      </p:pic>
+      <p:pic>
+        <p:nvPicPr>
+          <p:cNvPr id="19" name="Рисунок 18">
+            <a:extLst>
+              <a:ext uri="{FF2B5EF4-FFF2-40B4-BE49-F238E27FC236}">
+                <a16:creationId xmlns:a16="http://schemas.microsoft.com/office/drawing/2014/main" id="{13CD212E-C994-40A3-AEB5-AF0D3A3BCE5D}"/>
+              </a:ext>
+            </a:extLst>
+          </p:cNvPr>
+          <p:cNvPicPr>
+            <a:picLocks noChangeAspect="1"/>
+          </p:cNvPicPr>
+          <p:nvPr/>
+        </p:nvPicPr>
+        <p:blipFill>
+          <a:blip r:embed="rId3"/>
+          <a:stretch>
+            <a:fillRect/>
+          </a:stretch>
+        </p:blipFill>
+        <p:spPr>
+          <a:xfrm>
+            <a:off x="6444697" y="3132537"/>
+            <a:ext cx="1506608" cy="1209531"/>
+          </a:xfrm>
+          <a:prstGeom prst="rect">
+            <a:avLst/>
+          </a:prstGeom>
+        </p:spPr>
+      </p:pic>
+      <p:pic>
+        <p:nvPicPr>
+          <p:cNvPr id="20" name="Рисунок 19">
+            <a:extLst>
+              <a:ext uri="{FF2B5EF4-FFF2-40B4-BE49-F238E27FC236}">
+                <a16:creationId xmlns:a16="http://schemas.microsoft.com/office/drawing/2014/main" id="{3B44B7EA-0E3E-41A2-AD7E-D28BC05B450C}"/>
+              </a:ext>
+            </a:extLst>
+          </p:cNvPr>
+          <p:cNvPicPr>
+            <a:picLocks noChangeAspect="1"/>
+          </p:cNvPicPr>
+          <p:nvPr/>
+        </p:nvPicPr>
+        <p:blipFill>
+          <a:blip r:embed="rId4"/>
+          <a:stretch>
+            <a:fillRect/>
+          </a:stretch>
+        </p:blipFill>
+        <p:spPr>
+          <a:xfrm>
+            <a:off x="6444697" y="4460440"/>
+            <a:ext cx="1639129" cy="2040548"/>
+          </a:xfrm>
+          <a:prstGeom prst="rect">
+            <a:avLst/>
+          </a:prstGeom>
+        </p:spPr>
+      </p:pic>
+      <p:sp>
+        <p:nvSpPr>
+          <p:cNvPr id="21" name="TextBox 20">
+            <a:extLst>
+              <a:ext uri="{FF2B5EF4-FFF2-40B4-BE49-F238E27FC236}">
+                <a16:creationId xmlns:a16="http://schemas.microsoft.com/office/drawing/2014/main" id="{D2203179-5BA6-44DB-8ED2-D64953630A40}"/>
+              </a:ext>
+            </a:extLst>
+          </p:cNvPr>
+          <p:cNvSpPr txBox="1"/>
+          <p:nvPr/>
+        </p:nvSpPr>
+        <p:spPr>
+          <a:xfrm>
+            <a:off x="10429461" y="1690688"/>
+            <a:ext cx="1457739" cy="646331"/>
+          </a:xfrm>
+          <a:prstGeom prst="rect">
+            <a:avLst/>
+          </a:prstGeom>
+          <a:noFill/>
+        </p:spPr>
+        <p:txBody>
+          <a:bodyPr wrap="square" rtlCol="0">
+            <a:spAutoFit/>
+          </a:bodyPr>
+          <a:lstStyle/>
+          <a:p>
+            <a:r>
+              <a:rPr lang="en-US" dirty="0"/>
+              <a:t>Local Scope</a:t>
+            </a:r>
+          </a:p>
+          <a:p>
+            <a:endParaRPr lang="ru-RU" dirty="0"/>
+          </a:p>
+        </p:txBody>
+      </p:sp>
+      <p:sp>
+        <p:nvSpPr>
+          <p:cNvPr id="22" name="TextBox 21">
+            <a:extLst>
+              <a:ext uri="{FF2B5EF4-FFF2-40B4-BE49-F238E27FC236}">
+                <a16:creationId xmlns:a16="http://schemas.microsoft.com/office/drawing/2014/main" id="{88443131-E0EC-4741-8764-4C41760FBFC6}"/>
+              </a:ext>
+            </a:extLst>
+          </p:cNvPr>
+          <p:cNvSpPr txBox="1"/>
+          <p:nvPr/>
+        </p:nvSpPr>
+        <p:spPr>
+          <a:xfrm>
+            <a:off x="8772938" y="3179040"/>
+            <a:ext cx="1457739" cy="369332"/>
+          </a:xfrm>
+          <a:prstGeom prst="rect">
+            <a:avLst/>
+          </a:prstGeom>
+          <a:noFill/>
+        </p:spPr>
+        <p:txBody>
+          <a:bodyPr wrap="square" rtlCol="0">
+            <a:spAutoFit/>
+          </a:bodyPr>
+          <a:lstStyle/>
+          <a:p>
+            <a:r>
+              <a:rPr lang="en-US" dirty="0"/>
+              <a:t>Global Scope</a:t>
+            </a:r>
+            <a:endParaRPr lang="ru-RU" dirty="0"/>
+          </a:p>
+        </p:txBody>
+      </p:sp>
+      <p:cxnSp>
+        <p:nvCxnSpPr>
+          <p:cNvPr id="24" name="Прямая со стрелкой 23">
+            <a:extLst>
+              <a:ext uri="{FF2B5EF4-FFF2-40B4-BE49-F238E27FC236}">
+                <a16:creationId xmlns:a16="http://schemas.microsoft.com/office/drawing/2014/main" id="{91F8A2BA-7876-4A08-B78A-1F72DB11F1C4}"/>
+              </a:ext>
+            </a:extLst>
+          </p:cNvPr>
+          <p:cNvCxnSpPr>
+            <a:cxnSpLocks/>
+          </p:cNvCxnSpPr>
+          <p:nvPr/>
+        </p:nvCxnSpPr>
+        <p:spPr>
+          <a:xfrm flipH="1">
+            <a:off x="7580243" y="1825625"/>
+            <a:ext cx="2849218" cy="307975"/>
+          </a:xfrm>
+          <a:prstGeom prst="straightConnector1">
+            <a:avLst/>
+          </a:prstGeom>
+          <a:ln>
+            <a:tailEnd type="triangle"/>
+          </a:ln>
+        </p:spPr>
+        <p:style>
+          <a:lnRef idx="3">
+            <a:schemeClr val="accent2"/>
+          </a:lnRef>
+          <a:fillRef idx="0">
+            <a:schemeClr val="accent2"/>
+          </a:fillRef>
+          <a:effectRef idx="2">
+            <a:schemeClr val="accent2"/>
+          </a:effectRef>
+          <a:fontRef idx="minor">
+            <a:schemeClr val="tx1"/>
+          </a:fontRef>
+        </p:style>
+      </p:cxnSp>
+      <p:cxnSp>
+        <p:nvCxnSpPr>
+          <p:cNvPr id="26" name="Прямая со стрелкой 25">
+            <a:extLst>
+              <a:ext uri="{FF2B5EF4-FFF2-40B4-BE49-F238E27FC236}">
+                <a16:creationId xmlns:a16="http://schemas.microsoft.com/office/drawing/2014/main" id="{18BA1C47-E4D4-4AC7-B918-F4A391D50979}"/>
+              </a:ext>
+            </a:extLst>
+          </p:cNvPr>
+          <p:cNvCxnSpPr>
+            <a:cxnSpLocks/>
+          </p:cNvCxnSpPr>
+          <p:nvPr/>
+        </p:nvCxnSpPr>
+        <p:spPr>
+          <a:xfrm flipH="1" flipV="1">
+            <a:off x="7792278" y="3179040"/>
+            <a:ext cx="980660" cy="197918"/>
+          </a:xfrm>
+          <a:prstGeom prst="straightConnector1">
+            <a:avLst/>
+          </a:prstGeom>
+          <a:ln>
+            <a:tailEnd type="triangle"/>
+          </a:ln>
+        </p:spPr>
+        <p:style>
+          <a:lnRef idx="3">
+            <a:schemeClr val="accent2"/>
+          </a:lnRef>
+          <a:fillRef idx="0">
+            <a:schemeClr val="accent2"/>
+          </a:fillRef>
+          <a:effectRef idx="2">
+            <a:schemeClr val="accent2"/>
+          </a:effectRef>
+          <a:fontRef idx="minor">
+            <a:schemeClr val="tx1"/>
+          </a:fontRef>
+        </p:style>
+      </p:cxnSp>
+      <p:sp>
+        <p:nvSpPr>
+          <p:cNvPr id="28" name="Прямоугольник 27">
+            <a:extLst>
+              <a:ext uri="{FF2B5EF4-FFF2-40B4-BE49-F238E27FC236}">
+                <a16:creationId xmlns:a16="http://schemas.microsoft.com/office/drawing/2014/main" id="{9CB798CE-5DD6-4A84-B460-8B00C07F8BDC}"/>
+              </a:ext>
+            </a:extLst>
+          </p:cNvPr>
+          <p:cNvSpPr/>
+          <p:nvPr/>
+        </p:nvSpPr>
+        <p:spPr>
+          <a:xfrm>
+            <a:off x="6573078" y="1987826"/>
+            <a:ext cx="1007166" cy="543340"/>
+          </a:xfrm>
+          <a:prstGeom prst="rect">
+            <a:avLst/>
+          </a:prstGeom>
+          <a:noFill/>
+          <a:ln w="9525" cap="flat" cmpd="sng" algn="ctr">
+            <a:solidFill>
+              <a:schemeClr val="accent2"/>
+            </a:solidFill>
+            <a:prstDash val="solid"/>
+            <a:round/>
+            <a:headEnd type="none" w="med" len="med"/>
+            <a:tailEnd type="none" w="med" len="med"/>
+          </a:ln>
+        </p:spPr>
+        <p:style>
+          <a:lnRef idx="0">
+            <a:scrgbClr r="0" g="0" b="0"/>
+          </a:lnRef>
+          <a:fillRef idx="0">
+            <a:scrgbClr r="0" g="0" b="0"/>
+          </a:fillRef>
+          <a:effectRef idx="0">
+            <a:scrgbClr r="0" g="0" b="0"/>
+          </a:effectRef>
+          <a:fontRef idx="minor">
+            <a:schemeClr val="accent2"/>
+          </a:fontRef>
+        </p:style>
+        <p:txBody>
+          <a:bodyPr rtlCol="0" anchor="ctr"/>
+          <a:lstStyle/>
+          <a:p>
+            <a:pPr algn="ctr"/>
+            <a:endParaRPr lang="ru-RU"/>
+          </a:p>
+        </p:txBody>
+      </p:sp>
+      <p:sp>
+        <p:nvSpPr>
+          <p:cNvPr id="29" name="Прямоугольник 28">
+            <a:extLst>
+              <a:ext uri="{FF2B5EF4-FFF2-40B4-BE49-F238E27FC236}">
+                <a16:creationId xmlns:a16="http://schemas.microsoft.com/office/drawing/2014/main" id="{36921629-2E51-4AAA-95C1-D8674ED5E15B}"/>
+              </a:ext>
+            </a:extLst>
+          </p:cNvPr>
+          <p:cNvSpPr/>
+          <p:nvPr/>
+        </p:nvSpPr>
+        <p:spPr>
+          <a:xfrm>
+            <a:off x="6444697" y="3132537"/>
+            <a:ext cx="1347581" cy="1171975"/>
+          </a:xfrm>
+          <a:prstGeom prst="rect">
+            <a:avLst/>
+          </a:prstGeom>
+          <a:noFill/>
+          <a:ln w="9525" cap="flat" cmpd="sng" algn="ctr">
+            <a:solidFill>
+              <a:schemeClr val="accent2"/>
+            </a:solidFill>
+            <a:prstDash val="solid"/>
+            <a:round/>
+            <a:headEnd type="none" w="med" len="med"/>
+            <a:tailEnd type="none" w="med" len="med"/>
+          </a:ln>
+        </p:spPr>
+        <p:style>
+          <a:lnRef idx="0">
+            <a:scrgbClr r="0" g="0" b="0"/>
+          </a:lnRef>
+          <a:fillRef idx="0">
+            <a:scrgbClr r="0" g="0" b="0"/>
+          </a:fillRef>
+          <a:effectRef idx="0">
+            <a:scrgbClr r="0" g="0" b="0"/>
+          </a:effectRef>
+          <a:fontRef idx="minor">
+            <a:schemeClr val="accent2"/>
+          </a:fontRef>
+        </p:style>
+        <p:txBody>
+          <a:bodyPr rtlCol="0" anchor="ctr"/>
+          <a:lstStyle/>
+          <a:p>
+            <a:pPr algn="ctr"/>
+            <a:endParaRPr lang="ru-RU"/>
+          </a:p>
+        </p:txBody>
+      </p:sp>
+    </p:spTree>
+    <p:extLst>
+      <p:ext uri="{BB962C8B-B14F-4D97-AF65-F5344CB8AC3E}">
+        <p14:creationId xmlns:p14="http://schemas.microsoft.com/office/powerpoint/2010/main" val="1408040424"/>
+      </p:ext>
+    </p:extLst>
+  </p:cSld>
+  <p:clrMapOvr>
+    <a:masterClrMapping/>
+  </p:clrMapOvr>
+</p:sld>
+</file>
+
+<file path=ppt/slides/slide55.xml><?xml version="1.0" encoding="utf-8"?>
+<p:sld xmlns:a="http://schemas.openxmlformats.org/drawingml/2006/main" xmlns:r="http://schemas.openxmlformats.org/officeDocument/2006/relationships" xmlns:p="http://schemas.openxmlformats.org/presentationml/2006/main">
+  <p:cSld>
+    <p:spTree>
+      <p:nvGrpSpPr>
+        <p:cNvPr id="1" name=""/>
+        <p:cNvGrpSpPr/>
+        <p:nvPr/>
+      </p:nvGrpSpPr>
+      <p:grpSpPr>
+        <a:xfrm>
+          <a:off x="0" y="0"/>
+          <a:ext cx="0" cy="0"/>
+          <a:chOff x="0" y="0"/>
+          <a:chExt cx="0" cy="0"/>
+        </a:xfrm>
+      </p:grpSpPr>
+      <p:sp>
+        <p:nvSpPr>
           <p:cNvPr id="2" name="Заголовок 1">
             <a:extLst>
               <a:ext uri="{FF2B5EF4-FFF2-40B4-BE49-F238E27FC236}">
@@ -17272,7 +18452,7 @@
 </p:sld>
 </file>
 
-<file path=ppt/slides/slide51.xml><?xml version="1.0" encoding="utf-8"?>
+<file path=ppt/slides/slide56.xml><?xml version="1.0" encoding="utf-8"?>
 <p:sld xmlns:a="http://schemas.openxmlformats.org/drawingml/2006/main" xmlns:r="http://schemas.openxmlformats.org/officeDocument/2006/relationships" xmlns:p="http://schemas.openxmlformats.org/presentationml/2006/main">
   <p:cSld>
     <p:spTree>
@@ -17574,7 +18754,7 @@
 </p:sld>
 </file>
 
-<file path=ppt/slides/slide52.xml><?xml version="1.0" encoding="utf-8"?>
+<file path=ppt/slides/slide57.xml><?xml version="1.0" encoding="utf-8"?>
 <p:sld xmlns:a="http://schemas.openxmlformats.org/drawingml/2006/main" xmlns:r="http://schemas.openxmlformats.org/officeDocument/2006/relationships" xmlns:p="http://schemas.openxmlformats.org/presentationml/2006/main">
   <p:cSld>
     <p:spTree>
@@ -17972,7 +19152,7 @@
 </p:sld>
 </file>
 
-<file path=ppt/slides/slide53.xml><?xml version="1.0" encoding="utf-8"?>
+<file path=ppt/slides/slide58.xml><?xml version="1.0" encoding="utf-8"?>
 <p:sld xmlns:a="http://schemas.openxmlformats.org/drawingml/2006/main" xmlns:r="http://schemas.openxmlformats.org/officeDocument/2006/relationships" xmlns:p="http://schemas.openxmlformats.org/presentationml/2006/main">
   <p:cSld>
     <p:spTree>
@@ -18284,7 +19464,7 @@
 </p:sld>
 </file>
 
-<file path=ppt/slides/slide54.xml><?xml version="1.0" encoding="utf-8"?>
+<file path=ppt/slides/slide59.xml><?xml version="1.0" encoding="utf-8"?>
 <p:sld xmlns:a="http://schemas.openxmlformats.org/drawingml/2006/main" xmlns:r="http://schemas.openxmlformats.org/officeDocument/2006/relationships" xmlns:p="http://schemas.openxmlformats.org/presentationml/2006/main">
   <p:cSld>
     <p:spTree>
@@ -18389,15 +19569,7 @@
             <a:pPr lvl="1"/>
             <a:r>
               <a:rPr lang="en-US" dirty="0"/>
-              <a:t>You may provide all characteristics </a:t>
-            </a:r>
-            <a:r>
-              <a:rPr lang="en-US" dirty="0" err="1"/>
-              <a:t>ecxept</a:t>
-            </a:r>
-            <a:r>
-              <a:rPr lang="en-US" dirty="0"/>
-              <a:t> id, but required always the only name. Other defaults it is health – 20 , damage – 10. Manage id as you want</a:t>
+              <a:t>You may provide all characteristics except id, but required always the only name. Other defaults it is health – 20 , damage – 10. Manage id as you want</a:t>
             </a:r>
           </a:p>
           <a:p>
@@ -18617,7 +19789,246 @@
 </p:sld>
 </file>
 
-<file path=ppt/slides/slide55.xml><?xml version="1.0" encoding="utf-8"?>
+<file path=ppt/slides/slide6.xml><?xml version="1.0" encoding="utf-8"?>
+<p:sld xmlns:a="http://schemas.openxmlformats.org/drawingml/2006/main" xmlns:r="http://schemas.openxmlformats.org/officeDocument/2006/relationships" xmlns:p="http://schemas.openxmlformats.org/presentationml/2006/main">
+  <p:cSld>
+    <p:spTree>
+      <p:nvGrpSpPr>
+        <p:cNvPr id="1" name=""/>
+        <p:cNvGrpSpPr/>
+        <p:nvPr/>
+      </p:nvGrpSpPr>
+      <p:grpSpPr>
+        <a:xfrm>
+          <a:off x="0" y="0"/>
+          <a:ext cx="0" cy="0"/>
+          <a:chOff x="0" y="0"/>
+          <a:chExt cx="0" cy="0"/>
+        </a:xfrm>
+      </p:grpSpPr>
+      <p:sp>
+        <p:nvSpPr>
+          <p:cNvPr id="6" name="Прямоугольник 5"/>
+          <p:cNvSpPr/>
+          <p:nvPr/>
+        </p:nvSpPr>
+        <p:spPr>
+          <a:xfrm>
+            <a:off x="4315968" y="1060704"/>
+            <a:ext cx="3639312" cy="219456"/>
+          </a:xfrm>
+          <a:prstGeom prst="rect">
+            <a:avLst/>
+          </a:prstGeom>
+          <a:solidFill>
+            <a:srgbClr val="65F8FF"/>
+          </a:solidFill>
+          <a:ln>
+            <a:noFill/>
+          </a:ln>
+        </p:spPr>
+        <p:style>
+          <a:lnRef idx="2">
+            <a:schemeClr val="accent1">
+              <a:shade val="50000"/>
+            </a:schemeClr>
+          </a:lnRef>
+          <a:fillRef idx="1">
+            <a:schemeClr val="accent1"/>
+          </a:fillRef>
+          <a:effectRef idx="0">
+            <a:schemeClr val="accent1"/>
+          </a:effectRef>
+          <a:fontRef idx="minor">
+            <a:schemeClr val="lt1"/>
+          </a:fontRef>
+        </p:style>
+        <p:txBody>
+          <a:bodyPr rtlCol="0" anchor="ctr"/>
+          <a:lstStyle/>
+          <a:p>
+            <a:pPr algn="ctr"/>
+            <a:endParaRPr lang="ru-RU" dirty="0"/>
+          </a:p>
+        </p:txBody>
+      </p:sp>
+      <p:sp>
+        <p:nvSpPr>
+          <p:cNvPr id="2" name="Заголовок 1"/>
+          <p:cNvSpPr>
+            <a:spLocks noGrp="1"/>
+          </p:cNvSpPr>
+          <p:nvPr>
+            <p:ph type="title"/>
+          </p:nvPr>
+        </p:nvSpPr>
+        <p:spPr/>
+        <p:txBody>
+          <a:bodyPr/>
+          <a:lstStyle/>
+          <a:p>
+            <a:pPr algn="ctr"/>
+            <a:r>
+              <a:rPr lang="en-US" b="1" dirty="0"/>
+              <a:t>Math Operators</a:t>
+            </a:r>
+            <a:endParaRPr lang="ru-RU" b="1" dirty="0"/>
+          </a:p>
+        </p:txBody>
+      </p:sp>
+      <p:sp>
+        <p:nvSpPr>
+          <p:cNvPr id="3" name="Содержимое 2"/>
+          <p:cNvSpPr>
+            <a:spLocks noGrp="1"/>
+          </p:cNvSpPr>
+          <p:nvPr>
+            <p:ph idx="1"/>
+          </p:nvPr>
+        </p:nvSpPr>
+        <p:spPr>
+          <a:xfrm>
+            <a:off x="1353312" y="1825625"/>
+            <a:ext cx="10000488" cy="4351338"/>
+          </a:xfrm>
+        </p:spPr>
+        <p:txBody>
+          <a:bodyPr>
+            <a:normAutofit lnSpcReduction="10000"/>
+          </a:bodyPr>
+          <a:lstStyle/>
+          <a:p>
+            <a:r>
+              <a:rPr lang="en-US" dirty="0"/>
+              <a:t>Addition</a:t>
+            </a:r>
+          </a:p>
+          <a:p>
+            <a:r>
+              <a:rPr lang="en-US" dirty="0"/>
+              <a:t>Subtraction</a:t>
+            </a:r>
+          </a:p>
+          <a:p>
+            <a:r>
+              <a:rPr lang="en-US" dirty="0"/>
+              <a:t>Multiplication</a:t>
+            </a:r>
+            <a:endParaRPr lang="ru-RU" dirty="0"/>
+          </a:p>
+          <a:p>
+            <a:r>
+              <a:rPr lang="en-US" dirty="0"/>
+              <a:t>Division</a:t>
+            </a:r>
+          </a:p>
+          <a:p>
+            <a:r>
+              <a:rPr lang="en-US" dirty="0"/>
+              <a:t>Modulus</a:t>
+            </a:r>
+          </a:p>
+          <a:p>
+            <a:r>
+              <a:rPr lang="en-US" dirty="0"/>
+              <a:t>Exponent</a:t>
+            </a:r>
+          </a:p>
+          <a:p>
+            <a:endParaRPr lang="en-US" dirty="0"/>
+          </a:p>
+          <a:p>
+            <a:endParaRPr lang="en-US" dirty="0"/>
+          </a:p>
+          <a:p>
+            <a:r>
+              <a:rPr lang="en-US" dirty="0"/>
+              <a:t>It may used as variable assignment </a:t>
+            </a:r>
+            <a:r>
+              <a:rPr lang="en-US" dirty="0">
+                <a:solidFill>
+                  <a:srgbClr val="C00000"/>
+                </a:solidFill>
+              </a:rPr>
+              <a:t>+=</a:t>
+            </a:r>
+            <a:r>
+              <a:rPr lang="en-US" dirty="0"/>
+              <a:t>, </a:t>
+            </a:r>
+            <a:r>
+              <a:rPr lang="en-US" dirty="0">
+                <a:solidFill>
+                  <a:srgbClr val="C00000"/>
+                </a:solidFill>
+              </a:rPr>
+              <a:t>-=</a:t>
+            </a:r>
+            <a:r>
+              <a:rPr lang="en-US" dirty="0"/>
+              <a:t>, </a:t>
+            </a:r>
+            <a:r>
+              <a:rPr lang="en-US" dirty="0">
+                <a:solidFill>
+                  <a:srgbClr val="C00000"/>
+                </a:solidFill>
+              </a:rPr>
+              <a:t>**=</a:t>
+            </a:r>
+            <a:r>
+              <a:rPr lang="en-US" dirty="0"/>
+              <a:t> and other</a:t>
+            </a:r>
+          </a:p>
+          <a:p>
+            <a:endParaRPr lang="ru-RU" dirty="0"/>
+          </a:p>
+        </p:txBody>
+      </p:sp>
+      <p:pic>
+        <p:nvPicPr>
+          <p:cNvPr id="5123" name="Picture 3"/>
+          <p:cNvPicPr>
+            <a:picLocks noChangeAspect="1" noChangeArrowheads="1"/>
+          </p:cNvPicPr>
+          <p:nvPr/>
+        </p:nvPicPr>
+        <p:blipFill>
+          <a:blip r:embed="rId2"/>
+          <a:srcRect/>
+          <a:stretch>
+            <a:fillRect/>
+          </a:stretch>
+        </p:blipFill>
+        <p:spPr bwMode="auto">
+          <a:xfrm>
+            <a:off x="4719446" y="1504760"/>
+            <a:ext cx="3510153" cy="3902464"/>
+          </a:xfrm>
+          <a:prstGeom prst="rect">
+            <a:avLst/>
+          </a:prstGeom>
+          <a:noFill/>
+          <a:ln w="9525">
+            <a:noFill/>
+            <a:miter lim="800000"/>
+            <a:headEnd/>
+            <a:tailEnd/>
+          </a:ln>
+          <a:effectLst/>
+        </p:spPr>
+      </p:pic>
+    </p:spTree>
+  </p:cSld>
+  <p:clrMapOvr>
+    <a:masterClrMapping/>
+  </p:clrMapOvr>
+</p:sld>
+</file>
+
+<file path=ppt/slides/slide60.xml><?xml version="1.0" encoding="utf-8"?>
 <p:sld xmlns:a="http://schemas.openxmlformats.org/drawingml/2006/main" xmlns:r="http://schemas.openxmlformats.org/officeDocument/2006/relationships" xmlns:p="http://schemas.openxmlformats.org/presentationml/2006/main">
   <p:cSld>
     <p:spTree>
@@ -18673,245 +20084,6 @@
         <p14:creationId xmlns:p14="http://schemas.microsoft.com/office/powerpoint/2010/main" val="1822150012"/>
       </p:ext>
     </p:extLst>
-  </p:cSld>
-  <p:clrMapOvr>
-    <a:masterClrMapping/>
-  </p:clrMapOvr>
-</p:sld>
-</file>
-
-<file path=ppt/slides/slide6.xml><?xml version="1.0" encoding="utf-8"?>
-<p:sld xmlns:a="http://schemas.openxmlformats.org/drawingml/2006/main" xmlns:r="http://schemas.openxmlformats.org/officeDocument/2006/relationships" xmlns:p="http://schemas.openxmlformats.org/presentationml/2006/main">
-  <p:cSld>
-    <p:spTree>
-      <p:nvGrpSpPr>
-        <p:cNvPr id="1" name=""/>
-        <p:cNvGrpSpPr/>
-        <p:nvPr/>
-      </p:nvGrpSpPr>
-      <p:grpSpPr>
-        <a:xfrm>
-          <a:off x="0" y="0"/>
-          <a:ext cx="0" cy="0"/>
-          <a:chOff x="0" y="0"/>
-          <a:chExt cx="0" cy="0"/>
-        </a:xfrm>
-      </p:grpSpPr>
-      <p:sp>
-        <p:nvSpPr>
-          <p:cNvPr id="6" name="Прямоугольник 5"/>
-          <p:cNvSpPr/>
-          <p:nvPr/>
-        </p:nvSpPr>
-        <p:spPr>
-          <a:xfrm>
-            <a:off x="4315968" y="1060704"/>
-            <a:ext cx="3639312" cy="219456"/>
-          </a:xfrm>
-          <a:prstGeom prst="rect">
-            <a:avLst/>
-          </a:prstGeom>
-          <a:solidFill>
-            <a:srgbClr val="65F8FF"/>
-          </a:solidFill>
-          <a:ln>
-            <a:noFill/>
-          </a:ln>
-        </p:spPr>
-        <p:style>
-          <a:lnRef idx="2">
-            <a:schemeClr val="accent1">
-              <a:shade val="50000"/>
-            </a:schemeClr>
-          </a:lnRef>
-          <a:fillRef idx="1">
-            <a:schemeClr val="accent1"/>
-          </a:fillRef>
-          <a:effectRef idx="0">
-            <a:schemeClr val="accent1"/>
-          </a:effectRef>
-          <a:fontRef idx="minor">
-            <a:schemeClr val="lt1"/>
-          </a:fontRef>
-        </p:style>
-        <p:txBody>
-          <a:bodyPr rtlCol="0" anchor="ctr"/>
-          <a:lstStyle/>
-          <a:p>
-            <a:pPr algn="ctr"/>
-            <a:endParaRPr lang="ru-RU" dirty="0"/>
-          </a:p>
-        </p:txBody>
-      </p:sp>
-      <p:sp>
-        <p:nvSpPr>
-          <p:cNvPr id="2" name="Заголовок 1"/>
-          <p:cNvSpPr>
-            <a:spLocks noGrp="1"/>
-          </p:cNvSpPr>
-          <p:nvPr>
-            <p:ph type="title"/>
-          </p:nvPr>
-        </p:nvSpPr>
-        <p:spPr/>
-        <p:txBody>
-          <a:bodyPr/>
-          <a:lstStyle/>
-          <a:p>
-            <a:pPr algn="ctr"/>
-            <a:r>
-              <a:rPr lang="en-US" b="1" dirty="0"/>
-              <a:t>Math Operators</a:t>
-            </a:r>
-            <a:endParaRPr lang="ru-RU" b="1" dirty="0"/>
-          </a:p>
-        </p:txBody>
-      </p:sp>
-      <p:sp>
-        <p:nvSpPr>
-          <p:cNvPr id="3" name="Содержимое 2"/>
-          <p:cNvSpPr>
-            <a:spLocks noGrp="1"/>
-          </p:cNvSpPr>
-          <p:nvPr>
-            <p:ph idx="1"/>
-          </p:nvPr>
-        </p:nvSpPr>
-        <p:spPr>
-          <a:xfrm>
-            <a:off x="1353312" y="1825625"/>
-            <a:ext cx="10000488" cy="4351338"/>
-          </a:xfrm>
-        </p:spPr>
-        <p:txBody>
-          <a:bodyPr>
-            <a:normAutofit lnSpcReduction="10000"/>
-          </a:bodyPr>
-          <a:lstStyle/>
-          <a:p>
-            <a:r>
-              <a:rPr lang="en-US" dirty="0"/>
-              <a:t>Addition</a:t>
-            </a:r>
-          </a:p>
-          <a:p>
-            <a:r>
-              <a:rPr lang="en-US" dirty="0"/>
-              <a:t>Subtraction</a:t>
-            </a:r>
-          </a:p>
-          <a:p>
-            <a:r>
-              <a:rPr lang="en-US" dirty="0"/>
-              <a:t>Multiplication</a:t>
-            </a:r>
-            <a:endParaRPr lang="ru-RU" dirty="0"/>
-          </a:p>
-          <a:p>
-            <a:r>
-              <a:rPr lang="en-US" dirty="0"/>
-              <a:t>Division</a:t>
-            </a:r>
-          </a:p>
-          <a:p>
-            <a:r>
-              <a:rPr lang="en-US" dirty="0"/>
-              <a:t>Modulus</a:t>
-            </a:r>
-          </a:p>
-          <a:p>
-            <a:r>
-              <a:rPr lang="en-US" dirty="0"/>
-              <a:t>Exponent</a:t>
-            </a:r>
-          </a:p>
-          <a:p>
-            <a:endParaRPr lang="en-US" dirty="0"/>
-          </a:p>
-          <a:p>
-            <a:endParaRPr lang="en-US" dirty="0"/>
-          </a:p>
-          <a:p>
-            <a:r>
-              <a:rPr lang="en-US" dirty="0"/>
-              <a:t>It may used as variable assignment </a:t>
-            </a:r>
-            <a:r>
-              <a:rPr lang="en-US" dirty="0">
-                <a:solidFill>
-                  <a:srgbClr val="C00000"/>
-                </a:solidFill>
-              </a:rPr>
-              <a:t>+=</a:t>
-            </a:r>
-            <a:r>
-              <a:rPr lang="en-US" dirty="0"/>
-              <a:t>, </a:t>
-            </a:r>
-            <a:r>
-              <a:rPr lang="en-US" dirty="0">
-                <a:solidFill>
-                  <a:srgbClr val="C00000"/>
-                </a:solidFill>
-              </a:rPr>
-              <a:t>-=</a:t>
-            </a:r>
-            <a:r>
-              <a:rPr lang="en-US" dirty="0"/>
-              <a:t>, </a:t>
-            </a:r>
-            <a:r>
-              <a:rPr lang="en-US" dirty="0">
-                <a:solidFill>
-                  <a:srgbClr val="C00000"/>
-                </a:solidFill>
-              </a:rPr>
-              <a:t>**=</a:t>
-            </a:r>
-            <a:r>
-              <a:rPr lang="en-US" dirty="0"/>
-              <a:t> and other</a:t>
-            </a:r>
-          </a:p>
-          <a:p>
-            <a:endParaRPr lang="ru-RU" dirty="0"/>
-          </a:p>
-        </p:txBody>
-      </p:sp>
-      <p:pic>
-        <p:nvPicPr>
-          <p:cNvPr id="5123" name="Picture 3"/>
-          <p:cNvPicPr>
-            <a:picLocks noChangeAspect="1" noChangeArrowheads="1"/>
-          </p:cNvPicPr>
-          <p:nvPr/>
-        </p:nvPicPr>
-        <p:blipFill>
-          <a:blip r:embed="rId2"/>
-          <a:srcRect/>
-          <a:stretch>
-            <a:fillRect/>
-          </a:stretch>
-        </p:blipFill>
-        <p:spPr bwMode="auto">
-          <a:xfrm>
-            <a:off x="4719446" y="1504760"/>
-            <a:ext cx="3510153" cy="3902464"/>
-          </a:xfrm>
-          <a:prstGeom prst="rect">
-            <a:avLst/>
-          </a:prstGeom>
-          <a:noFill/>
-          <a:ln w="9525">
-            <a:noFill/>
-            <a:miter lim="800000"/>
-            <a:headEnd/>
-            <a:tailEnd/>
-          </a:ln>
-          <a:effectLst/>
-        </p:spPr>
-      </p:pic>
-    </p:spTree>
   </p:cSld>
   <p:clrMapOvr>
     <a:masterClrMapping/>

</xml_diff>

<commit_message>
feat: add exceptions block
</commit_message>
<xml_diff>
--- a/python 101/python_101.pptx
+++ b/python 101/python_101.pptx
@@ -65,6 +65,9 @@
     <p:sldId id="298" r:id="rId59"/>
     <p:sldId id="309" r:id="rId60"/>
     <p:sldId id="311" r:id="rId61"/>
+    <p:sldId id="318" r:id="rId62"/>
+    <p:sldId id="319" r:id="rId63"/>
+    <p:sldId id="320" r:id="rId64"/>
   </p:sldIdLst>
   <p:sldSz cx="12192000" cy="6858000"/>
   <p:notesSz cx="6858000" cy="9144000"/>
@@ -2768,7 +2771,7 @@
             <a:fld id="{79F9FB66-DBE4-4599-9B3C-E1452FD2AC05}" type="datetimeFigureOut">
               <a:rPr lang="en-US" smtClean="0"/>
               <a:pPr/>
-              <a:t>9/20/2021</a:t>
+              <a:t>9/23/2021</a:t>
             </a:fld>
             <a:endParaRPr lang="en-US" dirty="0"/>
           </a:p>
@@ -2938,7 +2941,7 @@
             <a:fld id="{79F9FB66-DBE4-4599-9B3C-E1452FD2AC05}" type="datetimeFigureOut">
               <a:rPr lang="en-US" smtClean="0"/>
               <a:pPr/>
-              <a:t>9/20/2021</a:t>
+              <a:t>9/23/2021</a:t>
             </a:fld>
             <a:endParaRPr lang="en-US" dirty="0"/>
           </a:p>
@@ -3118,7 +3121,7 @@
             <a:fld id="{79F9FB66-DBE4-4599-9B3C-E1452FD2AC05}" type="datetimeFigureOut">
               <a:rPr lang="en-US" smtClean="0"/>
               <a:pPr/>
-              <a:t>9/20/2021</a:t>
+              <a:t>9/23/2021</a:t>
             </a:fld>
             <a:endParaRPr lang="en-US" dirty="0"/>
           </a:p>
@@ -3288,7 +3291,7 @@
             <a:fld id="{79F9FB66-DBE4-4599-9B3C-E1452FD2AC05}" type="datetimeFigureOut">
               <a:rPr lang="en-US" smtClean="0"/>
               <a:pPr/>
-              <a:t>9/20/2021</a:t>
+              <a:t>9/23/2021</a:t>
             </a:fld>
             <a:endParaRPr lang="en-US" dirty="0"/>
           </a:p>
@@ -3535,7 +3538,7 @@
             <a:fld id="{79F9FB66-DBE4-4599-9B3C-E1452FD2AC05}" type="datetimeFigureOut">
               <a:rPr lang="en-US" smtClean="0"/>
               <a:pPr/>
-              <a:t>9/20/2021</a:t>
+              <a:t>9/23/2021</a:t>
             </a:fld>
             <a:endParaRPr lang="en-US" dirty="0"/>
           </a:p>
@@ -3766,7 +3769,7 @@
             <a:fld id="{79F9FB66-DBE4-4599-9B3C-E1452FD2AC05}" type="datetimeFigureOut">
               <a:rPr lang="en-US" smtClean="0"/>
               <a:pPr/>
-              <a:t>9/20/2021</a:t>
+              <a:t>9/23/2021</a:t>
             </a:fld>
             <a:endParaRPr lang="en-US" dirty="0"/>
           </a:p>
@@ -4132,7 +4135,7 @@
             <a:fld id="{79F9FB66-DBE4-4599-9B3C-E1452FD2AC05}" type="datetimeFigureOut">
               <a:rPr lang="en-US" smtClean="0"/>
               <a:pPr/>
-              <a:t>9/20/2021</a:t>
+              <a:t>9/23/2021</a:t>
             </a:fld>
             <a:endParaRPr lang="en-US" dirty="0"/>
           </a:p>
@@ -4251,7 +4254,7 @@
             <a:fld id="{79F9FB66-DBE4-4599-9B3C-E1452FD2AC05}" type="datetimeFigureOut">
               <a:rPr lang="en-US" smtClean="0"/>
               <a:pPr/>
-              <a:t>9/20/2021</a:t>
+              <a:t>9/23/2021</a:t>
             </a:fld>
             <a:endParaRPr lang="en-US" dirty="0"/>
           </a:p>
@@ -4348,7 +4351,7 @@
             <a:fld id="{79F9FB66-DBE4-4599-9B3C-E1452FD2AC05}" type="datetimeFigureOut">
               <a:rPr lang="en-US" smtClean="0"/>
               <a:pPr/>
-              <a:t>9/20/2021</a:t>
+              <a:t>9/23/2021</a:t>
             </a:fld>
             <a:endParaRPr lang="en-US" dirty="0"/>
           </a:p>
@@ -4625,7 +4628,7 @@
             <a:fld id="{79F9FB66-DBE4-4599-9B3C-E1452FD2AC05}" type="datetimeFigureOut">
               <a:rPr lang="en-US" smtClean="0"/>
               <a:pPr/>
-              <a:t>9/20/2021</a:t>
+              <a:t>9/23/2021</a:t>
             </a:fld>
             <a:endParaRPr lang="en-US" dirty="0"/>
           </a:p>
@@ -4879,7 +4882,7 @@
             <a:fld id="{79F9FB66-DBE4-4599-9B3C-E1452FD2AC05}" type="datetimeFigureOut">
               <a:rPr lang="en-US" smtClean="0"/>
               <a:pPr/>
-              <a:t>9/20/2021</a:t>
+              <a:t>9/23/2021</a:t>
             </a:fld>
             <a:endParaRPr lang="en-US" dirty="0"/>
           </a:p>
@@ -5122,7 +5125,7 @@
             <a:fld id="{79F9FB66-DBE4-4599-9B3C-E1452FD2AC05}" type="datetimeFigureOut">
               <a:rPr lang="en-US" smtClean="0"/>
               <a:pPr/>
-              <a:t>9/20/2021</a:t>
+              <a:t>9/23/2021</a:t>
             </a:fld>
             <a:endParaRPr lang="en-US" dirty="0"/>
           </a:p>
@@ -20091,6 +20094,868 @@
 </p:sld>
 </file>
 
+<file path=ppt/slides/slide61.xml><?xml version="1.0" encoding="utf-8"?>
+<p:sld xmlns:a="http://schemas.openxmlformats.org/drawingml/2006/main" xmlns:r="http://schemas.openxmlformats.org/officeDocument/2006/relationships" xmlns:p="http://schemas.openxmlformats.org/presentationml/2006/main">
+  <p:cSld>
+    <p:spTree>
+      <p:nvGrpSpPr>
+        <p:cNvPr id="1" name=""/>
+        <p:cNvGrpSpPr/>
+        <p:nvPr/>
+      </p:nvGrpSpPr>
+      <p:grpSpPr>
+        <a:xfrm>
+          <a:off x="0" y="0"/>
+          <a:ext cx="0" cy="0"/>
+          <a:chOff x="0" y="0"/>
+          <a:chExt cx="0" cy="0"/>
+        </a:xfrm>
+      </p:grpSpPr>
+      <p:sp>
+        <p:nvSpPr>
+          <p:cNvPr id="4" name="Прямоугольник 3">
+            <a:extLst>
+              <a:ext uri="{FF2B5EF4-FFF2-40B4-BE49-F238E27FC236}">
+                <a16:creationId xmlns:a16="http://schemas.microsoft.com/office/drawing/2014/main" id="{B9B5749B-813A-45E9-BE68-8D142DB4EC99}"/>
+              </a:ext>
+            </a:extLst>
+          </p:cNvPr>
+          <p:cNvSpPr/>
+          <p:nvPr/>
+        </p:nvSpPr>
+        <p:spPr>
+          <a:xfrm>
+            <a:off x="4770783" y="967409"/>
+            <a:ext cx="2557669" cy="319259"/>
+          </a:xfrm>
+          <a:prstGeom prst="rect">
+            <a:avLst/>
+          </a:prstGeom>
+          <a:solidFill>
+            <a:srgbClr val="65F8FF"/>
+          </a:solidFill>
+          <a:ln>
+            <a:solidFill>
+              <a:srgbClr val="65F8FF"/>
+            </a:solidFill>
+          </a:ln>
+        </p:spPr>
+        <p:style>
+          <a:lnRef idx="2">
+            <a:schemeClr val="accent1">
+              <a:shade val="50000"/>
+            </a:schemeClr>
+          </a:lnRef>
+          <a:fillRef idx="1">
+            <a:schemeClr val="accent1"/>
+          </a:fillRef>
+          <a:effectRef idx="0">
+            <a:schemeClr val="accent1"/>
+          </a:effectRef>
+          <a:fontRef idx="minor">
+            <a:schemeClr val="lt1"/>
+          </a:fontRef>
+        </p:style>
+        <p:txBody>
+          <a:bodyPr rtlCol="0" anchor="ctr"/>
+          <a:lstStyle/>
+          <a:p>
+            <a:pPr algn="ctr"/>
+            <a:endParaRPr lang="ru-RU"/>
+          </a:p>
+        </p:txBody>
+      </p:sp>
+      <p:sp>
+        <p:nvSpPr>
+          <p:cNvPr id="2" name="Заголовок 1">
+            <a:extLst>
+              <a:ext uri="{FF2B5EF4-FFF2-40B4-BE49-F238E27FC236}">
+                <a16:creationId xmlns:a16="http://schemas.microsoft.com/office/drawing/2014/main" id="{63726343-FFF0-4900-83E8-117B177CEC9A}"/>
+              </a:ext>
+            </a:extLst>
+          </p:cNvPr>
+          <p:cNvSpPr>
+            <a:spLocks noGrp="1"/>
+          </p:cNvSpPr>
+          <p:nvPr>
+            <p:ph type="title"/>
+          </p:nvPr>
+        </p:nvSpPr>
+        <p:spPr/>
+        <p:txBody>
+          <a:bodyPr/>
+          <a:lstStyle/>
+          <a:p>
+            <a:pPr algn="ctr"/>
+            <a:r>
+              <a:rPr lang="en-US" dirty="0"/>
+              <a:t>Exceptions </a:t>
+            </a:r>
+            <a:endParaRPr lang="ru-RU" dirty="0"/>
+          </a:p>
+        </p:txBody>
+      </p:sp>
+      <p:sp>
+        <p:nvSpPr>
+          <p:cNvPr id="3" name="Объект 2">
+            <a:extLst>
+              <a:ext uri="{FF2B5EF4-FFF2-40B4-BE49-F238E27FC236}">
+                <a16:creationId xmlns:a16="http://schemas.microsoft.com/office/drawing/2014/main" id="{E811AC94-D91A-4EE7-8FF1-A40D69E45472}"/>
+              </a:ext>
+            </a:extLst>
+          </p:cNvPr>
+          <p:cNvSpPr>
+            <a:spLocks noGrp="1"/>
+          </p:cNvSpPr>
+          <p:nvPr>
+            <p:ph idx="1"/>
+          </p:nvPr>
+        </p:nvSpPr>
+        <p:spPr>
+          <a:xfrm>
+            <a:off x="838200" y="1825625"/>
+            <a:ext cx="5628861" cy="4495662"/>
+          </a:xfrm>
+        </p:spPr>
+        <p:txBody>
+          <a:bodyPr>
+            <a:normAutofit fontScale="92500" lnSpcReduction="10000"/>
+          </a:bodyPr>
+          <a:lstStyle/>
+          <a:p>
+            <a:r>
+              <a:rPr lang="en-US" dirty="0"/>
+              <a:t>You may notice that sometimes our program failed with errors. In python, errors are named exceptions, and we may handle them.</a:t>
+            </a:r>
+          </a:p>
+          <a:p>
+            <a:r>
+              <a:rPr lang="en-US" dirty="0"/>
+              <a:t>Before we learn how to handle an error, let’s learn how we may do a custom error</a:t>
+            </a:r>
+          </a:p>
+          <a:p>
+            <a:r>
+              <a:rPr lang="en-US" dirty="0"/>
+              <a:t>To throw (or raise) an exception, use the </a:t>
+            </a:r>
+            <a:r>
+              <a:rPr lang="en-US" dirty="0">
+                <a:solidFill>
+                  <a:srgbClr val="FF0000"/>
+                </a:solidFill>
+              </a:rPr>
+              <a:t>raise</a:t>
+            </a:r>
+            <a:r>
+              <a:rPr lang="en-US" dirty="0"/>
+              <a:t> keyword.</a:t>
+            </a:r>
+          </a:p>
+          <a:p>
+            <a:r>
+              <a:rPr lang="en-US" dirty="0"/>
+              <a:t>You can define what kind of error to raise, and the text to print to the user</a:t>
+            </a:r>
+          </a:p>
+          <a:p>
+            <a:r>
+              <a:rPr lang="en-US" dirty="0"/>
+              <a:t>All errors types you may see </a:t>
+            </a:r>
+            <a:r>
+              <a:rPr lang="en-US" dirty="0">
+                <a:hlinkClick r:id="rId2"/>
+              </a:rPr>
+              <a:t>here</a:t>
+            </a:r>
+            <a:endParaRPr lang="en-US" dirty="0"/>
+          </a:p>
+        </p:txBody>
+      </p:sp>
+      <p:pic>
+        <p:nvPicPr>
+          <p:cNvPr id="6" name="Рисунок 5">
+            <a:extLst>
+              <a:ext uri="{FF2B5EF4-FFF2-40B4-BE49-F238E27FC236}">
+                <a16:creationId xmlns:a16="http://schemas.microsoft.com/office/drawing/2014/main" id="{A360705E-3290-4904-9A37-18F74B3A1F7F}"/>
+              </a:ext>
+            </a:extLst>
+          </p:cNvPr>
+          <p:cNvPicPr>
+            <a:picLocks noChangeAspect="1"/>
+          </p:cNvPicPr>
+          <p:nvPr/>
+        </p:nvPicPr>
+        <p:blipFill>
+          <a:blip r:embed="rId3"/>
+          <a:stretch>
+            <a:fillRect/>
+          </a:stretch>
+        </p:blipFill>
+        <p:spPr>
+          <a:xfrm>
+            <a:off x="6668535" y="3164370"/>
+            <a:ext cx="4062841" cy="529259"/>
+          </a:xfrm>
+          <a:prstGeom prst="rect">
+            <a:avLst/>
+          </a:prstGeom>
+        </p:spPr>
+      </p:pic>
+      <p:pic>
+        <p:nvPicPr>
+          <p:cNvPr id="7" name="Рисунок 6">
+            <a:extLst>
+              <a:ext uri="{FF2B5EF4-FFF2-40B4-BE49-F238E27FC236}">
+                <a16:creationId xmlns:a16="http://schemas.microsoft.com/office/drawing/2014/main" id="{574BE5B1-86D2-472D-A21F-AF081955F1A0}"/>
+              </a:ext>
+            </a:extLst>
+          </p:cNvPr>
+          <p:cNvPicPr>
+            <a:picLocks noChangeAspect="1"/>
+          </p:cNvPicPr>
+          <p:nvPr/>
+        </p:nvPicPr>
+        <p:blipFill>
+          <a:blip r:embed="rId4"/>
+          <a:stretch>
+            <a:fillRect/>
+          </a:stretch>
+        </p:blipFill>
+        <p:spPr>
+          <a:xfrm>
+            <a:off x="6688099" y="4154832"/>
+            <a:ext cx="2631173" cy="529259"/>
+          </a:xfrm>
+          <a:prstGeom prst="rect">
+            <a:avLst/>
+          </a:prstGeom>
+        </p:spPr>
+      </p:pic>
+      <p:pic>
+        <p:nvPicPr>
+          <p:cNvPr id="8" name="Рисунок 7">
+            <a:extLst>
+              <a:ext uri="{FF2B5EF4-FFF2-40B4-BE49-F238E27FC236}">
+                <a16:creationId xmlns:a16="http://schemas.microsoft.com/office/drawing/2014/main" id="{87BB1835-DA8C-4270-A507-9CC7BE2E7C2F}"/>
+              </a:ext>
+            </a:extLst>
+          </p:cNvPr>
+          <p:cNvPicPr>
+            <a:picLocks noChangeAspect="1"/>
+          </p:cNvPicPr>
+          <p:nvPr/>
+        </p:nvPicPr>
+        <p:blipFill>
+          <a:blip r:embed="rId5"/>
+          <a:stretch>
+            <a:fillRect/>
+          </a:stretch>
+        </p:blipFill>
+        <p:spPr>
+          <a:xfrm>
+            <a:off x="6668535" y="4929185"/>
+            <a:ext cx="4596468" cy="755998"/>
+          </a:xfrm>
+          <a:prstGeom prst="rect">
+            <a:avLst/>
+          </a:prstGeom>
+        </p:spPr>
+      </p:pic>
+    </p:spTree>
+    <p:extLst>
+      <p:ext uri="{BB962C8B-B14F-4D97-AF65-F5344CB8AC3E}">
+        <p14:creationId xmlns:p14="http://schemas.microsoft.com/office/powerpoint/2010/main" val="4140394858"/>
+      </p:ext>
+    </p:extLst>
+  </p:cSld>
+  <p:clrMapOvr>
+    <a:masterClrMapping/>
+  </p:clrMapOvr>
+</p:sld>
+</file>
+
+<file path=ppt/slides/slide62.xml><?xml version="1.0" encoding="utf-8"?>
+<p:sld xmlns:a="http://schemas.openxmlformats.org/drawingml/2006/main" xmlns:r="http://schemas.openxmlformats.org/officeDocument/2006/relationships" xmlns:p="http://schemas.openxmlformats.org/presentationml/2006/main">
+  <p:cSld>
+    <p:spTree>
+      <p:nvGrpSpPr>
+        <p:cNvPr id="1" name=""/>
+        <p:cNvGrpSpPr/>
+        <p:nvPr/>
+      </p:nvGrpSpPr>
+      <p:grpSpPr>
+        <a:xfrm>
+          <a:off x="0" y="0"/>
+          <a:ext cx="0" cy="0"/>
+          <a:chOff x="0" y="0"/>
+          <a:chExt cx="0" cy="0"/>
+        </a:xfrm>
+      </p:grpSpPr>
+      <p:sp>
+        <p:nvSpPr>
+          <p:cNvPr id="2" name="Заголовок 1">
+            <a:extLst>
+              <a:ext uri="{FF2B5EF4-FFF2-40B4-BE49-F238E27FC236}">
+                <a16:creationId xmlns:a16="http://schemas.microsoft.com/office/drawing/2014/main" id="{163DB0C2-23B4-4FEC-B396-D915F7CBDACA}"/>
+              </a:ext>
+            </a:extLst>
+          </p:cNvPr>
+          <p:cNvSpPr>
+            <a:spLocks noGrp="1"/>
+          </p:cNvSpPr>
+          <p:nvPr>
+            <p:ph type="title"/>
+          </p:nvPr>
+        </p:nvSpPr>
+        <p:spPr/>
+        <p:txBody>
+          <a:bodyPr/>
+          <a:lstStyle/>
+          <a:p>
+            <a:pPr algn="ctr"/>
+            <a:r>
+              <a:rPr lang="en-US" dirty="0"/>
+              <a:t>Error handling</a:t>
+            </a:r>
+            <a:endParaRPr lang="ru-RU" dirty="0"/>
+          </a:p>
+        </p:txBody>
+      </p:sp>
+      <p:sp>
+        <p:nvSpPr>
+          <p:cNvPr id="3" name="Объект 2">
+            <a:extLst>
+              <a:ext uri="{FF2B5EF4-FFF2-40B4-BE49-F238E27FC236}">
+                <a16:creationId xmlns:a16="http://schemas.microsoft.com/office/drawing/2014/main" id="{F8051DDF-3FEA-4CC7-A2FC-205B2950423A}"/>
+              </a:ext>
+            </a:extLst>
+          </p:cNvPr>
+          <p:cNvSpPr>
+            <a:spLocks noGrp="1"/>
+          </p:cNvSpPr>
+          <p:nvPr>
+            <p:ph idx="1"/>
+          </p:nvPr>
+        </p:nvSpPr>
+        <p:spPr>
+          <a:xfrm>
+            <a:off x="838200" y="1825624"/>
+            <a:ext cx="5483087" cy="5032375"/>
+          </a:xfrm>
+        </p:spPr>
+        <p:txBody>
+          <a:bodyPr>
+            <a:normAutofit fontScale="62500" lnSpcReduction="20000"/>
+          </a:bodyPr>
+          <a:lstStyle/>
+          <a:p>
+            <a:r>
+              <a:rPr lang="en-US" dirty="0"/>
+              <a:t>There are 4 blocks for doing it  - </a:t>
+            </a:r>
+            <a:r>
+              <a:rPr lang="en-US" dirty="0">
+                <a:solidFill>
+                  <a:srgbClr val="FF0000"/>
+                </a:solidFill>
+              </a:rPr>
+              <a:t>try</a:t>
+            </a:r>
+            <a:r>
+              <a:rPr lang="en-US" dirty="0"/>
+              <a:t>, </a:t>
+            </a:r>
+            <a:r>
+              <a:rPr lang="en-US" dirty="0">
+                <a:solidFill>
+                  <a:srgbClr val="FF0000"/>
+                </a:solidFill>
+              </a:rPr>
+              <a:t>except</a:t>
+            </a:r>
+            <a:r>
+              <a:rPr lang="en-US" dirty="0"/>
+              <a:t>, </a:t>
+            </a:r>
+            <a:r>
+              <a:rPr lang="en-US" dirty="0">
+                <a:solidFill>
+                  <a:srgbClr val="FF0000"/>
+                </a:solidFill>
+              </a:rPr>
+              <a:t>else</a:t>
+            </a:r>
+            <a:r>
+              <a:rPr lang="en-US" dirty="0"/>
+              <a:t> and </a:t>
+            </a:r>
+            <a:r>
+              <a:rPr lang="en-US" dirty="0">
+                <a:solidFill>
+                  <a:srgbClr val="FF0000"/>
+                </a:solidFill>
+              </a:rPr>
+              <a:t>finally</a:t>
+            </a:r>
+          </a:p>
+          <a:p>
+            <a:r>
+              <a:rPr lang="en-US" dirty="0"/>
+              <a:t>First, wrap code block with a potential error in </a:t>
+            </a:r>
+            <a:r>
+              <a:rPr lang="en-US" dirty="0">
+                <a:solidFill>
+                  <a:srgbClr val="FF0000"/>
+                </a:solidFill>
+              </a:rPr>
+              <a:t>try</a:t>
+            </a:r>
+          </a:p>
+          <a:p>
+            <a:r>
+              <a:rPr lang="en-US" dirty="0"/>
+              <a:t>Then add an </a:t>
+            </a:r>
+            <a:r>
+              <a:rPr lang="en-US" dirty="0">
+                <a:solidFill>
+                  <a:srgbClr val="FF0000"/>
+                </a:solidFill>
+              </a:rPr>
+              <a:t>except</a:t>
+            </a:r>
+            <a:r>
+              <a:rPr lang="en-US" dirty="0"/>
+              <a:t> block that catches an error. You may add so many </a:t>
+            </a:r>
+            <a:r>
+              <a:rPr lang="en-US" dirty="0">
+                <a:solidFill>
+                  <a:srgbClr val="FF0000"/>
+                </a:solidFill>
+              </a:rPr>
+              <a:t>except</a:t>
+            </a:r>
+            <a:r>
+              <a:rPr lang="en-US" dirty="0"/>
+              <a:t> blocks as you want.</a:t>
+            </a:r>
+          </a:p>
+          <a:p>
+            <a:r>
+              <a:rPr lang="en-US" dirty="0"/>
+              <a:t>If you want to do something when your block of code doesn’t have errors – add </a:t>
+            </a:r>
+            <a:r>
+              <a:rPr lang="en-US" dirty="0">
+                <a:solidFill>
+                  <a:srgbClr val="FF0000"/>
+                </a:solidFill>
+              </a:rPr>
+              <a:t>else</a:t>
+            </a:r>
+            <a:r>
+              <a:rPr lang="en-US" dirty="0"/>
+              <a:t> block </a:t>
+            </a:r>
+          </a:p>
+          <a:p>
+            <a:r>
+              <a:rPr lang="en-US" dirty="0"/>
+              <a:t>If you want to do something every time, no matter error was or not – add </a:t>
+            </a:r>
+            <a:r>
+              <a:rPr lang="en-US" dirty="0">
+                <a:solidFill>
+                  <a:srgbClr val="FF0000"/>
+                </a:solidFill>
+              </a:rPr>
+              <a:t>finally</a:t>
+            </a:r>
+          </a:p>
+          <a:p>
+            <a:r>
+              <a:rPr lang="en-US" dirty="0"/>
+              <a:t>Note! Don’t use </a:t>
+            </a:r>
+            <a:r>
+              <a:rPr lang="en-US" dirty="0">
+                <a:solidFill>
+                  <a:srgbClr val="FF0000"/>
+                </a:solidFill>
+              </a:rPr>
+              <a:t>try</a:t>
+            </a:r>
+            <a:r>
+              <a:rPr lang="en-US" dirty="0"/>
+              <a:t> without </a:t>
+            </a:r>
+            <a:r>
+              <a:rPr lang="en-US" dirty="0">
+                <a:solidFill>
+                  <a:srgbClr val="FF0000"/>
+                </a:solidFill>
+              </a:rPr>
+              <a:t>except</a:t>
+            </a:r>
+          </a:p>
+          <a:p>
+            <a:r>
+              <a:rPr lang="en-US" dirty="0"/>
+              <a:t>Full schema – </a:t>
+            </a:r>
+          </a:p>
+          <a:p>
+            <a:pPr marL="457200" lvl="1" indent="0">
+              <a:buNone/>
+            </a:pPr>
+            <a:r>
+              <a:rPr lang="en-US" dirty="0">
+                <a:solidFill>
+                  <a:srgbClr val="FF0000"/>
+                </a:solidFill>
+              </a:rPr>
+              <a:t>try:</a:t>
+            </a:r>
+          </a:p>
+          <a:p>
+            <a:pPr marL="457200" lvl="1" indent="0">
+              <a:buNone/>
+            </a:pPr>
+            <a:r>
+              <a:rPr lang="en-US" dirty="0"/>
+              <a:t>	…your code</a:t>
+            </a:r>
+          </a:p>
+          <a:p>
+            <a:pPr marL="457200" lvl="1" indent="0">
+              <a:buNone/>
+            </a:pPr>
+            <a:r>
+              <a:rPr lang="en-US" dirty="0">
+                <a:solidFill>
+                  <a:srgbClr val="FF0000"/>
+                </a:solidFill>
+              </a:rPr>
+              <a:t>except [Error Type]:</a:t>
+            </a:r>
+          </a:p>
+          <a:p>
+            <a:pPr marL="457200" lvl="1" indent="0">
+              <a:buNone/>
+            </a:pPr>
+            <a:r>
+              <a:rPr lang="en-US" dirty="0"/>
+              <a:t>	…error handling</a:t>
+            </a:r>
+          </a:p>
+          <a:p>
+            <a:pPr marL="457200" lvl="1" indent="0">
+              <a:buNone/>
+            </a:pPr>
+            <a:r>
+              <a:rPr lang="en-US" dirty="0">
+                <a:solidFill>
+                  <a:srgbClr val="FF0000"/>
+                </a:solidFill>
+              </a:rPr>
+              <a:t>else:</a:t>
+            </a:r>
+          </a:p>
+          <a:p>
+            <a:pPr marL="457200" lvl="1" indent="0">
+              <a:buNone/>
+            </a:pPr>
+            <a:r>
+              <a:rPr lang="en-US" dirty="0"/>
+              <a:t>	… only when there is no errors</a:t>
+            </a:r>
+          </a:p>
+          <a:p>
+            <a:pPr marL="457200" lvl="1" indent="0">
+              <a:buNone/>
+            </a:pPr>
+            <a:r>
+              <a:rPr lang="en-US" dirty="0">
+                <a:solidFill>
+                  <a:srgbClr val="FF0000"/>
+                </a:solidFill>
+              </a:rPr>
+              <a:t>finally:</a:t>
+            </a:r>
+          </a:p>
+          <a:p>
+            <a:pPr marL="457200" lvl="1" indent="0">
+              <a:buNone/>
+            </a:pPr>
+            <a:r>
+              <a:rPr lang="en-US" dirty="0"/>
+              <a:t>	…Every time</a:t>
+            </a:r>
+          </a:p>
+          <a:p>
+            <a:pPr marL="457200" lvl="1" indent="0">
+              <a:buNone/>
+            </a:pPr>
+            <a:endParaRPr lang="ru-RU" dirty="0"/>
+          </a:p>
+          <a:p>
+            <a:endParaRPr lang="ru-RU" dirty="0"/>
+          </a:p>
+        </p:txBody>
+      </p:sp>
+      <p:pic>
+        <p:nvPicPr>
+          <p:cNvPr id="4" name="Рисунок 3">
+            <a:extLst>
+              <a:ext uri="{FF2B5EF4-FFF2-40B4-BE49-F238E27FC236}">
+                <a16:creationId xmlns:a16="http://schemas.microsoft.com/office/drawing/2014/main" id="{B95C8F63-5360-4683-B656-F609AA8EBF98}"/>
+              </a:ext>
+            </a:extLst>
+          </p:cNvPr>
+          <p:cNvPicPr>
+            <a:picLocks noChangeAspect="1"/>
+          </p:cNvPicPr>
+          <p:nvPr/>
+        </p:nvPicPr>
+        <p:blipFill>
+          <a:blip r:embed="rId2"/>
+          <a:stretch>
+            <a:fillRect/>
+          </a:stretch>
+        </p:blipFill>
+        <p:spPr>
+          <a:xfrm>
+            <a:off x="6321287" y="2522676"/>
+            <a:ext cx="5545600" cy="3215516"/>
+          </a:xfrm>
+          <a:prstGeom prst="rect">
+            <a:avLst/>
+          </a:prstGeom>
+        </p:spPr>
+      </p:pic>
+    </p:spTree>
+    <p:extLst>
+      <p:ext uri="{BB962C8B-B14F-4D97-AF65-F5344CB8AC3E}">
+        <p14:creationId xmlns:p14="http://schemas.microsoft.com/office/powerpoint/2010/main" val="417851677"/>
+      </p:ext>
+    </p:extLst>
+  </p:cSld>
+  <p:clrMapOvr>
+    <a:masterClrMapping/>
+  </p:clrMapOvr>
+</p:sld>
+</file>
+
+<file path=ppt/slides/slide63.xml><?xml version="1.0" encoding="utf-8"?>
+<p:sld xmlns:a="http://schemas.openxmlformats.org/drawingml/2006/main" xmlns:r="http://schemas.openxmlformats.org/officeDocument/2006/relationships" xmlns:p="http://schemas.openxmlformats.org/presentationml/2006/main">
+  <p:cSld>
+    <p:spTree>
+      <p:nvGrpSpPr>
+        <p:cNvPr id="1" name=""/>
+        <p:cNvGrpSpPr/>
+        <p:nvPr/>
+      </p:nvGrpSpPr>
+      <p:grpSpPr>
+        <a:xfrm>
+          <a:off x="0" y="0"/>
+          <a:ext cx="0" cy="0"/>
+          <a:chOff x="0" y="0"/>
+          <a:chExt cx="0" cy="0"/>
+        </a:xfrm>
+      </p:grpSpPr>
+      <p:sp>
+        <p:nvSpPr>
+          <p:cNvPr id="3" name="Содержимое 2"/>
+          <p:cNvSpPr>
+            <a:spLocks noGrp="1"/>
+          </p:cNvSpPr>
+          <p:nvPr>
+            <p:ph idx="1"/>
+          </p:nvPr>
+        </p:nvSpPr>
+        <p:spPr>
+          <a:xfrm>
+            <a:off x="914400" y="1499616"/>
+            <a:ext cx="10439400" cy="5358384"/>
+          </a:xfrm>
+        </p:spPr>
+        <p:txBody>
+          <a:bodyPr>
+            <a:normAutofit/>
+          </a:bodyPr>
+          <a:lstStyle/>
+          <a:p>
+            <a:pPr marL="514350" indent="-514350">
+              <a:buFont typeface="+mj-lt"/>
+              <a:buAutoNum type="arabicPeriod"/>
+            </a:pPr>
+            <a:r>
+              <a:rPr lang="en-US" dirty="0"/>
+              <a:t>Do you remember a BMI calculator? Time to protect it from bad users who try to put a string in inputs. And of course, let's do our program better.</a:t>
+            </a:r>
+          </a:p>
+          <a:p>
+            <a:pPr lvl="1"/>
+            <a:r>
+              <a:rPr lang="en-US" dirty="0"/>
+              <a:t>Now the program has code duplicates, reduce them with functions</a:t>
+            </a:r>
+          </a:p>
+          <a:p>
+            <a:pPr lvl="1"/>
+            <a:r>
+              <a:rPr lang="en-US" dirty="0"/>
+              <a:t>Add error handling to user inputs</a:t>
+            </a:r>
+          </a:p>
+          <a:p>
+            <a:pPr lvl="1"/>
+            <a:r>
+              <a:rPr lang="en-US" dirty="0"/>
+              <a:t>The program should ask the user to enter the data until the user enters the correct data</a:t>
+            </a:r>
+          </a:p>
+          <a:p>
+            <a:pPr lvl="1"/>
+            <a:r>
+              <a:rPr lang="en-US" dirty="0"/>
+              <a:t>If the first number is correct remember it and don’t ask again</a:t>
+            </a:r>
+          </a:p>
+        </p:txBody>
+      </p:sp>
+      <p:grpSp>
+        <p:nvGrpSpPr>
+          <p:cNvPr id="2" name="Группа 3"/>
+          <p:cNvGrpSpPr/>
+          <p:nvPr/>
+        </p:nvGrpSpPr>
+        <p:grpSpPr>
+          <a:xfrm>
+            <a:off x="838200" y="365125"/>
+            <a:ext cx="10515600" cy="1325563"/>
+            <a:chOff x="838200" y="365125"/>
+            <a:chExt cx="10515600" cy="1325563"/>
+          </a:xfrm>
+        </p:grpSpPr>
+        <p:sp>
+          <p:nvSpPr>
+            <p:cNvPr id="5" name="Заголовок 1"/>
+            <p:cNvSpPr txBox="1">
+              <a:spLocks/>
+            </p:cNvSpPr>
+            <p:nvPr/>
+          </p:nvSpPr>
+          <p:spPr>
+            <a:xfrm>
+              <a:off x="838200" y="365125"/>
+              <a:ext cx="10515600" cy="1325563"/>
+            </a:xfrm>
+            <a:prstGeom prst="rect">
+              <a:avLst/>
+            </a:prstGeom>
+          </p:spPr>
+          <p:txBody>
+            <a:bodyPr vert="horz" lIns="91440" tIns="45720" rIns="91440" bIns="45720" rtlCol="0" anchor="ctr">
+              <a:normAutofit/>
+            </a:bodyPr>
+            <a:lstStyle/>
+            <a:p>
+              <a:pPr marL="0" marR="0" lvl="0" indent="0" algn="ctr" defTabSz="914400" rtl="0" eaLnBrk="1" fontAlgn="auto" latinLnBrk="0" hangingPunct="1">
+                <a:lnSpc>
+                  <a:spcPct val="90000"/>
+                </a:lnSpc>
+                <a:spcBef>
+                  <a:spcPct val="0"/>
+                </a:spcBef>
+                <a:spcAft>
+                  <a:spcPts val="0"/>
+                </a:spcAft>
+                <a:buClrTx/>
+                <a:buSzTx/>
+                <a:buFontTx/>
+                <a:buNone/>
+                <a:tabLst/>
+                <a:defRPr/>
+              </a:pPr>
+              <a:r>
+                <a:rPr kumimoji="0" lang="en-US" sz="4400" b="1" i="0" u="none" strike="noStrike" kern="1200" cap="none" spc="0" normalizeH="0" baseline="0" noProof="0" dirty="0">
+                  <a:ln>
+                    <a:noFill/>
+                  </a:ln>
+                  <a:solidFill>
+                    <a:schemeClr val="tx1"/>
+                  </a:solidFill>
+                  <a:effectLst/>
+                  <a:uLnTx/>
+                  <a:uFillTx/>
+                  <a:latin typeface="+mj-lt"/>
+                  <a:ea typeface="+mj-ea"/>
+                  <a:cs typeface="+mj-cs"/>
+                </a:rPr>
+                <a:t>Tasks </a:t>
+              </a:r>
+              <a:endParaRPr kumimoji="0" lang="ru-RU" sz="4400" b="1" i="0" u="none" strike="noStrike" kern="1200" cap="none" spc="0" normalizeH="0" baseline="0" noProof="0" dirty="0">
+                <a:ln>
+                  <a:noFill/>
+                </a:ln>
+                <a:solidFill>
+                  <a:schemeClr val="tx1"/>
+                </a:solidFill>
+                <a:effectLst/>
+                <a:uLnTx/>
+                <a:uFillTx/>
+                <a:latin typeface="+mj-lt"/>
+                <a:ea typeface="+mj-ea"/>
+                <a:cs typeface="+mj-cs"/>
+              </a:endParaRPr>
+            </a:p>
+          </p:txBody>
+        </p:sp>
+        <p:pic>
+          <p:nvPicPr>
+            <p:cNvPr id="6" name="Picture 2" descr="Pin on Бесплатные иконки"/>
+            <p:cNvPicPr>
+              <a:picLocks noChangeAspect="1" noChangeArrowheads="1"/>
+            </p:cNvPicPr>
+            <p:nvPr/>
+          </p:nvPicPr>
+          <p:blipFill>
+            <a:blip r:embed="rId2" cstate="print"/>
+            <a:srcRect/>
+            <a:stretch>
+              <a:fillRect/>
+            </a:stretch>
+          </p:blipFill>
+          <p:spPr bwMode="auto">
+            <a:xfrm>
+              <a:off x="4672711" y="603504"/>
+              <a:ext cx="795401" cy="795401"/>
+            </a:xfrm>
+            <a:prstGeom prst="rect">
+              <a:avLst/>
+            </a:prstGeom>
+            <a:noFill/>
+          </p:spPr>
+        </p:pic>
+      </p:grpSp>
+    </p:spTree>
+    <p:extLst>
+      <p:ext uri="{BB962C8B-B14F-4D97-AF65-F5344CB8AC3E}">
+        <p14:creationId xmlns:p14="http://schemas.microsoft.com/office/powerpoint/2010/main" val="1922389426"/>
+      </p:ext>
+    </p:extLst>
+  </p:cSld>
+  <p:clrMapOvr>
+    <a:masterClrMapping/>
+  </p:clrMapOvr>
+</p:sld>
+</file>
+
 <file path=ppt/slides/slide7.xml><?xml version="1.0" encoding="utf-8"?>
 <p:sld xmlns:a="http://schemas.openxmlformats.org/drawingml/2006/main" xmlns:r="http://schemas.openxmlformats.org/officeDocument/2006/relationships" xmlns:p="http://schemas.openxmlformats.org/presentationml/2006/main">
   <p:cSld>

</xml_diff>

<commit_message>
feat: add module block
</commit_message>
<xml_diff>
--- a/python 101/python_101.pptx
+++ b/python 101/python_101.pptx
@@ -68,6 +68,10 @@
     <p:sldId id="318" r:id="rId62"/>
     <p:sldId id="319" r:id="rId63"/>
     <p:sldId id="320" r:id="rId64"/>
+    <p:sldId id="321" r:id="rId65"/>
+    <p:sldId id="322" r:id="rId66"/>
+    <p:sldId id="323" r:id="rId67"/>
+    <p:sldId id="324" r:id="rId68"/>
   </p:sldIdLst>
   <p:sldSz cx="12192000" cy="6858000"/>
   <p:notesSz cx="6858000" cy="9144000"/>
@@ -20956,6 +20960,999 @@
 </p:sld>
 </file>
 
+<file path=ppt/slides/slide64.xml><?xml version="1.0" encoding="utf-8"?>
+<p:sld xmlns:a="http://schemas.openxmlformats.org/drawingml/2006/main" xmlns:r="http://schemas.openxmlformats.org/officeDocument/2006/relationships" xmlns:p="http://schemas.openxmlformats.org/presentationml/2006/main">
+  <p:cSld>
+    <p:spTree>
+      <p:nvGrpSpPr>
+        <p:cNvPr id="1" name=""/>
+        <p:cNvGrpSpPr/>
+        <p:nvPr/>
+      </p:nvGrpSpPr>
+      <p:grpSpPr>
+        <a:xfrm>
+          <a:off x="0" y="0"/>
+          <a:ext cx="0" cy="0"/>
+          <a:chOff x="0" y="0"/>
+          <a:chExt cx="0" cy="0"/>
+        </a:xfrm>
+      </p:grpSpPr>
+      <p:sp>
+        <p:nvSpPr>
+          <p:cNvPr id="4" name="Прямоугольник 3">
+            <a:extLst>
+              <a:ext uri="{FF2B5EF4-FFF2-40B4-BE49-F238E27FC236}">
+                <a16:creationId xmlns:a16="http://schemas.microsoft.com/office/drawing/2014/main" id="{0E1B1771-8E66-4680-814E-2CE600D3B23C}"/>
+              </a:ext>
+            </a:extLst>
+          </p:cNvPr>
+          <p:cNvSpPr/>
+          <p:nvPr/>
+        </p:nvSpPr>
+        <p:spPr>
+          <a:xfrm>
+            <a:off x="5102087" y="967409"/>
+            <a:ext cx="2001078" cy="304800"/>
+          </a:xfrm>
+          <a:prstGeom prst="rect">
+            <a:avLst/>
+          </a:prstGeom>
+          <a:solidFill>
+            <a:srgbClr val="65F8FF"/>
+          </a:solidFill>
+          <a:ln>
+            <a:solidFill>
+              <a:srgbClr val="65F8FF"/>
+            </a:solidFill>
+          </a:ln>
+        </p:spPr>
+        <p:style>
+          <a:lnRef idx="2">
+            <a:schemeClr val="accent1">
+              <a:shade val="50000"/>
+            </a:schemeClr>
+          </a:lnRef>
+          <a:fillRef idx="1">
+            <a:schemeClr val="accent1"/>
+          </a:fillRef>
+          <a:effectRef idx="0">
+            <a:schemeClr val="accent1"/>
+          </a:effectRef>
+          <a:fontRef idx="minor">
+            <a:schemeClr val="lt1"/>
+          </a:fontRef>
+        </p:style>
+        <p:txBody>
+          <a:bodyPr rtlCol="0" anchor="ctr"/>
+          <a:lstStyle/>
+          <a:p>
+            <a:pPr algn="ctr"/>
+            <a:endParaRPr lang="ru-RU"/>
+          </a:p>
+        </p:txBody>
+      </p:sp>
+      <p:sp>
+        <p:nvSpPr>
+          <p:cNvPr id="2" name="Заголовок 1">
+            <a:extLst>
+              <a:ext uri="{FF2B5EF4-FFF2-40B4-BE49-F238E27FC236}">
+                <a16:creationId xmlns:a16="http://schemas.microsoft.com/office/drawing/2014/main" id="{7823E4A6-FF8E-4FD8-B197-6C80026A171A}"/>
+              </a:ext>
+            </a:extLst>
+          </p:cNvPr>
+          <p:cNvSpPr>
+            <a:spLocks noGrp="1"/>
+          </p:cNvSpPr>
+          <p:nvPr>
+            <p:ph type="title"/>
+          </p:nvPr>
+        </p:nvSpPr>
+        <p:spPr/>
+        <p:txBody>
+          <a:bodyPr/>
+          <a:lstStyle/>
+          <a:p>
+            <a:pPr algn="ctr"/>
+            <a:r>
+              <a:rPr lang="en-US" dirty="0"/>
+              <a:t>Modules</a:t>
+            </a:r>
+            <a:endParaRPr lang="ru-RU" dirty="0"/>
+          </a:p>
+        </p:txBody>
+      </p:sp>
+      <p:sp>
+        <p:nvSpPr>
+          <p:cNvPr id="3" name="Объект 2">
+            <a:extLst>
+              <a:ext uri="{FF2B5EF4-FFF2-40B4-BE49-F238E27FC236}">
+                <a16:creationId xmlns:a16="http://schemas.microsoft.com/office/drawing/2014/main" id="{6106F7C7-82CA-4030-A67F-2600C1793A7F}"/>
+              </a:ext>
+            </a:extLst>
+          </p:cNvPr>
+          <p:cNvSpPr>
+            <a:spLocks noGrp="1"/>
+          </p:cNvSpPr>
+          <p:nvPr>
+            <p:ph idx="1"/>
+          </p:nvPr>
+        </p:nvSpPr>
+        <p:spPr>
+          <a:xfrm>
+            <a:off x="838199" y="1825625"/>
+            <a:ext cx="6264965" cy="4495662"/>
+          </a:xfrm>
+        </p:spPr>
+        <p:txBody>
+          <a:bodyPr>
+            <a:normAutofit fontScale="77500" lnSpcReduction="20000"/>
+          </a:bodyPr>
+          <a:lstStyle/>
+          <a:p>
+            <a:r>
+              <a:rPr lang="en-US" dirty="0"/>
+              <a:t>Right now our programs are small, but if a program will have 10000+ strings of code? How we may fast find and change code in this case? For that case, we may separate code on different files or modules. A module is a library, and many python tools are named libraries.</a:t>
+            </a:r>
+          </a:p>
+          <a:p>
+            <a:r>
+              <a:rPr lang="en-US" dirty="0"/>
+              <a:t>Let’s create our first module! First, create two files – module.py and main.py</a:t>
+            </a:r>
+          </a:p>
+          <a:p>
+            <a:r>
+              <a:rPr lang="en-US" dirty="0"/>
+              <a:t>Add a function to module.py</a:t>
+            </a:r>
+          </a:p>
+          <a:p>
+            <a:r>
+              <a:rPr lang="en-US" dirty="0"/>
+              <a:t>Then use </a:t>
+            </a:r>
+            <a:r>
+              <a:rPr lang="en-US" dirty="0">
+                <a:solidFill>
+                  <a:srgbClr val="FF0000"/>
+                </a:solidFill>
+              </a:rPr>
+              <a:t>import</a:t>
+            </a:r>
+            <a:r>
+              <a:rPr lang="en-US" dirty="0"/>
+              <a:t> keyword to import our module</a:t>
+            </a:r>
+          </a:p>
+          <a:p>
+            <a:r>
+              <a:rPr lang="en-US" dirty="0"/>
+              <a:t>And finally call function by &lt;</a:t>
+            </a:r>
+            <a:r>
+              <a:rPr lang="en-US" dirty="0" err="1"/>
+              <a:t>moduleName</a:t>
+            </a:r>
+            <a:r>
+              <a:rPr lang="en-US" dirty="0"/>
+              <a:t>&gt;.&lt;</a:t>
+            </a:r>
+            <a:r>
+              <a:rPr lang="en-US" dirty="0" err="1"/>
+              <a:t>objectName</a:t>
+            </a:r>
+            <a:r>
+              <a:rPr lang="en-US" dirty="0"/>
+              <a:t>&gt;</a:t>
+            </a:r>
+          </a:p>
+          <a:p>
+            <a:r>
+              <a:rPr lang="en-US" dirty="0"/>
+              <a:t>Superb! </a:t>
+            </a:r>
+          </a:p>
+          <a:p>
+            <a:r>
+              <a:rPr lang="en-US" dirty="0"/>
+              <a:t>Note! We used to &lt;</a:t>
+            </a:r>
+            <a:r>
+              <a:rPr lang="en-US" dirty="0" err="1"/>
+              <a:t>objectName</a:t>
+            </a:r>
+            <a:r>
+              <a:rPr lang="en-US" dirty="0"/>
+              <a:t>&gt; , not only a function may be imported</a:t>
+            </a:r>
+            <a:endParaRPr lang="ru-RU" dirty="0"/>
+          </a:p>
+        </p:txBody>
+      </p:sp>
+      <p:pic>
+        <p:nvPicPr>
+          <p:cNvPr id="5" name="Рисунок 4">
+            <a:extLst>
+              <a:ext uri="{FF2B5EF4-FFF2-40B4-BE49-F238E27FC236}">
+                <a16:creationId xmlns:a16="http://schemas.microsoft.com/office/drawing/2014/main" id="{F135BD3D-A8EB-4DA0-958F-3633F2CA1DEB}"/>
+              </a:ext>
+            </a:extLst>
+          </p:cNvPr>
+          <p:cNvPicPr>
+            <a:picLocks noChangeAspect="1"/>
+          </p:cNvPicPr>
+          <p:nvPr/>
+        </p:nvPicPr>
+        <p:blipFill>
+          <a:blip r:embed="rId2"/>
+          <a:stretch>
+            <a:fillRect/>
+          </a:stretch>
+        </p:blipFill>
+        <p:spPr>
+          <a:xfrm>
+            <a:off x="7506734" y="1825624"/>
+            <a:ext cx="3400457" cy="1500671"/>
+          </a:xfrm>
+          <a:prstGeom prst="rect">
+            <a:avLst/>
+          </a:prstGeom>
+        </p:spPr>
+      </p:pic>
+      <p:pic>
+        <p:nvPicPr>
+          <p:cNvPr id="6" name="Рисунок 5">
+            <a:extLst>
+              <a:ext uri="{FF2B5EF4-FFF2-40B4-BE49-F238E27FC236}">
+                <a16:creationId xmlns:a16="http://schemas.microsoft.com/office/drawing/2014/main" id="{8693A8E1-8B8F-4681-BD03-71CF0AB3A9E9}"/>
+              </a:ext>
+            </a:extLst>
+          </p:cNvPr>
+          <p:cNvPicPr>
+            <a:picLocks noChangeAspect="1"/>
+          </p:cNvPicPr>
+          <p:nvPr/>
+        </p:nvPicPr>
+        <p:blipFill>
+          <a:blip r:embed="rId3"/>
+          <a:stretch>
+            <a:fillRect/>
+          </a:stretch>
+        </p:blipFill>
+        <p:spPr>
+          <a:xfrm>
+            <a:off x="7506734" y="3901729"/>
+            <a:ext cx="3400457" cy="1785628"/>
+          </a:xfrm>
+          <a:prstGeom prst="rect">
+            <a:avLst/>
+          </a:prstGeom>
+        </p:spPr>
+      </p:pic>
+    </p:spTree>
+    <p:extLst>
+      <p:ext uri="{BB962C8B-B14F-4D97-AF65-F5344CB8AC3E}">
+        <p14:creationId xmlns:p14="http://schemas.microsoft.com/office/powerpoint/2010/main" val="2076798236"/>
+      </p:ext>
+    </p:extLst>
+  </p:cSld>
+  <p:clrMapOvr>
+    <a:masterClrMapping/>
+  </p:clrMapOvr>
+</p:sld>
+</file>
+
+<file path=ppt/slides/slide65.xml><?xml version="1.0" encoding="utf-8"?>
+<p:sld xmlns:a="http://schemas.openxmlformats.org/drawingml/2006/main" xmlns:r="http://schemas.openxmlformats.org/officeDocument/2006/relationships" xmlns:p="http://schemas.openxmlformats.org/presentationml/2006/main">
+  <p:cSld>
+    <p:spTree>
+      <p:nvGrpSpPr>
+        <p:cNvPr id="1" name=""/>
+        <p:cNvGrpSpPr/>
+        <p:nvPr/>
+      </p:nvGrpSpPr>
+      <p:grpSpPr>
+        <a:xfrm>
+          <a:off x="0" y="0"/>
+          <a:ext cx="0" cy="0"/>
+          <a:chOff x="0" y="0"/>
+          <a:chExt cx="0" cy="0"/>
+        </a:xfrm>
+      </p:grpSpPr>
+      <p:sp>
+        <p:nvSpPr>
+          <p:cNvPr id="2" name="Заголовок 1">
+            <a:extLst>
+              <a:ext uri="{FF2B5EF4-FFF2-40B4-BE49-F238E27FC236}">
+                <a16:creationId xmlns:a16="http://schemas.microsoft.com/office/drawing/2014/main" id="{783BDF96-848A-489D-A669-6E81FFC1317A}"/>
+              </a:ext>
+            </a:extLst>
+          </p:cNvPr>
+          <p:cNvSpPr>
+            <a:spLocks noGrp="1"/>
+          </p:cNvSpPr>
+          <p:nvPr>
+            <p:ph type="title"/>
+          </p:nvPr>
+        </p:nvSpPr>
+        <p:spPr/>
+        <p:txBody>
+          <a:bodyPr/>
+          <a:lstStyle/>
+          <a:p>
+            <a:pPr algn="ctr"/>
+            <a:r>
+              <a:rPr lang="en-US" dirty="0"/>
+              <a:t>Import</a:t>
+            </a:r>
+            <a:endParaRPr lang="ru-RU" dirty="0"/>
+          </a:p>
+        </p:txBody>
+      </p:sp>
+      <p:sp>
+        <p:nvSpPr>
+          <p:cNvPr id="3" name="Объект 2">
+            <a:extLst>
+              <a:ext uri="{FF2B5EF4-FFF2-40B4-BE49-F238E27FC236}">
+                <a16:creationId xmlns:a16="http://schemas.microsoft.com/office/drawing/2014/main" id="{4F5F2916-ED7F-4536-A329-25D6C7685D0C}"/>
+              </a:ext>
+            </a:extLst>
+          </p:cNvPr>
+          <p:cNvSpPr>
+            <a:spLocks noGrp="1"/>
+          </p:cNvSpPr>
+          <p:nvPr>
+            <p:ph idx="1"/>
+          </p:nvPr>
+        </p:nvSpPr>
+        <p:spPr>
+          <a:xfrm>
+            <a:off x="838200" y="1825625"/>
+            <a:ext cx="5880652" cy="4217366"/>
+          </a:xfrm>
+        </p:spPr>
+        <p:txBody>
+          <a:bodyPr>
+            <a:normAutofit fontScale="85000" lnSpcReduction="20000"/>
+          </a:bodyPr>
+          <a:lstStyle/>
+          <a:p>
+            <a:r>
+              <a:rPr lang="en-US" dirty="0"/>
+              <a:t>There are many ways how you may use import:</a:t>
+            </a:r>
+          </a:p>
+          <a:p>
+            <a:r>
+              <a:rPr lang="en-US" dirty="0"/>
+              <a:t>Use it as we do it in the previous example</a:t>
+            </a:r>
+          </a:p>
+          <a:p>
+            <a:r>
+              <a:rPr lang="en-US" dirty="0"/>
+              <a:t>You may rename a module </a:t>
+            </a:r>
+          </a:p>
+          <a:p>
+            <a:r>
+              <a:rPr lang="en-US" dirty="0"/>
+              <a:t>Use </a:t>
+            </a:r>
+            <a:r>
+              <a:rPr lang="en-US" dirty="0">
+                <a:solidFill>
+                  <a:srgbClr val="FF0000"/>
+                </a:solidFill>
+              </a:rPr>
+              <a:t>from</a:t>
+            </a:r>
+            <a:r>
+              <a:rPr lang="en-US" dirty="0"/>
+              <a:t> keyword to import all</a:t>
+            </a:r>
+          </a:p>
+          <a:p>
+            <a:r>
+              <a:rPr lang="en-US" dirty="0"/>
+              <a:t>Or use </a:t>
+            </a:r>
+            <a:r>
+              <a:rPr lang="en-US" dirty="0">
+                <a:solidFill>
+                  <a:srgbClr val="FF0000"/>
+                </a:solidFill>
+              </a:rPr>
+              <a:t>from</a:t>
+            </a:r>
+            <a:r>
+              <a:rPr lang="en-US" dirty="0"/>
+              <a:t> keyword to import a single object. In that case, you reduce the memory that the module requires. </a:t>
+            </a:r>
+          </a:p>
+          <a:p>
+            <a:r>
+              <a:rPr lang="en-US" dirty="0"/>
+              <a:t>Note! If we use from we may use the function directly without dot notation. But be careful because in this way function with the same name will be rewritten</a:t>
+            </a:r>
+          </a:p>
+          <a:p>
+            <a:endParaRPr lang="ru-RU" dirty="0"/>
+          </a:p>
+        </p:txBody>
+      </p:sp>
+      <p:pic>
+        <p:nvPicPr>
+          <p:cNvPr id="4" name="Рисунок 3">
+            <a:extLst>
+              <a:ext uri="{FF2B5EF4-FFF2-40B4-BE49-F238E27FC236}">
+                <a16:creationId xmlns:a16="http://schemas.microsoft.com/office/drawing/2014/main" id="{3ED9928D-F044-4470-BEAE-0C4080E180CD}"/>
+              </a:ext>
+            </a:extLst>
+          </p:cNvPr>
+          <p:cNvPicPr>
+            <a:picLocks noChangeAspect="1"/>
+          </p:cNvPicPr>
+          <p:nvPr/>
+        </p:nvPicPr>
+        <p:blipFill>
+          <a:blip r:embed="rId2"/>
+          <a:stretch>
+            <a:fillRect/>
+          </a:stretch>
+        </p:blipFill>
+        <p:spPr>
+          <a:xfrm>
+            <a:off x="7620007" y="2354659"/>
+            <a:ext cx="2101297" cy="864243"/>
+          </a:xfrm>
+          <a:prstGeom prst="rect">
+            <a:avLst/>
+          </a:prstGeom>
+        </p:spPr>
+      </p:pic>
+      <p:pic>
+        <p:nvPicPr>
+          <p:cNvPr id="5" name="Рисунок 4">
+            <a:extLst>
+              <a:ext uri="{FF2B5EF4-FFF2-40B4-BE49-F238E27FC236}">
+                <a16:creationId xmlns:a16="http://schemas.microsoft.com/office/drawing/2014/main" id="{B114F977-ECD5-439D-8285-3967E6B81F51}"/>
+              </a:ext>
+            </a:extLst>
+          </p:cNvPr>
+          <p:cNvPicPr>
+            <a:picLocks noChangeAspect="1"/>
+          </p:cNvPicPr>
+          <p:nvPr/>
+        </p:nvPicPr>
+        <p:blipFill>
+          <a:blip r:embed="rId3"/>
+          <a:stretch>
+            <a:fillRect/>
+          </a:stretch>
+        </p:blipFill>
+        <p:spPr>
+          <a:xfrm>
+            <a:off x="7620007" y="3429000"/>
+            <a:ext cx="2101296" cy="764107"/>
+          </a:xfrm>
+          <a:prstGeom prst="rect">
+            <a:avLst/>
+          </a:prstGeom>
+        </p:spPr>
+      </p:pic>
+      <p:pic>
+        <p:nvPicPr>
+          <p:cNvPr id="6" name="Рисунок 5">
+            <a:extLst>
+              <a:ext uri="{FF2B5EF4-FFF2-40B4-BE49-F238E27FC236}">
+                <a16:creationId xmlns:a16="http://schemas.microsoft.com/office/drawing/2014/main" id="{F687CFD7-F99F-49D2-B94A-AD883CB7CDC1}"/>
+              </a:ext>
+            </a:extLst>
+          </p:cNvPr>
+          <p:cNvPicPr>
+            <a:picLocks noChangeAspect="1"/>
+          </p:cNvPicPr>
+          <p:nvPr/>
+        </p:nvPicPr>
+        <p:blipFill>
+          <a:blip r:embed="rId4"/>
+          <a:stretch>
+            <a:fillRect/>
+          </a:stretch>
+        </p:blipFill>
+        <p:spPr>
+          <a:xfrm>
+            <a:off x="7625797" y="4403205"/>
+            <a:ext cx="2512116" cy="916020"/>
+          </a:xfrm>
+          <a:prstGeom prst="rect">
+            <a:avLst/>
+          </a:prstGeom>
+        </p:spPr>
+      </p:pic>
+    </p:spTree>
+    <p:extLst>
+      <p:ext uri="{BB962C8B-B14F-4D97-AF65-F5344CB8AC3E}">
+        <p14:creationId xmlns:p14="http://schemas.microsoft.com/office/powerpoint/2010/main" val="3652166553"/>
+      </p:ext>
+    </p:extLst>
+  </p:cSld>
+  <p:clrMapOvr>
+    <a:masterClrMapping/>
+  </p:clrMapOvr>
+</p:sld>
+</file>
+
+<file path=ppt/slides/slide66.xml><?xml version="1.0" encoding="utf-8"?>
+<p:sld xmlns:a="http://schemas.openxmlformats.org/drawingml/2006/main" xmlns:r="http://schemas.openxmlformats.org/officeDocument/2006/relationships" xmlns:p="http://schemas.openxmlformats.org/presentationml/2006/main">
+  <p:cSld>
+    <p:spTree>
+      <p:nvGrpSpPr>
+        <p:cNvPr id="1" name=""/>
+        <p:cNvGrpSpPr/>
+        <p:nvPr/>
+      </p:nvGrpSpPr>
+      <p:grpSpPr>
+        <a:xfrm>
+          <a:off x="0" y="0"/>
+          <a:ext cx="0" cy="0"/>
+          <a:chOff x="0" y="0"/>
+          <a:chExt cx="0" cy="0"/>
+        </a:xfrm>
+      </p:grpSpPr>
+      <p:sp>
+        <p:nvSpPr>
+          <p:cNvPr id="2" name="Заголовок 1">
+            <a:extLst>
+              <a:ext uri="{FF2B5EF4-FFF2-40B4-BE49-F238E27FC236}">
+                <a16:creationId xmlns:a16="http://schemas.microsoft.com/office/drawing/2014/main" id="{CBA4C6E7-A1A3-448A-8B41-7FBF9D2BF63C}"/>
+              </a:ext>
+            </a:extLst>
+          </p:cNvPr>
+          <p:cNvSpPr>
+            <a:spLocks noGrp="1"/>
+          </p:cNvSpPr>
+          <p:nvPr>
+            <p:ph type="title"/>
+          </p:nvPr>
+        </p:nvSpPr>
+        <p:spPr/>
+        <p:txBody>
+          <a:bodyPr/>
+          <a:lstStyle/>
+          <a:p>
+            <a:pPr algn="ctr"/>
+            <a:r>
+              <a:rPr lang="en-US" dirty="0"/>
+              <a:t>Import Order</a:t>
+            </a:r>
+            <a:endParaRPr lang="ru-RU" dirty="0"/>
+          </a:p>
+        </p:txBody>
+      </p:sp>
+      <p:sp>
+        <p:nvSpPr>
+          <p:cNvPr id="3" name="Объект 2">
+            <a:extLst>
+              <a:ext uri="{FF2B5EF4-FFF2-40B4-BE49-F238E27FC236}">
+                <a16:creationId xmlns:a16="http://schemas.microsoft.com/office/drawing/2014/main" id="{5948C90C-9FAB-45A2-BEBA-BDA55A9C53C2}"/>
+              </a:ext>
+            </a:extLst>
+          </p:cNvPr>
+          <p:cNvSpPr>
+            <a:spLocks noGrp="1"/>
+          </p:cNvSpPr>
+          <p:nvPr>
+            <p:ph idx="1"/>
+          </p:nvPr>
+        </p:nvSpPr>
+        <p:spPr>
+          <a:xfrm>
+            <a:off x="838200" y="1825625"/>
+            <a:ext cx="5257800" cy="4826966"/>
+          </a:xfrm>
+        </p:spPr>
+        <p:txBody>
+          <a:bodyPr>
+            <a:normAutofit fontScale="92500" lnSpcReduction="20000"/>
+          </a:bodyPr>
+          <a:lstStyle/>
+          <a:p>
+            <a:r>
+              <a:rPr lang="en-US" dirty="0"/>
+              <a:t>Of course, python have many built-in modules, like math, and other downloaded modules. So how python may find exactly our module? </a:t>
+            </a:r>
+          </a:p>
+          <a:p>
+            <a:r>
+              <a:rPr lang="en-US" dirty="0"/>
+              <a:t>First, we need to know the order of python modules:</a:t>
+            </a:r>
+          </a:p>
+          <a:p>
+            <a:pPr lvl="1"/>
+            <a:r>
+              <a:rPr lang="en-US" dirty="0"/>
+              <a:t>Standard library imports </a:t>
+            </a:r>
+          </a:p>
+          <a:p>
+            <a:pPr lvl="1"/>
+            <a:r>
+              <a:rPr lang="en-US" dirty="0"/>
+              <a:t>Related third party imports </a:t>
+            </a:r>
+          </a:p>
+          <a:p>
+            <a:pPr lvl="1"/>
+            <a:r>
+              <a:rPr lang="en-US" dirty="0"/>
+              <a:t>Local application/library specific imports</a:t>
+            </a:r>
+          </a:p>
+          <a:p>
+            <a:r>
+              <a:rPr lang="en-US" dirty="0"/>
+              <a:t>For our modules python searches in the same folder. </a:t>
+            </a:r>
+          </a:p>
+          <a:p>
+            <a:r>
+              <a:rPr lang="en-US" dirty="0"/>
+              <a:t>For subfolders, we must use the submodule import</a:t>
+            </a:r>
+          </a:p>
+        </p:txBody>
+      </p:sp>
+      <p:pic>
+        <p:nvPicPr>
+          <p:cNvPr id="4" name="Рисунок 3">
+            <a:extLst>
+              <a:ext uri="{FF2B5EF4-FFF2-40B4-BE49-F238E27FC236}">
+                <a16:creationId xmlns:a16="http://schemas.microsoft.com/office/drawing/2014/main" id="{51586C68-F81E-41A0-96EC-B6561AF30B5B}"/>
+              </a:ext>
+            </a:extLst>
+          </p:cNvPr>
+          <p:cNvPicPr>
+            <a:picLocks noChangeAspect="1"/>
+          </p:cNvPicPr>
+          <p:nvPr/>
+        </p:nvPicPr>
+        <p:blipFill>
+          <a:blip r:embed="rId2"/>
+          <a:stretch>
+            <a:fillRect/>
+          </a:stretch>
+        </p:blipFill>
+        <p:spPr>
+          <a:xfrm>
+            <a:off x="8868113" y="1635731"/>
+            <a:ext cx="3005896" cy="1518284"/>
+          </a:xfrm>
+          <a:prstGeom prst="rect">
+            <a:avLst/>
+          </a:prstGeom>
+        </p:spPr>
+      </p:pic>
+      <p:pic>
+        <p:nvPicPr>
+          <p:cNvPr id="5" name="Рисунок 4">
+            <a:extLst>
+              <a:ext uri="{FF2B5EF4-FFF2-40B4-BE49-F238E27FC236}">
+                <a16:creationId xmlns:a16="http://schemas.microsoft.com/office/drawing/2014/main" id="{22550198-64DB-4A08-88E8-DAF3B0E900FC}"/>
+              </a:ext>
+            </a:extLst>
+          </p:cNvPr>
+          <p:cNvPicPr>
+            <a:picLocks noChangeAspect="1"/>
+          </p:cNvPicPr>
+          <p:nvPr/>
+        </p:nvPicPr>
+        <p:blipFill>
+          <a:blip r:embed="rId3"/>
+          <a:stretch>
+            <a:fillRect/>
+          </a:stretch>
+        </p:blipFill>
+        <p:spPr>
+          <a:xfrm>
+            <a:off x="6616209" y="3696267"/>
+            <a:ext cx="3442190" cy="1793409"/>
+          </a:xfrm>
+          <a:prstGeom prst="rect">
+            <a:avLst/>
+          </a:prstGeom>
+        </p:spPr>
+      </p:pic>
+      <p:pic>
+        <p:nvPicPr>
+          <p:cNvPr id="6" name="Рисунок 5">
+            <a:extLst>
+              <a:ext uri="{FF2B5EF4-FFF2-40B4-BE49-F238E27FC236}">
+                <a16:creationId xmlns:a16="http://schemas.microsoft.com/office/drawing/2014/main" id="{878EE6F3-B3BA-47CB-90FE-02C163843C0B}"/>
+              </a:ext>
+            </a:extLst>
+          </p:cNvPr>
+          <p:cNvPicPr>
+            <a:picLocks noChangeAspect="1"/>
+          </p:cNvPicPr>
+          <p:nvPr/>
+        </p:nvPicPr>
+        <p:blipFill>
+          <a:blip r:embed="rId4"/>
+          <a:stretch>
+            <a:fillRect/>
+          </a:stretch>
+        </p:blipFill>
+        <p:spPr>
+          <a:xfrm>
+            <a:off x="6616209" y="1635731"/>
+            <a:ext cx="2110416" cy="1518285"/>
+          </a:xfrm>
+          <a:prstGeom prst="rect">
+            <a:avLst/>
+          </a:prstGeom>
+        </p:spPr>
+      </p:pic>
+    </p:spTree>
+    <p:extLst>
+      <p:ext uri="{BB962C8B-B14F-4D97-AF65-F5344CB8AC3E}">
+        <p14:creationId xmlns:p14="http://schemas.microsoft.com/office/powerpoint/2010/main" val="926869513"/>
+      </p:ext>
+    </p:extLst>
+  </p:cSld>
+  <p:clrMapOvr>
+    <a:masterClrMapping/>
+  </p:clrMapOvr>
+</p:sld>
+</file>
+
+<file path=ppt/slides/slide67.xml><?xml version="1.0" encoding="utf-8"?>
+<p:sld xmlns:a="http://schemas.openxmlformats.org/drawingml/2006/main" xmlns:r="http://schemas.openxmlformats.org/officeDocument/2006/relationships" xmlns:p="http://schemas.openxmlformats.org/presentationml/2006/main">
+  <p:cSld>
+    <p:spTree>
+      <p:nvGrpSpPr>
+        <p:cNvPr id="1" name=""/>
+        <p:cNvGrpSpPr/>
+        <p:nvPr/>
+      </p:nvGrpSpPr>
+      <p:grpSpPr>
+        <a:xfrm>
+          <a:off x="0" y="0"/>
+          <a:ext cx="0" cy="0"/>
+          <a:chOff x="0" y="0"/>
+          <a:chExt cx="0" cy="0"/>
+        </a:xfrm>
+      </p:grpSpPr>
+      <p:sp>
+        <p:nvSpPr>
+          <p:cNvPr id="3" name="Содержимое 2"/>
+          <p:cNvSpPr>
+            <a:spLocks noGrp="1"/>
+          </p:cNvSpPr>
+          <p:nvPr>
+            <p:ph idx="1"/>
+          </p:nvPr>
+        </p:nvSpPr>
+        <p:spPr>
+          <a:xfrm>
+            <a:off x="914400" y="1499616"/>
+            <a:ext cx="10439400" cy="5358384"/>
+          </a:xfrm>
+        </p:spPr>
+        <p:txBody>
+          <a:bodyPr>
+            <a:normAutofit/>
+          </a:bodyPr>
+          <a:lstStyle/>
+          <a:p>
+            <a:pPr marL="514350" indent="-514350">
+              <a:buFont typeface="+mj-lt"/>
+              <a:buAutoNum type="arabicPeriod"/>
+            </a:pPr>
+            <a:r>
+              <a:rPr lang="en-US" dirty="0"/>
+              <a:t>Returns to our skeletons program. Now you need to refactor it.</a:t>
+            </a:r>
+          </a:p>
+          <a:p>
+            <a:pPr marL="971550" lvl="1" indent="-514350">
+              <a:buFont typeface="+mj-lt"/>
+              <a:buAutoNum type="arabicPeriod"/>
+            </a:pPr>
+            <a:r>
+              <a:rPr lang="en-US" dirty="0"/>
+              <a:t>Separate all functions from  the program into : skeletons, base, additional and </a:t>
+            </a:r>
+            <a:r>
+              <a:rPr lang="en-US" dirty="0" err="1"/>
+              <a:t>userInteraction</a:t>
+            </a:r>
+            <a:r>
+              <a:rPr lang="en-US" dirty="0"/>
+              <a:t> files</a:t>
+            </a:r>
+          </a:p>
+          <a:p>
+            <a:pPr marL="971550" lvl="1" indent="-514350">
+              <a:buFont typeface="+mj-lt"/>
+              <a:buAutoNum type="arabicPeriod"/>
+            </a:pPr>
+            <a:r>
+              <a:rPr lang="en-US" dirty="0"/>
+              <a:t>Skeletons must contain only initial status and program loop</a:t>
+            </a:r>
+          </a:p>
+          <a:p>
+            <a:pPr marL="971550" lvl="1" indent="-514350">
+              <a:buFont typeface="+mj-lt"/>
+              <a:buAutoNum type="arabicPeriod"/>
+            </a:pPr>
+            <a:r>
+              <a:rPr lang="en-US" dirty="0"/>
+              <a:t>Base must contain actions – create, add, delete, find, </a:t>
+            </a:r>
+            <a:r>
+              <a:rPr lang="en-US" dirty="0" err="1"/>
+              <a:t>sendToHero</a:t>
+            </a:r>
+            <a:endParaRPr lang="en-US" dirty="0"/>
+          </a:p>
+          <a:p>
+            <a:pPr marL="971550" lvl="1" indent="-514350">
+              <a:buFont typeface="+mj-lt"/>
+              <a:buAutoNum type="arabicPeriod"/>
+            </a:pPr>
+            <a:r>
+              <a:rPr lang="en-US" dirty="0" err="1"/>
+              <a:t>UserInteraction</a:t>
+            </a:r>
+            <a:r>
+              <a:rPr lang="en-US" dirty="0"/>
+              <a:t> must contain all functions from the main loop</a:t>
+            </a:r>
+          </a:p>
+          <a:p>
+            <a:pPr marL="971550" lvl="1" indent="-514350">
+              <a:buFont typeface="+mj-lt"/>
+              <a:buAutoNum type="arabicPeriod"/>
+            </a:pPr>
+            <a:r>
+              <a:rPr lang="en-US" dirty="0"/>
+              <a:t>Additional contains all other functions</a:t>
+            </a:r>
+          </a:p>
+        </p:txBody>
+      </p:sp>
+      <p:grpSp>
+        <p:nvGrpSpPr>
+          <p:cNvPr id="2" name="Группа 3"/>
+          <p:cNvGrpSpPr/>
+          <p:nvPr/>
+        </p:nvGrpSpPr>
+        <p:grpSpPr>
+          <a:xfrm>
+            <a:off x="838200" y="365125"/>
+            <a:ext cx="10515600" cy="1325563"/>
+            <a:chOff x="838200" y="365125"/>
+            <a:chExt cx="10515600" cy="1325563"/>
+          </a:xfrm>
+        </p:grpSpPr>
+        <p:sp>
+          <p:nvSpPr>
+            <p:cNvPr id="5" name="Заголовок 1"/>
+            <p:cNvSpPr txBox="1">
+              <a:spLocks/>
+            </p:cNvSpPr>
+            <p:nvPr/>
+          </p:nvSpPr>
+          <p:spPr>
+            <a:xfrm>
+              <a:off x="838200" y="365125"/>
+              <a:ext cx="10515600" cy="1325563"/>
+            </a:xfrm>
+            <a:prstGeom prst="rect">
+              <a:avLst/>
+            </a:prstGeom>
+          </p:spPr>
+          <p:txBody>
+            <a:bodyPr vert="horz" lIns="91440" tIns="45720" rIns="91440" bIns="45720" rtlCol="0" anchor="ctr">
+              <a:normAutofit/>
+            </a:bodyPr>
+            <a:lstStyle/>
+            <a:p>
+              <a:pPr marL="0" marR="0" lvl="0" indent="0" algn="ctr" defTabSz="914400" rtl="0" eaLnBrk="1" fontAlgn="auto" latinLnBrk="0" hangingPunct="1">
+                <a:lnSpc>
+                  <a:spcPct val="90000"/>
+                </a:lnSpc>
+                <a:spcBef>
+                  <a:spcPct val="0"/>
+                </a:spcBef>
+                <a:spcAft>
+                  <a:spcPts val="0"/>
+                </a:spcAft>
+                <a:buClrTx/>
+                <a:buSzTx/>
+                <a:buFontTx/>
+                <a:buNone/>
+                <a:tabLst/>
+                <a:defRPr/>
+              </a:pPr>
+              <a:r>
+                <a:rPr kumimoji="0" lang="en-US" sz="4400" b="1" i="0" u="none" strike="noStrike" kern="1200" cap="none" spc="0" normalizeH="0" baseline="0" noProof="0" dirty="0">
+                  <a:ln>
+                    <a:noFill/>
+                  </a:ln>
+                  <a:solidFill>
+                    <a:schemeClr val="tx1"/>
+                  </a:solidFill>
+                  <a:effectLst/>
+                  <a:uLnTx/>
+                  <a:uFillTx/>
+                  <a:latin typeface="+mj-lt"/>
+                  <a:ea typeface="+mj-ea"/>
+                  <a:cs typeface="+mj-cs"/>
+                </a:rPr>
+                <a:t>Tasks </a:t>
+              </a:r>
+              <a:endParaRPr kumimoji="0" lang="ru-RU" sz="4400" b="1" i="0" u="none" strike="noStrike" kern="1200" cap="none" spc="0" normalizeH="0" baseline="0" noProof="0" dirty="0">
+                <a:ln>
+                  <a:noFill/>
+                </a:ln>
+                <a:solidFill>
+                  <a:schemeClr val="tx1"/>
+                </a:solidFill>
+                <a:effectLst/>
+                <a:uLnTx/>
+                <a:uFillTx/>
+                <a:latin typeface="+mj-lt"/>
+                <a:ea typeface="+mj-ea"/>
+                <a:cs typeface="+mj-cs"/>
+              </a:endParaRPr>
+            </a:p>
+          </p:txBody>
+        </p:sp>
+        <p:pic>
+          <p:nvPicPr>
+            <p:cNvPr id="6" name="Picture 2" descr="Pin on Бесплатные иконки"/>
+            <p:cNvPicPr>
+              <a:picLocks noChangeAspect="1" noChangeArrowheads="1"/>
+            </p:cNvPicPr>
+            <p:nvPr/>
+          </p:nvPicPr>
+          <p:blipFill>
+            <a:blip r:embed="rId2" cstate="print"/>
+            <a:srcRect/>
+            <a:stretch>
+              <a:fillRect/>
+            </a:stretch>
+          </p:blipFill>
+          <p:spPr bwMode="auto">
+            <a:xfrm>
+              <a:off x="4672711" y="603504"/>
+              <a:ext cx="795401" cy="795401"/>
+            </a:xfrm>
+            <a:prstGeom prst="rect">
+              <a:avLst/>
+            </a:prstGeom>
+            <a:noFill/>
+          </p:spPr>
+        </p:pic>
+      </p:grpSp>
+    </p:spTree>
+    <p:extLst>
+      <p:ext uri="{BB962C8B-B14F-4D97-AF65-F5344CB8AC3E}">
+        <p14:creationId xmlns:p14="http://schemas.microsoft.com/office/powerpoint/2010/main" val="494055149"/>
+      </p:ext>
+    </p:extLst>
+  </p:cSld>
+  <p:clrMapOvr>
+    <a:masterClrMapping/>
+  </p:clrMapOvr>
+</p:sld>
+</file>
+
 <file path=ppt/slides/slide7.xml><?xml version="1.0" encoding="utf-8"?>
 <p:sld xmlns:a="http://schemas.openxmlformats.org/drawingml/2006/main" xmlns:r="http://schemas.openxmlformats.org/officeDocument/2006/relationships" xmlns:p="http://schemas.openxmlformats.org/presentationml/2006/main">
   <p:cSld>

</xml_diff>

<commit_message>
feat: add random module block
</commit_message>
<xml_diff>
--- a/python 101/python_101.pptx
+++ b/python 101/python_101.pptx
@@ -72,6 +72,9 @@
     <p:sldId id="322" r:id="rId66"/>
     <p:sldId id="323" r:id="rId67"/>
     <p:sldId id="324" r:id="rId68"/>
+    <p:sldId id="326" r:id="rId69"/>
+    <p:sldId id="327" r:id="rId70"/>
+    <p:sldId id="325" r:id="rId71"/>
   </p:sldIdLst>
   <p:sldSz cx="12192000" cy="6858000"/>
   <p:notesSz cx="6858000" cy="9144000"/>
@@ -2775,7 +2778,7 @@
             <a:fld id="{79F9FB66-DBE4-4599-9B3C-E1452FD2AC05}" type="datetimeFigureOut">
               <a:rPr lang="en-US" smtClean="0"/>
               <a:pPr/>
-              <a:t>9/23/2021</a:t>
+              <a:t>9/24/2021</a:t>
             </a:fld>
             <a:endParaRPr lang="en-US" dirty="0"/>
           </a:p>
@@ -2945,7 +2948,7 @@
             <a:fld id="{79F9FB66-DBE4-4599-9B3C-E1452FD2AC05}" type="datetimeFigureOut">
               <a:rPr lang="en-US" smtClean="0"/>
               <a:pPr/>
-              <a:t>9/23/2021</a:t>
+              <a:t>9/24/2021</a:t>
             </a:fld>
             <a:endParaRPr lang="en-US" dirty="0"/>
           </a:p>
@@ -3125,7 +3128,7 @@
             <a:fld id="{79F9FB66-DBE4-4599-9B3C-E1452FD2AC05}" type="datetimeFigureOut">
               <a:rPr lang="en-US" smtClean="0"/>
               <a:pPr/>
-              <a:t>9/23/2021</a:t>
+              <a:t>9/24/2021</a:t>
             </a:fld>
             <a:endParaRPr lang="en-US" dirty="0"/>
           </a:p>
@@ -3295,7 +3298,7 @@
             <a:fld id="{79F9FB66-DBE4-4599-9B3C-E1452FD2AC05}" type="datetimeFigureOut">
               <a:rPr lang="en-US" smtClean="0"/>
               <a:pPr/>
-              <a:t>9/23/2021</a:t>
+              <a:t>9/24/2021</a:t>
             </a:fld>
             <a:endParaRPr lang="en-US" dirty="0"/>
           </a:p>
@@ -3542,7 +3545,7 @@
             <a:fld id="{79F9FB66-DBE4-4599-9B3C-E1452FD2AC05}" type="datetimeFigureOut">
               <a:rPr lang="en-US" smtClean="0"/>
               <a:pPr/>
-              <a:t>9/23/2021</a:t>
+              <a:t>9/24/2021</a:t>
             </a:fld>
             <a:endParaRPr lang="en-US" dirty="0"/>
           </a:p>
@@ -3773,7 +3776,7 @@
             <a:fld id="{79F9FB66-DBE4-4599-9B3C-E1452FD2AC05}" type="datetimeFigureOut">
               <a:rPr lang="en-US" smtClean="0"/>
               <a:pPr/>
-              <a:t>9/23/2021</a:t>
+              <a:t>9/24/2021</a:t>
             </a:fld>
             <a:endParaRPr lang="en-US" dirty="0"/>
           </a:p>
@@ -4139,7 +4142,7 @@
             <a:fld id="{79F9FB66-DBE4-4599-9B3C-E1452FD2AC05}" type="datetimeFigureOut">
               <a:rPr lang="en-US" smtClean="0"/>
               <a:pPr/>
-              <a:t>9/23/2021</a:t>
+              <a:t>9/24/2021</a:t>
             </a:fld>
             <a:endParaRPr lang="en-US" dirty="0"/>
           </a:p>
@@ -4258,7 +4261,7 @@
             <a:fld id="{79F9FB66-DBE4-4599-9B3C-E1452FD2AC05}" type="datetimeFigureOut">
               <a:rPr lang="en-US" smtClean="0"/>
               <a:pPr/>
-              <a:t>9/23/2021</a:t>
+              <a:t>9/24/2021</a:t>
             </a:fld>
             <a:endParaRPr lang="en-US" dirty="0"/>
           </a:p>
@@ -4355,7 +4358,7 @@
             <a:fld id="{79F9FB66-DBE4-4599-9B3C-E1452FD2AC05}" type="datetimeFigureOut">
               <a:rPr lang="en-US" smtClean="0"/>
               <a:pPr/>
-              <a:t>9/23/2021</a:t>
+              <a:t>9/24/2021</a:t>
             </a:fld>
             <a:endParaRPr lang="en-US" dirty="0"/>
           </a:p>
@@ -4632,7 +4635,7 @@
             <a:fld id="{79F9FB66-DBE4-4599-9B3C-E1452FD2AC05}" type="datetimeFigureOut">
               <a:rPr lang="en-US" smtClean="0"/>
               <a:pPr/>
-              <a:t>9/23/2021</a:t>
+              <a:t>9/24/2021</a:t>
             </a:fld>
             <a:endParaRPr lang="en-US" dirty="0"/>
           </a:p>
@@ -4886,7 +4889,7 @@
             <a:fld id="{79F9FB66-DBE4-4599-9B3C-E1452FD2AC05}" type="datetimeFigureOut">
               <a:rPr lang="en-US" smtClean="0"/>
               <a:pPr/>
-              <a:t>9/23/2021</a:t>
+              <a:t>9/24/2021</a:t>
             </a:fld>
             <a:endParaRPr lang="en-US" dirty="0"/>
           </a:p>
@@ -5129,7 +5132,7 @@
             <a:fld id="{79F9FB66-DBE4-4599-9B3C-E1452FD2AC05}" type="datetimeFigureOut">
               <a:rPr lang="en-US" smtClean="0"/>
               <a:pPr/>
-              <a:t>9/23/2021</a:t>
+              <a:t>9/24/2021</a:t>
             </a:fld>
             <a:endParaRPr lang="en-US" dirty="0"/>
           </a:p>
@@ -21953,6 +21956,472 @@
 </p:sld>
 </file>
 
+<file path=ppt/slides/slide68.xml><?xml version="1.0" encoding="utf-8"?>
+<p:sld xmlns:a="http://schemas.openxmlformats.org/drawingml/2006/main" xmlns:r="http://schemas.openxmlformats.org/officeDocument/2006/relationships" xmlns:p="http://schemas.openxmlformats.org/presentationml/2006/main">
+  <p:cSld>
+    <p:spTree>
+      <p:nvGrpSpPr>
+        <p:cNvPr id="1" name=""/>
+        <p:cNvGrpSpPr/>
+        <p:nvPr/>
+      </p:nvGrpSpPr>
+      <p:grpSpPr>
+        <a:xfrm>
+          <a:off x="0" y="0"/>
+          <a:ext cx="0" cy="0"/>
+          <a:chOff x="0" y="0"/>
+          <a:chExt cx="0" cy="0"/>
+        </a:xfrm>
+      </p:grpSpPr>
+      <p:sp>
+        <p:nvSpPr>
+          <p:cNvPr id="4" name="Прямоугольник 3">
+            <a:extLst>
+              <a:ext uri="{FF2B5EF4-FFF2-40B4-BE49-F238E27FC236}">
+                <a16:creationId xmlns:a16="http://schemas.microsoft.com/office/drawing/2014/main" id="{2823A4D6-D667-48E2-8DB7-ED1E26260B50}"/>
+              </a:ext>
+            </a:extLst>
+          </p:cNvPr>
+          <p:cNvSpPr/>
+          <p:nvPr/>
+        </p:nvSpPr>
+        <p:spPr>
+          <a:xfrm>
+            <a:off x="4200939" y="980661"/>
+            <a:ext cx="3816626" cy="318052"/>
+          </a:xfrm>
+          <a:prstGeom prst="rect">
+            <a:avLst/>
+          </a:prstGeom>
+          <a:solidFill>
+            <a:srgbClr val="65F8FF"/>
+          </a:solidFill>
+          <a:ln>
+            <a:solidFill>
+              <a:srgbClr val="65F8FF"/>
+            </a:solidFill>
+          </a:ln>
+        </p:spPr>
+        <p:style>
+          <a:lnRef idx="2">
+            <a:schemeClr val="accent1">
+              <a:shade val="50000"/>
+            </a:schemeClr>
+          </a:lnRef>
+          <a:fillRef idx="1">
+            <a:schemeClr val="accent1"/>
+          </a:fillRef>
+          <a:effectRef idx="0">
+            <a:schemeClr val="accent1"/>
+          </a:effectRef>
+          <a:fontRef idx="minor">
+            <a:schemeClr val="lt1"/>
+          </a:fontRef>
+        </p:style>
+        <p:txBody>
+          <a:bodyPr rtlCol="0" anchor="ctr"/>
+          <a:lstStyle/>
+          <a:p>
+            <a:pPr algn="ctr"/>
+            <a:endParaRPr lang="ru-RU"/>
+          </a:p>
+        </p:txBody>
+      </p:sp>
+      <p:sp>
+        <p:nvSpPr>
+          <p:cNvPr id="2" name="Заголовок 1">
+            <a:extLst>
+              <a:ext uri="{FF2B5EF4-FFF2-40B4-BE49-F238E27FC236}">
+                <a16:creationId xmlns:a16="http://schemas.microsoft.com/office/drawing/2014/main" id="{4B6E1AB8-A648-441C-A85F-1793163341F1}"/>
+              </a:ext>
+            </a:extLst>
+          </p:cNvPr>
+          <p:cNvSpPr>
+            <a:spLocks noGrp="1"/>
+          </p:cNvSpPr>
+          <p:nvPr>
+            <p:ph type="title"/>
+          </p:nvPr>
+        </p:nvSpPr>
+        <p:spPr/>
+        <p:txBody>
+          <a:bodyPr/>
+          <a:lstStyle/>
+          <a:p>
+            <a:pPr algn="ctr"/>
+            <a:r>
+              <a:rPr lang="en-US" dirty="0"/>
+              <a:t>Random Module</a:t>
+            </a:r>
+            <a:endParaRPr lang="ru-RU" dirty="0"/>
+          </a:p>
+        </p:txBody>
+      </p:sp>
+      <p:sp>
+        <p:nvSpPr>
+          <p:cNvPr id="3" name="Объект 2">
+            <a:extLst>
+              <a:ext uri="{FF2B5EF4-FFF2-40B4-BE49-F238E27FC236}">
+                <a16:creationId xmlns:a16="http://schemas.microsoft.com/office/drawing/2014/main" id="{3E213345-73AE-40A2-93F8-64D2A4FB8D23}"/>
+              </a:ext>
+            </a:extLst>
+          </p:cNvPr>
+          <p:cNvSpPr>
+            <a:spLocks noGrp="1"/>
+          </p:cNvSpPr>
+          <p:nvPr>
+            <p:ph idx="1"/>
+          </p:nvPr>
+        </p:nvSpPr>
+        <p:spPr>
+          <a:xfrm>
+            <a:off x="838200" y="1825625"/>
+            <a:ext cx="5814391" cy="4351338"/>
+          </a:xfrm>
+        </p:spPr>
+        <p:txBody>
+          <a:bodyPr>
+            <a:normAutofit fontScale="77500" lnSpcReduction="20000"/>
+          </a:bodyPr>
+          <a:lstStyle/>
+          <a:p>
+            <a:r>
+              <a:rPr lang="en-US" dirty="0"/>
+              <a:t>Random provides you a random number generator with different generator functions. Here are some helpful of them: </a:t>
+            </a:r>
+          </a:p>
+          <a:p>
+            <a:r>
+              <a:rPr lang="en-US" dirty="0">
+                <a:solidFill>
+                  <a:srgbClr val="FF0000"/>
+                </a:solidFill>
+              </a:rPr>
+              <a:t>random() </a:t>
+            </a:r>
+            <a:r>
+              <a:rPr lang="en-US" dirty="0"/>
+              <a:t>– return a random value between 0 and 1</a:t>
+            </a:r>
+          </a:p>
+          <a:p>
+            <a:r>
+              <a:rPr lang="en-US" dirty="0" err="1">
+                <a:solidFill>
+                  <a:srgbClr val="FF0000"/>
+                </a:solidFill>
+              </a:rPr>
+              <a:t>randint</a:t>
+            </a:r>
+            <a:r>
+              <a:rPr lang="en-US" dirty="0">
+                <a:solidFill>
+                  <a:srgbClr val="FF0000"/>
+                </a:solidFill>
+              </a:rPr>
+              <a:t>(A, B) </a:t>
+            </a:r>
+            <a:r>
+              <a:rPr lang="en-US" dirty="0"/>
+              <a:t>– return int value between A and B </a:t>
+            </a:r>
+          </a:p>
+          <a:p>
+            <a:r>
+              <a:rPr lang="en-US" dirty="0">
+                <a:solidFill>
+                  <a:srgbClr val="FF0000"/>
+                </a:solidFill>
+              </a:rPr>
+              <a:t>choice(sequence) </a:t>
+            </a:r>
+            <a:r>
+              <a:rPr lang="en-US" dirty="0"/>
+              <a:t>– return a random value from the sequence. The sequence must have at last 1 value</a:t>
+            </a:r>
+          </a:p>
+          <a:p>
+            <a:r>
+              <a:rPr lang="en-US" dirty="0">
+                <a:solidFill>
+                  <a:srgbClr val="FF0000"/>
+                </a:solidFill>
+              </a:rPr>
+              <a:t>shuffle(sequence) </a:t>
+            </a:r>
+            <a:r>
+              <a:rPr lang="en-US" dirty="0"/>
+              <a:t>– shuffles the sequence. None return!</a:t>
+            </a:r>
+          </a:p>
+          <a:p>
+            <a:r>
+              <a:rPr lang="en-US" dirty="0">
+                <a:solidFill>
+                  <a:srgbClr val="FF0000"/>
+                </a:solidFill>
+              </a:rPr>
+              <a:t>sample(sequence, length) </a:t>
+            </a:r>
+            <a:r>
+              <a:rPr lang="en-US" dirty="0"/>
+              <a:t>– return a random sequence with a given length from the original sequence</a:t>
+            </a:r>
+            <a:endParaRPr lang="ru-RU" dirty="0"/>
+          </a:p>
+        </p:txBody>
+      </p:sp>
+      <p:pic>
+        <p:nvPicPr>
+          <p:cNvPr id="5" name="Рисунок 4">
+            <a:extLst>
+              <a:ext uri="{FF2B5EF4-FFF2-40B4-BE49-F238E27FC236}">
+                <a16:creationId xmlns:a16="http://schemas.microsoft.com/office/drawing/2014/main" id="{6BE6DE94-907B-4D78-9E26-9C4A653BFCAE}"/>
+              </a:ext>
+            </a:extLst>
+          </p:cNvPr>
+          <p:cNvPicPr>
+            <a:picLocks noChangeAspect="1"/>
+          </p:cNvPicPr>
+          <p:nvPr/>
+        </p:nvPicPr>
+        <p:blipFill>
+          <a:blip r:embed="rId2"/>
+          <a:stretch>
+            <a:fillRect/>
+          </a:stretch>
+        </p:blipFill>
+        <p:spPr>
+          <a:xfrm>
+            <a:off x="6988450" y="2501003"/>
+            <a:ext cx="4795573" cy="3000582"/>
+          </a:xfrm>
+          <a:prstGeom prst="rect">
+            <a:avLst/>
+          </a:prstGeom>
+        </p:spPr>
+      </p:pic>
+    </p:spTree>
+    <p:extLst>
+      <p:ext uri="{BB962C8B-B14F-4D97-AF65-F5344CB8AC3E}">
+        <p14:creationId xmlns:p14="http://schemas.microsoft.com/office/powerpoint/2010/main" val="3481508202"/>
+      </p:ext>
+    </p:extLst>
+  </p:cSld>
+  <p:clrMapOvr>
+    <a:masterClrMapping/>
+  </p:clrMapOvr>
+</p:sld>
+</file>
+
+<file path=ppt/slides/slide69.xml><?xml version="1.0" encoding="utf-8"?>
+<p:sld xmlns:a="http://schemas.openxmlformats.org/drawingml/2006/main" xmlns:r="http://schemas.openxmlformats.org/officeDocument/2006/relationships" xmlns:p="http://schemas.openxmlformats.org/presentationml/2006/main">
+  <p:cSld>
+    <p:spTree>
+      <p:nvGrpSpPr>
+        <p:cNvPr id="1" name=""/>
+        <p:cNvGrpSpPr/>
+        <p:nvPr/>
+      </p:nvGrpSpPr>
+      <p:grpSpPr>
+        <a:xfrm>
+          <a:off x="0" y="0"/>
+          <a:ext cx="0" cy="0"/>
+          <a:chOff x="0" y="0"/>
+          <a:chExt cx="0" cy="0"/>
+        </a:xfrm>
+      </p:grpSpPr>
+      <p:sp>
+        <p:nvSpPr>
+          <p:cNvPr id="3" name="Содержимое 2"/>
+          <p:cNvSpPr>
+            <a:spLocks noGrp="1"/>
+          </p:cNvSpPr>
+          <p:nvPr>
+            <p:ph idx="1"/>
+          </p:nvPr>
+        </p:nvSpPr>
+        <p:spPr>
+          <a:xfrm>
+            <a:off x="914400" y="1499616"/>
+            <a:ext cx="10439400" cy="5358384"/>
+          </a:xfrm>
+        </p:spPr>
+        <p:txBody>
+          <a:bodyPr>
+            <a:normAutofit/>
+          </a:bodyPr>
+          <a:lstStyle/>
+          <a:p>
+            <a:pPr marL="514350" indent="-514350">
+              <a:buFont typeface="+mj-lt"/>
+              <a:buAutoNum type="arabicPeriod"/>
+            </a:pPr>
+            <a:r>
+              <a:rPr lang="en-US" dirty="0"/>
+              <a:t>Our skeletons program is boring and predictable in battle. Let’s do it more fun</a:t>
+            </a:r>
+          </a:p>
+          <a:p>
+            <a:pPr marL="971550" lvl="1" indent="-514350">
+              <a:buFont typeface="+mj-lt"/>
+              <a:buAutoNum type="arabicPeriod"/>
+            </a:pPr>
+            <a:r>
+              <a:rPr lang="en-US" dirty="0"/>
+              <a:t>Damage of skeletons is a random number between 10 and 30</a:t>
+            </a:r>
+          </a:p>
+          <a:p>
+            <a:pPr marL="971550" lvl="1" indent="-514350">
+              <a:buFont typeface="+mj-lt"/>
+              <a:buAutoNum type="arabicPeriod"/>
+            </a:pPr>
+            <a:r>
+              <a:rPr lang="en-US" dirty="0"/>
+              <a:t>Health is also a random number between 1 and 30 multiplied  by 2.35 and rounded to int</a:t>
+            </a:r>
+          </a:p>
+          <a:p>
+            <a:pPr marL="971550" lvl="1" indent="-514350">
+              <a:buFont typeface="+mj-lt"/>
+              <a:buAutoNum type="arabicPeriod"/>
+            </a:pPr>
+            <a:r>
+              <a:rPr lang="en-US" dirty="0"/>
+              <a:t>Add a function that send to hero a random skeleton</a:t>
+            </a:r>
+          </a:p>
+        </p:txBody>
+      </p:sp>
+      <p:grpSp>
+        <p:nvGrpSpPr>
+          <p:cNvPr id="2" name="Группа 3"/>
+          <p:cNvGrpSpPr/>
+          <p:nvPr/>
+        </p:nvGrpSpPr>
+        <p:grpSpPr>
+          <a:xfrm>
+            <a:off x="838200" y="365125"/>
+            <a:ext cx="10515600" cy="1325563"/>
+            <a:chOff x="838200" y="365125"/>
+            <a:chExt cx="10515600" cy="1325563"/>
+          </a:xfrm>
+        </p:grpSpPr>
+        <p:sp>
+          <p:nvSpPr>
+            <p:cNvPr id="5" name="Заголовок 1"/>
+            <p:cNvSpPr txBox="1">
+              <a:spLocks/>
+            </p:cNvSpPr>
+            <p:nvPr/>
+          </p:nvSpPr>
+          <p:spPr>
+            <a:xfrm>
+              <a:off x="838200" y="365125"/>
+              <a:ext cx="10515600" cy="1325563"/>
+            </a:xfrm>
+            <a:prstGeom prst="rect">
+              <a:avLst/>
+            </a:prstGeom>
+          </p:spPr>
+          <p:txBody>
+            <a:bodyPr vert="horz" lIns="91440" tIns="45720" rIns="91440" bIns="45720" rtlCol="0" anchor="ctr">
+              <a:normAutofit/>
+            </a:bodyPr>
+            <a:lstStyle/>
+            <a:p>
+              <a:pPr marL="0" marR="0" lvl="0" indent="0" algn="ctr" defTabSz="914400" rtl="0" eaLnBrk="1" fontAlgn="auto" latinLnBrk="0" hangingPunct="1">
+                <a:lnSpc>
+                  <a:spcPct val="90000"/>
+                </a:lnSpc>
+                <a:spcBef>
+                  <a:spcPct val="0"/>
+                </a:spcBef>
+                <a:spcAft>
+                  <a:spcPts val="0"/>
+                </a:spcAft>
+                <a:buClrTx/>
+                <a:buSzTx/>
+                <a:buFontTx/>
+                <a:buNone/>
+                <a:tabLst/>
+                <a:defRPr/>
+              </a:pPr>
+              <a:r>
+                <a:rPr kumimoji="0" lang="en-US" sz="4400" b="1" i="0" u="none" strike="noStrike" kern="1200" cap="none" spc="0" normalizeH="0" baseline="0" noProof="0" dirty="0">
+                  <a:ln>
+                    <a:noFill/>
+                  </a:ln>
+                  <a:solidFill>
+                    <a:schemeClr val="tx1"/>
+                  </a:solidFill>
+                  <a:effectLst/>
+                  <a:uLnTx/>
+                  <a:uFillTx/>
+                  <a:latin typeface="+mj-lt"/>
+                  <a:ea typeface="+mj-ea"/>
+                  <a:cs typeface="+mj-cs"/>
+                </a:rPr>
+                <a:t>Tasks </a:t>
+              </a:r>
+              <a:endParaRPr kumimoji="0" lang="ru-RU" sz="4400" b="1" i="0" u="none" strike="noStrike" kern="1200" cap="none" spc="0" normalizeH="0" baseline="0" noProof="0" dirty="0">
+                <a:ln>
+                  <a:noFill/>
+                </a:ln>
+                <a:solidFill>
+                  <a:schemeClr val="tx1"/>
+                </a:solidFill>
+                <a:effectLst/>
+                <a:uLnTx/>
+                <a:uFillTx/>
+                <a:latin typeface="+mj-lt"/>
+                <a:ea typeface="+mj-ea"/>
+                <a:cs typeface="+mj-cs"/>
+              </a:endParaRPr>
+            </a:p>
+          </p:txBody>
+        </p:sp>
+        <p:pic>
+          <p:nvPicPr>
+            <p:cNvPr id="6" name="Picture 2" descr="Pin on Бесплатные иконки"/>
+            <p:cNvPicPr>
+              <a:picLocks noChangeAspect="1" noChangeArrowheads="1"/>
+            </p:cNvPicPr>
+            <p:nvPr/>
+          </p:nvPicPr>
+          <p:blipFill>
+            <a:blip r:embed="rId2" cstate="print"/>
+            <a:srcRect/>
+            <a:stretch>
+              <a:fillRect/>
+            </a:stretch>
+          </p:blipFill>
+          <p:spPr bwMode="auto">
+            <a:xfrm>
+              <a:off x="4672711" y="603504"/>
+              <a:ext cx="795401" cy="795401"/>
+            </a:xfrm>
+            <a:prstGeom prst="rect">
+              <a:avLst/>
+            </a:prstGeom>
+            <a:noFill/>
+          </p:spPr>
+        </p:pic>
+      </p:grpSp>
+    </p:spTree>
+    <p:extLst>
+      <p:ext uri="{BB962C8B-B14F-4D97-AF65-F5344CB8AC3E}">
+        <p14:creationId xmlns:p14="http://schemas.microsoft.com/office/powerpoint/2010/main" val="2024132920"/>
+      </p:ext>
+    </p:extLst>
+  </p:cSld>
+  <p:clrMapOvr>
+    <a:masterClrMapping/>
+  </p:clrMapOvr>
+</p:sld>
+</file>
+
 <file path=ppt/slides/slide7.xml><?xml version="1.0" encoding="utf-8"?>
 <p:sld xmlns:a="http://schemas.openxmlformats.org/drawingml/2006/main" xmlns:r="http://schemas.openxmlformats.org/officeDocument/2006/relationships" xmlns:p="http://schemas.openxmlformats.org/presentationml/2006/main">
   <p:cSld>
@@ -22132,6 +22601,312 @@
         </p:spPr>
       </p:pic>
     </p:spTree>
+  </p:cSld>
+  <p:clrMapOvr>
+    <a:masterClrMapping/>
+  </p:clrMapOvr>
+</p:sld>
+</file>
+
+<file path=ppt/slides/slide70.xml><?xml version="1.0" encoding="utf-8"?>
+<p:sld xmlns:a="http://schemas.openxmlformats.org/drawingml/2006/main" xmlns:r="http://schemas.openxmlformats.org/officeDocument/2006/relationships" xmlns:p="http://schemas.openxmlformats.org/presentationml/2006/main">
+  <p:cSld>
+    <p:spTree>
+      <p:nvGrpSpPr>
+        <p:cNvPr id="1" name=""/>
+        <p:cNvGrpSpPr/>
+        <p:nvPr/>
+      </p:nvGrpSpPr>
+      <p:grpSpPr>
+        <a:xfrm>
+          <a:off x="0" y="0"/>
+          <a:ext cx="0" cy="0"/>
+          <a:chOff x="0" y="0"/>
+          <a:chExt cx="0" cy="0"/>
+        </a:xfrm>
+      </p:grpSpPr>
+      <p:sp>
+        <p:nvSpPr>
+          <p:cNvPr id="2" name="Заголовок 1">
+            <a:extLst>
+              <a:ext uri="{FF2B5EF4-FFF2-40B4-BE49-F238E27FC236}">
+                <a16:creationId xmlns:a16="http://schemas.microsoft.com/office/drawing/2014/main" id="{9324FF77-85ED-430A-A432-8E22C22D98B8}"/>
+              </a:ext>
+            </a:extLst>
+          </p:cNvPr>
+          <p:cNvSpPr>
+            <a:spLocks noGrp="1"/>
+          </p:cNvSpPr>
+          <p:nvPr>
+            <p:ph type="title"/>
+          </p:nvPr>
+        </p:nvSpPr>
+        <p:spPr/>
+        <p:txBody>
+          <a:bodyPr/>
+          <a:lstStyle/>
+          <a:p>
+            <a:pPr algn="ctr"/>
+            <a:r>
+              <a:rPr lang="en-US" dirty="0">
+                <a:latin typeface="MV Boli" panose="02000500030200090000" pitchFamily="2" charset="0"/>
+                <a:cs typeface="MV Boli" panose="02000500030200090000" pitchFamily="2" charset="0"/>
+              </a:rPr>
+              <a:t>12 Hellish Trials </a:t>
+            </a:r>
+            <a:endParaRPr lang="ru-RU" dirty="0">
+              <a:cs typeface="MV Boli" panose="02000500030200090000" pitchFamily="2" charset="0"/>
+            </a:endParaRPr>
+          </a:p>
+        </p:txBody>
+      </p:sp>
+      <p:sp>
+        <p:nvSpPr>
+          <p:cNvPr id="3" name="Объект 2">
+            <a:extLst>
+              <a:ext uri="{FF2B5EF4-FFF2-40B4-BE49-F238E27FC236}">
+                <a16:creationId xmlns:a16="http://schemas.microsoft.com/office/drawing/2014/main" id="{2ADF3C9B-7FC9-4B7B-953F-F1A81668185B}"/>
+              </a:ext>
+            </a:extLst>
+          </p:cNvPr>
+          <p:cNvSpPr>
+            <a:spLocks noGrp="1"/>
+          </p:cNvSpPr>
+          <p:nvPr>
+            <p:ph idx="1"/>
+          </p:nvPr>
+        </p:nvSpPr>
+        <p:spPr>
+          <a:xfrm>
+            <a:off x="838200" y="2342459"/>
+            <a:ext cx="10515600" cy="4351338"/>
+          </a:xfrm>
+        </p:spPr>
+        <p:txBody>
+          <a:bodyPr>
+            <a:normAutofit fontScale="77500" lnSpcReduction="20000"/>
+          </a:bodyPr>
+          <a:lstStyle/>
+          <a:p>
+            <a:pPr marL="514350" indent="-514350">
+              <a:buFont typeface="+mj-lt"/>
+              <a:buAutoNum type="arabicPeriod"/>
+            </a:pPr>
+            <a:r>
+              <a:rPr lang="en-US" dirty="0">
+                <a:hlinkClick r:id="rId2"/>
+              </a:rPr>
+              <a:t>https://www.codewars.com/kata/52fba66badcd10859f00097e</a:t>
+            </a:r>
+            <a:endParaRPr lang="en-US" dirty="0"/>
+          </a:p>
+          <a:p>
+            <a:pPr marL="514350" indent="-514350">
+              <a:buFont typeface="+mj-lt"/>
+              <a:buAutoNum type="arabicPeriod"/>
+            </a:pPr>
+            <a:r>
+              <a:rPr lang="en-US" dirty="0">
+                <a:hlinkClick r:id="rId3"/>
+              </a:rPr>
+              <a:t>https://www.codewars.com/kata/5667e8f4e3f572a8f2000039</a:t>
+            </a:r>
+            <a:endParaRPr lang="en-US" dirty="0"/>
+          </a:p>
+          <a:p>
+            <a:pPr marL="514350" indent="-514350">
+              <a:buFont typeface="+mj-lt"/>
+              <a:buAutoNum type="arabicPeriod"/>
+            </a:pPr>
+            <a:r>
+              <a:rPr lang="en-US" dirty="0">
+                <a:hlinkClick r:id="rId4"/>
+              </a:rPr>
+              <a:t>https://www.codewars.com/kata/554b4ac871d6813a03000035</a:t>
+            </a:r>
+            <a:endParaRPr lang="en-US" dirty="0"/>
+          </a:p>
+          <a:p>
+            <a:pPr marL="514350" indent="-514350">
+              <a:buFont typeface="+mj-lt"/>
+              <a:buAutoNum type="arabicPeriod"/>
+            </a:pPr>
+            <a:r>
+              <a:rPr lang="en-US" dirty="0">
+                <a:hlinkClick r:id="rId5"/>
+              </a:rPr>
+              <a:t>https://www.codewars.com/kata/546e2562b03326a88e000020/javascript</a:t>
+            </a:r>
+            <a:endParaRPr lang="en-US" dirty="0"/>
+          </a:p>
+          <a:p>
+            <a:pPr marL="514350" indent="-514350">
+              <a:buFont typeface="+mj-lt"/>
+              <a:buAutoNum type="arabicPeriod"/>
+            </a:pPr>
+            <a:r>
+              <a:rPr lang="en-US" dirty="0">
+                <a:hlinkClick r:id="rId6"/>
+              </a:rPr>
+              <a:t>https://www.codewars.com/kata/523f5d21c841566fde000009</a:t>
+            </a:r>
+            <a:endParaRPr lang="en-US" dirty="0"/>
+          </a:p>
+          <a:p>
+            <a:pPr marL="514350" indent="-514350">
+              <a:buFont typeface="+mj-lt"/>
+              <a:buAutoNum type="arabicPeriod"/>
+            </a:pPr>
+            <a:r>
+              <a:rPr lang="en-US" dirty="0">
+                <a:hlinkClick r:id="rId7"/>
+              </a:rPr>
+              <a:t>https://www.codewars.com/kata/5526fc09a1bbd946250002dc</a:t>
+            </a:r>
+            <a:endParaRPr lang="en-US" dirty="0"/>
+          </a:p>
+          <a:p>
+            <a:pPr marL="514350" indent="-514350">
+              <a:buFont typeface="+mj-lt"/>
+              <a:buAutoNum type="arabicPeriod"/>
+            </a:pPr>
+            <a:r>
+              <a:rPr lang="en-US" dirty="0">
+                <a:hlinkClick r:id="rId8"/>
+              </a:rPr>
+              <a:t>https://www.codewars.com/kata/54b42f9314d9229fd6000d9c</a:t>
+            </a:r>
+            <a:endParaRPr lang="en-US" dirty="0"/>
+          </a:p>
+          <a:p>
+            <a:pPr marL="514350" indent="-514350">
+              <a:buFont typeface="+mj-lt"/>
+              <a:buAutoNum type="arabicPeriod"/>
+            </a:pPr>
+            <a:r>
+              <a:rPr lang="en-US" dirty="0">
+                <a:hlinkClick r:id="rId9"/>
+              </a:rPr>
+              <a:t>https://www.codewars.com/kata/54da539698b8a2ad76000228</a:t>
+            </a:r>
+            <a:endParaRPr lang="en-US" dirty="0"/>
+          </a:p>
+          <a:p>
+            <a:pPr marL="514350" indent="-514350">
+              <a:buFont typeface="+mj-lt"/>
+              <a:buAutoNum type="arabicPeriod"/>
+            </a:pPr>
+            <a:r>
+              <a:rPr lang="en-US" dirty="0">
+                <a:hlinkClick r:id="rId10"/>
+              </a:rPr>
+              <a:t>https://www.codewars.com/kata/5682e646d5eddc1e21000017</a:t>
+            </a:r>
+            <a:endParaRPr lang="en-US" dirty="0"/>
+          </a:p>
+          <a:p>
+            <a:pPr marL="514350" indent="-514350">
+              <a:buFont typeface="+mj-lt"/>
+              <a:buAutoNum type="arabicPeriod"/>
+            </a:pPr>
+            <a:r>
+              <a:rPr lang="en-US" dirty="0">
+                <a:hlinkClick r:id="rId11"/>
+              </a:rPr>
+              <a:t>https://www.codewars.com/kata/5682e72eb7354b2f39000021</a:t>
+            </a:r>
+            <a:endParaRPr lang="en-US" dirty="0"/>
+          </a:p>
+          <a:p>
+            <a:pPr marL="514350" indent="-514350">
+              <a:buFont typeface="+mj-lt"/>
+              <a:buAutoNum type="arabicPeriod"/>
+            </a:pPr>
+            <a:r>
+              <a:rPr lang="en-US" dirty="0">
+                <a:hlinkClick r:id="rId12"/>
+              </a:rPr>
+              <a:t>https://www.codewars.com/kata/5682e809386707366d000024</a:t>
+            </a:r>
+            <a:endParaRPr lang="en-US" dirty="0"/>
+          </a:p>
+          <a:p>
+            <a:pPr marL="514350" indent="-514350">
+              <a:buFont typeface="+mj-lt"/>
+              <a:buAutoNum type="arabicPeriod"/>
+            </a:pPr>
+            <a:r>
+              <a:rPr lang="en-US" dirty="0">
+                <a:hlinkClick r:id="rId13"/>
+              </a:rPr>
+              <a:t>https://www.codewars.com/kata/5682e545fb263ecf7b000069</a:t>
+            </a:r>
+            <a:endParaRPr lang="en-US" dirty="0"/>
+          </a:p>
+          <a:p>
+            <a:pPr marL="514350" indent="-514350">
+              <a:buFont typeface="+mj-lt"/>
+              <a:buAutoNum type="arabicPeriod"/>
+            </a:pPr>
+            <a:endParaRPr lang="en-US" dirty="0"/>
+          </a:p>
+          <a:p>
+            <a:pPr marL="514350" indent="-514350">
+              <a:buFont typeface="+mj-lt"/>
+              <a:buAutoNum type="arabicPeriod"/>
+            </a:pPr>
+            <a:endParaRPr lang="en-US" dirty="0"/>
+          </a:p>
+        </p:txBody>
+      </p:sp>
+      <p:sp>
+        <p:nvSpPr>
+          <p:cNvPr id="4" name="TextBox 3">
+            <a:extLst>
+              <a:ext uri="{FF2B5EF4-FFF2-40B4-BE49-F238E27FC236}">
+                <a16:creationId xmlns:a16="http://schemas.microsoft.com/office/drawing/2014/main" id="{6FDD5A4C-3AF2-4400-ABA3-EB82EB6B7555}"/>
+              </a:ext>
+            </a:extLst>
+          </p:cNvPr>
+          <p:cNvSpPr txBox="1"/>
+          <p:nvPr/>
+        </p:nvSpPr>
+        <p:spPr>
+          <a:xfrm>
+            <a:off x="838200" y="1690688"/>
+            <a:ext cx="10515600" cy="461665"/>
+          </a:xfrm>
+          <a:prstGeom prst="rect">
+            <a:avLst/>
+          </a:prstGeom>
+          <a:noFill/>
+        </p:spPr>
+        <p:txBody>
+          <a:bodyPr wrap="square" rtlCol="0">
+            <a:spAutoFit/>
+          </a:bodyPr>
+          <a:lstStyle/>
+          <a:p>
+            <a:pPr algn="ctr"/>
+            <a:r>
+              <a:rPr lang="en-US" sz="2400" b="1" dirty="0">
+                <a:latin typeface="MV Boli" panose="02000500030200090000" pitchFamily="2" charset="0"/>
+                <a:cs typeface="MV Boli" panose="02000500030200090000" pitchFamily="2" charset="0"/>
+              </a:rPr>
+              <a:t>Your current task is pretty simple – Just finish All </a:t>
+            </a:r>
+            <a:endParaRPr lang="ru-RU" sz="2400" b="1" dirty="0">
+              <a:cs typeface="MV Boli" panose="02000500030200090000" pitchFamily="2" charset="0"/>
+            </a:endParaRPr>
+          </a:p>
+        </p:txBody>
+      </p:sp>
+    </p:spTree>
+    <p:extLst>
+      <p:ext uri="{BB962C8B-B14F-4D97-AF65-F5344CB8AC3E}">
+        <p14:creationId xmlns:p14="http://schemas.microsoft.com/office/powerpoint/2010/main" val="1148193553"/>
+      </p:ext>
+    </p:extLst>
   </p:cSld>
   <p:clrMapOvr>
     <a:masterClrMapping/>

</xml_diff>

<commit_message>
feat: add datetime and date modules
</commit_message>
<xml_diff>
--- a/python 101/python_101.pptx
+++ b/python 101/python_101.pptx
@@ -74,7 +74,14 @@
     <p:sldId id="324" r:id="rId68"/>
     <p:sldId id="326" r:id="rId69"/>
     <p:sldId id="327" r:id="rId70"/>
-    <p:sldId id="325" r:id="rId71"/>
+    <p:sldId id="329" r:id="rId71"/>
+    <p:sldId id="330" r:id="rId72"/>
+    <p:sldId id="328" r:id="rId73"/>
+    <p:sldId id="332" r:id="rId74"/>
+    <p:sldId id="331" r:id="rId75"/>
+    <p:sldId id="333" r:id="rId76"/>
+    <p:sldId id="334" r:id="rId77"/>
+    <p:sldId id="325" r:id="rId78"/>
   </p:sldIdLst>
   <p:sldSz cx="12192000" cy="6858000"/>
   <p:notesSz cx="6858000" cy="9144000"/>
@@ -21088,7 +21095,7 @@
         </p:spPr>
         <p:txBody>
           <a:bodyPr>
-            <a:normAutofit fontScale="77500" lnSpcReduction="20000"/>
+            <a:normAutofit fontScale="70000" lnSpcReduction="20000"/>
           </a:bodyPr>
           <a:lstStyle/>
           <a:p>
@@ -21168,7 +21175,33 @@
               <a:rPr lang="en-US" dirty="0"/>
               <a:t>&gt; , not only a function may be imported</a:t>
             </a:r>
-            <a:endParaRPr lang="ru-RU" dirty="0"/>
+          </a:p>
+          <a:p>
+            <a:r>
+              <a:rPr lang="en-US" dirty="0"/>
+              <a:t>To show all exports from module use </a:t>
+            </a:r>
+            <a:r>
+              <a:rPr lang="en-US" dirty="0" err="1">
+                <a:solidFill>
+                  <a:srgbClr val="FF0000"/>
+                </a:solidFill>
+              </a:rPr>
+              <a:t>dir</a:t>
+            </a:r>
+            <a:r>
+              <a:rPr lang="en-US" dirty="0">
+                <a:solidFill>
+                  <a:srgbClr val="FF0000"/>
+                </a:solidFill>
+              </a:rPr>
+              <a:t>()</a:t>
+            </a:r>
+            <a:endParaRPr lang="ru-RU" dirty="0">
+              <a:solidFill>
+                <a:srgbClr val="FF0000"/>
+              </a:solidFill>
+            </a:endParaRPr>
           </a:p>
         </p:txBody>
       </p:sp>
@@ -22627,6 +22660,1523 @@
       </p:grpSpPr>
       <p:sp>
         <p:nvSpPr>
+          <p:cNvPr id="4" name="Прямоугольник 3">
+            <a:extLst>
+              <a:ext uri="{FF2B5EF4-FFF2-40B4-BE49-F238E27FC236}">
+                <a16:creationId xmlns:a16="http://schemas.microsoft.com/office/drawing/2014/main" id="{237700B9-C12D-417D-8584-682AC40E87FC}"/>
+              </a:ext>
+            </a:extLst>
+          </p:cNvPr>
+          <p:cNvSpPr/>
+          <p:nvPr/>
+        </p:nvSpPr>
+        <p:spPr>
+          <a:xfrm>
+            <a:off x="4545496" y="954157"/>
+            <a:ext cx="3087756" cy="344556"/>
+          </a:xfrm>
+          <a:prstGeom prst="rect">
+            <a:avLst/>
+          </a:prstGeom>
+          <a:solidFill>
+            <a:srgbClr val="65F8FF"/>
+          </a:solidFill>
+          <a:ln>
+            <a:solidFill>
+              <a:srgbClr val="65F8FF"/>
+            </a:solidFill>
+          </a:ln>
+        </p:spPr>
+        <p:style>
+          <a:lnRef idx="2">
+            <a:schemeClr val="accent1">
+              <a:shade val="50000"/>
+            </a:schemeClr>
+          </a:lnRef>
+          <a:fillRef idx="1">
+            <a:schemeClr val="accent1"/>
+          </a:fillRef>
+          <a:effectRef idx="0">
+            <a:schemeClr val="accent1"/>
+          </a:effectRef>
+          <a:fontRef idx="minor">
+            <a:schemeClr val="lt1"/>
+          </a:fontRef>
+        </p:style>
+        <p:txBody>
+          <a:bodyPr rtlCol="0" anchor="ctr"/>
+          <a:lstStyle/>
+          <a:p>
+            <a:pPr algn="ctr"/>
+            <a:endParaRPr lang="ru-RU"/>
+          </a:p>
+        </p:txBody>
+      </p:sp>
+      <p:sp>
+        <p:nvSpPr>
+          <p:cNvPr id="2" name="Заголовок 1">
+            <a:extLst>
+              <a:ext uri="{FF2B5EF4-FFF2-40B4-BE49-F238E27FC236}">
+                <a16:creationId xmlns:a16="http://schemas.microsoft.com/office/drawing/2014/main" id="{B0E5DED9-6335-453B-893A-DD1712F68167}"/>
+              </a:ext>
+            </a:extLst>
+          </p:cNvPr>
+          <p:cNvSpPr>
+            <a:spLocks noGrp="1"/>
+          </p:cNvSpPr>
+          <p:nvPr>
+            <p:ph type="title"/>
+          </p:nvPr>
+        </p:nvSpPr>
+        <p:spPr/>
+        <p:txBody>
+          <a:bodyPr/>
+          <a:lstStyle/>
+          <a:p>
+            <a:pPr algn="ctr"/>
+            <a:r>
+              <a:rPr lang="en-US" dirty="0"/>
+              <a:t>Time Module</a:t>
+            </a:r>
+            <a:endParaRPr lang="ru-RU" dirty="0"/>
+          </a:p>
+        </p:txBody>
+      </p:sp>
+      <p:sp>
+        <p:nvSpPr>
+          <p:cNvPr id="3" name="Объект 2">
+            <a:extLst>
+              <a:ext uri="{FF2B5EF4-FFF2-40B4-BE49-F238E27FC236}">
+                <a16:creationId xmlns:a16="http://schemas.microsoft.com/office/drawing/2014/main" id="{118C1045-833B-4B88-9224-95DF613F8FC3}"/>
+              </a:ext>
+            </a:extLst>
+          </p:cNvPr>
+          <p:cNvSpPr>
+            <a:spLocks noGrp="1"/>
+          </p:cNvSpPr>
+          <p:nvPr>
+            <p:ph idx="1"/>
+          </p:nvPr>
+        </p:nvSpPr>
+        <p:spPr>
+          <a:xfrm>
+            <a:off x="838200" y="1825625"/>
+            <a:ext cx="5681870" cy="4310132"/>
+          </a:xfrm>
+        </p:spPr>
+        <p:txBody>
+          <a:bodyPr>
+            <a:normAutofit fontScale="77500" lnSpcReduction="20000"/>
+          </a:bodyPr>
+          <a:lstStyle/>
+          <a:p>
+            <a:r>
+              <a:rPr lang="en-US" dirty="0"/>
+              <a:t>This module to work with time in seconds since 1 January 1970 (UTC).</a:t>
+            </a:r>
+          </a:p>
+          <a:p>
+            <a:r>
+              <a:rPr lang="en-US" dirty="0">
+                <a:solidFill>
+                  <a:srgbClr val="FF0000"/>
+                </a:solidFill>
+              </a:rPr>
+              <a:t>time() </a:t>
+            </a:r>
+            <a:r>
+              <a:rPr lang="en-US" dirty="0"/>
+              <a:t>– get time since 1 January 1970.</a:t>
+            </a:r>
+          </a:p>
+          <a:p>
+            <a:r>
+              <a:rPr lang="en-US" dirty="0" err="1">
+                <a:solidFill>
+                  <a:srgbClr val="FF0000"/>
+                </a:solidFill>
+              </a:rPr>
+              <a:t>ctime</a:t>
+            </a:r>
+            <a:r>
+              <a:rPr lang="en-US" dirty="0">
+                <a:solidFill>
+                  <a:srgbClr val="FF0000"/>
+                </a:solidFill>
+              </a:rPr>
+              <a:t>(seconds) </a:t>
+            </a:r>
+            <a:r>
+              <a:rPr lang="en-US" dirty="0"/>
+              <a:t>– get time since given seconds</a:t>
+            </a:r>
+          </a:p>
+          <a:p>
+            <a:r>
+              <a:rPr lang="en-US" dirty="0">
+                <a:solidFill>
+                  <a:srgbClr val="FF0000"/>
+                </a:solidFill>
+              </a:rPr>
+              <a:t>sleep(seconds) </a:t>
+            </a:r>
+            <a:r>
+              <a:rPr lang="en-US" dirty="0"/>
+              <a:t>– stop the current program on given seconds</a:t>
+            </a:r>
+          </a:p>
+          <a:p>
+            <a:r>
+              <a:rPr lang="en-US" dirty="0" err="1">
+                <a:solidFill>
+                  <a:srgbClr val="FF0000"/>
+                </a:solidFill>
+              </a:rPr>
+              <a:t>gmtime</a:t>
+            </a:r>
+            <a:r>
+              <a:rPr lang="en-US" dirty="0">
+                <a:solidFill>
+                  <a:srgbClr val="FF0000"/>
+                </a:solidFill>
+              </a:rPr>
+              <a:t>(seconds) </a:t>
+            </a:r>
+            <a:r>
+              <a:rPr lang="en-US" dirty="0"/>
+              <a:t>– takes seconds and returns </a:t>
+            </a:r>
+            <a:r>
+              <a:rPr lang="en-US" dirty="0" err="1"/>
+              <a:t>struct_time</a:t>
+            </a:r>
+            <a:r>
+              <a:rPr lang="en-US" dirty="0"/>
+              <a:t>  </a:t>
+            </a:r>
+          </a:p>
+          <a:p>
+            <a:r>
+              <a:rPr lang="en-US" dirty="0" err="1">
+                <a:solidFill>
+                  <a:srgbClr val="FF0000"/>
+                </a:solidFill>
+              </a:rPr>
+              <a:t>mktime</a:t>
+            </a:r>
+            <a:r>
+              <a:rPr lang="en-US" dirty="0">
+                <a:solidFill>
+                  <a:srgbClr val="FF0000"/>
+                </a:solidFill>
+              </a:rPr>
+              <a:t>(</a:t>
+            </a:r>
+            <a:r>
+              <a:rPr lang="en-US" dirty="0" err="1">
+                <a:solidFill>
+                  <a:srgbClr val="FF0000"/>
+                </a:solidFill>
+              </a:rPr>
+              <a:t>struct_time</a:t>
+            </a:r>
+            <a:r>
+              <a:rPr lang="en-US" dirty="0">
+                <a:solidFill>
+                  <a:srgbClr val="FF0000"/>
+                </a:solidFill>
+              </a:rPr>
+              <a:t> or tuple) </a:t>
+            </a:r>
+            <a:r>
+              <a:rPr lang="en-US" dirty="0"/>
+              <a:t>– takes </a:t>
+            </a:r>
+            <a:r>
+              <a:rPr lang="en-US" dirty="0" err="1"/>
+              <a:t>struct_time</a:t>
+            </a:r>
+            <a:r>
+              <a:rPr lang="en-US" dirty="0"/>
+              <a:t> or tuple with 9 value according </a:t>
+            </a:r>
+            <a:r>
+              <a:rPr lang="en-US" dirty="0" err="1"/>
+              <a:t>struct_time</a:t>
+            </a:r>
+            <a:r>
+              <a:rPr lang="en-US" dirty="0"/>
+              <a:t>. Returns a seconds since 1 January 1970</a:t>
+            </a:r>
+          </a:p>
+          <a:p>
+            <a:r>
+              <a:rPr lang="en-US" dirty="0" err="1">
+                <a:solidFill>
+                  <a:srgbClr val="FF0000"/>
+                </a:solidFill>
+              </a:rPr>
+              <a:t>asctime</a:t>
+            </a:r>
+            <a:r>
+              <a:rPr lang="en-US" dirty="0">
+                <a:solidFill>
+                  <a:srgbClr val="FF0000"/>
+                </a:solidFill>
+              </a:rPr>
+              <a:t>(</a:t>
+            </a:r>
+            <a:r>
+              <a:rPr lang="en-US" dirty="0" err="1">
+                <a:solidFill>
+                  <a:srgbClr val="FF0000"/>
+                </a:solidFill>
+              </a:rPr>
+              <a:t>struct_time</a:t>
+            </a:r>
+            <a:r>
+              <a:rPr lang="en-US" dirty="0">
+                <a:solidFill>
+                  <a:srgbClr val="FF0000"/>
+                </a:solidFill>
+              </a:rPr>
+              <a:t> or tuple) </a:t>
+            </a:r>
+            <a:r>
+              <a:rPr lang="en-US" dirty="0"/>
+              <a:t>– returns a date string </a:t>
+            </a:r>
+          </a:p>
+        </p:txBody>
+      </p:sp>
+      <p:pic>
+        <p:nvPicPr>
+          <p:cNvPr id="5" name="Рисунок 4">
+            <a:extLst>
+              <a:ext uri="{FF2B5EF4-FFF2-40B4-BE49-F238E27FC236}">
+                <a16:creationId xmlns:a16="http://schemas.microsoft.com/office/drawing/2014/main" id="{DB84399E-E54C-46A4-8548-D6ADA1360710}"/>
+              </a:ext>
+            </a:extLst>
+          </p:cNvPr>
+          <p:cNvPicPr>
+            <a:picLocks noChangeAspect="1"/>
+          </p:cNvPicPr>
+          <p:nvPr/>
+        </p:nvPicPr>
+        <p:blipFill>
+          <a:blip r:embed="rId2"/>
+          <a:stretch>
+            <a:fillRect/>
+          </a:stretch>
+        </p:blipFill>
+        <p:spPr>
+          <a:xfrm>
+            <a:off x="7403409" y="2444750"/>
+            <a:ext cx="3295650" cy="4048125"/>
+          </a:xfrm>
+          <a:prstGeom prst="rect">
+            <a:avLst/>
+          </a:prstGeom>
+        </p:spPr>
+      </p:pic>
+      <p:sp>
+        <p:nvSpPr>
+          <p:cNvPr id="6" name="TextBox 5">
+            <a:extLst>
+              <a:ext uri="{FF2B5EF4-FFF2-40B4-BE49-F238E27FC236}">
+                <a16:creationId xmlns:a16="http://schemas.microsoft.com/office/drawing/2014/main" id="{72DD17B8-EECC-49CB-9B93-25B523902167}"/>
+              </a:ext>
+            </a:extLst>
+          </p:cNvPr>
+          <p:cNvSpPr txBox="1"/>
+          <p:nvPr/>
+        </p:nvSpPr>
+        <p:spPr>
+          <a:xfrm>
+            <a:off x="7103165" y="1467555"/>
+            <a:ext cx="4250635" cy="1200329"/>
+          </a:xfrm>
+          <a:prstGeom prst="rect">
+            <a:avLst/>
+          </a:prstGeom>
+          <a:noFill/>
+        </p:spPr>
+        <p:txBody>
+          <a:bodyPr wrap="square" rtlCol="0">
+            <a:spAutoFit/>
+          </a:bodyPr>
+          <a:lstStyle/>
+          <a:p>
+            <a:r>
+              <a:rPr lang="en-US" dirty="0"/>
+              <a:t>Some function in time module takes a </a:t>
+            </a:r>
+            <a:r>
+              <a:rPr lang="en-US" dirty="0" err="1"/>
+              <a:t>time.struct_time</a:t>
+            </a:r>
+            <a:r>
+              <a:rPr lang="en-US" dirty="0"/>
+              <a:t> as argument. Object </a:t>
+            </a:r>
+            <a:r>
+              <a:rPr lang="en-US" dirty="0" err="1"/>
+              <a:t>time.struct_time</a:t>
+            </a:r>
+            <a:r>
+              <a:rPr lang="en-US" dirty="0"/>
+              <a:t> contains:</a:t>
+            </a:r>
+            <a:endParaRPr lang="ru-RU" dirty="0"/>
+          </a:p>
+          <a:p>
+            <a:endParaRPr lang="ru-RU" dirty="0"/>
+          </a:p>
+        </p:txBody>
+      </p:sp>
+    </p:spTree>
+    <p:extLst>
+      <p:ext uri="{BB962C8B-B14F-4D97-AF65-F5344CB8AC3E}">
+        <p14:creationId xmlns:p14="http://schemas.microsoft.com/office/powerpoint/2010/main" val="748414170"/>
+      </p:ext>
+    </p:extLst>
+  </p:cSld>
+  <p:clrMapOvr>
+    <a:masterClrMapping/>
+  </p:clrMapOvr>
+</p:sld>
+</file>
+
+<file path=ppt/slides/slide71.xml><?xml version="1.0" encoding="utf-8"?>
+<p:sld xmlns:a="http://schemas.openxmlformats.org/drawingml/2006/main" xmlns:r="http://schemas.openxmlformats.org/officeDocument/2006/relationships" xmlns:p="http://schemas.openxmlformats.org/presentationml/2006/main">
+  <p:cSld>
+    <p:spTree>
+      <p:nvGrpSpPr>
+        <p:cNvPr id="1" name=""/>
+        <p:cNvGrpSpPr/>
+        <p:nvPr/>
+      </p:nvGrpSpPr>
+      <p:grpSpPr>
+        <a:xfrm>
+          <a:off x="0" y="0"/>
+          <a:ext cx="0" cy="0"/>
+          <a:chOff x="0" y="0"/>
+          <a:chExt cx="0" cy="0"/>
+        </a:xfrm>
+      </p:grpSpPr>
+      <p:sp>
+        <p:nvSpPr>
+          <p:cNvPr id="2" name="Заголовок 1">
+            <a:extLst>
+              <a:ext uri="{FF2B5EF4-FFF2-40B4-BE49-F238E27FC236}">
+                <a16:creationId xmlns:a16="http://schemas.microsoft.com/office/drawing/2014/main" id="{57BA446A-45FF-4313-82B4-14488D9B51BA}"/>
+              </a:ext>
+            </a:extLst>
+          </p:cNvPr>
+          <p:cNvSpPr>
+            <a:spLocks noGrp="1"/>
+          </p:cNvSpPr>
+          <p:nvPr>
+            <p:ph type="title"/>
+          </p:nvPr>
+        </p:nvSpPr>
+        <p:spPr/>
+        <p:txBody>
+          <a:bodyPr/>
+          <a:lstStyle/>
+          <a:p>
+            <a:pPr algn="ctr"/>
+            <a:r>
+              <a:rPr lang="en-US" dirty="0"/>
+              <a:t>Time module - examples</a:t>
+            </a:r>
+            <a:endParaRPr lang="ru-RU" dirty="0"/>
+          </a:p>
+        </p:txBody>
+      </p:sp>
+      <p:pic>
+        <p:nvPicPr>
+          <p:cNvPr id="4" name="Рисунок 3">
+            <a:extLst>
+              <a:ext uri="{FF2B5EF4-FFF2-40B4-BE49-F238E27FC236}">
+                <a16:creationId xmlns:a16="http://schemas.microsoft.com/office/drawing/2014/main" id="{0381F4BA-0E1C-4252-9306-1C12CBD44571}"/>
+              </a:ext>
+            </a:extLst>
+          </p:cNvPr>
+          <p:cNvPicPr>
+            <a:picLocks noChangeAspect="1"/>
+          </p:cNvPicPr>
+          <p:nvPr/>
+        </p:nvPicPr>
+        <p:blipFill>
+          <a:blip r:embed="rId2"/>
+          <a:stretch>
+            <a:fillRect/>
+          </a:stretch>
+        </p:blipFill>
+        <p:spPr>
+          <a:xfrm>
+            <a:off x="4604922" y="1537555"/>
+            <a:ext cx="3253616" cy="5121662"/>
+          </a:xfrm>
+          <a:prstGeom prst="rect">
+            <a:avLst/>
+          </a:prstGeom>
+        </p:spPr>
+      </p:pic>
+    </p:spTree>
+    <p:extLst>
+      <p:ext uri="{BB962C8B-B14F-4D97-AF65-F5344CB8AC3E}">
+        <p14:creationId xmlns:p14="http://schemas.microsoft.com/office/powerpoint/2010/main" val="1817072386"/>
+      </p:ext>
+    </p:extLst>
+  </p:cSld>
+  <p:clrMapOvr>
+    <a:masterClrMapping/>
+  </p:clrMapOvr>
+</p:sld>
+</file>
+
+<file path=ppt/slides/slide72.xml><?xml version="1.0" encoding="utf-8"?>
+<p:sld xmlns:a="http://schemas.openxmlformats.org/drawingml/2006/main" xmlns:r="http://schemas.openxmlformats.org/officeDocument/2006/relationships" xmlns:p="http://schemas.openxmlformats.org/presentationml/2006/main">
+  <p:cSld>
+    <p:spTree>
+      <p:nvGrpSpPr>
+        <p:cNvPr id="1" name=""/>
+        <p:cNvGrpSpPr/>
+        <p:nvPr/>
+      </p:nvGrpSpPr>
+      <p:grpSpPr>
+        <a:xfrm>
+          <a:off x="0" y="0"/>
+          <a:ext cx="0" cy="0"/>
+          <a:chOff x="0" y="0"/>
+          <a:chExt cx="0" cy="0"/>
+        </a:xfrm>
+      </p:grpSpPr>
+      <p:sp>
+        <p:nvSpPr>
+          <p:cNvPr id="4" name="Прямоугольник 3">
+            <a:extLst>
+              <a:ext uri="{FF2B5EF4-FFF2-40B4-BE49-F238E27FC236}">
+                <a16:creationId xmlns:a16="http://schemas.microsoft.com/office/drawing/2014/main" id="{97A24814-6928-4339-BB62-03DD3E86D9A7}"/>
+              </a:ext>
+            </a:extLst>
+          </p:cNvPr>
+          <p:cNvSpPr/>
+          <p:nvPr/>
+        </p:nvSpPr>
+        <p:spPr>
+          <a:xfrm>
+            <a:off x="4094922" y="967409"/>
+            <a:ext cx="4028661" cy="318052"/>
+          </a:xfrm>
+          <a:prstGeom prst="rect">
+            <a:avLst/>
+          </a:prstGeom>
+          <a:solidFill>
+            <a:srgbClr val="65F8FF"/>
+          </a:solidFill>
+          <a:ln>
+            <a:solidFill>
+              <a:srgbClr val="65F8FF"/>
+            </a:solidFill>
+          </a:ln>
+        </p:spPr>
+        <p:style>
+          <a:lnRef idx="2">
+            <a:schemeClr val="accent1">
+              <a:shade val="50000"/>
+            </a:schemeClr>
+          </a:lnRef>
+          <a:fillRef idx="1">
+            <a:schemeClr val="accent1"/>
+          </a:fillRef>
+          <a:effectRef idx="0">
+            <a:schemeClr val="accent1"/>
+          </a:effectRef>
+          <a:fontRef idx="minor">
+            <a:schemeClr val="lt1"/>
+          </a:fontRef>
+        </p:style>
+        <p:txBody>
+          <a:bodyPr rtlCol="0" anchor="ctr"/>
+          <a:lstStyle/>
+          <a:p>
+            <a:pPr algn="ctr"/>
+            <a:endParaRPr lang="ru-RU"/>
+          </a:p>
+        </p:txBody>
+      </p:sp>
+      <p:sp>
+        <p:nvSpPr>
+          <p:cNvPr id="2" name="Заголовок 1">
+            <a:extLst>
+              <a:ext uri="{FF2B5EF4-FFF2-40B4-BE49-F238E27FC236}">
+                <a16:creationId xmlns:a16="http://schemas.microsoft.com/office/drawing/2014/main" id="{C541DFEB-0AFB-4681-9A3D-EE79792F36BE}"/>
+              </a:ext>
+            </a:extLst>
+          </p:cNvPr>
+          <p:cNvSpPr>
+            <a:spLocks noGrp="1"/>
+          </p:cNvSpPr>
+          <p:nvPr>
+            <p:ph type="title"/>
+          </p:nvPr>
+        </p:nvSpPr>
+        <p:spPr/>
+        <p:txBody>
+          <a:bodyPr/>
+          <a:lstStyle/>
+          <a:p>
+            <a:pPr algn="ctr"/>
+            <a:r>
+              <a:rPr lang="en-US" dirty="0"/>
+              <a:t>Datetime Module</a:t>
+            </a:r>
+            <a:endParaRPr lang="ru-RU" dirty="0"/>
+          </a:p>
+        </p:txBody>
+      </p:sp>
+      <p:sp>
+        <p:nvSpPr>
+          <p:cNvPr id="3" name="Объект 2">
+            <a:extLst>
+              <a:ext uri="{FF2B5EF4-FFF2-40B4-BE49-F238E27FC236}">
+                <a16:creationId xmlns:a16="http://schemas.microsoft.com/office/drawing/2014/main" id="{1BE683D3-D90B-4E38-9DD5-9863E9D78B09}"/>
+              </a:ext>
+            </a:extLst>
+          </p:cNvPr>
+          <p:cNvSpPr>
+            <a:spLocks noGrp="1"/>
+          </p:cNvSpPr>
+          <p:nvPr>
+            <p:ph idx="1"/>
+          </p:nvPr>
+        </p:nvSpPr>
+        <p:spPr>
+          <a:xfrm>
+            <a:off x="838200" y="1825624"/>
+            <a:ext cx="6543261" cy="4853472"/>
+          </a:xfrm>
+        </p:spPr>
+        <p:txBody>
+          <a:bodyPr>
+            <a:normAutofit fontScale="77500" lnSpcReduction="20000"/>
+          </a:bodyPr>
+          <a:lstStyle/>
+          <a:p>
+            <a:r>
+              <a:rPr lang="en-US" dirty="0"/>
+              <a:t>This module is for works with a custom date. It’s different from time and provides you comfortable methods to work with dates, for a case, math operation with a date. Basic usage is working with an instance of datetime, but also the module has a date, time and other classes. We will work only with datetime, because it includes both date and time. </a:t>
+            </a:r>
+          </a:p>
+          <a:p>
+            <a:r>
+              <a:rPr lang="en-US" dirty="0" err="1">
+                <a:solidFill>
+                  <a:srgbClr val="FF0000"/>
+                </a:solidFill>
+              </a:rPr>
+              <a:t>datetime.now</a:t>
+            </a:r>
+            <a:r>
+              <a:rPr lang="en-US" dirty="0">
+                <a:solidFill>
+                  <a:srgbClr val="FF0000"/>
+                </a:solidFill>
+              </a:rPr>
+              <a:t>()</a:t>
+            </a:r>
+            <a:r>
+              <a:rPr lang="en-US" dirty="0"/>
+              <a:t> – this method you may use without creation datetime. It returns a current date. And creates instance of datetime</a:t>
+            </a:r>
+          </a:p>
+          <a:p>
+            <a:r>
+              <a:rPr lang="en-US" dirty="0">
+                <a:solidFill>
+                  <a:srgbClr val="FF0000"/>
+                </a:solidFill>
+              </a:rPr>
+              <a:t>datetime(year, month, day, [hour], [minute], [second], [millisecond]) </a:t>
+            </a:r>
+            <a:r>
+              <a:rPr lang="en-US" dirty="0"/>
+              <a:t>– basic instance of datetime requires only 3 arguments, but you may provide an additional arguments. </a:t>
+            </a:r>
+          </a:p>
+          <a:p>
+            <a:r>
+              <a:rPr lang="en-US" dirty="0"/>
+              <a:t>datetime has many properties and functions, there are some of them – </a:t>
+            </a:r>
+            <a:r>
+              <a:rPr lang="en-US" dirty="0">
+                <a:solidFill>
+                  <a:srgbClr val="FF0000"/>
+                </a:solidFill>
+              </a:rPr>
+              <a:t>time(), date(), weekday(), year, month, day, hour, minute, second, millisecond</a:t>
+            </a:r>
+          </a:p>
+        </p:txBody>
+      </p:sp>
+      <p:pic>
+        <p:nvPicPr>
+          <p:cNvPr id="5" name="Рисунок 4">
+            <a:extLst>
+              <a:ext uri="{FF2B5EF4-FFF2-40B4-BE49-F238E27FC236}">
+                <a16:creationId xmlns:a16="http://schemas.microsoft.com/office/drawing/2014/main" id="{36FDE4CF-0DDC-4C63-9AE6-EA177716A687}"/>
+              </a:ext>
+            </a:extLst>
+          </p:cNvPr>
+          <p:cNvPicPr>
+            <a:picLocks noChangeAspect="1"/>
+          </p:cNvPicPr>
+          <p:nvPr/>
+        </p:nvPicPr>
+        <p:blipFill>
+          <a:blip r:embed="rId2"/>
+          <a:stretch>
+            <a:fillRect/>
+          </a:stretch>
+        </p:blipFill>
+        <p:spPr>
+          <a:xfrm>
+            <a:off x="7381461" y="1933575"/>
+            <a:ext cx="4516800" cy="2318785"/>
+          </a:xfrm>
+          <a:prstGeom prst="rect">
+            <a:avLst/>
+          </a:prstGeom>
+        </p:spPr>
+      </p:pic>
+      <p:pic>
+        <p:nvPicPr>
+          <p:cNvPr id="6" name="Рисунок 5">
+            <a:extLst>
+              <a:ext uri="{FF2B5EF4-FFF2-40B4-BE49-F238E27FC236}">
+                <a16:creationId xmlns:a16="http://schemas.microsoft.com/office/drawing/2014/main" id="{C049C72D-C738-4BE7-A67E-AED21C0347B1}"/>
+              </a:ext>
+            </a:extLst>
+          </p:cNvPr>
+          <p:cNvPicPr>
+            <a:picLocks noChangeAspect="1"/>
+          </p:cNvPicPr>
+          <p:nvPr/>
+        </p:nvPicPr>
+        <p:blipFill>
+          <a:blip r:embed="rId3"/>
+          <a:stretch>
+            <a:fillRect/>
+          </a:stretch>
+        </p:blipFill>
+        <p:spPr>
+          <a:xfrm>
+            <a:off x="7381461" y="4922802"/>
+            <a:ext cx="4296007" cy="576849"/>
+          </a:xfrm>
+          <a:prstGeom prst="rect">
+            <a:avLst/>
+          </a:prstGeom>
+        </p:spPr>
+      </p:pic>
+    </p:spTree>
+    <p:extLst>
+      <p:ext uri="{BB962C8B-B14F-4D97-AF65-F5344CB8AC3E}">
+        <p14:creationId xmlns:p14="http://schemas.microsoft.com/office/powerpoint/2010/main" val="2560535571"/>
+      </p:ext>
+    </p:extLst>
+  </p:cSld>
+  <p:clrMapOvr>
+    <a:masterClrMapping/>
+  </p:clrMapOvr>
+</p:sld>
+</file>
+
+<file path=ppt/slides/slide73.xml><?xml version="1.0" encoding="utf-8"?>
+<p:sld xmlns:a="http://schemas.openxmlformats.org/drawingml/2006/main" xmlns:r="http://schemas.openxmlformats.org/officeDocument/2006/relationships" xmlns:p="http://schemas.openxmlformats.org/presentationml/2006/main">
+  <p:cSld>
+    <p:spTree>
+      <p:nvGrpSpPr>
+        <p:cNvPr id="1" name=""/>
+        <p:cNvGrpSpPr/>
+        <p:nvPr/>
+      </p:nvGrpSpPr>
+      <p:grpSpPr>
+        <a:xfrm>
+          <a:off x="0" y="0"/>
+          <a:ext cx="0" cy="0"/>
+          <a:chOff x="0" y="0"/>
+          <a:chExt cx="0" cy="0"/>
+        </a:xfrm>
+      </p:grpSpPr>
+      <p:sp>
+        <p:nvSpPr>
+          <p:cNvPr id="2" name="Заголовок 1">
+            <a:extLst>
+              <a:ext uri="{FF2B5EF4-FFF2-40B4-BE49-F238E27FC236}">
+                <a16:creationId xmlns:a16="http://schemas.microsoft.com/office/drawing/2014/main" id="{461BFDA6-D4B0-4794-BD01-5511A94228E8}"/>
+              </a:ext>
+            </a:extLst>
+          </p:cNvPr>
+          <p:cNvSpPr>
+            <a:spLocks noGrp="1"/>
+          </p:cNvSpPr>
+          <p:nvPr>
+            <p:ph type="title"/>
+          </p:nvPr>
+        </p:nvSpPr>
+        <p:spPr/>
+        <p:txBody>
+          <a:bodyPr/>
+          <a:lstStyle/>
+          <a:p>
+            <a:pPr algn="ctr"/>
+            <a:r>
+              <a:rPr lang="en-US" dirty="0"/>
+              <a:t>Datetime Operations</a:t>
+            </a:r>
+            <a:endParaRPr lang="ru-RU" dirty="0"/>
+          </a:p>
+        </p:txBody>
+      </p:sp>
+      <p:sp>
+        <p:nvSpPr>
+          <p:cNvPr id="3" name="Объект 2">
+            <a:extLst>
+              <a:ext uri="{FF2B5EF4-FFF2-40B4-BE49-F238E27FC236}">
+                <a16:creationId xmlns:a16="http://schemas.microsoft.com/office/drawing/2014/main" id="{7E6A0988-44F0-4277-9F11-60972BCCCA4B}"/>
+              </a:ext>
+            </a:extLst>
+          </p:cNvPr>
+          <p:cNvSpPr>
+            <a:spLocks noGrp="1"/>
+          </p:cNvSpPr>
+          <p:nvPr>
+            <p:ph idx="1"/>
+          </p:nvPr>
+        </p:nvSpPr>
+        <p:spPr>
+          <a:xfrm>
+            <a:off x="838200" y="1825625"/>
+            <a:ext cx="6384235" cy="4495662"/>
+          </a:xfrm>
+        </p:spPr>
+        <p:txBody>
+          <a:bodyPr>
+            <a:normAutofit lnSpcReduction="10000"/>
+          </a:bodyPr>
+          <a:lstStyle/>
+          <a:p>
+            <a:r>
+              <a:rPr lang="en-US" dirty="0"/>
+              <a:t>Besides class datetime the module has class </a:t>
+            </a:r>
+            <a:r>
+              <a:rPr lang="en-US" dirty="0" err="1"/>
+              <a:t>timedelta</a:t>
+            </a:r>
+            <a:r>
+              <a:rPr lang="en-US" dirty="0"/>
+              <a:t>. This reflects time changes.</a:t>
+            </a:r>
+          </a:p>
+          <a:p>
+            <a:r>
+              <a:rPr lang="en-US" dirty="0" err="1"/>
+              <a:t>timedelta</a:t>
+            </a:r>
+            <a:r>
+              <a:rPr lang="en-US" dirty="0"/>
+              <a:t>([weeks],[days], [hours], [minutes], [seconds], [milliseconds])  - create a </a:t>
+            </a:r>
+            <a:r>
+              <a:rPr lang="en-US" dirty="0" err="1"/>
+              <a:t>timedelta</a:t>
+            </a:r>
+            <a:r>
+              <a:rPr lang="en-US" dirty="0"/>
+              <a:t> instance. You may provide a additional data, but may create without arguments at all</a:t>
+            </a:r>
+          </a:p>
+          <a:p>
+            <a:r>
+              <a:rPr lang="en-US" dirty="0"/>
+              <a:t>But there is another way to create </a:t>
+            </a:r>
+            <a:r>
+              <a:rPr lang="en-US" dirty="0" err="1"/>
+              <a:t>timedelta</a:t>
+            </a:r>
+            <a:r>
+              <a:rPr lang="en-US" dirty="0"/>
+              <a:t>. When we try to add or subtract</a:t>
+            </a:r>
+            <a:r>
+              <a:rPr lang="ru-RU" dirty="0"/>
+              <a:t> </a:t>
+            </a:r>
+            <a:r>
+              <a:rPr lang="en-US" dirty="0"/>
+              <a:t>datetime with datetime or </a:t>
+            </a:r>
+            <a:r>
+              <a:rPr lang="en-US" dirty="0" err="1"/>
+              <a:t>timedelta</a:t>
+            </a:r>
+            <a:r>
+              <a:rPr lang="en-US" dirty="0"/>
+              <a:t> it return to us </a:t>
+            </a:r>
+            <a:r>
+              <a:rPr lang="en-US" dirty="0" err="1"/>
+              <a:t>timedelta</a:t>
+            </a:r>
+            <a:r>
+              <a:rPr lang="en-US" dirty="0"/>
+              <a:t> object</a:t>
+            </a:r>
+            <a:endParaRPr lang="ru-RU" dirty="0"/>
+          </a:p>
+        </p:txBody>
+      </p:sp>
+      <p:pic>
+        <p:nvPicPr>
+          <p:cNvPr id="5" name="Рисунок 4">
+            <a:extLst>
+              <a:ext uri="{FF2B5EF4-FFF2-40B4-BE49-F238E27FC236}">
+                <a16:creationId xmlns:a16="http://schemas.microsoft.com/office/drawing/2014/main" id="{90A1A416-CB0F-4649-B6E0-3A51FAC6E862}"/>
+              </a:ext>
+            </a:extLst>
+          </p:cNvPr>
+          <p:cNvPicPr>
+            <a:picLocks noChangeAspect="1"/>
+          </p:cNvPicPr>
+          <p:nvPr/>
+        </p:nvPicPr>
+        <p:blipFill>
+          <a:blip r:embed="rId2"/>
+          <a:stretch>
+            <a:fillRect/>
+          </a:stretch>
+        </p:blipFill>
+        <p:spPr>
+          <a:xfrm>
+            <a:off x="7667831" y="2161760"/>
+            <a:ext cx="3902520" cy="1267239"/>
+          </a:xfrm>
+          <a:prstGeom prst="rect">
+            <a:avLst/>
+          </a:prstGeom>
+        </p:spPr>
+      </p:pic>
+      <p:pic>
+        <p:nvPicPr>
+          <p:cNvPr id="6" name="Рисунок 5">
+            <a:extLst>
+              <a:ext uri="{FF2B5EF4-FFF2-40B4-BE49-F238E27FC236}">
+                <a16:creationId xmlns:a16="http://schemas.microsoft.com/office/drawing/2014/main" id="{57B83049-85BD-4807-B57E-3A8EC1D66FA2}"/>
+              </a:ext>
+            </a:extLst>
+          </p:cNvPr>
+          <p:cNvPicPr>
+            <a:picLocks noChangeAspect="1"/>
+          </p:cNvPicPr>
+          <p:nvPr/>
+        </p:nvPicPr>
+        <p:blipFill>
+          <a:blip r:embed="rId3"/>
+          <a:stretch>
+            <a:fillRect/>
+          </a:stretch>
+        </p:blipFill>
+        <p:spPr>
+          <a:xfrm>
+            <a:off x="7667831" y="3636993"/>
+            <a:ext cx="3098472" cy="526156"/>
+          </a:xfrm>
+          <a:prstGeom prst="rect">
+            <a:avLst/>
+          </a:prstGeom>
+        </p:spPr>
+      </p:pic>
+      <p:pic>
+        <p:nvPicPr>
+          <p:cNvPr id="7" name="Рисунок 6">
+            <a:extLst>
+              <a:ext uri="{FF2B5EF4-FFF2-40B4-BE49-F238E27FC236}">
+                <a16:creationId xmlns:a16="http://schemas.microsoft.com/office/drawing/2014/main" id="{FBD68C82-A222-4C70-B9EC-85E265869D92}"/>
+              </a:ext>
+            </a:extLst>
+          </p:cNvPr>
+          <p:cNvPicPr>
+            <a:picLocks noChangeAspect="1"/>
+          </p:cNvPicPr>
+          <p:nvPr/>
+        </p:nvPicPr>
+        <p:blipFill>
+          <a:blip r:embed="rId4"/>
+          <a:stretch>
+            <a:fillRect/>
+          </a:stretch>
+        </p:blipFill>
+        <p:spPr>
+          <a:xfrm>
+            <a:off x="7667831" y="4371143"/>
+            <a:ext cx="2337560" cy="1082659"/>
+          </a:xfrm>
+          <a:prstGeom prst="rect">
+            <a:avLst/>
+          </a:prstGeom>
+        </p:spPr>
+      </p:pic>
+    </p:spTree>
+    <p:extLst>
+      <p:ext uri="{BB962C8B-B14F-4D97-AF65-F5344CB8AC3E}">
+        <p14:creationId xmlns:p14="http://schemas.microsoft.com/office/powerpoint/2010/main" val="1464963545"/>
+      </p:ext>
+    </p:extLst>
+  </p:cSld>
+  <p:clrMapOvr>
+    <a:masterClrMapping/>
+  </p:clrMapOvr>
+</p:sld>
+</file>
+
+<file path=ppt/slides/slide74.xml><?xml version="1.0" encoding="utf-8"?>
+<p:sld xmlns:a="http://schemas.openxmlformats.org/drawingml/2006/main" xmlns:r="http://schemas.openxmlformats.org/officeDocument/2006/relationships" xmlns:p="http://schemas.openxmlformats.org/presentationml/2006/main">
+  <p:cSld>
+    <p:spTree>
+      <p:nvGrpSpPr>
+        <p:cNvPr id="1" name=""/>
+        <p:cNvGrpSpPr/>
+        <p:nvPr/>
+      </p:nvGrpSpPr>
+      <p:grpSpPr>
+        <a:xfrm>
+          <a:off x="0" y="0"/>
+          <a:ext cx="0" cy="0"/>
+          <a:chOff x="0" y="0"/>
+          <a:chExt cx="0" cy="0"/>
+        </a:xfrm>
+      </p:grpSpPr>
+      <p:sp>
+        <p:nvSpPr>
+          <p:cNvPr id="3" name="Содержимое 2"/>
+          <p:cNvSpPr>
+            <a:spLocks noGrp="1"/>
+          </p:cNvSpPr>
+          <p:nvPr>
+            <p:ph idx="1"/>
+          </p:nvPr>
+        </p:nvSpPr>
+        <p:spPr>
+          <a:xfrm>
+            <a:off x="914400" y="1499616"/>
+            <a:ext cx="10439400" cy="5358384"/>
+          </a:xfrm>
+        </p:spPr>
+        <p:txBody>
+          <a:bodyPr>
+            <a:normAutofit/>
+          </a:bodyPr>
+          <a:lstStyle/>
+          <a:p>
+            <a:pPr marL="514350" indent="-514350">
+              <a:buFont typeface="+mj-lt"/>
+              <a:buAutoNum type="arabicPeriod"/>
+            </a:pPr>
+            <a:r>
+              <a:rPr lang="en-US" dirty="0"/>
+              <a:t>Write a benchmark decorator that counts how many time a function uses for calculation </a:t>
+            </a:r>
+            <a:endParaRPr lang="ru-RU" dirty="0"/>
+          </a:p>
+          <a:p>
+            <a:pPr marL="514350" indent="-514350">
+              <a:buFont typeface="+mj-lt"/>
+              <a:buAutoNum type="arabicPeriod"/>
+            </a:pPr>
+            <a:r>
+              <a:rPr lang="en-US" dirty="0"/>
+              <a:t>Write a program that counts how many days the user lives.</a:t>
+            </a:r>
+          </a:p>
+          <a:p>
+            <a:pPr lvl="1"/>
+            <a:r>
+              <a:rPr lang="en-US" dirty="0"/>
+              <a:t>Ask from user a day, month, and year</a:t>
+            </a:r>
+          </a:p>
+          <a:p>
+            <a:pPr lvl="1"/>
+            <a:r>
+              <a:rPr lang="en-US" dirty="0"/>
+              <a:t>Print how many days the user lives.</a:t>
+            </a:r>
+          </a:p>
+          <a:p>
+            <a:pPr marL="514350" indent="-514350">
+              <a:buFont typeface="+mj-lt"/>
+              <a:buAutoNum type="arabicPeriod"/>
+            </a:pPr>
+            <a:r>
+              <a:rPr lang="en-US" dirty="0"/>
+              <a:t>User want to get a random date from the past.</a:t>
+            </a:r>
+          </a:p>
+          <a:p>
+            <a:pPr lvl="1"/>
+            <a:r>
+              <a:rPr lang="en-US" dirty="0"/>
+              <a:t>Write a program that returns to the user a random date between 1 and 2021 years. </a:t>
+            </a:r>
+          </a:p>
+          <a:p>
+            <a:pPr lvl="1"/>
+            <a:r>
+              <a:rPr lang="en-US" dirty="0"/>
+              <a:t>A date and month also a random</a:t>
+            </a:r>
+          </a:p>
+        </p:txBody>
+      </p:sp>
+      <p:grpSp>
+        <p:nvGrpSpPr>
+          <p:cNvPr id="2" name="Группа 3"/>
+          <p:cNvGrpSpPr/>
+          <p:nvPr/>
+        </p:nvGrpSpPr>
+        <p:grpSpPr>
+          <a:xfrm>
+            <a:off x="838200" y="365125"/>
+            <a:ext cx="10515600" cy="1325563"/>
+            <a:chOff x="838200" y="365125"/>
+            <a:chExt cx="10515600" cy="1325563"/>
+          </a:xfrm>
+        </p:grpSpPr>
+        <p:sp>
+          <p:nvSpPr>
+            <p:cNvPr id="5" name="Заголовок 1"/>
+            <p:cNvSpPr txBox="1">
+              <a:spLocks/>
+            </p:cNvSpPr>
+            <p:nvPr/>
+          </p:nvSpPr>
+          <p:spPr>
+            <a:xfrm>
+              <a:off x="838200" y="365125"/>
+              <a:ext cx="10515600" cy="1325563"/>
+            </a:xfrm>
+            <a:prstGeom prst="rect">
+              <a:avLst/>
+            </a:prstGeom>
+          </p:spPr>
+          <p:txBody>
+            <a:bodyPr vert="horz" lIns="91440" tIns="45720" rIns="91440" bIns="45720" rtlCol="0" anchor="ctr">
+              <a:normAutofit/>
+            </a:bodyPr>
+            <a:lstStyle/>
+            <a:p>
+              <a:pPr marL="0" marR="0" lvl="0" indent="0" algn="ctr" defTabSz="914400" rtl="0" eaLnBrk="1" fontAlgn="auto" latinLnBrk="0" hangingPunct="1">
+                <a:lnSpc>
+                  <a:spcPct val="90000"/>
+                </a:lnSpc>
+                <a:spcBef>
+                  <a:spcPct val="0"/>
+                </a:spcBef>
+                <a:spcAft>
+                  <a:spcPts val="0"/>
+                </a:spcAft>
+                <a:buClrTx/>
+                <a:buSzTx/>
+                <a:buFontTx/>
+                <a:buNone/>
+                <a:tabLst/>
+                <a:defRPr/>
+              </a:pPr>
+              <a:r>
+                <a:rPr kumimoji="0" lang="en-US" sz="4400" b="1" i="0" u="none" strike="noStrike" kern="1200" cap="none" spc="0" normalizeH="0" baseline="0" noProof="0" dirty="0">
+                  <a:ln>
+                    <a:noFill/>
+                  </a:ln>
+                  <a:solidFill>
+                    <a:schemeClr val="tx1"/>
+                  </a:solidFill>
+                  <a:effectLst/>
+                  <a:uLnTx/>
+                  <a:uFillTx/>
+                  <a:latin typeface="+mj-lt"/>
+                  <a:ea typeface="+mj-ea"/>
+                  <a:cs typeface="+mj-cs"/>
+                </a:rPr>
+                <a:t>Tasks </a:t>
+              </a:r>
+              <a:endParaRPr kumimoji="0" lang="ru-RU" sz="4400" b="1" i="0" u="none" strike="noStrike" kern="1200" cap="none" spc="0" normalizeH="0" baseline="0" noProof="0" dirty="0">
+                <a:ln>
+                  <a:noFill/>
+                </a:ln>
+                <a:solidFill>
+                  <a:schemeClr val="tx1"/>
+                </a:solidFill>
+                <a:effectLst/>
+                <a:uLnTx/>
+                <a:uFillTx/>
+                <a:latin typeface="+mj-lt"/>
+                <a:ea typeface="+mj-ea"/>
+                <a:cs typeface="+mj-cs"/>
+              </a:endParaRPr>
+            </a:p>
+          </p:txBody>
+        </p:sp>
+        <p:pic>
+          <p:nvPicPr>
+            <p:cNvPr id="6" name="Picture 2" descr="Pin on Бесплатные иконки"/>
+            <p:cNvPicPr>
+              <a:picLocks noChangeAspect="1" noChangeArrowheads="1"/>
+            </p:cNvPicPr>
+            <p:nvPr/>
+          </p:nvPicPr>
+          <p:blipFill>
+            <a:blip r:embed="rId2" cstate="print"/>
+            <a:srcRect/>
+            <a:stretch>
+              <a:fillRect/>
+            </a:stretch>
+          </p:blipFill>
+          <p:spPr bwMode="auto">
+            <a:xfrm>
+              <a:off x="4672711" y="603504"/>
+              <a:ext cx="795401" cy="795401"/>
+            </a:xfrm>
+            <a:prstGeom prst="rect">
+              <a:avLst/>
+            </a:prstGeom>
+            <a:noFill/>
+          </p:spPr>
+        </p:pic>
+      </p:grpSp>
+    </p:spTree>
+    <p:extLst>
+      <p:ext uri="{BB962C8B-B14F-4D97-AF65-F5344CB8AC3E}">
+        <p14:creationId xmlns:p14="http://schemas.microsoft.com/office/powerpoint/2010/main" val="1464066488"/>
+      </p:ext>
+    </p:extLst>
+  </p:cSld>
+  <p:clrMapOvr>
+    <a:masterClrMapping/>
+  </p:clrMapOvr>
+</p:sld>
+</file>
+
+<file path=ppt/slides/slide75.xml><?xml version="1.0" encoding="utf-8"?>
+<p:sld xmlns:a="http://schemas.openxmlformats.org/drawingml/2006/main" xmlns:r="http://schemas.openxmlformats.org/officeDocument/2006/relationships" xmlns:p="http://schemas.openxmlformats.org/presentationml/2006/main">
+  <p:cSld>
+    <p:spTree>
+      <p:nvGrpSpPr>
+        <p:cNvPr id="1" name=""/>
+        <p:cNvGrpSpPr/>
+        <p:nvPr/>
+      </p:nvGrpSpPr>
+      <p:grpSpPr>
+        <a:xfrm>
+          <a:off x="0" y="0"/>
+          <a:ext cx="0" cy="0"/>
+          <a:chOff x="0" y="0"/>
+          <a:chExt cx="0" cy="0"/>
+        </a:xfrm>
+      </p:grpSpPr>
+      <p:sp>
+        <p:nvSpPr>
+          <p:cNvPr id="4" name="Прямоугольник 3">
+            <a:extLst>
+              <a:ext uri="{FF2B5EF4-FFF2-40B4-BE49-F238E27FC236}">
+                <a16:creationId xmlns:a16="http://schemas.microsoft.com/office/drawing/2014/main" id="{731D33C0-1CF9-497C-BC54-C55630B9D1D0}"/>
+              </a:ext>
+            </a:extLst>
+          </p:cNvPr>
+          <p:cNvSpPr/>
+          <p:nvPr/>
+        </p:nvSpPr>
+        <p:spPr>
+          <a:xfrm>
+            <a:off x="5565913" y="1007165"/>
+            <a:ext cx="1073426" cy="251792"/>
+          </a:xfrm>
+          <a:prstGeom prst="rect">
+            <a:avLst/>
+          </a:prstGeom>
+          <a:solidFill>
+            <a:srgbClr val="65F8FF"/>
+          </a:solidFill>
+          <a:ln>
+            <a:solidFill>
+              <a:srgbClr val="65F8FF"/>
+            </a:solidFill>
+          </a:ln>
+        </p:spPr>
+        <p:style>
+          <a:lnRef idx="2">
+            <a:schemeClr val="accent1">
+              <a:shade val="50000"/>
+            </a:schemeClr>
+          </a:lnRef>
+          <a:fillRef idx="1">
+            <a:schemeClr val="accent1"/>
+          </a:fillRef>
+          <a:effectRef idx="0">
+            <a:schemeClr val="accent1"/>
+          </a:effectRef>
+          <a:fontRef idx="minor">
+            <a:schemeClr val="lt1"/>
+          </a:fontRef>
+        </p:style>
+        <p:txBody>
+          <a:bodyPr rtlCol="0" anchor="ctr"/>
+          <a:lstStyle/>
+          <a:p>
+            <a:pPr algn="ctr"/>
+            <a:endParaRPr lang="ru-RU"/>
+          </a:p>
+        </p:txBody>
+      </p:sp>
+      <p:sp>
+        <p:nvSpPr>
+          <p:cNvPr id="2" name="Заголовок 1">
+            <a:extLst>
+              <a:ext uri="{FF2B5EF4-FFF2-40B4-BE49-F238E27FC236}">
+                <a16:creationId xmlns:a16="http://schemas.microsoft.com/office/drawing/2014/main" id="{5A4C9B28-8871-48A2-8A34-777FC4728060}"/>
+              </a:ext>
+            </a:extLst>
+          </p:cNvPr>
+          <p:cNvSpPr>
+            <a:spLocks noGrp="1"/>
+          </p:cNvSpPr>
+          <p:nvPr>
+            <p:ph type="title"/>
+          </p:nvPr>
+        </p:nvSpPr>
+        <p:spPr/>
+        <p:txBody>
+          <a:bodyPr/>
+          <a:lstStyle/>
+          <a:p>
+            <a:pPr algn="ctr"/>
+            <a:r>
+              <a:rPr lang="en-US" dirty="0"/>
+              <a:t>Files</a:t>
+            </a:r>
+            <a:endParaRPr lang="ru-RU" dirty="0"/>
+          </a:p>
+        </p:txBody>
+      </p:sp>
+      <p:sp>
+        <p:nvSpPr>
+          <p:cNvPr id="3" name="Объект 2">
+            <a:extLst>
+              <a:ext uri="{FF2B5EF4-FFF2-40B4-BE49-F238E27FC236}">
+                <a16:creationId xmlns:a16="http://schemas.microsoft.com/office/drawing/2014/main" id="{C7A8495E-158B-4F62-AF90-8419273D96F4}"/>
+              </a:ext>
+            </a:extLst>
+          </p:cNvPr>
+          <p:cNvSpPr>
+            <a:spLocks noGrp="1"/>
+          </p:cNvSpPr>
+          <p:nvPr>
+            <p:ph idx="1"/>
+          </p:nvPr>
+        </p:nvSpPr>
+        <p:spPr/>
+        <p:txBody>
+          <a:bodyPr>
+            <a:normAutofit fontScale="70000" lnSpcReduction="20000"/>
+          </a:bodyPr>
+          <a:lstStyle/>
+          <a:p>
+            <a:r>
+              <a:rPr lang="en-US" dirty="0"/>
+              <a:t>File handling is an important part of any programming language. In this part, we will work with txt files, but it is similar to other types of files.</a:t>
+            </a:r>
+          </a:p>
+          <a:p>
+            <a:r>
+              <a:rPr lang="en-US" dirty="0"/>
+              <a:t>The main function to work with files is open(). It takes a filename, mode, and buffering.</a:t>
+            </a:r>
+          </a:p>
+          <a:p>
+            <a:r>
+              <a:rPr lang="en-US" dirty="0"/>
+              <a:t>Filename – is the path to file or file itself if it placed in the same directory </a:t>
+            </a:r>
+          </a:p>
+          <a:p>
+            <a:r>
+              <a:rPr lang="en-US" dirty="0"/>
+              <a:t>Some of mode:</a:t>
+            </a:r>
+          </a:p>
+          <a:p>
+            <a:pPr lvl="1"/>
+            <a:r>
+              <a:rPr lang="en-US" dirty="0"/>
+              <a:t>'r' - reading mode. The default. It allows you only to read the file, not to modify it. When using this mode the file must exist. </a:t>
+            </a:r>
+          </a:p>
+          <a:p>
+            <a:pPr lvl="1"/>
+            <a:r>
+              <a:rPr lang="en-US" dirty="0"/>
+              <a:t>'w' - writing mode. It will create a new file if it does not exist, otherwise will erase the file and allow you to write to it.</a:t>
+            </a:r>
+          </a:p>
+          <a:p>
+            <a:pPr lvl="1"/>
+            <a:r>
+              <a:rPr lang="en-US" dirty="0"/>
+              <a:t> 'a' - append mode. It will write data to the end of the file. It does not erase the file, and the file must exist for this mode. </a:t>
+            </a:r>
+          </a:p>
+          <a:p>
+            <a:pPr lvl="1"/>
+            <a:r>
+              <a:rPr lang="en-US" dirty="0"/>
+              <a:t>'r+' - reading mode plus writing mode at the same time. This allows you to read and write into files at the same time without having to use r and w. </a:t>
+            </a:r>
+          </a:p>
+          <a:p>
+            <a:pPr lvl="1"/>
+            <a:r>
+              <a:rPr lang="en-US" dirty="0"/>
+              <a:t>'w+' - writing and reading mode. The exact same as r+ but if the file does not exist, a new one is made. Otherwise, the file is overwritten</a:t>
+            </a:r>
+          </a:p>
+          <a:p>
+            <a:pPr lvl="1"/>
+            <a:r>
+              <a:rPr lang="en-US" dirty="0"/>
+              <a:t>'a+' - appending and reading mode. Similar to w+ as it will create a new file if the file does not exist. Otherwise, the file pointer is at the end of the file if it exists. </a:t>
+            </a:r>
+            <a:endParaRPr lang="ru-RU" dirty="0"/>
+          </a:p>
+        </p:txBody>
+      </p:sp>
+    </p:spTree>
+    <p:extLst>
+      <p:ext uri="{BB962C8B-B14F-4D97-AF65-F5344CB8AC3E}">
+        <p14:creationId xmlns:p14="http://schemas.microsoft.com/office/powerpoint/2010/main" val="746516432"/>
+      </p:ext>
+    </p:extLst>
+  </p:cSld>
+  <p:clrMapOvr>
+    <a:masterClrMapping/>
+  </p:clrMapOvr>
+</p:sld>
+</file>
+
+<file path=ppt/slides/slide76.xml><?xml version="1.0" encoding="utf-8"?>
+<p:sld xmlns:a="http://schemas.openxmlformats.org/drawingml/2006/main" xmlns:r="http://schemas.openxmlformats.org/officeDocument/2006/relationships" xmlns:p="http://schemas.openxmlformats.org/presentationml/2006/main">
+  <p:cSld>
+    <p:spTree>
+      <p:nvGrpSpPr>
+        <p:cNvPr id="1" name=""/>
+        <p:cNvGrpSpPr/>
+        <p:nvPr/>
+      </p:nvGrpSpPr>
+      <p:grpSpPr>
+        <a:xfrm>
+          <a:off x="0" y="0"/>
+          <a:ext cx="0" cy="0"/>
+          <a:chOff x="0" y="0"/>
+          <a:chExt cx="0" cy="0"/>
+        </a:xfrm>
+      </p:grpSpPr>
+      <p:sp>
+        <p:nvSpPr>
+          <p:cNvPr id="2" name="Заголовок 1">
+            <a:extLst>
+              <a:ext uri="{FF2B5EF4-FFF2-40B4-BE49-F238E27FC236}">
+                <a16:creationId xmlns:a16="http://schemas.microsoft.com/office/drawing/2014/main" id="{BF4F6B4C-D973-4D3B-86D6-5FD04C52054B}"/>
+              </a:ext>
+            </a:extLst>
+          </p:cNvPr>
+          <p:cNvSpPr>
+            <a:spLocks noGrp="1"/>
+          </p:cNvSpPr>
+          <p:nvPr>
+            <p:ph type="title"/>
+          </p:nvPr>
+        </p:nvSpPr>
+        <p:spPr/>
+        <p:txBody>
+          <a:bodyPr/>
+          <a:lstStyle/>
+          <a:p>
+            <a:endParaRPr lang="ru-RU"/>
+          </a:p>
+        </p:txBody>
+      </p:sp>
+      <p:sp>
+        <p:nvSpPr>
+          <p:cNvPr id="3" name="Объект 2">
+            <a:extLst>
+              <a:ext uri="{FF2B5EF4-FFF2-40B4-BE49-F238E27FC236}">
+                <a16:creationId xmlns:a16="http://schemas.microsoft.com/office/drawing/2014/main" id="{DD3CE626-7FF5-4B34-82FB-80FF0982811B}"/>
+              </a:ext>
+            </a:extLst>
+          </p:cNvPr>
+          <p:cNvSpPr>
+            <a:spLocks noGrp="1"/>
+          </p:cNvSpPr>
+          <p:nvPr>
+            <p:ph idx="1"/>
+          </p:nvPr>
+        </p:nvSpPr>
+        <p:spPr/>
+        <p:txBody>
+          <a:bodyPr/>
+          <a:lstStyle/>
+          <a:p>
+            <a:endParaRPr lang="ru-RU"/>
+          </a:p>
+        </p:txBody>
+      </p:sp>
+    </p:spTree>
+    <p:extLst>
+      <p:ext uri="{BB962C8B-B14F-4D97-AF65-F5344CB8AC3E}">
+        <p14:creationId xmlns:p14="http://schemas.microsoft.com/office/powerpoint/2010/main" val="737052585"/>
+      </p:ext>
+    </p:extLst>
+  </p:cSld>
+  <p:clrMapOvr>
+    <a:masterClrMapping/>
+  </p:clrMapOvr>
+</p:sld>
+</file>
+
+<file path=ppt/slides/slide77.xml><?xml version="1.0" encoding="utf-8"?>
+<p:sld xmlns:a="http://schemas.openxmlformats.org/drawingml/2006/main" xmlns:r="http://schemas.openxmlformats.org/officeDocument/2006/relationships" xmlns:p="http://schemas.openxmlformats.org/presentationml/2006/main">
+  <p:cSld>
+    <p:spTree>
+      <p:nvGrpSpPr>
+        <p:cNvPr id="1" name=""/>
+        <p:cNvGrpSpPr/>
+        <p:nvPr/>
+      </p:nvGrpSpPr>
+      <p:grpSpPr>
+        <a:xfrm>
+          <a:off x="0" y="0"/>
+          <a:ext cx="0" cy="0"/>
+          <a:chOff x="0" y="0"/>
+          <a:chExt cx="0" cy="0"/>
+        </a:xfrm>
+      </p:grpSpPr>
+      <p:sp>
+        <p:nvSpPr>
           <p:cNvPr id="2" name="Заголовок 1">
             <a:extLst>
               <a:ext uri="{FF2B5EF4-FFF2-40B4-BE49-F238E27FC236}">
@@ -22652,7 +24202,7 @@
                 <a:latin typeface="MV Boli" panose="02000500030200090000" pitchFamily="2" charset="0"/>
                 <a:cs typeface="MV Boli" panose="02000500030200090000" pitchFamily="2" charset="0"/>
               </a:rPr>
-              <a:t>12 Hellish Trials </a:t>
+              <a:t>Final Trials </a:t>
             </a:r>
             <a:endParaRPr lang="ru-RU" dirty="0">
               <a:cs typeface="MV Boli" panose="02000500030200090000" pitchFamily="2" charset="0"/>
@@ -22735,7 +24285,7 @@
               <a:rPr lang="en-US" dirty="0">
                 <a:hlinkClick r:id="rId5"/>
               </a:rPr>
-              <a:t>https://www.codewars.com/kata/546e2562b03326a88e000020/javascript</a:t>
+              <a:t>https://www.codewars.com/kata/546e2562b03326a88e000020</a:t>
             </a:r>
             <a:endParaRPr lang="en-US" dirty="0"/>
           </a:p>

</xml_diff>

<commit_message>
feat: add files block
</commit_message>
<xml_diff>
--- a/python 101/python_101.pptx
+++ b/python 101/python_101.pptx
@@ -81,7 +81,10 @@
     <p:sldId id="331" r:id="rId75"/>
     <p:sldId id="333" r:id="rId76"/>
     <p:sldId id="334" r:id="rId77"/>
-    <p:sldId id="325" r:id="rId78"/>
+    <p:sldId id="335" r:id="rId78"/>
+    <p:sldId id="337" r:id="rId79"/>
+    <p:sldId id="336" r:id="rId80"/>
+    <p:sldId id="325" r:id="rId81"/>
   </p:sldIdLst>
   <p:sldSz cx="12192000" cy="6858000"/>
   <p:notesSz cx="6858000" cy="9144000"/>
@@ -5619,7 +5622,7 @@
               <a:t>Created by </a:t>
             </a:r>
             <a:r>
-              <a:rPr lang="en-US" dirty="0" err="1">
+              <a:rPr lang="en-US" dirty="0">
                 <a:hlinkClick r:id="rId2"/>
               </a:rPr>
               <a:t>wonderluc</a:t>
@@ -9908,20 +9911,8 @@
           <a:p>
             <a:pPr lvl="1"/>
             <a:r>
-              <a:rPr lang="en-US" dirty="0" err="1"/>
-              <a:t>HeadChop</a:t>
-            </a:r>
-            <a:r>
-              <a:rPr lang="en-US" dirty="0"/>
-              <a:t> comfortable with </a:t>
-            </a:r>
-            <a:r>
-              <a:rPr lang="en-US" dirty="0" err="1"/>
-              <a:t>Headchop</a:t>
-            </a:r>
-            <a:r>
-              <a:rPr lang="en-US" dirty="0"/>
-              <a:t> too</a:t>
+              <a:rPr lang="en-US" dirty="0"/>
+              <a:t>HeadChop comfortable with Headchop too</a:t>
             </a:r>
           </a:p>
         </p:txBody>
@@ -10846,43 +10837,15 @@
             <a:pPr lvl="1"/>
             <a:r>
               <a:rPr lang="en-US" dirty="0"/>
-              <a:t>Schema of a person – [Name: </a:t>
-            </a:r>
-            <a:r>
-              <a:rPr lang="en-US" dirty="0" err="1"/>
-              <a:t>str</a:t>
-            </a:r>
-            <a:r>
-              <a:rPr lang="en-US" dirty="0"/>
-              <a:t>,</a:t>
+              <a:t>Schema of a person – [Name: str,</a:t>
             </a:r>
             <a:r>
               <a:rPr lang="ru-RU" dirty="0"/>
               <a:t> </a:t>
             </a:r>
             <a:r>
-              <a:rPr lang="en-US" dirty="0" err="1"/>
-              <a:t>isEnemy</a:t>
-            </a:r>
-            <a:r>
-              <a:rPr lang="en-US" dirty="0"/>
-              <a:t>: </a:t>
-            </a:r>
-            <a:r>
-              <a:rPr lang="en-US" dirty="0" err="1"/>
-              <a:t>bool</a:t>
-            </a:r>
-            <a:r>
-              <a:rPr lang="en-US" dirty="0"/>
-              <a:t>, health: </a:t>
-            </a:r>
-            <a:r>
-              <a:rPr lang="en-US" dirty="0" err="1"/>
-              <a:t>int</a:t>
-            </a:r>
-            <a:r>
-              <a:rPr lang="en-US" dirty="0"/>
-              <a:t>]. It maybe a different order</a:t>
+              <a:rPr lang="en-US" dirty="0"/>
+              <a:t>isEnemy: bool, health: int]. It maybe a different order</a:t>
             </a:r>
           </a:p>
           <a:p>
@@ -10938,15 +10901,7 @@
             <a:pPr lvl="1"/>
             <a:r>
               <a:rPr lang="en-US" dirty="0"/>
-              <a:t>If it not enemy – print “Hey! Don’t touch yours friend, </a:t>
-            </a:r>
-            <a:r>
-              <a:rPr lang="en-US" dirty="0" err="1"/>
-              <a:t>wierdo</a:t>
-            </a:r>
-            <a:r>
-              <a:rPr lang="en-US" dirty="0"/>
-              <a:t>!”</a:t>
+              <a:t>If it not enemy – print “Hey! Don’t touch yours friend, wierdo!”</a:t>
             </a:r>
           </a:p>
           <a:p>
@@ -11024,23 +10979,7 @@
                   <a:srgbClr val="C00000"/>
                 </a:solidFill>
               </a:rPr>
-              <a:t>    [200, True, '</a:t>
-            </a:r>
-            <a:r>
-              <a:rPr lang="en-US" dirty="0" err="1">
-                <a:solidFill>
-                  <a:srgbClr val="C00000"/>
-                </a:solidFill>
-              </a:rPr>
-              <a:t>Rassel</a:t>
-            </a:r>
-            <a:r>
-              <a:rPr lang="en-US" dirty="0">
-                <a:solidFill>
-                  <a:srgbClr val="C00000"/>
-                </a:solidFill>
-              </a:rPr>
-              <a:t>'],</a:t>
+              <a:t>    [200, True, 'Rassel'],</a:t>
             </a:r>
           </a:p>
           <a:p>
@@ -11286,7 +11225,7 @@
               <a:t>List comprehension offers a shorter syntax when you want to create a new list based on the values of an existing list.    Common syntax (or generator)  –  			          </a:t>
             </a:r>
             <a:r>
-              <a:rPr lang="en-US" sz="1700" dirty="0" err="1">
+              <a:rPr lang="en-US" sz="1700" dirty="0">
                 <a:solidFill>
                   <a:schemeClr val="accent1">
                     <a:lumMod val="75000"/>
@@ -11340,7 +11279,7 @@
               <a:t> </a:t>
             </a:r>
             <a:r>
-              <a:rPr lang="en-US" sz="1700" i="1" dirty="0" err="1"/>
+              <a:rPr lang="en-US" sz="1700" i="1" dirty="0"/>
               <a:t>iterable</a:t>
             </a:r>
             <a:r>
@@ -11621,20 +11560,24 @@
               <a:t>Strings sorted by first letter charter code( A – 65 B – 66, a -  97 ). For take charter code use </a:t>
             </a:r>
             <a:r>
-              <a:rPr lang="en-US" dirty="0" err="1"/>
-              <a:t>ord</a:t>
-            </a:r>
-            <a:r>
-              <a:rPr lang="en-US" dirty="0"/>
-              <a:t>(), reverse use </a:t>
-            </a:r>
-            <a:r>
-              <a:rPr lang="en-US" dirty="0" err="1"/>
-              <a:t>chr</a:t>
-            </a:r>
-            <a:r>
-              <a:rPr lang="en-US" dirty="0"/>
-              <a:t>()</a:t>
+              <a:rPr lang="en-US" dirty="0">
+                <a:solidFill>
+                  <a:srgbClr val="FF0000"/>
+                </a:solidFill>
+              </a:rPr>
+              <a:t>ord()</a:t>
+            </a:r>
+            <a:r>
+              <a:rPr lang="en-US" dirty="0"/>
+              <a:t>, reverse use </a:t>
+            </a:r>
+            <a:r>
+              <a:rPr lang="en-US" dirty="0">
+                <a:solidFill>
+                  <a:srgbClr val="FF0000"/>
+                </a:solidFill>
+              </a:rPr>
+              <a:t>chr()</a:t>
             </a:r>
           </a:p>
           <a:p>
@@ -12221,15 +12164,7 @@
             </a:r>
             <a:r>
               <a:rPr lang="en-US" dirty="0"/>
-              <a:t>Add the elements of a list (or any </a:t>
-            </a:r>
-            <a:r>
-              <a:rPr lang="en-US" dirty="0" err="1"/>
-              <a:t>iterable</a:t>
-            </a:r>
-            <a:r>
-              <a:rPr lang="en-US" dirty="0"/>
-              <a:t>), to the end of the current list</a:t>
+              <a:t>Add the elements of a list (or any iterable), to the end of the current list</a:t>
             </a:r>
           </a:p>
           <a:p>
@@ -12683,7 +12618,7 @@
           <a:lstStyle/>
           <a:p>
             <a:pPr algn="ctr"/>
-            <a:endParaRPr lang="ru-RU"/>
+            <a:endParaRPr lang="ru-RU" dirty="0"/>
           </a:p>
         </p:txBody>
       </p:sp>
@@ -15560,15 +15495,7 @@
             </a:r>
             <a:r>
               <a:rPr lang="en-US" dirty="0"/>
-              <a:t> method. Actually, update receives any </a:t>
-            </a:r>
-            <a:r>
-              <a:rPr lang="en-US" dirty="0" err="1"/>
-              <a:t>iterable</a:t>
-            </a:r>
-            <a:r>
-              <a:rPr lang="en-US" dirty="0"/>
-              <a:t> object, so you may put to it array, tuple or </a:t>
+              <a:t> method. Actually, update receives any iterable object, so you may put to it array, tuple or </a:t>
             </a:r>
             <a:r>
               <a:rPr lang="en-US" dirty="0" err="1"/>
@@ -24116,7 +24043,12 @@
           <a:bodyPr/>
           <a:lstStyle/>
           <a:p>
-            <a:endParaRPr lang="ru-RU"/>
+            <a:pPr algn="ctr"/>
+            <a:r>
+              <a:rPr lang="en-US" dirty="0"/>
+              <a:t>Read a files</a:t>
+            </a:r>
+            <a:endParaRPr lang="ru-RU" dirty="0"/>
           </a:p>
         </p:txBody>
       </p:sp>
@@ -24136,15 +24068,356 @@
             <p:ph idx="1"/>
           </p:nvPr>
         </p:nvSpPr>
-        <p:spPr/>
+        <p:spPr>
+          <a:xfrm>
+            <a:off x="838199" y="1825624"/>
+            <a:ext cx="5456583" cy="5032376"/>
+          </a:xfrm>
+        </p:spPr>
         <p:txBody>
-          <a:bodyPr/>
+          <a:bodyPr>
+            <a:normAutofit fontScale="77500" lnSpcReduction="20000"/>
+          </a:bodyPr>
           <a:lstStyle/>
           <a:p>
-            <a:endParaRPr lang="ru-RU"/>
+            <a:r>
+              <a:rPr lang="en-US" dirty="0"/>
+              <a:t>To read a file – use ‘r’ mode. In this mode you have some helpful functions:</a:t>
+            </a:r>
+          </a:p>
+          <a:p>
+            <a:r>
+              <a:rPr lang="en-US" dirty="0">
+                <a:solidFill>
+                  <a:srgbClr val="FF0000"/>
+                </a:solidFill>
+              </a:rPr>
+              <a:t>read([int]) </a:t>
+            </a:r>
+            <a:r>
+              <a:rPr lang="en-US" dirty="0"/>
+              <a:t>– returns all content of file. </a:t>
+            </a:r>
+          </a:p>
+          <a:p>
+            <a:r>
+              <a:rPr lang="en-US" dirty="0" err="1">
+                <a:solidFill>
+                  <a:srgbClr val="FF0000"/>
+                </a:solidFill>
+              </a:rPr>
+              <a:t>readline</a:t>
+            </a:r>
+            <a:r>
+              <a:rPr lang="en-US" dirty="0">
+                <a:solidFill>
+                  <a:srgbClr val="FF0000"/>
+                </a:solidFill>
+              </a:rPr>
+              <a:t>([int]) </a:t>
+            </a:r>
+            <a:r>
+              <a:rPr lang="en-US" dirty="0"/>
+              <a:t>– returns a line on every call. </a:t>
+            </a:r>
+          </a:p>
+          <a:p>
+            <a:r>
+              <a:rPr lang="en-US" dirty="0" err="1">
+                <a:solidFill>
+                  <a:srgbClr val="FF0000"/>
+                </a:solidFill>
+              </a:rPr>
+              <a:t>readlines</a:t>
+            </a:r>
+            <a:r>
+              <a:rPr lang="en-US" dirty="0">
+                <a:solidFill>
+                  <a:srgbClr val="FF0000"/>
+                </a:solidFill>
+              </a:rPr>
+              <a:t>([int]) </a:t>
+            </a:r>
+            <a:r>
+              <a:rPr lang="en-US" dirty="0"/>
+              <a:t>– return a array of lines.</a:t>
+            </a:r>
+          </a:p>
+          <a:p>
+            <a:r>
+              <a:rPr lang="en-US" dirty="0"/>
+              <a:t>You may notice that we don’t put an argument in this function. If you do this, you may specify how many contents will be read. Read and </a:t>
+            </a:r>
+            <a:r>
+              <a:rPr lang="en-US" dirty="0" err="1"/>
+              <a:t>Readline</a:t>
+            </a:r>
+            <a:r>
+              <a:rPr lang="en-US" dirty="0"/>
+              <a:t> counts symbols, in that case, the next call returns a remainder part. </a:t>
+            </a:r>
+            <a:r>
+              <a:rPr lang="en-US" dirty="0" err="1"/>
+              <a:t>Readlines</a:t>
+            </a:r>
+            <a:r>
+              <a:rPr lang="en-US" dirty="0"/>
+              <a:t> count by lines.</a:t>
+            </a:r>
+          </a:p>
+          <a:p>
+            <a:r>
+              <a:rPr lang="en-US" dirty="0"/>
+              <a:t>Also you may loop through file line by line. </a:t>
+            </a:r>
+          </a:p>
+          <a:p>
+            <a:r>
+              <a:rPr lang="en-US" dirty="0"/>
+              <a:t>Note! Here we don’t handle error that occur if file doesn’t exists. We fix it in preferable example.</a:t>
+            </a:r>
+          </a:p>
+          <a:p>
+            <a:r>
+              <a:rPr lang="en-US" dirty="0"/>
+              <a:t>Note! Always close() the file. It is a good practice </a:t>
+            </a:r>
+            <a:endParaRPr lang="ru-RU" dirty="0"/>
           </a:p>
         </p:txBody>
       </p:sp>
+      <p:pic>
+        <p:nvPicPr>
+          <p:cNvPr id="4" name="Рисунок 3">
+            <a:extLst>
+              <a:ext uri="{FF2B5EF4-FFF2-40B4-BE49-F238E27FC236}">
+                <a16:creationId xmlns:a16="http://schemas.microsoft.com/office/drawing/2014/main" id="{3580D06E-8179-4B6C-AB55-87CA7BF91E7C}"/>
+              </a:ext>
+            </a:extLst>
+          </p:cNvPr>
+          <p:cNvPicPr>
+            <a:picLocks noChangeAspect="1"/>
+          </p:cNvPicPr>
+          <p:nvPr/>
+        </p:nvPicPr>
+        <p:blipFill>
+          <a:blip r:embed="rId2"/>
+          <a:stretch>
+            <a:fillRect/>
+          </a:stretch>
+        </p:blipFill>
+        <p:spPr>
+          <a:xfrm>
+            <a:off x="6603722" y="1471265"/>
+            <a:ext cx="2277321" cy="1050098"/>
+          </a:xfrm>
+          <a:prstGeom prst="rect">
+            <a:avLst/>
+          </a:prstGeom>
+        </p:spPr>
+      </p:pic>
+      <p:pic>
+        <p:nvPicPr>
+          <p:cNvPr id="5" name="Рисунок 4">
+            <a:extLst>
+              <a:ext uri="{FF2B5EF4-FFF2-40B4-BE49-F238E27FC236}">
+                <a16:creationId xmlns:a16="http://schemas.microsoft.com/office/drawing/2014/main" id="{739035FD-C73C-4827-8851-0853E255A6F3}"/>
+              </a:ext>
+            </a:extLst>
+          </p:cNvPr>
+          <p:cNvPicPr>
+            <a:picLocks noChangeAspect="1"/>
+          </p:cNvPicPr>
+          <p:nvPr/>
+        </p:nvPicPr>
+        <p:blipFill>
+          <a:blip r:embed="rId3"/>
+          <a:stretch>
+            <a:fillRect/>
+          </a:stretch>
+        </p:blipFill>
+        <p:spPr>
+          <a:xfrm>
+            <a:off x="6603722" y="2562394"/>
+            <a:ext cx="2284622" cy="1256542"/>
+          </a:xfrm>
+          <a:prstGeom prst="rect">
+            <a:avLst/>
+          </a:prstGeom>
+        </p:spPr>
+      </p:pic>
+      <p:pic>
+        <p:nvPicPr>
+          <p:cNvPr id="6" name="Рисунок 5">
+            <a:extLst>
+              <a:ext uri="{FF2B5EF4-FFF2-40B4-BE49-F238E27FC236}">
+                <a16:creationId xmlns:a16="http://schemas.microsoft.com/office/drawing/2014/main" id="{0D1E7A94-B02C-413F-B917-FA532C834152}"/>
+              </a:ext>
+            </a:extLst>
+          </p:cNvPr>
+          <p:cNvPicPr>
+            <a:picLocks noChangeAspect="1"/>
+          </p:cNvPicPr>
+          <p:nvPr/>
+        </p:nvPicPr>
+        <p:blipFill>
+          <a:blip r:embed="rId4"/>
+          <a:stretch>
+            <a:fillRect/>
+          </a:stretch>
+        </p:blipFill>
+        <p:spPr>
+          <a:xfrm>
+            <a:off x="6603722" y="3859967"/>
+            <a:ext cx="2260491" cy="713203"/>
+          </a:xfrm>
+          <a:prstGeom prst="rect">
+            <a:avLst/>
+          </a:prstGeom>
+        </p:spPr>
+      </p:pic>
+      <p:pic>
+        <p:nvPicPr>
+          <p:cNvPr id="7" name="Рисунок 6">
+            <a:extLst>
+              <a:ext uri="{FF2B5EF4-FFF2-40B4-BE49-F238E27FC236}">
+                <a16:creationId xmlns:a16="http://schemas.microsoft.com/office/drawing/2014/main" id="{76A14ED0-DDEC-4A03-B522-5EF4E9B65774}"/>
+              </a:ext>
+            </a:extLst>
+          </p:cNvPr>
+          <p:cNvPicPr>
+            <a:picLocks noChangeAspect="1"/>
+          </p:cNvPicPr>
+          <p:nvPr/>
+        </p:nvPicPr>
+        <p:blipFill>
+          <a:blip r:embed="rId5"/>
+          <a:stretch>
+            <a:fillRect/>
+          </a:stretch>
+        </p:blipFill>
+        <p:spPr>
+          <a:xfrm>
+            <a:off x="9106785" y="1471265"/>
+            <a:ext cx="2431807" cy="3101905"/>
+          </a:xfrm>
+          <a:prstGeom prst="rect">
+            <a:avLst/>
+          </a:prstGeom>
+        </p:spPr>
+      </p:pic>
+      <p:pic>
+        <p:nvPicPr>
+          <p:cNvPr id="8" name="Рисунок 7">
+            <a:extLst>
+              <a:ext uri="{FF2B5EF4-FFF2-40B4-BE49-F238E27FC236}">
+                <a16:creationId xmlns:a16="http://schemas.microsoft.com/office/drawing/2014/main" id="{BC22E9BF-8F69-422D-8132-5B20459BB5EB}"/>
+              </a:ext>
+            </a:extLst>
+          </p:cNvPr>
+          <p:cNvPicPr>
+            <a:picLocks noChangeAspect="1"/>
+          </p:cNvPicPr>
+          <p:nvPr/>
+        </p:nvPicPr>
+        <p:blipFill>
+          <a:blip r:embed="rId6"/>
+          <a:stretch>
+            <a:fillRect/>
+          </a:stretch>
+        </p:blipFill>
+        <p:spPr>
+          <a:xfrm>
+            <a:off x="6603722" y="4967145"/>
+            <a:ext cx="2255296" cy="839180"/>
+          </a:xfrm>
+          <a:prstGeom prst="rect">
+            <a:avLst/>
+          </a:prstGeom>
+        </p:spPr>
+      </p:pic>
+      <p:sp>
+        <p:nvSpPr>
+          <p:cNvPr id="10" name="Прямоугольник 9">
+            <a:extLst>
+              <a:ext uri="{FF2B5EF4-FFF2-40B4-BE49-F238E27FC236}">
+                <a16:creationId xmlns:a16="http://schemas.microsoft.com/office/drawing/2014/main" id="{BE303500-D2A7-4C02-9A13-D2D72B4F6308}"/>
+              </a:ext>
+            </a:extLst>
+          </p:cNvPr>
+          <p:cNvSpPr/>
+          <p:nvPr/>
+        </p:nvSpPr>
+        <p:spPr>
+          <a:xfrm>
+            <a:off x="8984975" y="5128591"/>
+            <a:ext cx="2915478" cy="1524000"/>
+          </a:xfrm>
+          <a:prstGeom prst="rect">
+            <a:avLst/>
+          </a:prstGeom>
+          <a:solidFill>
+            <a:srgbClr val="FFC000"/>
+          </a:solidFill>
+          <a:ln>
+            <a:noFill/>
+          </a:ln>
+        </p:spPr>
+        <p:style>
+          <a:lnRef idx="2">
+            <a:schemeClr val="accent1">
+              <a:shade val="50000"/>
+            </a:schemeClr>
+          </a:lnRef>
+          <a:fillRef idx="1">
+            <a:schemeClr val="accent1"/>
+          </a:fillRef>
+          <a:effectRef idx="0">
+            <a:schemeClr val="accent1"/>
+          </a:effectRef>
+          <a:fontRef idx="minor">
+            <a:schemeClr val="lt1"/>
+          </a:fontRef>
+        </p:style>
+        <p:txBody>
+          <a:bodyPr rtlCol="0" anchor="ctr"/>
+          <a:lstStyle/>
+          <a:p>
+            <a:pPr algn="ctr"/>
+            <a:endParaRPr lang="ru-RU"/>
+          </a:p>
+        </p:txBody>
+      </p:sp>
+      <p:pic>
+        <p:nvPicPr>
+          <p:cNvPr id="9" name="Рисунок 8">
+            <a:extLst>
+              <a:ext uri="{FF2B5EF4-FFF2-40B4-BE49-F238E27FC236}">
+                <a16:creationId xmlns:a16="http://schemas.microsoft.com/office/drawing/2014/main" id="{0BDAA429-394F-43B5-A3FD-B4022567FEA3}"/>
+              </a:ext>
+            </a:extLst>
+          </p:cNvPr>
+          <p:cNvPicPr>
+            <a:picLocks noChangeAspect="1"/>
+          </p:cNvPicPr>
+          <p:nvPr/>
+        </p:nvPicPr>
+        <p:blipFill>
+          <a:blip r:embed="rId7"/>
+          <a:stretch>
+            <a:fillRect/>
+          </a:stretch>
+        </p:blipFill>
+        <p:spPr>
+          <a:xfrm>
+            <a:off x="9106785" y="5257542"/>
+            <a:ext cx="2693086" cy="1282422"/>
+          </a:xfrm>
+          <a:prstGeom prst="rect">
+            <a:avLst/>
+          </a:prstGeom>
+        </p:spPr>
+      </p:pic>
     </p:spTree>
     <p:extLst>
       <p:ext uri="{BB962C8B-B14F-4D97-AF65-F5344CB8AC3E}">
@@ -24180,7 +24453,7 @@
           <p:cNvPr id="2" name="Заголовок 1">
             <a:extLst>
               <a:ext uri="{FF2B5EF4-FFF2-40B4-BE49-F238E27FC236}">
-                <a16:creationId xmlns:a16="http://schemas.microsoft.com/office/drawing/2014/main" id="{9324FF77-85ED-430A-A432-8E22C22D98B8}"/>
+                <a16:creationId xmlns:a16="http://schemas.microsoft.com/office/drawing/2014/main" id="{ED588CFE-713A-43FB-BE24-3D59A275922E}"/>
               </a:ext>
             </a:extLst>
           </p:cNvPr>
@@ -24198,15 +24471,10 @@
           <a:p>
             <a:pPr algn="ctr"/>
             <a:r>
-              <a:rPr lang="en-US" dirty="0">
-                <a:latin typeface="MV Boli" panose="02000500030200090000" pitchFamily="2" charset="0"/>
-                <a:cs typeface="MV Boli" panose="02000500030200090000" pitchFamily="2" charset="0"/>
-              </a:rPr>
-              <a:t>Final Trials </a:t>
-            </a:r>
-            <a:endParaRPr lang="ru-RU" dirty="0">
-              <a:cs typeface="MV Boli" panose="02000500030200090000" pitchFamily="2" charset="0"/>
-            </a:endParaRPr>
+              <a:rPr lang="en-US" dirty="0"/>
+              <a:t>Write a Files</a:t>
+            </a:r>
+            <a:endParaRPr lang="ru-RU" dirty="0"/>
           </a:p>
         </p:txBody>
       </p:sp>
@@ -24215,7 +24483,7 @@
           <p:cNvPr id="3" name="Объект 2">
             <a:extLst>
               <a:ext uri="{FF2B5EF4-FFF2-40B4-BE49-F238E27FC236}">
-                <a16:creationId xmlns:a16="http://schemas.microsoft.com/office/drawing/2014/main" id="{2ADF3C9B-7FC9-4B7B-953F-F1A81668185B}"/>
+                <a16:creationId xmlns:a16="http://schemas.microsoft.com/office/drawing/2014/main" id="{2DD20626-28C6-4C75-93B4-72A421F66AAF}"/>
               </a:ext>
             </a:extLst>
           </p:cNvPr>
@@ -24228,13 +24496,145 @@
         </p:nvSpPr>
         <p:spPr>
           <a:xfrm>
-            <a:off x="838200" y="2342459"/>
-            <a:ext cx="10515600" cy="4351338"/>
+            <a:off x="838200" y="1825625"/>
+            <a:ext cx="10515600" cy="2203036"/>
+          </a:xfrm>
+        </p:spPr>
+        <p:txBody>
+          <a:bodyPr/>
+          <a:lstStyle/>
+          <a:p>
+            <a:r>
+              <a:rPr lang="en-US" dirty="0"/>
+              <a:t>To write a file use – ‘w’ or ‘a’ mode. The difference between them is ‘w’ creates the file if this doesn’t exist or rewrites the current file. ‘a’ doesn’t rewrite file, only adds to the end and raise Exception if file not exists</a:t>
+            </a:r>
+          </a:p>
+          <a:p>
+            <a:r>
+              <a:rPr lang="en-US" dirty="0">
+                <a:solidFill>
+                  <a:srgbClr val="FF0000"/>
+                </a:solidFill>
+              </a:rPr>
+              <a:t>write() </a:t>
+            </a:r>
+            <a:r>
+              <a:rPr lang="en-US" dirty="0"/>
+              <a:t>– main method to write to the file</a:t>
+            </a:r>
+            <a:endParaRPr lang="ru-RU" dirty="0"/>
+          </a:p>
+        </p:txBody>
+      </p:sp>
+      <p:pic>
+        <p:nvPicPr>
+          <p:cNvPr id="4" name="Рисунок 3">
+            <a:extLst>
+              <a:ext uri="{FF2B5EF4-FFF2-40B4-BE49-F238E27FC236}">
+                <a16:creationId xmlns:a16="http://schemas.microsoft.com/office/drawing/2014/main" id="{F8E5E0AC-641D-4743-84B0-A2C32DC30542}"/>
+              </a:ext>
+            </a:extLst>
+          </p:cNvPr>
+          <p:cNvPicPr>
+            <a:picLocks noChangeAspect="1"/>
+          </p:cNvPicPr>
+          <p:nvPr/>
+        </p:nvPicPr>
+        <p:blipFill>
+          <a:blip r:embed="rId2"/>
+          <a:stretch>
+            <a:fillRect/>
+          </a:stretch>
+        </p:blipFill>
+        <p:spPr>
+          <a:xfrm>
+            <a:off x="838200" y="4365141"/>
+            <a:ext cx="3715161" cy="1956146"/>
+          </a:xfrm>
+          <a:prstGeom prst="rect">
+            <a:avLst/>
+          </a:prstGeom>
+        </p:spPr>
+      </p:pic>
+      <p:pic>
+        <p:nvPicPr>
+          <p:cNvPr id="5" name="Рисунок 4">
+            <a:extLst>
+              <a:ext uri="{FF2B5EF4-FFF2-40B4-BE49-F238E27FC236}">
+                <a16:creationId xmlns:a16="http://schemas.microsoft.com/office/drawing/2014/main" id="{19D7B3E7-BAC0-47FB-B366-51134D0016CF}"/>
+              </a:ext>
+            </a:extLst>
+          </p:cNvPr>
+          <p:cNvPicPr>
+            <a:picLocks noChangeAspect="1"/>
+          </p:cNvPicPr>
+          <p:nvPr/>
+        </p:nvPicPr>
+        <p:blipFill>
+          <a:blip r:embed="rId3"/>
+          <a:stretch>
+            <a:fillRect/>
+          </a:stretch>
+        </p:blipFill>
+        <p:spPr>
+          <a:xfrm>
+            <a:off x="6282359" y="4365141"/>
+            <a:ext cx="3426808" cy="1412807"/>
+          </a:xfrm>
+          <a:prstGeom prst="rect">
+            <a:avLst/>
+          </a:prstGeom>
+        </p:spPr>
+      </p:pic>
+    </p:spTree>
+    <p:extLst>
+      <p:ext uri="{BB962C8B-B14F-4D97-AF65-F5344CB8AC3E}">
+        <p14:creationId xmlns:p14="http://schemas.microsoft.com/office/powerpoint/2010/main" val="226737447"/>
+      </p:ext>
+    </p:extLst>
+  </p:cSld>
+  <p:clrMapOvr>
+    <a:masterClrMapping/>
+  </p:clrMapOvr>
+</p:sld>
+</file>
+
+<file path=ppt/slides/slide78.xml><?xml version="1.0" encoding="utf-8"?>
+<p:sld xmlns:a="http://schemas.openxmlformats.org/drawingml/2006/main" xmlns:r="http://schemas.openxmlformats.org/officeDocument/2006/relationships" xmlns:p="http://schemas.openxmlformats.org/presentationml/2006/main">
+  <p:cSld>
+    <p:spTree>
+      <p:nvGrpSpPr>
+        <p:cNvPr id="1" name=""/>
+        <p:cNvGrpSpPr/>
+        <p:nvPr/>
+      </p:nvGrpSpPr>
+      <p:grpSpPr>
+        <a:xfrm>
+          <a:off x="0" y="0"/>
+          <a:ext cx="0" cy="0"/>
+          <a:chOff x="0" y="0"/>
+          <a:chExt cx="0" cy="0"/>
+        </a:xfrm>
+      </p:grpSpPr>
+      <p:sp>
+        <p:nvSpPr>
+          <p:cNvPr id="3" name="Содержимое 2"/>
+          <p:cNvSpPr>
+            <a:spLocks noGrp="1"/>
+          </p:cNvSpPr>
+          <p:nvPr>
+            <p:ph idx="1"/>
+          </p:nvPr>
+        </p:nvSpPr>
+        <p:spPr>
+          <a:xfrm>
+            <a:off x="914400" y="1499616"/>
+            <a:ext cx="10439400" cy="5358384"/>
           </a:xfrm>
         </p:spPr>
         <p:txBody>
           <a:bodyPr>
-            <a:normAutofit fontScale="77500" lnSpcReduction="20000"/>
+            <a:normAutofit/>
           </a:bodyPr>
           <a:lstStyle/>
           <a:p>
@@ -24243,12 +24643,51 @@
               <a:buAutoNum type="arabicPeriod"/>
             </a:pPr>
             <a:r>
+              <a:rPr lang="en-US" dirty="0"/>
+              <a:t>Write a program that counts symbols words and letters in a given file</a:t>
+            </a:r>
+          </a:p>
+          <a:p>
+            <a:pPr marL="971550" lvl="1" indent="-514350">
+              <a:buFont typeface="+mj-lt"/>
+              <a:buAutoNum type="arabicPeriod"/>
+            </a:pPr>
+            <a:r>
+              <a:rPr lang="en-US" dirty="0"/>
+              <a:t>User inputs a filename </a:t>
+            </a:r>
+          </a:p>
+          <a:p>
+            <a:pPr marL="971550" lvl="1" indent="-514350">
+              <a:buFont typeface="+mj-lt"/>
+              <a:buAutoNum type="arabicPeriod"/>
+            </a:pPr>
+            <a:r>
+              <a:rPr lang="en-US" dirty="0"/>
+              <a:t>The file always must be .txt . To check filename use file.</a:t>
+            </a:r>
+            <a:r>
               <a:rPr lang="en-US" dirty="0">
-                <a:hlinkClick r:id="rId2"/>
+                <a:solidFill>
+                  <a:srgbClr val="FF0000"/>
+                </a:solidFill>
               </a:rPr>
-              <a:t>https://www.codewars.com/kata/52fba66badcd10859f00097e</a:t>
-            </a:r>
-            <a:endParaRPr lang="en-US" dirty="0"/>
+              <a:t>name</a:t>
+            </a:r>
+            <a:r>
+              <a:rPr lang="en-US" dirty="0"/>
+              <a:t> property</a:t>
+            </a:r>
+          </a:p>
+          <a:p>
+            <a:pPr marL="971550" lvl="1" indent="-514350">
+              <a:buFont typeface="+mj-lt"/>
+              <a:buAutoNum type="arabicPeriod"/>
+            </a:pPr>
+            <a:r>
+              <a:rPr lang="en-US" dirty="0"/>
+              <a:t>Program prints words and letters and finish </a:t>
+            </a:r>
           </a:p>
           <a:p>
             <a:pPr marL="514350" indent="-514350">
@@ -24256,205 +24695,284 @@
               <a:buAutoNum type="arabicPeriod"/>
             </a:pPr>
             <a:r>
-              <a:rPr lang="en-US" dirty="0">
-                <a:hlinkClick r:id="rId3"/>
-              </a:rPr>
-              <a:t>https://www.codewars.com/kata/5667e8f4e3f572a8f2000039</a:t>
-            </a:r>
-            <a:endParaRPr lang="en-US" dirty="0"/>
-          </a:p>
-          <a:p>
-            <a:pPr marL="514350" indent="-514350">
+              <a:rPr lang="en-US" dirty="0"/>
+              <a:t>Write the Budget program. It must counts a budget by month.</a:t>
+            </a:r>
+          </a:p>
+          <a:p>
+            <a:pPr marL="971550" lvl="1" indent="-514350">
               <a:buFont typeface="+mj-lt"/>
               <a:buAutoNum type="arabicPeriod"/>
             </a:pPr>
             <a:r>
-              <a:rPr lang="en-US" dirty="0">
-                <a:hlinkClick r:id="rId4"/>
-              </a:rPr>
-              <a:t>https://www.codewars.com/kata/554b4ac871d6813a03000035</a:t>
-            </a:r>
-            <a:endParaRPr lang="en-US" dirty="0"/>
-          </a:p>
-          <a:p>
-            <a:pPr marL="514350" indent="-514350">
+              <a:rPr lang="en-US" dirty="0"/>
+              <a:t>User inputs a filename</a:t>
+            </a:r>
+          </a:p>
+          <a:p>
+            <a:pPr marL="971550" lvl="1" indent="-514350">
               <a:buFont typeface="+mj-lt"/>
               <a:buAutoNum type="arabicPeriod"/>
             </a:pPr>
             <a:r>
-              <a:rPr lang="en-US" dirty="0">
-                <a:hlinkClick r:id="rId5"/>
-              </a:rPr>
-              <a:t>https://www.codewars.com/kata/546e2562b03326a88e000020</a:t>
-            </a:r>
-            <a:endParaRPr lang="en-US" dirty="0"/>
-          </a:p>
-          <a:p>
-            <a:pPr marL="514350" indent="-514350">
+              <a:rPr lang="en-US" dirty="0"/>
+              <a:t>The program counts a monthly sum by values in file</a:t>
+            </a:r>
+          </a:p>
+          <a:p>
+            <a:pPr marL="971550" lvl="1" indent="-514350">
               <a:buFont typeface="+mj-lt"/>
               <a:buAutoNum type="arabicPeriod"/>
             </a:pPr>
             <a:r>
-              <a:rPr lang="en-US" dirty="0">
-                <a:hlinkClick r:id="rId6"/>
-              </a:rPr>
-              <a:t>https://www.codewars.com/kata/523f5d21c841566fde000009</a:t>
-            </a:r>
-            <a:endParaRPr lang="en-US" dirty="0"/>
-          </a:p>
-          <a:p>
-            <a:pPr marL="514350" indent="-514350">
+              <a:rPr lang="en-US" dirty="0"/>
+              <a:t>Value = </a:t>
+            </a:r>
+            <a:r>
+              <a:rPr lang="en-US" dirty="0" err="1"/>
+              <a:t>NameValue</a:t>
+            </a:r>
+            <a:r>
+              <a:rPr lang="en-US" dirty="0"/>
+              <a:t>: (+/-)sum. Example – Food: -100</a:t>
+            </a:r>
+          </a:p>
+          <a:p>
+            <a:pPr marL="971550" lvl="1" indent="-514350">
               <a:buFont typeface="+mj-lt"/>
               <a:buAutoNum type="arabicPeriod"/>
             </a:pPr>
             <a:r>
-              <a:rPr lang="en-US" dirty="0">
-                <a:hlinkClick r:id="rId7"/>
-              </a:rPr>
-              <a:t>https://www.codewars.com/kata/5526fc09a1bbd946250002dc</a:t>
-            </a:r>
-            <a:endParaRPr lang="en-US" dirty="0"/>
-          </a:p>
-          <a:p>
-            <a:pPr marL="514350" indent="-514350">
+              <a:rPr lang="en-US" dirty="0"/>
+              <a:t>Each value is a line</a:t>
+            </a:r>
+          </a:p>
+          <a:p>
+            <a:pPr marL="971550" lvl="1" indent="-514350">
               <a:buFont typeface="+mj-lt"/>
               <a:buAutoNum type="arabicPeriod"/>
             </a:pPr>
             <a:r>
-              <a:rPr lang="en-US" dirty="0">
-                <a:hlinkClick r:id="rId8"/>
-              </a:rPr>
-              <a:t>https://www.codewars.com/kata/54b42f9314d9229fd6000d9c</a:t>
-            </a:r>
-            <a:endParaRPr lang="en-US" dirty="0"/>
-          </a:p>
-          <a:p>
-            <a:pPr marL="514350" indent="-514350">
+              <a:rPr lang="en-US" dirty="0"/>
+              <a:t>Program write a calculated sum in ‘output.txt’ in format – filename: sum</a:t>
+            </a:r>
+          </a:p>
+          <a:p>
+            <a:pPr marL="971550" lvl="1" indent="-514350">
               <a:buFont typeface="+mj-lt"/>
               <a:buAutoNum type="arabicPeriod"/>
             </a:pPr>
             <a:r>
-              <a:rPr lang="en-US" dirty="0">
-                <a:hlinkClick r:id="rId9"/>
-              </a:rPr>
-              <a:t>https://www.codewars.com/kata/54da539698b8a2ad76000228</a:t>
-            </a:r>
-            <a:endParaRPr lang="en-US" dirty="0"/>
-          </a:p>
-          <a:p>
-            <a:pPr marL="514350" indent="-514350">
-              <a:buFont typeface="+mj-lt"/>
-              <a:buAutoNum type="arabicPeriod"/>
-            </a:pPr>
-            <a:r>
-              <a:rPr lang="en-US" dirty="0">
-                <a:hlinkClick r:id="rId10"/>
-              </a:rPr>
-              <a:t>https://www.codewars.com/kata/5682e646d5eddc1e21000017</a:t>
-            </a:r>
-            <a:endParaRPr lang="en-US" dirty="0"/>
-          </a:p>
-          <a:p>
-            <a:pPr marL="514350" indent="-514350">
-              <a:buFont typeface="+mj-lt"/>
-              <a:buAutoNum type="arabicPeriod"/>
-            </a:pPr>
-            <a:r>
-              <a:rPr lang="en-US" dirty="0">
-                <a:hlinkClick r:id="rId11"/>
-              </a:rPr>
-              <a:t>https://www.codewars.com/kata/5682e72eb7354b2f39000021</a:t>
-            </a:r>
-            <a:endParaRPr lang="en-US" dirty="0"/>
-          </a:p>
-          <a:p>
-            <a:pPr marL="514350" indent="-514350">
-              <a:buFont typeface="+mj-lt"/>
-              <a:buAutoNum type="arabicPeriod"/>
-            </a:pPr>
-            <a:r>
-              <a:rPr lang="en-US" dirty="0">
-                <a:hlinkClick r:id="rId12"/>
-              </a:rPr>
-              <a:t>https://www.codewars.com/kata/5682e809386707366d000024</a:t>
-            </a:r>
-            <a:endParaRPr lang="en-US" dirty="0"/>
-          </a:p>
-          <a:p>
-            <a:pPr marL="514350" indent="-514350">
-              <a:buFont typeface="+mj-lt"/>
-              <a:buAutoNum type="arabicPeriod"/>
-            </a:pPr>
-            <a:r>
-              <a:rPr lang="en-US" dirty="0">
-                <a:hlinkClick r:id="rId13"/>
-              </a:rPr>
-              <a:t>https://www.codewars.com/kata/5682e545fb263ecf7b000069</a:t>
-            </a:r>
-            <a:endParaRPr lang="en-US" dirty="0"/>
-          </a:p>
-          <a:p>
-            <a:pPr marL="514350" indent="-514350">
-              <a:buFont typeface="+mj-lt"/>
-              <a:buAutoNum type="arabicPeriod"/>
-            </a:pPr>
-            <a:endParaRPr lang="en-US" dirty="0"/>
-          </a:p>
-          <a:p>
-            <a:pPr marL="514350" indent="-514350">
-              <a:buFont typeface="+mj-lt"/>
-              <a:buAutoNum type="arabicPeriod"/>
-            </a:pPr>
-            <a:endParaRPr lang="en-US" dirty="0"/>
+              <a:rPr lang="en-US" dirty="0"/>
+              <a:t>Filename and structure are always correct</a:t>
+            </a:r>
+          </a:p>
+        </p:txBody>
+      </p:sp>
+      <p:grpSp>
+        <p:nvGrpSpPr>
+          <p:cNvPr id="2" name="Группа 3"/>
+          <p:cNvGrpSpPr/>
+          <p:nvPr/>
+        </p:nvGrpSpPr>
+        <p:grpSpPr>
+          <a:xfrm>
+            <a:off x="838200" y="365125"/>
+            <a:ext cx="10515600" cy="1325563"/>
+            <a:chOff x="838200" y="365125"/>
+            <a:chExt cx="10515600" cy="1325563"/>
+          </a:xfrm>
+        </p:grpSpPr>
+        <p:sp>
+          <p:nvSpPr>
+            <p:cNvPr id="5" name="Заголовок 1"/>
+            <p:cNvSpPr txBox="1">
+              <a:spLocks/>
+            </p:cNvSpPr>
+            <p:nvPr/>
+          </p:nvSpPr>
+          <p:spPr>
+            <a:xfrm>
+              <a:off x="838200" y="365125"/>
+              <a:ext cx="10515600" cy="1325563"/>
+            </a:xfrm>
+            <a:prstGeom prst="rect">
+              <a:avLst/>
+            </a:prstGeom>
+          </p:spPr>
+          <p:txBody>
+            <a:bodyPr vert="horz" lIns="91440" tIns="45720" rIns="91440" bIns="45720" rtlCol="0" anchor="ctr">
+              <a:normAutofit/>
+            </a:bodyPr>
+            <a:lstStyle/>
+            <a:p>
+              <a:pPr marL="0" marR="0" lvl="0" indent="0" algn="ctr" defTabSz="914400" rtl="0" eaLnBrk="1" fontAlgn="auto" latinLnBrk="0" hangingPunct="1">
+                <a:lnSpc>
+                  <a:spcPct val="90000"/>
+                </a:lnSpc>
+                <a:spcBef>
+                  <a:spcPct val="0"/>
+                </a:spcBef>
+                <a:spcAft>
+                  <a:spcPts val="0"/>
+                </a:spcAft>
+                <a:buClrTx/>
+                <a:buSzTx/>
+                <a:buFontTx/>
+                <a:buNone/>
+                <a:tabLst/>
+                <a:defRPr/>
+              </a:pPr>
+              <a:r>
+                <a:rPr kumimoji="0" lang="en-US" sz="4400" b="1" i="0" u="none" strike="noStrike" kern="1200" cap="none" spc="0" normalizeH="0" baseline="0" noProof="0" dirty="0">
+                  <a:ln>
+                    <a:noFill/>
+                  </a:ln>
+                  <a:solidFill>
+                    <a:schemeClr val="tx1"/>
+                  </a:solidFill>
+                  <a:effectLst/>
+                  <a:uLnTx/>
+                  <a:uFillTx/>
+                  <a:latin typeface="+mj-lt"/>
+                  <a:ea typeface="+mj-ea"/>
+                  <a:cs typeface="+mj-cs"/>
+                </a:rPr>
+                <a:t>Tasks </a:t>
+              </a:r>
+              <a:endParaRPr kumimoji="0" lang="ru-RU" sz="4400" b="1" i="0" u="none" strike="noStrike" kern="1200" cap="none" spc="0" normalizeH="0" baseline="0" noProof="0" dirty="0">
+                <a:ln>
+                  <a:noFill/>
+                </a:ln>
+                <a:solidFill>
+                  <a:schemeClr val="tx1"/>
+                </a:solidFill>
+                <a:effectLst/>
+                <a:uLnTx/>
+                <a:uFillTx/>
+                <a:latin typeface="+mj-lt"/>
+                <a:ea typeface="+mj-ea"/>
+                <a:cs typeface="+mj-cs"/>
+              </a:endParaRPr>
+            </a:p>
+          </p:txBody>
+        </p:sp>
+        <p:pic>
+          <p:nvPicPr>
+            <p:cNvPr id="6" name="Picture 2" descr="Pin on Бесплатные иконки"/>
+            <p:cNvPicPr>
+              <a:picLocks noChangeAspect="1" noChangeArrowheads="1"/>
+            </p:cNvPicPr>
+            <p:nvPr/>
+          </p:nvPicPr>
+          <p:blipFill>
+            <a:blip r:embed="rId2" cstate="print"/>
+            <a:srcRect/>
+            <a:stretch>
+              <a:fillRect/>
+            </a:stretch>
+          </p:blipFill>
+          <p:spPr bwMode="auto">
+            <a:xfrm>
+              <a:off x="4672711" y="603504"/>
+              <a:ext cx="795401" cy="795401"/>
+            </a:xfrm>
+            <a:prstGeom prst="rect">
+              <a:avLst/>
+            </a:prstGeom>
+            <a:noFill/>
+          </p:spPr>
+        </p:pic>
+      </p:grpSp>
+    </p:spTree>
+    <p:extLst>
+      <p:ext uri="{BB962C8B-B14F-4D97-AF65-F5344CB8AC3E}">
+        <p14:creationId xmlns:p14="http://schemas.microsoft.com/office/powerpoint/2010/main" val="4115074604"/>
+      </p:ext>
+    </p:extLst>
+  </p:cSld>
+  <p:clrMapOvr>
+    <a:masterClrMapping/>
+  </p:clrMapOvr>
+</p:sld>
+</file>
+
+<file path=ppt/slides/slide79.xml><?xml version="1.0" encoding="utf-8"?>
+<p:sld xmlns:a="http://schemas.openxmlformats.org/drawingml/2006/main" xmlns:r="http://schemas.openxmlformats.org/officeDocument/2006/relationships" xmlns:p="http://schemas.openxmlformats.org/presentationml/2006/main">
+  <p:cSld>
+    <p:spTree>
+      <p:nvGrpSpPr>
+        <p:cNvPr id="1" name=""/>
+        <p:cNvGrpSpPr/>
+        <p:nvPr/>
+      </p:nvGrpSpPr>
+      <p:grpSpPr>
+        <a:xfrm>
+          <a:off x="0" y="0"/>
+          <a:ext cx="0" cy="0"/>
+          <a:chOff x="0" y="0"/>
+          <a:chExt cx="0" cy="0"/>
+        </a:xfrm>
+      </p:grpSpPr>
+      <p:sp>
+        <p:nvSpPr>
+          <p:cNvPr id="2" name="Заголовок 1">
+            <a:extLst>
+              <a:ext uri="{FF2B5EF4-FFF2-40B4-BE49-F238E27FC236}">
+                <a16:creationId xmlns:a16="http://schemas.microsoft.com/office/drawing/2014/main" id="{8D95A280-5FEB-4EA5-8201-803FD6BCE384}"/>
+              </a:ext>
+            </a:extLst>
+          </p:cNvPr>
+          <p:cNvSpPr>
+            <a:spLocks noGrp="1"/>
+          </p:cNvSpPr>
+          <p:nvPr>
+            <p:ph type="title"/>
+          </p:nvPr>
+        </p:nvSpPr>
+        <p:spPr/>
+        <p:txBody>
+          <a:bodyPr/>
+          <a:lstStyle/>
+          <a:p>
+            <a:pPr algn="ctr"/>
+            <a:r>
+              <a:rPr lang="en-US" dirty="0"/>
+              <a:t>Object-oriented programming (OOP)</a:t>
+            </a:r>
+            <a:endParaRPr lang="ru-RU" dirty="0"/>
           </a:p>
         </p:txBody>
       </p:sp>
       <p:sp>
         <p:nvSpPr>
-          <p:cNvPr id="4" name="TextBox 3">
+          <p:cNvPr id="3" name="Объект 2">
             <a:extLst>
               <a:ext uri="{FF2B5EF4-FFF2-40B4-BE49-F238E27FC236}">
-                <a16:creationId xmlns:a16="http://schemas.microsoft.com/office/drawing/2014/main" id="{6FDD5A4C-3AF2-4400-ABA3-EB82EB6B7555}"/>
+                <a16:creationId xmlns:a16="http://schemas.microsoft.com/office/drawing/2014/main" id="{D2E05127-BC44-44D2-B8B2-D40989E81AB1}"/>
               </a:ext>
             </a:extLst>
           </p:cNvPr>
-          <p:cNvSpPr txBox="1"/>
-          <p:nvPr/>
+          <p:cNvSpPr>
+            <a:spLocks noGrp="1"/>
+          </p:cNvSpPr>
+          <p:nvPr>
+            <p:ph idx="1"/>
+          </p:nvPr>
         </p:nvSpPr>
-        <p:spPr>
-          <a:xfrm>
-            <a:off x="838200" y="1690688"/>
-            <a:ext cx="10515600" cy="461665"/>
-          </a:xfrm>
-          <a:prstGeom prst="rect">
-            <a:avLst/>
-          </a:prstGeom>
-          <a:noFill/>
-        </p:spPr>
+        <p:spPr/>
         <p:txBody>
-          <a:bodyPr wrap="square" rtlCol="0">
-            <a:spAutoFit/>
-          </a:bodyPr>
+          <a:bodyPr/>
           <a:lstStyle/>
           <a:p>
-            <a:pPr algn="ctr"/>
-            <a:r>
-              <a:rPr lang="en-US" sz="2400" b="1" dirty="0">
-                <a:latin typeface="MV Boli" panose="02000500030200090000" pitchFamily="2" charset="0"/>
-                <a:cs typeface="MV Boli" panose="02000500030200090000" pitchFamily="2" charset="0"/>
-              </a:rPr>
-              <a:t>Your current task is pretty simple – Just finish All </a:t>
-            </a:r>
-            <a:endParaRPr lang="ru-RU" sz="2400" b="1" dirty="0">
-              <a:cs typeface="MV Boli" panose="02000500030200090000" pitchFamily="2" charset="0"/>
-            </a:endParaRPr>
+            <a:endParaRPr lang="ru-RU" dirty="0"/>
           </a:p>
         </p:txBody>
       </p:sp>
     </p:spTree>
     <p:extLst>
       <p:ext uri="{BB962C8B-B14F-4D97-AF65-F5344CB8AC3E}">
-        <p14:creationId xmlns:p14="http://schemas.microsoft.com/office/powerpoint/2010/main" val="1148193553"/>
+        <p14:creationId xmlns:p14="http://schemas.microsoft.com/office/powerpoint/2010/main" val="655160135"/>
       </p:ext>
     </p:extLst>
   </p:cSld>
@@ -24636,6 +25154,312 @@
         </p:spPr>
       </p:pic>
     </p:spTree>
+  </p:cSld>
+  <p:clrMapOvr>
+    <a:masterClrMapping/>
+  </p:clrMapOvr>
+</p:sld>
+</file>
+
+<file path=ppt/slides/slide80.xml><?xml version="1.0" encoding="utf-8"?>
+<p:sld xmlns:a="http://schemas.openxmlformats.org/drawingml/2006/main" xmlns:r="http://schemas.openxmlformats.org/officeDocument/2006/relationships" xmlns:p="http://schemas.openxmlformats.org/presentationml/2006/main">
+  <p:cSld>
+    <p:spTree>
+      <p:nvGrpSpPr>
+        <p:cNvPr id="1" name=""/>
+        <p:cNvGrpSpPr/>
+        <p:nvPr/>
+      </p:nvGrpSpPr>
+      <p:grpSpPr>
+        <a:xfrm>
+          <a:off x="0" y="0"/>
+          <a:ext cx="0" cy="0"/>
+          <a:chOff x="0" y="0"/>
+          <a:chExt cx="0" cy="0"/>
+        </a:xfrm>
+      </p:grpSpPr>
+      <p:sp>
+        <p:nvSpPr>
+          <p:cNvPr id="2" name="Заголовок 1">
+            <a:extLst>
+              <a:ext uri="{FF2B5EF4-FFF2-40B4-BE49-F238E27FC236}">
+                <a16:creationId xmlns:a16="http://schemas.microsoft.com/office/drawing/2014/main" id="{9324FF77-85ED-430A-A432-8E22C22D98B8}"/>
+              </a:ext>
+            </a:extLst>
+          </p:cNvPr>
+          <p:cNvSpPr>
+            <a:spLocks noGrp="1"/>
+          </p:cNvSpPr>
+          <p:nvPr>
+            <p:ph type="title"/>
+          </p:nvPr>
+        </p:nvSpPr>
+        <p:spPr/>
+        <p:txBody>
+          <a:bodyPr/>
+          <a:lstStyle/>
+          <a:p>
+            <a:pPr algn="ctr"/>
+            <a:r>
+              <a:rPr lang="en-US" dirty="0">
+                <a:latin typeface="MV Boli" panose="02000500030200090000" pitchFamily="2" charset="0"/>
+                <a:cs typeface="MV Boli" panose="02000500030200090000" pitchFamily="2" charset="0"/>
+              </a:rPr>
+              <a:t>Final Trials </a:t>
+            </a:r>
+            <a:endParaRPr lang="ru-RU" dirty="0">
+              <a:cs typeface="MV Boli" panose="02000500030200090000" pitchFamily="2" charset="0"/>
+            </a:endParaRPr>
+          </a:p>
+        </p:txBody>
+      </p:sp>
+      <p:sp>
+        <p:nvSpPr>
+          <p:cNvPr id="3" name="Объект 2">
+            <a:extLst>
+              <a:ext uri="{FF2B5EF4-FFF2-40B4-BE49-F238E27FC236}">
+                <a16:creationId xmlns:a16="http://schemas.microsoft.com/office/drawing/2014/main" id="{2ADF3C9B-7FC9-4B7B-953F-F1A81668185B}"/>
+              </a:ext>
+            </a:extLst>
+          </p:cNvPr>
+          <p:cNvSpPr>
+            <a:spLocks noGrp="1"/>
+          </p:cNvSpPr>
+          <p:nvPr>
+            <p:ph idx="1"/>
+          </p:nvPr>
+        </p:nvSpPr>
+        <p:spPr>
+          <a:xfrm>
+            <a:off x="838200" y="2342459"/>
+            <a:ext cx="10515600" cy="4351338"/>
+          </a:xfrm>
+        </p:spPr>
+        <p:txBody>
+          <a:bodyPr>
+            <a:normAutofit fontScale="77500" lnSpcReduction="20000"/>
+          </a:bodyPr>
+          <a:lstStyle/>
+          <a:p>
+            <a:pPr marL="514350" indent="-514350">
+              <a:buFont typeface="+mj-lt"/>
+              <a:buAutoNum type="arabicPeriod"/>
+            </a:pPr>
+            <a:r>
+              <a:rPr lang="en-US" dirty="0">
+                <a:hlinkClick r:id="rId2"/>
+              </a:rPr>
+              <a:t>https://www.codewars.com/kata/52fba66badcd10859f00097e</a:t>
+            </a:r>
+            <a:endParaRPr lang="en-US" dirty="0"/>
+          </a:p>
+          <a:p>
+            <a:pPr marL="514350" indent="-514350">
+              <a:buFont typeface="+mj-lt"/>
+              <a:buAutoNum type="arabicPeriod"/>
+            </a:pPr>
+            <a:r>
+              <a:rPr lang="en-US" dirty="0">
+                <a:hlinkClick r:id="rId3"/>
+              </a:rPr>
+              <a:t>https://www.codewars.com/kata/5667e8f4e3f572a8f2000039</a:t>
+            </a:r>
+            <a:endParaRPr lang="en-US" dirty="0"/>
+          </a:p>
+          <a:p>
+            <a:pPr marL="514350" indent="-514350">
+              <a:buFont typeface="+mj-lt"/>
+              <a:buAutoNum type="arabicPeriod"/>
+            </a:pPr>
+            <a:r>
+              <a:rPr lang="en-US" dirty="0">
+                <a:hlinkClick r:id="rId4"/>
+              </a:rPr>
+              <a:t>https://www.codewars.com/kata/554b4ac871d6813a03000035</a:t>
+            </a:r>
+            <a:endParaRPr lang="en-US" dirty="0"/>
+          </a:p>
+          <a:p>
+            <a:pPr marL="514350" indent="-514350">
+              <a:buFont typeface="+mj-lt"/>
+              <a:buAutoNum type="arabicPeriod"/>
+            </a:pPr>
+            <a:r>
+              <a:rPr lang="en-US" dirty="0">
+                <a:hlinkClick r:id="rId5"/>
+              </a:rPr>
+              <a:t>https://www.codewars.com/kata/546e2562b03326a88e000020</a:t>
+            </a:r>
+            <a:endParaRPr lang="en-US" dirty="0"/>
+          </a:p>
+          <a:p>
+            <a:pPr marL="514350" indent="-514350">
+              <a:buFont typeface="+mj-lt"/>
+              <a:buAutoNum type="arabicPeriod"/>
+            </a:pPr>
+            <a:r>
+              <a:rPr lang="en-US" dirty="0">
+                <a:hlinkClick r:id="rId6"/>
+              </a:rPr>
+              <a:t>https://www.codewars.com/kata/523f5d21c841566fde000009</a:t>
+            </a:r>
+            <a:endParaRPr lang="en-US" dirty="0"/>
+          </a:p>
+          <a:p>
+            <a:pPr marL="514350" indent="-514350">
+              <a:buFont typeface="+mj-lt"/>
+              <a:buAutoNum type="arabicPeriod"/>
+            </a:pPr>
+            <a:r>
+              <a:rPr lang="en-US" dirty="0">
+                <a:hlinkClick r:id="rId7"/>
+              </a:rPr>
+              <a:t>https://www.codewars.com/kata/5526fc09a1bbd946250002dc</a:t>
+            </a:r>
+            <a:endParaRPr lang="en-US" dirty="0"/>
+          </a:p>
+          <a:p>
+            <a:pPr marL="514350" indent="-514350">
+              <a:buFont typeface="+mj-lt"/>
+              <a:buAutoNum type="arabicPeriod"/>
+            </a:pPr>
+            <a:r>
+              <a:rPr lang="en-US" dirty="0">
+                <a:hlinkClick r:id="rId8"/>
+              </a:rPr>
+              <a:t>https://www.codewars.com/kata/54b42f9314d9229fd6000d9c</a:t>
+            </a:r>
+            <a:endParaRPr lang="en-US" dirty="0"/>
+          </a:p>
+          <a:p>
+            <a:pPr marL="514350" indent="-514350">
+              <a:buFont typeface="+mj-lt"/>
+              <a:buAutoNum type="arabicPeriod"/>
+            </a:pPr>
+            <a:r>
+              <a:rPr lang="en-US" dirty="0">
+                <a:hlinkClick r:id="rId9"/>
+              </a:rPr>
+              <a:t>https://www.codewars.com/kata/54da539698b8a2ad76000228</a:t>
+            </a:r>
+            <a:endParaRPr lang="en-US" dirty="0"/>
+          </a:p>
+          <a:p>
+            <a:pPr marL="514350" indent="-514350">
+              <a:buFont typeface="+mj-lt"/>
+              <a:buAutoNum type="arabicPeriod"/>
+            </a:pPr>
+            <a:r>
+              <a:rPr lang="en-US" dirty="0">
+                <a:hlinkClick r:id="rId10"/>
+              </a:rPr>
+              <a:t>https://www.codewars.com/kata/5682e646d5eddc1e21000017</a:t>
+            </a:r>
+            <a:endParaRPr lang="en-US" dirty="0"/>
+          </a:p>
+          <a:p>
+            <a:pPr marL="514350" indent="-514350">
+              <a:buFont typeface="+mj-lt"/>
+              <a:buAutoNum type="arabicPeriod"/>
+            </a:pPr>
+            <a:r>
+              <a:rPr lang="en-US" dirty="0">
+                <a:hlinkClick r:id="rId11"/>
+              </a:rPr>
+              <a:t>https://www.codewars.com/kata/5682e72eb7354b2f39000021</a:t>
+            </a:r>
+            <a:endParaRPr lang="en-US" dirty="0"/>
+          </a:p>
+          <a:p>
+            <a:pPr marL="514350" indent="-514350">
+              <a:buFont typeface="+mj-lt"/>
+              <a:buAutoNum type="arabicPeriod"/>
+            </a:pPr>
+            <a:r>
+              <a:rPr lang="en-US" dirty="0">
+                <a:hlinkClick r:id="rId12"/>
+              </a:rPr>
+              <a:t>https://www.codewars.com/kata/5682e809386707366d000024</a:t>
+            </a:r>
+            <a:endParaRPr lang="en-US" dirty="0"/>
+          </a:p>
+          <a:p>
+            <a:pPr marL="514350" indent="-514350">
+              <a:buFont typeface="+mj-lt"/>
+              <a:buAutoNum type="arabicPeriod"/>
+            </a:pPr>
+            <a:r>
+              <a:rPr lang="en-US" dirty="0">
+                <a:hlinkClick r:id="rId13"/>
+              </a:rPr>
+              <a:t>https://www.codewars.com/kata/5682e545fb263ecf7b000069</a:t>
+            </a:r>
+            <a:endParaRPr lang="en-US" dirty="0"/>
+          </a:p>
+          <a:p>
+            <a:pPr marL="514350" indent="-514350">
+              <a:buFont typeface="+mj-lt"/>
+              <a:buAutoNum type="arabicPeriod"/>
+            </a:pPr>
+            <a:endParaRPr lang="en-US" dirty="0"/>
+          </a:p>
+          <a:p>
+            <a:pPr marL="514350" indent="-514350">
+              <a:buFont typeface="+mj-lt"/>
+              <a:buAutoNum type="arabicPeriod"/>
+            </a:pPr>
+            <a:endParaRPr lang="en-US" dirty="0"/>
+          </a:p>
+        </p:txBody>
+      </p:sp>
+      <p:sp>
+        <p:nvSpPr>
+          <p:cNvPr id="4" name="TextBox 3">
+            <a:extLst>
+              <a:ext uri="{FF2B5EF4-FFF2-40B4-BE49-F238E27FC236}">
+                <a16:creationId xmlns:a16="http://schemas.microsoft.com/office/drawing/2014/main" id="{6FDD5A4C-3AF2-4400-ABA3-EB82EB6B7555}"/>
+              </a:ext>
+            </a:extLst>
+          </p:cNvPr>
+          <p:cNvSpPr txBox="1"/>
+          <p:nvPr/>
+        </p:nvSpPr>
+        <p:spPr>
+          <a:xfrm>
+            <a:off x="838200" y="1690688"/>
+            <a:ext cx="10515600" cy="461665"/>
+          </a:xfrm>
+          <a:prstGeom prst="rect">
+            <a:avLst/>
+          </a:prstGeom>
+          <a:noFill/>
+        </p:spPr>
+        <p:txBody>
+          <a:bodyPr wrap="square" rtlCol="0">
+            <a:spAutoFit/>
+          </a:bodyPr>
+          <a:lstStyle/>
+          <a:p>
+            <a:pPr algn="ctr"/>
+            <a:r>
+              <a:rPr lang="en-US" sz="2400" b="1" dirty="0">
+                <a:latin typeface="MV Boli" panose="02000500030200090000" pitchFamily="2" charset="0"/>
+                <a:cs typeface="MV Boli" panose="02000500030200090000" pitchFamily="2" charset="0"/>
+              </a:rPr>
+              <a:t>Your current task is pretty simple – Just finish All </a:t>
+            </a:r>
+            <a:endParaRPr lang="ru-RU" sz="2400" b="1" dirty="0">
+              <a:cs typeface="MV Boli" panose="02000500030200090000" pitchFamily="2" charset="0"/>
+            </a:endParaRPr>
+          </a:p>
+        </p:txBody>
+      </p:sp>
+    </p:spTree>
+    <p:extLst>
+      <p:ext uri="{BB962C8B-B14F-4D97-AF65-F5344CB8AC3E}">
+        <p14:creationId xmlns:p14="http://schemas.microsoft.com/office/powerpoint/2010/main" val="1148193553"/>
+      </p:ext>
+    </p:extLst>
   </p:cSld>
   <p:clrMapOvr>
     <a:masterClrMapping/>

</xml_diff>

<commit_message>
feat: add classes block
</commit_message>
<xml_diff>
--- a/python 101/python_101.pptx
+++ b/python 101/python_101.pptx
@@ -83,8 +83,19 @@
     <p:sldId id="334" r:id="rId77"/>
     <p:sldId id="335" r:id="rId78"/>
     <p:sldId id="337" r:id="rId79"/>
-    <p:sldId id="336" r:id="rId80"/>
-    <p:sldId id="325" r:id="rId81"/>
+    <p:sldId id="341" r:id="rId80"/>
+    <p:sldId id="336" r:id="rId81"/>
+    <p:sldId id="338" r:id="rId82"/>
+    <p:sldId id="339" r:id="rId83"/>
+    <p:sldId id="340" r:id="rId84"/>
+    <p:sldId id="342" r:id="rId85"/>
+    <p:sldId id="344" r:id="rId86"/>
+    <p:sldId id="343" r:id="rId87"/>
+    <p:sldId id="346" r:id="rId88"/>
+    <p:sldId id="345" r:id="rId89"/>
+    <p:sldId id="350" r:id="rId90"/>
+    <p:sldId id="347" r:id="rId91"/>
+    <p:sldId id="325" r:id="rId92"/>
   </p:sldIdLst>
   <p:sldSz cx="12192000" cy="6858000"/>
   <p:notesSz cx="6858000" cy="9144000"/>
@@ -2788,7 +2799,7 @@
             <a:fld id="{79F9FB66-DBE4-4599-9B3C-E1452FD2AC05}" type="datetimeFigureOut">
               <a:rPr lang="en-US" smtClean="0"/>
               <a:pPr/>
-              <a:t>9/24/2021</a:t>
+              <a:t>9/25/2021</a:t>
             </a:fld>
             <a:endParaRPr lang="en-US" dirty="0"/>
           </a:p>
@@ -2958,7 +2969,7 @@
             <a:fld id="{79F9FB66-DBE4-4599-9B3C-E1452FD2AC05}" type="datetimeFigureOut">
               <a:rPr lang="en-US" smtClean="0"/>
               <a:pPr/>
-              <a:t>9/24/2021</a:t>
+              <a:t>9/25/2021</a:t>
             </a:fld>
             <a:endParaRPr lang="en-US" dirty="0"/>
           </a:p>
@@ -3138,7 +3149,7 @@
             <a:fld id="{79F9FB66-DBE4-4599-9B3C-E1452FD2AC05}" type="datetimeFigureOut">
               <a:rPr lang="en-US" smtClean="0"/>
               <a:pPr/>
-              <a:t>9/24/2021</a:t>
+              <a:t>9/25/2021</a:t>
             </a:fld>
             <a:endParaRPr lang="en-US" dirty="0"/>
           </a:p>
@@ -3308,7 +3319,7 @@
             <a:fld id="{79F9FB66-DBE4-4599-9B3C-E1452FD2AC05}" type="datetimeFigureOut">
               <a:rPr lang="en-US" smtClean="0"/>
               <a:pPr/>
-              <a:t>9/24/2021</a:t>
+              <a:t>9/25/2021</a:t>
             </a:fld>
             <a:endParaRPr lang="en-US" dirty="0"/>
           </a:p>
@@ -3555,7 +3566,7 @@
             <a:fld id="{79F9FB66-DBE4-4599-9B3C-E1452FD2AC05}" type="datetimeFigureOut">
               <a:rPr lang="en-US" smtClean="0"/>
               <a:pPr/>
-              <a:t>9/24/2021</a:t>
+              <a:t>9/25/2021</a:t>
             </a:fld>
             <a:endParaRPr lang="en-US" dirty="0"/>
           </a:p>
@@ -3786,7 +3797,7 @@
             <a:fld id="{79F9FB66-DBE4-4599-9B3C-E1452FD2AC05}" type="datetimeFigureOut">
               <a:rPr lang="en-US" smtClean="0"/>
               <a:pPr/>
-              <a:t>9/24/2021</a:t>
+              <a:t>9/25/2021</a:t>
             </a:fld>
             <a:endParaRPr lang="en-US" dirty="0"/>
           </a:p>
@@ -4152,7 +4163,7 @@
             <a:fld id="{79F9FB66-DBE4-4599-9B3C-E1452FD2AC05}" type="datetimeFigureOut">
               <a:rPr lang="en-US" smtClean="0"/>
               <a:pPr/>
-              <a:t>9/24/2021</a:t>
+              <a:t>9/25/2021</a:t>
             </a:fld>
             <a:endParaRPr lang="en-US" dirty="0"/>
           </a:p>
@@ -4271,7 +4282,7 @@
             <a:fld id="{79F9FB66-DBE4-4599-9B3C-E1452FD2AC05}" type="datetimeFigureOut">
               <a:rPr lang="en-US" smtClean="0"/>
               <a:pPr/>
-              <a:t>9/24/2021</a:t>
+              <a:t>9/25/2021</a:t>
             </a:fld>
             <a:endParaRPr lang="en-US" dirty="0"/>
           </a:p>
@@ -4368,7 +4379,7 @@
             <a:fld id="{79F9FB66-DBE4-4599-9B3C-E1452FD2AC05}" type="datetimeFigureOut">
               <a:rPr lang="en-US" smtClean="0"/>
               <a:pPr/>
-              <a:t>9/24/2021</a:t>
+              <a:t>9/25/2021</a:t>
             </a:fld>
             <a:endParaRPr lang="en-US" dirty="0"/>
           </a:p>
@@ -4645,7 +4656,7 @@
             <a:fld id="{79F9FB66-DBE4-4599-9B3C-E1452FD2AC05}" type="datetimeFigureOut">
               <a:rPr lang="en-US" smtClean="0"/>
               <a:pPr/>
-              <a:t>9/24/2021</a:t>
+              <a:t>9/25/2021</a:t>
             </a:fld>
             <a:endParaRPr lang="en-US" dirty="0"/>
           </a:p>
@@ -4899,7 +4910,7 @@
             <a:fld id="{79F9FB66-DBE4-4599-9B3C-E1452FD2AC05}" type="datetimeFigureOut">
               <a:rPr lang="en-US" smtClean="0"/>
               <a:pPr/>
-              <a:t>9/24/2021</a:t>
+              <a:t>9/25/2021</a:t>
             </a:fld>
             <a:endParaRPr lang="en-US" dirty="0"/>
           </a:p>
@@ -5142,7 +5153,7 @@
             <a:fld id="{79F9FB66-DBE4-4599-9B3C-E1452FD2AC05}" type="datetimeFigureOut">
               <a:rPr lang="en-US" smtClean="0"/>
               <a:pPr/>
-              <a:t>9/24/2021</a:t>
+              <a:t>9/25/2021</a:t>
             </a:fld>
             <a:endParaRPr lang="en-US" dirty="0"/>
           </a:p>
@@ -24648,20 +24659,14 @@
             </a:r>
           </a:p>
           <a:p>
-            <a:pPr marL="971550" lvl="1" indent="-514350">
-              <a:buFont typeface="+mj-lt"/>
-              <a:buAutoNum type="arabicPeriod"/>
-            </a:pPr>
+            <a:pPr lvl="1"/>
             <a:r>
               <a:rPr lang="en-US" dirty="0"/>
               <a:t>User inputs a filename </a:t>
             </a:r>
           </a:p>
           <a:p>
-            <a:pPr marL="971550" lvl="1" indent="-514350">
-              <a:buFont typeface="+mj-lt"/>
-              <a:buAutoNum type="arabicPeriod"/>
-            </a:pPr>
+            <a:pPr lvl="1"/>
             <a:r>
               <a:rPr lang="en-US" dirty="0"/>
               <a:t>The file always must be .txt . To check filename use file.</a:t>
@@ -24680,10 +24685,7 @@
             </a:r>
           </a:p>
           <a:p>
-            <a:pPr marL="971550" lvl="1" indent="-514350">
-              <a:buFont typeface="+mj-lt"/>
-              <a:buAutoNum type="arabicPeriod"/>
-            </a:pPr>
+            <a:pPr lvl="1"/>
             <a:r>
               <a:rPr lang="en-US" dirty="0"/>
               <a:t>Program prints words and letters and finish </a:t>
@@ -24700,30 +24702,21 @@
             </a:r>
           </a:p>
           <a:p>
-            <a:pPr marL="971550" lvl="1" indent="-514350">
-              <a:buFont typeface="+mj-lt"/>
-              <a:buAutoNum type="arabicPeriod"/>
-            </a:pPr>
+            <a:pPr lvl="1"/>
             <a:r>
               <a:rPr lang="en-US" dirty="0"/>
               <a:t>User inputs a filename</a:t>
             </a:r>
           </a:p>
           <a:p>
-            <a:pPr marL="971550" lvl="1" indent="-514350">
-              <a:buFont typeface="+mj-lt"/>
-              <a:buAutoNum type="arabicPeriod"/>
-            </a:pPr>
+            <a:pPr lvl="1"/>
             <a:r>
               <a:rPr lang="en-US" dirty="0"/>
               <a:t>The program counts a monthly sum by values in file</a:t>
             </a:r>
           </a:p>
           <a:p>
-            <a:pPr marL="971550" lvl="1" indent="-514350">
-              <a:buFont typeface="+mj-lt"/>
-              <a:buAutoNum type="arabicPeriod"/>
-            </a:pPr>
+            <a:pPr lvl="1"/>
             <a:r>
               <a:rPr lang="en-US" dirty="0"/>
               <a:t>Value = </a:t>
@@ -24738,30 +24731,21 @@
             </a:r>
           </a:p>
           <a:p>
-            <a:pPr marL="971550" lvl="1" indent="-514350">
-              <a:buFont typeface="+mj-lt"/>
-              <a:buAutoNum type="arabicPeriod"/>
-            </a:pPr>
+            <a:pPr lvl="1"/>
             <a:r>
               <a:rPr lang="en-US" dirty="0"/>
               <a:t>Each value is a line</a:t>
             </a:r>
           </a:p>
           <a:p>
-            <a:pPr marL="971550" lvl="1" indent="-514350">
-              <a:buFont typeface="+mj-lt"/>
-              <a:buAutoNum type="arabicPeriod"/>
-            </a:pPr>
+            <a:pPr lvl="1"/>
             <a:r>
               <a:rPr lang="en-US" dirty="0"/>
               <a:t>Program write a calculated sum in ‘output.txt’ in format – filename: sum</a:t>
             </a:r>
           </a:p>
           <a:p>
-            <a:pPr marL="971550" lvl="1" indent="-514350">
-              <a:buFont typeface="+mj-lt"/>
-              <a:buAutoNum type="arabicPeriod"/>
-            </a:pPr>
+            <a:pPr lvl="1"/>
             <a:r>
               <a:rPr lang="en-US" dirty="0"/>
               <a:t>Filename and structure are always correct</a:t>
@@ -24916,13 +24900,7 @@
       </p:grpSpPr>
       <p:sp>
         <p:nvSpPr>
-          <p:cNvPr id="2" name="Заголовок 1">
-            <a:extLst>
-              <a:ext uri="{FF2B5EF4-FFF2-40B4-BE49-F238E27FC236}">
-                <a16:creationId xmlns:a16="http://schemas.microsoft.com/office/drawing/2014/main" id="{8D95A280-5FEB-4EA5-8201-803FD6BCE384}"/>
-              </a:ext>
-            </a:extLst>
-          </p:cNvPr>
+          <p:cNvPr id="2" name="Заголовок 1"/>
           <p:cNvSpPr>
             <a:spLocks noGrp="1"/>
           </p:cNvSpPr>
@@ -24930,49 +24908,33 @@
             <p:ph type="title"/>
           </p:nvPr>
         </p:nvSpPr>
-        <p:spPr/>
+        <p:spPr>
+          <a:xfrm>
+            <a:off x="856488" y="2431669"/>
+            <a:ext cx="10515600" cy="1325563"/>
+          </a:xfrm>
+        </p:spPr>
         <p:txBody>
-          <a:bodyPr/>
+          <a:bodyPr>
+            <a:normAutofit/>
+          </a:bodyPr>
           <a:lstStyle/>
           <a:p>
             <a:pPr algn="ctr"/>
             <a:r>
-              <a:rPr lang="en-US" dirty="0"/>
-              <a:t>Object-oriented programming (OOP)</a:t>
-            </a:r>
-            <a:endParaRPr lang="ru-RU" dirty="0"/>
-          </a:p>
-        </p:txBody>
-      </p:sp>
-      <p:sp>
-        <p:nvSpPr>
-          <p:cNvPr id="3" name="Объект 2">
-            <a:extLst>
-              <a:ext uri="{FF2B5EF4-FFF2-40B4-BE49-F238E27FC236}">
-                <a16:creationId xmlns:a16="http://schemas.microsoft.com/office/drawing/2014/main" id="{D2E05127-BC44-44D2-B8B2-D40989E81AB1}"/>
-              </a:ext>
-            </a:extLst>
-          </p:cNvPr>
-          <p:cNvSpPr>
-            <a:spLocks noGrp="1"/>
-          </p:cNvSpPr>
-          <p:nvPr>
-            <p:ph idx="1"/>
-          </p:nvPr>
-        </p:nvSpPr>
-        <p:spPr/>
-        <p:txBody>
-          <a:bodyPr/>
-          <a:lstStyle/>
-          <a:p>
-            <a:endParaRPr lang="ru-RU" dirty="0"/>
+              <a:rPr lang="en-US" sz="8800" dirty="0">
+                <a:latin typeface="Forte" pitchFamily="66" charset="0"/>
+              </a:rPr>
+              <a:t>Coffee Break </a:t>
+            </a:r>
+            <a:endParaRPr lang="ru-RU" sz="8800" dirty="0"/>
           </a:p>
         </p:txBody>
       </p:sp>
     </p:spTree>
     <p:extLst>
       <p:ext uri="{BB962C8B-B14F-4D97-AF65-F5344CB8AC3E}">
-        <p14:creationId xmlns:p14="http://schemas.microsoft.com/office/powerpoint/2010/main" val="655160135"/>
+        <p14:creationId xmlns:p14="http://schemas.microsoft.com/office/powerpoint/2010/main" val="558985161"/>
       </p:ext>
     </p:extLst>
   </p:cSld>
@@ -25180,10 +25142,64 @@
       </p:grpSpPr>
       <p:sp>
         <p:nvSpPr>
+          <p:cNvPr id="4" name="Прямоугольник 3">
+            <a:extLst>
+              <a:ext uri="{FF2B5EF4-FFF2-40B4-BE49-F238E27FC236}">
+                <a16:creationId xmlns:a16="http://schemas.microsoft.com/office/drawing/2014/main" id="{AA8AE051-34B2-4FE9-9D1F-43B45ACB2474}"/>
+              </a:ext>
+            </a:extLst>
+          </p:cNvPr>
+          <p:cNvSpPr/>
+          <p:nvPr/>
+        </p:nvSpPr>
+        <p:spPr>
+          <a:xfrm>
+            <a:off x="1934817" y="993913"/>
+            <a:ext cx="8335618" cy="371061"/>
+          </a:xfrm>
+          <a:prstGeom prst="rect">
+            <a:avLst/>
+          </a:prstGeom>
+          <a:solidFill>
+            <a:srgbClr val="65F8FF"/>
+          </a:solidFill>
+          <a:ln>
+            <a:solidFill>
+              <a:srgbClr val="65F8FF"/>
+            </a:solidFill>
+          </a:ln>
+        </p:spPr>
+        <p:style>
+          <a:lnRef idx="2">
+            <a:schemeClr val="accent1">
+              <a:shade val="50000"/>
+            </a:schemeClr>
+          </a:lnRef>
+          <a:fillRef idx="1">
+            <a:schemeClr val="accent1"/>
+          </a:fillRef>
+          <a:effectRef idx="0">
+            <a:schemeClr val="accent1"/>
+          </a:effectRef>
+          <a:fontRef idx="minor">
+            <a:schemeClr val="lt1"/>
+          </a:fontRef>
+        </p:style>
+        <p:txBody>
+          <a:bodyPr rtlCol="0" anchor="ctr"/>
+          <a:lstStyle/>
+          <a:p>
+            <a:pPr algn="ctr"/>
+            <a:endParaRPr lang="ru-RU"/>
+          </a:p>
+        </p:txBody>
+      </p:sp>
+      <p:sp>
+        <p:nvSpPr>
           <p:cNvPr id="2" name="Заголовок 1">
             <a:extLst>
               <a:ext uri="{FF2B5EF4-FFF2-40B4-BE49-F238E27FC236}">
-                <a16:creationId xmlns:a16="http://schemas.microsoft.com/office/drawing/2014/main" id="{9324FF77-85ED-430A-A432-8E22C22D98B8}"/>
+                <a16:creationId xmlns:a16="http://schemas.microsoft.com/office/drawing/2014/main" id="{8D95A280-5FEB-4EA5-8201-803FD6BCE384}"/>
               </a:ext>
             </a:extLst>
           </p:cNvPr>
@@ -25201,15 +25217,10 @@
           <a:p>
             <a:pPr algn="ctr"/>
             <a:r>
-              <a:rPr lang="en-US" dirty="0">
-                <a:latin typeface="MV Boli" panose="02000500030200090000" pitchFamily="2" charset="0"/>
-                <a:cs typeface="MV Boli" panose="02000500030200090000" pitchFamily="2" charset="0"/>
-              </a:rPr>
-              <a:t>Final Trials </a:t>
-            </a:r>
-            <a:endParaRPr lang="ru-RU" dirty="0">
-              <a:cs typeface="MV Boli" panose="02000500030200090000" pitchFamily="2" charset="0"/>
-            </a:endParaRPr>
+              <a:rPr lang="en-US" dirty="0"/>
+              <a:t>Object-oriented programming (OOP)</a:t>
+            </a:r>
+            <a:endParaRPr lang="ru-RU" dirty="0"/>
           </a:p>
         </p:txBody>
       </p:sp>
@@ -25218,7 +25229,175 @@
           <p:cNvPr id="3" name="Объект 2">
             <a:extLst>
               <a:ext uri="{FF2B5EF4-FFF2-40B4-BE49-F238E27FC236}">
-                <a16:creationId xmlns:a16="http://schemas.microsoft.com/office/drawing/2014/main" id="{2ADF3C9B-7FC9-4B7B-953F-F1A81668185B}"/>
+                <a16:creationId xmlns:a16="http://schemas.microsoft.com/office/drawing/2014/main" id="{D2E05127-BC44-44D2-B8B2-D40989E81AB1}"/>
+              </a:ext>
+            </a:extLst>
+          </p:cNvPr>
+          <p:cNvSpPr>
+            <a:spLocks noGrp="1"/>
+          </p:cNvSpPr>
+          <p:nvPr>
+            <p:ph idx="1"/>
+          </p:nvPr>
+        </p:nvSpPr>
+        <p:spPr/>
+        <p:txBody>
+          <a:bodyPr>
+            <a:normAutofit fontScale="92500" lnSpcReduction="10000"/>
+          </a:bodyPr>
+          <a:lstStyle/>
+          <a:p>
+            <a:r>
+              <a:rPr lang="en-US" dirty="0"/>
+              <a:t>Python is an object-oriented programming language. Almost everything in Python is an object, with its properties(attributes) and methods.</a:t>
+            </a:r>
+          </a:p>
+          <a:p>
+            <a:r>
+              <a:rPr lang="en-US" dirty="0"/>
+              <a:t>Class is the basic structure of an object. You may think about object as a blueprint of real things like a Car, Airport, or Human.</a:t>
+            </a:r>
+          </a:p>
+          <a:p>
+            <a:r>
+              <a:rPr lang="en-US" dirty="0"/>
+              <a:t> Single objects created by Class is named instance. An example, A Car that has a brand, model, max speed, and may ride, stop, and show a fuel level, and The instance Ford Mustang with a max speed equals 200 mph.</a:t>
+            </a:r>
+          </a:p>
+          <a:p>
+            <a:r>
+              <a:rPr lang="en-US" dirty="0"/>
+              <a:t>There are 3 main concepts of OOP :</a:t>
+            </a:r>
+          </a:p>
+          <a:p>
+            <a:pPr lvl="1" algn="ctr"/>
+            <a:r>
+              <a:rPr lang="en-US" dirty="0">
+                <a:solidFill>
+                  <a:schemeClr val="accent1">
+                    <a:lumMod val="50000"/>
+                  </a:schemeClr>
+                </a:solidFill>
+              </a:rPr>
+              <a:t>Encapsulation </a:t>
+            </a:r>
+            <a:endParaRPr lang="ru-RU" dirty="0">
+              <a:solidFill>
+                <a:schemeClr val="accent1">
+                  <a:lumMod val="50000"/>
+                </a:schemeClr>
+              </a:solidFill>
+            </a:endParaRPr>
+          </a:p>
+          <a:p>
+            <a:pPr lvl="1" algn="ctr"/>
+            <a:r>
+              <a:rPr lang="en-US" dirty="0">
+                <a:solidFill>
+                  <a:schemeClr val="accent1">
+                    <a:lumMod val="50000"/>
+                  </a:schemeClr>
+                </a:solidFill>
+              </a:rPr>
+              <a:t>Inheritance</a:t>
+            </a:r>
+            <a:endParaRPr lang="ru-RU" dirty="0">
+              <a:solidFill>
+                <a:schemeClr val="accent1">
+                  <a:lumMod val="50000"/>
+                </a:schemeClr>
+              </a:solidFill>
+            </a:endParaRPr>
+          </a:p>
+          <a:p>
+            <a:pPr lvl="1" algn="ctr"/>
+            <a:r>
+              <a:rPr lang="en-US" dirty="0">
+                <a:solidFill>
+                  <a:schemeClr val="accent1">
+                    <a:lumMod val="50000"/>
+                  </a:schemeClr>
+                </a:solidFill>
+              </a:rPr>
+              <a:t>Polymorphism</a:t>
+            </a:r>
+            <a:endParaRPr lang="ru-RU" dirty="0">
+              <a:solidFill>
+                <a:schemeClr val="accent1">
+                  <a:lumMod val="50000"/>
+                </a:schemeClr>
+              </a:solidFill>
+            </a:endParaRPr>
+          </a:p>
+        </p:txBody>
+      </p:sp>
+    </p:spTree>
+    <p:extLst>
+      <p:ext uri="{BB962C8B-B14F-4D97-AF65-F5344CB8AC3E}">
+        <p14:creationId xmlns:p14="http://schemas.microsoft.com/office/powerpoint/2010/main" val="655160135"/>
+      </p:ext>
+    </p:extLst>
+  </p:cSld>
+  <p:clrMapOvr>
+    <a:masterClrMapping/>
+  </p:clrMapOvr>
+</p:sld>
+</file>
+
+<file path=ppt/slides/slide81.xml><?xml version="1.0" encoding="utf-8"?>
+<p:sld xmlns:a="http://schemas.openxmlformats.org/drawingml/2006/main" xmlns:r="http://schemas.openxmlformats.org/officeDocument/2006/relationships" xmlns:p="http://schemas.openxmlformats.org/presentationml/2006/main">
+  <p:cSld>
+    <p:spTree>
+      <p:nvGrpSpPr>
+        <p:cNvPr id="1" name=""/>
+        <p:cNvGrpSpPr/>
+        <p:nvPr/>
+      </p:nvGrpSpPr>
+      <p:grpSpPr>
+        <a:xfrm>
+          <a:off x="0" y="0"/>
+          <a:ext cx="0" cy="0"/>
+          <a:chOff x="0" y="0"/>
+          <a:chExt cx="0" cy="0"/>
+        </a:xfrm>
+      </p:grpSpPr>
+      <p:sp>
+        <p:nvSpPr>
+          <p:cNvPr id="2" name="Заголовок 1">
+            <a:extLst>
+              <a:ext uri="{FF2B5EF4-FFF2-40B4-BE49-F238E27FC236}">
+                <a16:creationId xmlns:a16="http://schemas.microsoft.com/office/drawing/2014/main" id="{FF45E2BF-DFCD-4655-AF53-BFA95A0A6A2C}"/>
+              </a:ext>
+            </a:extLst>
+          </p:cNvPr>
+          <p:cNvSpPr>
+            <a:spLocks noGrp="1"/>
+          </p:cNvSpPr>
+          <p:nvPr>
+            <p:ph type="title"/>
+          </p:nvPr>
+        </p:nvSpPr>
+        <p:spPr/>
+        <p:txBody>
+          <a:bodyPr/>
+          <a:lstStyle/>
+          <a:p>
+            <a:pPr algn="ctr"/>
+            <a:r>
+              <a:rPr lang="en-US" dirty="0"/>
+              <a:t>Create Class</a:t>
+            </a:r>
+            <a:endParaRPr lang="ru-RU" dirty="0"/>
+          </a:p>
+        </p:txBody>
+      </p:sp>
+      <p:sp>
+        <p:nvSpPr>
+          <p:cNvPr id="3" name="Объект 2">
+            <a:extLst>
+              <a:ext uri="{FF2B5EF4-FFF2-40B4-BE49-F238E27FC236}">
+                <a16:creationId xmlns:a16="http://schemas.microsoft.com/office/drawing/2014/main" id="{EB35C2B3-F10E-4E08-9A9C-769A74BB2BC0}"/>
               </a:ext>
             </a:extLst>
           </p:cNvPr>
@@ -25231,8 +25410,8 @@
         </p:nvSpPr>
         <p:spPr>
           <a:xfrm>
-            <a:off x="838200" y="2342459"/>
-            <a:ext cx="10515600" cy="4351338"/>
+            <a:off x="838200" y="1825624"/>
+            <a:ext cx="5734878" cy="4906480"/>
           </a:xfrm>
         </p:spPr>
         <p:txBody>
@@ -25241,30 +25420,1921 @@
           </a:bodyPr>
           <a:lstStyle/>
           <a:p>
+            <a:r>
+              <a:rPr lang="en-US" dirty="0"/>
+              <a:t>Before we start learning concepts, we need to know how to create a Class and work with it. </a:t>
+            </a:r>
+          </a:p>
+          <a:p>
+            <a:r>
+              <a:rPr lang="en-US" dirty="0"/>
+              <a:t>Use syntax – </a:t>
+            </a:r>
+          </a:p>
+          <a:p>
+            <a:pPr marL="457200" lvl="1" indent="0">
+              <a:buNone/>
+            </a:pPr>
+            <a:r>
+              <a:rPr lang="en-US" dirty="0"/>
+              <a:t>class &lt;</a:t>
+            </a:r>
+            <a:r>
+              <a:rPr lang="en-US" dirty="0" err="1"/>
+              <a:t>className</a:t>
+            </a:r>
+            <a:r>
+              <a:rPr lang="en-US" dirty="0"/>
+              <a:t>&gt;:</a:t>
+            </a:r>
+          </a:p>
+          <a:p>
+            <a:pPr marL="914400" lvl="2" indent="0">
+              <a:buNone/>
+            </a:pPr>
+            <a:r>
+              <a:rPr lang="en-US" dirty="0"/>
+              <a:t>…class description</a:t>
+            </a:r>
+          </a:p>
+          <a:p>
+            <a:r>
+              <a:rPr lang="en-US" dirty="0"/>
+              <a:t>Then we add some properties</a:t>
+            </a:r>
+          </a:p>
+          <a:p>
+            <a:r>
+              <a:rPr lang="en-US" dirty="0"/>
+              <a:t>Add methods. Note that we declare an argument, but do not provide it when we call a method. </a:t>
+            </a:r>
+          </a:p>
+          <a:p>
+            <a:r>
+              <a:rPr lang="en-US" dirty="0"/>
+              <a:t>Now you can create an instance of Class. But it does not work as we want, because is a stupid class.</a:t>
+            </a:r>
+          </a:p>
+          <a:p>
+            <a:r>
+              <a:rPr lang="en-US" dirty="0"/>
+              <a:t>And it’s not all. For real Class, we need a constructor. For this python provide a private method __</a:t>
+            </a:r>
+            <a:r>
+              <a:rPr lang="en-US" dirty="0" err="1"/>
+              <a:t>init</a:t>
+            </a:r>
+            <a:r>
+              <a:rPr lang="en-US" dirty="0"/>
+              <a:t>__ that calls every time when instance will create</a:t>
+            </a:r>
+            <a:endParaRPr lang="ru-RU" dirty="0"/>
+          </a:p>
+        </p:txBody>
+      </p:sp>
+      <p:pic>
+        <p:nvPicPr>
+          <p:cNvPr id="4" name="Рисунок 3">
+            <a:extLst>
+              <a:ext uri="{FF2B5EF4-FFF2-40B4-BE49-F238E27FC236}">
+                <a16:creationId xmlns:a16="http://schemas.microsoft.com/office/drawing/2014/main" id="{65A25F9C-20BD-4BF6-9DB1-5591C02602BB}"/>
+              </a:ext>
+            </a:extLst>
+          </p:cNvPr>
+          <p:cNvPicPr>
+            <a:picLocks noChangeAspect="1"/>
+          </p:cNvPicPr>
+          <p:nvPr/>
+        </p:nvPicPr>
+        <p:blipFill>
+          <a:blip r:embed="rId2"/>
+          <a:stretch>
+            <a:fillRect/>
+          </a:stretch>
+        </p:blipFill>
+        <p:spPr>
+          <a:xfrm>
+            <a:off x="6880363" y="2247143"/>
+            <a:ext cx="1609787" cy="626028"/>
+          </a:xfrm>
+          <a:prstGeom prst="rect">
+            <a:avLst/>
+          </a:prstGeom>
+        </p:spPr>
+      </p:pic>
+      <p:pic>
+        <p:nvPicPr>
+          <p:cNvPr id="5" name="Рисунок 4">
+            <a:extLst>
+              <a:ext uri="{FF2B5EF4-FFF2-40B4-BE49-F238E27FC236}">
+                <a16:creationId xmlns:a16="http://schemas.microsoft.com/office/drawing/2014/main" id="{5AA2B3BA-D7DB-4528-99A0-A434FA9607FE}"/>
+              </a:ext>
+            </a:extLst>
+          </p:cNvPr>
+          <p:cNvPicPr>
+            <a:picLocks noChangeAspect="1"/>
+          </p:cNvPicPr>
+          <p:nvPr/>
+        </p:nvPicPr>
+        <p:blipFill>
+          <a:blip r:embed="rId3"/>
+          <a:stretch>
+            <a:fillRect/>
+          </a:stretch>
+        </p:blipFill>
+        <p:spPr>
+          <a:xfrm>
+            <a:off x="6880363" y="3057250"/>
+            <a:ext cx="1639597" cy="626028"/>
+          </a:xfrm>
+          <a:prstGeom prst="rect">
+            <a:avLst/>
+          </a:prstGeom>
+        </p:spPr>
+      </p:pic>
+      <p:pic>
+        <p:nvPicPr>
+          <p:cNvPr id="7" name="Рисунок 6">
+            <a:extLst>
+              <a:ext uri="{FF2B5EF4-FFF2-40B4-BE49-F238E27FC236}">
+                <a16:creationId xmlns:a16="http://schemas.microsoft.com/office/drawing/2014/main" id="{FD074978-8411-439F-ABD6-BAF95AC9438B}"/>
+              </a:ext>
+            </a:extLst>
+          </p:cNvPr>
+          <p:cNvPicPr>
+            <a:picLocks noChangeAspect="1"/>
+          </p:cNvPicPr>
+          <p:nvPr/>
+        </p:nvPicPr>
+        <p:blipFill>
+          <a:blip r:embed="rId4"/>
+          <a:stretch>
+            <a:fillRect/>
+          </a:stretch>
+        </p:blipFill>
+        <p:spPr>
+          <a:xfrm>
+            <a:off x="6880363" y="3867357"/>
+            <a:ext cx="2502176" cy="1278645"/>
+          </a:xfrm>
+          <a:prstGeom prst="rect">
+            <a:avLst/>
+          </a:prstGeom>
+        </p:spPr>
+      </p:pic>
+    </p:spTree>
+    <p:extLst>
+      <p:ext uri="{BB962C8B-B14F-4D97-AF65-F5344CB8AC3E}">
+        <p14:creationId xmlns:p14="http://schemas.microsoft.com/office/powerpoint/2010/main" val="928083373"/>
+      </p:ext>
+    </p:extLst>
+  </p:cSld>
+  <p:clrMapOvr>
+    <a:masterClrMapping/>
+  </p:clrMapOvr>
+</p:sld>
+</file>
+
+<file path=ppt/slides/slide82.xml><?xml version="1.0" encoding="utf-8"?>
+<p:sld xmlns:a="http://schemas.openxmlformats.org/drawingml/2006/main" xmlns:r="http://schemas.openxmlformats.org/officeDocument/2006/relationships" xmlns:p="http://schemas.openxmlformats.org/presentationml/2006/main">
+  <p:cSld>
+    <p:spTree>
+      <p:nvGrpSpPr>
+        <p:cNvPr id="1" name=""/>
+        <p:cNvGrpSpPr/>
+        <p:nvPr/>
+      </p:nvGrpSpPr>
+      <p:grpSpPr>
+        <a:xfrm>
+          <a:off x="0" y="0"/>
+          <a:ext cx="0" cy="0"/>
+          <a:chOff x="0" y="0"/>
+          <a:chExt cx="0" cy="0"/>
+        </a:xfrm>
+      </p:grpSpPr>
+      <p:sp>
+        <p:nvSpPr>
+          <p:cNvPr id="2" name="Заголовок 1">
+            <a:extLst>
+              <a:ext uri="{FF2B5EF4-FFF2-40B4-BE49-F238E27FC236}">
+                <a16:creationId xmlns:a16="http://schemas.microsoft.com/office/drawing/2014/main" id="{027DF091-AF21-4552-9DE5-4F8C7458D798}"/>
+              </a:ext>
+            </a:extLst>
+          </p:cNvPr>
+          <p:cNvSpPr>
+            <a:spLocks noGrp="1"/>
+          </p:cNvSpPr>
+          <p:nvPr>
+            <p:ph type="title"/>
+          </p:nvPr>
+        </p:nvSpPr>
+        <p:spPr/>
+        <p:txBody>
+          <a:bodyPr/>
+          <a:lstStyle/>
+          <a:p>
+            <a:pPr algn="ctr"/>
+            <a:r>
+              <a:rPr lang="en-US" dirty="0"/>
+              <a:t>__</a:t>
+            </a:r>
+            <a:r>
+              <a:rPr lang="en-US" dirty="0" err="1"/>
+              <a:t>init</a:t>
+            </a:r>
+            <a:r>
+              <a:rPr lang="en-US" dirty="0"/>
+              <a:t>__</a:t>
+            </a:r>
+            <a:endParaRPr lang="ru-RU" dirty="0"/>
+          </a:p>
+        </p:txBody>
+      </p:sp>
+      <p:sp>
+        <p:nvSpPr>
+          <p:cNvPr id="3" name="Объект 2">
+            <a:extLst>
+              <a:ext uri="{FF2B5EF4-FFF2-40B4-BE49-F238E27FC236}">
+                <a16:creationId xmlns:a16="http://schemas.microsoft.com/office/drawing/2014/main" id="{09796AA5-6123-4B46-94FF-357B3914FD96}"/>
+              </a:ext>
+            </a:extLst>
+          </p:cNvPr>
+          <p:cNvSpPr>
+            <a:spLocks noGrp="1"/>
+          </p:cNvSpPr>
+          <p:nvPr>
+            <p:ph idx="1"/>
+          </p:nvPr>
+        </p:nvSpPr>
+        <p:spPr>
+          <a:xfrm>
+            <a:off x="838200" y="1825625"/>
+            <a:ext cx="5973417" cy="4667250"/>
+          </a:xfrm>
+        </p:spPr>
+        <p:txBody>
+          <a:bodyPr>
+            <a:normAutofit lnSpcReduction="10000"/>
+          </a:bodyPr>
+          <a:lstStyle/>
+          <a:p>
+            <a:r>
+              <a:rPr lang="en-US" dirty="0"/>
+              <a:t>To create a constructor we must define a __</a:t>
+            </a:r>
+            <a:r>
+              <a:rPr lang="en-US" dirty="0" err="1"/>
+              <a:t>init</a:t>
+            </a:r>
+            <a:r>
+              <a:rPr lang="en-US" dirty="0"/>
+              <a:t>__ into our Class. It takes an argument that refers to the created instance itself, historically in python, it is named – self</a:t>
+            </a:r>
+          </a:p>
+          <a:p>
+            <a:r>
+              <a:rPr lang="en-US" dirty="0"/>
+              <a:t>Also, __</a:t>
+            </a:r>
+            <a:r>
+              <a:rPr lang="en-US" dirty="0" err="1"/>
+              <a:t>init</a:t>
+            </a:r>
+            <a:r>
+              <a:rPr lang="en-US" dirty="0"/>
+              <a:t>__ may takes any arguments that you want to provide. This arguments will be a properties(attributes) of the instance.</a:t>
+            </a:r>
+          </a:p>
+          <a:p>
+            <a:r>
+              <a:rPr lang="en-US" dirty="0"/>
+              <a:t>You may think about a constructor as a factory that builds an instance with a given property</a:t>
+            </a:r>
+          </a:p>
+        </p:txBody>
+      </p:sp>
+      <p:pic>
+        <p:nvPicPr>
+          <p:cNvPr id="4" name="Рисунок 3">
+            <a:extLst>
+              <a:ext uri="{FF2B5EF4-FFF2-40B4-BE49-F238E27FC236}">
+                <a16:creationId xmlns:a16="http://schemas.microsoft.com/office/drawing/2014/main" id="{9FAA2C3E-C77F-4C32-AB65-5CF75D3BED95}"/>
+              </a:ext>
+            </a:extLst>
+          </p:cNvPr>
+          <p:cNvPicPr>
+            <a:picLocks noChangeAspect="1"/>
+          </p:cNvPicPr>
+          <p:nvPr/>
+        </p:nvPicPr>
+        <p:blipFill>
+          <a:blip r:embed="rId2"/>
+          <a:stretch>
+            <a:fillRect/>
+          </a:stretch>
+        </p:blipFill>
+        <p:spPr>
+          <a:xfrm>
+            <a:off x="7456833" y="2035864"/>
+            <a:ext cx="2407682" cy="945875"/>
+          </a:xfrm>
+          <a:prstGeom prst="rect">
+            <a:avLst/>
+          </a:prstGeom>
+        </p:spPr>
+      </p:pic>
+      <p:pic>
+        <p:nvPicPr>
+          <p:cNvPr id="5" name="Рисунок 4">
+            <a:extLst>
+              <a:ext uri="{FF2B5EF4-FFF2-40B4-BE49-F238E27FC236}">
+                <a16:creationId xmlns:a16="http://schemas.microsoft.com/office/drawing/2014/main" id="{69741695-9E07-4D51-B9DD-16547BBABCC9}"/>
+              </a:ext>
+            </a:extLst>
+          </p:cNvPr>
+          <p:cNvPicPr>
+            <a:picLocks noChangeAspect="1"/>
+          </p:cNvPicPr>
+          <p:nvPr/>
+        </p:nvPicPr>
+        <p:blipFill>
+          <a:blip r:embed="rId3"/>
+          <a:stretch>
+            <a:fillRect/>
+          </a:stretch>
+        </p:blipFill>
+        <p:spPr>
+          <a:xfrm>
+            <a:off x="7491619" y="3876261"/>
+            <a:ext cx="3696112" cy="1689651"/>
+          </a:xfrm>
+          <a:prstGeom prst="rect">
+            <a:avLst/>
+          </a:prstGeom>
+        </p:spPr>
+      </p:pic>
+    </p:spTree>
+    <p:extLst>
+      <p:ext uri="{BB962C8B-B14F-4D97-AF65-F5344CB8AC3E}">
+        <p14:creationId xmlns:p14="http://schemas.microsoft.com/office/powerpoint/2010/main" val="2796483028"/>
+      </p:ext>
+    </p:extLst>
+  </p:cSld>
+  <p:clrMapOvr>
+    <a:masterClrMapping/>
+  </p:clrMapOvr>
+</p:sld>
+</file>
+
+<file path=ppt/slides/slide83.xml><?xml version="1.0" encoding="utf-8"?>
+<p:sld xmlns:a="http://schemas.openxmlformats.org/drawingml/2006/main" xmlns:r="http://schemas.openxmlformats.org/officeDocument/2006/relationships" xmlns:p="http://schemas.openxmlformats.org/presentationml/2006/main">
+  <p:cSld>
+    <p:spTree>
+      <p:nvGrpSpPr>
+        <p:cNvPr id="1" name=""/>
+        <p:cNvGrpSpPr/>
+        <p:nvPr/>
+      </p:nvGrpSpPr>
+      <p:grpSpPr>
+        <a:xfrm>
+          <a:off x="0" y="0"/>
+          <a:ext cx="0" cy="0"/>
+          <a:chOff x="0" y="0"/>
+          <a:chExt cx="0" cy="0"/>
+        </a:xfrm>
+      </p:grpSpPr>
+      <p:sp>
+        <p:nvSpPr>
+          <p:cNvPr id="2" name="Заголовок 1">
+            <a:extLst>
+              <a:ext uri="{FF2B5EF4-FFF2-40B4-BE49-F238E27FC236}">
+                <a16:creationId xmlns:a16="http://schemas.microsoft.com/office/drawing/2014/main" id="{1E9A4A0F-FB6D-4785-8380-C1A060792231}"/>
+              </a:ext>
+            </a:extLst>
+          </p:cNvPr>
+          <p:cNvSpPr>
+            <a:spLocks noGrp="1"/>
+          </p:cNvSpPr>
+          <p:nvPr>
+            <p:ph type="title"/>
+          </p:nvPr>
+        </p:nvSpPr>
+        <p:spPr/>
+        <p:txBody>
+          <a:bodyPr/>
+          <a:lstStyle/>
+          <a:p>
+            <a:pPr algn="ctr"/>
+            <a:r>
+              <a:rPr lang="en-US" dirty="0"/>
+              <a:t>Add property</a:t>
+            </a:r>
+            <a:endParaRPr lang="ru-RU" dirty="0"/>
+          </a:p>
+        </p:txBody>
+      </p:sp>
+      <p:sp>
+        <p:nvSpPr>
+          <p:cNvPr id="3" name="Объект 2">
+            <a:extLst>
+              <a:ext uri="{FF2B5EF4-FFF2-40B4-BE49-F238E27FC236}">
+                <a16:creationId xmlns:a16="http://schemas.microsoft.com/office/drawing/2014/main" id="{F850EB84-8D97-4F3E-8D0B-BEB9ED855D91}"/>
+              </a:ext>
+            </a:extLst>
+          </p:cNvPr>
+          <p:cNvSpPr>
+            <a:spLocks noGrp="1"/>
+          </p:cNvSpPr>
+          <p:nvPr>
+            <p:ph idx="1"/>
+          </p:nvPr>
+        </p:nvSpPr>
+        <p:spPr/>
+        <p:txBody>
+          <a:bodyPr/>
+          <a:lstStyle/>
+          <a:p>
+            <a:r>
+              <a:rPr lang="en-US" dirty="0"/>
+              <a:t>We added property in the constructor. But class may have default properties</a:t>
+            </a:r>
+          </a:p>
+          <a:p>
+            <a:r>
+              <a:rPr lang="en-US" dirty="0"/>
+              <a:t>These properties are the same for all instances</a:t>
+            </a:r>
+          </a:p>
+          <a:p>
+            <a:r>
+              <a:rPr lang="en-US" dirty="0"/>
+              <a:t>All property may be rewritten by the user of the class. </a:t>
+            </a:r>
+            <a:endParaRPr lang="ru-RU" dirty="0"/>
+          </a:p>
+        </p:txBody>
+      </p:sp>
+      <p:pic>
+        <p:nvPicPr>
+          <p:cNvPr id="4" name="Рисунок 3">
+            <a:extLst>
+              <a:ext uri="{FF2B5EF4-FFF2-40B4-BE49-F238E27FC236}">
+                <a16:creationId xmlns:a16="http://schemas.microsoft.com/office/drawing/2014/main" id="{07EF8D7B-740C-4377-B312-7613B7140FFB}"/>
+              </a:ext>
+            </a:extLst>
+          </p:cNvPr>
+          <p:cNvPicPr>
+            <a:picLocks noChangeAspect="1"/>
+          </p:cNvPicPr>
+          <p:nvPr/>
+        </p:nvPicPr>
+        <p:blipFill>
+          <a:blip r:embed="rId2"/>
+          <a:stretch>
+            <a:fillRect/>
+          </a:stretch>
+        </p:blipFill>
+        <p:spPr>
+          <a:xfrm>
+            <a:off x="4153728" y="3815764"/>
+            <a:ext cx="3585542" cy="2802983"/>
+          </a:xfrm>
+          <a:prstGeom prst="rect">
+            <a:avLst/>
+          </a:prstGeom>
+        </p:spPr>
+      </p:pic>
+    </p:spTree>
+    <p:extLst>
+      <p:ext uri="{BB962C8B-B14F-4D97-AF65-F5344CB8AC3E}">
+        <p14:creationId xmlns:p14="http://schemas.microsoft.com/office/powerpoint/2010/main" val="1558026264"/>
+      </p:ext>
+    </p:extLst>
+  </p:cSld>
+  <p:clrMapOvr>
+    <a:masterClrMapping/>
+  </p:clrMapOvr>
+</p:sld>
+</file>
+
+<file path=ppt/slides/slide84.xml><?xml version="1.0" encoding="utf-8"?>
+<p:sld xmlns:a="http://schemas.openxmlformats.org/drawingml/2006/main" xmlns:r="http://schemas.openxmlformats.org/officeDocument/2006/relationships" xmlns:p="http://schemas.openxmlformats.org/presentationml/2006/main">
+  <p:cSld>
+    <p:spTree>
+      <p:nvGrpSpPr>
+        <p:cNvPr id="1" name=""/>
+        <p:cNvGrpSpPr/>
+        <p:nvPr/>
+      </p:nvGrpSpPr>
+      <p:grpSpPr>
+        <a:xfrm>
+          <a:off x="0" y="0"/>
+          <a:ext cx="0" cy="0"/>
+          <a:chOff x="0" y="0"/>
+          <a:chExt cx="0" cy="0"/>
+        </a:xfrm>
+      </p:grpSpPr>
+      <p:sp>
+        <p:nvSpPr>
+          <p:cNvPr id="2" name="Заголовок 1">
+            <a:extLst>
+              <a:ext uri="{FF2B5EF4-FFF2-40B4-BE49-F238E27FC236}">
+                <a16:creationId xmlns:a16="http://schemas.microsoft.com/office/drawing/2014/main" id="{7C071240-25C8-4C3B-80EA-10903148C613}"/>
+              </a:ext>
+            </a:extLst>
+          </p:cNvPr>
+          <p:cNvSpPr>
+            <a:spLocks noGrp="1"/>
+          </p:cNvSpPr>
+          <p:nvPr>
+            <p:ph type="title"/>
+          </p:nvPr>
+        </p:nvSpPr>
+        <p:spPr/>
+        <p:txBody>
+          <a:bodyPr/>
+          <a:lstStyle/>
+          <a:p>
+            <a:pPr algn="ctr"/>
+            <a:r>
+              <a:rPr lang="en-US" dirty="0"/>
+              <a:t>Add methods</a:t>
+            </a:r>
+            <a:endParaRPr lang="ru-RU" dirty="0"/>
+          </a:p>
+        </p:txBody>
+      </p:sp>
+      <p:sp>
+        <p:nvSpPr>
+          <p:cNvPr id="3" name="Объект 2">
+            <a:extLst>
+              <a:ext uri="{FF2B5EF4-FFF2-40B4-BE49-F238E27FC236}">
+                <a16:creationId xmlns:a16="http://schemas.microsoft.com/office/drawing/2014/main" id="{E1A1C981-2BD7-4B30-BEF0-750B7EA295A4}"/>
+              </a:ext>
+            </a:extLst>
+          </p:cNvPr>
+          <p:cNvSpPr>
+            <a:spLocks noGrp="1"/>
+          </p:cNvSpPr>
+          <p:nvPr>
+            <p:ph idx="1"/>
+          </p:nvPr>
+        </p:nvSpPr>
+        <p:spPr>
+          <a:xfrm>
+            <a:off x="838200" y="1825624"/>
+            <a:ext cx="5814391" cy="5032376"/>
+          </a:xfrm>
+        </p:spPr>
+        <p:txBody>
+          <a:bodyPr>
+            <a:normAutofit fontScale="85000" lnSpcReduction="10000"/>
+          </a:bodyPr>
+          <a:lstStyle/>
+          <a:p>
+            <a:r>
+              <a:rPr lang="en-US" dirty="0"/>
+              <a:t>In our first class, we added a method that works but works without class. It was like a different function with a strange argument. Let’s create a real method!</a:t>
+            </a:r>
+          </a:p>
+          <a:p>
+            <a:r>
+              <a:rPr lang="en-US" dirty="0"/>
+              <a:t>First, we need to define a function in the class.</a:t>
+            </a:r>
+          </a:p>
+          <a:p>
+            <a:r>
+              <a:rPr lang="en-US" dirty="0"/>
+              <a:t>Second, add arguments. For all functions in the class python automatically send a self reference. In our class, we named it n , but it’s still a reference to the instance. In this case, for all methods of class the first or even single arguments - self</a:t>
+            </a:r>
+          </a:p>
+          <a:p>
+            <a:r>
+              <a:rPr lang="en-US" dirty="0"/>
+              <a:t>Then we may use into this methods all property of class and other methods </a:t>
+            </a:r>
+          </a:p>
+          <a:p>
+            <a:r>
+              <a:rPr lang="en-US" dirty="0"/>
+              <a:t>Cool! Our first real class is done</a:t>
+            </a:r>
+            <a:endParaRPr lang="ru-RU" dirty="0"/>
+          </a:p>
+        </p:txBody>
+      </p:sp>
+      <p:pic>
+        <p:nvPicPr>
+          <p:cNvPr id="4" name="Рисунок 3">
+            <a:extLst>
+              <a:ext uri="{FF2B5EF4-FFF2-40B4-BE49-F238E27FC236}">
+                <a16:creationId xmlns:a16="http://schemas.microsoft.com/office/drawing/2014/main" id="{D708CC62-4D84-4E84-A403-2D851D680635}"/>
+              </a:ext>
+            </a:extLst>
+          </p:cNvPr>
+          <p:cNvPicPr>
+            <a:picLocks noChangeAspect="1"/>
+          </p:cNvPicPr>
+          <p:nvPr/>
+        </p:nvPicPr>
+        <p:blipFill>
+          <a:blip r:embed="rId2"/>
+          <a:stretch>
+            <a:fillRect/>
+          </a:stretch>
+        </p:blipFill>
+        <p:spPr>
+          <a:xfrm>
+            <a:off x="7239827" y="2017711"/>
+            <a:ext cx="3733731" cy="3733731"/>
+          </a:xfrm>
+          <a:prstGeom prst="rect">
+            <a:avLst/>
+          </a:prstGeom>
+        </p:spPr>
+      </p:pic>
+    </p:spTree>
+    <p:extLst>
+      <p:ext uri="{BB962C8B-B14F-4D97-AF65-F5344CB8AC3E}">
+        <p14:creationId xmlns:p14="http://schemas.microsoft.com/office/powerpoint/2010/main" val="2011278061"/>
+      </p:ext>
+    </p:extLst>
+  </p:cSld>
+  <p:clrMapOvr>
+    <a:masterClrMapping/>
+  </p:clrMapOvr>
+</p:sld>
+</file>
+
+<file path=ppt/slides/slide85.xml><?xml version="1.0" encoding="utf-8"?>
+<p:sld xmlns:a="http://schemas.openxmlformats.org/drawingml/2006/main" xmlns:r="http://schemas.openxmlformats.org/officeDocument/2006/relationships" xmlns:p="http://schemas.openxmlformats.org/presentationml/2006/main">
+  <p:cSld>
+    <p:spTree>
+      <p:nvGrpSpPr>
+        <p:cNvPr id="1" name=""/>
+        <p:cNvGrpSpPr/>
+        <p:nvPr/>
+      </p:nvGrpSpPr>
+      <p:grpSpPr>
+        <a:xfrm>
+          <a:off x="0" y="0"/>
+          <a:ext cx="0" cy="0"/>
+          <a:chOff x="0" y="0"/>
+          <a:chExt cx="0" cy="0"/>
+        </a:xfrm>
+      </p:grpSpPr>
+      <p:sp>
+        <p:nvSpPr>
+          <p:cNvPr id="3" name="Содержимое 2"/>
+          <p:cNvSpPr>
+            <a:spLocks noGrp="1"/>
+          </p:cNvSpPr>
+          <p:nvPr>
+            <p:ph idx="1"/>
+          </p:nvPr>
+        </p:nvSpPr>
+        <p:spPr>
+          <a:xfrm>
+            <a:off x="914400" y="1499616"/>
+            <a:ext cx="10439400" cy="5358384"/>
+          </a:xfrm>
+        </p:spPr>
+        <p:txBody>
+          <a:bodyPr>
+            <a:normAutofit/>
+          </a:bodyPr>
+          <a:lstStyle/>
+          <a:p>
             <a:pPr marL="514350" indent="-514350">
               <a:buFont typeface="+mj-lt"/>
               <a:buAutoNum type="arabicPeriod"/>
             </a:pPr>
             <a:r>
+              <a:rPr lang="en-US" dirty="0"/>
+              <a:t>Create a class Car that has a brand, model, </a:t>
+            </a:r>
+            <a:r>
+              <a:rPr lang="en-US" dirty="0" err="1"/>
+              <a:t>maxSpeed</a:t>
+            </a:r>
+            <a:r>
+              <a:rPr lang="en-US" dirty="0"/>
+              <a:t>, </a:t>
+            </a:r>
+            <a:r>
+              <a:rPr lang="en-US" dirty="0" err="1"/>
+              <a:t>currentSpeed</a:t>
+            </a:r>
+            <a:r>
+              <a:rPr lang="en-US" dirty="0"/>
+              <a:t>, </a:t>
+            </a:r>
+            <a:r>
+              <a:rPr lang="en-US" dirty="0" err="1"/>
+              <a:t>isRide</a:t>
+            </a:r>
+            <a:r>
+              <a:rPr lang="en-US" dirty="0"/>
+              <a:t> properties. And also, has a start, stop, </a:t>
+            </a:r>
+            <a:r>
+              <a:rPr lang="en-US" dirty="0" err="1"/>
+              <a:t>setSpeed</a:t>
+            </a:r>
+            <a:r>
+              <a:rPr lang="en-US" dirty="0"/>
+              <a:t> methods.</a:t>
+            </a:r>
+          </a:p>
+          <a:p>
+            <a:pPr marL="971550" lvl="1" indent="-514350">
+              <a:buFont typeface="+mj-lt"/>
+              <a:buAutoNum type="arabicPeriod"/>
+            </a:pPr>
+            <a:r>
+              <a:rPr lang="en-US" dirty="0"/>
+              <a:t>Start() – must starts car- set </a:t>
+            </a:r>
+            <a:r>
+              <a:rPr lang="en-US" dirty="0" err="1"/>
+              <a:t>isRide</a:t>
+            </a:r>
+            <a:r>
+              <a:rPr lang="en-US" dirty="0"/>
+              <a:t> to True, and set a default </a:t>
+            </a:r>
+            <a:r>
+              <a:rPr lang="en-US" dirty="0" err="1"/>
+              <a:t>currentSpeed</a:t>
+            </a:r>
+            <a:r>
+              <a:rPr lang="en-US" dirty="0"/>
+              <a:t>. If it is already started ignore the call and handle Exception</a:t>
+            </a:r>
+          </a:p>
+          <a:p>
+            <a:pPr marL="971550" lvl="1" indent="-514350">
+              <a:buFont typeface="+mj-lt"/>
+              <a:buAutoNum type="arabicPeriod"/>
+            </a:pPr>
+            <a:r>
+              <a:rPr lang="en-US" dirty="0"/>
+              <a:t>Stop() – similar with start() but reverse actions.</a:t>
+            </a:r>
+          </a:p>
+          <a:p>
+            <a:pPr marL="971550" lvl="1" indent="-514350">
+              <a:buFont typeface="+mj-lt"/>
+              <a:buAutoNum type="arabicPeriod"/>
+            </a:pPr>
+            <a:r>
+              <a:rPr lang="en-US" dirty="0" err="1"/>
+              <a:t>setSpeed</a:t>
+            </a:r>
+            <a:r>
+              <a:rPr lang="en-US" dirty="0"/>
+              <a:t>() – must try to set speed but no more than </a:t>
+            </a:r>
+            <a:r>
+              <a:rPr lang="en-US" dirty="0" err="1"/>
+              <a:t>maxSpeed</a:t>
+            </a:r>
+            <a:r>
+              <a:rPr lang="en-US" dirty="0"/>
+              <a:t>.</a:t>
+            </a:r>
+          </a:p>
+        </p:txBody>
+      </p:sp>
+      <p:grpSp>
+        <p:nvGrpSpPr>
+          <p:cNvPr id="2" name="Группа 3"/>
+          <p:cNvGrpSpPr/>
+          <p:nvPr/>
+        </p:nvGrpSpPr>
+        <p:grpSpPr>
+          <a:xfrm>
+            <a:off x="838200" y="365125"/>
+            <a:ext cx="10515600" cy="1325563"/>
+            <a:chOff x="838200" y="365125"/>
+            <a:chExt cx="10515600" cy="1325563"/>
+          </a:xfrm>
+        </p:grpSpPr>
+        <p:sp>
+          <p:nvSpPr>
+            <p:cNvPr id="5" name="Заголовок 1"/>
+            <p:cNvSpPr txBox="1">
+              <a:spLocks/>
+            </p:cNvSpPr>
+            <p:nvPr/>
+          </p:nvSpPr>
+          <p:spPr>
+            <a:xfrm>
+              <a:off x="838200" y="365125"/>
+              <a:ext cx="10515600" cy="1325563"/>
+            </a:xfrm>
+            <a:prstGeom prst="rect">
+              <a:avLst/>
+            </a:prstGeom>
+          </p:spPr>
+          <p:txBody>
+            <a:bodyPr vert="horz" lIns="91440" tIns="45720" rIns="91440" bIns="45720" rtlCol="0" anchor="ctr">
+              <a:normAutofit/>
+            </a:bodyPr>
+            <a:lstStyle/>
+            <a:p>
+              <a:pPr marL="0" marR="0" lvl="0" indent="0" algn="ctr" defTabSz="914400" rtl="0" eaLnBrk="1" fontAlgn="auto" latinLnBrk="0" hangingPunct="1">
+                <a:lnSpc>
+                  <a:spcPct val="90000"/>
+                </a:lnSpc>
+                <a:spcBef>
+                  <a:spcPct val="0"/>
+                </a:spcBef>
+                <a:spcAft>
+                  <a:spcPts val="0"/>
+                </a:spcAft>
+                <a:buClrTx/>
+                <a:buSzTx/>
+                <a:buFontTx/>
+                <a:buNone/>
+                <a:tabLst/>
+                <a:defRPr/>
+              </a:pPr>
+              <a:r>
+                <a:rPr kumimoji="0" lang="en-US" sz="4400" b="1" i="0" u="none" strike="noStrike" kern="1200" cap="none" spc="0" normalizeH="0" baseline="0" noProof="0" dirty="0">
+                  <a:ln>
+                    <a:noFill/>
+                  </a:ln>
+                  <a:solidFill>
+                    <a:schemeClr val="tx1"/>
+                  </a:solidFill>
+                  <a:effectLst/>
+                  <a:uLnTx/>
+                  <a:uFillTx/>
+                  <a:latin typeface="+mj-lt"/>
+                  <a:ea typeface="+mj-ea"/>
+                  <a:cs typeface="+mj-cs"/>
+                </a:rPr>
+                <a:t>Tasks </a:t>
+              </a:r>
+              <a:endParaRPr kumimoji="0" lang="ru-RU" sz="4400" b="1" i="0" u="none" strike="noStrike" kern="1200" cap="none" spc="0" normalizeH="0" baseline="0" noProof="0" dirty="0">
+                <a:ln>
+                  <a:noFill/>
+                </a:ln>
+                <a:solidFill>
+                  <a:schemeClr val="tx1"/>
+                </a:solidFill>
+                <a:effectLst/>
+                <a:uLnTx/>
+                <a:uFillTx/>
+                <a:latin typeface="+mj-lt"/>
+                <a:ea typeface="+mj-ea"/>
+                <a:cs typeface="+mj-cs"/>
+              </a:endParaRPr>
+            </a:p>
+          </p:txBody>
+        </p:sp>
+        <p:pic>
+          <p:nvPicPr>
+            <p:cNvPr id="6" name="Picture 2" descr="Pin on Бесплатные иконки"/>
+            <p:cNvPicPr>
+              <a:picLocks noChangeAspect="1" noChangeArrowheads="1"/>
+            </p:cNvPicPr>
+            <p:nvPr/>
+          </p:nvPicPr>
+          <p:blipFill>
+            <a:blip r:embed="rId2" cstate="print"/>
+            <a:srcRect/>
+            <a:stretch>
+              <a:fillRect/>
+            </a:stretch>
+          </p:blipFill>
+          <p:spPr bwMode="auto">
+            <a:xfrm>
+              <a:off x="4672711" y="603504"/>
+              <a:ext cx="795401" cy="795401"/>
+            </a:xfrm>
+            <a:prstGeom prst="rect">
+              <a:avLst/>
+            </a:prstGeom>
+            <a:noFill/>
+          </p:spPr>
+        </p:pic>
+      </p:grpSp>
+    </p:spTree>
+    <p:extLst>
+      <p:ext uri="{BB962C8B-B14F-4D97-AF65-F5344CB8AC3E}">
+        <p14:creationId xmlns:p14="http://schemas.microsoft.com/office/powerpoint/2010/main" val="1214895222"/>
+      </p:ext>
+    </p:extLst>
+  </p:cSld>
+  <p:clrMapOvr>
+    <a:masterClrMapping/>
+  </p:clrMapOvr>
+</p:sld>
+</file>
+
+<file path=ppt/slides/slide86.xml><?xml version="1.0" encoding="utf-8"?>
+<p:sld xmlns:a="http://schemas.openxmlformats.org/drawingml/2006/main" xmlns:r="http://schemas.openxmlformats.org/officeDocument/2006/relationships" xmlns:p="http://schemas.openxmlformats.org/presentationml/2006/main">
+  <p:cSld>
+    <p:spTree>
+      <p:nvGrpSpPr>
+        <p:cNvPr id="1" name=""/>
+        <p:cNvGrpSpPr/>
+        <p:nvPr/>
+      </p:nvGrpSpPr>
+      <p:grpSpPr>
+        <a:xfrm>
+          <a:off x="0" y="0"/>
+          <a:ext cx="0" cy="0"/>
+          <a:chOff x="0" y="0"/>
+          <a:chExt cx="0" cy="0"/>
+        </a:xfrm>
+      </p:grpSpPr>
+      <p:sp>
+        <p:nvSpPr>
+          <p:cNvPr id="2" name="Заголовок 1">
+            <a:extLst>
+              <a:ext uri="{FF2B5EF4-FFF2-40B4-BE49-F238E27FC236}">
+                <a16:creationId xmlns:a16="http://schemas.microsoft.com/office/drawing/2014/main" id="{365E5AEA-6A2F-42DE-AF92-3D602133393F}"/>
+              </a:ext>
+            </a:extLst>
+          </p:cNvPr>
+          <p:cNvSpPr>
+            <a:spLocks noGrp="1"/>
+          </p:cNvSpPr>
+          <p:nvPr>
+            <p:ph type="title"/>
+          </p:nvPr>
+        </p:nvSpPr>
+        <p:spPr/>
+        <p:txBody>
+          <a:bodyPr/>
+          <a:lstStyle/>
+          <a:p>
+            <a:pPr algn="ctr"/>
+            <a:r>
+              <a:rPr lang="en-US" dirty="0"/>
+              <a:t>Encapsulation</a:t>
+            </a:r>
+            <a:endParaRPr lang="ru-RU" dirty="0"/>
+          </a:p>
+        </p:txBody>
+      </p:sp>
+      <p:sp>
+        <p:nvSpPr>
+          <p:cNvPr id="3" name="Объект 2">
+            <a:extLst>
+              <a:ext uri="{FF2B5EF4-FFF2-40B4-BE49-F238E27FC236}">
+                <a16:creationId xmlns:a16="http://schemas.microsoft.com/office/drawing/2014/main" id="{70301F2F-3CF4-4A98-B998-8F035B293B5B}"/>
+              </a:ext>
+            </a:extLst>
+          </p:cNvPr>
+          <p:cNvSpPr>
+            <a:spLocks noGrp="1"/>
+          </p:cNvSpPr>
+          <p:nvPr>
+            <p:ph idx="1"/>
+          </p:nvPr>
+        </p:nvSpPr>
+        <p:spPr>
+          <a:xfrm>
+            <a:off x="838199" y="1825624"/>
+            <a:ext cx="6119191" cy="5032376"/>
+          </a:xfrm>
+        </p:spPr>
+        <p:txBody>
+          <a:bodyPr>
+            <a:normAutofit fontScale="85000" lnSpcReduction="10000"/>
+          </a:bodyPr>
+          <a:lstStyle/>
+          <a:p>
+            <a:r>
+              <a:rPr lang="en-US" dirty="0"/>
+              <a:t>Did you notice how easy to broke our class? For example, in the last task, we may change the speed directly without our cool method.</a:t>
+            </a:r>
+          </a:p>
+          <a:p>
+            <a:r>
+              <a:rPr lang="en-US" dirty="0"/>
+              <a:t> Encapsulation is a concept that say us how we may fix it.</a:t>
+            </a:r>
+          </a:p>
+          <a:p>
+            <a:r>
+              <a:rPr lang="en-US" dirty="0"/>
+              <a:t>We must hide all inner properties from direct access. In python, we may use two ways:</a:t>
+            </a:r>
+          </a:p>
+          <a:p>
+            <a:pPr lvl="1"/>
+            <a:r>
+              <a:rPr lang="en-US" dirty="0"/>
+              <a:t>Add 'virtual attributes’ - </a:t>
+            </a:r>
+            <a:r>
               <a:rPr lang="en-US" dirty="0">
-                <a:hlinkClick r:id="rId2"/>
+                <a:solidFill>
+                  <a:srgbClr val="FF0000"/>
+                </a:solidFill>
               </a:rPr>
-              <a:t>https://www.codewars.com/kata/52fba66badcd10859f00097e</a:t>
-            </a:r>
+              <a:t>__property</a:t>
+            </a:r>
+            <a:r>
+              <a:rPr lang="en-US" dirty="0"/>
+              <a:t> </a:t>
+            </a:r>
+          </a:p>
+          <a:p>
+            <a:pPr lvl="1"/>
+            <a:r>
+              <a:rPr lang="en-US" dirty="0"/>
+              <a:t>Create a getter and setter for property</a:t>
+            </a:r>
+          </a:p>
+          <a:p>
+            <a:pPr lvl="2"/>
+            <a:r>
+              <a:rPr lang="en-US" dirty="0"/>
+              <a:t>Use </a:t>
+            </a:r>
+            <a:r>
+              <a:rPr lang="en-US" dirty="0">
+                <a:solidFill>
+                  <a:srgbClr val="FF0000"/>
+                </a:solidFill>
+              </a:rPr>
+              <a:t>@property </a:t>
+            </a:r>
+            <a:r>
+              <a:rPr lang="en-US" dirty="0"/>
+              <a:t>decorator to define getter </a:t>
+            </a:r>
+          </a:p>
+          <a:p>
+            <a:pPr lvl="2"/>
+            <a:r>
+              <a:rPr lang="en-US" dirty="0"/>
+              <a:t>Use </a:t>
+            </a:r>
+            <a:r>
+              <a:rPr lang="en-US" dirty="0">
+                <a:solidFill>
+                  <a:srgbClr val="FF0000"/>
+                </a:solidFill>
+              </a:rPr>
+              <a:t>@&lt;</a:t>
+            </a:r>
+            <a:r>
+              <a:rPr lang="en-US" dirty="0" err="1">
+                <a:solidFill>
+                  <a:srgbClr val="FF0000"/>
+                </a:solidFill>
+              </a:rPr>
+              <a:t>propertyName</a:t>
+            </a:r>
+            <a:r>
+              <a:rPr lang="en-US" dirty="0">
+                <a:solidFill>
+                  <a:srgbClr val="FF0000"/>
+                </a:solidFill>
+              </a:rPr>
+              <a:t>&gt;.setter </a:t>
+            </a:r>
+            <a:r>
+              <a:rPr lang="en-US" dirty="0"/>
+              <a:t>to define setter</a:t>
+            </a:r>
+          </a:p>
+          <a:p>
+            <a:r>
+              <a:rPr lang="en-US" dirty="0"/>
+              <a:t>But Encapsulation is not only about hiding. It’s about collecting all used in class property and methods together. In that way, we may be confident in the safety of our class</a:t>
+            </a:r>
+          </a:p>
+          <a:p>
+            <a:pPr lvl="1"/>
             <a:endParaRPr lang="en-US" dirty="0"/>
           </a:p>
+        </p:txBody>
+      </p:sp>
+      <p:pic>
+        <p:nvPicPr>
+          <p:cNvPr id="5" name="Рисунок 4">
+            <a:extLst>
+              <a:ext uri="{FF2B5EF4-FFF2-40B4-BE49-F238E27FC236}">
+                <a16:creationId xmlns:a16="http://schemas.microsoft.com/office/drawing/2014/main" id="{40C97768-D44F-44DE-A663-0D9C948E1937}"/>
+              </a:ext>
+            </a:extLst>
+          </p:cNvPr>
+          <p:cNvPicPr>
+            <a:picLocks noChangeAspect="1"/>
+          </p:cNvPicPr>
+          <p:nvPr/>
+        </p:nvPicPr>
+        <p:blipFill>
+          <a:blip r:embed="rId2"/>
+          <a:stretch>
+            <a:fillRect/>
+          </a:stretch>
+        </p:blipFill>
+        <p:spPr>
+          <a:xfrm>
+            <a:off x="9839325" y="1350859"/>
+            <a:ext cx="2352675" cy="2219325"/>
+          </a:xfrm>
+          <a:prstGeom prst="rect">
+            <a:avLst/>
+          </a:prstGeom>
+        </p:spPr>
+      </p:pic>
+      <p:pic>
+        <p:nvPicPr>
+          <p:cNvPr id="6" name="Рисунок 5">
+            <a:extLst>
+              <a:ext uri="{FF2B5EF4-FFF2-40B4-BE49-F238E27FC236}">
+                <a16:creationId xmlns:a16="http://schemas.microsoft.com/office/drawing/2014/main" id="{6CB77AA8-F270-4E94-9296-2033B7860AAE}"/>
+              </a:ext>
+            </a:extLst>
+          </p:cNvPr>
+          <p:cNvPicPr>
+            <a:picLocks noChangeAspect="1"/>
+          </p:cNvPicPr>
+          <p:nvPr/>
+        </p:nvPicPr>
+        <p:blipFill>
+          <a:blip r:embed="rId3"/>
+          <a:stretch>
+            <a:fillRect/>
+          </a:stretch>
+        </p:blipFill>
+        <p:spPr>
+          <a:xfrm>
+            <a:off x="6957390" y="2937288"/>
+            <a:ext cx="2706551" cy="3782516"/>
+          </a:xfrm>
+          <a:prstGeom prst="rect">
+            <a:avLst/>
+          </a:prstGeom>
+        </p:spPr>
+      </p:pic>
+    </p:spTree>
+    <p:extLst>
+      <p:ext uri="{BB962C8B-B14F-4D97-AF65-F5344CB8AC3E}">
+        <p14:creationId xmlns:p14="http://schemas.microsoft.com/office/powerpoint/2010/main" val="4150770742"/>
+      </p:ext>
+    </p:extLst>
+  </p:cSld>
+  <p:clrMapOvr>
+    <a:masterClrMapping/>
+  </p:clrMapOvr>
+</p:sld>
+</file>
+
+<file path=ppt/slides/slide87.xml><?xml version="1.0" encoding="utf-8"?>
+<p:sld xmlns:a="http://schemas.openxmlformats.org/drawingml/2006/main" xmlns:r="http://schemas.openxmlformats.org/officeDocument/2006/relationships" xmlns:p="http://schemas.openxmlformats.org/presentationml/2006/main">
+  <p:cSld>
+    <p:spTree>
+      <p:nvGrpSpPr>
+        <p:cNvPr id="1" name=""/>
+        <p:cNvGrpSpPr/>
+        <p:nvPr/>
+      </p:nvGrpSpPr>
+      <p:grpSpPr>
+        <a:xfrm>
+          <a:off x="0" y="0"/>
+          <a:ext cx="0" cy="0"/>
+          <a:chOff x="0" y="0"/>
+          <a:chExt cx="0" cy="0"/>
+        </a:xfrm>
+      </p:grpSpPr>
+      <p:sp>
+        <p:nvSpPr>
+          <p:cNvPr id="2" name="Заголовок 1">
+            <a:extLst>
+              <a:ext uri="{FF2B5EF4-FFF2-40B4-BE49-F238E27FC236}">
+                <a16:creationId xmlns:a16="http://schemas.microsoft.com/office/drawing/2014/main" id="{C7966423-EAD6-418D-B28D-43699E2DC971}"/>
+              </a:ext>
+            </a:extLst>
+          </p:cNvPr>
+          <p:cNvSpPr>
+            <a:spLocks noGrp="1"/>
+          </p:cNvSpPr>
+          <p:nvPr>
+            <p:ph type="title"/>
+          </p:nvPr>
+        </p:nvSpPr>
+        <p:spPr/>
+        <p:txBody>
+          <a:bodyPr/>
+          <a:lstStyle/>
+          <a:p>
+            <a:pPr algn="ctr"/>
+            <a:r>
+              <a:rPr lang="en-US" dirty="0"/>
+              <a:t>Inheritance</a:t>
+            </a:r>
+            <a:endParaRPr lang="ru-RU" dirty="0"/>
+          </a:p>
+        </p:txBody>
+      </p:sp>
+      <p:sp>
+        <p:nvSpPr>
+          <p:cNvPr id="3" name="Объект 2">
+            <a:extLst>
+              <a:ext uri="{FF2B5EF4-FFF2-40B4-BE49-F238E27FC236}">
+                <a16:creationId xmlns:a16="http://schemas.microsoft.com/office/drawing/2014/main" id="{11A7870D-CFE1-4F92-842C-DD38B5F282B2}"/>
+              </a:ext>
+            </a:extLst>
+          </p:cNvPr>
+          <p:cNvSpPr>
+            <a:spLocks noGrp="1"/>
+          </p:cNvSpPr>
+          <p:nvPr>
+            <p:ph idx="1"/>
+          </p:nvPr>
+        </p:nvSpPr>
+        <p:spPr>
+          <a:xfrm>
+            <a:off x="838200" y="1825624"/>
+            <a:ext cx="6357730" cy="5032376"/>
+          </a:xfrm>
+        </p:spPr>
+        <p:txBody>
+          <a:bodyPr>
+            <a:normAutofit fontScale="85000" lnSpcReduction="20000"/>
+          </a:bodyPr>
+          <a:lstStyle/>
+          <a:p>
+            <a:r>
+              <a:rPr lang="en-US" dirty="0"/>
+              <a:t>You create a zoo program , and of course, you need many classes of animals – dogs, bears, parrots. How much code duplication you will need? </a:t>
+            </a:r>
+          </a:p>
+          <a:p>
+            <a:r>
+              <a:rPr lang="en-US" dirty="0"/>
+              <a:t>Inheritance is a concept that represent show we may reduce code and create a clear structure of the program. Right now, we have Class of Animal. Is dog and parrot also animals in real life? So we may Inherit all property and methods to our new Class!</a:t>
+            </a:r>
+          </a:p>
+          <a:p>
+            <a:r>
+              <a:rPr lang="en-US" dirty="0"/>
+              <a:t>To do it in python:</a:t>
+            </a:r>
+          </a:p>
+          <a:p>
+            <a:pPr lvl="1"/>
+            <a:r>
+              <a:rPr lang="en-US" dirty="0"/>
+              <a:t>Add to class a parent</a:t>
+            </a:r>
+          </a:p>
+          <a:p>
+            <a:pPr lvl="1"/>
+            <a:r>
+              <a:rPr lang="en-US" dirty="0"/>
+              <a:t>Use a parent constructor with </a:t>
+            </a:r>
+            <a:r>
+              <a:rPr lang="en-US" dirty="0">
+                <a:solidFill>
+                  <a:srgbClr val="FF0000"/>
+                </a:solidFill>
+              </a:rPr>
+              <a:t>super()</a:t>
+            </a:r>
+            <a:r>
+              <a:rPr lang="en-US" dirty="0"/>
+              <a:t> in the child class constructor. Note! It always must be first in child __</a:t>
+            </a:r>
+            <a:r>
+              <a:rPr lang="en-US" dirty="0" err="1"/>
+              <a:t>init</a:t>
+            </a:r>
+            <a:r>
+              <a:rPr lang="en-US" dirty="0"/>
+              <a:t>__ and we need to call __</a:t>
+            </a:r>
+            <a:r>
+              <a:rPr lang="en-US" dirty="0" err="1"/>
+              <a:t>init</a:t>
+            </a:r>
+            <a:r>
+              <a:rPr lang="en-US" dirty="0"/>
+              <a:t>__ on parent</a:t>
+            </a:r>
+          </a:p>
+          <a:p>
+            <a:pPr lvl="1"/>
+            <a:r>
+              <a:rPr lang="en-US" dirty="0"/>
+              <a:t>If you don’t want to change arguments you may doesn’t define __</a:t>
+            </a:r>
+            <a:r>
+              <a:rPr lang="en-US" dirty="0" err="1"/>
+              <a:t>init</a:t>
+            </a:r>
+            <a:r>
+              <a:rPr lang="en-US" dirty="0"/>
+              <a:t>__ in child class</a:t>
+            </a:r>
+          </a:p>
+        </p:txBody>
+      </p:sp>
+      <p:pic>
+        <p:nvPicPr>
+          <p:cNvPr id="4" name="Рисунок 3">
+            <a:extLst>
+              <a:ext uri="{FF2B5EF4-FFF2-40B4-BE49-F238E27FC236}">
+                <a16:creationId xmlns:a16="http://schemas.microsoft.com/office/drawing/2014/main" id="{78D6740F-2341-4B4E-8A8F-C2704702BD04}"/>
+              </a:ext>
+            </a:extLst>
+          </p:cNvPr>
+          <p:cNvPicPr>
+            <a:picLocks noChangeAspect="1"/>
+          </p:cNvPicPr>
+          <p:nvPr/>
+        </p:nvPicPr>
+        <p:blipFill>
+          <a:blip r:embed="rId2"/>
+          <a:stretch>
+            <a:fillRect/>
+          </a:stretch>
+        </p:blipFill>
+        <p:spPr>
+          <a:xfrm>
+            <a:off x="8785569" y="1576387"/>
+            <a:ext cx="2295525" cy="2028825"/>
+          </a:xfrm>
+          <a:prstGeom prst="rect">
+            <a:avLst/>
+          </a:prstGeom>
+        </p:spPr>
+      </p:pic>
+      <p:pic>
+        <p:nvPicPr>
+          <p:cNvPr id="5" name="Рисунок 4">
+            <a:extLst>
+              <a:ext uri="{FF2B5EF4-FFF2-40B4-BE49-F238E27FC236}">
+                <a16:creationId xmlns:a16="http://schemas.microsoft.com/office/drawing/2014/main" id="{69FBE732-99C3-4AC2-87BF-04EED9B3D5AD}"/>
+              </a:ext>
+            </a:extLst>
+          </p:cNvPr>
+          <p:cNvPicPr>
+            <a:picLocks noChangeAspect="1"/>
+          </p:cNvPicPr>
+          <p:nvPr/>
+        </p:nvPicPr>
+        <p:blipFill>
+          <a:blip r:embed="rId3"/>
+          <a:stretch>
+            <a:fillRect/>
+          </a:stretch>
+        </p:blipFill>
+        <p:spPr>
+          <a:xfrm>
+            <a:off x="6851373" y="3916362"/>
+            <a:ext cx="2724150" cy="1095375"/>
+          </a:xfrm>
+          <a:prstGeom prst="rect">
+            <a:avLst/>
+          </a:prstGeom>
+        </p:spPr>
+      </p:pic>
+      <p:pic>
+        <p:nvPicPr>
+          <p:cNvPr id="6" name="Рисунок 5">
+            <a:extLst>
+              <a:ext uri="{FF2B5EF4-FFF2-40B4-BE49-F238E27FC236}">
+                <a16:creationId xmlns:a16="http://schemas.microsoft.com/office/drawing/2014/main" id="{28D7601F-E09B-4C64-AD8B-60945EC08FCB}"/>
+              </a:ext>
+            </a:extLst>
+          </p:cNvPr>
+          <p:cNvPicPr>
+            <a:picLocks noChangeAspect="1"/>
+          </p:cNvPicPr>
+          <p:nvPr/>
+        </p:nvPicPr>
+        <p:blipFill>
+          <a:blip r:embed="rId4"/>
+          <a:stretch>
+            <a:fillRect/>
+          </a:stretch>
+        </p:blipFill>
+        <p:spPr>
+          <a:xfrm>
+            <a:off x="9732563" y="3916362"/>
+            <a:ext cx="2459437" cy="664998"/>
+          </a:xfrm>
+          <a:prstGeom prst="rect">
+            <a:avLst/>
+          </a:prstGeom>
+        </p:spPr>
+      </p:pic>
+      <p:pic>
+        <p:nvPicPr>
+          <p:cNvPr id="7" name="Рисунок 6">
+            <a:extLst>
+              <a:ext uri="{FF2B5EF4-FFF2-40B4-BE49-F238E27FC236}">
+                <a16:creationId xmlns:a16="http://schemas.microsoft.com/office/drawing/2014/main" id="{D9F46203-0870-49F6-B7EA-F2CB6712F7F3}"/>
+              </a:ext>
+            </a:extLst>
+          </p:cNvPr>
+          <p:cNvPicPr>
+            <a:picLocks noChangeAspect="1"/>
+          </p:cNvPicPr>
+          <p:nvPr/>
+        </p:nvPicPr>
+        <p:blipFill>
+          <a:blip r:embed="rId5"/>
+          <a:stretch>
+            <a:fillRect/>
+          </a:stretch>
+        </p:blipFill>
+        <p:spPr>
+          <a:xfrm>
+            <a:off x="8213448" y="5519738"/>
+            <a:ext cx="2676525" cy="914400"/>
+          </a:xfrm>
+          <a:prstGeom prst="rect">
+            <a:avLst/>
+          </a:prstGeom>
+        </p:spPr>
+      </p:pic>
+      <p:cxnSp>
+        <p:nvCxnSpPr>
+          <p:cNvPr id="9" name="Прямая со стрелкой 8">
+            <a:extLst>
+              <a:ext uri="{FF2B5EF4-FFF2-40B4-BE49-F238E27FC236}">
+                <a16:creationId xmlns:a16="http://schemas.microsoft.com/office/drawing/2014/main" id="{3418B137-4EFC-415C-9251-D1F16EEFAAF4}"/>
+              </a:ext>
+            </a:extLst>
+          </p:cNvPr>
+          <p:cNvCxnSpPr>
+            <a:stCxn id="4" idx="2"/>
+            <a:endCxn id="5" idx="0"/>
+          </p:cNvCxnSpPr>
+          <p:nvPr/>
+        </p:nvCxnSpPr>
+        <p:spPr>
+          <a:xfrm flipH="1">
+            <a:off x="8213448" y="3605212"/>
+            <a:ext cx="1719884" cy="311150"/>
+          </a:xfrm>
+          <a:prstGeom prst="straightConnector1">
+            <a:avLst/>
+          </a:prstGeom>
+          <a:ln>
+            <a:tailEnd type="triangle"/>
+          </a:ln>
+        </p:spPr>
+        <p:style>
+          <a:lnRef idx="3">
+            <a:schemeClr val="accent2"/>
+          </a:lnRef>
+          <a:fillRef idx="0">
+            <a:schemeClr val="accent2"/>
+          </a:fillRef>
+          <a:effectRef idx="2">
+            <a:schemeClr val="accent2"/>
+          </a:effectRef>
+          <a:fontRef idx="minor">
+            <a:schemeClr val="tx1"/>
+          </a:fontRef>
+        </p:style>
+      </p:cxnSp>
+      <p:cxnSp>
+        <p:nvCxnSpPr>
+          <p:cNvPr id="11" name="Прямая со стрелкой 10">
+            <a:extLst>
+              <a:ext uri="{FF2B5EF4-FFF2-40B4-BE49-F238E27FC236}">
+                <a16:creationId xmlns:a16="http://schemas.microsoft.com/office/drawing/2014/main" id="{0329E377-C976-4A63-B0E1-EF8DD253B684}"/>
+              </a:ext>
+            </a:extLst>
+          </p:cNvPr>
+          <p:cNvCxnSpPr>
+            <a:stCxn id="4" idx="2"/>
+            <a:endCxn id="6" idx="0"/>
+          </p:cNvCxnSpPr>
+          <p:nvPr/>
+        </p:nvCxnSpPr>
+        <p:spPr>
+          <a:xfrm>
+            <a:off x="9933332" y="3605212"/>
+            <a:ext cx="1028950" cy="311150"/>
+          </a:xfrm>
+          <a:prstGeom prst="straightConnector1">
+            <a:avLst/>
+          </a:prstGeom>
+          <a:ln>
+            <a:tailEnd type="triangle"/>
+          </a:ln>
+        </p:spPr>
+        <p:style>
+          <a:lnRef idx="3">
+            <a:schemeClr val="accent2"/>
+          </a:lnRef>
+          <a:fillRef idx="0">
+            <a:schemeClr val="accent2"/>
+          </a:fillRef>
+          <a:effectRef idx="2">
+            <a:schemeClr val="accent2"/>
+          </a:effectRef>
+          <a:fontRef idx="minor">
+            <a:schemeClr val="tx1"/>
+          </a:fontRef>
+        </p:style>
+      </p:cxnSp>
+    </p:spTree>
+    <p:extLst>
+      <p:ext uri="{BB962C8B-B14F-4D97-AF65-F5344CB8AC3E}">
+        <p14:creationId xmlns:p14="http://schemas.microsoft.com/office/powerpoint/2010/main" val="3200078603"/>
+      </p:ext>
+    </p:extLst>
+  </p:cSld>
+  <p:clrMapOvr>
+    <a:masterClrMapping/>
+  </p:clrMapOvr>
+</p:sld>
+</file>
+
+<file path=ppt/slides/slide88.xml><?xml version="1.0" encoding="utf-8"?>
+<p:sld xmlns:a="http://schemas.openxmlformats.org/drawingml/2006/main" xmlns:r="http://schemas.openxmlformats.org/officeDocument/2006/relationships" xmlns:p="http://schemas.openxmlformats.org/presentationml/2006/main">
+  <p:cSld>
+    <p:spTree>
+      <p:nvGrpSpPr>
+        <p:cNvPr id="1" name=""/>
+        <p:cNvGrpSpPr/>
+        <p:nvPr/>
+      </p:nvGrpSpPr>
+      <p:grpSpPr>
+        <a:xfrm>
+          <a:off x="0" y="0"/>
+          <a:ext cx="0" cy="0"/>
+          <a:chOff x="0" y="0"/>
+          <a:chExt cx="0" cy="0"/>
+        </a:xfrm>
+      </p:grpSpPr>
+      <p:sp>
+        <p:nvSpPr>
+          <p:cNvPr id="2" name="Заголовок 1">
+            <a:extLst>
+              <a:ext uri="{FF2B5EF4-FFF2-40B4-BE49-F238E27FC236}">
+                <a16:creationId xmlns:a16="http://schemas.microsoft.com/office/drawing/2014/main" id="{D7FAEC1D-EDF3-453C-A419-9759C6BB2AAC}"/>
+              </a:ext>
+            </a:extLst>
+          </p:cNvPr>
+          <p:cNvSpPr>
+            <a:spLocks noGrp="1"/>
+          </p:cNvSpPr>
+          <p:nvPr>
+            <p:ph type="title"/>
+          </p:nvPr>
+        </p:nvSpPr>
+        <p:spPr/>
+        <p:txBody>
+          <a:bodyPr/>
+          <a:lstStyle/>
+          <a:p>
+            <a:pPr algn="ctr"/>
+            <a:r>
+              <a:rPr lang="en-US" dirty="0"/>
+              <a:t>Polymorphism</a:t>
+            </a:r>
+            <a:endParaRPr lang="ru-RU" dirty="0"/>
+          </a:p>
+        </p:txBody>
+      </p:sp>
+      <p:sp>
+        <p:nvSpPr>
+          <p:cNvPr id="3" name="Объект 2">
+            <a:extLst>
+              <a:ext uri="{FF2B5EF4-FFF2-40B4-BE49-F238E27FC236}">
+                <a16:creationId xmlns:a16="http://schemas.microsoft.com/office/drawing/2014/main" id="{DF8221B4-0501-471D-B9EC-9F62FF0C8AFE}"/>
+              </a:ext>
+            </a:extLst>
+          </p:cNvPr>
+          <p:cNvSpPr>
+            <a:spLocks noGrp="1"/>
+          </p:cNvSpPr>
+          <p:nvPr>
+            <p:ph idx="1"/>
+          </p:nvPr>
+        </p:nvSpPr>
+        <p:spPr>
+          <a:xfrm>
+            <a:off x="838200" y="1825624"/>
+            <a:ext cx="5708374" cy="4442653"/>
+          </a:xfrm>
+        </p:spPr>
+        <p:txBody>
+          <a:bodyPr>
+            <a:normAutofit fontScale="92500" lnSpcReduction="20000"/>
+          </a:bodyPr>
+          <a:lstStyle/>
+          <a:p>
+            <a:r>
+              <a:rPr lang="en-US" dirty="0"/>
+              <a:t>We have a class of bird, and child class – parrot, and now we need to add a raven. But there is a problem, parrots and ravens have different flying. How we may handle the different behavior?</a:t>
+            </a:r>
+            <a:endParaRPr lang="ru-RU" dirty="0"/>
+          </a:p>
+          <a:p>
+            <a:r>
+              <a:rPr lang="en-US" dirty="0"/>
+              <a:t>Polymorphism is a concept that tells us – a child may extend parent behavior. Polymorphism is the ability of an object to take on many forms.</a:t>
+            </a:r>
+          </a:p>
+          <a:p>
+            <a:r>
+              <a:rPr lang="en-US" dirty="0"/>
+              <a:t>To do it – just override a parent method in child class</a:t>
+            </a:r>
+          </a:p>
+          <a:p>
+            <a:r>
+              <a:rPr lang="en-US" dirty="0"/>
+              <a:t>You also may use an original function from a parent with </a:t>
+            </a:r>
+            <a:r>
+              <a:rPr lang="en-US" dirty="0">
+                <a:solidFill>
+                  <a:srgbClr val="FF0000"/>
+                </a:solidFill>
+              </a:rPr>
+              <a:t>super()</a:t>
+            </a:r>
+          </a:p>
+        </p:txBody>
+      </p:sp>
+      <p:pic>
+        <p:nvPicPr>
+          <p:cNvPr id="4" name="Рисунок 3">
+            <a:extLst>
+              <a:ext uri="{FF2B5EF4-FFF2-40B4-BE49-F238E27FC236}">
+                <a16:creationId xmlns:a16="http://schemas.microsoft.com/office/drawing/2014/main" id="{39491F40-F2EF-4708-B5F2-026D0E45AE05}"/>
+              </a:ext>
+            </a:extLst>
+          </p:cNvPr>
+          <p:cNvPicPr>
+            <a:picLocks noChangeAspect="1"/>
+          </p:cNvPicPr>
+          <p:nvPr/>
+        </p:nvPicPr>
+        <p:blipFill>
+          <a:blip r:embed="rId2"/>
+          <a:stretch>
+            <a:fillRect/>
+          </a:stretch>
+        </p:blipFill>
+        <p:spPr>
+          <a:xfrm>
+            <a:off x="6876636" y="1825623"/>
+            <a:ext cx="2782030" cy="665785"/>
+          </a:xfrm>
+          <a:prstGeom prst="rect">
+            <a:avLst/>
+          </a:prstGeom>
+        </p:spPr>
+      </p:pic>
+      <p:pic>
+        <p:nvPicPr>
+          <p:cNvPr id="5" name="Рисунок 4">
+            <a:extLst>
+              <a:ext uri="{FF2B5EF4-FFF2-40B4-BE49-F238E27FC236}">
+                <a16:creationId xmlns:a16="http://schemas.microsoft.com/office/drawing/2014/main" id="{F98C2616-5625-4366-986F-742250653D79}"/>
+              </a:ext>
+            </a:extLst>
+          </p:cNvPr>
+          <p:cNvPicPr>
+            <a:picLocks noChangeAspect="1"/>
+          </p:cNvPicPr>
+          <p:nvPr/>
+        </p:nvPicPr>
+        <p:blipFill>
+          <a:blip r:embed="rId3"/>
+          <a:stretch>
+            <a:fillRect/>
+          </a:stretch>
+        </p:blipFill>
+        <p:spPr>
+          <a:xfrm>
+            <a:off x="7179327" y="2721043"/>
+            <a:ext cx="4958678" cy="828674"/>
+          </a:xfrm>
+          <a:prstGeom prst="rect">
+            <a:avLst/>
+          </a:prstGeom>
+        </p:spPr>
+      </p:pic>
+      <p:pic>
+        <p:nvPicPr>
+          <p:cNvPr id="6" name="Рисунок 5">
+            <a:extLst>
+              <a:ext uri="{FF2B5EF4-FFF2-40B4-BE49-F238E27FC236}">
+                <a16:creationId xmlns:a16="http://schemas.microsoft.com/office/drawing/2014/main" id="{1EA7C101-AF2B-428D-B180-1CBA82CCEC12}"/>
+              </a:ext>
+            </a:extLst>
+          </p:cNvPr>
+          <p:cNvPicPr>
+            <a:picLocks noChangeAspect="1"/>
+          </p:cNvPicPr>
+          <p:nvPr/>
+        </p:nvPicPr>
+        <p:blipFill>
+          <a:blip r:embed="rId4"/>
+          <a:stretch>
+            <a:fillRect/>
+          </a:stretch>
+        </p:blipFill>
+        <p:spPr>
+          <a:xfrm>
+            <a:off x="7179327" y="3779352"/>
+            <a:ext cx="3870877" cy="983688"/>
+          </a:xfrm>
+          <a:prstGeom prst="rect">
+            <a:avLst/>
+          </a:prstGeom>
+        </p:spPr>
+      </p:pic>
+      <p:cxnSp>
+        <p:nvCxnSpPr>
+          <p:cNvPr id="8" name="Соединитель: уступ 7">
+            <a:extLst>
+              <a:ext uri="{FF2B5EF4-FFF2-40B4-BE49-F238E27FC236}">
+                <a16:creationId xmlns:a16="http://schemas.microsoft.com/office/drawing/2014/main" id="{D609B22A-D640-4C80-BB81-78C51101BE75}"/>
+              </a:ext>
+            </a:extLst>
+          </p:cNvPr>
+          <p:cNvCxnSpPr>
+            <a:stCxn id="4" idx="1"/>
+            <a:endCxn id="6" idx="1"/>
+          </p:cNvCxnSpPr>
+          <p:nvPr/>
+        </p:nvCxnSpPr>
+        <p:spPr>
+          <a:xfrm rot="10800000" flipH="1" flipV="1">
+            <a:off x="6876635" y="2158516"/>
+            <a:ext cx="302691" cy="2112680"/>
+          </a:xfrm>
+          <a:prstGeom prst="bentConnector3">
+            <a:avLst>
+              <a:gd name="adj1" fmla="val -66767"/>
+            </a:avLst>
+          </a:prstGeom>
+          <a:ln>
+            <a:tailEnd type="triangle"/>
+          </a:ln>
+        </p:spPr>
+        <p:style>
+          <a:lnRef idx="1">
+            <a:schemeClr val="accent1"/>
+          </a:lnRef>
+          <a:fillRef idx="0">
+            <a:schemeClr val="accent1"/>
+          </a:fillRef>
+          <a:effectRef idx="0">
+            <a:schemeClr val="accent1"/>
+          </a:effectRef>
+          <a:fontRef idx="minor">
+            <a:schemeClr val="tx1"/>
+          </a:fontRef>
+        </p:style>
+      </p:cxnSp>
+      <p:cxnSp>
+        <p:nvCxnSpPr>
+          <p:cNvPr id="11" name="Прямая со стрелкой 10">
+            <a:extLst>
+              <a:ext uri="{FF2B5EF4-FFF2-40B4-BE49-F238E27FC236}">
+                <a16:creationId xmlns:a16="http://schemas.microsoft.com/office/drawing/2014/main" id="{D7EF0876-DD59-4286-A518-DE50492AC7FD}"/>
+              </a:ext>
+            </a:extLst>
+          </p:cNvPr>
+          <p:cNvCxnSpPr>
+            <a:cxnSpLocks/>
+            <a:endCxn id="5" idx="1"/>
+          </p:cNvCxnSpPr>
+          <p:nvPr/>
+        </p:nvCxnSpPr>
+        <p:spPr>
+          <a:xfrm>
+            <a:off x="6692348" y="3135380"/>
+            <a:ext cx="486979" cy="0"/>
+          </a:xfrm>
+          <a:prstGeom prst="straightConnector1">
+            <a:avLst/>
+          </a:prstGeom>
+          <a:ln>
+            <a:tailEnd type="triangle"/>
+          </a:ln>
+        </p:spPr>
+        <p:style>
+          <a:lnRef idx="1">
+            <a:schemeClr val="accent1"/>
+          </a:lnRef>
+          <a:fillRef idx="0">
+            <a:schemeClr val="accent1"/>
+          </a:fillRef>
+          <a:effectRef idx="0">
+            <a:schemeClr val="accent1"/>
+          </a:effectRef>
+          <a:fontRef idx="minor">
+            <a:schemeClr val="tx1"/>
+          </a:fontRef>
+        </p:style>
+      </p:cxnSp>
+      <p:pic>
+        <p:nvPicPr>
+          <p:cNvPr id="15" name="Рисунок 14">
+            <a:extLst>
+              <a:ext uri="{FF2B5EF4-FFF2-40B4-BE49-F238E27FC236}">
+                <a16:creationId xmlns:a16="http://schemas.microsoft.com/office/drawing/2014/main" id="{4CB782F5-21B1-4444-A515-9B385880A166}"/>
+              </a:ext>
+            </a:extLst>
+          </p:cNvPr>
+          <p:cNvPicPr>
+            <a:picLocks noChangeAspect="1"/>
+          </p:cNvPicPr>
+          <p:nvPr/>
+        </p:nvPicPr>
+        <p:blipFill>
+          <a:blip r:embed="rId5"/>
+          <a:stretch>
+            <a:fillRect/>
+          </a:stretch>
+        </p:blipFill>
+        <p:spPr>
+          <a:xfrm>
+            <a:off x="6692348" y="5105399"/>
+            <a:ext cx="4324322" cy="1162843"/>
+          </a:xfrm>
+          <a:prstGeom prst="rect">
+            <a:avLst/>
+          </a:prstGeom>
+        </p:spPr>
+      </p:pic>
+    </p:spTree>
+    <p:extLst>
+      <p:ext uri="{BB962C8B-B14F-4D97-AF65-F5344CB8AC3E}">
+        <p14:creationId xmlns:p14="http://schemas.microsoft.com/office/powerpoint/2010/main" val="108444093"/>
+      </p:ext>
+    </p:extLst>
+  </p:cSld>
+  <p:clrMapOvr>
+    <a:masterClrMapping/>
+  </p:clrMapOvr>
+</p:sld>
+</file>
+
+<file path=ppt/slides/slide89.xml><?xml version="1.0" encoding="utf-8"?>
+<p:sld xmlns:a="http://schemas.openxmlformats.org/drawingml/2006/main" xmlns:r="http://schemas.openxmlformats.org/officeDocument/2006/relationships" xmlns:p="http://schemas.openxmlformats.org/presentationml/2006/main">
+  <p:cSld>
+    <p:spTree>
+      <p:nvGrpSpPr>
+        <p:cNvPr id="1" name=""/>
+        <p:cNvGrpSpPr/>
+        <p:nvPr/>
+      </p:nvGrpSpPr>
+      <p:grpSpPr>
+        <a:xfrm>
+          <a:off x="0" y="0"/>
+          <a:ext cx="0" cy="0"/>
+          <a:chOff x="0" y="0"/>
+          <a:chExt cx="0" cy="0"/>
+        </a:xfrm>
+      </p:grpSpPr>
+      <p:sp>
+        <p:nvSpPr>
+          <p:cNvPr id="3" name="Содержимое 2"/>
+          <p:cNvSpPr>
+            <a:spLocks noGrp="1"/>
+          </p:cNvSpPr>
+          <p:nvPr>
+            <p:ph idx="1"/>
+          </p:nvPr>
+        </p:nvSpPr>
+        <p:spPr>
+          <a:xfrm>
+            <a:off x="914400" y="1499616"/>
+            <a:ext cx="10439400" cy="5358384"/>
+          </a:xfrm>
+        </p:spPr>
+        <p:txBody>
+          <a:bodyPr>
+            <a:normAutofit/>
+          </a:bodyPr>
+          <a:lstStyle/>
           <a:p>
             <a:pPr marL="514350" indent="-514350">
               <a:buFont typeface="+mj-lt"/>
               <a:buAutoNum type="arabicPeriod"/>
             </a:pPr>
             <a:r>
-              <a:rPr lang="en-US" dirty="0">
-                <a:hlinkClick r:id="rId3"/>
-              </a:rPr>
-              <a:t>https://www.codewars.com/kata/5667e8f4e3f572a8f2000039</a:t>
-            </a:r>
-            <a:endParaRPr lang="en-US" dirty="0"/>
+              <a:rPr lang="en-US" dirty="0"/>
+              <a:t>Rewrite your Car Class according to concepts</a:t>
+            </a:r>
           </a:p>
           <a:p>
             <a:pPr marL="514350" indent="-514350">
@@ -25272,192 +27342,179 @@
               <a:buAutoNum type="arabicPeriod"/>
             </a:pPr>
             <a:r>
-              <a:rPr lang="en-US" dirty="0">
-                <a:hlinkClick r:id="rId4"/>
-              </a:rPr>
-              <a:t>https://www.codewars.com/kata/554b4ac871d6813a03000035</a:t>
-            </a:r>
-            <a:endParaRPr lang="en-US" dirty="0"/>
-          </a:p>
-          <a:p>
-            <a:pPr marL="514350" indent="-514350">
+              <a:rPr lang="en-US" dirty="0"/>
+              <a:t>Write a program for Airline reserving.</a:t>
+            </a:r>
+          </a:p>
+          <a:p>
+            <a:pPr marL="971550" lvl="1" indent="-514350">
               <a:buFont typeface="+mj-lt"/>
               <a:buAutoNum type="arabicPeriod"/>
             </a:pPr>
             <a:r>
-              <a:rPr lang="en-US" dirty="0">
-                <a:hlinkClick r:id="rId5"/>
-              </a:rPr>
-              <a:t>https://www.codewars.com/kata/546e2562b03326a88e000020</a:t>
-            </a:r>
-            <a:endParaRPr lang="en-US" dirty="0"/>
-          </a:p>
-          <a:p>
-            <a:pPr marL="514350" indent="-514350">
+              <a:rPr lang="en-US" dirty="0"/>
+              <a:t>Program user is a manager</a:t>
+            </a:r>
+          </a:p>
+          <a:p>
+            <a:pPr marL="971550" lvl="1" indent="-514350">
               <a:buFont typeface="+mj-lt"/>
               <a:buAutoNum type="arabicPeriod"/>
             </a:pPr>
             <a:r>
-              <a:rPr lang="en-US" dirty="0">
-                <a:hlinkClick r:id="rId6"/>
-              </a:rPr>
-              <a:t>https://www.codewars.com/kata/523f5d21c841566fde000009</a:t>
-            </a:r>
-            <a:endParaRPr lang="en-US" dirty="0"/>
-          </a:p>
-          <a:p>
-            <a:pPr marL="514350" indent="-514350">
+              <a:rPr lang="en-US" dirty="0"/>
+              <a:t>Airport contains as many airplanes as manager set while </a:t>
+            </a:r>
+            <a:r>
+              <a:rPr lang="en-US" dirty="0" err="1"/>
+              <a:t>init</a:t>
+            </a:r>
+            <a:r>
+              <a:rPr lang="en-US" dirty="0"/>
+              <a:t> program</a:t>
+            </a:r>
+          </a:p>
+          <a:p>
+            <a:pPr marL="971550" lvl="1" indent="-514350">
               <a:buFont typeface="+mj-lt"/>
               <a:buAutoNum type="arabicPeriod"/>
             </a:pPr>
             <a:r>
-              <a:rPr lang="en-US" dirty="0">
-                <a:hlinkClick r:id="rId7"/>
-              </a:rPr>
-              <a:t>https://www.codewars.com/kata/5526fc09a1bbd946250002dc</a:t>
-            </a:r>
-            <a:endParaRPr lang="en-US" dirty="0"/>
-          </a:p>
-          <a:p>
-            <a:pPr marL="514350" indent="-514350">
+              <a:rPr lang="en-US" dirty="0"/>
+              <a:t>Manager may add users, reserving seats, cancel reserving, ban users, see all info about airplanes or single airplane</a:t>
+            </a:r>
+          </a:p>
+          <a:p>
+            <a:pPr marL="971550" lvl="1" indent="-514350">
               <a:buFont typeface="+mj-lt"/>
               <a:buAutoNum type="arabicPeriod"/>
             </a:pPr>
             <a:r>
-              <a:rPr lang="en-US" dirty="0">
-                <a:hlinkClick r:id="rId8"/>
-              </a:rPr>
-              <a:t>https://www.codewars.com/kata/54b42f9314d9229fd6000d9c</a:t>
-            </a:r>
-            <a:endParaRPr lang="en-US" dirty="0"/>
-          </a:p>
-          <a:p>
-            <a:pPr marL="514350" indent="-514350">
-              <a:buFont typeface="+mj-lt"/>
-              <a:buAutoNum type="arabicPeriod"/>
-            </a:pPr>
-            <a:r>
-              <a:rPr lang="en-US" dirty="0">
-                <a:hlinkClick r:id="rId9"/>
-              </a:rPr>
-              <a:t>https://www.codewars.com/kata/54da539698b8a2ad76000228</a:t>
-            </a:r>
-            <a:endParaRPr lang="en-US" dirty="0"/>
-          </a:p>
-          <a:p>
-            <a:pPr marL="514350" indent="-514350">
-              <a:buFont typeface="+mj-lt"/>
-              <a:buAutoNum type="arabicPeriod"/>
-            </a:pPr>
-            <a:r>
-              <a:rPr lang="en-US" dirty="0">
-                <a:hlinkClick r:id="rId10"/>
-              </a:rPr>
-              <a:t>https://www.codewars.com/kata/5682e646d5eddc1e21000017</a:t>
-            </a:r>
-            <a:endParaRPr lang="en-US" dirty="0"/>
-          </a:p>
-          <a:p>
-            <a:pPr marL="514350" indent="-514350">
-              <a:buFont typeface="+mj-lt"/>
-              <a:buAutoNum type="arabicPeriod"/>
-            </a:pPr>
-            <a:r>
-              <a:rPr lang="en-US" dirty="0">
-                <a:hlinkClick r:id="rId11"/>
-              </a:rPr>
-              <a:t>https://www.codewars.com/kata/5682e72eb7354b2f39000021</a:t>
-            </a:r>
-            <a:endParaRPr lang="en-US" dirty="0"/>
-          </a:p>
-          <a:p>
-            <a:pPr marL="514350" indent="-514350">
-              <a:buFont typeface="+mj-lt"/>
-              <a:buAutoNum type="arabicPeriod"/>
-            </a:pPr>
-            <a:r>
-              <a:rPr lang="en-US" dirty="0">
-                <a:hlinkClick r:id="rId12"/>
-              </a:rPr>
-              <a:t>https://www.codewars.com/kata/5682e809386707366d000024</a:t>
-            </a:r>
-            <a:endParaRPr lang="en-US" dirty="0"/>
-          </a:p>
-          <a:p>
-            <a:pPr marL="514350" indent="-514350">
-              <a:buFont typeface="+mj-lt"/>
-              <a:buAutoNum type="arabicPeriod"/>
-            </a:pPr>
-            <a:r>
-              <a:rPr lang="en-US" dirty="0">
-                <a:hlinkClick r:id="rId13"/>
-              </a:rPr>
-              <a:t>https://www.codewars.com/kata/5682e545fb263ecf7b000069</a:t>
-            </a:r>
-            <a:endParaRPr lang="en-US" dirty="0"/>
-          </a:p>
-          <a:p>
-            <a:pPr marL="514350" indent="-514350">
-              <a:buFont typeface="+mj-lt"/>
-              <a:buAutoNum type="arabicPeriod"/>
-            </a:pPr>
-            <a:endParaRPr lang="en-US" dirty="0"/>
-          </a:p>
-          <a:p>
-            <a:pPr marL="514350" indent="-514350">
-              <a:buFont typeface="+mj-lt"/>
-              <a:buAutoNum type="arabicPeriod"/>
-            </a:pPr>
-            <a:endParaRPr lang="en-US" dirty="0"/>
+              <a:rPr lang="en-US" dirty="0"/>
+              <a:t>Do it with only classes </a:t>
+            </a:r>
           </a:p>
         </p:txBody>
       </p:sp>
-      <p:sp>
-        <p:nvSpPr>
-          <p:cNvPr id="4" name="TextBox 3">
-            <a:extLst>
-              <a:ext uri="{FF2B5EF4-FFF2-40B4-BE49-F238E27FC236}">
-                <a16:creationId xmlns:a16="http://schemas.microsoft.com/office/drawing/2014/main" id="{6FDD5A4C-3AF2-4400-ABA3-EB82EB6B7555}"/>
-              </a:ext>
-            </a:extLst>
-          </p:cNvPr>
-          <p:cNvSpPr txBox="1"/>
+      <p:grpSp>
+        <p:nvGrpSpPr>
+          <p:cNvPr id="2" name="Группа 3"/>
+          <p:cNvGrpSpPr/>
           <p:nvPr/>
-        </p:nvSpPr>
-        <p:spPr>
-          <a:xfrm>
-            <a:off x="838200" y="1690688"/>
-            <a:ext cx="10515600" cy="461665"/>
-          </a:xfrm>
-          <a:prstGeom prst="rect">
-            <a:avLst/>
-          </a:prstGeom>
-          <a:noFill/>
-        </p:spPr>
-        <p:txBody>
-          <a:bodyPr wrap="square" rtlCol="0">
-            <a:spAutoFit/>
-          </a:bodyPr>
-          <a:lstStyle/>
-          <a:p>
-            <a:pPr algn="ctr"/>
-            <a:r>
-              <a:rPr lang="en-US" sz="2400" b="1" dirty="0">
-                <a:latin typeface="MV Boli" panose="02000500030200090000" pitchFamily="2" charset="0"/>
-                <a:cs typeface="MV Boli" panose="02000500030200090000" pitchFamily="2" charset="0"/>
-              </a:rPr>
-              <a:t>Your current task is pretty simple – Just finish All </a:t>
-            </a:r>
-            <a:endParaRPr lang="ru-RU" sz="2400" b="1" dirty="0">
-              <a:cs typeface="MV Boli" panose="02000500030200090000" pitchFamily="2" charset="0"/>
-            </a:endParaRPr>
-          </a:p>
-        </p:txBody>
-      </p:sp>
+        </p:nvGrpSpPr>
+        <p:grpSpPr>
+          <a:xfrm>
+            <a:off x="838200" y="365125"/>
+            <a:ext cx="10515600" cy="1325563"/>
+            <a:chOff x="838200" y="365125"/>
+            <a:chExt cx="10515600" cy="1325563"/>
+          </a:xfrm>
+        </p:grpSpPr>
+        <p:sp>
+          <p:nvSpPr>
+            <p:cNvPr id="5" name="Заголовок 1"/>
+            <p:cNvSpPr txBox="1">
+              <a:spLocks/>
+            </p:cNvSpPr>
+            <p:nvPr/>
+          </p:nvSpPr>
+          <p:spPr>
+            <a:xfrm>
+              <a:off x="838200" y="365125"/>
+              <a:ext cx="10515600" cy="1325563"/>
+            </a:xfrm>
+            <a:prstGeom prst="rect">
+              <a:avLst/>
+            </a:prstGeom>
+          </p:spPr>
+          <p:txBody>
+            <a:bodyPr vert="horz" lIns="91440" tIns="45720" rIns="91440" bIns="45720" rtlCol="0" anchor="ctr">
+              <a:normAutofit/>
+            </a:bodyPr>
+            <a:lstStyle/>
+            <a:p>
+              <a:pPr marL="0" marR="0" lvl="0" indent="0" algn="ctr" defTabSz="914400" rtl="0" eaLnBrk="1" fontAlgn="auto" latinLnBrk="0" hangingPunct="1">
+                <a:lnSpc>
+                  <a:spcPct val="90000"/>
+                </a:lnSpc>
+                <a:spcBef>
+                  <a:spcPct val="0"/>
+                </a:spcBef>
+                <a:spcAft>
+                  <a:spcPts val="0"/>
+                </a:spcAft>
+                <a:buClrTx/>
+                <a:buSzTx/>
+                <a:buFontTx/>
+                <a:buNone/>
+                <a:tabLst/>
+                <a:defRPr/>
+              </a:pPr>
+              <a:r>
+                <a:rPr kumimoji="0" lang="en-US" sz="4400" b="1" i="0" u="none" strike="noStrike" kern="1200" cap="none" spc="0" normalizeH="0" baseline="0" noProof="0" dirty="0">
+                  <a:ln>
+                    <a:noFill/>
+                  </a:ln>
+                  <a:solidFill>
+                    <a:schemeClr val="tx1"/>
+                  </a:solidFill>
+                  <a:effectLst/>
+                  <a:uLnTx/>
+                  <a:uFillTx/>
+                  <a:latin typeface="+mj-lt"/>
+                  <a:ea typeface="+mj-ea"/>
+                  <a:cs typeface="+mj-cs"/>
+                </a:rPr>
+                <a:t>Tasks </a:t>
+              </a:r>
+              <a:endParaRPr kumimoji="0" lang="ru-RU" sz="4400" b="1" i="0" u="none" strike="noStrike" kern="1200" cap="none" spc="0" normalizeH="0" baseline="0" noProof="0" dirty="0">
+                <a:ln>
+                  <a:noFill/>
+                </a:ln>
+                <a:solidFill>
+                  <a:schemeClr val="tx1"/>
+                </a:solidFill>
+                <a:effectLst/>
+                <a:uLnTx/>
+                <a:uFillTx/>
+                <a:latin typeface="+mj-lt"/>
+                <a:ea typeface="+mj-ea"/>
+                <a:cs typeface="+mj-cs"/>
+              </a:endParaRPr>
+            </a:p>
+          </p:txBody>
+        </p:sp>
+        <p:pic>
+          <p:nvPicPr>
+            <p:cNvPr id="6" name="Picture 2" descr="Pin on Бесплатные иконки"/>
+            <p:cNvPicPr>
+              <a:picLocks noChangeAspect="1" noChangeArrowheads="1"/>
+            </p:cNvPicPr>
+            <p:nvPr/>
+          </p:nvPicPr>
+          <p:blipFill>
+            <a:blip r:embed="rId2" cstate="print"/>
+            <a:srcRect/>
+            <a:stretch>
+              <a:fillRect/>
+            </a:stretch>
+          </p:blipFill>
+          <p:spPr bwMode="auto">
+            <a:xfrm>
+              <a:off x="4672711" y="603504"/>
+              <a:ext cx="795401" cy="795401"/>
+            </a:xfrm>
+            <a:prstGeom prst="rect">
+              <a:avLst/>
+            </a:prstGeom>
+            <a:noFill/>
+          </p:spPr>
+        </p:pic>
+      </p:grpSp>
     </p:spTree>
     <p:extLst>
       <p:ext uri="{BB962C8B-B14F-4D97-AF65-F5344CB8AC3E}">
-        <p14:creationId xmlns:p14="http://schemas.microsoft.com/office/powerpoint/2010/main" val="1148193553"/>
+        <p14:creationId xmlns:p14="http://schemas.microsoft.com/office/powerpoint/2010/main" val="4039549532"/>
       </p:ext>
     </p:extLst>
   </p:cSld>
@@ -25693,6 +27750,375 @@
         </p:spPr>
       </p:pic>
     </p:spTree>
+  </p:cSld>
+  <p:clrMapOvr>
+    <a:masterClrMapping/>
+  </p:clrMapOvr>
+</p:sld>
+</file>
+
+<file path=ppt/slides/slide90.xml><?xml version="1.0" encoding="utf-8"?>
+<p:sld xmlns:a="http://schemas.openxmlformats.org/drawingml/2006/main" xmlns:r="http://schemas.openxmlformats.org/officeDocument/2006/relationships" xmlns:p="http://schemas.openxmlformats.org/presentationml/2006/main">
+  <p:cSld>
+    <p:spTree>
+      <p:nvGrpSpPr>
+        <p:cNvPr id="1" name=""/>
+        <p:cNvGrpSpPr/>
+        <p:nvPr/>
+      </p:nvGrpSpPr>
+      <p:grpSpPr>
+        <a:xfrm>
+          <a:off x="0" y="0"/>
+          <a:ext cx="0" cy="0"/>
+          <a:chOff x="0" y="0"/>
+          <a:chExt cx="0" cy="0"/>
+        </a:xfrm>
+      </p:grpSpPr>
+      <p:sp>
+        <p:nvSpPr>
+          <p:cNvPr id="2" name="Заголовок 1"/>
+          <p:cNvSpPr>
+            <a:spLocks noGrp="1"/>
+          </p:cNvSpPr>
+          <p:nvPr>
+            <p:ph type="title"/>
+          </p:nvPr>
+        </p:nvSpPr>
+        <p:spPr>
+          <a:xfrm>
+            <a:off x="856488" y="2431669"/>
+            <a:ext cx="10515600" cy="1325563"/>
+          </a:xfrm>
+        </p:spPr>
+        <p:txBody>
+          <a:bodyPr>
+            <a:normAutofit/>
+          </a:bodyPr>
+          <a:lstStyle/>
+          <a:p>
+            <a:pPr algn="ctr"/>
+            <a:r>
+              <a:rPr lang="en-US" sz="8800" dirty="0">
+                <a:latin typeface="Forte" pitchFamily="66" charset="0"/>
+              </a:rPr>
+              <a:t>Coffee Break </a:t>
+            </a:r>
+            <a:endParaRPr lang="ru-RU" sz="8800" dirty="0"/>
+          </a:p>
+        </p:txBody>
+      </p:sp>
+    </p:spTree>
+    <p:extLst>
+      <p:ext uri="{BB962C8B-B14F-4D97-AF65-F5344CB8AC3E}">
+        <p14:creationId xmlns:p14="http://schemas.microsoft.com/office/powerpoint/2010/main" val="1342017384"/>
+      </p:ext>
+    </p:extLst>
+  </p:cSld>
+  <p:clrMapOvr>
+    <a:masterClrMapping/>
+  </p:clrMapOvr>
+</p:sld>
+</file>
+
+<file path=ppt/slides/slide91.xml><?xml version="1.0" encoding="utf-8"?>
+<p:sld xmlns:a="http://schemas.openxmlformats.org/drawingml/2006/main" xmlns:r="http://schemas.openxmlformats.org/officeDocument/2006/relationships" xmlns:p="http://schemas.openxmlformats.org/presentationml/2006/main">
+  <p:cSld>
+    <p:spTree>
+      <p:nvGrpSpPr>
+        <p:cNvPr id="1" name=""/>
+        <p:cNvGrpSpPr/>
+        <p:nvPr/>
+      </p:nvGrpSpPr>
+      <p:grpSpPr>
+        <a:xfrm>
+          <a:off x="0" y="0"/>
+          <a:ext cx="0" cy="0"/>
+          <a:chOff x="0" y="0"/>
+          <a:chExt cx="0" cy="0"/>
+        </a:xfrm>
+      </p:grpSpPr>
+      <p:sp>
+        <p:nvSpPr>
+          <p:cNvPr id="2" name="Заголовок 1">
+            <a:extLst>
+              <a:ext uri="{FF2B5EF4-FFF2-40B4-BE49-F238E27FC236}">
+                <a16:creationId xmlns:a16="http://schemas.microsoft.com/office/drawing/2014/main" id="{9324FF77-85ED-430A-A432-8E22C22D98B8}"/>
+              </a:ext>
+            </a:extLst>
+          </p:cNvPr>
+          <p:cNvSpPr>
+            <a:spLocks noGrp="1"/>
+          </p:cNvSpPr>
+          <p:nvPr>
+            <p:ph type="title"/>
+          </p:nvPr>
+        </p:nvSpPr>
+        <p:spPr/>
+        <p:txBody>
+          <a:bodyPr/>
+          <a:lstStyle/>
+          <a:p>
+            <a:pPr algn="ctr"/>
+            <a:r>
+              <a:rPr lang="en-US" dirty="0">
+                <a:latin typeface="MV Boli" panose="02000500030200090000" pitchFamily="2" charset="0"/>
+                <a:cs typeface="MV Boli" panose="02000500030200090000" pitchFamily="2" charset="0"/>
+              </a:rPr>
+              <a:t>Final Trials </a:t>
+            </a:r>
+            <a:endParaRPr lang="ru-RU" dirty="0">
+              <a:cs typeface="MV Boli" panose="02000500030200090000" pitchFamily="2" charset="0"/>
+            </a:endParaRPr>
+          </a:p>
+        </p:txBody>
+      </p:sp>
+      <p:sp>
+        <p:nvSpPr>
+          <p:cNvPr id="3" name="Объект 2">
+            <a:extLst>
+              <a:ext uri="{FF2B5EF4-FFF2-40B4-BE49-F238E27FC236}">
+                <a16:creationId xmlns:a16="http://schemas.microsoft.com/office/drawing/2014/main" id="{2ADF3C9B-7FC9-4B7B-953F-F1A81668185B}"/>
+              </a:ext>
+            </a:extLst>
+          </p:cNvPr>
+          <p:cNvSpPr>
+            <a:spLocks noGrp="1"/>
+          </p:cNvSpPr>
+          <p:nvPr>
+            <p:ph idx="1"/>
+          </p:nvPr>
+        </p:nvSpPr>
+        <p:spPr>
+          <a:xfrm>
+            <a:off x="838200" y="2342459"/>
+            <a:ext cx="10515600" cy="4351338"/>
+          </a:xfrm>
+        </p:spPr>
+        <p:txBody>
+          <a:bodyPr>
+            <a:normAutofit fontScale="77500" lnSpcReduction="20000"/>
+          </a:bodyPr>
+          <a:lstStyle/>
+          <a:p>
+            <a:pPr marL="514350" indent="-514350">
+              <a:buFont typeface="+mj-lt"/>
+              <a:buAutoNum type="arabicPeriod"/>
+            </a:pPr>
+            <a:r>
+              <a:rPr lang="en-US" dirty="0">
+                <a:hlinkClick r:id="rId2"/>
+              </a:rPr>
+              <a:t>https://www.codewars.com/kata/52fba66badcd10859f00097e</a:t>
+            </a:r>
+            <a:endParaRPr lang="en-US" dirty="0"/>
+          </a:p>
+          <a:p>
+            <a:pPr marL="514350" indent="-514350">
+              <a:buFont typeface="+mj-lt"/>
+              <a:buAutoNum type="arabicPeriod"/>
+            </a:pPr>
+            <a:r>
+              <a:rPr lang="en-US" dirty="0">
+                <a:hlinkClick r:id="rId3"/>
+              </a:rPr>
+              <a:t>https://www.codewars.com/kata/5667e8f4e3f572a8f2000039</a:t>
+            </a:r>
+            <a:endParaRPr lang="en-US" dirty="0"/>
+          </a:p>
+          <a:p>
+            <a:pPr marL="514350" indent="-514350">
+              <a:buFont typeface="+mj-lt"/>
+              <a:buAutoNum type="arabicPeriod"/>
+            </a:pPr>
+            <a:r>
+              <a:rPr lang="en-US" dirty="0">
+                <a:hlinkClick r:id="rId4"/>
+              </a:rPr>
+              <a:t>https://www.codewars.com/kata/554b4ac871d6813a03000035</a:t>
+            </a:r>
+            <a:endParaRPr lang="en-US" dirty="0"/>
+          </a:p>
+          <a:p>
+            <a:pPr marL="514350" indent="-514350">
+              <a:buFont typeface="+mj-lt"/>
+              <a:buAutoNum type="arabicPeriod"/>
+            </a:pPr>
+            <a:r>
+              <a:rPr lang="en-US" dirty="0">
+                <a:hlinkClick r:id="rId5"/>
+              </a:rPr>
+              <a:t>https://www.codewars.com/kata/546e2562b03326a88e000020</a:t>
+            </a:r>
+            <a:endParaRPr lang="en-US" dirty="0"/>
+          </a:p>
+          <a:p>
+            <a:pPr marL="514350" indent="-514350">
+              <a:buFont typeface="+mj-lt"/>
+              <a:buAutoNum type="arabicPeriod"/>
+            </a:pPr>
+            <a:r>
+              <a:rPr lang="en-US" dirty="0">
+                <a:hlinkClick r:id="rId6"/>
+              </a:rPr>
+              <a:t>https://www.codewars.com/kata/523f5d21c841566fde000009</a:t>
+            </a:r>
+            <a:endParaRPr lang="en-US" dirty="0"/>
+          </a:p>
+          <a:p>
+            <a:pPr marL="514350" indent="-514350">
+              <a:buFont typeface="+mj-lt"/>
+              <a:buAutoNum type="arabicPeriod"/>
+            </a:pPr>
+            <a:r>
+              <a:rPr lang="en-US" dirty="0">
+                <a:hlinkClick r:id="rId7"/>
+              </a:rPr>
+              <a:t>https://www.codewars.com/kata/5526fc09a1bbd946250002dc</a:t>
+            </a:r>
+            <a:endParaRPr lang="en-US" dirty="0"/>
+          </a:p>
+          <a:p>
+            <a:pPr marL="514350" indent="-514350">
+              <a:buFont typeface="+mj-lt"/>
+              <a:buAutoNum type="arabicPeriod"/>
+            </a:pPr>
+            <a:r>
+              <a:rPr lang="en-US" dirty="0">
+                <a:hlinkClick r:id="rId8"/>
+              </a:rPr>
+              <a:t>https://www.codewars.com/kata/54b42f9314d9229fd6000d9c</a:t>
+            </a:r>
+            <a:endParaRPr lang="en-US" dirty="0"/>
+          </a:p>
+          <a:p>
+            <a:pPr marL="514350" indent="-514350">
+              <a:buFont typeface="+mj-lt"/>
+              <a:buAutoNum type="arabicPeriod"/>
+            </a:pPr>
+            <a:r>
+              <a:rPr lang="en-US" dirty="0">
+                <a:hlinkClick r:id="rId9"/>
+              </a:rPr>
+              <a:t>https://www.codewars.com/kata/54da539698b8a2ad76000228</a:t>
+            </a:r>
+            <a:endParaRPr lang="en-US" dirty="0"/>
+          </a:p>
+          <a:p>
+            <a:pPr marL="514350" indent="-514350">
+              <a:buFont typeface="+mj-lt"/>
+              <a:buAutoNum type="arabicPeriod"/>
+            </a:pPr>
+            <a:r>
+              <a:rPr lang="en-US" dirty="0">
+                <a:hlinkClick r:id="rId10"/>
+              </a:rPr>
+              <a:t>https://www.codewars.com/kata/5682e646d5eddc1e21000017</a:t>
+            </a:r>
+            <a:endParaRPr lang="en-US" dirty="0"/>
+          </a:p>
+          <a:p>
+            <a:pPr marL="514350" indent="-514350">
+              <a:buFont typeface="+mj-lt"/>
+              <a:buAutoNum type="arabicPeriod"/>
+            </a:pPr>
+            <a:r>
+              <a:rPr lang="en-US" dirty="0">
+                <a:hlinkClick r:id="rId11"/>
+              </a:rPr>
+              <a:t>https://www.codewars.com/kata/5682e72eb7354b2f39000021</a:t>
+            </a:r>
+            <a:endParaRPr lang="en-US" dirty="0"/>
+          </a:p>
+          <a:p>
+            <a:pPr marL="514350" indent="-514350">
+              <a:buFont typeface="+mj-lt"/>
+              <a:buAutoNum type="arabicPeriod"/>
+            </a:pPr>
+            <a:r>
+              <a:rPr lang="en-US" dirty="0">
+                <a:hlinkClick r:id="rId12"/>
+              </a:rPr>
+              <a:t>https://www.codewars.com/kata/5682e809386707366d000024</a:t>
+            </a:r>
+            <a:endParaRPr lang="en-US" dirty="0"/>
+          </a:p>
+          <a:p>
+            <a:pPr marL="514350" indent="-514350">
+              <a:buFont typeface="+mj-lt"/>
+              <a:buAutoNum type="arabicPeriod"/>
+            </a:pPr>
+            <a:r>
+              <a:rPr lang="en-US" dirty="0">
+                <a:hlinkClick r:id="rId13"/>
+              </a:rPr>
+              <a:t>https://www.codewars.com/kata/5682e545fb263ecf7b000069</a:t>
+            </a:r>
+            <a:endParaRPr lang="en-US" dirty="0"/>
+          </a:p>
+          <a:p>
+            <a:pPr marL="514350" indent="-514350">
+              <a:buFont typeface="+mj-lt"/>
+              <a:buAutoNum type="arabicPeriod"/>
+            </a:pPr>
+            <a:endParaRPr lang="en-US" dirty="0"/>
+          </a:p>
+          <a:p>
+            <a:pPr marL="514350" indent="-514350">
+              <a:buFont typeface="+mj-lt"/>
+              <a:buAutoNum type="arabicPeriod"/>
+            </a:pPr>
+            <a:endParaRPr lang="en-US" dirty="0"/>
+          </a:p>
+        </p:txBody>
+      </p:sp>
+      <p:sp>
+        <p:nvSpPr>
+          <p:cNvPr id="4" name="TextBox 3">
+            <a:extLst>
+              <a:ext uri="{FF2B5EF4-FFF2-40B4-BE49-F238E27FC236}">
+                <a16:creationId xmlns:a16="http://schemas.microsoft.com/office/drawing/2014/main" id="{6FDD5A4C-3AF2-4400-ABA3-EB82EB6B7555}"/>
+              </a:ext>
+            </a:extLst>
+          </p:cNvPr>
+          <p:cNvSpPr txBox="1"/>
+          <p:nvPr/>
+        </p:nvSpPr>
+        <p:spPr>
+          <a:xfrm>
+            <a:off x="838200" y="1690688"/>
+            <a:ext cx="10515600" cy="461665"/>
+          </a:xfrm>
+          <a:prstGeom prst="rect">
+            <a:avLst/>
+          </a:prstGeom>
+          <a:noFill/>
+        </p:spPr>
+        <p:txBody>
+          <a:bodyPr wrap="square" rtlCol="0">
+            <a:spAutoFit/>
+          </a:bodyPr>
+          <a:lstStyle/>
+          <a:p>
+            <a:pPr algn="ctr"/>
+            <a:r>
+              <a:rPr lang="en-US" sz="2400" b="1" dirty="0">
+                <a:latin typeface="MV Boli" panose="02000500030200090000" pitchFamily="2" charset="0"/>
+                <a:cs typeface="MV Boli" panose="02000500030200090000" pitchFamily="2" charset="0"/>
+              </a:rPr>
+              <a:t>Your current task is pretty simple – Just finish All </a:t>
+            </a:r>
+            <a:endParaRPr lang="ru-RU" sz="2400" b="1" dirty="0">
+              <a:cs typeface="MV Boli" panose="02000500030200090000" pitchFamily="2" charset="0"/>
+            </a:endParaRPr>
+          </a:p>
+        </p:txBody>
+      </p:sp>
+    </p:spTree>
+    <p:extLst>
+      <p:ext uri="{BB962C8B-B14F-4D97-AF65-F5344CB8AC3E}">
+        <p14:creationId xmlns:p14="http://schemas.microsoft.com/office/powerpoint/2010/main" val="1148193553"/>
+      </p:ext>
+    </p:extLst>
   </p:cSld>
   <p:clrMapOvr>
     <a:masterClrMapping/>

</xml_diff>

<commit_message>
feat: add __str__ description
</commit_message>
<xml_diff>
--- a/python 101/python_101.pptx
+++ b/python 101/python_101.pptx
@@ -89,13 +89,14 @@
     <p:sldId id="339" r:id="rId83"/>
     <p:sldId id="340" r:id="rId84"/>
     <p:sldId id="342" r:id="rId85"/>
-    <p:sldId id="344" r:id="rId86"/>
-    <p:sldId id="343" r:id="rId87"/>
-    <p:sldId id="346" r:id="rId88"/>
-    <p:sldId id="345" r:id="rId89"/>
-    <p:sldId id="350" r:id="rId90"/>
-    <p:sldId id="347" r:id="rId91"/>
-    <p:sldId id="325" r:id="rId92"/>
+    <p:sldId id="351" r:id="rId86"/>
+    <p:sldId id="344" r:id="rId87"/>
+    <p:sldId id="343" r:id="rId88"/>
+    <p:sldId id="346" r:id="rId89"/>
+    <p:sldId id="345" r:id="rId90"/>
+    <p:sldId id="350" r:id="rId91"/>
+    <p:sldId id="347" r:id="rId92"/>
+    <p:sldId id="325" r:id="rId93"/>
   </p:sldIdLst>
   <p:sldSz cx="12192000" cy="6858000"/>
   <p:notesSz cx="6858000" cy="9144000"/>
@@ -2799,7 +2800,7 @@
             <a:fld id="{79F9FB66-DBE4-4599-9B3C-E1452FD2AC05}" type="datetimeFigureOut">
               <a:rPr lang="en-US" smtClean="0"/>
               <a:pPr/>
-              <a:t>9/25/2021</a:t>
+              <a:t>9/26/2021</a:t>
             </a:fld>
             <a:endParaRPr lang="en-US" dirty="0"/>
           </a:p>
@@ -2969,7 +2970,7 @@
             <a:fld id="{79F9FB66-DBE4-4599-9B3C-E1452FD2AC05}" type="datetimeFigureOut">
               <a:rPr lang="en-US" smtClean="0"/>
               <a:pPr/>
-              <a:t>9/25/2021</a:t>
+              <a:t>9/26/2021</a:t>
             </a:fld>
             <a:endParaRPr lang="en-US" dirty="0"/>
           </a:p>
@@ -3149,7 +3150,7 @@
             <a:fld id="{79F9FB66-DBE4-4599-9B3C-E1452FD2AC05}" type="datetimeFigureOut">
               <a:rPr lang="en-US" smtClean="0"/>
               <a:pPr/>
-              <a:t>9/25/2021</a:t>
+              <a:t>9/26/2021</a:t>
             </a:fld>
             <a:endParaRPr lang="en-US" dirty="0"/>
           </a:p>
@@ -3319,7 +3320,7 @@
             <a:fld id="{79F9FB66-DBE4-4599-9B3C-E1452FD2AC05}" type="datetimeFigureOut">
               <a:rPr lang="en-US" smtClean="0"/>
               <a:pPr/>
-              <a:t>9/25/2021</a:t>
+              <a:t>9/26/2021</a:t>
             </a:fld>
             <a:endParaRPr lang="en-US" dirty="0"/>
           </a:p>
@@ -3566,7 +3567,7 @@
             <a:fld id="{79F9FB66-DBE4-4599-9B3C-E1452FD2AC05}" type="datetimeFigureOut">
               <a:rPr lang="en-US" smtClean="0"/>
               <a:pPr/>
-              <a:t>9/25/2021</a:t>
+              <a:t>9/26/2021</a:t>
             </a:fld>
             <a:endParaRPr lang="en-US" dirty="0"/>
           </a:p>
@@ -3797,7 +3798,7 @@
             <a:fld id="{79F9FB66-DBE4-4599-9B3C-E1452FD2AC05}" type="datetimeFigureOut">
               <a:rPr lang="en-US" smtClean="0"/>
               <a:pPr/>
-              <a:t>9/25/2021</a:t>
+              <a:t>9/26/2021</a:t>
             </a:fld>
             <a:endParaRPr lang="en-US" dirty="0"/>
           </a:p>
@@ -4163,7 +4164,7 @@
             <a:fld id="{79F9FB66-DBE4-4599-9B3C-E1452FD2AC05}" type="datetimeFigureOut">
               <a:rPr lang="en-US" smtClean="0"/>
               <a:pPr/>
-              <a:t>9/25/2021</a:t>
+              <a:t>9/26/2021</a:t>
             </a:fld>
             <a:endParaRPr lang="en-US" dirty="0"/>
           </a:p>
@@ -4282,7 +4283,7 @@
             <a:fld id="{79F9FB66-DBE4-4599-9B3C-E1452FD2AC05}" type="datetimeFigureOut">
               <a:rPr lang="en-US" smtClean="0"/>
               <a:pPr/>
-              <a:t>9/25/2021</a:t>
+              <a:t>9/26/2021</a:t>
             </a:fld>
             <a:endParaRPr lang="en-US" dirty="0"/>
           </a:p>
@@ -4379,7 +4380,7 @@
             <a:fld id="{79F9FB66-DBE4-4599-9B3C-E1452FD2AC05}" type="datetimeFigureOut">
               <a:rPr lang="en-US" smtClean="0"/>
               <a:pPr/>
-              <a:t>9/25/2021</a:t>
+              <a:t>9/26/2021</a:t>
             </a:fld>
             <a:endParaRPr lang="en-US" dirty="0"/>
           </a:p>
@@ -4656,7 +4657,7 @@
             <a:fld id="{79F9FB66-DBE4-4599-9B3C-E1452FD2AC05}" type="datetimeFigureOut">
               <a:rPr lang="en-US" smtClean="0"/>
               <a:pPr/>
-              <a:t>9/25/2021</a:t>
+              <a:t>9/26/2021</a:t>
             </a:fld>
             <a:endParaRPr lang="en-US" dirty="0"/>
           </a:p>
@@ -4910,7 +4911,7 @@
             <a:fld id="{79F9FB66-DBE4-4599-9B3C-E1452FD2AC05}" type="datetimeFigureOut">
               <a:rPr lang="en-US" smtClean="0"/>
               <a:pPr/>
-              <a:t>9/25/2021</a:t>
+              <a:t>9/26/2021</a:t>
             </a:fld>
             <a:endParaRPr lang="en-US" dirty="0"/>
           </a:p>
@@ -5153,7 +5154,7 @@
             <a:fld id="{79F9FB66-DBE4-4599-9B3C-E1452FD2AC05}" type="datetimeFigureOut">
               <a:rPr lang="en-US" smtClean="0"/>
               <a:pPr/>
-              <a:t>9/25/2021</a:t>
+              <a:t>9/26/2021</a:t>
             </a:fld>
             <a:endParaRPr lang="en-US" dirty="0"/>
           </a:p>
@@ -26086,6 +26087,156 @@
       </p:grpSpPr>
       <p:sp>
         <p:nvSpPr>
+          <p:cNvPr id="2" name="Заголовок 1">
+            <a:extLst>
+              <a:ext uri="{FF2B5EF4-FFF2-40B4-BE49-F238E27FC236}">
+                <a16:creationId xmlns:a16="http://schemas.microsoft.com/office/drawing/2014/main" id="{6CBAE825-C50E-46B7-9926-C85FEFCB9D24}"/>
+              </a:ext>
+            </a:extLst>
+          </p:cNvPr>
+          <p:cNvSpPr>
+            <a:spLocks noGrp="1"/>
+          </p:cNvSpPr>
+          <p:nvPr>
+            <p:ph type="title"/>
+          </p:nvPr>
+        </p:nvSpPr>
+        <p:spPr/>
+        <p:txBody>
+          <a:bodyPr/>
+          <a:lstStyle/>
+          <a:p>
+            <a:pPr algn="ctr"/>
+            <a:r>
+              <a:rPr lang="en-US" dirty="0"/>
+              <a:t>__str__</a:t>
+            </a:r>
+            <a:endParaRPr lang="ru-RU" dirty="0"/>
+          </a:p>
+        </p:txBody>
+      </p:sp>
+      <p:sp>
+        <p:nvSpPr>
+          <p:cNvPr id="3" name="Объект 2">
+            <a:extLst>
+              <a:ext uri="{FF2B5EF4-FFF2-40B4-BE49-F238E27FC236}">
+                <a16:creationId xmlns:a16="http://schemas.microsoft.com/office/drawing/2014/main" id="{E437C80F-15E1-4353-A066-C28A851B139E}"/>
+              </a:ext>
+            </a:extLst>
+          </p:cNvPr>
+          <p:cNvSpPr>
+            <a:spLocks noGrp="1"/>
+          </p:cNvSpPr>
+          <p:nvPr>
+            <p:ph idx="1"/>
+          </p:nvPr>
+        </p:nvSpPr>
+        <p:spPr>
+          <a:xfrm>
+            <a:off x="838200" y="1825625"/>
+            <a:ext cx="10515600" cy="1898236"/>
+          </a:xfrm>
+        </p:spPr>
+        <p:txBody>
+          <a:bodyPr>
+            <a:normAutofit/>
+          </a:bodyPr>
+          <a:lstStyle/>
+          <a:p>
+            <a:r>
+              <a:rPr lang="en-US" dirty="0"/>
+              <a:t>This is a python private method that calls every time when object transforms to string.</a:t>
+            </a:r>
+          </a:p>
+          <a:p>
+            <a:r>
+              <a:rPr lang="en-US" dirty="0"/>
+              <a:t>You may define into your class e for better performance</a:t>
+            </a:r>
+          </a:p>
+          <a:p>
+            <a:r>
+              <a:rPr lang="en-US" dirty="0"/>
+              <a:t>Note! </a:t>
+            </a:r>
+            <a:r>
+              <a:rPr lang="en-US" dirty="0">
+                <a:solidFill>
+                  <a:srgbClr val="FF0000"/>
+                </a:solidFill>
+              </a:rPr>
+              <a:t>__str__ </a:t>
+            </a:r>
+            <a:r>
+              <a:rPr lang="en-US" dirty="0"/>
+              <a:t>must return a string </a:t>
+            </a:r>
+            <a:endParaRPr lang="ru-RU" dirty="0"/>
+          </a:p>
+        </p:txBody>
+      </p:sp>
+      <p:pic>
+        <p:nvPicPr>
+          <p:cNvPr id="4" name="Рисунок 3">
+            <a:extLst>
+              <a:ext uri="{FF2B5EF4-FFF2-40B4-BE49-F238E27FC236}">
+                <a16:creationId xmlns:a16="http://schemas.microsoft.com/office/drawing/2014/main" id="{DFD3ED7C-39D0-413A-83D7-67526CCFBDA8}"/>
+              </a:ext>
+            </a:extLst>
+          </p:cNvPr>
+          <p:cNvPicPr>
+            <a:picLocks noChangeAspect="1"/>
+          </p:cNvPicPr>
+          <p:nvPr/>
+        </p:nvPicPr>
+        <p:blipFill>
+          <a:blip r:embed="rId2"/>
+          <a:stretch>
+            <a:fillRect/>
+          </a:stretch>
+        </p:blipFill>
+        <p:spPr>
+          <a:xfrm>
+            <a:off x="4259332" y="3858798"/>
+            <a:ext cx="3837746" cy="2423840"/>
+          </a:xfrm>
+          <a:prstGeom prst="rect">
+            <a:avLst/>
+          </a:prstGeom>
+        </p:spPr>
+      </p:pic>
+    </p:spTree>
+    <p:extLst>
+      <p:ext uri="{BB962C8B-B14F-4D97-AF65-F5344CB8AC3E}">
+        <p14:creationId xmlns:p14="http://schemas.microsoft.com/office/powerpoint/2010/main" val="134010320"/>
+      </p:ext>
+    </p:extLst>
+  </p:cSld>
+  <p:clrMapOvr>
+    <a:masterClrMapping/>
+  </p:clrMapOvr>
+</p:sld>
+</file>
+
+<file path=ppt/slides/slide86.xml><?xml version="1.0" encoding="utf-8"?>
+<p:sld xmlns:a="http://schemas.openxmlformats.org/drawingml/2006/main" xmlns:r="http://schemas.openxmlformats.org/officeDocument/2006/relationships" xmlns:p="http://schemas.openxmlformats.org/presentationml/2006/main">
+  <p:cSld>
+    <p:spTree>
+      <p:nvGrpSpPr>
+        <p:cNvPr id="1" name=""/>
+        <p:cNvGrpSpPr/>
+        <p:nvPr/>
+      </p:nvGrpSpPr>
+      <p:grpSpPr>
+        <a:xfrm>
+          <a:off x="0" y="0"/>
+          <a:ext cx="0" cy="0"/>
+          <a:chOff x="0" y="0"/>
+          <a:chExt cx="0" cy="0"/>
+        </a:xfrm>
+      </p:grpSpPr>
+      <p:sp>
+        <p:nvSpPr>
           <p:cNvPr id="3" name="Содержимое 2"/>
           <p:cNvSpPr>
             <a:spLocks noGrp="1"/>
@@ -26335,7 +26486,7 @@
 </p:sld>
 </file>
 
-<file path=ppt/slides/slide86.xml><?xml version="1.0" encoding="utf-8"?>
+<file path=ppt/slides/slide87.xml><?xml version="1.0" encoding="utf-8"?>
 <p:sld xmlns:a="http://schemas.openxmlformats.org/drawingml/2006/main" xmlns:r="http://schemas.openxmlformats.org/officeDocument/2006/relationships" xmlns:p="http://schemas.openxmlformats.org/presentationml/2006/main">
   <p:cSld>
     <p:spTree>
@@ -26592,7 +26743,7 @@
 </p:sld>
 </file>
 
-<file path=ppt/slides/slide87.xml><?xml version="1.0" encoding="utf-8"?>
+<file path=ppt/slides/slide88.xml><?xml version="1.0" encoding="utf-8"?>
 <p:sld xmlns:a="http://schemas.openxmlformats.org/drawingml/2006/main" xmlns:r="http://schemas.openxmlformats.org/officeDocument/2006/relationships" xmlns:p="http://schemas.openxmlformats.org/presentationml/2006/main">
   <p:cSld>
     <p:spTree>
@@ -26960,7 +27111,7 @@
 </p:sld>
 </file>
 
-<file path=ppt/slides/slide88.xml><?xml version="1.0" encoding="utf-8"?>
+<file path=ppt/slides/slide89.xml><?xml version="1.0" encoding="utf-8"?>
 <p:sld xmlns:a="http://schemas.openxmlformats.org/drawingml/2006/main" xmlns:r="http://schemas.openxmlformats.org/officeDocument/2006/relationships" xmlns:p="http://schemas.openxmlformats.org/presentationml/2006/main">
   <p:cSld>
     <p:spTree>
@@ -27288,7 +27439,240 @@
 </p:sld>
 </file>
 
-<file path=ppt/slides/slide89.xml><?xml version="1.0" encoding="utf-8"?>
+<file path=ppt/slides/slide9.xml><?xml version="1.0" encoding="utf-8"?>
+<p:sld xmlns:a="http://schemas.openxmlformats.org/drawingml/2006/main" xmlns:r="http://schemas.openxmlformats.org/officeDocument/2006/relationships" xmlns:p="http://schemas.openxmlformats.org/presentationml/2006/main">
+  <p:cSld>
+    <p:spTree>
+      <p:nvGrpSpPr>
+        <p:cNvPr id="1" name=""/>
+        <p:cNvGrpSpPr/>
+        <p:nvPr/>
+      </p:nvGrpSpPr>
+      <p:grpSpPr>
+        <a:xfrm>
+          <a:off x="0" y="0"/>
+          <a:ext cx="0" cy="0"/>
+          <a:chOff x="0" y="0"/>
+          <a:chExt cx="0" cy="0"/>
+        </a:xfrm>
+      </p:grpSpPr>
+      <p:sp>
+        <p:nvSpPr>
+          <p:cNvPr id="2" name="Заголовок 1"/>
+          <p:cNvSpPr>
+            <a:spLocks noGrp="1"/>
+          </p:cNvSpPr>
+          <p:nvPr>
+            <p:ph type="title"/>
+          </p:nvPr>
+        </p:nvSpPr>
+        <p:spPr/>
+        <p:txBody>
+          <a:bodyPr/>
+          <a:lstStyle/>
+          <a:p>
+            <a:pPr algn="ctr"/>
+            <a:r>
+              <a:rPr lang="en-US" b="1" dirty="0"/>
+              <a:t>Tasks</a:t>
+            </a:r>
+            <a:endParaRPr lang="ru-RU" b="1" dirty="0"/>
+          </a:p>
+        </p:txBody>
+      </p:sp>
+      <p:sp>
+        <p:nvSpPr>
+          <p:cNvPr id="3" name="Содержимое 2"/>
+          <p:cNvSpPr>
+            <a:spLocks noGrp="1"/>
+          </p:cNvSpPr>
+          <p:nvPr>
+            <p:ph idx="1"/>
+          </p:nvPr>
+        </p:nvSpPr>
+        <p:spPr>
+          <a:xfrm>
+            <a:off x="1115568" y="1825624"/>
+            <a:ext cx="10238232" cy="5032375"/>
+          </a:xfrm>
+        </p:spPr>
+        <p:txBody>
+          <a:bodyPr>
+            <a:normAutofit/>
+          </a:bodyPr>
+          <a:lstStyle/>
+          <a:p>
+            <a:pPr marL="514350" indent="-514350">
+              <a:buFont typeface="+mj-lt"/>
+              <a:buAutoNum type="romanUcPeriod"/>
+            </a:pPr>
+            <a:r>
+              <a:rPr lang="en-US" dirty="0"/>
+              <a:t>Find lowest number among group </a:t>
+            </a:r>
+          </a:p>
+          <a:p>
+            <a:pPr marL="914400" lvl="1" indent="-457200"/>
+            <a:r>
+              <a:rPr lang="en-US" dirty="0">
+                <a:solidFill>
+                  <a:srgbClr val="C00000"/>
+                </a:solidFill>
+              </a:rPr>
+              <a:t>7, 10, 9 , 20</a:t>
+            </a:r>
+          </a:p>
+          <a:p>
+            <a:pPr marL="914400" lvl="1" indent="-457200"/>
+            <a:r>
+              <a:rPr lang="en-US" dirty="0">
+                <a:solidFill>
+                  <a:srgbClr val="C00000"/>
+                </a:solidFill>
+              </a:rPr>
+              <a:t>-1, 2, 5, -1.5</a:t>
+            </a:r>
+          </a:p>
+          <a:p>
+            <a:pPr marL="914400" lvl="1" indent="-457200"/>
+            <a:r>
+              <a:rPr lang="en-US" dirty="0">
+                <a:solidFill>
+                  <a:srgbClr val="C00000"/>
+                </a:solidFill>
+              </a:rPr>
+              <a:t>23532, 35329, 2335, 33</a:t>
+            </a:r>
+          </a:p>
+          <a:p>
+            <a:pPr marL="571500" indent="-571500">
+              <a:buFont typeface="+mj-lt"/>
+              <a:buAutoNum type="romanUcPeriod"/>
+            </a:pPr>
+            <a:r>
+              <a:rPr lang="en-US" dirty="0"/>
+              <a:t>Find square root</a:t>
+            </a:r>
+          </a:p>
+          <a:p>
+            <a:pPr marL="1028700" lvl="1" indent="-571500"/>
+            <a:r>
+              <a:rPr lang="en-US" dirty="0"/>
+              <a:t>User input some number</a:t>
+            </a:r>
+          </a:p>
+          <a:p>
+            <a:pPr marL="1028700" lvl="1" indent="-571500"/>
+            <a:r>
+              <a:rPr lang="en-US" dirty="0"/>
+              <a:t>Program print square root of it</a:t>
+            </a:r>
+          </a:p>
+          <a:p>
+            <a:pPr marL="571500" indent="-571500">
+              <a:buFont typeface="+mj-lt"/>
+              <a:buAutoNum type="romanUcPeriod"/>
+            </a:pPr>
+            <a:r>
+              <a:rPr lang="en-US" dirty="0"/>
+              <a:t>Create BMI program</a:t>
+            </a:r>
+          </a:p>
+          <a:p>
+            <a:pPr marL="1028700" lvl="1" indent="-571500"/>
+            <a:r>
+              <a:rPr lang="en-US" dirty="0"/>
+              <a:t>BMI – body mass index </a:t>
+            </a:r>
+          </a:p>
+          <a:p>
+            <a:pPr marL="1028700" lvl="1" indent="-571500"/>
+            <a:r>
+              <a:rPr lang="en-US" dirty="0"/>
+              <a:t>Its calculates by formula: </a:t>
+            </a:r>
+          </a:p>
+          <a:p>
+            <a:pPr marL="1028700" lvl="1" indent="-571500"/>
+            <a:endParaRPr lang="en-US" dirty="0"/>
+          </a:p>
+          <a:p>
+            <a:pPr marL="1028700" lvl="1" indent="-571500"/>
+            <a:r>
+              <a:rPr lang="en-US" dirty="0"/>
+              <a:t>Program should return the result of calculation</a:t>
+            </a:r>
+          </a:p>
+        </p:txBody>
+      </p:sp>
+      <p:pic>
+        <p:nvPicPr>
+          <p:cNvPr id="8194" name="Picture 2" descr="Pin on Бесплатные иконки"/>
+          <p:cNvPicPr>
+            <a:picLocks noChangeAspect="1" noChangeArrowheads="1"/>
+          </p:cNvPicPr>
+          <p:nvPr/>
+        </p:nvPicPr>
+        <p:blipFill>
+          <a:blip r:embed="rId2" cstate="print"/>
+          <a:srcRect/>
+          <a:stretch>
+            <a:fillRect/>
+          </a:stretch>
+        </p:blipFill>
+        <p:spPr bwMode="auto">
+          <a:xfrm>
+            <a:off x="4672711" y="603504"/>
+            <a:ext cx="795401" cy="795401"/>
+          </a:xfrm>
+          <a:prstGeom prst="rect">
+            <a:avLst/>
+          </a:prstGeom>
+          <a:noFill/>
+        </p:spPr>
+      </p:pic>
+      <p:pic>
+        <p:nvPicPr>
+          <p:cNvPr id="2050" name="Picture 2"/>
+          <p:cNvPicPr>
+            <a:picLocks noChangeAspect="1" noChangeArrowheads="1"/>
+          </p:cNvPicPr>
+          <p:nvPr/>
+        </p:nvPicPr>
+        <p:blipFill>
+          <a:blip r:embed="rId3"/>
+          <a:srcRect/>
+          <a:stretch>
+            <a:fillRect/>
+          </a:stretch>
+        </p:blipFill>
+        <p:spPr bwMode="auto">
+          <a:xfrm>
+            <a:off x="5518404" y="5063491"/>
+            <a:ext cx="2563611" cy="1117854"/>
+          </a:xfrm>
+          <a:prstGeom prst="rect">
+            <a:avLst/>
+          </a:prstGeom>
+          <a:noFill/>
+          <a:ln w="9525">
+            <a:noFill/>
+            <a:miter lim="800000"/>
+            <a:headEnd/>
+            <a:tailEnd/>
+          </a:ln>
+          <a:effectLst/>
+        </p:spPr>
+      </p:pic>
+    </p:spTree>
+  </p:cSld>
+  <p:clrMapOvr>
+    <a:masterClrMapping/>
+  </p:clrMapOvr>
+</p:sld>
+</file>
+
+<file path=ppt/slides/slide90.xml><?xml version="1.0" encoding="utf-8"?>
 <p:sld xmlns:a="http://schemas.openxmlformats.org/drawingml/2006/main" xmlns:r="http://schemas.openxmlformats.org/officeDocument/2006/relationships" xmlns:p="http://schemas.openxmlformats.org/presentationml/2006/main">
   <p:cSld>
     <p:spTree>
@@ -27524,240 +27908,7 @@
 </p:sld>
 </file>
 
-<file path=ppt/slides/slide9.xml><?xml version="1.0" encoding="utf-8"?>
-<p:sld xmlns:a="http://schemas.openxmlformats.org/drawingml/2006/main" xmlns:r="http://schemas.openxmlformats.org/officeDocument/2006/relationships" xmlns:p="http://schemas.openxmlformats.org/presentationml/2006/main">
-  <p:cSld>
-    <p:spTree>
-      <p:nvGrpSpPr>
-        <p:cNvPr id="1" name=""/>
-        <p:cNvGrpSpPr/>
-        <p:nvPr/>
-      </p:nvGrpSpPr>
-      <p:grpSpPr>
-        <a:xfrm>
-          <a:off x="0" y="0"/>
-          <a:ext cx="0" cy="0"/>
-          <a:chOff x="0" y="0"/>
-          <a:chExt cx="0" cy="0"/>
-        </a:xfrm>
-      </p:grpSpPr>
-      <p:sp>
-        <p:nvSpPr>
-          <p:cNvPr id="2" name="Заголовок 1"/>
-          <p:cNvSpPr>
-            <a:spLocks noGrp="1"/>
-          </p:cNvSpPr>
-          <p:nvPr>
-            <p:ph type="title"/>
-          </p:nvPr>
-        </p:nvSpPr>
-        <p:spPr/>
-        <p:txBody>
-          <a:bodyPr/>
-          <a:lstStyle/>
-          <a:p>
-            <a:pPr algn="ctr"/>
-            <a:r>
-              <a:rPr lang="en-US" b="1" dirty="0"/>
-              <a:t>Tasks</a:t>
-            </a:r>
-            <a:endParaRPr lang="ru-RU" b="1" dirty="0"/>
-          </a:p>
-        </p:txBody>
-      </p:sp>
-      <p:sp>
-        <p:nvSpPr>
-          <p:cNvPr id="3" name="Содержимое 2"/>
-          <p:cNvSpPr>
-            <a:spLocks noGrp="1"/>
-          </p:cNvSpPr>
-          <p:nvPr>
-            <p:ph idx="1"/>
-          </p:nvPr>
-        </p:nvSpPr>
-        <p:spPr>
-          <a:xfrm>
-            <a:off x="1115568" y="1825624"/>
-            <a:ext cx="10238232" cy="5032375"/>
-          </a:xfrm>
-        </p:spPr>
-        <p:txBody>
-          <a:bodyPr>
-            <a:normAutofit/>
-          </a:bodyPr>
-          <a:lstStyle/>
-          <a:p>
-            <a:pPr marL="514350" indent="-514350">
-              <a:buFont typeface="+mj-lt"/>
-              <a:buAutoNum type="romanUcPeriod"/>
-            </a:pPr>
-            <a:r>
-              <a:rPr lang="en-US" dirty="0"/>
-              <a:t>Find lowest number among group </a:t>
-            </a:r>
-          </a:p>
-          <a:p>
-            <a:pPr marL="914400" lvl="1" indent="-457200"/>
-            <a:r>
-              <a:rPr lang="en-US" dirty="0">
-                <a:solidFill>
-                  <a:srgbClr val="C00000"/>
-                </a:solidFill>
-              </a:rPr>
-              <a:t>7, 10, 9 , 20</a:t>
-            </a:r>
-          </a:p>
-          <a:p>
-            <a:pPr marL="914400" lvl="1" indent="-457200"/>
-            <a:r>
-              <a:rPr lang="en-US" dirty="0">
-                <a:solidFill>
-                  <a:srgbClr val="C00000"/>
-                </a:solidFill>
-              </a:rPr>
-              <a:t>-1, 2, 5, -1.5</a:t>
-            </a:r>
-          </a:p>
-          <a:p>
-            <a:pPr marL="914400" lvl="1" indent="-457200"/>
-            <a:r>
-              <a:rPr lang="en-US" dirty="0">
-                <a:solidFill>
-                  <a:srgbClr val="C00000"/>
-                </a:solidFill>
-              </a:rPr>
-              <a:t>23532, 35329, 2335, 33</a:t>
-            </a:r>
-          </a:p>
-          <a:p>
-            <a:pPr marL="571500" indent="-571500">
-              <a:buFont typeface="+mj-lt"/>
-              <a:buAutoNum type="romanUcPeriod"/>
-            </a:pPr>
-            <a:r>
-              <a:rPr lang="en-US" dirty="0"/>
-              <a:t>Find square root</a:t>
-            </a:r>
-          </a:p>
-          <a:p>
-            <a:pPr marL="1028700" lvl="1" indent="-571500"/>
-            <a:r>
-              <a:rPr lang="en-US" dirty="0"/>
-              <a:t>User input some number</a:t>
-            </a:r>
-          </a:p>
-          <a:p>
-            <a:pPr marL="1028700" lvl="1" indent="-571500"/>
-            <a:r>
-              <a:rPr lang="en-US" dirty="0"/>
-              <a:t>Program print square root of it</a:t>
-            </a:r>
-          </a:p>
-          <a:p>
-            <a:pPr marL="571500" indent="-571500">
-              <a:buFont typeface="+mj-lt"/>
-              <a:buAutoNum type="romanUcPeriod"/>
-            </a:pPr>
-            <a:r>
-              <a:rPr lang="en-US" dirty="0"/>
-              <a:t>Create BMI program</a:t>
-            </a:r>
-          </a:p>
-          <a:p>
-            <a:pPr marL="1028700" lvl="1" indent="-571500"/>
-            <a:r>
-              <a:rPr lang="en-US" dirty="0"/>
-              <a:t>BMI – body mass index </a:t>
-            </a:r>
-          </a:p>
-          <a:p>
-            <a:pPr marL="1028700" lvl="1" indent="-571500"/>
-            <a:r>
-              <a:rPr lang="en-US" dirty="0"/>
-              <a:t>Its calculates by formula: </a:t>
-            </a:r>
-          </a:p>
-          <a:p>
-            <a:pPr marL="1028700" lvl="1" indent="-571500"/>
-            <a:endParaRPr lang="en-US" dirty="0"/>
-          </a:p>
-          <a:p>
-            <a:pPr marL="1028700" lvl="1" indent="-571500"/>
-            <a:r>
-              <a:rPr lang="en-US" dirty="0"/>
-              <a:t>Program should return the result of calculation</a:t>
-            </a:r>
-          </a:p>
-        </p:txBody>
-      </p:sp>
-      <p:pic>
-        <p:nvPicPr>
-          <p:cNvPr id="8194" name="Picture 2" descr="Pin on Бесплатные иконки"/>
-          <p:cNvPicPr>
-            <a:picLocks noChangeAspect="1" noChangeArrowheads="1"/>
-          </p:cNvPicPr>
-          <p:nvPr/>
-        </p:nvPicPr>
-        <p:blipFill>
-          <a:blip r:embed="rId2" cstate="print"/>
-          <a:srcRect/>
-          <a:stretch>
-            <a:fillRect/>
-          </a:stretch>
-        </p:blipFill>
-        <p:spPr bwMode="auto">
-          <a:xfrm>
-            <a:off x="4672711" y="603504"/>
-            <a:ext cx="795401" cy="795401"/>
-          </a:xfrm>
-          <a:prstGeom prst="rect">
-            <a:avLst/>
-          </a:prstGeom>
-          <a:noFill/>
-        </p:spPr>
-      </p:pic>
-      <p:pic>
-        <p:nvPicPr>
-          <p:cNvPr id="2050" name="Picture 2"/>
-          <p:cNvPicPr>
-            <a:picLocks noChangeAspect="1" noChangeArrowheads="1"/>
-          </p:cNvPicPr>
-          <p:nvPr/>
-        </p:nvPicPr>
-        <p:blipFill>
-          <a:blip r:embed="rId3"/>
-          <a:srcRect/>
-          <a:stretch>
-            <a:fillRect/>
-          </a:stretch>
-        </p:blipFill>
-        <p:spPr bwMode="auto">
-          <a:xfrm>
-            <a:off x="5518404" y="5063491"/>
-            <a:ext cx="2563611" cy="1117854"/>
-          </a:xfrm>
-          <a:prstGeom prst="rect">
-            <a:avLst/>
-          </a:prstGeom>
-          <a:noFill/>
-          <a:ln w="9525">
-            <a:noFill/>
-            <a:miter lim="800000"/>
-            <a:headEnd/>
-            <a:tailEnd/>
-          </a:ln>
-          <a:effectLst/>
-        </p:spPr>
-      </p:pic>
-    </p:spTree>
-  </p:cSld>
-  <p:clrMapOvr>
-    <a:masterClrMapping/>
-  </p:clrMapOvr>
-</p:sld>
-</file>
-
-<file path=ppt/slides/slide90.xml><?xml version="1.0" encoding="utf-8"?>
+<file path=ppt/slides/slide91.xml><?xml version="1.0" encoding="utf-8"?>
 <p:sld xmlns:a="http://schemas.openxmlformats.org/drawingml/2006/main" xmlns:r="http://schemas.openxmlformats.org/officeDocument/2006/relationships" xmlns:p="http://schemas.openxmlformats.org/presentationml/2006/main">
   <p:cSld>
     <p:spTree>
@@ -27820,7 +27971,7 @@
 </p:sld>
 </file>
 
-<file path=ppt/slides/slide91.xml><?xml version="1.0" encoding="utf-8"?>
+<file path=ppt/slides/slide92.xml><?xml version="1.0" encoding="utf-8"?>
 <p:sld xmlns:a="http://schemas.openxmlformats.org/drawingml/2006/main" xmlns:r="http://schemas.openxmlformats.org/officeDocument/2006/relationships" xmlns:p="http://schemas.openxmlformats.org/presentationml/2006/main">
   <p:cSld>
     <p:spTree>

</xml_diff>